<commit_message>
Title added + Content Slide Added + Objective has been finalized
</commit_message>
<xml_diff>
--- a/Project Interim Submission/Generic DS Framework.pptx
+++ b/Project Interim Submission/Generic DS Framework.pptx
@@ -8,7 +8,8 @@
     <p:sldId id="256" r:id="rId2"/>
     <p:sldId id="258" r:id="rId3"/>
     <p:sldId id="257" r:id="rId4"/>
-    <p:sldId id="259" r:id="rId5"/>
+    <p:sldId id="260" r:id="rId5"/>
+    <p:sldId id="259" r:id="rId6"/>
   </p:sldIdLst>
   <p:sldSz cx="12192000" cy="6858000"/>
   <p:notesSz cx="6858000" cy="9144000"/>
@@ -107,6 +108,11 @@
       </a:defRPr>
     </a:lvl9pPr>
   </p:defaultTextStyle>
+  <p:extLst>
+    <p:ext uri="{EFAFB233-063F-42B5-8137-9DF3F51BA10A}">
+      <p15:sldGuideLst xmlns:p15="http://schemas.microsoft.com/office/powerpoint/2012/main"/>
+    </p:ext>
+  </p:extLst>
 </p:presentation>
 </file>
 
@@ -336,7 +342,7 @@
           <a:p>
             <a:fld id="{BE50AB1F-9C50-41A2-BE99-4D3D06C85678}" type="datetimeFigureOut">
               <a:rPr lang="en-US" smtClean="0"/>
-              <a:t>11-Jan-19</a:t>
+              <a:t>1/11/2019</a:t>
             </a:fld>
             <a:endParaRPr lang="en-US"/>
           </a:p>
@@ -544,7 +550,7 @@
           <a:p>
             <a:fld id="{BE50AB1F-9C50-41A2-BE99-4D3D06C85678}" type="datetimeFigureOut">
               <a:rPr lang="en-US" smtClean="0"/>
-              <a:t>11-Jan-19</a:t>
+              <a:t>1/11/2019</a:t>
             </a:fld>
             <a:endParaRPr lang="en-US"/>
           </a:p>
@@ -800,7 +806,7 @@
           <a:p>
             <a:fld id="{BE50AB1F-9C50-41A2-BE99-4D3D06C85678}" type="datetimeFigureOut">
               <a:rPr lang="en-US" smtClean="0"/>
-              <a:t>11-Jan-19</a:t>
+              <a:t>1/11/2019</a:t>
             </a:fld>
             <a:endParaRPr lang="en-US"/>
           </a:p>
@@ -970,7 +976,7 @@
           <a:p>
             <a:fld id="{BE50AB1F-9C50-41A2-BE99-4D3D06C85678}" type="datetimeFigureOut">
               <a:rPr lang="en-US" smtClean="0"/>
-              <a:t>11-Jan-19</a:t>
+              <a:t>1/11/2019</a:t>
             </a:fld>
             <a:endParaRPr lang="en-US"/>
           </a:p>
@@ -1313,7 +1319,7 @@
           <a:p>
             <a:fld id="{BE50AB1F-9C50-41A2-BE99-4D3D06C85678}" type="datetimeFigureOut">
               <a:rPr lang="en-US" smtClean="0"/>
-              <a:t>11-Jan-19</a:t>
+              <a:t>1/11/2019</a:t>
             </a:fld>
             <a:endParaRPr lang="en-US"/>
           </a:p>
@@ -1588,7 +1594,7 @@
           <a:p>
             <a:fld id="{BE50AB1F-9C50-41A2-BE99-4D3D06C85678}" type="datetimeFigureOut">
               <a:rPr lang="en-US" smtClean="0"/>
-              <a:t>11-Jan-19</a:t>
+              <a:t>1/11/2019</a:t>
             </a:fld>
             <a:endParaRPr lang="en-US"/>
           </a:p>
@@ -1967,7 +1973,7 @@
           <a:p>
             <a:fld id="{BE50AB1F-9C50-41A2-BE99-4D3D06C85678}" type="datetimeFigureOut">
               <a:rPr lang="en-US" smtClean="0"/>
-              <a:t>11-Jan-19</a:t>
+              <a:t>1/11/2019</a:t>
             </a:fld>
             <a:endParaRPr lang="en-US"/>
           </a:p>
@@ -2085,7 +2091,7 @@
           <a:p>
             <a:fld id="{BE50AB1F-9C50-41A2-BE99-4D3D06C85678}" type="datetimeFigureOut">
               <a:rPr lang="en-US" smtClean="0"/>
-              <a:t>11-Jan-19</a:t>
+              <a:t>1/11/2019</a:t>
             </a:fld>
             <a:endParaRPr lang="en-US"/>
           </a:p>
@@ -2256,7 +2262,7 @@
           <a:p>
             <a:fld id="{BE50AB1F-9C50-41A2-BE99-4D3D06C85678}" type="datetimeFigureOut">
               <a:rPr lang="en-US" smtClean="0"/>
-              <a:t>11-Jan-19</a:t>
+              <a:t>1/11/2019</a:t>
             </a:fld>
             <a:endParaRPr lang="en-US"/>
           </a:p>
@@ -2610,7 +2616,7 @@
           <a:p>
             <a:fld id="{BE50AB1F-9C50-41A2-BE99-4D3D06C85678}" type="datetimeFigureOut">
               <a:rPr lang="en-US" smtClean="0"/>
-              <a:t>11-Jan-19</a:t>
+              <a:t>1/11/2019</a:t>
             </a:fld>
             <a:endParaRPr lang="en-US"/>
           </a:p>
@@ -2987,7 +2993,7 @@
           <a:p>
             <a:fld id="{BE50AB1F-9C50-41A2-BE99-4D3D06C85678}" type="datetimeFigureOut">
               <a:rPr lang="en-US" smtClean="0"/>
-              <a:t>11-Jan-19</a:t>
+              <a:t>1/11/2019</a:t>
             </a:fld>
             <a:endParaRPr lang="en-US"/>
           </a:p>
@@ -3274,7 +3280,7 @@
           <a:p>
             <a:fld id="{BE50AB1F-9C50-41A2-BE99-4D3D06C85678}" type="datetimeFigureOut">
               <a:rPr lang="en-US" smtClean="0"/>
-              <a:t>11-Jan-19</a:t>
+              <a:t>1/11/2019</a:t>
             </a:fld>
             <a:endParaRPr lang="en-US"/>
           </a:p>
@@ -3813,9 +3819,21 @@
           <a:bodyPr/>
           <a:lstStyle/>
           <a:p>
+            <a:pPr algn="ctr"/>
             <a:r>
               <a:rPr lang="en-US" dirty="0" smtClean="0"/>
-              <a:t>Generic DS Framework</a:t>
+              <a:t>Generic DS Framework / </a:t>
+            </a:r>
+            <a:br>
+              <a:rPr lang="en-US" dirty="0" smtClean="0"/>
+            </a:br>
+            <a:r>
+              <a:rPr lang="en-US" dirty="0" smtClean="0"/>
+              <a:t>Mega </a:t>
+            </a:r>
+            <a:r>
+              <a:rPr lang="en-US" dirty="0" err="1" smtClean="0"/>
+              <a:t>FrameWork</a:t>
             </a:r>
             <a:endParaRPr lang="en-US" dirty="0"/>
           </a:p>
@@ -4369,6 +4387,92 @@
           <a:p>
             <a:r>
               <a:rPr lang="en-US" dirty="0" smtClean="0"/>
+              <a:t>Content To Be Delivered </a:t>
+            </a:r>
+            <a:endParaRPr lang="en-US" dirty="0"/>
+          </a:p>
+        </p:txBody>
+      </p:sp>
+      <p:sp>
+        <p:nvSpPr>
+          <p:cNvPr id="3" name="Content Placeholder 2"/>
+          <p:cNvSpPr>
+            <a:spLocks noGrp="1"/>
+          </p:cNvSpPr>
+          <p:nvPr>
+            <p:ph idx="1"/>
+          </p:nvPr>
+        </p:nvSpPr>
+        <p:spPr/>
+        <p:txBody>
+          <a:bodyPr/>
+          <a:lstStyle/>
+          <a:p>
+            <a:pPr>
+              <a:buFont typeface="Wingdings" panose="05000000000000000000" pitchFamily="2" charset="2"/>
+              <a:buChar char="Ø"/>
+            </a:pPr>
+            <a:r>
+              <a:rPr lang="en-US" dirty="0" smtClean="0"/>
+              <a:t> Objective</a:t>
+            </a:r>
+          </a:p>
+          <a:p>
+            <a:pPr>
+              <a:buFont typeface="Wingdings" panose="05000000000000000000" pitchFamily="2" charset="2"/>
+              <a:buChar char="Ø"/>
+            </a:pPr>
+            <a:endParaRPr lang="en-US" dirty="0"/>
+          </a:p>
+        </p:txBody>
+      </p:sp>
+    </p:spTree>
+    <p:extLst>
+      <p:ext uri="{BB962C8B-B14F-4D97-AF65-F5344CB8AC3E}">
+        <p14:creationId xmlns:p14="http://schemas.microsoft.com/office/powerpoint/2010/main" val="2868840354"/>
+      </p:ext>
+    </p:extLst>
+  </p:cSld>
+  <p:clrMapOvr>
+    <a:masterClrMapping/>
+  </p:clrMapOvr>
+</p:sld>
+</file>
+
+<file path=ppt/slides/slide5.xml><?xml version="1.0" encoding="utf-8"?>
+<p:sld xmlns:a="http://schemas.openxmlformats.org/drawingml/2006/main" xmlns:r="http://schemas.openxmlformats.org/officeDocument/2006/relationships" xmlns:p="http://schemas.openxmlformats.org/presentationml/2006/main">
+  <p:cSld>
+    <p:spTree>
+      <p:nvGrpSpPr>
+        <p:cNvPr id="1" name=""/>
+        <p:cNvGrpSpPr/>
+        <p:nvPr/>
+      </p:nvGrpSpPr>
+      <p:grpSpPr>
+        <a:xfrm>
+          <a:off x="0" y="0"/>
+          <a:ext cx="0" cy="0"/>
+          <a:chOff x="0" y="0"/>
+          <a:chExt cx="0" cy="0"/>
+        </a:xfrm>
+      </p:grpSpPr>
+      <p:sp>
+        <p:nvSpPr>
+          <p:cNvPr id="2" name="Title 1"/>
+          <p:cNvSpPr>
+            <a:spLocks noGrp="1"/>
+          </p:cNvSpPr>
+          <p:nvPr>
+            <p:ph type="title"/>
+          </p:nvPr>
+        </p:nvSpPr>
+        <p:spPr/>
+        <p:txBody>
+          <a:bodyPr/>
+          <a:lstStyle/>
+          <a:p>
+            <a:r>
+              <a:rPr lang="en-US" dirty="0" smtClean="0"/>
               <a:t>Objectives</a:t>
             </a:r>
             <a:endParaRPr lang="en-US" dirty="0"/>
@@ -4387,10 +4491,27 @@
         </p:nvSpPr>
         <p:spPr/>
         <p:txBody>
-          <a:bodyPr/>
-          <a:lstStyle/>
-          <a:p>
-            <a:endParaRPr lang="en-US" dirty="0"/>
+          <a:bodyPr>
+            <a:normAutofit/>
+          </a:bodyPr>
+          <a:lstStyle/>
+          <a:p>
+            <a:r>
+              <a:rPr lang="en-US" sz="2800" dirty="0"/>
+              <a:t>Our objective is to study a wide variety of Tools / Algorithms / Techniques and make a centralized platform </a:t>
+            </a:r>
+            <a:r>
+              <a:rPr lang="en-US" sz="2800"/>
+              <a:t>or </a:t>
+            </a:r>
+            <a:r>
+              <a:rPr lang="en-US" sz="2800" smtClean="0"/>
+              <a:t>Framework </a:t>
+            </a:r>
+            <a:r>
+              <a:rPr lang="en-US" sz="2800" dirty="0"/>
+              <a:t>where different nature of tools are categorized for the ease of use for Data Scientists and this will be helpful for the future enhancement of Data Science.</a:t>
+            </a:r>
           </a:p>
         </p:txBody>
       </p:sp>

</xml_diff>

<commit_message>
Data Science & Distributed System Slide Added .... Finalized
</commit_message>
<xml_diff>
--- a/Project Interim Submission/Generic DS Framework.pptx
+++ b/Project Interim Submission/Generic DS Framework.pptx
@@ -8,10 +8,11 @@
     <p:sldId id="256" r:id="rId2"/>
     <p:sldId id="258" r:id="rId3"/>
     <p:sldId id="257" r:id="rId4"/>
-    <p:sldId id="260" r:id="rId5"/>
+    <p:sldId id="263" r:id="rId5"/>
     <p:sldId id="259" r:id="rId6"/>
-    <p:sldId id="261" r:id="rId7"/>
-    <p:sldId id="262" r:id="rId8"/>
+    <p:sldId id="264" r:id="rId7"/>
+    <p:sldId id="261" r:id="rId8"/>
+    <p:sldId id="262" r:id="rId9"/>
   </p:sldIdLst>
   <p:sldSz cx="12192000" cy="6858000"/>
   <p:notesSz cx="6858000" cy="9144000"/>
@@ -4049,14 +4050,14 @@
                 <a:gridCol w="5035931">
                   <a:extLst>
                     <a:ext uri="{9D8B030D-6E8A-4147-A177-3AD203B41FA5}">
-                      <a16:colId xmlns:a16="http://schemas.microsoft.com/office/drawing/2014/main" val="20000"/>
+                      <a16:colId xmlns:a16="http://schemas.microsoft.com/office/drawing/2014/main" xmlns="" val="20000"/>
                     </a:ext>
                   </a:extLst>
                 </a:gridCol>
                 <a:gridCol w="5022469">
                   <a:extLst>
                     <a:ext uri="{9D8B030D-6E8A-4147-A177-3AD203B41FA5}">
-                      <a16:colId xmlns:a16="http://schemas.microsoft.com/office/drawing/2014/main" val="20001"/>
+                      <a16:colId xmlns:a16="http://schemas.microsoft.com/office/drawing/2014/main" xmlns="" val="20001"/>
                     </a:ext>
                   </a:extLst>
                 </a:gridCol>
@@ -4136,7 +4137,7 @@
                 </a:tc>
                 <a:extLst>
                   <a:ext uri="{0D108BD9-81ED-4DB2-BD59-A6C34878D82A}">
-                    <a16:rowId xmlns:a16="http://schemas.microsoft.com/office/drawing/2014/main" val="10000"/>
+                    <a16:rowId xmlns:a16="http://schemas.microsoft.com/office/drawing/2014/main" xmlns="" val="10000"/>
                   </a:ext>
                 </a:extLst>
               </a:tr>
@@ -4223,7 +4224,7 @@
                 </a:tc>
                 <a:extLst>
                   <a:ext uri="{0D108BD9-81ED-4DB2-BD59-A6C34878D82A}">
-                    <a16:rowId xmlns:a16="http://schemas.microsoft.com/office/drawing/2014/main" val="10001"/>
+                    <a16:rowId xmlns:a16="http://schemas.microsoft.com/office/drawing/2014/main" xmlns="" val="10001"/>
                   </a:ext>
                 </a:extLst>
               </a:tr>
@@ -4326,7 +4327,7 @@
                 </a:tc>
                 <a:extLst>
                   <a:ext uri="{0D108BD9-81ED-4DB2-BD59-A6C34878D82A}">
-                    <a16:rowId xmlns:a16="http://schemas.microsoft.com/office/drawing/2014/main" val="10002"/>
+                    <a16:rowId xmlns:a16="http://schemas.microsoft.com/office/drawing/2014/main" xmlns="" val="10002"/>
                   </a:ext>
                 </a:extLst>
               </a:tr>
@@ -4407,8 +4408,23 @@
             </a:pPr>
             <a:r>
               <a:rPr lang="en-US" dirty="0"/>
-              <a:t> Objective</a:t>
-            </a:r>
+              <a:t> </a:t>
+            </a:r>
+            <a:r>
+              <a:rPr lang="en-US" dirty="0" smtClean="0"/>
+              <a:t>Objective</a:t>
+            </a:r>
+          </a:p>
+          <a:p>
+            <a:pPr>
+              <a:buFont typeface="Wingdings" panose="05000000000000000000" pitchFamily="2" charset="2"/>
+              <a:buChar char="Ø"/>
+            </a:pPr>
+            <a:r>
+              <a:rPr lang="en-US" dirty="0" smtClean="0"/>
+              <a:t>Data Science &amp; Distributed System</a:t>
+            </a:r>
+            <a:endParaRPr lang="en-US" dirty="0"/>
           </a:p>
           <a:p>
             <a:pPr>
@@ -4442,7 +4458,7 @@
     </p:spTree>
     <p:extLst>
       <p:ext uri="{BB962C8B-B14F-4D97-AF65-F5344CB8AC3E}">
-        <p14:creationId xmlns:p14="http://schemas.microsoft.com/office/powerpoint/2010/main" val="2868840354"/>
+        <p14:creationId xmlns:p14="http://schemas.microsoft.com/office/powerpoint/2010/main" val="3965877948"/>
       </p:ext>
     </p:extLst>
   </p:cSld>
@@ -4558,7 +4574,7 @@
           <p:cNvPr id="2" name="Title 1">
             <a:extLst>
               <a:ext uri="{FF2B5EF4-FFF2-40B4-BE49-F238E27FC236}">
-                <a16:creationId xmlns:a16="http://schemas.microsoft.com/office/drawing/2014/main" id="{F4727C6F-3982-4E54-AA66-B4E0AA33FF66}"/>
+                <a16:creationId xmlns="" xmlns:a16="http://schemas.microsoft.com/office/drawing/2014/main" id="{F4727C6F-3982-4E54-AA66-B4E0AA33FF66}"/>
               </a:ext>
             </a:extLst>
           </p:cNvPr>
@@ -4576,9 +4592,8 @@
           <a:p>
             <a:r>
               <a:rPr lang="en-US" dirty="0"/>
-              <a:t>Introduction to Big Data</a:t>
-            </a:r>
-            <a:endParaRPr lang="en-PK" dirty="0"/>
+              <a:t>Data Science &amp; Distributed System</a:t>
+            </a:r>
           </a:p>
         </p:txBody>
       </p:sp>
@@ -4587,7 +4602,7 @@
           <p:cNvPr id="3" name="Content Placeholder 2">
             <a:extLst>
               <a:ext uri="{FF2B5EF4-FFF2-40B4-BE49-F238E27FC236}">
-                <a16:creationId xmlns:a16="http://schemas.microsoft.com/office/drawing/2014/main" id="{1134DAC4-9E94-441C-A9BE-87750F6F60A2}"/>
+                <a16:creationId xmlns="" xmlns:a16="http://schemas.microsoft.com/office/drawing/2014/main" id="{1134DAC4-9E94-441C-A9BE-87750F6F60A2}"/>
               </a:ext>
             </a:extLst>
           </p:cNvPr>
@@ -4605,40 +4620,64 @@
           </a:bodyPr>
           <a:lstStyle/>
           <a:p>
-            <a:r>
-              <a:rPr lang="en-US" b="1" i="1" u="sng" dirty="0"/>
-              <a:t>Definition</a:t>
-            </a:r>
-            <a:r>
-              <a:rPr lang="en-US" dirty="0"/>
-              <a:t> </a:t>
-            </a:r>
+            <a:endParaRPr lang="en-US" dirty="0"/>
           </a:p>
           <a:p>
             <a:r>
               <a:rPr lang="en-US" dirty="0">
                 <a:latin typeface="+mj-lt"/>
               </a:rPr>
-              <a:t>Extremely large data sets that may be analyzed computationally to reveal patterns, trends, and associations, especially relating to human behavior and interactions.</a:t>
-            </a:r>
-          </a:p>
-          <a:p>
+              <a:t>Data science is a "concept to unify statistics, data analysis, machine learning and their related methods" in order to "understand and analyze actual phenomena" with data. It employs techniques and theories drawn from many fields within the context of mathematics, statistics, information science, and computer science</a:t>
+            </a:r>
+            <a:r>
+              <a:rPr lang="en-US" dirty="0" smtClean="0">
+                <a:latin typeface="+mj-lt"/>
+              </a:rPr>
+              <a:t>.</a:t>
+            </a:r>
+          </a:p>
+          <a:p>
+            <a:r>
+              <a:rPr lang="en-US" dirty="0" smtClean="0">
+                <a:latin typeface="+mj-lt"/>
+              </a:rPr>
+              <a:t>Companies </a:t>
+            </a:r>
             <a:r>
               <a:rPr lang="en-US" dirty="0">
                 <a:latin typeface="+mj-lt"/>
               </a:rPr>
-              <a:t>Big data is a term that describes the large volume of data – both structured and unstructured – that inundates a business on a day-to-day basis. But it’s not the amount of data that’s important. It’s what organizations do with the data that matters. Big data can be analyzed for insights that lead to better decisions and strategic business moves.</a:t>
-            </a:r>
-          </a:p>
-          <a:p>
-            <a:endParaRPr lang="en-PK" dirty="0"/>
+              <a:t>are generating Large volume of Data on daily basis and they have to identify the trends or forecasting different nature of stats for maximizing their profitability. This Big Data is used by their distributed systems for the evaluation of their production, sales, and different other types of productivity for the future growth of a company</a:t>
+            </a:r>
+            <a:r>
+              <a:rPr lang="en-US" dirty="0" smtClean="0">
+                <a:latin typeface="+mj-lt"/>
+              </a:rPr>
+              <a:t>.</a:t>
+            </a:r>
+          </a:p>
+          <a:p>
+            <a:endParaRPr lang="en-US" dirty="0" smtClean="0">
+              <a:latin typeface="+mj-lt"/>
+            </a:endParaRPr>
+          </a:p>
+          <a:p>
+            <a:endParaRPr lang="en-US" dirty="0">
+              <a:latin typeface="+mj-lt"/>
+            </a:endParaRPr>
+          </a:p>
+          <a:p>
+            <a:endParaRPr lang="en-US" dirty="0" smtClean="0"/>
+          </a:p>
+          <a:p>
+            <a:endParaRPr lang="x-none" dirty="0"/>
           </a:p>
         </p:txBody>
       </p:sp>
     </p:spTree>
     <p:extLst>
       <p:ext uri="{BB962C8B-B14F-4D97-AF65-F5344CB8AC3E}">
-        <p14:creationId xmlns:p14="http://schemas.microsoft.com/office/powerpoint/2010/main" val="196455147"/>
+        <p14:creationId xmlns:p14="http://schemas.microsoft.com/office/powerpoint/2010/main" val="2419379414"/>
       </p:ext>
     </p:extLst>
   </p:cSld>
@@ -4670,7 +4709,7 @@
           <p:cNvPr id="2" name="Title 1">
             <a:extLst>
               <a:ext uri="{FF2B5EF4-FFF2-40B4-BE49-F238E27FC236}">
-                <a16:creationId xmlns:a16="http://schemas.microsoft.com/office/drawing/2014/main" id="{3E1AC600-D16C-47B7-9075-94DA61007B25}"/>
+                <a16:creationId xmlns:a16="http://schemas.microsoft.com/office/drawing/2014/main" xmlns="" id="{F4727C6F-3982-4E54-AA66-B4E0AA33FF66}"/>
               </a:ext>
             </a:extLst>
           </p:cNvPr>
@@ -4688,9 +4727,9 @@
           <a:p>
             <a:r>
               <a:rPr lang="en-US" dirty="0"/>
-              <a:t>Tools used for big data</a:t>
-            </a:r>
-            <a:endParaRPr lang="en-PK" dirty="0"/>
+              <a:t>Introduction to Big Data</a:t>
+            </a:r>
+            <a:endParaRPr lang="x-none" dirty="0"/>
           </a:p>
         </p:txBody>
       </p:sp>
@@ -4699,7 +4738,119 @@
           <p:cNvPr id="3" name="Content Placeholder 2">
             <a:extLst>
               <a:ext uri="{FF2B5EF4-FFF2-40B4-BE49-F238E27FC236}">
-                <a16:creationId xmlns:a16="http://schemas.microsoft.com/office/drawing/2014/main" id="{DDC8679B-3323-4E4B-ABD6-BD8748DF3AEB}"/>
+                <a16:creationId xmlns:a16="http://schemas.microsoft.com/office/drawing/2014/main" xmlns="" id="{1134DAC4-9E94-441C-A9BE-87750F6F60A2}"/>
+              </a:ext>
+            </a:extLst>
+          </p:cNvPr>
+          <p:cNvSpPr>
+            <a:spLocks noGrp="1"/>
+          </p:cNvSpPr>
+          <p:nvPr>
+            <p:ph idx="1"/>
+          </p:nvPr>
+        </p:nvSpPr>
+        <p:spPr/>
+        <p:txBody>
+          <a:bodyPr>
+            <a:normAutofit/>
+          </a:bodyPr>
+          <a:lstStyle/>
+          <a:p>
+            <a:r>
+              <a:rPr lang="en-US" b="1" i="1" u="sng" dirty="0"/>
+              <a:t>Definition</a:t>
+            </a:r>
+            <a:r>
+              <a:rPr lang="en-US" dirty="0"/>
+              <a:t> </a:t>
+            </a:r>
+          </a:p>
+          <a:p>
+            <a:r>
+              <a:rPr lang="en-US" dirty="0">
+                <a:latin typeface="+mj-lt"/>
+              </a:rPr>
+              <a:t>Extremely large data sets that may be analyzed computationally to reveal patterns, trends, and associations, especially relating to human behavior and interactions.</a:t>
+            </a:r>
+          </a:p>
+          <a:p>
+            <a:r>
+              <a:rPr lang="en-US" dirty="0">
+                <a:latin typeface="+mj-lt"/>
+              </a:rPr>
+              <a:t>Big data is a term that describes the large volume of data – both structured and unstructured – that inundates a business on a day-to-day basis. But it’s not the amount of data that’s important. It’s what organizations do with the data that matters. Big data can be analyzed for insights that lead to better decisions and strategic business moves.</a:t>
+            </a:r>
+          </a:p>
+          <a:p>
+            <a:endParaRPr lang="x-none" dirty="0"/>
+          </a:p>
+        </p:txBody>
+      </p:sp>
+    </p:spTree>
+    <p:extLst>
+      <p:ext uri="{BB962C8B-B14F-4D97-AF65-F5344CB8AC3E}">
+        <p14:creationId xmlns:p14="http://schemas.microsoft.com/office/powerpoint/2010/main" val="196455147"/>
+      </p:ext>
+    </p:extLst>
+  </p:cSld>
+  <p:clrMapOvr>
+    <a:masterClrMapping/>
+  </p:clrMapOvr>
+</p:sld>
+</file>
+
+<file path=ppt/slides/slide8.xml><?xml version="1.0" encoding="utf-8"?>
+<p:sld xmlns:a="http://schemas.openxmlformats.org/drawingml/2006/main" xmlns:r="http://schemas.openxmlformats.org/officeDocument/2006/relationships" xmlns:p="http://schemas.openxmlformats.org/presentationml/2006/main">
+  <p:cSld>
+    <p:spTree>
+      <p:nvGrpSpPr>
+        <p:cNvPr id="1" name=""/>
+        <p:cNvGrpSpPr/>
+        <p:nvPr/>
+      </p:nvGrpSpPr>
+      <p:grpSpPr>
+        <a:xfrm>
+          <a:off x="0" y="0"/>
+          <a:ext cx="0" cy="0"/>
+          <a:chOff x="0" y="0"/>
+          <a:chExt cx="0" cy="0"/>
+        </a:xfrm>
+      </p:grpSpPr>
+      <p:sp>
+        <p:nvSpPr>
+          <p:cNvPr id="2" name="Title 1">
+            <a:extLst>
+              <a:ext uri="{FF2B5EF4-FFF2-40B4-BE49-F238E27FC236}">
+                <a16:creationId xmlns:a16="http://schemas.microsoft.com/office/drawing/2014/main" xmlns="" id="{3E1AC600-D16C-47B7-9075-94DA61007B25}"/>
+              </a:ext>
+            </a:extLst>
+          </p:cNvPr>
+          <p:cNvSpPr>
+            <a:spLocks noGrp="1"/>
+          </p:cNvSpPr>
+          <p:nvPr>
+            <p:ph type="title"/>
+          </p:nvPr>
+        </p:nvSpPr>
+        <p:spPr/>
+        <p:txBody>
+          <a:bodyPr/>
+          <a:lstStyle/>
+          <a:p>
+            <a:r>
+              <a:rPr lang="en-US" dirty="0"/>
+              <a:t>Tools used for big data</a:t>
+            </a:r>
+            <a:endParaRPr lang="x-none" dirty="0"/>
+          </a:p>
+        </p:txBody>
+      </p:sp>
+      <p:sp>
+        <p:nvSpPr>
+          <p:cNvPr id="3" name="Content Placeholder 2">
+            <a:extLst>
+              <a:ext uri="{FF2B5EF4-FFF2-40B4-BE49-F238E27FC236}">
+                <a16:creationId xmlns:a16="http://schemas.microsoft.com/office/drawing/2014/main" xmlns="" id="{DDC8679B-3323-4E4B-ABD6-BD8748DF3AEB}"/>
               </a:ext>
             </a:extLst>
           </p:cNvPr>
@@ -4730,8 +4881,12 @@
               <a:buChar char="v"/>
             </a:pPr>
             <a:r>
+              <a:rPr lang="en-US" dirty="0" smtClean="0"/>
+              <a:t>Hadoop </a:t>
+            </a:r>
+            <a:r>
               <a:rPr lang="en-US" dirty="0"/>
-              <a:t>	Hadoop software library is a framework</a:t>
+              <a:t>software library is a framework</a:t>
             </a:r>
           </a:p>
           <a:p>
@@ -4753,7 +4908,7 @@
               <a:rPr lang="en-US" dirty="0"/>
               <a:t>Two method to start single node or cluster mode</a:t>
             </a:r>
-            <a:endParaRPr lang="en-PK" dirty="0"/>
+            <a:endParaRPr lang="x-none" dirty="0"/>
           </a:p>
         </p:txBody>
       </p:sp>

</xml_diff>

<commit_message>
Data Science & Distributed System Slide updated
</commit_message>
<xml_diff>
--- a/Project Interim Submission/Generic DS Framework.pptx
+++ b/Project Interim Submission/Generic DS Framework.pptx
@@ -10,8 +10,9 @@
     <p:sldId id="257" r:id="rId4"/>
     <p:sldId id="260" r:id="rId5"/>
     <p:sldId id="259" r:id="rId6"/>
-    <p:sldId id="261" r:id="rId7"/>
-    <p:sldId id="262" r:id="rId8"/>
+    <p:sldId id="263" r:id="rId7"/>
+    <p:sldId id="261" r:id="rId8"/>
+    <p:sldId id="262" r:id="rId9"/>
   </p:sldIdLst>
   <p:sldSz cx="12192000" cy="6858000"/>
   <p:notesSz cx="6858000" cy="9144000"/>
@@ -344,7 +345,7 @@
           <a:p>
             <a:fld id="{BE50AB1F-9C50-41A2-BE99-4D3D06C85678}" type="datetimeFigureOut">
               <a:rPr lang="en-US" smtClean="0"/>
-              <a:t>17-Jan-19</a:t>
+              <a:t>1/17/2019</a:t>
             </a:fld>
             <a:endParaRPr lang="en-US"/>
           </a:p>
@@ -552,7 +553,7 @@
           <a:p>
             <a:fld id="{BE50AB1F-9C50-41A2-BE99-4D3D06C85678}" type="datetimeFigureOut">
               <a:rPr lang="en-US" smtClean="0"/>
-              <a:t>17-Jan-19</a:t>
+              <a:t>1/17/2019</a:t>
             </a:fld>
             <a:endParaRPr lang="en-US"/>
           </a:p>
@@ -808,7 +809,7 @@
           <a:p>
             <a:fld id="{BE50AB1F-9C50-41A2-BE99-4D3D06C85678}" type="datetimeFigureOut">
               <a:rPr lang="en-US" smtClean="0"/>
-              <a:t>17-Jan-19</a:t>
+              <a:t>1/17/2019</a:t>
             </a:fld>
             <a:endParaRPr lang="en-US"/>
           </a:p>
@@ -978,7 +979,7 @@
           <a:p>
             <a:fld id="{BE50AB1F-9C50-41A2-BE99-4D3D06C85678}" type="datetimeFigureOut">
               <a:rPr lang="en-US" smtClean="0"/>
-              <a:t>17-Jan-19</a:t>
+              <a:t>1/17/2019</a:t>
             </a:fld>
             <a:endParaRPr lang="en-US"/>
           </a:p>
@@ -1321,7 +1322,7 @@
           <a:p>
             <a:fld id="{BE50AB1F-9C50-41A2-BE99-4D3D06C85678}" type="datetimeFigureOut">
               <a:rPr lang="en-US" smtClean="0"/>
-              <a:t>17-Jan-19</a:t>
+              <a:t>1/17/2019</a:t>
             </a:fld>
             <a:endParaRPr lang="en-US"/>
           </a:p>
@@ -1596,7 +1597,7 @@
           <a:p>
             <a:fld id="{BE50AB1F-9C50-41A2-BE99-4D3D06C85678}" type="datetimeFigureOut">
               <a:rPr lang="en-US" smtClean="0"/>
-              <a:t>17-Jan-19</a:t>
+              <a:t>1/17/2019</a:t>
             </a:fld>
             <a:endParaRPr lang="en-US"/>
           </a:p>
@@ -1975,7 +1976,7 @@
           <a:p>
             <a:fld id="{BE50AB1F-9C50-41A2-BE99-4D3D06C85678}" type="datetimeFigureOut">
               <a:rPr lang="en-US" smtClean="0"/>
-              <a:t>17-Jan-19</a:t>
+              <a:t>1/17/2019</a:t>
             </a:fld>
             <a:endParaRPr lang="en-US"/>
           </a:p>
@@ -2093,7 +2094,7 @@
           <a:p>
             <a:fld id="{BE50AB1F-9C50-41A2-BE99-4D3D06C85678}" type="datetimeFigureOut">
               <a:rPr lang="en-US" smtClean="0"/>
-              <a:t>17-Jan-19</a:t>
+              <a:t>1/17/2019</a:t>
             </a:fld>
             <a:endParaRPr lang="en-US"/>
           </a:p>
@@ -2264,7 +2265,7 @@
           <a:p>
             <a:fld id="{BE50AB1F-9C50-41A2-BE99-4D3D06C85678}" type="datetimeFigureOut">
               <a:rPr lang="en-US" smtClean="0"/>
-              <a:t>17-Jan-19</a:t>
+              <a:t>1/17/2019</a:t>
             </a:fld>
             <a:endParaRPr lang="en-US"/>
           </a:p>
@@ -2618,7 +2619,7 @@
           <a:p>
             <a:fld id="{BE50AB1F-9C50-41A2-BE99-4D3D06C85678}" type="datetimeFigureOut">
               <a:rPr lang="en-US" smtClean="0"/>
-              <a:t>17-Jan-19</a:t>
+              <a:t>1/17/2019</a:t>
             </a:fld>
             <a:endParaRPr lang="en-US"/>
           </a:p>
@@ -2995,7 +2996,7 @@
           <a:p>
             <a:fld id="{BE50AB1F-9C50-41A2-BE99-4D3D06C85678}" type="datetimeFigureOut">
               <a:rPr lang="en-US" smtClean="0"/>
-              <a:t>17-Jan-19</a:t>
+              <a:t>1/17/2019</a:t>
             </a:fld>
             <a:endParaRPr lang="en-US"/>
           </a:p>
@@ -3282,7 +3283,7 @@
           <a:p>
             <a:fld id="{BE50AB1F-9C50-41A2-BE99-4D3D06C85678}" type="datetimeFigureOut">
               <a:rPr lang="en-US" smtClean="0"/>
-              <a:t>17-Jan-19</a:t>
+              <a:t>1/17/2019</a:t>
             </a:fld>
             <a:endParaRPr lang="en-US"/>
           </a:p>
@@ -4048,14 +4049,14 @@
                 <a:gridCol w="5035931">
                   <a:extLst>
                     <a:ext uri="{9D8B030D-6E8A-4147-A177-3AD203B41FA5}">
-                      <a16:colId xmlns:a16="http://schemas.microsoft.com/office/drawing/2014/main" xmlns="" val="20000"/>
+                      <a16:colId xmlns="" xmlns:a16="http://schemas.microsoft.com/office/drawing/2014/main" val="20000"/>
                     </a:ext>
                   </a:extLst>
                 </a:gridCol>
                 <a:gridCol w="5022469">
                   <a:extLst>
                     <a:ext uri="{9D8B030D-6E8A-4147-A177-3AD203B41FA5}">
-                      <a16:colId xmlns:a16="http://schemas.microsoft.com/office/drawing/2014/main" xmlns="" val="20001"/>
+                      <a16:colId xmlns="" xmlns:a16="http://schemas.microsoft.com/office/drawing/2014/main" val="20001"/>
                     </a:ext>
                   </a:extLst>
                 </a:gridCol>
@@ -4135,7 +4136,7 @@
                 </a:tc>
                 <a:extLst>
                   <a:ext uri="{0D108BD9-81ED-4DB2-BD59-A6C34878D82A}">
-                    <a16:rowId xmlns:a16="http://schemas.microsoft.com/office/drawing/2014/main" xmlns="" val="10000"/>
+                    <a16:rowId xmlns="" xmlns:a16="http://schemas.microsoft.com/office/drawing/2014/main" val="10000"/>
                   </a:ext>
                 </a:extLst>
               </a:tr>
@@ -4222,7 +4223,7 @@
                 </a:tc>
                 <a:extLst>
                   <a:ext uri="{0D108BD9-81ED-4DB2-BD59-A6C34878D82A}">
-                    <a16:rowId xmlns:a16="http://schemas.microsoft.com/office/drawing/2014/main" xmlns="" val="10001"/>
+                    <a16:rowId xmlns="" xmlns:a16="http://schemas.microsoft.com/office/drawing/2014/main" val="10001"/>
                   </a:ext>
                 </a:extLst>
               </a:tr>
@@ -4325,7 +4326,7 @@
                 </a:tc>
                 <a:extLst>
                   <a:ext uri="{0D108BD9-81ED-4DB2-BD59-A6C34878D82A}">
-                    <a16:rowId xmlns:a16="http://schemas.microsoft.com/office/drawing/2014/main" xmlns="" val="10002"/>
+                    <a16:rowId xmlns="" xmlns:a16="http://schemas.microsoft.com/office/drawing/2014/main" val="10002"/>
                   </a:ext>
                 </a:extLst>
               </a:tr>
@@ -4407,8 +4408,27 @@
             </a:pPr>
             <a:r>
               <a:rPr lang="en-US" dirty="0"/>
-              <a:t> Objective</a:t>
-            </a:r>
+              <a:t> </a:t>
+            </a:r>
+            <a:r>
+              <a:rPr lang="en-US" dirty="0" smtClean="0"/>
+              <a:t>Objective</a:t>
+            </a:r>
+          </a:p>
+          <a:p>
+            <a:pPr>
+              <a:buFont typeface="Wingdings" panose="05000000000000000000" pitchFamily="2" charset="2"/>
+              <a:buChar char="Ø"/>
+            </a:pPr>
+            <a:r>
+              <a:rPr lang="en-US" dirty="0"/>
+              <a:t>Data Science &amp; Distributed </a:t>
+            </a:r>
+            <a:r>
+              <a:rPr lang="en-US" dirty="0" smtClean="0"/>
+              <a:t>System</a:t>
+            </a:r>
+            <a:endParaRPr lang="en-US" dirty="0"/>
           </a:p>
           <a:p>
             <a:pPr>
@@ -4510,15 +4530,7 @@
           <a:p>
             <a:r>
               <a:rPr lang="en-US" sz="2800" dirty="0"/>
-              <a:t>Our objective is to study a wide variety of Tools / Algorithms / Techniques and make a centralized platform </a:t>
-            </a:r>
-            <a:r>
-              <a:rPr lang="en-US" sz="2800"/>
-              <a:t>or Framework </a:t>
-            </a:r>
-            <a:r>
-              <a:rPr lang="en-US" sz="2800" dirty="0"/>
-              <a:t>where different nature of tools are categorized for the ease of use for Data Scientists and this will be helpful for the future enhancement of Data Science.</a:t>
+              <a:t>Our objective is to study a wide variety of Tools / Algorithms / Techniques and make a centralized platform or Framework where different nature of tools are categorized for the ease of use for Data Scientists and this will be helpful for the future enhancement of Data Science.</a:t>
             </a:r>
           </a:p>
         </p:txBody>
@@ -4576,9 +4588,8 @@
           <a:p>
             <a:r>
               <a:rPr lang="en-US" dirty="0"/>
-              <a:t>Introduction to Big Data</a:t>
-            </a:r>
-            <a:endParaRPr lang="x-none" dirty="0"/>
+              <a:t>Data Science &amp; Distributed System</a:t>
+            </a:r>
           </a:p>
         </p:txBody>
       </p:sp>
@@ -4605,30 +4616,54 @@
           </a:bodyPr>
           <a:lstStyle/>
           <a:p>
-            <a:r>
-              <a:rPr lang="en-US" b="1" i="1" u="sng" dirty="0"/>
-              <a:t>Definition</a:t>
-            </a:r>
-            <a:r>
-              <a:rPr lang="en-US" dirty="0"/>
-              <a:t> </a:t>
-            </a:r>
+            <a:endParaRPr lang="en-US" dirty="0"/>
           </a:p>
           <a:p>
             <a:r>
               <a:rPr lang="en-US" dirty="0">
                 <a:latin typeface="+mj-lt"/>
               </a:rPr>
-              <a:t>Extremely large data sets that may be analyzed computationally to reveal patterns, trends, and associations, especially relating to human behavior and interactions.</a:t>
-            </a:r>
-          </a:p>
-          <a:p>
+              <a:t>Data science is a "concept to unify statistics, data analysis, machine learning and their related methods" in order to "understand and analyze actual phenomena" with data. It employs techniques and theories drawn from many fields within the context of mathematics, statistics, information science, and computer science</a:t>
+            </a:r>
+            <a:r>
+              <a:rPr lang="en-US" dirty="0" smtClean="0">
+                <a:latin typeface="+mj-lt"/>
+              </a:rPr>
+              <a:t>.</a:t>
+            </a:r>
+          </a:p>
+          <a:p>
+            <a:r>
+              <a:rPr lang="en-US" dirty="0" smtClean="0">
+                <a:latin typeface="+mj-lt"/>
+              </a:rPr>
+              <a:t>Companies </a:t>
+            </a:r>
             <a:r>
               <a:rPr lang="en-US" dirty="0">
                 <a:latin typeface="+mj-lt"/>
               </a:rPr>
-              <a:t>Big data is a term that describes the large volume of data – both structured and unstructured – that inundates a business on a day-to-day basis. But it’s not the amount of data that’s important. It’s what organizations do with the data that matters. Big data can be analyzed for insights that lead to better decisions and strategic business moves.</a:t>
-            </a:r>
+              <a:t>are generating Large volume of Data on daily basis and they have to identify the trends or forecasting different nature of stats for maximizing their profitability. This Big Data is used by their distributed systems for the evaluation of their production, sales, and different other types of productivity for the future growth of a company</a:t>
+            </a:r>
+            <a:r>
+              <a:rPr lang="en-US" dirty="0" smtClean="0">
+                <a:latin typeface="+mj-lt"/>
+              </a:rPr>
+              <a:t>.</a:t>
+            </a:r>
+          </a:p>
+          <a:p>
+            <a:endParaRPr lang="en-US" dirty="0" smtClean="0">
+              <a:latin typeface="+mj-lt"/>
+            </a:endParaRPr>
+          </a:p>
+          <a:p>
+            <a:endParaRPr lang="en-US" dirty="0">
+              <a:latin typeface="+mj-lt"/>
+            </a:endParaRPr>
+          </a:p>
+          <a:p>
+            <a:endParaRPr lang="en-US" dirty="0" smtClean="0"/>
           </a:p>
           <a:p>
             <a:endParaRPr lang="x-none" dirty="0"/>
@@ -4638,7 +4673,7 @@
     </p:spTree>
     <p:extLst>
       <p:ext uri="{BB962C8B-B14F-4D97-AF65-F5344CB8AC3E}">
-        <p14:creationId xmlns:p14="http://schemas.microsoft.com/office/powerpoint/2010/main" val="196455147"/>
+        <p14:creationId xmlns:p14="http://schemas.microsoft.com/office/powerpoint/2010/main" val="62285291"/>
       </p:ext>
     </p:extLst>
   </p:cSld>
@@ -4670,7 +4705,7 @@
           <p:cNvPr id="2" name="Title 1">
             <a:extLst>
               <a:ext uri="{FF2B5EF4-FFF2-40B4-BE49-F238E27FC236}">
-                <a16:creationId xmlns:a16="http://schemas.microsoft.com/office/drawing/2014/main" xmlns="" id="{3E1AC600-D16C-47B7-9075-94DA61007B25}"/>
+                <a16:creationId xmlns="" xmlns:a16="http://schemas.microsoft.com/office/drawing/2014/main" id="{F4727C6F-3982-4E54-AA66-B4E0AA33FF66}"/>
               </a:ext>
             </a:extLst>
           </p:cNvPr>
@@ -4688,7 +4723,7 @@
           <a:p>
             <a:r>
               <a:rPr lang="en-US" dirty="0"/>
-              <a:t>Tools used for big data</a:t>
+              <a:t>Introduction to Big Data</a:t>
             </a:r>
             <a:endParaRPr lang="x-none" dirty="0"/>
           </a:p>
@@ -4699,7 +4734,119 @@
           <p:cNvPr id="3" name="Content Placeholder 2">
             <a:extLst>
               <a:ext uri="{FF2B5EF4-FFF2-40B4-BE49-F238E27FC236}">
-                <a16:creationId xmlns:a16="http://schemas.microsoft.com/office/drawing/2014/main" xmlns="" id="{DDC8679B-3323-4E4B-ABD6-BD8748DF3AEB}"/>
+                <a16:creationId xmlns="" xmlns:a16="http://schemas.microsoft.com/office/drawing/2014/main" id="{1134DAC4-9E94-441C-A9BE-87750F6F60A2}"/>
+              </a:ext>
+            </a:extLst>
+          </p:cNvPr>
+          <p:cNvSpPr>
+            <a:spLocks noGrp="1"/>
+          </p:cNvSpPr>
+          <p:nvPr>
+            <p:ph idx="1"/>
+          </p:nvPr>
+        </p:nvSpPr>
+        <p:spPr/>
+        <p:txBody>
+          <a:bodyPr>
+            <a:normAutofit/>
+          </a:bodyPr>
+          <a:lstStyle/>
+          <a:p>
+            <a:r>
+              <a:rPr lang="en-US" b="1" i="1" u="sng" dirty="0"/>
+              <a:t>Definition</a:t>
+            </a:r>
+            <a:r>
+              <a:rPr lang="en-US" dirty="0"/>
+              <a:t> </a:t>
+            </a:r>
+          </a:p>
+          <a:p>
+            <a:r>
+              <a:rPr lang="en-US" dirty="0">
+                <a:latin typeface="+mj-lt"/>
+              </a:rPr>
+              <a:t>Extremely large data sets that may be analyzed computationally to reveal patterns, trends, and associations, especially relating to human behavior and interactions.</a:t>
+            </a:r>
+          </a:p>
+          <a:p>
+            <a:r>
+              <a:rPr lang="en-US" dirty="0">
+                <a:latin typeface="+mj-lt"/>
+              </a:rPr>
+              <a:t>Big data is a term that describes the large volume of data – both structured and unstructured – that inundates a business on a day-to-day basis. But it’s not the amount of data that’s important. It’s what organizations do with the data that matters. Big data can be analyzed for insights that lead to better decisions and strategic business moves.</a:t>
+            </a:r>
+          </a:p>
+          <a:p>
+            <a:endParaRPr lang="x-none" dirty="0"/>
+          </a:p>
+        </p:txBody>
+      </p:sp>
+    </p:spTree>
+    <p:extLst>
+      <p:ext uri="{BB962C8B-B14F-4D97-AF65-F5344CB8AC3E}">
+        <p14:creationId xmlns:p14="http://schemas.microsoft.com/office/powerpoint/2010/main" val="196455147"/>
+      </p:ext>
+    </p:extLst>
+  </p:cSld>
+  <p:clrMapOvr>
+    <a:masterClrMapping/>
+  </p:clrMapOvr>
+</p:sld>
+</file>
+
+<file path=ppt/slides/slide8.xml><?xml version="1.0" encoding="utf-8"?>
+<p:sld xmlns:a="http://schemas.openxmlformats.org/drawingml/2006/main" xmlns:r="http://schemas.openxmlformats.org/officeDocument/2006/relationships" xmlns:p="http://schemas.openxmlformats.org/presentationml/2006/main">
+  <p:cSld>
+    <p:spTree>
+      <p:nvGrpSpPr>
+        <p:cNvPr id="1" name=""/>
+        <p:cNvGrpSpPr/>
+        <p:nvPr/>
+      </p:nvGrpSpPr>
+      <p:grpSpPr>
+        <a:xfrm>
+          <a:off x="0" y="0"/>
+          <a:ext cx="0" cy="0"/>
+          <a:chOff x="0" y="0"/>
+          <a:chExt cx="0" cy="0"/>
+        </a:xfrm>
+      </p:grpSpPr>
+      <p:sp>
+        <p:nvSpPr>
+          <p:cNvPr id="2" name="Title 1">
+            <a:extLst>
+              <a:ext uri="{FF2B5EF4-FFF2-40B4-BE49-F238E27FC236}">
+                <a16:creationId xmlns="" xmlns:a16="http://schemas.microsoft.com/office/drawing/2014/main" id="{3E1AC600-D16C-47B7-9075-94DA61007B25}"/>
+              </a:ext>
+            </a:extLst>
+          </p:cNvPr>
+          <p:cNvSpPr>
+            <a:spLocks noGrp="1"/>
+          </p:cNvSpPr>
+          <p:nvPr>
+            <p:ph type="title"/>
+          </p:nvPr>
+        </p:nvSpPr>
+        <p:spPr/>
+        <p:txBody>
+          <a:bodyPr/>
+          <a:lstStyle/>
+          <a:p>
+            <a:r>
+              <a:rPr lang="en-US" dirty="0"/>
+              <a:t>Tools used for big data</a:t>
+            </a:r>
+            <a:endParaRPr lang="x-none" dirty="0"/>
+          </a:p>
+        </p:txBody>
+      </p:sp>
+      <p:sp>
+        <p:nvSpPr>
+          <p:cNvPr id="3" name="Content Placeholder 2">
+            <a:extLst>
+              <a:ext uri="{FF2B5EF4-FFF2-40B4-BE49-F238E27FC236}">
+                <a16:creationId xmlns="" xmlns:a16="http://schemas.microsoft.com/office/drawing/2014/main" id="{DDC8679B-3323-4E4B-ABD6-BD8748DF3AEB}"/>
               </a:ext>
             </a:extLst>
           </p:cNvPr>

</xml_diff>

<commit_message>
Ppt: Complete outline content
Complete ppt outline slide content
</commit_message>
<xml_diff>
--- a/Project Interim Submission/Generic DS Framework.pptx
+++ b/Project Interim Submission/Generic DS Framework.pptx
@@ -4048,14 +4048,14 @@
                 <a:gridCol w="5035931">
                   <a:extLst>
                     <a:ext uri="{9D8B030D-6E8A-4147-A177-3AD203B41FA5}">
-                      <a16:colId xmlns="" xmlns:a16="http://schemas.microsoft.com/office/drawing/2014/main" val="20000"/>
+                      <a16:colId xmlns:a16="http://schemas.microsoft.com/office/drawing/2014/main" xmlns="" val="20000"/>
                     </a:ext>
                   </a:extLst>
                 </a:gridCol>
                 <a:gridCol w="5022469">
                   <a:extLst>
                     <a:ext uri="{9D8B030D-6E8A-4147-A177-3AD203B41FA5}">
-                      <a16:colId xmlns="" xmlns:a16="http://schemas.microsoft.com/office/drawing/2014/main" val="20001"/>
+                      <a16:colId xmlns:a16="http://schemas.microsoft.com/office/drawing/2014/main" xmlns="" val="20001"/>
                     </a:ext>
                   </a:extLst>
                 </a:gridCol>
@@ -4135,7 +4135,7 @@
                 </a:tc>
                 <a:extLst>
                   <a:ext uri="{0D108BD9-81ED-4DB2-BD59-A6C34878D82A}">
-                    <a16:rowId xmlns="" xmlns:a16="http://schemas.microsoft.com/office/drawing/2014/main" val="10000"/>
+                    <a16:rowId xmlns:a16="http://schemas.microsoft.com/office/drawing/2014/main" xmlns="" val="10000"/>
                   </a:ext>
                 </a:extLst>
               </a:tr>
@@ -4222,7 +4222,7 @@
                 </a:tc>
                 <a:extLst>
                   <a:ext uri="{0D108BD9-81ED-4DB2-BD59-A6C34878D82A}">
-                    <a16:rowId xmlns="" xmlns:a16="http://schemas.microsoft.com/office/drawing/2014/main" val="10001"/>
+                    <a16:rowId xmlns:a16="http://schemas.microsoft.com/office/drawing/2014/main" xmlns="" val="10001"/>
                   </a:ext>
                 </a:extLst>
               </a:tr>
@@ -4325,7 +4325,7 @@
                 </a:tc>
                 <a:extLst>
                   <a:ext uri="{0D108BD9-81ED-4DB2-BD59-A6C34878D82A}">
-                    <a16:rowId xmlns="" xmlns:a16="http://schemas.microsoft.com/office/drawing/2014/main" val="10002"/>
+                    <a16:rowId xmlns:a16="http://schemas.microsoft.com/office/drawing/2014/main" xmlns="" val="10002"/>
                   </a:ext>
                 </a:extLst>
               </a:tr>
@@ -4379,7 +4379,7 @@
           <a:lstStyle/>
           <a:p>
             <a:r>
-              <a:rPr lang="en-US" smtClean="0"/>
+              <a:rPr lang="en-US" dirty="0" smtClean="0"/>
               <a:t>Outline</a:t>
             </a:r>
             <a:endParaRPr lang="en-US" dirty="0"/>
@@ -4399,7 +4399,7 @@
         <p:spPr/>
         <p:txBody>
           <a:bodyPr>
-            <a:normAutofit fontScale="92500" lnSpcReduction="10000"/>
+            <a:normAutofit lnSpcReduction="10000"/>
           </a:bodyPr>
           <a:lstStyle/>
           <a:p>
@@ -4477,8 +4477,13 @@
             </a:pPr>
             <a:r>
               <a:rPr lang="en-US" dirty="0" smtClean="0"/>
-              <a:t> Data Analytics</a:t>
-            </a:r>
+              <a:t> Data </a:t>
+            </a:r>
+            <a:r>
+              <a:rPr lang="en-US" dirty="0" smtClean="0"/>
+              <a:t>Analysis</a:t>
+            </a:r>
+            <a:endParaRPr lang="en-US" dirty="0" smtClean="0"/>
           </a:p>
           <a:p>
             <a:pPr lvl="1">
@@ -4487,7 +4492,17 @@
             </a:pPr>
             <a:r>
               <a:rPr lang="en-US" dirty="0" smtClean="0"/>
-              <a:t> Tools</a:t>
+              <a:t> Analysis vs Analytics </a:t>
+            </a:r>
+          </a:p>
+          <a:p>
+            <a:pPr lvl="1">
+              <a:buFont typeface="Wingdings" panose="05000000000000000000" pitchFamily="2" charset="2"/>
+              <a:buChar char="Ø"/>
+            </a:pPr>
+            <a:r>
+              <a:rPr lang="en-US" dirty="0" smtClean="0"/>
+              <a:t> Analytics Tools</a:t>
             </a:r>
             <a:endParaRPr lang="en-US" dirty="0" smtClean="0"/>
           </a:p>
@@ -4526,22 +4541,13 @@
             </a:r>
             <a:r>
               <a:rPr lang="en-US" dirty="0" smtClean="0"/>
-              <a:t>Big Data &amp; Analytics Algorithms</a:t>
-            </a:r>
-          </a:p>
-          <a:p>
-            <a:pPr>
-              <a:buFont typeface="Wingdings" panose="05000000000000000000" pitchFamily="2" charset="2"/>
-              <a:buChar char="Ø"/>
-            </a:pPr>
-            <a:r>
-              <a:rPr lang="en-US" dirty="0"/>
-              <a:t> </a:t>
+              <a:t>Big Data &amp; Analytics </a:t>
             </a:r>
             <a:r>
               <a:rPr lang="en-US" dirty="0" smtClean="0"/>
-              <a:t>Comparison </a:t>
-            </a:r>
+              <a:t>Algorithms</a:t>
+            </a:r>
+            <a:endParaRPr lang="en-US" dirty="0"/>
           </a:p>
           <a:p>
             <a:pPr>
@@ -4550,31 +4556,75 @@
             </a:pPr>
             <a:endParaRPr lang="en-US" dirty="0"/>
           </a:p>
+        </p:txBody>
+      </p:sp>
+      <p:sp>
+        <p:nvSpPr>
+          <p:cNvPr id="4" name="Content Placeholder 3"/>
+          <p:cNvSpPr>
+            <a:spLocks noGrp="1"/>
+          </p:cNvSpPr>
+          <p:nvPr>
+            <p:ph sz="half" idx="2"/>
+          </p:nvPr>
+        </p:nvSpPr>
+        <p:spPr/>
+        <p:txBody>
+          <a:bodyPr>
+            <a:normAutofit lnSpcReduction="10000"/>
+          </a:bodyPr>
+          <a:lstStyle/>
           <a:p>
             <a:pPr>
               <a:buFont typeface="Wingdings" panose="05000000000000000000" pitchFamily="2" charset="2"/>
               <a:buChar char="Ø"/>
             </a:pPr>
-            <a:endParaRPr lang="en-US" dirty="0"/>
-          </a:p>
-        </p:txBody>
-      </p:sp>
-      <p:sp>
-        <p:nvSpPr>
-          <p:cNvPr id="4" name="Content Placeholder 3"/>
-          <p:cNvSpPr>
-            <a:spLocks noGrp="1"/>
-          </p:cNvSpPr>
-          <p:nvPr>
-            <p:ph sz="half" idx="2"/>
-          </p:nvPr>
-        </p:nvSpPr>
-        <p:spPr/>
-        <p:txBody>
-          <a:bodyPr>
-            <a:normAutofit fontScale="92500" lnSpcReduction="10000"/>
-          </a:bodyPr>
-          <a:lstStyle/>
+            <a:r>
+              <a:rPr lang="en-US" dirty="0" smtClean="0"/>
+              <a:t> Comparison</a:t>
+            </a:r>
+          </a:p>
+          <a:p>
+            <a:pPr lvl="1">
+              <a:buFont typeface="Wingdings" panose="05000000000000000000" pitchFamily="2" charset="2"/>
+              <a:buChar char="Ø"/>
+            </a:pPr>
+            <a:r>
+              <a:rPr lang="en-US" dirty="0" smtClean="0"/>
+              <a:t> Tools</a:t>
+            </a:r>
+          </a:p>
+          <a:p>
+            <a:pPr lvl="1">
+              <a:buFont typeface="Wingdings" panose="05000000000000000000" pitchFamily="2" charset="2"/>
+              <a:buChar char="Ø"/>
+            </a:pPr>
+            <a:r>
+              <a:rPr lang="en-US" dirty="0" smtClean="0"/>
+              <a:t> Characteristics </a:t>
+            </a:r>
+          </a:p>
+          <a:p>
+            <a:pPr>
+              <a:buFont typeface="Wingdings" panose="05000000000000000000" pitchFamily="2" charset="2"/>
+              <a:buChar char="Ø"/>
+            </a:pPr>
+            <a:r>
+              <a:rPr lang="en-US" dirty="0" smtClean="0"/>
+              <a:t> New Propose Model</a:t>
+            </a:r>
+          </a:p>
+          <a:p>
+            <a:pPr>
+              <a:buFont typeface="Wingdings" panose="05000000000000000000" pitchFamily="2" charset="2"/>
+              <a:buChar char="Ø"/>
+            </a:pPr>
+            <a:r>
+              <a:rPr lang="en-US" smtClean="0"/>
+              <a:t> Conclusion</a:t>
+            </a:r>
+            <a:endParaRPr lang="en-US" dirty="0" smtClean="0"/>
+          </a:p>
           <a:p>
             <a:endParaRPr lang="en-US" dirty="0"/>
           </a:p>
@@ -4699,7 +4749,7 @@
           <p:cNvPr id="2" name="Title 1">
             <a:extLst>
               <a:ext uri="{FF2B5EF4-FFF2-40B4-BE49-F238E27FC236}">
-                <a16:creationId xmlns="" xmlns:a16="http://schemas.microsoft.com/office/drawing/2014/main" id="{F4727C6F-3982-4E54-AA66-B4E0AA33FF66}"/>
+                <a16:creationId xmlns:a16="http://schemas.microsoft.com/office/drawing/2014/main" xmlns="" id="{F4727C6F-3982-4E54-AA66-B4E0AA33FF66}"/>
               </a:ext>
             </a:extLst>
           </p:cNvPr>
@@ -4728,7 +4778,7 @@
           <p:cNvPr id="3" name="Content Placeholder 2">
             <a:extLst>
               <a:ext uri="{FF2B5EF4-FFF2-40B4-BE49-F238E27FC236}">
-                <a16:creationId xmlns="" xmlns:a16="http://schemas.microsoft.com/office/drawing/2014/main" id="{1134DAC4-9E94-441C-A9BE-87750F6F60A2}"/>
+                <a16:creationId xmlns:a16="http://schemas.microsoft.com/office/drawing/2014/main" xmlns="" id="{1134DAC4-9E94-441C-A9BE-87750F6F60A2}"/>
               </a:ext>
             </a:extLst>
           </p:cNvPr>
@@ -4811,7 +4861,7 @@
           <p:cNvPr id="2" name="Title 1">
             <a:extLst>
               <a:ext uri="{FF2B5EF4-FFF2-40B4-BE49-F238E27FC236}">
-                <a16:creationId xmlns="" xmlns:a16="http://schemas.microsoft.com/office/drawing/2014/main" id="{3E1AC600-D16C-47B7-9075-94DA61007B25}"/>
+                <a16:creationId xmlns:a16="http://schemas.microsoft.com/office/drawing/2014/main" xmlns="" id="{3E1AC600-D16C-47B7-9075-94DA61007B25}"/>
               </a:ext>
             </a:extLst>
           </p:cNvPr>
@@ -4840,7 +4890,7 @@
           <p:cNvPr id="3" name="Content Placeholder 2">
             <a:extLst>
               <a:ext uri="{FF2B5EF4-FFF2-40B4-BE49-F238E27FC236}">
-                <a16:creationId xmlns="" xmlns:a16="http://schemas.microsoft.com/office/drawing/2014/main" id="{DDC8679B-3323-4E4B-ABD6-BD8748DF3AEB}"/>
+                <a16:creationId xmlns:a16="http://schemas.microsoft.com/office/drawing/2014/main" xmlns="" id="{DDC8679B-3323-4E4B-ABD6-BD8748DF3AEB}"/>
               </a:ext>
             </a:extLst>
           </p:cNvPr>

</xml_diff>

<commit_message>
ppt: Add sub-head slides
Adding sub section header slides.
</commit_message>
<xml_diff>
--- a/Project Interim Submission/Generic DS Framework.pptx
+++ b/Project Interim Submission/Generic DS Framework.pptx
@@ -10,8 +10,12 @@
     <p:sldId id="257" r:id="rId4"/>
     <p:sldId id="260" r:id="rId5"/>
     <p:sldId id="259" r:id="rId6"/>
-    <p:sldId id="261" r:id="rId7"/>
-    <p:sldId id="262" r:id="rId8"/>
+    <p:sldId id="263" r:id="rId7"/>
+    <p:sldId id="261" r:id="rId8"/>
+    <p:sldId id="262" r:id="rId9"/>
+    <p:sldId id="264" r:id="rId10"/>
+    <p:sldId id="265" r:id="rId11"/>
+    <p:sldId id="266" r:id="rId12"/>
   </p:sldIdLst>
   <p:sldSz cx="12192000" cy="6858000"/>
   <p:notesSz cx="6858000" cy="9144000"/>
@@ -3861,6 +3865,162 @@
 </p:sld>
 </file>
 
+<file path=ppt/slides/slide10.xml><?xml version="1.0" encoding="utf-8"?>
+<p:sld xmlns:a="http://schemas.openxmlformats.org/drawingml/2006/main" xmlns:r="http://schemas.openxmlformats.org/officeDocument/2006/relationships" xmlns:p="http://schemas.openxmlformats.org/presentationml/2006/main">
+  <p:cSld>
+    <p:spTree>
+      <p:nvGrpSpPr>
+        <p:cNvPr id="1" name=""/>
+        <p:cNvGrpSpPr/>
+        <p:nvPr/>
+      </p:nvGrpSpPr>
+      <p:grpSpPr>
+        <a:xfrm>
+          <a:off x="0" y="0"/>
+          <a:ext cx="0" cy="0"/>
+          <a:chOff x="0" y="0"/>
+          <a:chExt cx="0" cy="0"/>
+        </a:xfrm>
+      </p:grpSpPr>
+      <p:sp>
+        <p:nvSpPr>
+          <p:cNvPr id="2" name="Title 1"/>
+          <p:cNvSpPr>
+            <a:spLocks noGrp="1"/>
+          </p:cNvSpPr>
+          <p:nvPr>
+            <p:ph type="title"/>
+          </p:nvPr>
+        </p:nvSpPr>
+        <p:spPr/>
+        <p:txBody>
+          <a:bodyPr/>
+          <a:lstStyle/>
+          <a:p>
+            <a:pPr algn="ctr"/>
+            <a:r>
+              <a:rPr lang="en-US" dirty="0" smtClean="0"/>
+              <a:t>ALGORITHMS</a:t>
+            </a:r>
+            <a:endParaRPr lang="en-US" dirty="0"/>
+          </a:p>
+        </p:txBody>
+      </p:sp>
+      <p:sp>
+        <p:nvSpPr>
+          <p:cNvPr id="3" name="Text Placeholder 2"/>
+          <p:cNvSpPr>
+            <a:spLocks noGrp="1"/>
+          </p:cNvSpPr>
+          <p:nvPr>
+            <p:ph type="body" idx="1"/>
+          </p:nvPr>
+        </p:nvSpPr>
+        <p:spPr/>
+        <p:txBody>
+          <a:bodyPr/>
+          <a:lstStyle/>
+          <a:p>
+            <a:pPr algn="ctr"/>
+            <a:r>
+              <a:rPr lang="en-US" dirty="0" smtClean="0"/>
+              <a:t>Classification, for Da, for BD</a:t>
+            </a:r>
+            <a:endParaRPr lang="en-US" dirty="0"/>
+          </a:p>
+        </p:txBody>
+      </p:sp>
+    </p:spTree>
+    <p:extLst>
+      <p:ext uri="{BB962C8B-B14F-4D97-AF65-F5344CB8AC3E}">
+        <p14:creationId xmlns:p14="http://schemas.microsoft.com/office/powerpoint/2010/main" val="2204207379"/>
+      </p:ext>
+    </p:extLst>
+  </p:cSld>
+  <p:clrMapOvr>
+    <a:masterClrMapping/>
+  </p:clrMapOvr>
+</p:sld>
+</file>
+
+<file path=ppt/slides/slide11.xml><?xml version="1.0" encoding="utf-8"?>
+<p:sld xmlns:a="http://schemas.openxmlformats.org/drawingml/2006/main" xmlns:r="http://schemas.openxmlformats.org/officeDocument/2006/relationships" xmlns:p="http://schemas.openxmlformats.org/presentationml/2006/main">
+  <p:cSld>
+    <p:spTree>
+      <p:nvGrpSpPr>
+        <p:cNvPr id="1" name=""/>
+        <p:cNvGrpSpPr/>
+        <p:nvPr/>
+      </p:nvGrpSpPr>
+      <p:grpSpPr>
+        <a:xfrm>
+          <a:off x="0" y="0"/>
+          <a:ext cx="0" cy="0"/>
+          <a:chOff x="0" y="0"/>
+          <a:chExt cx="0" cy="0"/>
+        </a:xfrm>
+      </p:grpSpPr>
+      <p:sp>
+        <p:nvSpPr>
+          <p:cNvPr id="2" name="Title 1"/>
+          <p:cNvSpPr>
+            <a:spLocks noGrp="1"/>
+          </p:cNvSpPr>
+          <p:nvPr>
+            <p:ph type="title"/>
+          </p:nvPr>
+        </p:nvSpPr>
+        <p:spPr/>
+        <p:txBody>
+          <a:bodyPr/>
+          <a:lstStyle/>
+          <a:p>
+            <a:pPr algn="ctr"/>
+            <a:r>
+              <a:rPr lang="en-US" dirty="0" smtClean="0"/>
+              <a:t>COMPARISON </a:t>
+            </a:r>
+            <a:endParaRPr lang="en-US" dirty="0"/>
+          </a:p>
+        </p:txBody>
+      </p:sp>
+      <p:sp>
+        <p:nvSpPr>
+          <p:cNvPr id="3" name="Text Placeholder 2"/>
+          <p:cNvSpPr>
+            <a:spLocks noGrp="1"/>
+          </p:cNvSpPr>
+          <p:nvPr>
+            <p:ph type="body" idx="1"/>
+          </p:nvPr>
+        </p:nvSpPr>
+        <p:spPr/>
+        <p:txBody>
+          <a:bodyPr/>
+          <a:lstStyle/>
+          <a:p>
+            <a:pPr algn="ctr"/>
+            <a:r>
+              <a:rPr lang="en-US" cap="none" dirty="0" smtClean="0"/>
+              <a:t>Technology, Tool, Features, Use</a:t>
+            </a:r>
+            <a:endParaRPr lang="en-US" dirty="0"/>
+          </a:p>
+        </p:txBody>
+      </p:sp>
+    </p:spTree>
+    <p:extLst>
+      <p:ext uri="{BB962C8B-B14F-4D97-AF65-F5344CB8AC3E}">
+        <p14:creationId xmlns:p14="http://schemas.microsoft.com/office/powerpoint/2010/main" val="3585353157"/>
+      </p:ext>
+    </p:extLst>
+  </p:cSld>
+  <p:clrMapOvr>
+    <a:masterClrMapping/>
+  </p:clrMapOvr>
+</p:sld>
+</file>
+
 <file path=ppt/slides/slide2.xml><?xml version="1.0" encoding="utf-8"?>
 <p:sld xmlns:a="http://schemas.openxmlformats.org/drawingml/2006/main" xmlns:r="http://schemas.openxmlformats.org/officeDocument/2006/relationships" xmlns:p="http://schemas.openxmlformats.org/presentationml/2006/main">
   <p:cSld>
@@ -4048,14 +4208,14 @@
                 <a:gridCol w="5035931">
                   <a:extLst>
                     <a:ext uri="{9D8B030D-6E8A-4147-A177-3AD203B41FA5}">
-                      <a16:colId xmlns:a16="http://schemas.microsoft.com/office/drawing/2014/main" xmlns="" val="20000"/>
+                      <a16:colId xmlns="" xmlns:a16="http://schemas.microsoft.com/office/drawing/2014/main" val="20000"/>
                     </a:ext>
                   </a:extLst>
                 </a:gridCol>
                 <a:gridCol w="5022469">
                   <a:extLst>
                     <a:ext uri="{9D8B030D-6E8A-4147-A177-3AD203B41FA5}">
-                      <a16:colId xmlns:a16="http://schemas.microsoft.com/office/drawing/2014/main" xmlns="" val="20001"/>
+                      <a16:colId xmlns="" xmlns:a16="http://schemas.microsoft.com/office/drawing/2014/main" val="20001"/>
                     </a:ext>
                   </a:extLst>
                 </a:gridCol>
@@ -4135,7 +4295,7 @@
                 </a:tc>
                 <a:extLst>
                   <a:ext uri="{0D108BD9-81ED-4DB2-BD59-A6C34878D82A}">
-                    <a16:rowId xmlns:a16="http://schemas.microsoft.com/office/drawing/2014/main" xmlns="" val="10000"/>
+                    <a16:rowId xmlns="" xmlns:a16="http://schemas.microsoft.com/office/drawing/2014/main" val="10000"/>
                   </a:ext>
                 </a:extLst>
               </a:tr>
@@ -4222,7 +4382,7 @@
                 </a:tc>
                 <a:extLst>
                   <a:ext uri="{0D108BD9-81ED-4DB2-BD59-A6C34878D82A}">
-                    <a16:rowId xmlns:a16="http://schemas.microsoft.com/office/drawing/2014/main" xmlns="" val="10001"/>
+                    <a16:rowId xmlns="" xmlns:a16="http://schemas.microsoft.com/office/drawing/2014/main" val="10001"/>
                   </a:ext>
                 </a:extLst>
               </a:tr>
@@ -4325,7 +4485,7 @@
                 </a:tc>
                 <a:extLst>
                   <a:ext uri="{0D108BD9-81ED-4DB2-BD59-A6C34878D82A}">
-                    <a16:rowId xmlns:a16="http://schemas.microsoft.com/office/drawing/2014/main" xmlns="" val="10002"/>
+                    <a16:rowId xmlns="" xmlns:a16="http://schemas.microsoft.com/office/drawing/2014/main" val="10002"/>
                   </a:ext>
                 </a:extLst>
               </a:tr>
@@ -4429,7 +4589,11 @@
             </a:pPr>
             <a:r>
               <a:rPr lang="en-US" dirty="0" smtClean="0"/>
-              <a:t> Pillars</a:t>
+              <a:t> </a:t>
+            </a:r>
+            <a:r>
+              <a:rPr lang="en-US" dirty="0" smtClean="0"/>
+              <a:t>Pillars</a:t>
             </a:r>
           </a:p>
           <a:p>
@@ -4443,8 +4607,9 @@
             </a:r>
             <a:r>
               <a:rPr lang="en-US" dirty="0" smtClean="0"/>
-              <a:t>Model</a:t>
-            </a:r>
+              <a:t>Sources</a:t>
+            </a:r>
+            <a:endParaRPr lang="en-US" dirty="0" smtClean="0"/>
           </a:p>
           <a:p>
             <a:pPr lvl="1">
@@ -4452,8 +4617,12 @@
               <a:buChar char="Ø"/>
             </a:pPr>
             <a:r>
+              <a:rPr lang="en-US" dirty="0"/>
+              <a:t> </a:t>
+            </a:r>
+            <a:r>
               <a:rPr lang="en-US" dirty="0" smtClean="0"/>
-              <a:t> Data Lake</a:t>
+              <a:t>Model</a:t>
             </a:r>
           </a:p>
           <a:p>
@@ -4462,13 +4631,10 @@
               <a:buChar char="Ø"/>
             </a:pPr>
             <a:r>
-              <a:rPr lang="en-US" dirty="0"/>
-              <a:t> </a:t>
-            </a:r>
-            <a:r>
               <a:rPr lang="en-US" dirty="0" smtClean="0"/>
-              <a:t>Tools</a:t>
-            </a:r>
+              <a:t> Tools</a:t>
+            </a:r>
+            <a:endParaRPr lang="en-US" dirty="0" smtClean="0"/>
           </a:p>
           <a:p>
             <a:pPr>
@@ -4477,13 +4643,8 @@
             </a:pPr>
             <a:r>
               <a:rPr lang="en-US" dirty="0" smtClean="0"/>
-              <a:t> Data </a:t>
-            </a:r>
-            <a:r>
-              <a:rPr lang="en-US" dirty="0" smtClean="0"/>
-              <a:t>Analysis</a:t>
-            </a:r>
-            <a:endParaRPr lang="en-US" dirty="0" smtClean="0"/>
+              <a:t> Data Analysis</a:t>
+            </a:r>
           </a:p>
           <a:p>
             <a:pPr lvl="1">
@@ -4504,7 +4665,6 @@
               <a:rPr lang="en-US" dirty="0" smtClean="0"/>
               <a:t> Analytics Tools</a:t>
             </a:r>
-            <a:endParaRPr lang="en-US" dirty="0" smtClean="0"/>
           </a:p>
           <a:p>
             <a:pPr>
@@ -4541,11 +4701,7 @@
             </a:r>
             <a:r>
               <a:rPr lang="en-US" dirty="0" smtClean="0"/>
-              <a:t>Big Data &amp; Analytics </a:t>
-            </a:r>
-            <a:r>
-              <a:rPr lang="en-US" dirty="0" smtClean="0"/>
-              <a:t>Algorithms</a:t>
+              <a:t>Big Data &amp; Analytics Algorithms</a:t>
             </a:r>
             <a:endParaRPr lang="en-US" dirty="0"/>
           </a:p>
@@ -4591,7 +4747,11 @@
             </a:pPr>
             <a:r>
               <a:rPr lang="en-US" dirty="0" smtClean="0"/>
-              <a:t> Tools</a:t>
+              <a:t> </a:t>
+            </a:r>
+            <a:r>
+              <a:rPr lang="en-US" dirty="0" smtClean="0"/>
+              <a:t>Technology</a:t>
             </a:r>
           </a:p>
           <a:p>
@@ -4600,9 +4760,39 @@
               <a:buChar char="Ø"/>
             </a:pPr>
             <a:r>
+              <a:rPr lang="en-US" dirty="0"/>
+              <a:t> </a:t>
+            </a:r>
+            <a:r>
               <a:rPr lang="en-US" dirty="0" smtClean="0"/>
-              <a:t> Characteristics </a:t>
-            </a:r>
+              <a:t>Tools</a:t>
+            </a:r>
+            <a:endParaRPr lang="en-US" dirty="0" smtClean="0"/>
+          </a:p>
+          <a:p>
+            <a:pPr lvl="1">
+              <a:buFont typeface="Wingdings" panose="05000000000000000000" pitchFamily="2" charset="2"/>
+              <a:buChar char="Ø"/>
+            </a:pPr>
+            <a:r>
+              <a:rPr lang="en-US" dirty="0" smtClean="0"/>
+              <a:t> </a:t>
+            </a:r>
+            <a:r>
+              <a:rPr lang="en-US" dirty="0" smtClean="0"/>
+              <a:t>Feature</a:t>
+            </a:r>
+          </a:p>
+          <a:p>
+            <a:pPr lvl="1">
+              <a:buFont typeface="Wingdings" panose="05000000000000000000" pitchFamily="2" charset="2"/>
+              <a:buChar char="Ø"/>
+            </a:pPr>
+            <a:r>
+              <a:rPr lang="en-US" dirty="0" smtClean="0"/>
+              <a:t> Use </a:t>
+            </a:r>
+            <a:endParaRPr lang="en-US" dirty="0" smtClean="0"/>
           </a:p>
           <a:p>
             <a:pPr>
@@ -4620,10 +4810,9 @@
               <a:buChar char="Ø"/>
             </a:pPr>
             <a:r>
-              <a:rPr lang="en-US" smtClean="0"/>
+              <a:rPr lang="en-US" dirty="0" smtClean="0"/>
               <a:t> Conclusion</a:t>
             </a:r>
-            <a:endParaRPr lang="en-US" dirty="0" smtClean="0"/>
           </a:p>
           <a:p>
             <a:endParaRPr lang="en-US" dirty="0"/>
@@ -4746,13 +4935,7 @@
       </p:grpSpPr>
       <p:sp>
         <p:nvSpPr>
-          <p:cNvPr id="2" name="Title 1">
-            <a:extLst>
-              <a:ext uri="{FF2B5EF4-FFF2-40B4-BE49-F238E27FC236}">
-                <a16:creationId xmlns:a16="http://schemas.microsoft.com/office/drawing/2014/main" xmlns="" id="{F4727C6F-3982-4E54-AA66-B4E0AA33FF66}"/>
-              </a:ext>
-            </a:extLst>
-          </p:cNvPr>
+          <p:cNvPr id="4" name="Title 3"/>
           <p:cNvSpPr>
             <a:spLocks noGrp="1"/>
           </p:cNvSpPr>
@@ -4765,28 +4948,23 @@
           <a:bodyPr/>
           <a:lstStyle/>
           <a:p>
-            <a:r>
-              <a:rPr lang="en-US" dirty="0"/>
-              <a:t>Introduction to Big Data</a:t>
-            </a:r>
-            <a:endParaRPr lang="x-none" dirty="0"/>
-          </a:p>
-        </p:txBody>
-      </p:sp>
-      <p:sp>
-        <p:nvSpPr>
-          <p:cNvPr id="3" name="Content Placeholder 2">
-            <a:extLst>
-              <a:ext uri="{FF2B5EF4-FFF2-40B4-BE49-F238E27FC236}">
-                <a16:creationId xmlns:a16="http://schemas.microsoft.com/office/drawing/2014/main" xmlns="" id="{1134DAC4-9E94-441C-A9BE-87750F6F60A2}"/>
-              </a:ext>
-            </a:extLst>
-          </p:cNvPr>
-          <p:cNvSpPr>
-            <a:spLocks noGrp="1"/>
-          </p:cNvSpPr>
-          <p:nvPr>
-            <p:ph idx="1"/>
+            <a:pPr algn="ctr"/>
+            <a:r>
+              <a:rPr lang="en-US" dirty="0" smtClean="0"/>
+              <a:t>BIG DATA</a:t>
+            </a:r>
+            <a:endParaRPr lang="en-US" dirty="0"/>
+          </a:p>
+        </p:txBody>
+      </p:sp>
+      <p:sp>
+        <p:nvSpPr>
+          <p:cNvPr id="5" name="Text Placeholder 4"/>
+          <p:cNvSpPr>
+            <a:spLocks noGrp="1"/>
+          </p:cNvSpPr>
+          <p:nvPr>
+            <p:ph type="body" idx="1"/>
           </p:nvPr>
         </p:nvSpPr>
         <p:spPr/>
@@ -4796,40 +4974,27 @@
           </a:bodyPr>
           <a:lstStyle/>
           <a:p>
-            <a:r>
-              <a:rPr lang="en-US" b="1" i="1" u="sng" dirty="0"/>
-              <a:t>Definition</a:t>
-            </a:r>
-            <a:r>
-              <a:rPr lang="en-US" dirty="0"/>
-              <a:t> </a:t>
-            </a:r>
-          </a:p>
-          <a:p>
-            <a:r>
-              <a:rPr lang="en-US" dirty="0">
-                <a:latin typeface="+mj-lt"/>
-              </a:rPr>
-              <a:t>Extremely large data sets that may be analyzed computationally to reveal patterns, trends, and associations, especially relating to human behavior and interactions.</a:t>
-            </a:r>
-          </a:p>
-          <a:p>
-            <a:r>
-              <a:rPr lang="en-US" dirty="0">
-                <a:latin typeface="+mj-lt"/>
-              </a:rPr>
-              <a:t>Big data is a term that describes the large volume of data – both structured and unstructured – that inundates a business on a day-to-day basis. But it’s not the amount of data that’s important. It’s what organizations do with the data that matters. Big data can be analyzed for insights that lead to better decisions and strategic business moves.</a:t>
-            </a:r>
-          </a:p>
-          <a:p>
-            <a:endParaRPr lang="x-none" dirty="0"/>
+            <a:pPr marL="0" lvl="1" algn="ctr"/>
+            <a:r>
+              <a:rPr lang="en-US" sz="2000" dirty="0" smtClean="0"/>
+              <a:t>PILLARS, SOURCES, </a:t>
+            </a:r>
+            <a:r>
+              <a:rPr lang="en-US" sz="2000" dirty="0"/>
+              <a:t>MODEL,</a:t>
+            </a:r>
+            <a:r>
+              <a:rPr lang="en-US" sz="2000" dirty="0" smtClean="0"/>
+              <a:t> TOOLS</a:t>
+            </a:r>
+            <a:endParaRPr lang="en-US" sz="2000" dirty="0"/>
           </a:p>
         </p:txBody>
       </p:sp>
     </p:spTree>
     <p:extLst>
       <p:ext uri="{BB962C8B-B14F-4D97-AF65-F5344CB8AC3E}">
-        <p14:creationId xmlns:p14="http://schemas.microsoft.com/office/powerpoint/2010/main" val="196455147"/>
+        <p14:creationId xmlns:p14="http://schemas.microsoft.com/office/powerpoint/2010/main" val="2241138064"/>
       </p:ext>
     </p:extLst>
   </p:cSld>
@@ -4861,7 +5026,7 @@
           <p:cNvPr id="2" name="Title 1">
             <a:extLst>
               <a:ext uri="{FF2B5EF4-FFF2-40B4-BE49-F238E27FC236}">
-                <a16:creationId xmlns:a16="http://schemas.microsoft.com/office/drawing/2014/main" xmlns="" id="{3E1AC600-D16C-47B7-9075-94DA61007B25}"/>
+                <a16:creationId xmlns="" xmlns:a16="http://schemas.microsoft.com/office/drawing/2014/main" id="{F4727C6F-3982-4E54-AA66-B4E0AA33FF66}"/>
               </a:ext>
             </a:extLst>
           </p:cNvPr>
@@ -4878,8 +5043,12 @@
           <a:lstStyle/>
           <a:p>
             <a:r>
+              <a:rPr lang="en-US" dirty="0" smtClean="0"/>
+              <a:t>Big </a:t>
+            </a:r>
+            <a:r>
               <a:rPr lang="en-US" dirty="0"/>
-              <a:t>Tools used for big data</a:t>
+              <a:t>Data</a:t>
             </a:r>
             <a:endParaRPr lang="x-none" dirty="0"/>
           </a:p>
@@ -4890,7 +5059,116 @@
           <p:cNvPr id="3" name="Content Placeholder 2">
             <a:extLst>
               <a:ext uri="{FF2B5EF4-FFF2-40B4-BE49-F238E27FC236}">
-                <a16:creationId xmlns:a16="http://schemas.microsoft.com/office/drawing/2014/main" xmlns="" id="{DDC8679B-3323-4E4B-ABD6-BD8748DF3AEB}"/>
+                <a16:creationId xmlns="" xmlns:a16="http://schemas.microsoft.com/office/drawing/2014/main" id="{1134DAC4-9E94-441C-A9BE-87750F6F60A2}"/>
+              </a:ext>
+            </a:extLst>
+          </p:cNvPr>
+          <p:cNvSpPr>
+            <a:spLocks noGrp="1"/>
+          </p:cNvSpPr>
+          <p:nvPr>
+            <p:ph idx="1"/>
+          </p:nvPr>
+        </p:nvSpPr>
+        <p:spPr/>
+        <p:txBody>
+          <a:bodyPr>
+            <a:normAutofit/>
+          </a:bodyPr>
+          <a:lstStyle/>
+          <a:p>
+            <a:r>
+              <a:rPr lang="en-US" sz="3200" b="1" dirty="0"/>
+              <a:t>DEFINITION </a:t>
+            </a:r>
+            <a:endParaRPr lang="en-US" sz="3200" b="1" dirty="0"/>
+          </a:p>
+          <a:p>
+            <a:r>
+              <a:rPr lang="en-US" dirty="0">
+                <a:latin typeface="+mj-lt"/>
+              </a:rPr>
+              <a:t>Extremely large data sets that may be analyzed computationally to reveal patterns, trends, and associations, especially relating to human behavior and interactions.</a:t>
+            </a:r>
+          </a:p>
+          <a:p>
+            <a:r>
+              <a:rPr lang="en-US" dirty="0">
+                <a:latin typeface="+mj-lt"/>
+              </a:rPr>
+              <a:t>Big data is a term that describes the large volume of data – both structured and unstructured – that inundates a business on a day-to-day basis. But it’s not the amount of data that’s important. It’s what organizations do with the data that matters. Big data can be analyzed for insights that lead to better decisions and strategic business moves.</a:t>
+            </a:r>
+          </a:p>
+          <a:p>
+            <a:endParaRPr lang="x-none" dirty="0"/>
+          </a:p>
+        </p:txBody>
+      </p:sp>
+    </p:spTree>
+    <p:extLst>
+      <p:ext uri="{BB962C8B-B14F-4D97-AF65-F5344CB8AC3E}">
+        <p14:creationId xmlns:p14="http://schemas.microsoft.com/office/powerpoint/2010/main" val="196455147"/>
+      </p:ext>
+    </p:extLst>
+  </p:cSld>
+  <p:clrMapOvr>
+    <a:masterClrMapping/>
+  </p:clrMapOvr>
+</p:sld>
+</file>
+
+<file path=ppt/slides/slide8.xml><?xml version="1.0" encoding="utf-8"?>
+<p:sld xmlns:a="http://schemas.openxmlformats.org/drawingml/2006/main" xmlns:r="http://schemas.openxmlformats.org/officeDocument/2006/relationships" xmlns:p="http://schemas.openxmlformats.org/presentationml/2006/main">
+  <p:cSld>
+    <p:spTree>
+      <p:nvGrpSpPr>
+        <p:cNvPr id="1" name=""/>
+        <p:cNvGrpSpPr/>
+        <p:nvPr/>
+      </p:nvGrpSpPr>
+      <p:grpSpPr>
+        <a:xfrm>
+          <a:off x="0" y="0"/>
+          <a:ext cx="0" cy="0"/>
+          <a:chOff x="0" y="0"/>
+          <a:chExt cx="0" cy="0"/>
+        </a:xfrm>
+      </p:grpSpPr>
+      <p:sp>
+        <p:nvSpPr>
+          <p:cNvPr id="2" name="Title 1">
+            <a:extLst>
+              <a:ext uri="{FF2B5EF4-FFF2-40B4-BE49-F238E27FC236}">
+                <a16:creationId xmlns="" xmlns:a16="http://schemas.microsoft.com/office/drawing/2014/main" id="{3E1AC600-D16C-47B7-9075-94DA61007B25}"/>
+              </a:ext>
+            </a:extLst>
+          </p:cNvPr>
+          <p:cNvSpPr>
+            <a:spLocks noGrp="1"/>
+          </p:cNvSpPr>
+          <p:nvPr>
+            <p:ph type="title"/>
+          </p:nvPr>
+        </p:nvSpPr>
+        <p:spPr/>
+        <p:txBody>
+          <a:bodyPr/>
+          <a:lstStyle/>
+          <a:p>
+            <a:r>
+              <a:rPr lang="en-US" dirty="0" smtClean="0"/>
+              <a:t>Big Data: Tools</a:t>
+            </a:r>
+            <a:endParaRPr lang="x-none" dirty="0"/>
+          </a:p>
+        </p:txBody>
+      </p:sp>
+      <p:sp>
+        <p:nvSpPr>
+          <p:cNvPr id="3" name="Content Placeholder 2">
+            <a:extLst>
+              <a:ext uri="{FF2B5EF4-FFF2-40B4-BE49-F238E27FC236}">
+                <a16:creationId xmlns="" xmlns:a16="http://schemas.microsoft.com/office/drawing/2014/main" id="{DDC8679B-3323-4E4B-ABD6-BD8748DF3AEB}"/>
               </a:ext>
             </a:extLst>
           </p:cNvPr>
@@ -4962,13 +5240,8 @@
             </a:pPr>
             <a:r>
               <a:rPr lang="en-US" dirty="0"/>
-              <a:t>Few Important features are HDFS, YARN,MAPREDUCE, cost efficient, Hadoop libraries and </a:t>
-            </a:r>
-            <a:r>
-              <a:rPr lang="en-US"/>
-              <a:t>many more</a:t>
-            </a:r>
-            <a:endParaRPr lang="en-US" dirty="0"/>
+              <a:t>Few Important features are HDFS, YARN,MAPREDUCE, cost efficient, Hadoop libraries and many more</a:t>
+            </a:r>
           </a:p>
         </p:txBody>
       </p:sp>
@@ -4976,6 +5249,94 @@
     <p:extLst>
       <p:ext uri="{BB962C8B-B14F-4D97-AF65-F5344CB8AC3E}">
         <p14:creationId xmlns:p14="http://schemas.microsoft.com/office/powerpoint/2010/main" val="2845727905"/>
+      </p:ext>
+    </p:extLst>
+  </p:cSld>
+  <p:clrMapOvr>
+    <a:masterClrMapping/>
+  </p:clrMapOvr>
+</p:sld>
+</file>
+
+<file path=ppt/slides/slide9.xml><?xml version="1.0" encoding="utf-8"?>
+<p:sld xmlns:a="http://schemas.openxmlformats.org/drawingml/2006/main" xmlns:r="http://schemas.openxmlformats.org/officeDocument/2006/relationships" xmlns:p="http://schemas.openxmlformats.org/presentationml/2006/main">
+  <p:cSld>
+    <p:spTree>
+      <p:nvGrpSpPr>
+        <p:cNvPr id="1" name=""/>
+        <p:cNvGrpSpPr/>
+        <p:nvPr/>
+      </p:nvGrpSpPr>
+      <p:grpSpPr>
+        <a:xfrm>
+          <a:off x="0" y="0"/>
+          <a:ext cx="0" cy="0"/>
+          <a:chOff x="0" y="0"/>
+          <a:chExt cx="0" cy="0"/>
+        </a:xfrm>
+      </p:grpSpPr>
+      <p:sp>
+        <p:nvSpPr>
+          <p:cNvPr id="2" name="Title 1"/>
+          <p:cNvSpPr>
+            <a:spLocks noGrp="1"/>
+          </p:cNvSpPr>
+          <p:nvPr>
+            <p:ph type="title"/>
+          </p:nvPr>
+        </p:nvSpPr>
+        <p:spPr/>
+        <p:txBody>
+          <a:bodyPr/>
+          <a:lstStyle/>
+          <a:p>
+            <a:pPr algn="ctr"/>
+            <a:r>
+              <a:rPr lang="en-US" dirty="0" smtClean="0"/>
+              <a:t>DATA ANALYTICS</a:t>
+            </a:r>
+            <a:endParaRPr lang="en-US" dirty="0"/>
+          </a:p>
+        </p:txBody>
+      </p:sp>
+      <p:sp>
+        <p:nvSpPr>
+          <p:cNvPr id="3" name="Text Placeholder 2"/>
+          <p:cNvSpPr>
+            <a:spLocks noGrp="1"/>
+          </p:cNvSpPr>
+          <p:nvPr>
+            <p:ph type="body" idx="1"/>
+          </p:nvPr>
+        </p:nvSpPr>
+        <p:spPr/>
+        <p:txBody>
+          <a:bodyPr/>
+          <a:lstStyle/>
+          <a:p>
+            <a:pPr marL="0" lvl="1" algn="ctr"/>
+            <a:r>
+              <a:rPr lang="en-US" dirty="0" smtClean="0"/>
+              <a:t>TYPES, </a:t>
+            </a:r>
+            <a:r>
+              <a:rPr lang="en-US" dirty="0"/>
+              <a:t>DATA </a:t>
+            </a:r>
+            <a:r>
+              <a:rPr lang="en-US" dirty="0" smtClean="0"/>
+              <a:t>LAKE, ANALYSIS, ANALYTICS, A vs A, ANALYTICS TOOLS</a:t>
+            </a:r>
+          </a:p>
+          <a:p>
+            <a:endParaRPr lang="en-US" dirty="0"/>
+          </a:p>
+        </p:txBody>
+      </p:sp>
+    </p:spTree>
+    <p:extLst>
+      <p:ext uri="{BB962C8B-B14F-4D97-AF65-F5344CB8AC3E}">
+        <p14:creationId xmlns:p14="http://schemas.microsoft.com/office/powerpoint/2010/main" val="4230158867"/>
       </p:ext>
     </p:extLst>
   </p:cSld>

</xml_diff>

<commit_message>
update outline and content
Update slide contents: rearrgning outline, rearranging slides as per new outline, add sub-points in outline.
</commit_message>
<xml_diff>
--- a/Project Interim Submission/Generic DS Framework.pptx
+++ b/Project Interim Submission/Generic DS Framework.pptx
@@ -13,11 +13,11 @@
     <p:sldId id="257" r:id="rId4"/>
     <p:sldId id="260" r:id="rId5"/>
     <p:sldId id="259" r:id="rId6"/>
-    <p:sldId id="263" r:id="rId7"/>
-    <p:sldId id="261" r:id="rId8"/>
-    <p:sldId id="262" r:id="rId9"/>
-    <p:sldId id="264" r:id="rId10"/>
-    <p:sldId id="267" r:id="rId11"/>
+    <p:sldId id="264" r:id="rId7"/>
+    <p:sldId id="267" r:id="rId8"/>
+    <p:sldId id="263" r:id="rId9"/>
+    <p:sldId id="261" r:id="rId10"/>
+    <p:sldId id="262" r:id="rId11"/>
     <p:sldId id="265" r:id="rId12"/>
     <p:sldId id="266" r:id="rId13"/>
   </p:sldIdLst>
@@ -541,7 +541,7 @@
           <a:p>
             <a:fld id="{A8B0FF17-3803-4CB5-ACD9-64695F88EA67}" type="slidenum">
               <a:rPr lang="en-US" smtClean="0"/>
-              <a:t>10</a:t>
+              <a:t>7</a:t>
             </a:fld>
             <a:endParaRPr lang="en-US"/>
           </a:p>
@@ -4322,7 +4322,13 @@
       </p:grpSpPr>
       <p:sp>
         <p:nvSpPr>
-          <p:cNvPr id="4" name="Title 3"/>
+          <p:cNvPr id="2" name="Title 1">
+            <a:extLst>
+              <a:ext uri="{FF2B5EF4-FFF2-40B4-BE49-F238E27FC236}">
+                <a16:creationId xmlns="" xmlns:a16="http://schemas.microsoft.com/office/drawing/2014/main" id="{3E1AC600-D16C-47B7-9075-94DA61007B25}"/>
+              </a:ext>
+            </a:extLst>
+          </p:cNvPr>
           <p:cNvSpPr>
             <a:spLocks noGrp="1"/>
           </p:cNvSpPr>
@@ -4337,15 +4343,21 @@
           <a:p>
             <a:r>
               <a:rPr lang="en-US" dirty="0" smtClean="0"/>
-              <a:t>THE DATA</a:t>
-            </a:r>
-            <a:endParaRPr lang="en-US" dirty="0"/>
-          </a:p>
-        </p:txBody>
-      </p:sp>
-      <p:sp>
-        <p:nvSpPr>
-          <p:cNvPr id="5" name="Content Placeholder 4"/>
+              <a:t>Big Data: Tools</a:t>
+            </a:r>
+            <a:endParaRPr lang="x-none" dirty="0"/>
+          </a:p>
+        </p:txBody>
+      </p:sp>
+      <p:sp>
+        <p:nvSpPr>
+          <p:cNvPr id="3" name="Content Placeholder 2">
+            <a:extLst>
+              <a:ext uri="{FF2B5EF4-FFF2-40B4-BE49-F238E27FC236}">
+                <a16:creationId xmlns="" xmlns:a16="http://schemas.microsoft.com/office/drawing/2014/main" id="{DDC8679B-3323-4E4B-ABD6-BD8748DF3AEB}"/>
+              </a:ext>
+            </a:extLst>
+          </p:cNvPr>
           <p:cNvSpPr>
             <a:spLocks noGrp="1"/>
           </p:cNvSpPr>
@@ -4355,87 +4367,74 @@
         </p:nvSpPr>
         <p:spPr/>
         <p:txBody>
-          <a:bodyPr>
-            <a:normAutofit/>
-          </a:bodyPr>
-          <a:lstStyle/>
-          <a:p>
-            <a:r>
-              <a:rPr lang="en-US" sz="3200" b="1" dirty="0" smtClean="0"/>
-              <a:t>DEFINITION</a:t>
-            </a:r>
-          </a:p>
-          <a:p>
-            <a:pPr algn="justLow"/>
-            <a:r>
-              <a:rPr lang="en-US" dirty="0" smtClean="0"/>
-              <a:t>It </a:t>
-            </a:r>
+          <a:bodyPr/>
+          <a:lstStyle/>
+          <a:p>
+            <a:pPr marL="0" indent="0">
+              <a:buNone/>
+            </a:pPr>
+            <a:r>
+              <a:rPr lang="en-US" sz="3200" b="1" dirty="0"/>
+              <a:t>Hadoop</a:t>
+            </a:r>
+            <a:endParaRPr lang="en-US" b="1" dirty="0"/>
+          </a:p>
+          <a:p>
+            <a:pPr>
+              <a:buFont typeface="Wingdings" panose="05000000000000000000" pitchFamily="2" charset="2"/>
+              <a:buChar char="v"/>
+            </a:pPr>
             <a:r>
               <a:rPr lang="en-US" dirty="0"/>
-              <a:t>is </a:t>
-            </a:r>
-            <a:r>
-              <a:rPr lang="en-US" dirty="0" smtClean="0"/>
-              <a:t>something that could be measured</a:t>
-            </a:r>
+              <a:t>Hadoop software library is a framework</a:t>
+            </a:r>
+          </a:p>
+          <a:p>
+            <a:pPr>
+              <a:buFont typeface="Wingdings" panose="05000000000000000000" pitchFamily="2" charset="2"/>
+              <a:buChar char="v"/>
+            </a:pPr>
             <a:r>
               <a:rPr lang="en-US" dirty="0"/>
-              <a:t>, </a:t>
-            </a:r>
-            <a:r>
-              <a:rPr lang="en-US" dirty="0" smtClean="0"/>
-              <a:t>collected, </a:t>
-            </a:r>
+              <a:t>Help in distributed processing of large data sets across clusters of computers</a:t>
+            </a:r>
+          </a:p>
+          <a:p>
+            <a:pPr>
+              <a:buFont typeface="Wingdings" panose="05000000000000000000" pitchFamily="2" charset="2"/>
+              <a:buChar char="v"/>
+            </a:pPr>
             <a:r>
               <a:rPr lang="en-US" dirty="0"/>
-              <a:t>reported, </a:t>
-            </a:r>
-            <a:r>
-              <a:rPr lang="en-US" dirty="0" smtClean="0"/>
-              <a:t>analyzed</a:t>
-            </a:r>
+              <a:t>Two method to start single node or cluster mode</a:t>
+            </a:r>
+          </a:p>
+          <a:p>
+            <a:pPr>
+              <a:buFont typeface="Wingdings" panose="05000000000000000000" pitchFamily="2" charset="2"/>
+              <a:buChar char="v"/>
+            </a:pPr>
             <a:r>
               <a:rPr lang="en-US" dirty="0"/>
-              <a:t>, </a:t>
-            </a:r>
-            <a:r>
-              <a:rPr lang="en-US" dirty="0" smtClean="0"/>
-              <a:t>stored, </a:t>
-            </a:r>
+              <a:t>Latest stable version is 2.9.2 </a:t>
+            </a:r>
+          </a:p>
+          <a:p>
+            <a:pPr>
+              <a:buFont typeface="Wingdings" panose="05000000000000000000" pitchFamily="2" charset="2"/>
+              <a:buChar char="v"/>
+            </a:pPr>
             <a:r>
               <a:rPr lang="en-US" dirty="0"/>
-              <a:t>and whereupon </a:t>
-            </a:r>
-            <a:r>
-              <a:rPr lang="en-US" dirty="0" smtClean="0"/>
-              <a:t>it </a:t>
-            </a:r>
-            <a:r>
-              <a:rPr lang="en-US" dirty="0"/>
-              <a:t>can be visualized using graphs, images or other analysis tools.</a:t>
-            </a:r>
-            <a:endParaRPr lang="en-US" dirty="0">
-              <a:latin typeface="+mj-lt"/>
-            </a:endParaRPr>
-          </a:p>
-          <a:p>
-            <a:r>
-              <a:rPr lang="en-US" dirty="0"/>
-              <a:t>Data, in general concept refers to the facts that has information or knowledge.</a:t>
-            </a:r>
-          </a:p>
-          <a:p>
-            <a:endParaRPr lang="en-US" dirty="0">
-              <a:latin typeface="+mj-lt"/>
-            </a:endParaRPr>
+              <a:t>Few Important features are HDFS, YARN,MAPREDUCE, cost efficient, Hadoop libraries and many more</a:t>
+            </a:r>
           </a:p>
         </p:txBody>
       </p:sp>
     </p:spTree>
     <p:extLst>
       <p:ext uri="{BB962C8B-B14F-4D97-AF65-F5344CB8AC3E}">
-        <p14:creationId xmlns:p14="http://schemas.microsoft.com/office/powerpoint/2010/main" val="146744336"/>
+        <p14:creationId xmlns:p14="http://schemas.microsoft.com/office/powerpoint/2010/main" val="2845727905"/>
       </p:ext>
     </p:extLst>
   </p:cSld>
@@ -4769,7 +4768,7 @@
           <p:nvPr>
             <p:extLst>
               <p:ext uri="{D42A27DB-BD31-4B8C-83A1-F6EECF244321}">
-                <p14:modId xmlns:p14="http://schemas.microsoft.com/office/powerpoint/2010/main" val="2923142928"/>
+                <p14:modId xmlns:p14="http://schemas.microsoft.com/office/powerpoint/2010/main" val="2467089574"/>
               </p:ext>
             </p:extLst>
           </p:nvPr>
@@ -4788,14 +4787,14 @@
                 <a:gridCol w="5035931">
                   <a:extLst>
                     <a:ext uri="{9D8B030D-6E8A-4147-A177-3AD203B41FA5}">
-                      <a16:colId xmlns:a16="http://schemas.microsoft.com/office/drawing/2014/main" xmlns="" val="20000"/>
+                      <a16:colId xmlns="" xmlns:a16="http://schemas.microsoft.com/office/drawing/2014/main" val="20000"/>
                     </a:ext>
                   </a:extLst>
                 </a:gridCol>
                 <a:gridCol w="5022469">
                   <a:extLst>
                     <a:ext uri="{9D8B030D-6E8A-4147-A177-3AD203B41FA5}">
-                      <a16:colId xmlns:a16="http://schemas.microsoft.com/office/drawing/2014/main" xmlns="" val="20001"/>
+                      <a16:colId xmlns="" xmlns:a16="http://schemas.microsoft.com/office/drawing/2014/main" val="20001"/>
                     </a:ext>
                   </a:extLst>
                 </a:gridCol>
@@ -4820,14 +4819,14 @@
                       <a:r>
                         <a:rPr lang="en-US" sz="1800" b="0" kern="1200" spc="300" baseline="0" dirty="0">
                           <a:solidFill>
-                            <a:schemeClr val="tx1"/>
+                            <a:schemeClr val="bg1"/>
                           </a:solidFill>
                         </a:rPr>
                         <a:t>Jibran Rasheed Khan </a:t>
                       </a:r>
                       <a:endParaRPr lang="en-US" sz="1800" b="0" kern="1200" spc="300" baseline="0" dirty="0">
                         <a:solidFill>
-                          <a:schemeClr val="tx1"/>
+                          <a:schemeClr val="bg1"/>
                         </a:solidFill>
                         <a:latin typeface="+mj-lt"/>
                         <a:ea typeface="+mj-ea"/>
@@ -4856,14 +4855,14 @@
                       <a:r>
                         <a:rPr lang="en-US" sz="1800" b="0" kern="1200" spc="300" baseline="0" dirty="0">
                           <a:solidFill>
-                            <a:schemeClr val="tx1"/>
+                            <a:schemeClr val="bg1"/>
                           </a:solidFill>
                         </a:rPr>
                         <a:t>MSIS-010/2018</a:t>
                       </a:r>
                       <a:endParaRPr lang="en-US" sz="1800" b="0" kern="1200" spc="300" baseline="0" dirty="0">
                         <a:solidFill>
-                          <a:schemeClr val="tx1"/>
+                          <a:schemeClr val="bg1"/>
                         </a:solidFill>
                         <a:latin typeface="+mj-lt"/>
                         <a:ea typeface="+mj-ea"/>
@@ -4875,7 +4874,7 @@
                 </a:tc>
                 <a:extLst>
                   <a:ext uri="{0D108BD9-81ED-4DB2-BD59-A6C34878D82A}">
-                    <a16:rowId xmlns:a16="http://schemas.microsoft.com/office/drawing/2014/main" xmlns="" val="10000"/>
+                    <a16:rowId xmlns="" xmlns:a16="http://schemas.microsoft.com/office/drawing/2014/main" val="10000"/>
                   </a:ext>
                 </a:extLst>
               </a:tr>
@@ -4899,7 +4898,7 @@
                       <a:r>
                         <a:rPr lang="en-US" sz="1800" b="0" kern="1200" spc="300" baseline="0" dirty="0">
                           <a:solidFill>
-                            <a:schemeClr val="tx1"/>
+                            <a:schemeClr val="bg1"/>
                           </a:solidFill>
                         </a:rPr>
                         <a:t>Muhammad </a:t>
@@ -4907,14 +4906,14 @@
                       <a:r>
                         <a:rPr lang="en-US" sz="1800" b="0" kern="1200" spc="300" baseline="0" dirty="0" err="1">
                           <a:solidFill>
-                            <a:schemeClr val="tx1"/>
+                            <a:schemeClr val="bg1"/>
                           </a:solidFill>
                         </a:rPr>
                         <a:t>Waqar</a:t>
                       </a:r>
                       <a:endParaRPr lang="en-US" sz="1800" b="0" kern="1200" spc="300" baseline="0" dirty="0">
                         <a:solidFill>
-                          <a:schemeClr val="tx1"/>
+                          <a:schemeClr val="bg1"/>
                         </a:solidFill>
                         <a:latin typeface="+mj-lt"/>
                         <a:ea typeface="+mj-ea"/>
@@ -4943,14 +4942,14 @@
                       <a:r>
                         <a:rPr lang="en-US" sz="1800" b="0" kern="1200" spc="300" baseline="0" dirty="0">
                           <a:solidFill>
-                            <a:schemeClr val="tx1"/>
+                            <a:schemeClr val="bg1"/>
                           </a:solidFill>
                         </a:rPr>
                         <a:t>MSIS-011/2018</a:t>
                       </a:r>
                       <a:endParaRPr lang="en-US" sz="1800" b="0" kern="1200" spc="300" baseline="0" dirty="0">
                         <a:solidFill>
-                          <a:schemeClr val="tx1"/>
+                          <a:schemeClr val="bg1"/>
                         </a:solidFill>
                         <a:latin typeface="+mj-lt"/>
                         <a:ea typeface="+mj-ea"/>
@@ -4962,7 +4961,7 @@
                 </a:tc>
                 <a:extLst>
                   <a:ext uri="{0D108BD9-81ED-4DB2-BD59-A6C34878D82A}">
-                    <a16:rowId xmlns:a16="http://schemas.microsoft.com/office/drawing/2014/main" xmlns="" val="10001"/>
+                    <a16:rowId xmlns="" xmlns:a16="http://schemas.microsoft.com/office/drawing/2014/main" val="10001"/>
                   </a:ext>
                 </a:extLst>
               </a:tr>
@@ -4986,7 +4985,7 @@
                       <a:r>
                         <a:rPr lang="en-US" sz="1800" b="0" kern="1200" spc="300" baseline="0" dirty="0">
                           <a:solidFill>
-                            <a:schemeClr val="tx1"/>
+                            <a:schemeClr val="bg1"/>
                           </a:solidFill>
                         </a:rPr>
                         <a:t>Hafiz </a:t>
@@ -4994,7 +4993,7 @@
                       <a:r>
                         <a:rPr lang="en-US" sz="1800" b="0" kern="1200" spc="300" baseline="0" dirty="0" err="1">
                           <a:solidFill>
-                            <a:schemeClr val="tx1"/>
+                            <a:schemeClr val="bg1"/>
                           </a:solidFill>
                         </a:rPr>
                         <a:t>Idrees</a:t>
@@ -5002,7 +5001,7 @@
                       <a:r>
                         <a:rPr lang="en-US" sz="1800" b="0" kern="1200" spc="300" baseline="0" dirty="0">
                           <a:solidFill>
-                            <a:schemeClr val="tx1"/>
+                            <a:schemeClr val="bg1"/>
                           </a:solidFill>
                         </a:rPr>
                         <a:t> </a:t>
@@ -5010,14 +5009,14 @@
                       <a:r>
                         <a:rPr lang="en-US" sz="1800" b="0" kern="1200" spc="300" baseline="0" dirty="0" err="1">
                           <a:solidFill>
-                            <a:schemeClr val="tx1"/>
+                            <a:schemeClr val="bg1"/>
                           </a:solidFill>
                         </a:rPr>
                         <a:t>Riaz</a:t>
                       </a:r>
                       <a:endParaRPr lang="en-US" sz="1800" b="0" kern="1200" spc="300" baseline="0" dirty="0">
                         <a:solidFill>
-                          <a:schemeClr val="tx1"/>
+                          <a:schemeClr val="bg1"/>
                         </a:solidFill>
                         <a:latin typeface="+mj-lt"/>
                         <a:ea typeface="+mj-ea"/>
@@ -5046,14 +5045,14 @@
                       <a:r>
                         <a:rPr lang="en-US" sz="1800" b="0" kern="1200" spc="300" baseline="0" dirty="0">
                           <a:solidFill>
-                            <a:schemeClr val="tx1"/>
+                            <a:schemeClr val="bg1"/>
                           </a:solidFill>
                         </a:rPr>
                         <a:t>MSIS-025/2018</a:t>
                       </a:r>
                       <a:endParaRPr lang="en-US" sz="1800" b="0" kern="1200" spc="300" baseline="0" dirty="0">
                         <a:solidFill>
-                          <a:schemeClr val="tx1"/>
+                          <a:schemeClr val="bg1"/>
                         </a:solidFill>
                         <a:latin typeface="+mj-lt"/>
                         <a:ea typeface="+mj-ea"/>
@@ -5065,7 +5064,7 @@
                 </a:tc>
                 <a:extLst>
                   <a:ext uri="{0D108BD9-81ED-4DB2-BD59-A6C34878D82A}">
-                    <a16:rowId xmlns:a16="http://schemas.microsoft.com/office/drawing/2014/main" xmlns="" val="10002"/>
+                    <a16:rowId xmlns="" xmlns:a16="http://schemas.microsoft.com/office/drawing/2014/main" val="10002"/>
                   </a:ext>
                 </a:extLst>
               </a:tr>
@@ -5144,7 +5143,7 @@
         </p:spPr>
         <p:txBody>
           <a:bodyPr>
-            <a:normAutofit fontScale="92500" lnSpcReduction="10000"/>
+            <a:normAutofit fontScale="92500" lnSpcReduction="20000"/>
           </a:bodyPr>
           <a:lstStyle/>
           <a:p>
@@ -5154,7 +5153,11 @@
             </a:pPr>
             <a:r>
               <a:rPr lang="en-US" dirty="0"/>
-              <a:t> Objective</a:t>
+              <a:t> </a:t>
+            </a:r>
+            <a:r>
+              <a:rPr lang="en-US" dirty="0" smtClean="0"/>
+              <a:t>Objective</a:t>
             </a:r>
           </a:p>
           <a:p>
@@ -5163,8 +5166,8 @@
               <a:buChar char="Ø"/>
             </a:pPr>
             <a:r>
-              <a:rPr lang="en-US" dirty="0" smtClean="0"/>
-              <a:t> Big Data</a:t>
+              <a:rPr lang="en-US" dirty="0"/>
+              <a:t>Data </a:t>
             </a:r>
           </a:p>
           <a:p>
@@ -5173,8 +5176,8 @@
               <a:buChar char="Ø"/>
             </a:pPr>
             <a:r>
-              <a:rPr lang="en-US" dirty="0" smtClean="0"/>
-              <a:t> Pillars</a:t>
+              <a:rPr lang="en-US" dirty="0"/>
+              <a:t> Analysis</a:t>
             </a:r>
           </a:p>
           <a:p>
@@ -5184,11 +5187,7 @@
             </a:pPr>
             <a:r>
               <a:rPr lang="en-US" dirty="0"/>
-              <a:t> </a:t>
-            </a:r>
-            <a:r>
-              <a:rPr lang="en-US" dirty="0" smtClean="0"/>
-              <a:t>Sources</a:t>
+              <a:t> Analytics</a:t>
             </a:r>
           </a:p>
           <a:p>
@@ -5198,11 +5197,7 @@
             </a:pPr>
             <a:r>
               <a:rPr lang="en-US" dirty="0"/>
-              <a:t> </a:t>
-            </a:r>
-            <a:r>
-              <a:rPr lang="en-US" dirty="0" smtClean="0"/>
-              <a:t>Model</a:t>
+              <a:t> A vs A </a:t>
             </a:r>
           </a:p>
           <a:p>
@@ -5211,9 +5206,14 @@
               <a:buChar char="Ø"/>
             </a:pPr>
             <a:r>
+              <a:rPr lang="en-US" dirty="0"/>
+              <a:t> Analytics </a:t>
+            </a:r>
+            <a:r>
               <a:rPr lang="en-US" dirty="0" smtClean="0"/>
-              <a:t> Tools</a:t>
-            </a:r>
+              <a:t>Tools</a:t>
+            </a:r>
+            <a:endParaRPr lang="en-US" dirty="0"/>
           </a:p>
           <a:p>
             <a:pPr>
@@ -5222,9 +5222,8 @@
             </a:pPr>
             <a:r>
               <a:rPr lang="en-US" dirty="0" smtClean="0"/>
-              <a:t> Data </a:t>
-            </a:r>
-            <a:endParaRPr lang="en-US" dirty="0" smtClean="0"/>
+              <a:t> Big Data</a:t>
+            </a:r>
           </a:p>
           <a:p>
             <a:pPr lvl="1">
@@ -5232,12 +5231,8 @@
               <a:buChar char="Ø"/>
             </a:pPr>
             <a:r>
-              <a:rPr lang="en-US" dirty="0"/>
-              <a:t> </a:t>
-            </a:r>
-            <a:r>
               <a:rPr lang="en-US" dirty="0" smtClean="0"/>
-              <a:t>Analysis</a:t>
+              <a:t> Pillars</a:t>
             </a:r>
           </a:p>
           <a:p>
@@ -5251,8 +5246,9 @@
             </a:r>
             <a:r>
               <a:rPr lang="en-US" dirty="0" smtClean="0"/>
-              <a:t>Analytics</a:t>
-            </a:r>
+              <a:t>Sources</a:t>
+            </a:r>
+            <a:endParaRPr lang="en-US" dirty="0" smtClean="0"/>
           </a:p>
           <a:p>
             <a:pPr lvl="1">
@@ -5260,14 +5256,13 @@
               <a:buChar char="Ø"/>
             </a:pPr>
             <a:r>
+              <a:rPr lang="en-US" dirty="0"/>
+              <a:t> </a:t>
+            </a:r>
+            <a:r>
               <a:rPr lang="en-US" dirty="0" smtClean="0"/>
-              <a:t> A vs A</a:t>
-            </a:r>
-            <a:r>
-              <a:rPr lang="en-US" dirty="0" smtClean="0"/>
-              <a:t> </a:t>
-            </a:r>
-            <a:endParaRPr lang="en-US" dirty="0" smtClean="0"/>
+              <a:t>Model</a:t>
+            </a:r>
           </a:p>
           <a:p>
             <a:pPr lvl="1">
@@ -5276,7 +5271,18 @@
             </a:pPr>
             <a:r>
               <a:rPr lang="en-US" dirty="0" smtClean="0"/>
-              <a:t> Analytics Tools</a:t>
+              <a:t> Analytics</a:t>
+            </a:r>
+            <a:endParaRPr lang="en-US" dirty="0" smtClean="0"/>
+          </a:p>
+          <a:p>
+            <a:pPr lvl="1">
+              <a:buFont typeface="Wingdings" panose="05000000000000000000" pitchFamily="2" charset="2"/>
+              <a:buChar char="Ø"/>
+            </a:pPr>
+            <a:r>
+              <a:rPr lang="en-US" dirty="0" smtClean="0"/>
+              <a:t> Tools</a:t>
             </a:r>
           </a:p>
           <a:p>
@@ -5285,13 +5291,10 @@
               <a:buChar char="Ø"/>
             </a:pPr>
             <a:r>
-              <a:rPr lang="en-US" dirty="0"/>
-              <a:t> </a:t>
-            </a:r>
-            <a:r>
               <a:rPr lang="en-US" dirty="0" smtClean="0"/>
-              <a:t> Algorithms</a:t>
-            </a:r>
+              <a:t>Algorithms</a:t>
+            </a:r>
+            <a:endParaRPr lang="en-US" dirty="0" smtClean="0"/>
           </a:p>
           <a:p>
             <a:pPr lvl="1">
@@ -5314,11 +5317,7 @@
             </a:r>
             <a:r>
               <a:rPr lang="en-US" dirty="0" smtClean="0"/>
-              <a:t>Big Data &amp; Analytics </a:t>
-            </a:r>
-            <a:r>
-              <a:rPr lang="en-US" dirty="0" smtClean="0"/>
-              <a:t>Algorithms</a:t>
+              <a:t>Big Data &amp; Analytics Algorithms</a:t>
             </a:r>
             <a:endParaRPr lang="en-US" dirty="0"/>
           </a:p>
@@ -5342,7 +5341,7 @@
         </p:spPr>
         <p:txBody>
           <a:bodyPr>
-            <a:normAutofit fontScale="92500" lnSpcReduction="10000"/>
+            <a:normAutofit fontScale="92500" lnSpcReduction="20000"/>
           </a:bodyPr>
           <a:lstStyle/>
           <a:p>
@@ -5376,7 +5375,7 @@
             </a:r>
             <a:r>
               <a:rPr lang="en-US" dirty="0" smtClean="0"/>
-              <a:t>Tools</a:t>
+              <a:t>Tools </a:t>
             </a:r>
           </a:p>
           <a:p>
@@ -5388,6 +5387,7 @@
               <a:rPr lang="en-US" dirty="0" smtClean="0"/>
               <a:t> Feature</a:t>
             </a:r>
+            <a:endParaRPr lang="en-US" dirty="0" smtClean="0"/>
           </a:p>
           <a:p>
             <a:pPr lvl="1">
@@ -5406,8 +5406,13 @@
             </a:pPr>
             <a:r>
               <a:rPr lang="en-US" dirty="0" smtClean="0"/>
-              <a:t> New Propose Model</a:t>
-            </a:r>
+              <a:t> New Propose </a:t>
+            </a:r>
+            <a:r>
+              <a:rPr lang="en-US" dirty="0" smtClean="0"/>
+              <a:t>Model</a:t>
+            </a:r>
+            <a:endParaRPr lang="en-US" dirty="0" smtClean="0"/>
           </a:p>
           <a:p>
             <a:pPr>
@@ -5540,7 +5545,7 @@
       </p:grpSpPr>
       <p:sp>
         <p:nvSpPr>
-          <p:cNvPr id="4" name="Title 3"/>
+          <p:cNvPr id="2" name="Title 1"/>
           <p:cNvSpPr>
             <a:spLocks noGrp="1"/>
           </p:cNvSpPr>
@@ -5556,7 +5561,7 @@
             <a:pPr algn="ctr"/>
             <a:r>
               <a:rPr lang="en-US" dirty="0" smtClean="0"/>
-              <a:t>BIG DATA</a:t>
+              <a:t>DATA</a:t>
             </a:r>
             <a:endParaRPr lang="en-US" dirty="0"/>
           </a:p>
@@ -5564,7 +5569,7 @@
       </p:sp>
       <p:sp>
         <p:nvSpPr>
-          <p:cNvPr id="5" name="Text Placeholder 4"/>
+          <p:cNvPr id="3" name="Text Placeholder 2"/>
           <p:cNvSpPr>
             <a:spLocks noGrp="1"/>
           </p:cNvSpPr>
@@ -5574,32 +5579,32 @@
         </p:nvSpPr>
         <p:spPr/>
         <p:txBody>
-          <a:bodyPr>
-            <a:normAutofit/>
-          </a:bodyPr>
+          <a:bodyPr/>
           <a:lstStyle/>
           <a:p>
             <a:pPr marL="0" lvl="1" algn="ctr"/>
             <a:r>
-              <a:rPr lang="en-US" sz="2000" dirty="0" smtClean="0"/>
-              <a:t>PILLARS, SOURCES, </a:t>
-            </a:r>
-            <a:r>
-              <a:rPr lang="en-US" sz="2000" dirty="0"/>
-              <a:t>MODEL,</a:t>
-            </a:r>
-            <a:r>
-              <a:rPr lang="en-US" sz="2000" dirty="0" smtClean="0"/>
-              <a:t> TOOLS</a:t>
-            </a:r>
-            <a:endParaRPr lang="en-US" sz="2000" dirty="0"/>
+              <a:rPr lang="en-US" dirty="0" smtClean="0"/>
+              <a:t>TYPES, </a:t>
+            </a:r>
+            <a:r>
+              <a:rPr lang="en-US" dirty="0"/>
+              <a:t>DATA </a:t>
+            </a:r>
+            <a:r>
+              <a:rPr lang="en-US" dirty="0" smtClean="0"/>
+              <a:t>LAKE, ANALYSIS, ANALYTICS, A vs A, ANALYTICS TOOLS</a:t>
+            </a:r>
+          </a:p>
+          <a:p>
+            <a:endParaRPr lang="en-US" dirty="0"/>
           </a:p>
         </p:txBody>
       </p:sp>
     </p:spTree>
     <p:extLst>
       <p:ext uri="{BB962C8B-B14F-4D97-AF65-F5344CB8AC3E}">
-        <p14:creationId xmlns:p14="http://schemas.microsoft.com/office/powerpoint/2010/main" val="2241138064"/>
+        <p14:creationId xmlns:p14="http://schemas.microsoft.com/office/powerpoint/2010/main" val="4230158867"/>
       </p:ext>
     </p:extLst>
   </p:cSld>
@@ -5628,13 +5633,7 @@
       </p:grpSpPr>
       <p:sp>
         <p:nvSpPr>
-          <p:cNvPr id="2" name="Title 1">
-            <a:extLst>
-              <a:ext uri="{FF2B5EF4-FFF2-40B4-BE49-F238E27FC236}">
-                <a16:creationId xmlns:a16="http://schemas.microsoft.com/office/drawing/2014/main" xmlns="" id="{F4727C6F-3982-4E54-AA66-B4E0AA33FF66}"/>
-              </a:ext>
-            </a:extLst>
-          </p:cNvPr>
+          <p:cNvPr id="4" name="Title 3"/>
           <p:cNvSpPr>
             <a:spLocks noGrp="1"/>
           </p:cNvSpPr>
@@ -5649,25 +5648,15 @@
           <a:p>
             <a:r>
               <a:rPr lang="en-US" dirty="0" smtClean="0"/>
-              <a:t>Big </a:t>
-            </a:r>
-            <a:r>
-              <a:rPr lang="en-US" dirty="0"/>
-              <a:t>Data</a:t>
-            </a:r>
-            <a:endParaRPr lang="x-none" dirty="0"/>
-          </a:p>
-        </p:txBody>
-      </p:sp>
-      <p:sp>
-        <p:nvSpPr>
-          <p:cNvPr id="3" name="Content Placeholder 2">
-            <a:extLst>
-              <a:ext uri="{FF2B5EF4-FFF2-40B4-BE49-F238E27FC236}">
-                <a16:creationId xmlns:a16="http://schemas.microsoft.com/office/drawing/2014/main" xmlns="" id="{1134DAC4-9E94-441C-A9BE-87750F6F60A2}"/>
-              </a:ext>
-            </a:extLst>
-          </p:cNvPr>
+              <a:t>THE DATA</a:t>
+            </a:r>
+            <a:endParaRPr lang="en-US" dirty="0"/>
+          </a:p>
+        </p:txBody>
+      </p:sp>
+      <p:sp>
+        <p:nvSpPr>
+          <p:cNvPr id="5" name="Content Placeholder 4"/>
           <p:cNvSpPr>
             <a:spLocks noGrp="1"/>
           </p:cNvSpPr>
@@ -5683,35 +5672,81 @@
           <a:lstStyle/>
           <a:p>
             <a:r>
-              <a:rPr lang="en-US" sz="3200" b="1" dirty="0"/>
-              <a:t>DEFINITION </a:t>
-            </a:r>
-          </a:p>
-          <a:p>
-            <a:r>
-              <a:rPr lang="en-US" dirty="0">
-                <a:latin typeface="+mj-lt"/>
-              </a:rPr>
-              <a:t>Extremely large data sets that may be analyzed computationally to reveal patterns, trends, and associations, especially relating to human behavior and interactions.</a:t>
-            </a:r>
-          </a:p>
-          <a:p>
-            <a:r>
-              <a:rPr lang="en-US" dirty="0">
-                <a:latin typeface="+mj-lt"/>
-              </a:rPr>
-              <a:t>Big data is a term that describes the large volume of data – both structured and unstructured – that inundates a business on a day-to-day basis. But it’s not the amount of data that’s important. It’s what organizations do with the data that matters. Big data can be analyzed for insights that lead to better decisions and strategic business moves.</a:t>
-            </a:r>
-          </a:p>
-          <a:p>
-            <a:endParaRPr lang="x-none" dirty="0"/>
+              <a:rPr lang="en-US" sz="3200" b="1" dirty="0" smtClean="0"/>
+              <a:t>DEFINITION</a:t>
+            </a:r>
+          </a:p>
+          <a:p>
+            <a:pPr algn="justLow"/>
+            <a:r>
+              <a:rPr lang="en-US" dirty="0" smtClean="0"/>
+              <a:t>It </a:t>
+            </a:r>
+            <a:r>
+              <a:rPr lang="en-US" dirty="0"/>
+              <a:t>is </a:t>
+            </a:r>
+            <a:r>
+              <a:rPr lang="en-US" dirty="0" smtClean="0"/>
+              <a:t>something that could be measured</a:t>
+            </a:r>
+            <a:r>
+              <a:rPr lang="en-US" dirty="0"/>
+              <a:t>, </a:t>
+            </a:r>
+            <a:r>
+              <a:rPr lang="en-US" dirty="0" smtClean="0"/>
+              <a:t>collected, </a:t>
+            </a:r>
+            <a:r>
+              <a:rPr lang="en-US" dirty="0"/>
+              <a:t>reported, </a:t>
+            </a:r>
+            <a:r>
+              <a:rPr lang="en-US" dirty="0" smtClean="0"/>
+              <a:t>analyzed</a:t>
+            </a:r>
+            <a:r>
+              <a:rPr lang="en-US" dirty="0"/>
+              <a:t>, </a:t>
+            </a:r>
+            <a:r>
+              <a:rPr lang="en-US" dirty="0" smtClean="0"/>
+              <a:t>stored, </a:t>
+            </a:r>
+            <a:r>
+              <a:rPr lang="en-US" dirty="0"/>
+              <a:t>and whereupon </a:t>
+            </a:r>
+            <a:r>
+              <a:rPr lang="en-US" dirty="0" smtClean="0"/>
+              <a:t>it </a:t>
+            </a:r>
+            <a:r>
+              <a:rPr lang="en-US" dirty="0"/>
+              <a:t>can be visualized using graphs, images or other analysis tools.</a:t>
+            </a:r>
+            <a:endParaRPr lang="en-US" dirty="0">
+              <a:latin typeface="+mj-lt"/>
+            </a:endParaRPr>
+          </a:p>
+          <a:p>
+            <a:r>
+              <a:rPr lang="en-US" dirty="0"/>
+              <a:t>Data, in general concept refers to the facts that has information or knowledge.</a:t>
+            </a:r>
+          </a:p>
+          <a:p>
+            <a:endParaRPr lang="en-US" dirty="0">
+              <a:latin typeface="+mj-lt"/>
+            </a:endParaRPr>
           </a:p>
         </p:txBody>
       </p:sp>
     </p:spTree>
     <p:extLst>
       <p:ext uri="{BB962C8B-B14F-4D97-AF65-F5344CB8AC3E}">
-        <p14:creationId xmlns:p14="http://schemas.microsoft.com/office/powerpoint/2010/main" val="196455147"/>
+        <p14:creationId xmlns:p14="http://schemas.microsoft.com/office/powerpoint/2010/main" val="146744336"/>
       </p:ext>
     </p:extLst>
   </p:cSld>
@@ -5740,13 +5775,7 @@
       </p:grpSpPr>
       <p:sp>
         <p:nvSpPr>
-          <p:cNvPr id="2" name="Title 1">
-            <a:extLst>
-              <a:ext uri="{FF2B5EF4-FFF2-40B4-BE49-F238E27FC236}">
-                <a16:creationId xmlns:a16="http://schemas.microsoft.com/office/drawing/2014/main" xmlns="" id="{3E1AC600-D16C-47B7-9075-94DA61007B25}"/>
-              </a:ext>
-            </a:extLst>
-          </p:cNvPr>
+          <p:cNvPr id="4" name="Title 3"/>
           <p:cNvSpPr>
             <a:spLocks noGrp="1"/>
           </p:cNvSpPr>
@@ -5759,100 +5788,53 @@
           <a:bodyPr/>
           <a:lstStyle/>
           <a:p>
+            <a:pPr algn="ctr"/>
             <a:r>
               <a:rPr lang="en-US" dirty="0" smtClean="0"/>
-              <a:t>Big Data: Tools</a:t>
-            </a:r>
-            <a:endParaRPr lang="x-none" dirty="0"/>
-          </a:p>
-        </p:txBody>
-      </p:sp>
-      <p:sp>
-        <p:nvSpPr>
-          <p:cNvPr id="3" name="Content Placeholder 2">
-            <a:extLst>
-              <a:ext uri="{FF2B5EF4-FFF2-40B4-BE49-F238E27FC236}">
-                <a16:creationId xmlns:a16="http://schemas.microsoft.com/office/drawing/2014/main" xmlns="" id="{DDC8679B-3323-4E4B-ABD6-BD8748DF3AEB}"/>
-              </a:ext>
-            </a:extLst>
-          </p:cNvPr>
-          <p:cNvSpPr>
-            <a:spLocks noGrp="1"/>
-          </p:cNvSpPr>
-          <p:nvPr>
-            <p:ph idx="1"/>
+              <a:t>BIG DATA</a:t>
+            </a:r>
+            <a:endParaRPr lang="en-US" dirty="0"/>
+          </a:p>
+        </p:txBody>
+      </p:sp>
+      <p:sp>
+        <p:nvSpPr>
+          <p:cNvPr id="5" name="Text Placeholder 4"/>
+          <p:cNvSpPr>
+            <a:spLocks noGrp="1"/>
+          </p:cNvSpPr>
+          <p:nvPr>
+            <p:ph type="body" idx="1"/>
           </p:nvPr>
         </p:nvSpPr>
         <p:spPr/>
         <p:txBody>
-          <a:bodyPr/>
-          <a:lstStyle/>
-          <a:p>
-            <a:pPr marL="0" indent="0">
-              <a:buNone/>
-            </a:pPr>
-            <a:r>
-              <a:rPr lang="en-US" sz="3200" b="1" dirty="0"/>
-              <a:t>Hadoop</a:t>
-            </a:r>
-            <a:endParaRPr lang="en-US" b="1" dirty="0"/>
-          </a:p>
-          <a:p>
-            <a:pPr>
-              <a:buFont typeface="Wingdings" panose="05000000000000000000" pitchFamily="2" charset="2"/>
-              <a:buChar char="v"/>
-            </a:pPr>
-            <a:r>
-              <a:rPr lang="en-US" dirty="0"/>
-              <a:t>Hadoop software library is a framework</a:t>
-            </a:r>
-          </a:p>
-          <a:p>
-            <a:pPr>
-              <a:buFont typeface="Wingdings" panose="05000000000000000000" pitchFamily="2" charset="2"/>
-              <a:buChar char="v"/>
-            </a:pPr>
-            <a:r>
-              <a:rPr lang="en-US" dirty="0"/>
-              <a:t>Help in distributed processing of large data sets across clusters of computers</a:t>
-            </a:r>
-          </a:p>
-          <a:p>
-            <a:pPr>
-              <a:buFont typeface="Wingdings" panose="05000000000000000000" pitchFamily="2" charset="2"/>
-              <a:buChar char="v"/>
-            </a:pPr>
-            <a:r>
-              <a:rPr lang="en-US" dirty="0"/>
-              <a:t>Two method to start single node or cluster mode</a:t>
-            </a:r>
-          </a:p>
-          <a:p>
-            <a:pPr>
-              <a:buFont typeface="Wingdings" panose="05000000000000000000" pitchFamily="2" charset="2"/>
-              <a:buChar char="v"/>
-            </a:pPr>
-            <a:r>
-              <a:rPr lang="en-US" dirty="0"/>
-              <a:t>Latest stable version is 2.9.2 </a:t>
-            </a:r>
-          </a:p>
-          <a:p>
-            <a:pPr>
-              <a:buFont typeface="Wingdings" panose="05000000000000000000" pitchFamily="2" charset="2"/>
-              <a:buChar char="v"/>
-            </a:pPr>
-            <a:r>
-              <a:rPr lang="en-US" dirty="0"/>
-              <a:t>Few Important features are HDFS, YARN,MAPREDUCE, cost efficient, Hadoop libraries and many more</a:t>
-            </a:r>
+          <a:bodyPr>
+            <a:normAutofit/>
+          </a:bodyPr>
+          <a:lstStyle/>
+          <a:p>
+            <a:pPr marL="0" lvl="1" algn="ctr"/>
+            <a:r>
+              <a:rPr lang="en-US" sz="2000" dirty="0" smtClean="0"/>
+              <a:t>PILLARS, SOURCES, </a:t>
+            </a:r>
+            <a:r>
+              <a:rPr lang="en-US" sz="2000" dirty="0"/>
+              <a:t>MODEL,</a:t>
+            </a:r>
+            <a:r>
+              <a:rPr lang="en-US" sz="2000" dirty="0" smtClean="0"/>
+              <a:t> TOOLS</a:t>
+            </a:r>
+            <a:endParaRPr lang="en-US" sz="2000" dirty="0"/>
           </a:p>
         </p:txBody>
       </p:sp>
     </p:spTree>
     <p:extLst>
       <p:ext uri="{BB962C8B-B14F-4D97-AF65-F5344CB8AC3E}">
-        <p14:creationId xmlns:p14="http://schemas.microsoft.com/office/powerpoint/2010/main" val="2845727905"/>
+        <p14:creationId xmlns:p14="http://schemas.microsoft.com/office/powerpoint/2010/main" val="2241138064"/>
       </p:ext>
     </p:extLst>
   </p:cSld>
@@ -5881,7 +5863,13 @@
       </p:grpSpPr>
       <p:sp>
         <p:nvSpPr>
-          <p:cNvPr id="2" name="Title 1"/>
+          <p:cNvPr id="2" name="Title 1">
+            <a:extLst>
+              <a:ext uri="{FF2B5EF4-FFF2-40B4-BE49-F238E27FC236}">
+                <a16:creationId xmlns="" xmlns:a16="http://schemas.microsoft.com/office/drawing/2014/main" id="{F4727C6F-3982-4E54-AA66-B4E0AA33FF66}"/>
+              </a:ext>
+            </a:extLst>
+          </p:cNvPr>
           <p:cNvSpPr>
             <a:spLocks noGrp="1"/>
           </p:cNvSpPr>
@@ -5894,53 +5882,71 @@
           <a:bodyPr/>
           <a:lstStyle/>
           <a:p>
-            <a:pPr algn="ctr"/>
             <a:r>
               <a:rPr lang="en-US" dirty="0" smtClean="0"/>
-              <a:t>DATA</a:t>
-            </a:r>
-            <a:endParaRPr lang="en-US" dirty="0"/>
-          </a:p>
-        </p:txBody>
-      </p:sp>
-      <p:sp>
-        <p:nvSpPr>
-          <p:cNvPr id="3" name="Text Placeholder 2"/>
-          <p:cNvSpPr>
-            <a:spLocks noGrp="1"/>
-          </p:cNvSpPr>
-          <p:nvPr>
-            <p:ph type="body" idx="1"/>
+              <a:t>Big </a:t>
+            </a:r>
+            <a:r>
+              <a:rPr lang="en-US" dirty="0"/>
+              <a:t>Data</a:t>
+            </a:r>
+            <a:endParaRPr lang="x-none" dirty="0"/>
+          </a:p>
+        </p:txBody>
+      </p:sp>
+      <p:sp>
+        <p:nvSpPr>
+          <p:cNvPr id="3" name="Content Placeholder 2">
+            <a:extLst>
+              <a:ext uri="{FF2B5EF4-FFF2-40B4-BE49-F238E27FC236}">
+                <a16:creationId xmlns="" xmlns:a16="http://schemas.microsoft.com/office/drawing/2014/main" id="{1134DAC4-9E94-441C-A9BE-87750F6F60A2}"/>
+              </a:ext>
+            </a:extLst>
+          </p:cNvPr>
+          <p:cNvSpPr>
+            <a:spLocks noGrp="1"/>
+          </p:cNvSpPr>
+          <p:nvPr>
+            <p:ph idx="1"/>
           </p:nvPr>
         </p:nvSpPr>
         <p:spPr/>
         <p:txBody>
-          <a:bodyPr/>
-          <a:lstStyle/>
-          <a:p>
-            <a:pPr marL="0" lvl="1" algn="ctr"/>
-            <a:r>
-              <a:rPr lang="en-US" dirty="0" smtClean="0"/>
-              <a:t>TYPES, </a:t>
-            </a:r>
-            <a:r>
-              <a:rPr lang="en-US" dirty="0"/>
-              <a:t>DATA </a:t>
-            </a:r>
-            <a:r>
-              <a:rPr lang="en-US" dirty="0" smtClean="0"/>
-              <a:t>LAKE, ANALYSIS, ANALYTICS, A vs A, ANALYTICS TOOLS</a:t>
-            </a:r>
-          </a:p>
-          <a:p>
-            <a:endParaRPr lang="en-US" dirty="0"/>
+          <a:bodyPr>
+            <a:normAutofit/>
+          </a:bodyPr>
+          <a:lstStyle/>
+          <a:p>
+            <a:r>
+              <a:rPr lang="en-US" sz="3200" b="1" dirty="0"/>
+              <a:t>DEFINITION </a:t>
+            </a:r>
+          </a:p>
+          <a:p>
+            <a:r>
+              <a:rPr lang="en-US" dirty="0">
+                <a:latin typeface="+mj-lt"/>
+              </a:rPr>
+              <a:t>Extremely large data sets that may be analyzed computationally to reveal patterns, trends, and associations, especially relating to human behavior and interactions.</a:t>
+            </a:r>
+          </a:p>
+          <a:p>
+            <a:r>
+              <a:rPr lang="en-US" dirty="0">
+                <a:latin typeface="+mj-lt"/>
+              </a:rPr>
+              <a:t>Big data is a term that describes the large volume of data – both structured and unstructured – that inundates a business on a day-to-day basis. But it’s not the amount of data that’s important. It’s what organizations do with the data that matters. Big data can be analyzed for insights that lead to better decisions and strategic business moves.</a:t>
+            </a:r>
+          </a:p>
+          <a:p>
+            <a:endParaRPr lang="x-none" dirty="0"/>
           </a:p>
         </p:txBody>
       </p:sp>
     </p:spTree>
     <p:extLst>
       <p:ext uri="{BB962C8B-B14F-4D97-AF65-F5344CB8AC3E}">
-        <p14:creationId xmlns:p14="http://schemas.microsoft.com/office/powerpoint/2010/main" val="4230158867"/>
+        <p14:creationId xmlns:p14="http://schemas.microsoft.com/office/powerpoint/2010/main" val="196455147"/>
       </p:ext>
     </p:extLst>
   </p:cSld>

</xml_diff>

<commit_message>
Added: Data types slide
Added data type slide and content
</commit_message>
<xml_diff>
--- a/Project Interim Submission/Generic DS Framework.pptx
+++ b/Project Interim Submission/Generic DS Framework.pptx
@@ -5,7 +5,7 @@
     <p:sldMasterId id="2147483708" r:id="rId1"/>
   </p:sldMasterIdLst>
   <p:notesMasterIdLst>
-    <p:notesMasterId r:id="rId14"/>
+    <p:notesMasterId r:id="rId15"/>
   </p:notesMasterIdLst>
   <p:sldIdLst>
     <p:sldId id="256" r:id="rId2"/>
@@ -15,11 +15,12 @@
     <p:sldId id="259" r:id="rId6"/>
     <p:sldId id="264" r:id="rId7"/>
     <p:sldId id="267" r:id="rId8"/>
-    <p:sldId id="263" r:id="rId9"/>
-    <p:sldId id="261" r:id="rId10"/>
-    <p:sldId id="262" r:id="rId11"/>
-    <p:sldId id="265" r:id="rId12"/>
-    <p:sldId id="266" r:id="rId13"/>
+    <p:sldId id="268" r:id="rId9"/>
+    <p:sldId id="263" r:id="rId10"/>
+    <p:sldId id="261" r:id="rId11"/>
+    <p:sldId id="262" r:id="rId12"/>
+    <p:sldId id="265" r:id="rId13"/>
+    <p:sldId id="266" r:id="rId14"/>
   </p:sldIdLst>
   <p:sldSz cx="12192000" cy="6858000"/>
   <p:notesSz cx="6858000" cy="9144000"/>
@@ -4325,7 +4326,7 @@
           <p:cNvPr id="2" name="Title 1">
             <a:extLst>
               <a:ext uri="{FF2B5EF4-FFF2-40B4-BE49-F238E27FC236}">
-                <a16:creationId xmlns="" xmlns:a16="http://schemas.microsoft.com/office/drawing/2014/main" id="{3E1AC600-D16C-47B7-9075-94DA61007B25}"/>
+                <a16:creationId xmlns:a16="http://schemas.microsoft.com/office/drawing/2014/main" xmlns="" id="{F4727C6F-3982-4E54-AA66-B4E0AA33FF66}"/>
               </a:ext>
             </a:extLst>
           </p:cNvPr>
@@ -4343,7 +4344,11 @@
           <a:p>
             <a:r>
               <a:rPr lang="en-US" dirty="0" smtClean="0"/>
-              <a:t>Big Data: Tools</a:t>
+              <a:t>Big </a:t>
+            </a:r>
+            <a:r>
+              <a:rPr lang="en-US" dirty="0"/>
+              <a:t>Data</a:t>
             </a:r>
             <a:endParaRPr lang="x-none" dirty="0"/>
           </a:p>
@@ -4354,7 +4359,7 @@
           <p:cNvPr id="3" name="Content Placeholder 2">
             <a:extLst>
               <a:ext uri="{FF2B5EF4-FFF2-40B4-BE49-F238E27FC236}">
-                <a16:creationId xmlns="" xmlns:a16="http://schemas.microsoft.com/office/drawing/2014/main" id="{DDC8679B-3323-4E4B-ABD6-BD8748DF3AEB}"/>
+                <a16:creationId xmlns:a16="http://schemas.microsoft.com/office/drawing/2014/main" xmlns="" id="{1134DAC4-9E94-441C-A9BE-87750F6F60A2}"/>
               </a:ext>
             </a:extLst>
           </p:cNvPr>
@@ -4367,74 +4372,41 @@
         </p:nvSpPr>
         <p:spPr/>
         <p:txBody>
-          <a:bodyPr/>
-          <a:lstStyle/>
-          <a:p>
-            <a:pPr marL="0" indent="0">
-              <a:buNone/>
-            </a:pPr>
+          <a:bodyPr>
+            <a:normAutofit/>
+          </a:bodyPr>
+          <a:lstStyle/>
+          <a:p>
             <a:r>
               <a:rPr lang="en-US" sz="3200" b="1" dirty="0"/>
-              <a:t>Hadoop</a:t>
-            </a:r>
-            <a:endParaRPr lang="en-US" b="1" dirty="0"/>
-          </a:p>
-          <a:p>
-            <a:pPr>
-              <a:buFont typeface="Wingdings" panose="05000000000000000000" pitchFamily="2" charset="2"/>
-              <a:buChar char="v"/>
-            </a:pPr>
-            <a:r>
-              <a:rPr lang="en-US" dirty="0"/>
-              <a:t>Hadoop software library is a framework</a:t>
-            </a:r>
-          </a:p>
-          <a:p>
-            <a:pPr>
-              <a:buFont typeface="Wingdings" panose="05000000000000000000" pitchFamily="2" charset="2"/>
-              <a:buChar char="v"/>
-            </a:pPr>
-            <a:r>
-              <a:rPr lang="en-US" dirty="0"/>
-              <a:t>Help in distributed processing of large data sets across clusters of computers</a:t>
-            </a:r>
-          </a:p>
-          <a:p>
-            <a:pPr>
-              <a:buFont typeface="Wingdings" panose="05000000000000000000" pitchFamily="2" charset="2"/>
-              <a:buChar char="v"/>
-            </a:pPr>
-            <a:r>
-              <a:rPr lang="en-US" dirty="0"/>
-              <a:t>Two method to start single node or cluster mode</a:t>
-            </a:r>
-          </a:p>
-          <a:p>
-            <a:pPr>
-              <a:buFont typeface="Wingdings" panose="05000000000000000000" pitchFamily="2" charset="2"/>
-              <a:buChar char="v"/>
-            </a:pPr>
-            <a:r>
-              <a:rPr lang="en-US" dirty="0"/>
-              <a:t>Latest stable version is 2.9.2 </a:t>
-            </a:r>
-          </a:p>
-          <a:p>
-            <a:pPr>
-              <a:buFont typeface="Wingdings" panose="05000000000000000000" pitchFamily="2" charset="2"/>
-              <a:buChar char="v"/>
-            </a:pPr>
-            <a:r>
-              <a:rPr lang="en-US" dirty="0"/>
-              <a:t>Few Important features are HDFS, YARN,MAPREDUCE, cost efficient, Hadoop libraries and many more</a:t>
-            </a:r>
+              <a:t>DEFINITION </a:t>
+            </a:r>
+          </a:p>
+          <a:p>
+            <a:r>
+              <a:rPr lang="en-US" dirty="0">
+                <a:latin typeface="+mj-lt"/>
+              </a:rPr>
+              <a:t>Extremely large data sets that may be analyzed computationally to reveal patterns, trends, and associations, especially relating to human behavior and interactions.</a:t>
+            </a:r>
+          </a:p>
+          <a:p>
+            <a:r>
+              <a:rPr lang="en-US" dirty="0">
+                <a:latin typeface="+mj-lt"/>
+              </a:rPr>
+              <a:t>Big data is a term that describes the large volume of data – both structured and unstructured – that inundates a business on a day-to-day basis. But it’s not the amount of data that’s important. It’s what organizations do with the data that matters. Big data can be analyzed for insights that lead to better decisions and strategic business moves.</a:t>
+            </a:r>
+          </a:p>
+          <a:p>
+            <a:endParaRPr lang="x-none" dirty="0"/>
           </a:p>
         </p:txBody>
       </p:sp>
     </p:spTree>
     <p:extLst>
       <p:ext uri="{BB962C8B-B14F-4D97-AF65-F5344CB8AC3E}">
-        <p14:creationId xmlns:p14="http://schemas.microsoft.com/office/powerpoint/2010/main" val="2845727905"/>
+        <p14:creationId xmlns:p14="http://schemas.microsoft.com/office/powerpoint/2010/main" val="196455147"/>
       </p:ext>
     </p:extLst>
   </p:cSld>
@@ -4463,6 +4435,147 @@
       </p:grpSpPr>
       <p:sp>
         <p:nvSpPr>
+          <p:cNvPr id="2" name="Title 1">
+            <a:extLst>
+              <a:ext uri="{FF2B5EF4-FFF2-40B4-BE49-F238E27FC236}">
+                <a16:creationId xmlns:a16="http://schemas.microsoft.com/office/drawing/2014/main" xmlns="" id="{3E1AC600-D16C-47B7-9075-94DA61007B25}"/>
+              </a:ext>
+            </a:extLst>
+          </p:cNvPr>
+          <p:cNvSpPr>
+            <a:spLocks noGrp="1"/>
+          </p:cNvSpPr>
+          <p:nvPr>
+            <p:ph type="title"/>
+          </p:nvPr>
+        </p:nvSpPr>
+        <p:spPr/>
+        <p:txBody>
+          <a:bodyPr/>
+          <a:lstStyle/>
+          <a:p>
+            <a:r>
+              <a:rPr lang="en-US" dirty="0" smtClean="0"/>
+              <a:t>Big Data: Tools</a:t>
+            </a:r>
+            <a:endParaRPr lang="x-none" dirty="0"/>
+          </a:p>
+        </p:txBody>
+      </p:sp>
+      <p:sp>
+        <p:nvSpPr>
+          <p:cNvPr id="3" name="Content Placeholder 2">
+            <a:extLst>
+              <a:ext uri="{FF2B5EF4-FFF2-40B4-BE49-F238E27FC236}">
+                <a16:creationId xmlns:a16="http://schemas.microsoft.com/office/drawing/2014/main" xmlns="" id="{DDC8679B-3323-4E4B-ABD6-BD8748DF3AEB}"/>
+              </a:ext>
+            </a:extLst>
+          </p:cNvPr>
+          <p:cNvSpPr>
+            <a:spLocks noGrp="1"/>
+          </p:cNvSpPr>
+          <p:nvPr>
+            <p:ph idx="1"/>
+          </p:nvPr>
+        </p:nvSpPr>
+        <p:spPr/>
+        <p:txBody>
+          <a:bodyPr/>
+          <a:lstStyle/>
+          <a:p>
+            <a:pPr marL="0" indent="0">
+              <a:buNone/>
+            </a:pPr>
+            <a:r>
+              <a:rPr lang="en-US" sz="3200" b="1" dirty="0"/>
+              <a:t>Hadoop</a:t>
+            </a:r>
+            <a:endParaRPr lang="en-US" b="1" dirty="0"/>
+          </a:p>
+          <a:p>
+            <a:pPr>
+              <a:buFont typeface="Wingdings" panose="05000000000000000000" pitchFamily="2" charset="2"/>
+              <a:buChar char="v"/>
+            </a:pPr>
+            <a:r>
+              <a:rPr lang="en-US" dirty="0"/>
+              <a:t>Hadoop software library is a framework</a:t>
+            </a:r>
+          </a:p>
+          <a:p>
+            <a:pPr>
+              <a:buFont typeface="Wingdings" panose="05000000000000000000" pitchFamily="2" charset="2"/>
+              <a:buChar char="v"/>
+            </a:pPr>
+            <a:r>
+              <a:rPr lang="en-US" dirty="0"/>
+              <a:t>Help in distributed processing of large data sets across clusters of computers</a:t>
+            </a:r>
+          </a:p>
+          <a:p>
+            <a:pPr>
+              <a:buFont typeface="Wingdings" panose="05000000000000000000" pitchFamily="2" charset="2"/>
+              <a:buChar char="v"/>
+            </a:pPr>
+            <a:r>
+              <a:rPr lang="en-US" dirty="0"/>
+              <a:t>Two method to start single node or cluster mode</a:t>
+            </a:r>
+          </a:p>
+          <a:p>
+            <a:pPr>
+              <a:buFont typeface="Wingdings" panose="05000000000000000000" pitchFamily="2" charset="2"/>
+              <a:buChar char="v"/>
+            </a:pPr>
+            <a:r>
+              <a:rPr lang="en-US" dirty="0"/>
+              <a:t>Latest stable version is 2.9.2 </a:t>
+            </a:r>
+          </a:p>
+          <a:p>
+            <a:pPr>
+              <a:buFont typeface="Wingdings" panose="05000000000000000000" pitchFamily="2" charset="2"/>
+              <a:buChar char="v"/>
+            </a:pPr>
+            <a:r>
+              <a:rPr lang="en-US" dirty="0"/>
+              <a:t>Few Important features are HDFS, YARN,MAPREDUCE, cost efficient, Hadoop libraries and many more</a:t>
+            </a:r>
+          </a:p>
+        </p:txBody>
+      </p:sp>
+    </p:spTree>
+    <p:extLst>
+      <p:ext uri="{BB962C8B-B14F-4D97-AF65-F5344CB8AC3E}">
+        <p14:creationId xmlns:p14="http://schemas.microsoft.com/office/powerpoint/2010/main" val="2845727905"/>
+      </p:ext>
+    </p:extLst>
+  </p:cSld>
+  <p:clrMapOvr>
+    <a:masterClrMapping/>
+  </p:clrMapOvr>
+</p:sld>
+</file>
+
+<file path=ppt/slides/slide12.xml><?xml version="1.0" encoding="utf-8"?>
+<p:sld xmlns:a="http://schemas.openxmlformats.org/drawingml/2006/main" xmlns:r="http://schemas.openxmlformats.org/officeDocument/2006/relationships" xmlns:p="http://schemas.openxmlformats.org/presentationml/2006/main">
+  <p:cSld>
+    <p:spTree>
+      <p:nvGrpSpPr>
+        <p:cNvPr id="1" name=""/>
+        <p:cNvGrpSpPr/>
+        <p:nvPr/>
+      </p:nvGrpSpPr>
+      <p:grpSpPr>
+        <a:xfrm>
+          <a:off x="0" y="0"/>
+          <a:ext cx="0" cy="0"/>
+          <a:chOff x="0" y="0"/>
+          <a:chExt cx="0" cy="0"/>
+        </a:xfrm>
+      </p:grpSpPr>
+      <p:sp>
+        <p:nvSpPr>
           <p:cNvPr id="2" name="Title 1"/>
           <p:cNvSpPr>
             <a:spLocks noGrp="1"/>
@@ -4522,7 +4635,7 @@
 </p:sld>
 </file>
 
-<file path=ppt/slides/slide12.xml><?xml version="1.0" encoding="utf-8"?>
+<file path=ppt/slides/slide13.xml><?xml version="1.0" encoding="utf-8"?>
 <p:sld xmlns:a="http://schemas.openxmlformats.org/drawingml/2006/main" xmlns:r="http://schemas.openxmlformats.org/officeDocument/2006/relationships" xmlns:p="http://schemas.openxmlformats.org/presentationml/2006/main">
   <p:cSld>
     <p:spTree>
@@ -4787,14 +4900,14 @@
                 <a:gridCol w="5035931">
                   <a:extLst>
                     <a:ext uri="{9D8B030D-6E8A-4147-A177-3AD203B41FA5}">
-                      <a16:colId xmlns="" xmlns:a16="http://schemas.microsoft.com/office/drawing/2014/main" val="20000"/>
+                      <a16:colId xmlns:a16="http://schemas.microsoft.com/office/drawing/2014/main" xmlns="" val="20000"/>
                     </a:ext>
                   </a:extLst>
                 </a:gridCol>
                 <a:gridCol w="5022469">
                   <a:extLst>
                     <a:ext uri="{9D8B030D-6E8A-4147-A177-3AD203B41FA5}">
-                      <a16:colId xmlns="" xmlns:a16="http://schemas.microsoft.com/office/drawing/2014/main" val="20001"/>
+                      <a16:colId xmlns:a16="http://schemas.microsoft.com/office/drawing/2014/main" xmlns="" val="20001"/>
                     </a:ext>
                   </a:extLst>
                 </a:gridCol>
@@ -4874,7 +4987,7 @@
                 </a:tc>
                 <a:extLst>
                   <a:ext uri="{0D108BD9-81ED-4DB2-BD59-A6C34878D82A}">
-                    <a16:rowId xmlns="" xmlns:a16="http://schemas.microsoft.com/office/drawing/2014/main" val="10000"/>
+                    <a16:rowId xmlns:a16="http://schemas.microsoft.com/office/drawing/2014/main" xmlns="" val="10000"/>
                   </a:ext>
                 </a:extLst>
               </a:tr>
@@ -4961,7 +5074,7 @@
                 </a:tc>
                 <a:extLst>
                   <a:ext uri="{0D108BD9-81ED-4DB2-BD59-A6C34878D82A}">
-                    <a16:rowId xmlns="" xmlns:a16="http://schemas.microsoft.com/office/drawing/2014/main" val="10001"/>
+                    <a16:rowId xmlns:a16="http://schemas.microsoft.com/office/drawing/2014/main" xmlns="" val="10001"/>
                   </a:ext>
                 </a:extLst>
               </a:tr>
@@ -5064,7 +5177,7 @@
                 </a:tc>
                 <a:extLst>
                   <a:ext uri="{0D108BD9-81ED-4DB2-BD59-A6C34878D82A}">
-                    <a16:rowId xmlns="" xmlns:a16="http://schemas.microsoft.com/office/drawing/2014/main" val="10002"/>
+                    <a16:rowId xmlns:a16="http://schemas.microsoft.com/office/drawing/2014/main" xmlns="" val="10002"/>
                   </a:ext>
                 </a:extLst>
               </a:tr>
@@ -5248,7 +5361,6 @@
               <a:rPr lang="en-US" dirty="0" smtClean="0"/>
               <a:t>Sources</a:t>
             </a:r>
-            <a:endParaRPr lang="en-US" dirty="0" smtClean="0"/>
           </a:p>
           <a:p>
             <a:pPr lvl="1">
@@ -5273,7 +5385,6 @@
               <a:rPr lang="en-US" dirty="0" smtClean="0"/>
               <a:t> Analytics</a:t>
             </a:r>
-            <a:endParaRPr lang="en-US" dirty="0" smtClean="0"/>
           </a:p>
           <a:p>
             <a:pPr lvl="1">
@@ -5294,7 +5405,6 @@
               <a:rPr lang="en-US" dirty="0" smtClean="0"/>
               <a:t>Algorithms</a:t>
             </a:r>
-            <a:endParaRPr lang="en-US" dirty="0" smtClean="0"/>
           </a:p>
           <a:p>
             <a:pPr lvl="1">
@@ -5387,7 +5497,6 @@
               <a:rPr lang="en-US" dirty="0" smtClean="0"/>
               <a:t> Feature</a:t>
             </a:r>
-            <a:endParaRPr lang="en-US" dirty="0" smtClean="0"/>
           </a:p>
           <a:p>
             <a:pPr lvl="1">
@@ -5406,13 +5515,8 @@
             </a:pPr>
             <a:r>
               <a:rPr lang="en-US" dirty="0" smtClean="0"/>
-              <a:t> New Propose </a:t>
-            </a:r>
-            <a:r>
-              <a:rPr lang="en-US" dirty="0" smtClean="0"/>
-              <a:t>Model</a:t>
-            </a:r>
-            <a:endParaRPr lang="en-US" dirty="0" smtClean="0"/>
+              <a:t> New Propose Model</a:t>
+            </a:r>
           </a:p>
           <a:p>
             <a:pPr>
@@ -5500,15 +5604,7 @@
           <a:p>
             <a:r>
               <a:rPr lang="en-US" sz="2800" dirty="0"/>
-              <a:t>Our objective is to study a wide variety of Tools / Algorithms / Techniques and make a centralized platform </a:t>
-            </a:r>
-            <a:r>
-              <a:rPr lang="en-US" sz="2800"/>
-              <a:t>or Framework </a:t>
-            </a:r>
-            <a:r>
-              <a:rPr lang="en-US" sz="2800" dirty="0"/>
-              <a:t>where different nature of tools are categorized for the ease of use for Data Scientists and this will be helpful for the future enhancement of Data Science.</a:t>
+              <a:t>Our objective is to study a wide variety of Tools / Algorithms / Techniques and make a centralized platform or Framework where different nature of tools are categorized for the ease of use for Data Scientists and this will be helpful for the future enhancement of Data Science.</a:t>
             </a:r>
           </a:p>
         </p:txBody>
@@ -5664,7 +5760,12 @@
             <p:ph idx="1"/>
           </p:nvPr>
         </p:nvSpPr>
-        <p:spPr/>
+        <p:spPr>
+          <a:xfrm>
+            <a:off x="1097280" y="1845734"/>
+            <a:ext cx="10058400" cy="4023360"/>
+          </a:xfrm>
+        </p:spPr>
         <p:txBody>
           <a:bodyPr>
             <a:normAutofit/>
@@ -5724,7 +5825,15 @@
             </a:r>
             <a:r>
               <a:rPr lang="en-US" dirty="0"/>
-              <a:t>can be visualized using graphs, images or other analysis tools.</a:t>
+              <a:t>can be visualized using graphs, images or other </a:t>
+            </a:r>
+            <a:r>
+              <a:rPr lang="en-US" dirty="0" smtClean="0"/>
+              <a:t>analysis tools</a:t>
+            </a:r>
+            <a:r>
+              <a:rPr lang="en-US" dirty="0"/>
+              <a:t>.</a:t>
             </a:r>
             <a:endParaRPr lang="en-US" dirty="0">
               <a:latin typeface="+mj-lt"/>
@@ -5775,7 +5884,7 @@
       </p:grpSpPr>
       <p:sp>
         <p:nvSpPr>
-          <p:cNvPr id="4" name="Title 3"/>
+          <p:cNvPr id="2" name="Title 1"/>
           <p:cNvSpPr>
             <a:spLocks noGrp="1"/>
           </p:cNvSpPr>
@@ -5788,10 +5897,9 @@
           <a:bodyPr/>
           <a:lstStyle/>
           <a:p>
-            <a:pPr algn="ctr"/>
             <a:r>
               <a:rPr lang="en-US" dirty="0" smtClean="0"/>
-              <a:t>BIG DATA</a:t>
+              <a:t>DATA: TYPES</a:t>
             </a:r>
             <a:endParaRPr lang="en-US" dirty="0"/>
           </a:p>
@@ -5799,42 +5907,145 @@
       </p:sp>
       <p:sp>
         <p:nvSpPr>
-          <p:cNvPr id="5" name="Text Placeholder 4"/>
-          <p:cNvSpPr>
-            <a:spLocks noGrp="1"/>
-          </p:cNvSpPr>
-          <p:nvPr>
-            <p:ph type="body" idx="1"/>
+          <p:cNvPr id="3" name="Content Placeholder 2"/>
+          <p:cNvSpPr>
+            <a:spLocks noGrp="1"/>
+          </p:cNvSpPr>
+          <p:nvPr>
+            <p:ph idx="1"/>
           </p:nvPr>
         </p:nvSpPr>
         <p:spPr/>
         <p:txBody>
           <a:bodyPr>
-            <a:normAutofit/>
+            <a:normAutofit fontScale="85000" lnSpcReduction="20000"/>
           </a:bodyPr>
           <a:lstStyle/>
           <a:p>
-            <a:pPr marL="0" lvl="1" algn="ctr"/>
-            <a:r>
-              <a:rPr lang="en-US" sz="2000" dirty="0" smtClean="0"/>
-              <a:t>PILLARS, SOURCES, </a:t>
-            </a:r>
-            <a:r>
-              <a:rPr lang="en-US" sz="2000" dirty="0"/>
-              <a:t>MODEL,</a:t>
-            </a:r>
-            <a:r>
-              <a:rPr lang="en-US" sz="2000" dirty="0" smtClean="0"/>
-              <a:t> TOOLS</a:t>
-            </a:r>
-            <a:endParaRPr lang="en-US" sz="2000" dirty="0"/>
+            <a:pPr>
+              <a:buFont typeface="Wingdings" panose="05000000000000000000" pitchFamily="2" charset="2"/>
+              <a:buChar char="v"/>
+            </a:pPr>
+            <a:r>
+              <a:rPr lang="en-US" dirty="0" smtClean="0"/>
+              <a:t> Observational </a:t>
+            </a:r>
+            <a:endParaRPr lang="en-US" dirty="0"/>
+          </a:p>
+          <a:p>
+            <a:pPr>
+              <a:buFont typeface="Wingdings" panose="05000000000000000000" pitchFamily="2" charset="2"/>
+              <a:buChar char="v"/>
+            </a:pPr>
+            <a:r>
+              <a:rPr lang="en-US" dirty="0" smtClean="0"/>
+              <a:t> Simulation</a:t>
+            </a:r>
+            <a:endParaRPr lang="en-US" dirty="0"/>
+          </a:p>
+          <a:p>
+            <a:pPr>
+              <a:buFont typeface="Wingdings" panose="05000000000000000000" pitchFamily="2" charset="2"/>
+              <a:buChar char="v"/>
+            </a:pPr>
+            <a:r>
+              <a:rPr lang="en-US" dirty="0" smtClean="0"/>
+              <a:t> Experimental</a:t>
+            </a:r>
+            <a:endParaRPr lang="en-US" dirty="0"/>
+          </a:p>
+          <a:p>
+            <a:pPr>
+              <a:buFont typeface="Wingdings" panose="05000000000000000000" pitchFamily="2" charset="2"/>
+              <a:buChar char="v"/>
+            </a:pPr>
+            <a:r>
+              <a:rPr lang="en-US" dirty="0" smtClean="0"/>
+              <a:t> Derived or Compiled</a:t>
+            </a:r>
+            <a:endParaRPr lang="en-US" dirty="0"/>
+          </a:p>
+          <a:p>
+            <a:pPr>
+              <a:buFont typeface="Wingdings" panose="05000000000000000000" pitchFamily="2" charset="2"/>
+              <a:buChar char="v"/>
+            </a:pPr>
+            <a:r>
+              <a:rPr lang="en-US" dirty="0" smtClean="0"/>
+              <a:t> Machine</a:t>
+            </a:r>
+            <a:endParaRPr lang="en-US" dirty="0"/>
+          </a:p>
+          <a:p>
+            <a:pPr>
+              <a:buFont typeface="Wingdings" panose="05000000000000000000" pitchFamily="2" charset="2"/>
+              <a:buChar char="v"/>
+            </a:pPr>
+            <a:r>
+              <a:rPr lang="en-US" dirty="0" smtClean="0"/>
+              <a:t> Time-stamped</a:t>
+            </a:r>
+          </a:p>
+          <a:p>
+            <a:pPr>
+              <a:buFont typeface="Wingdings" panose="05000000000000000000" pitchFamily="2" charset="2"/>
+              <a:buChar char="v"/>
+            </a:pPr>
+            <a:r>
+              <a:rPr lang="en-US" dirty="0" smtClean="0"/>
+              <a:t> Spatiotemporal </a:t>
+            </a:r>
+            <a:endParaRPr lang="en-US" dirty="0"/>
+          </a:p>
+          <a:p>
+            <a:pPr>
+              <a:buFont typeface="Wingdings" panose="05000000000000000000" pitchFamily="2" charset="2"/>
+              <a:buChar char="v"/>
+            </a:pPr>
+            <a:r>
+              <a:rPr lang="en-US" dirty="0" smtClean="0"/>
+              <a:t> Open</a:t>
+            </a:r>
+            <a:endParaRPr lang="en-US" dirty="0"/>
+          </a:p>
+          <a:p>
+            <a:pPr>
+              <a:buFont typeface="Wingdings" panose="05000000000000000000" pitchFamily="2" charset="2"/>
+              <a:buChar char="v"/>
+            </a:pPr>
+            <a:r>
+              <a:rPr lang="en-US" dirty="0" smtClean="0"/>
+              <a:t> Dark </a:t>
+            </a:r>
+          </a:p>
+          <a:p>
+            <a:pPr>
+              <a:buFont typeface="Wingdings" panose="05000000000000000000" pitchFamily="2" charset="2"/>
+              <a:buChar char="v"/>
+            </a:pPr>
+            <a:r>
+              <a:rPr lang="en-US" dirty="0" smtClean="0"/>
+              <a:t> Real time</a:t>
+            </a:r>
+            <a:endParaRPr lang="en-US" dirty="0"/>
+          </a:p>
+          <a:p>
+            <a:pPr>
+              <a:buFont typeface="Wingdings" panose="05000000000000000000" pitchFamily="2" charset="2"/>
+              <a:buChar char="v"/>
+            </a:pPr>
+            <a:r>
+              <a:rPr lang="en-US" dirty="0" smtClean="0"/>
+              <a:t> Operational</a:t>
+            </a:r>
+            <a:endParaRPr lang="en-US" dirty="0"/>
           </a:p>
         </p:txBody>
       </p:sp>
     </p:spTree>
     <p:extLst>
       <p:ext uri="{BB962C8B-B14F-4D97-AF65-F5344CB8AC3E}">
-        <p14:creationId xmlns:p14="http://schemas.microsoft.com/office/powerpoint/2010/main" val="2241138064"/>
+        <p14:creationId xmlns:p14="http://schemas.microsoft.com/office/powerpoint/2010/main" val="3784117501"/>
       </p:ext>
     </p:extLst>
   </p:cSld>
@@ -5863,13 +6074,7 @@
       </p:grpSpPr>
       <p:sp>
         <p:nvSpPr>
-          <p:cNvPr id="2" name="Title 1">
-            <a:extLst>
-              <a:ext uri="{FF2B5EF4-FFF2-40B4-BE49-F238E27FC236}">
-                <a16:creationId xmlns="" xmlns:a16="http://schemas.microsoft.com/office/drawing/2014/main" id="{F4727C6F-3982-4E54-AA66-B4E0AA33FF66}"/>
-              </a:ext>
-            </a:extLst>
-          </p:cNvPr>
+          <p:cNvPr id="4" name="Title 3"/>
           <p:cNvSpPr>
             <a:spLocks noGrp="1"/>
           </p:cNvSpPr>
@@ -5882,32 +6087,23 @@
           <a:bodyPr/>
           <a:lstStyle/>
           <a:p>
+            <a:pPr algn="ctr"/>
             <a:r>
               <a:rPr lang="en-US" dirty="0" smtClean="0"/>
-              <a:t>Big </a:t>
-            </a:r>
-            <a:r>
-              <a:rPr lang="en-US" dirty="0"/>
-              <a:t>Data</a:t>
-            </a:r>
-            <a:endParaRPr lang="x-none" dirty="0"/>
-          </a:p>
-        </p:txBody>
-      </p:sp>
-      <p:sp>
-        <p:nvSpPr>
-          <p:cNvPr id="3" name="Content Placeholder 2">
-            <a:extLst>
-              <a:ext uri="{FF2B5EF4-FFF2-40B4-BE49-F238E27FC236}">
-                <a16:creationId xmlns="" xmlns:a16="http://schemas.microsoft.com/office/drawing/2014/main" id="{1134DAC4-9E94-441C-A9BE-87750F6F60A2}"/>
-              </a:ext>
-            </a:extLst>
-          </p:cNvPr>
-          <p:cNvSpPr>
-            <a:spLocks noGrp="1"/>
-          </p:cNvSpPr>
-          <p:nvPr>
-            <p:ph idx="1"/>
+              <a:t>BIG DATA</a:t>
+            </a:r>
+            <a:endParaRPr lang="en-US" dirty="0"/>
+          </a:p>
+        </p:txBody>
+      </p:sp>
+      <p:sp>
+        <p:nvSpPr>
+          <p:cNvPr id="5" name="Text Placeholder 4"/>
+          <p:cNvSpPr>
+            <a:spLocks noGrp="1"/>
+          </p:cNvSpPr>
+          <p:nvPr>
+            <p:ph type="body" idx="1"/>
           </p:nvPr>
         </p:nvSpPr>
         <p:spPr/>
@@ -5917,36 +6113,27 @@
           </a:bodyPr>
           <a:lstStyle/>
           <a:p>
-            <a:r>
-              <a:rPr lang="en-US" sz="3200" b="1" dirty="0"/>
-              <a:t>DEFINITION </a:t>
-            </a:r>
-          </a:p>
-          <a:p>
-            <a:r>
-              <a:rPr lang="en-US" dirty="0">
-                <a:latin typeface="+mj-lt"/>
-              </a:rPr>
-              <a:t>Extremely large data sets that may be analyzed computationally to reveal patterns, trends, and associations, especially relating to human behavior and interactions.</a:t>
-            </a:r>
-          </a:p>
-          <a:p>
-            <a:r>
-              <a:rPr lang="en-US" dirty="0">
-                <a:latin typeface="+mj-lt"/>
-              </a:rPr>
-              <a:t>Big data is a term that describes the large volume of data – both structured and unstructured – that inundates a business on a day-to-day basis. But it’s not the amount of data that’s important. It’s what organizations do with the data that matters. Big data can be analyzed for insights that lead to better decisions and strategic business moves.</a:t>
-            </a:r>
-          </a:p>
-          <a:p>
-            <a:endParaRPr lang="x-none" dirty="0"/>
+            <a:pPr marL="0" lvl="1" algn="ctr"/>
+            <a:r>
+              <a:rPr lang="en-US" sz="2000" dirty="0" smtClean="0"/>
+              <a:t>PILLARS, SOURCES, </a:t>
+            </a:r>
+            <a:r>
+              <a:rPr lang="en-US" sz="2000" dirty="0"/>
+              <a:t>MODEL,</a:t>
+            </a:r>
+            <a:r>
+              <a:rPr lang="en-US" sz="2000" dirty="0" smtClean="0"/>
+              <a:t> TOOLS</a:t>
+            </a:r>
+            <a:endParaRPr lang="en-US" sz="2000" dirty="0"/>
           </a:p>
         </p:txBody>
       </p:sp>
     </p:spTree>
     <p:extLst>
       <p:ext uri="{BB962C8B-B14F-4D97-AF65-F5344CB8AC3E}">
-        <p14:creationId xmlns:p14="http://schemas.microsoft.com/office/powerpoint/2010/main" val="196455147"/>
+        <p14:creationId xmlns:p14="http://schemas.microsoft.com/office/powerpoint/2010/main" val="2241138064"/>
       </p:ext>
     </p:extLst>
   </p:cSld>

</xml_diff>

<commit_message>
Added Slide: Data Classification
Added new slide: Data Classification
</commit_message>
<xml_diff>
--- a/Project Interim Submission/Generic DS Framework.pptx
+++ b/Project Interim Submission/Generic DS Framework.pptx
@@ -5,7 +5,7 @@
     <p:sldMasterId id="2147483708" r:id="rId1"/>
   </p:sldMasterIdLst>
   <p:notesMasterIdLst>
-    <p:notesMasterId r:id="rId15"/>
+    <p:notesMasterId r:id="rId16"/>
   </p:notesMasterIdLst>
   <p:sldIdLst>
     <p:sldId id="256" r:id="rId2"/>
@@ -16,11 +16,12 @@
     <p:sldId id="264" r:id="rId7"/>
     <p:sldId id="267" r:id="rId8"/>
     <p:sldId id="268" r:id="rId9"/>
-    <p:sldId id="263" r:id="rId10"/>
-    <p:sldId id="261" r:id="rId11"/>
-    <p:sldId id="262" r:id="rId12"/>
-    <p:sldId id="265" r:id="rId13"/>
-    <p:sldId id="266" r:id="rId14"/>
+    <p:sldId id="269" r:id="rId10"/>
+    <p:sldId id="263" r:id="rId11"/>
+    <p:sldId id="261" r:id="rId12"/>
+    <p:sldId id="262" r:id="rId13"/>
+    <p:sldId id="265" r:id="rId14"/>
+    <p:sldId id="266" r:id="rId15"/>
   </p:sldIdLst>
   <p:sldSz cx="12192000" cy="6858000"/>
   <p:notesSz cx="6858000" cy="9144000"/>
@@ -209,7 +210,7 @@
           <a:p>
             <a:fld id="{1BE3ABC5-6C6D-49D2-9FFB-15BACE4436B8}" type="datetimeFigureOut">
               <a:rPr lang="en-US" smtClean="0"/>
-              <a:t>17-Jan-19</a:t>
+              <a:t>18-Jan-19</a:t>
             </a:fld>
             <a:endParaRPr lang="en-US"/>
           </a:p>
@@ -787,7 +788,7 @@
           <a:p>
             <a:fld id="{BE50AB1F-9C50-41A2-BE99-4D3D06C85678}" type="datetimeFigureOut">
               <a:rPr lang="en-US" smtClean="0"/>
-              <a:t>17-Jan-19</a:t>
+              <a:t>18-Jan-19</a:t>
             </a:fld>
             <a:endParaRPr lang="en-US"/>
           </a:p>
@@ -995,7 +996,7 @@
           <a:p>
             <a:fld id="{BE50AB1F-9C50-41A2-BE99-4D3D06C85678}" type="datetimeFigureOut">
               <a:rPr lang="en-US" smtClean="0"/>
-              <a:t>17-Jan-19</a:t>
+              <a:t>18-Jan-19</a:t>
             </a:fld>
             <a:endParaRPr lang="en-US"/>
           </a:p>
@@ -1251,7 +1252,7 @@
           <a:p>
             <a:fld id="{BE50AB1F-9C50-41A2-BE99-4D3D06C85678}" type="datetimeFigureOut">
               <a:rPr lang="en-US" smtClean="0"/>
-              <a:t>17-Jan-19</a:t>
+              <a:t>18-Jan-19</a:t>
             </a:fld>
             <a:endParaRPr lang="en-US"/>
           </a:p>
@@ -1421,7 +1422,7 @@
           <a:p>
             <a:fld id="{BE50AB1F-9C50-41A2-BE99-4D3D06C85678}" type="datetimeFigureOut">
               <a:rPr lang="en-US" smtClean="0"/>
-              <a:t>17-Jan-19</a:t>
+              <a:t>18-Jan-19</a:t>
             </a:fld>
             <a:endParaRPr lang="en-US"/>
           </a:p>
@@ -1764,7 +1765,7 @@
           <a:p>
             <a:fld id="{BE50AB1F-9C50-41A2-BE99-4D3D06C85678}" type="datetimeFigureOut">
               <a:rPr lang="en-US" smtClean="0"/>
-              <a:t>17-Jan-19</a:t>
+              <a:t>18-Jan-19</a:t>
             </a:fld>
             <a:endParaRPr lang="en-US"/>
           </a:p>
@@ -2039,7 +2040,7 @@
           <a:p>
             <a:fld id="{BE50AB1F-9C50-41A2-BE99-4D3D06C85678}" type="datetimeFigureOut">
               <a:rPr lang="en-US" smtClean="0"/>
-              <a:t>17-Jan-19</a:t>
+              <a:t>18-Jan-19</a:t>
             </a:fld>
             <a:endParaRPr lang="en-US"/>
           </a:p>
@@ -2418,7 +2419,7 @@
           <a:p>
             <a:fld id="{BE50AB1F-9C50-41A2-BE99-4D3D06C85678}" type="datetimeFigureOut">
               <a:rPr lang="en-US" smtClean="0"/>
-              <a:t>17-Jan-19</a:t>
+              <a:t>18-Jan-19</a:t>
             </a:fld>
             <a:endParaRPr lang="en-US"/>
           </a:p>
@@ -2536,7 +2537,7 @@
           <a:p>
             <a:fld id="{BE50AB1F-9C50-41A2-BE99-4D3D06C85678}" type="datetimeFigureOut">
               <a:rPr lang="en-US" smtClean="0"/>
-              <a:t>17-Jan-19</a:t>
+              <a:t>18-Jan-19</a:t>
             </a:fld>
             <a:endParaRPr lang="en-US"/>
           </a:p>
@@ -2707,7 +2708,7 @@
           <a:p>
             <a:fld id="{BE50AB1F-9C50-41A2-BE99-4D3D06C85678}" type="datetimeFigureOut">
               <a:rPr lang="en-US" smtClean="0"/>
-              <a:t>17-Jan-19</a:t>
+              <a:t>18-Jan-19</a:t>
             </a:fld>
             <a:endParaRPr lang="en-US"/>
           </a:p>
@@ -3061,7 +3062,7 @@
           <a:p>
             <a:fld id="{BE50AB1F-9C50-41A2-BE99-4D3D06C85678}" type="datetimeFigureOut">
               <a:rPr lang="en-US" smtClean="0"/>
-              <a:t>17-Jan-19</a:t>
+              <a:t>18-Jan-19</a:t>
             </a:fld>
             <a:endParaRPr lang="en-US"/>
           </a:p>
@@ -3438,7 +3439,7 @@
           <a:p>
             <a:fld id="{BE50AB1F-9C50-41A2-BE99-4D3D06C85678}" type="datetimeFigureOut">
               <a:rPr lang="en-US" smtClean="0"/>
-              <a:t>17-Jan-19</a:t>
+              <a:t>18-Jan-19</a:t>
             </a:fld>
             <a:endParaRPr lang="en-US"/>
           </a:p>
@@ -3725,7 +3726,7 @@
           <a:p>
             <a:fld id="{BE50AB1F-9C50-41A2-BE99-4D3D06C85678}" type="datetimeFigureOut">
               <a:rPr lang="en-US" smtClean="0"/>
-              <a:t>17-Jan-19</a:t>
+              <a:t>18-Jan-19</a:t>
             </a:fld>
             <a:endParaRPr lang="en-US"/>
           </a:p>
@@ -4323,13 +4324,7 @@
       </p:grpSpPr>
       <p:sp>
         <p:nvSpPr>
-          <p:cNvPr id="2" name="Title 1">
-            <a:extLst>
-              <a:ext uri="{FF2B5EF4-FFF2-40B4-BE49-F238E27FC236}">
-                <a16:creationId xmlns:a16="http://schemas.microsoft.com/office/drawing/2014/main" xmlns="" id="{F4727C6F-3982-4E54-AA66-B4E0AA33FF66}"/>
-              </a:ext>
-            </a:extLst>
-          </p:cNvPr>
+          <p:cNvPr id="4" name="Title 3"/>
           <p:cNvSpPr>
             <a:spLocks noGrp="1"/>
           </p:cNvSpPr>
@@ -4342,32 +4337,23 @@
           <a:bodyPr/>
           <a:lstStyle/>
           <a:p>
+            <a:pPr algn="ctr"/>
             <a:r>
               <a:rPr lang="en-US" dirty="0" smtClean="0"/>
-              <a:t>Big </a:t>
-            </a:r>
-            <a:r>
-              <a:rPr lang="en-US" dirty="0"/>
-              <a:t>Data</a:t>
-            </a:r>
-            <a:endParaRPr lang="x-none" dirty="0"/>
-          </a:p>
-        </p:txBody>
-      </p:sp>
-      <p:sp>
-        <p:nvSpPr>
-          <p:cNvPr id="3" name="Content Placeholder 2">
-            <a:extLst>
-              <a:ext uri="{FF2B5EF4-FFF2-40B4-BE49-F238E27FC236}">
-                <a16:creationId xmlns:a16="http://schemas.microsoft.com/office/drawing/2014/main" xmlns="" id="{1134DAC4-9E94-441C-A9BE-87750F6F60A2}"/>
-              </a:ext>
-            </a:extLst>
-          </p:cNvPr>
-          <p:cNvSpPr>
-            <a:spLocks noGrp="1"/>
-          </p:cNvSpPr>
-          <p:nvPr>
-            <p:ph idx="1"/>
+              <a:t>BIG DATA</a:t>
+            </a:r>
+            <a:endParaRPr lang="en-US" dirty="0"/>
+          </a:p>
+        </p:txBody>
+      </p:sp>
+      <p:sp>
+        <p:nvSpPr>
+          <p:cNvPr id="5" name="Text Placeholder 4"/>
+          <p:cNvSpPr>
+            <a:spLocks noGrp="1"/>
+          </p:cNvSpPr>
+          <p:nvPr>
+            <p:ph type="body" idx="1"/>
           </p:nvPr>
         </p:nvSpPr>
         <p:spPr/>
@@ -4377,36 +4363,27 @@
           </a:bodyPr>
           <a:lstStyle/>
           <a:p>
-            <a:r>
-              <a:rPr lang="en-US" sz="3200" b="1" dirty="0"/>
-              <a:t>DEFINITION </a:t>
-            </a:r>
-          </a:p>
-          <a:p>
-            <a:r>
-              <a:rPr lang="en-US" dirty="0">
-                <a:latin typeface="+mj-lt"/>
-              </a:rPr>
-              <a:t>Extremely large data sets that may be analyzed computationally to reveal patterns, trends, and associations, especially relating to human behavior and interactions.</a:t>
-            </a:r>
-          </a:p>
-          <a:p>
-            <a:r>
-              <a:rPr lang="en-US" dirty="0">
-                <a:latin typeface="+mj-lt"/>
-              </a:rPr>
-              <a:t>Big data is a term that describes the large volume of data – both structured and unstructured – that inundates a business on a day-to-day basis. But it’s not the amount of data that’s important. It’s what organizations do with the data that matters. Big data can be analyzed for insights that lead to better decisions and strategic business moves.</a:t>
-            </a:r>
-          </a:p>
-          <a:p>
-            <a:endParaRPr lang="x-none" dirty="0"/>
+            <a:pPr marL="0" lvl="1" algn="ctr"/>
+            <a:r>
+              <a:rPr lang="en-US" sz="2000" dirty="0" smtClean="0"/>
+              <a:t>PILLARS, SOURCES, </a:t>
+            </a:r>
+            <a:r>
+              <a:rPr lang="en-US" sz="2000" dirty="0"/>
+              <a:t>MODEL,</a:t>
+            </a:r>
+            <a:r>
+              <a:rPr lang="en-US" sz="2000" dirty="0" smtClean="0"/>
+              <a:t> TOOLS</a:t>
+            </a:r>
+            <a:endParaRPr lang="en-US" sz="2000" dirty="0"/>
           </a:p>
         </p:txBody>
       </p:sp>
     </p:spTree>
     <p:extLst>
       <p:ext uri="{BB962C8B-B14F-4D97-AF65-F5344CB8AC3E}">
-        <p14:creationId xmlns:p14="http://schemas.microsoft.com/office/powerpoint/2010/main" val="196455147"/>
+        <p14:creationId xmlns:p14="http://schemas.microsoft.com/office/powerpoint/2010/main" val="2241138064"/>
       </p:ext>
     </p:extLst>
   </p:cSld>
@@ -4438,7 +4415,7 @@
           <p:cNvPr id="2" name="Title 1">
             <a:extLst>
               <a:ext uri="{FF2B5EF4-FFF2-40B4-BE49-F238E27FC236}">
-                <a16:creationId xmlns:a16="http://schemas.microsoft.com/office/drawing/2014/main" xmlns="" id="{3E1AC600-D16C-47B7-9075-94DA61007B25}"/>
+                <a16:creationId xmlns="" xmlns:a16="http://schemas.microsoft.com/office/drawing/2014/main" id="{F4727C6F-3982-4E54-AA66-B4E0AA33FF66}"/>
               </a:ext>
             </a:extLst>
           </p:cNvPr>
@@ -4456,7 +4433,11 @@
           <a:p>
             <a:r>
               <a:rPr lang="en-US" dirty="0" smtClean="0"/>
-              <a:t>Big Data: Tools</a:t>
+              <a:t>Big </a:t>
+            </a:r>
+            <a:r>
+              <a:rPr lang="en-US" dirty="0"/>
+              <a:t>Data</a:t>
             </a:r>
             <a:endParaRPr lang="x-none" dirty="0"/>
           </a:p>
@@ -4467,7 +4448,7 @@
           <p:cNvPr id="3" name="Content Placeholder 2">
             <a:extLst>
               <a:ext uri="{FF2B5EF4-FFF2-40B4-BE49-F238E27FC236}">
-                <a16:creationId xmlns:a16="http://schemas.microsoft.com/office/drawing/2014/main" xmlns="" id="{DDC8679B-3323-4E4B-ABD6-BD8748DF3AEB}"/>
+                <a16:creationId xmlns="" xmlns:a16="http://schemas.microsoft.com/office/drawing/2014/main" id="{1134DAC4-9E94-441C-A9BE-87750F6F60A2}"/>
               </a:ext>
             </a:extLst>
           </p:cNvPr>
@@ -4480,74 +4461,41 @@
         </p:nvSpPr>
         <p:spPr/>
         <p:txBody>
-          <a:bodyPr/>
-          <a:lstStyle/>
-          <a:p>
-            <a:pPr marL="0" indent="0">
-              <a:buNone/>
-            </a:pPr>
+          <a:bodyPr>
+            <a:normAutofit/>
+          </a:bodyPr>
+          <a:lstStyle/>
+          <a:p>
             <a:r>
               <a:rPr lang="en-US" sz="3200" b="1" dirty="0"/>
-              <a:t>Hadoop</a:t>
-            </a:r>
-            <a:endParaRPr lang="en-US" b="1" dirty="0"/>
-          </a:p>
-          <a:p>
-            <a:pPr>
-              <a:buFont typeface="Wingdings" panose="05000000000000000000" pitchFamily="2" charset="2"/>
-              <a:buChar char="v"/>
-            </a:pPr>
-            <a:r>
-              <a:rPr lang="en-US" dirty="0"/>
-              <a:t>Hadoop software library is a framework</a:t>
-            </a:r>
-          </a:p>
-          <a:p>
-            <a:pPr>
-              <a:buFont typeface="Wingdings" panose="05000000000000000000" pitchFamily="2" charset="2"/>
-              <a:buChar char="v"/>
-            </a:pPr>
-            <a:r>
-              <a:rPr lang="en-US" dirty="0"/>
-              <a:t>Help in distributed processing of large data sets across clusters of computers</a:t>
-            </a:r>
-          </a:p>
-          <a:p>
-            <a:pPr>
-              <a:buFont typeface="Wingdings" panose="05000000000000000000" pitchFamily="2" charset="2"/>
-              <a:buChar char="v"/>
-            </a:pPr>
-            <a:r>
-              <a:rPr lang="en-US" dirty="0"/>
-              <a:t>Two method to start single node or cluster mode</a:t>
-            </a:r>
-          </a:p>
-          <a:p>
-            <a:pPr>
-              <a:buFont typeface="Wingdings" panose="05000000000000000000" pitchFamily="2" charset="2"/>
-              <a:buChar char="v"/>
-            </a:pPr>
-            <a:r>
-              <a:rPr lang="en-US" dirty="0"/>
-              <a:t>Latest stable version is 2.9.2 </a:t>
-            </a:r>
-          </a:p>
-          <a:p>
-            <a:pPr>
-              <a:buFont typeface="Wingdings" panose="05000000000000000000" pitchFamily="2" charset="2"/>
-              <a:buChar char="v"/>
-            </a:pPr>
-            <a:r>
-              <a:rPr lang="en-US" dirty="0"/>
-              <a:t>Few Important features are HDFS, YARN,MAPREDUCE, cost efficient, Hadoop libraries and many more</a:t>
-            </a:r>
+              <a:t>DEFINITION </a:t>
+            </a:r>
+          </a:p>
+          <a:p>
+            <a:r>
+              <a:rPr lang="en-US" dirty="0">
+                <a:latin typeface="+mj-lt"/>
+              </a:rPr>
+              <a:t>Extremely large data sets that may be analyzed computationally to reveal patterns, trends, and associations, especially relating to human behavior and interactions.</a:t>
+            </a:r>
+          </a:p>
+          <a:p>
+            <a:r>
+              <a:rPr lang="en-US" dirty="0">
+                <a:latin typeface="+mj-lt"/>
+              </a:rPr>
+              <a:t>Big data is a term that describes the large volume of data – both structured and unstructured – that inundates a business on a day-to-day basis. But it’s not the amount of data that’s important. It’s what organizations do with the data that matters. Big data can be analyzed for insights that lead to better decisions and strategic business moves.</a:t>
+            </a:r>
+          </a:p>
+          <a:p>
+            <a:endParaRPr lang="x-none" dirty="0"/>
           </a:p>
         </p:txBody>
       </p:sp>
     </p:spTree>
     <p:extLst>
       <p:ext uri="{BB962C8B-B14F-4D97-AF65-F5344CB8AC3E}">
-        <p14:creationId xmlns:p14="http://schemas.microsoft.com/office/powerpoint/2010/main" val="2845727905"/>
+        <p14:creationId xmlns:p14="http://schemas.microsoft.com/office/powerpoint/2010/main" val="196455147"/>
       </p:ext>
     </p:extLst>
   </p:cSld>
@@ -4576,6 +4524,147 @@
       </p:grpSpPr>
       <p:sp>
         <p:nvSpPr>
+          <p:cNvPr id="2" name="Title 1">
+            <a:extLst>
+              <a:ext uri="{FF2B5EF4-FFF2-40B4-BE49-F238E27FC236}">
+                <a16:creationId xmlns="" xmlns:a16="http://schemas.microsoft.com/office/drawing/2014/main" id="{3E1AC600-D16C-47B7-9075-94DA61007B25}"/>
+              </a:ext>
+            </a:extLst>
+          </p:cNvPr>
+          <p:cNvSpPr>
+            <a:spLocks noGrp="1"/>
+          </p:cNvSpPr>
+          <p:nvPr>
+            <p:ph type="title"/>
+          </p:nvPr>
+        </p:nvSpPr>
+        <p:spPr/>
+        <p:txBody>
+          <a:bodyPr/>
+          <a:lstStyle/>
+          <a:p>
+            <a:r>
+              <a:rPr lang="en-US" dirty="0" smtClean="0"/>
+              <a:t>Big Data: Tools</a:t>
+            </a:r>
+            <a:endParaRPr lang="x-none" dirty="0"/>
+          </a:p>
+        </p:txBody>
+      </p:sp>
+      <p:sp>
+        <p:nvSpPr>
+          <p:cNvPr id="3" name="Content Placeholder 2">
+            <a:extLst>
+              <a:ext uri="{FF2B5EF4-FFF2-40B4-BE49-F238E27FC236}">
+                <a16:creationId xmlns="" xmlns:a16="http://schemas.microsoft.com/office/drawing/2014/main" id="{DDC8679B-3323-4E4B-ABD6-BD8748DF3AEB}"/>
+              </a:ext>
+            </a:extLst>
+          </p:cNvPr>
+          <p:cNvSpPr>
+            <a:spLocks noGrp="1"/>
+          </p:cNvSpPr>
+          <p:nvPr>
+            <p:ph idx="1"/>
+          </p:nvPr>
+        </p:nvSpPr>
+        <p:spPr/>
+        <p:txBody>
+          <a:bodyPr/>
+          <a:lstStyle/>
+          <a:p>
+            <a:pPr marL="0" indent="0">
+              <a:buNone/>
+            </a:pPr>
+            <a:r>
+              <a:rPr lang="en-US" sz="3200" b="1" dirty="0"/>
+              <a:t>Hadoop</a:t>
+            </a:r>
+            <a:endParaRPr lang="en-US" b="1" dirty="0"/>
+          </a:p>
+          <a:p>
+            <a:pPr>
+              <a:buFont typeface="Wingdings" panose="05000000000000000000" pitchFamily="2" charset="2"/>
+              <a:buChar char="v"/>
+            </a:pPr>
+            <a:r>
+              <a:rPr lang="en-US" dirty="0"/>
+              <a:t>Hadoop software library is a framework</a:t>
+            </a:r>
+          </a:p>
+          <a:p>
+            <a:pPr>
+              <a:buFont typeface="Wingdings" panose="05000000000000000000" pitchFamily="2" charset="2"/>
+              <a:buChar char="v"/>
+            </a:pPr>
+            <a:r>
+              <a:rPr lang="en-US" dirty="0"/>
+              <a:t>Help in distributed processing of large data sets across clusters of computers</a:t>
+            </a:r>
+          </a:p>
+          <a:p>
+            <a:pPr>
+              <a:buFont typeface="Wingdings" panose="05000000000000000000" pitchFamily="2" charset="2"/>
+              <a:buChar char="v"/>
+            </a:pPr>
+            <a:r>
+              <a:rPr lang="en-US" dirty="0"/>
+              <a:t>Two method to start single node or cluster mode</a:t>
+            </a:r>
+          </a:p>
+          <a:p>
+            <a:pPr>
+              <a:buFont typeface="Wingdings" panose="05000000000000000000" pitchFamily="2" charset="2"/>
+              <a:buChar char="v"/>
+            </a:pPr>
+            <a:r>
+              <a:rPr lang="en-US" dirty="0"/>
+              <a:t>Latest stable version is 2.9.2 </a:t>
+            </a:r>
+          </a:p>
+          <a:p>
+            <a:pPr>
+              <a:buFont typeface="Wingdings" panose="05000000000000000000" pitchFamily="2" charset="2"/>
+              <a:buChar char="v"/>
+            </a:pPr>
+            <a:r>
+              <a:rPr lang="en-US" dirty="0"/>
+              <a:t>Few Important features are HDFS, YARN,MAPREDUCE, cost efficient, Hadoop libraries and many more</a:t>
+            </a:r>
+          </a:p>
+        </p:txBody>
+      </p:sp>
+    </p:spTree>
+    <p:extLst>
+      <p:ext uri="{BB962C8B-B14F-4D97-AF65-F5344CB8AC3E}">
+        <p14:creationId xmlns:p14="http://schemas.microsoft.com/office/powerpoint/2010/main" val="2845727905"/>
+      </p:ext>
+    </p:extLst>
+  </p:cSld>
+  <p:clrMapOvr>
+    <a:masterClrMapping/>
+  </p:clrMapOvr>
+</p:sld>
+</file>
+
+<file path=ppt/slides/slide13.xml><?xml version="1.0" encoding="utf-8"?>
+<p:sld xmlns:a="http://schemas.openxmlformats.org/drawingml/2006/main" xmlns:r="http://schemas.openxmlformats.org/officeDocument/2006/relationships" xmlns:p="http://schemas.openxmlformats.org/presentationml/2006/main">
+  <p:cSld>
+    <p:spTree>
+      <p:nvGrpSpPr>
+        <p:cNvPr id="1" name=""/>
+        <p:cNvGrpSpPr/>
+        <p:nvPr/>
+      </p:nvGrpSpPr>
+      <p:grpSpPr>
+        <a:xfrm>
+          <a:off x="0" y="0"/>
+          <a:ext cx="0" cy="0"/>
+          <a:chOff x="0" y="0"/>
+          <a:chExt cx="0" cy="0"/>
+        </a:xfrm>
+      </p:grpSpPr>
+      <p:sp>
+        <p:nvSpPr>
           <p:cNvPr id="2" name="Title 1"/>
           <p:cNvSpPr>
             <a:spLocks noGrp="1"/>
@@ -4635,7 +4724,7 @@
 </p:sld>
 </file>
 
-<file path=ppt/slides/slide13.xml><?xml version="1.0" encoding="utf-8"?>
+<file path=ppt/slides/slide14.xml><?xml version="1.0" encoding="utf-8"?>
 <p:sld xmlns:a="http://schemas.openxmlformats.org/drawingml/2006/main" xmlns:r="http://schemas.openxmlformats.org/officeDocument/2006/relationships" xmlns:p="http://schemas.openxmlformats.org/presentationml/2006/main">
   <p:cSld>
     <p:spTree>
@@ -4900,14 +4989,14 @@
                 <a:gridCol w="5035931">
                   <a:extLst>
                     <a:ext uri="{9D8B030D-6E8A-4147-A177-3AD203B41FA5}">
-                      <a16:colId xmlns:a16="http://schemas.microsoft.com/office/drawing/2014/main" xmlns="" val="20000"/>
+                      <a16:colId xmlns="" xmlns:a16="http://schemas.microsoft.com/office/drawing/2014/main" val="20000"/>
                     </a:ext>
                   </a:extLst>
                 </a:gridCol>
                 <a:gridCol w="5022469">
                   <a:extLst>
                     <a:ext uri="{9D8B030D-6E8A-4147-A177-3AD203B41FA5}">
-                      <a16:colId xmlns:a16="http://schemas.microsoft.com/office/drawing/2014/main" xmlns="" val="20001"/>
+                      <a16:colId xmlns="" xmlns:a16="http://schemas.microsoft.com/office/drawing/2014/main" val="20001"/>
                     </a:ext>
                   </a:extLst>
                 </a:gridCol>
@@ -4987,7 +5076,7 @@
                 </a:tc>
                 <a:extLst>
                   <a:ext uri="{0D108BD9-81ED-4DB2-BD59-A6C34878D82A}">
-                    <a16:rowId xmlns:a16="http://schemas.microsoft.com/office/drawing/2014/main" xmlns="" val="10000"/>
+                    <a16:rowId xmlns="" xmlns:a16="http://schemas.microsoft.com/office/drawing/2014/main" val="10000"/>
                   </a:ext>
                 </a:extLst>
               </a:tr>
@@ -5074,7 +5163,7 @@
                 </a:tc>
                 <a:extLst>
                   <a:ext uri="{0D108BD9-81ED-4DB2-BD59-A6C34878D82A}">
-                    <a16:rowId xmlns:a16="http://schemas.microsoft.com/office/drawing/2014/main" xmlns="" val="10001"/>
+                    <a16:rowId xmlns="" xmlns:a16="http://schemas.microsoft.com/office/drawing/2014/main" val="10001"/>
                   </a:ext>
                 </a:extLst>
               </a:tr>
@@ -5177,7 +5266,7 @@
                 </a:tc>
                 <a:extLst>
                   <a:ext uri="{0D108BD9-81ED-4DB2-BD59-A6C34878D82A}">
-                    <a16:rowId xmlns:a16="http://schemas.microsoft.com/office/drawing/2014/main" xmlns="" val="10002"/>
+                    <a16:rowId xmlns="" xmlns:a16="http://schemas.microsoft.com/office/drawing/2014/main" val="10002"/>
                   </a:ext>
                 </a:extLst>
               </a:tr>
@@ -5912,7 +6001,7 @@
             <a:spLocks noGrp="1"/>
           </p:cNvSpPr>
           <p:nvPr>
-            <p:ph idx="1"/>
+            <p:ph sz="half" idx="1"/>
           </p:nvPr>
         </p:nvSpPr>
         <p:spPr/>
@@ -6039,6 +6128,25 @@
               <a:t> Operational</a:t>
             </a:r>
             <a:endParaRPr lang="en-US" dirty="0"/>
+          </a:p>
+        </p:txBody>
+      </p:sp>
+      <p:sp>
+        <p:nvSpPr>
+          <p:cNvPr id="4" name="Content Placeholder 3"/>
+          <p:cNvSpPr>
+            <a:spLocks noGrp="1"/>
+          </p:cNvSpPr>
+          <p:nvPr>
+            <p:ph sz="half" idx="2"/>
+          </p:nvPr>
+        </p:nvSpPr>
+        <p:spPr/>
+        <p:txBody>
+          <a:bodyPr/>
+          <a:lstStyle/>
+          <a:p>
+            <a:endParaRPr lang="en-US"/>
           </a:p>
         </p:txBody>
       </p:sp>
@@ -6074,7 +6182,7 @@
       </p:grpSpPr>
       <p:sp>
         <p:nvSpPr>
-          <p:cNvPr id="4" name="Title 3"/>
+          <p:cNvPr id="2" name="Title 1"/>
           <p:cNvSpPr>
             <a:spLocks noGrp="1"/>
           </p:cNvSpPr>
@@ -6087,10 +6195,9 @@
           <a:bodyPr/>
           <a:lstStyle/>
           <a:p>
-            <a:pPr algn="ctr"/>
             <a:r>
               <a:rPr lang="en-US" dirty="0" smtClean="0"/>
-              <a:t>BIG DATA</a:t>
+              <a:t>DATA: CLASSIFICATION</a:t>
             </a:r>
             <a:endParaRPr lang="en-US" dirty="0"/>
           </a:p>
@@ -6098,42 +6205,132 @@
       </p:sp>
       <p:sp>
         <p:nvSpPr>
-          <p:cNvPr id="5" name="Text Placeholder 4"/>
-          <p:cNvSpPr>
-            <a:spLocks noGrp="1"/>
-          </p:cNvSpPr>
-          <p:nvPr>
-            <p:ph type="body" idx="1"/>
+          <p:cNvPr id="3" name="Content Placeholder 2"/>
+          <p:cNvSpPr>
+            <a:spLocks noGrp="1"/>
+          </p:cNvSpPr>
+          <p:nvPr>
+            <p:ph sz="half" idx="1"/>
           </p:nvPr>
         </p:nvSpPr>
         <p:spPr/>
         <p:txBody>
           <a:bodyPr>
-            <a:normAutofit/>
+            <a:normAutofit lnSpcReduction="10000"/>
           </a:bodyPr>
           <a:lstStyle/>
           <a:p>
-            <a:pPr marL="0" lvl="1" algn="ctr"/>
-            <a:r>
-              <a:rPr lang="en-US" sz="2000" dirty="0" smtClean="0"/>
-              <a:t>PILLARS, SOURCES, </a:t>
-            </a:r>
-            <a:r>
-              <a:rPr lang="en-US" sz="2000" dirty="0"/>
-              <a:t>MODEL,</a:t>
-            </a:r>
-            <a:r>
-              <a:rPr lang="en-US" sz="2000" dirty="0" smtClean="0"/>
-              <a:t> TOOLS</a:t>
-            </a:r>
-            <a:endParaRPr lang="en-US" sz="2000" dirty="0"/>
+            <a:r>
+              <a:rPr lang="en-US" sz="3200" b="1" dirty="0"/>
+              <a:t>First Level</a:t>
+            </a:r>
+          </a:p>
+          <a:p>
+            <a:pPr>
+              <a:buFont typeface="Wingdings" panose="05000000000000000000" pitchFamily="2" charset="2"/>
+              <a:buChar char="v"/>
+            </a:pPr>
+            <a:r>
+              <a:rPr lang="en-US" dirty="0" smtClean="0"/>
+              <a:t> Structured</a:t>
+            </a:r>
+          </a:p>
+          <a:p>
+            <a:pPr>
+              <a:buFont typeface="Wingdings" panose="05000000000000000000" pitchFamily="2" charset="2"/>
+              <a:buChar char="v"/>
+            </a:pPr>
+            <a:r>
+              <a:rPr lang="en-US" dirty="0" smtClean="0"/>
+              <a:t> Semi-structured</a:t>
+            </a:r>
+          </a:p>
+          <a:p>
+            <a:pPr>
+              <a:buFont typeface="Wingdings" panose="05000000000000000000" pitchFamily="2" charset="2"/>
+              <a:buChar char="v"/>
+            </a:pPr>
+            <a:r>
+              <a:rPr lang="en-US" dirty="0" smtClean="0"/>
+              <a:t> Unstructured</a:t>
+            </a:r>
+          </a:p>
+          <a:p>
+            <a:r>
+              <a:rPr lang="en-US" sz="3200" b="1" dirty="0"/>
+              <a:t>Second Level</a:t>
+            </a:r>
+          </a:p>
+          <a:p>
+            <a:pPr>
+              <a:buFont typeface="Wingdings" panose="05000000000000000000" pitchFamily="2" charset="2"/>
+              <a:buChar char="v"/>
+            </a:pPr>
+            <a:r>
+              <a:rPr lang="en-US" dirty="0" smtClean="0"/>
+              <a:t> Qualitative</a:t>
+            </a:r>
+            <a:r>
+              <a:rPr lang="en-US" dirty="0"/>
+              <a:t>   </a:t>
+            </a:r>
+            <a:endParaRPr lang="en-US" dirty="0" smtClean="0"/>
+          </a:p>
+          <a:p>
+            <a:pPr>
+              <a:buFont typeface="Wingdings" panose="05000000000000000000" pitchFamily="2" charset="2"/>
+              <a:buChar char="v"/>
+            </a:pPr>
+            <a:r>
+              <a:rPr lang="en-US" dirty="0" smtClean="0"/>
+              <a:t> Quantitative</a:t>
+            </a:r>
+          </a:p>
+          <a:p>
+            <a:pPr>
+              <a:buFont typeface="Wingdings" panose="05000000000000000000" pitchFamily="2" charset="2"/>
+              <a:buChar char="v"/>
+            </a:pPr>
+            <a:r>
+              <a:rPr lang="en-US" dirty="0" smtClean="0"/>
+              <a:t> Geographical Base</a:t>
+            </a:r>
+          </a:p>
+          <a:p>
+            <a:pPr>
+              <a:buFont typeface="Wingdings" panose="05000000000000000000" pitchFamily="2" charset="2"/>
+              <a:buChar char="v"/>
+            </a:pPr>
+            <a:r>
+              <a:rPr lang="en-US" dirty="0" smtClean="0"/>
+              <a:t> Chronological or Temporal</a:t>
+            </a:r>
+          </a:p>
+        </p:txBody>
+      </p:sp>
+      <p:sp>
+        <p:nvSpPr>
+          <p:cNvPr id="4" name="Content Placeholder 3"/>
+          <p:cNvSpPr>
+            <a:spLocks noGrp="1"/>
+          </p:cNvSpPr>
+          <p:nvPr>
+            <p:ph sz="half" idx="2"/>
+          </p:nvPr>
+        </p:nvSpPr>
+        <p:spPr/>
+        <p:txBody>
+          <a:bodyPr/>
+          <a:lstStyle/>
+          <a:p>
+            <a:endParaRPr lang="en-US"/>
           </a:p>
         </p:txBody>
       </p:sp>
     </p:spTree>
     <p:extLst>
       <p:ext uri="{BB962C8B-B14F-4D97-AF65-F5344CB8AC3E}">
-        <p14:creationId xmlns:p14="http://schemas.microsoft.com/office/powerpoint/2010/main" val="2241138064"/>
+        <p14:creationId xmlns:p14="http://schemas.microsoft.com/office/powerpoint/2010/main" val="2169991389"/>
       </p:ext>
     </p:extLst>
   </p:cSld>

</xml_diff>

<commit_message>
Added content to Data Type slide
Added: content to Data Type slide Added: Data Umbrella Picture to the slide
</commit_message>
<xml_diff>
--- a/Project Interim Submission/Generic DS Framework.pptx
+++ b/Project Interim Submission/Generic DS Framework.pptx
@@ -4415,7 +4415,7 @@
           <p:cNvPr id="2" name="Title 1">
             <a:extLst>
               <a:ext uri="{FF2B5EF4-FFF2-40B4-BE49-F238E27FC236}">
-                <a16:creationId xmlns="" xmlns:a16="http://schemas.microsoft.com/office/drawing/2014/main" id="{F4727C6F-3982-4E54-AA66-B4E0AA33FF66}"/>
+                <a16:creationId xmlns:a16="http://schemas.microsoft.com/office/drawing/2014/main" xmlns="" id="{F4727C6F-3982-4E54-AA66-B4E0AA33FF66}"/>
               </a:ext>
             </a:extLst>
           </p:cNvPr>
@@ -4448,7 +4448,7 @@
           <p:cNvPr id="3" name="Content Placeholder 2">
             <a:extLst>
               <a:ext uri="{FF2B5EF4-FFF2-40B4-BE49-F238E27FC236}">
-                <a16:creationId xmlns="" xmlns:a16="http://schemas.microsoft.com/office/drawing/2014/main" id="{1134DAC4-9E94-441C-A9BE-87750F6F60A2}"/>
+                <a16:creationId xmlns:a16="http://schemas.microsoft.com/office/drawing/2014/main" xmlns="" id="{1134DAC4-9E94-441C-A9BE-87750F6F60A2}"/>
               </a:ext>
             </a:extLst>
           </p:cNvPr>
@@ -4527,7 +4527,7 @@
           <p:cNvPr id="2" name="Title 1">
             <a:extLst>
               <a:ext uri="{FF2B5EF4-FFF2-40B4-BE49-F238E27FC236}">
-                <a16:creationId xmlns="" xmlns:a16="http://schemas.microsoft.com/office/drawing/2014/main" id="{3E1AC600-D16C-47B7-9075-94DA61007B25}"/>
+                <a16:creationId xmlns:a16="http://schemas.microsoft.com/office/drawing/2014/main" xmlns="" id="{3E1AC600-D16C-47B7-9075-94DA61007B25}"/>
               </a:ext>
             </a:extLst>
           </p:cNvPr>
@@ -4556,7 +4556,7 @@
           <p:cNvPr id="3" name="Content Placeholder 2">
             <a:extLst>
               <a:ext uri="{FF2B5EF4-FFF2-40B4-BE49-F238E27FC236}">
-                <a16:creationId xmlns="" xmlns:a16="http://schemas.microsoft.com/office/drawing/2014/main" id="{DDC8679B-3323-4E4B-ABD6-BD8748DF3AEB}"/>
+                <a16:creationId xmlns:a16="http://schemas.microsoft.com/office/drawing/2014/main" xmlns="" id="{DDC8679B-3323-4E4B-ABD6-BD8748DF3AEB}"/>
               </a:ext>
             </a:extLst>
           </p:cNvPr>
@@ -4989,14 +4989,14 @@
                 <a:gridCol w="5035931">
                   <a:extLst>
                     <a:ext uri="{9D8B030D-6E8A-4147-A177-3AD203B41FA5}">
-                      <a16:colId xmlns="" xmlns:a16="http://schemas.microsoft.com/office/drawing/2014/main" val="20000"/>
+                      <a16:colId xmlns:a16="http://schemas.microsoft.com/office/drawing/2014/main" xmlns="" val="20000"/>
                     </a:ext>
                   </a:extLst>
                 </a:gridCol>
                 <a:gridCol w="5022469">
                   <a:extLst>
                     <a:ext uri="{9D8B030D-6E8A-4147-A177-3AD203B41FA5}">
-                      <a16:colId xmlns="" xmlns:a16="http://schemas.microsoft.com/office/drawing/2014/main" val="20001"/>
+                      <a16:colId xmlns:a16="http://schemas.microsoft.com/office/drawing/2014/main" xmlns="" val="20001"/>
                     </a:ext>
                   </a:extLst>
                 </a:gridCol>
@@ -5076,7 +5076,7 @@
                 </a:tc>
                 <a:extLst>
                   <a:ext uri="{0D108BD9-81ED-4DB2-BD59-A6C34878D82A}">
-                    <a16:rowId xmlns="" xmlns:a16="http://schemas.microsoft.com/office/drawing/2014/main" val="10000"/>
+                    <a16:rowId xmlns:a16="http://schemas.microsoft.com/office/drawing/2014/main" xmlns="" val="10000"/>
                   </a:ext>
                 </a:extLst>
               </a:tr>
@@ -5163,7 +5163,7 @@
                 </a:tc>
                 <a:extLst>
                   <a:ext uri="{0D108BD9-81ED-4DB2-BD59-A6C34878D82A}">
-                    <a16:rowId xmlns="" xmlns:a16="http://schemas.microsoft.com/office/drawing/2014/main" val="10001"/>
+                    <a16:rowId xmlns:a16="http://schemas.microsoft.com/office/drawing/2014/main" xmlns="" val="10001"/>
                   </a:ext>
                 </a:extLst>
               </a:tr>
@@ -5266,7 +5266,7 @@
                 </a:tc>
                 <a:extLst>
                   <a:ext uri="{0D108BD9-81ED-4DB2-BD59-A6C34878D82A}">
-                    <a16:rowId xmlns="" xmlns:a16="http://schemas.microsoft.com/office/drawing/2014/main" val="10002"/>
+                    <a16:rowId xmlns:a16="http://schemas.microsoft.com/office/drawing/2014/main" xmlns="" val="10002"/>
                   </a:ext>
                 </a:extLst>
               </a:tr>
@@ -6131,22 +6131,147 @@
           </a:p>
         </p:txBody>
       </p:sp>
-      <p:sp>
-        <p:nvSpPr>
-          <p:cNvPr id="4" name="Content Placeholder 3"/>
-          <p:cNvSpPr>
-            <a:spLocks noGrp="1"/>
-          </p:cNvSpPr>
+      <p:pic>
+        <p:nvPicPr>
+          <p:cNvPr id="6" name="Content Placeholder 5"/>
+          <p:cNvPicPr>
+            <a:picLocks noGrp="1" noChangeAspect="1"/>
+          </p:cNvPicPr>
           <p:nvPr>
             <p:ph sz="half" idx="2"/>
           </p:nvPr>
-        </p:nvSpPr>
-        <p:spPr/>
-        <p:txBody>
-          <a:bodyPr/>
-          <a:lstStyle/>
-          <a:p>
-            <a:endParaRPr lang="en-US"/>
+        </p:nvPicPr>
+        <p:blipFill rotWithShape="1">
+          <a:blip r:embed="rId2">
+            <a:extLst>
+              <a:ext uri="{28A0092B-C50C-407E-A947-70E740481C1C}">
+                <a14:useLocalDpi xmlns:a14="http://schemas.microsoft.com/office/drawing/2010/main" val="0"/>
+              </a:ext>
+            </a:extLst>
+          </a:blip>
+          <a:srcRect t="12148" b="34005"/>
+          <a:stretch/>
+        </p:blipFill>
+        <p:spPr>
+          <a:xfrm>
+            <a:off x="6218555" y="1845734"/>
+            <a:ext cx="4937125" cy="1957009"/>
+          </a:xfrm>
+        </p:spPr>
+      </p:pic>
+      <p:sp>
+        <p:nvSpPr>
+          <p:cNvPr id="7" name="TextBox 6"/>
+          <p:cNvSpPr txBox="1"/>
+          <p:nvPr/>
+        </p:nvSpPr>
+        <p:spPr>
+          <a:xfrm>
+            <a:off x="6415314" y="3697759"/>
+            <a:ext cx="4397829" cy="369332"/>
+          </a:xfrm>
+          <a:prstGeom prst="rect">
+            <a:avLst/>
+          </a:prstGeom>
+          <a:noFill/>
+        </p:spPr>
+        <p:txBody>
+          <a:bodyPr wrap="square" rtlCol="0">
+            <a:spAutoFit/>
+          </a:bodyPr>
+          <a:lstStyle/>
+          <a:p>
+            <a:r>
+              <a:rPr lang="en-US" dirty="0" smtClean="0"/>
+              <a:t>Audio	Video	Image	 Text	Num</a:t>
+            </a:r>
+            <a:endParaRPr lang="en-US" dirty="0"/>
+          </a:p>
+        </p:txBody>
+      </p:sp>
+      <p:sp>
+        <p:nvSpPr>
+          <p:cNvPr id="8" name="TextBox 7"/>
+          <p:cNvSpPr txBox="1"/>
+          <p:nvPr/>
+        </p:nvSpPr>
+        <p:spPr>
+          <a:xfrm>
+            <a:off x="6350000" y="4140446"/>
+            <a:ext cx="4711337" cy="1754326"/>
+          </a:xfrm>
+          <a:prstGeom prst="rect">
+            <a:avLst/>
+          </a:prstGeom>
+          <a:noFill/>
+        </p:spPr>
+        <p:txBody>
+          <a:bodyPr wrap="square" rtlCol="0">
+            <a:spAutoFit/>
+          </a:bodyPr>
+          <a:lstStyle/>
+          <a:p>
+            <a:r>
+              <a:rPr lang="en-US" dirty="0"/>
+              <a:t> </a:t>
+            </a:r>
+            <a:r>
+              <a:rPr lang="en-US" dirty="0" smtClean="0"/>
+              <a:t>               Observational  	Simulation</a:t>
+            </a:r>
+            <a:endParaRPr lang="en-US" dirty="0"/>
+          </a:p>
+          <a:p>
+            <a:r>
+              <a:rPr lang="en-US" dirty="0"/>
+              <a:t> </a:t>
+            </a:r>
+            <a:r>
+              <a:rPr lang="en-US" dirty="0" smtClean="0"/>
+              <a:t>     Experimental 	    Dark	</a:t>
+            </a:r>
+            <a:r>
+              <a:rPr lang="en-US" dirty="0"/>
+              <a:t> </a:t>
+            </a:r>
+            <a:r>
+              <a:rPr lang="en-US" dirty="0" smtClean="0"/>
+              <a:t>	Derived </a:t>
+            </a:r>
+          </a:p>
+          <a:p>
+            <a:r>
+              <a:rPr lang="en-US" dirty="0"/>
+              <a:t>	</a:t>
+            </a:r>
+            <a:r>
+              <a:rPr lang="en-US" dirty="0" smtClean="0"/>
+              <a:t> Compiled 	Open  </a:t>
+            </a:r>
+          </a:p>
+          <a:p>
+            <a:r>
+              <a:rPr lang="en-US" dirty="0" smtClean="0"/>
+              <a:t>Machine            Time-stamped       Operational</a:t>
+            </a:r>
+            <a:endParaRPr lang="en-US" dirty="0"/>
+          </a:p>
+          <a:p>
+            <a:r>
+              <a:rPr lang="en-US" dirty="0"/>
+              <a:t>  </a:t>
+            </a:r>
+            <a:r>
+              <a:rPr lang="en-US" dirty="0" smtClean="0"/>
+              <a:t>            Spatiotemporal        Real time</a:t>
+            </a:r>
+          </a:p>
+          <a:p>
+            <a:r>
+              <a:rPr lang="en-US" dirty="0" smtClean="0"/>
+              <a:t>….. 	…	…..	...	…..        ... </a:t>
+            </a:r>
+            <a:endParaRPr lang="en-US" dirty="0"/>
           </a:p>
         </p:txBody>
       </p:sp>

</xml_diff>

<commit_message>
BIg Data tools added
Adding big data tools that are used for data analysis
</commit_message>
<xml_diff>
--- a/Project Interim Submission/Generic DS Framework.pptx
+++ b/Project Interim Submission/Generic DS Framework.pptx
@@ -5,7 +5,7 @@
     <p:sldMasterId id="2147483708" r:id="rId1"/>
   </p:sldMasterIdLst>
   <p:notesMasterIdLst>
-    <p:notesMasterId r:id="rId16"/>
+    <p:notesMasterId r:id="rId17"/>
   </p:notesMasterIdLst>
   <p:sldIdLst>
     <p:sldId id="256" r:id="rId2"/>
@@ -20,8 +20,9 @@
     <p:sldId id="263" r:id="rId11"/>
     <p:sldId id="261" r:id="rId12"/>
     <p:sldId id="262" r:id="rId13"/>
-    <p:sldId id="265" r:id="rId14"/>
-    <p:sldId id="266" r:id="rId15"/>
+    <p:sldId id="270" r:id="rId14"/>
+    <p:sldId id="265" r:id="rId15"/>
+    <p:sldId id="266" r:id="rId16"/>
   </p:sldIdLst>
   <p:sldSz cx="12192000" cy="6858000"/>
   <p:notesSz cx="6858000" cy="9144000"/>
@@ -210,7 +211,7 @@
           <a:p>
             <a:fld id="{1BE3ABC5-6C6D-49D2-9FFB-15BACE4436B8}" type="datetimeFigureOut">
               <a:rPr lang="en-US" smtClean="0"/>
-              <a:t>18-Jan-19</a:t>
+              <a:t>1/19/2019</a:t>
             </a:fld>
             <a:endParaRPr lang="en-US"/>
           </a:p>
@@ -274,38 +275,37 @@
           <a:p>
             <a:pPr lvl="0"/>
             <a:r>
-              <a:rPr lang="en-US" smtClean="0"/>
+              <a:rPr lang="en-US"/>
               <a:t>Click to edit Master text styles</a:t>
             </a:r>
           </a:p>
           <a:p>
             <a:pPr lvl="1"/>
             <a:r>
-              <a:rPr lang="en-US" smtClean="0"/>
+              <a:rPr lang="en-US"/>
               <a:t>Second level</a:t>
             </a:r>
           </a:p>
           <a:p>
             <a:pPr lvl="2"/>
             <a:r>
-              <a:rPr lang="en-US" smtClean="0"/>
+              <a:rPr lang="en-US"/>
               <a:t>Third level</a:t>
             </a:r>
           </a:p>
           <a:p>
             <a:pPr lvl="3"/>
             <a:r>
-              <a:rPr lang="en-US" smtClean="0"/>
+              <a:rPr lang="en-US"/>
               <a:t>Fourth level</a:t>
             </a:r>
           </a:p>
           <a:p>
             <a:pPr lvl="4"/>
             <a:r>
-              <a:rPr lang="en-US" smtClean="0"/>
+              <a:rPr lang="en-US"/>
               <a:t>Fifth level</a:t>
             </a:r>
-            <a:endParaRPr lang="en-US"/>
           </a:p>
         </p:txBody>
       </p:sp>
@@ -788,7 +788,7 @@
           <a:p>
             <a:fld id="{BE50AB1F-9C50-41A2-BE99-4D3D06C85678}" type="datetimeFigureOut">
               <a:rPr lang="en-US" smtClean="0"/>
-              <a:t>18-Jan-19</a:t>
+              <a:t>1/19/2019</a:t>
             </a:fld>
             <a:endParaRPr lang="en-US"/>
           </a:p>
@@ -996,7 +996,7 @@
           <a:p>
             <a:fld id="{BE50AB1F-9C50-41A2-BE99-4D3D06C85678}" type="datetimeFigureOut">
               <a:rPr lang="en-US" smtClean="0"/>
-              <a:t>18-Jan-19</a:t>
+              <a:t>1/19/2019</a:t>
             </a:fld>
             <a:endParaRPr lang="en-US"/>
           </a:p>
@@ -1252,7 +1252,7 @@
           <a:p>
             <a:fld id="{BE50AB1F-9C50-41A2-BE99-4D3D06C85678}" type="datetimeFigureOut">
               <a:rPr lang="en-US" smtClean="0"/>
-              <a:t>18-Jan-19</a:t>
+              <a:t>1/19/2019</a:t>
             </a:fld>
             <a:endParaRPr lang="en-US"/>
           </a:p>
@@ -1422,7 +1422,7 @@
           <a:p>
             <a:fld id="{BE50AB1F-9C50-41A2-BE99-4D3D06C85678}" type="datetimeFigureOut">
               <a:rPr lang="en-US" smtClean="0"/>
-              <a:t>18-Jan-19</a:t>
+              <a:t>1/19/2019</a:t>
             </a:fld>
             <a:endParaRPr lang="en-US"/>
           </a:p>
@@ -1765,7 +1765,7 @@
           <a:p>
             <a:fld id="{BE50AB1F-9C50-41A2-BE99-4D3D06C85678}" type="datetimeFigureOut">
               <a:rPr lang="en-US" smtClean="0"/>
-              <a:t>18-Jan-19</a:t>
+              <a:t>1/19/2019</a:t>
             </a:fld>
             <a:endParaRPr lang="en-US"/>
           </a:p>
@@ -2040,7 +2040,7 @@
           <a:p>
             <a:fld id="{BE50AB1F-9C50-41A2-BE99-4D3D06C85678}" type="datetimeFigureOut">
               <a:rPr lang="en-US" smtClean="0"/>
-              <a:t>18-Jan-19</a:t>
+              <a:t>1/19/2019</a:t>
             </a:fld>
             <a:endParaRPr lang="en-US"/>
           </a:p>
@@ -2419,7 +2419,7 @@
           <a:p>
             <a:fld id="{BE50AB1F-9C50-41A2-BE99-4D3D06C85678}" type="datetimeFigureOut">
               <a:rPr lang="en-US" smtClean="0"/>
-              <a:t>18-Jan-19</a:t>
+              <a:t>1/19/2019</a:t>
             </a:fld>
             <a:endParaRPr lang="en-US"/>
           </a:p>
@@ -2537,7 +2537,7 @@
           <a:p>
             <a:fld id="{BE50AB1F-9C50-41A2-BE99-4D3D06C85678}" type="datetimeFigureOut">
               <a:rPr lang="en-US" smtClean="0"/>
-              <a:t>18-Jan-19</a:t>
+              <a:t>1/19/2019</a:t>
             </a:fld>
             <a:endParaRPr lang="en-US"/>
           </a:p>
@@ -2708,7 +2708,7 @@
           <a:p>
             <a:fld id="{BE50AB1F-9C50-41A2-BE99-4D3D06C85678}" type="datetimeFigureOut">
               <a:rPr lang="en-US" smtClean="0"/>
-              <a:t>18-Jan-19</a:t>
+              <a:t>1/19/2019</a:t>
             </a:fld>
             <a:endParaRPr lang="en-US"/>
           </a:p>
@@ -3062,7 +3062,7 @@
           <a:p>
             <a:fld id="{BE50AB1F-9C50-41A2-BE99-4D3D06C85678}" type="datetimeFigureOut">
               <a:rPr lang="en-US" smtClean="0"/>
-              <a:t>18-Jan-19</a:t>
+              <a:t>1/19/2019</a:t>
             </a:fld>
             <a:endParaRPr lang="en-US"/>
           </a:p>
@@ -3439,7 +3439,7 @@
           <a:p>
             <a:fld id="{BE50AB1F-9C50-41A2-BE99-4D3D06C85678}" type="datetimeFigureOut">
               <a:rPr lang="en-US" smtClean="0"/>
-              <a:t>18-Jan-19</a:t>
+              <a:t>1/19/2019</a:t>
             </a:fld>
             <a:endParaRPr lang="en-US"/>
           </a:p>
@@ -3726,7 +3726,7 @@
           <a:p>
             <a:fld id="{BE50AB1F-9C50-41A2-BE99-4D3D06C85678}" type="datetimeFigureOut">
               <a:rPr lang="en-US" smtClean="0"/>
-              <a:t>18-Jan-19</a:t>
+              <a:t>1/19/2019</a:t>
             </a:fld>
             <a:endParaRPr lang="en-US"/>
           </a:p>
@@ -4339,10 +4339,9 @@
           <a:p>
             <a:pPr algn="ctr"/>
             <a:r>
-              <a:rPr lang="en-US" dirty="0" smtClean="0"/>
+              <a:rPr lang="en-US" dirty="0"/>
               <a:t>BIG DATA</a:t>
             </a:r>
-            <a:endParaRPr lang="en-US" dirty="0"/>
           </a:p>
         </p:txBody>
       </p:sp>
@@ -4365,18 +4364,9 @@
           <a:p>
             <a:pPr marL="0" lvl="1" algn="ctr"/>
             <a:r>
-              <a:rPr lang="en-US" sz="2000" dirty="0" smtClean="0"/>
-              <a:t>PILLARS, SOURCES, </a:t>
-            </a:r>
-            <a:r>
               <a:rPr lang="en-US" sz="2000" dirty="0"/>
-              <a:t>MODEL,</a:t>
-            </a:r>
-            <a:r>
-              <a:rPr lang="en-US" sz="2000" dirty="0" smtClean="0"/>
-              <a:t> TOOLS</a:t>
-            </a:r>
-            <a:endParaRPr lang="en-US" sz="2000" dirty="0"/>
+              <a:t>PILLARS, SOURCES, MODEL, TOOLS</a:t>
+            </a:r>
           </a:p>
         </p:txBody>
       </p:sp>
@@ -4415,7 +4405,7 @@
           <p:cNvPr id="2" name="Title 1">
             <a:extLst>
               <a:ext uri="{FF2B5EF4-FFF2-40B4-BE49-F238E27FC236}">
-                <a16:creationId xmlns:a16="http://schemas.microsoft.com/office/drawing/2014/main" xmlns="" id="{F4727C6F-3982-4E54-AA66-B4E0AA33FF66}"/>
+                <a16:creationId xmlns:a16="http://schemas.microsoft.com/office/drawing/2014/main" id="{F4727C6F-3982-4E54-AA66-B4E0AA33FF66}"/>
               </a:ext>
             </a:extLst>
           </p:cNvPr>
@@ -4432,12 +4422,8 @@
           <a:lstStyle/>
           <a:p>
             <a:r>
-              <a:rPr lang="en-US" dirty="0" smtClean="0"/>
-              <a:t>Big </a:t>
-            </a:r>
-            <a:r>
-              <a:rPr lang="en-US" dirty="0"/>
-              <a:t>Data</a:t>
+              <a:rPr lang="en-US" dirty="0"/>
+              <a:t>Big Data</a:t>
             </a:r>
             <a:endParaRPr lang="x-none" dirty="0"/>
           </a:p>
@@ -4448,7 +4434,7 @@
           <p:cNvPr id="3" name="Content Placeholder 2">
             <a:extLst>
               <a:ext uri="{FF2B5EF4-FFF2-40B4-BE49-F238E27FC236}">
-                <a16:creationId xmlns:a16="http://schemas.microsoft.com/office/drawing/2014/main" xmlns="" id="{1134DAC4-9E94-441C-A9BE-87750F6F60A2}"/>
+                <a16:creationId xmlns:a16="http://schemas.microsoft.com/office/drawing/2014/main" id="{1134DAC4-9E94-441C-A9BE-87750F6F60A2}"/>
               </a:ext>
             </a:extLst>
           </p:cNvPr>
@@ -4527,7 +4513,7 @@
           <p:cNvPr id="2" name="Title 1">
             <a:extLst>
               <a:ext uri="{FF2B5EF4-FFF2-40B4-BE49-F238E27FC236}">
-                <a16:creationId xmlns:a16="http://schemas.microsoft.com/office/drawing/2014/main" xmlns="" id="{3E1AC600-D16C-47B7-9075-94DA61007B25}"/>
+                <a16:creationId xmlns:a16="http://schemas.microsoft.com/office/drawing/2014/main" id="{3E1AC600-D16C-47B7-9075-94DA61007B25}"/>
               </a:ext>
             </a:extLst>
           </p:cNvPr>
@@ -4538,13 +4524,18 @@
             <p:ph type="title"/>
           </p:nvPr>
         </p:nvSpPr>
-        <p:spPr/>
+        <p:spPr>
+          <a:xfrm>
+            <a:off x="1097280" y="286603"/>
+            <a:ext cx="10058400" cy="1450757"/>
+          </a:xfrm>
+        </p:spPr>
         <p:txBody>
           <a:bodyPr/>
           <a:lstStyle/>
           <a:p>
             <a:r>
-              <a:rPr lang="en-US" dirty="0" smtClean="0"/>
+              <a:rPr lang="en-US" dirty="0"/>
               <a:t>Big Data: Tools</a:t>
             </a:r>
             <a:endParaRPr lang="x-none" dirty="0"/>
@@ -4556,7 +4547,7 @@
           <p:cNvPr id="3" name="Content Placeholder 2">
             <a:extLst>
               <a:ext uri="{FF2B5EF4-FFF2-40B4-BE49-F238E27FC236}">
-                <a16:creationId xmlns:a16="http://schemas.microsoft.com/office/drawing/2014/main" xmlns="" id="{DDC8679B-3323-4E4B-ABD6-BD8748DF3AEB}"/>
+                <a16:creationId xmlns:a16="http://schemas.microsoft.com/office/drawing/2014/main" id="{DDC8679B-3323-4E4B-ABD6-BD8748DF3AEB}"/>
               </a:ext>
             </a:extLst>
           </p:cNvPr>
@@ -4665,7 +4656,121 @@
       </p:grpSpPr>
       <p:sp>
         <p:nvSpPr>
-          <p:cNvPr id="2" name="Title 1"/>
+          <p:cNvPr id="3" name="Content Placeholder 2">
+            <a:extLst>
+              <a:ext uri="{FF2B5EF4-FFF2-40B4-BE49-F238E27FC236}">
+                <a16:creationId xmlns:a16="http://schemas.microsoft.com/office/drawing/2014/main" id="{12CE7563-67E4-470C-A76A-FD376D4C2471}"/>
+              </a:ext>
+            </a:extLst>
+          </p:cNvPr>
+          <p:cNvSpPr>
+            <a:spLocks noGrp="1"/>
+          </p:cNvSpPr>
+          <p:nvPr>
+            <p:ph idx="1"/>
+          </p:nvPr>
+        </p:nvSpPr>
+        <p:spPr/>
+        <p:txBody>
+          <a:bodyPr>
+            <a:normAutofit/>
+          </a:bodyPr>
+          <a:lstStyle/>
+          <a:p>
+            <a:r>
+              <a:rPr lang="en-US" sz="3200" dirty="0"/>
+              <a:t>SPARK</a:t>
+            </a:r>
+          </a:p>
+          <a:p>
+            <a:pPr>
+              <a:buFont typeface="Wingdings" panose="05000000000000000000" pitchFamily="2" charset="2"/>
+              <a:buChar char="v"/>
+            </a:pPr>
+            <a:r>
+              <a:rPr lang="en-PK" dirty="0"/>
+              <a:t>Apache Spark is the alternative — and in many aspects the successor — of Apache Hadoop. </a:t>
+            </a:r>
+            <a:endParaRPr lang="en-US" dirty="0"/>
+          </a:p>
+          <a:p>
+            <a:pPr>
+              <a:buFont typeface="Wingdings" panose="05000000000000000000" pitchFamily="2" charset="2"/>
+              <a:buChar char="v"/>
+            </a:pPr>
+            <a:r>
+              <a:rPr lang="en-US" dirty="0"/>
+              <a:t>Built </a:t>
+            </a:r>
+            <a:r>
+              <a:rPr lang="en-PK" dirty="0"/>
+              <a:t>to address the shortcomings of Hadoop</a:t>
+            </a:r>
+            <a:r>
+              <a:rPr lang="en-US" dirty="0"/>
+              <a:t>.</a:t>
+            </a:r>
+          </a:p>
+          <a:p>
+            <a:pPr>
+              <a:buFont typeface="Wingdings" panose="05000000000000000000" pitchFamily="2" charset="2"/>
+              <a:buChar char="v"/>
+            </a:pPr>
+            <a:r>
+              <a:rPr lang="en-US" dirty="0"/>
+              <a:t>Apache Spark achieves high performance for both batch and streaming data.</a:t>
+            </a:r>
+          </a:p>
+          <a:p>
+            <a:pPr>
+              <a:buFont typeface="Wingdings" panose="05000000000000000000" pitchFamily="2" charset="2"/>
+              <a:buChar char="v"/>
+            </a:pPr>
+            <a:r>
+              <a:rPr lang="en-US" dirty="0"/>
+              <a:t>Run workload 100X faster.</a:t>
+            </a:r>
+          </a:p>
+          <a:p>
+            <a:pPr>
+              <a:buFont typeface="Wingdings" panose="05000000000000000000" pitchFamily="2" charset="2"/>
+              <a:buChar char="v"/>
+            </a:pPr>
+            <a:r>
+              <a:rPr lang="en-US" dirty="0"/>
+              <a:t>Offers over 80 high-level operators that make it easy to build parallel apps.</a:t>
+            </a:r>
+          </a:p>
+          <a:p>
+            <a:pPr>
+              <a:buFont typeface="Wingdings" panose="05000000000000000000" pitchFamily="2" charset="2"/>
+              <a:buChar char="v"/>
+            </a:pPr>
+            <a:r>
+              <a:rPr lang="en-US" dirty="0"/>
+              <a:t> It powers a stack of libraries including SQL and </a:t>
+            </a:r>
+            <a:r>
+              <a:rPr lang="en-US" dirty="0" err="1"/>
+              <a:t>DataFrames</a:t>
+            </a:r>
+            <a:r>
+              <a:rPr lang="en-US" dirty="0"/>
+              <a:t>, MLlib for machine learning, GraphX, and Spark Streaming</a:t>
+            </a:r>
+            <a:endParaRPr lang="en-PK" dirty="0"/>
+          </a:p>
+        </p:txBody>
+      </p:sp>
+      <p:sp>
+        <p:nvSpPr>
+          <p:cNvPr id="4" name="Title 1">
+            <a:extLst>
+              <a:ext uri="{FF2B5EF4-FFF2-40B4-BE49-F238E27FC236}">
+                <a16:creationId xmlns:a16="http://schemas.microsoft.com/office/drawing/2014/main" id="{D1F22F75-6806-481E-A0D8-FC161C3266D1}"/>
+              </a:ext>
+            </a:extLst>
+          </p:cNvPr>
           <p:cNvSpPr>
             <a:spLocks noGrp="1"/>
           </p:cNvSpPr>
@@ -4673,48 +4778,28 @@
             <p:ph type="title"/>
           </p:nvPr>
         </p:nvSpPr>
-        <p:spPr/>
+        <p:spPr>
+          <a:xfrm>
+            <a:off x="1096963" y="287338"/>
+            <a:ext cx="10058400" cy="1449387"/>
+          </a:xfrm>
+        </p:spPr>
         <p:txBody>
           <a:bodyPr/>
           <a:lstStyle/>
           <a:p>
-            <a:pPr algn="ctr"/>
-            <a:r>
-              <a:rPr lang="en-US" dirty="0" smtClean="0"/>
-              <a:t>ALGORITHMS</a:t>
-            </a:r>
-            <a:endParaRPr lang="en-US" dirty="0"/>
-          </a:p>
-        </p:txBody>
-      </p:sp>
-      <p:sp>
-        <p:nvSpPr>
-          <p:cNvPr id="3" name="Text Placeholder 2"/>
-          <p:cNvSpPr>
-            <a:spLocks noGrp="1"/>
-          </p:cNvSpPr>
-          <p:nvPr>
-            <p:ph type="body" idx="1"/>
-          </p:nvPr>
-        </p:nvSpPr>
-        <p:spPr/>
-        <p:txBody>
-          <a:bodyPr/>
-          <a:lstStyle/>
-          <a:p>
-            <a:pPr algn="ctr"/>
-            <a:r>
-              <a:rPr lang="en-US" dirty="0" smtClean="0"/>
-              <a:t>Classification, for Da, for BD</a:t>
-            </a:r>
-            <a:endParaRPr lang="en-US" dirty="0"/>
+            <a:r>
+              <a:rPr lang="en-US" dirty="0"/>
+              <a:t>Big Data: Tools</a:t>
+            </a:r>
+            <a:endParaRPr lang="x-none" dirty="0"/>
           </a:p>
         </p:txBody>
       </p:sp>
     </p:spTree>
     <p:extLst>
       <p:ext uri="{BB962C8B-B14F-4D97-AF65-F5344CB8AC3E}">
-        <p14:creationId xmlns:p14="http://schemas.microsoft.com/office/powerpoint/2010/main" val="2204207379"/>
+        <p14:creationId xmlns:p14="http://schemas.microsoft.com/office/powerpoint/2010/main" val="2181567895"/>
       </p:ext>
     </p:extLst>
   </p:cSld>
@@ -4758,10 +4843,85 @@
           <a:p>
             <a:pPr algn="ctr"/>
             <a:r>
-              <a:rPr lang="en-US" dirty="0" smtClean="0"/>
+              <a:rPr lang="en-US" dirty="0"/>
+              <a:t>ALGORITHMS</a:t>
+            </a:r>
+          </a:p>
+        </p:txBody>
+      </p:sp>
+      <p:sp>
+        <p:nvSpPr>
+          <p:cNvPr id="3" name="Text Placeholder 2"/>
+          <p:cNvSpPr>
+            <a:spLocks noGrp="1"/>
+          </p:cNvSpPr>
+          <p:nvPr>
+            <p:ph type="body" idx="1"/>
+          </p:nvPr>
+        </p:nvSpPr>
+        <p:spPr/>
+        <p:txBody>
+          <a:bodyPr/>
+          <a:lstStyle/>
+          <a:p>
+            <a:pPr algn="ctr"/>
+            <a:r>
+              <a:rPr lang="en-US" dirty="0"/>
+              <a:t>Classification, for Da, for BD</a:t>
+            </a:r>
+          </a:p>
+        </p:txBody>
+      </p:sp>
+    </p:spTree>
+    <p:extLst>
+      <p:ext uri="{BB962C8B-B14F-4D97-AF65-F5344CB8AC3E}">
+        <p14:creationId xmlns:p14="http://schemas.microsoft.com/office/powerpoint/2010/main" val="2204207379"/>
+      </p:ext>
+    </p:extLst>
+  </p:cSld>
+  <p:clrMapOvr>
+    <a:masterClrMapping/>
+  </p:clrMapOvr>
+</p:sld>
+</file>
+
+<file path=ppt/slides/slide15.xml><?xml version="1.0" encoding="utf-8"?>
+<p:sld xmlns:a="http://schemas.openxmlformats.org/drawingml/2006/main" xmlns:r="http://schemas.openxmlformats.org/officeDocument/2006/relationships" xmlns:p="http://schemas.openxmlformats.org/presentationml/2006/main">
+  <p:cSld>
+    <p:spTree>
+      <p:nvGrpSpPr>
+        <p:cNvPr id="1" name=""/>
+        <p:cNvGrpSpPr/>
+        <p:nvPr/>
+      </p:nvGrpSpPr>
+      <p:grpSpPr>
+        <a:xfrm>
+          <a:off x="0" y="0"/>
+          <a:ext cx="0" cy="0"/>
+          <a:chOff x="0" y="0"/>
+          <a:chExt cx="0" cy="0"/>
+        </a:xfrm>
+      </p:grpSpPr>
+      <p:sp>
+        <p:nvSpPr>
+          <p:cNvPr id="2" name="Title 1"/>
+          <p:cNvSpPr>
+            <a:spLocks noGrp="1"/>
+          </p:cNvSpPr>
+          <p:nvPr>
+            <p:ph type="title"/>
+          </p:nvPr>
+        </p:nvSpPr>
+        <p:spPr/>
+        <p:txBody>
+          <a:bodyPr/>
+          <a:lstStyle/>
+          <a:p>
+            <a:pPr algn="ctr"/>
+            <a:r>
+              <a:rPr lang="en-US" dirty="0"/>
               <a:t>COMPARISON </a:t>
             </a:r>
-            <a:endParaRPr lang="en-US" dirty="0"/>
           </a:p>
         </p:txBody>
       </p:sp>
@@ -4782,7 +4942,7 @@
           <a:p>
             <a:pPr algn="ctr"/>
             <a:r>
-              <a:rPr lang="en-US" cap="none" dirty="0" smtClean="0"/>
+              <a:rPr lang="en-US" cap="none" dirty="0"/>
               <a:t>Technology, Tool, Features, Use</a:t>
             </a:r>
             <a:endParaRPr lang="en-US" dirty="0"/>
@@ -4989,14 +5149,14 @@
                 <a:gridCol w="5035931">
                   <a:extLst>
                     <a:ext uri="{9D8B030D-6E8A-4147-A177-3AD203B41FA5}">
-                      <a16:colId xmlns:a16="http://schemas.microsoft.com/office/drawing/2014/main" xmlns="" val="20000"/>
+                      <a16:colId xmlns:a16="http://schemas.microsoft.com/office/drawing/2014/main" val="20000"/>
                     </a:ext>
                   </a:extLst>
                 </a:gridCol>
                 <a:gridCol w="5022469">
                   <a:extLst>
                     <a:ext uri="{9D8B030D-6E8A-4147-A177-3AD203B41FA5}">
-                      <a16:colId xmlns:a16="http://schemas.microsoft.com/office/drawing/2014/main" xmlns="" val="20001"/>
+                      <a16:colId xmlns:a16="http://schemas.microsoft.com/office/drawing/2014/main" val="20001"/>
                     </a:ext>
                   </a:extLst>
                 </a:gridCol>
@@ -5076,7 +5236,7 @@
                 </a:tc>
                 <a:extLst>
                   <a:ext uri="{0D108BD9-81ED-4DB2-BD59-A6C34878D82A}">
-                    <a16:rowId xmlns:a16="http://schemas.microsoft.com/office/drawing/2014/main" xmlns="" val="10000"/>
+                    <a16:rowId xmlns:a16="http://schemas.microsoft.com/office/drawing/2014/main" val="10000"/>
                   </a:ext>
                 </a:extLst>
               </a:tr>
@@ -5163,7 +5323,7 @@
                 </a:tc>
                 <a:extLst>
                   <a:ext uri="{0D108BD9-81ED-4DB2-BD59-A6C34878D82A}">
-                    <a16:rowId xmlns:a16="http://schemas.microsoft.com/office/drawing/2014/main" xmlns="" val="10001"/>
+                    <a16:rowId xmlns:a16="http://schemas.microsoft.com/office/drawing/2014/main" val="10001"/>
                   </a:ext>
                 </a:extLst>
               </a:tr>
@@ -5266,7 +5426,7 @@
                 </a:tc>
                 <a:extLst>
                   <a:ext uri="{0D108BD9-81ED-4DB2-BD59-A6C34878D82A}">
-                    <a16:rowId xmlns:a16="http://schemas.microsoft.com/office/drawing/2014/main" xmlns="" val="10002"/>
+                    <a16:rowId xmlns:a16="http://schemas.microsoft.com/office/drawing/2014/main" val="10002"/>
                   </a:ext>
                 </a:extLst>
               </a:tr>
@@ -5320,10 +5480,9 @@
           <a:lstStyle/>
           <a:p>
             <a:r>
-              <a:rPr lang="en-US" dirty="0" smtClean="0"/>
+              <a:rPr lang="en-US" dirty="0"/>
               <a:t>Outline</a:t>
             </a:r>
-            <a:endParaRPr lang="en-US" dirty="0"/>
           </a:p>
         </p:txBody>
       </p:sp>
@@ -5355,11 +5514,7 @@
             </a:pPr>
             <a:r>
               <a:rPr lang="en-US" dirty="0"/>
-              <a:t> </a:t>
-            </a:r>
-            <a:r>
-              <a:rPr lang="en-US" dirty="0" smtClean="0"/>
-              <a:t>Objective</a:t>
+              <a:t> Objective</a:t>
             </a:r>
           </a:p>
           <a:p>
@@ -5409,13 +5564,8 @@
             </a:pPr>
             <a:r>
               <a:rPr lang="en-US" dirty="0"/>
-              <a:t> Analytics </a:t>
-            </a:r>
-            <a:r>
-              <a:rPr lang="en-US" dirty="0" smtClean="0"/>
-              <a:t>Tools</a:t>
-            </a:r>
-            <a:endParaRPr lang="en-US" dirty="0"/>
+              <a:t> Analytics Tools</a:t>
+            </a:r>
           </a:p>
           <a:p>
             <a:pPr>
@@ -5423,7 +5573,7 @@
               <a:buChar char="Ø"/>
             </a:pPr>
             <a:r>
-              <a:rPr lang="en-US" dirty="0" smtClean="0"/>
+              <a:rPr lang="en-US" dirty="0"/>
               <a:t> Big Data</a:t>
             </a:r>
           </a:p>
@@ -5433,7 +5583,7 @@
               <a:buChar char="Ø"/>
             </a:pPr>
             <a:r>
-              <a:rPr lang="en-US" dirty="0" smtClean="0"/>
+              <a:rPr lang="en-US" dirty="0"/>
               <a:t> Pillars</a:t>
             </a:r>
           </a:p>
@@ -5444,11 +5594,7 @@
             </a:pPr>
             <a:r>
               <a:rPr lang="en-US" dirty="0"/>
-              <a:t> </a:t>
-            </a:r>
-            <a:r>
-              <a:rPr lang="en-US" dirty="0" smtClean="0"/>
-              <a:t>Sources</a:t>
+              <a:t> Sources</a:t>
             </a:r>
           </a:p>
           <a:p>
@@ -5458,11 +5604,7 @@
             </a:pPr>
             <a:r>
               <a:rPr lang="en-US" dirty="0"/>
-              <a:t> </a:t>
-            </a:r>
-            <a:r>
-              <a:rPr lang="en-US" dirty="0" smtClean="0"/>
-              <a:t>Model</a:t>
+              <a:t> Model</a:t>
             </a:r>
           </a:p>
           <a:p>
@@ -5471,7 +5613,7 @@
               <a:buChar char="Ø"/>
             </a:pPr>
             <a:r>
-              <a:rPr lang="en-US" dirty="0" smtClean="0"/>
+              <a:rPr lang="en-US" dirty="0"/>
               <a:t> Analytics</a:t>
             </a:r>
           </a:p>
@@ -5481,7 +5623,7 @@
               <a:buChar char="Ø"/>
             </a:pPr>
             <a:r>
-              <a:rPr lang="en-US" dirty="0" smtClean="0"/>
+              <a:rPr lang="en-US" dirty="0"/>
               <a:t> Tools</a:t>
             </a:r>
           </a:p>
@@ -5491,7 +5633,7 @@
               <a:buChar char="Ø"/>
             </a:pPr>
             <a:r>
-              <a:rPr lang="en-US" dirty="0" smtClean="0"/>
+              <a:rPr lang="en-US" dirty="0"/>
               <a:t>Algorithms</a:t>
             </a:r>
           </a:p>
@@ -5501,7 +5643,7 @@
               <a:buChar char="Ø"/>
             </a:pPr>
             <a:r>
-              <a:rPr lang="en-US" dirty="0" smtClean="0"/>
+              <a:rPr lang="en-US" dirty="0"/>
               <a:t> Classification</a:t>
             </a:r>
           </a:p>
@@ -5512,13 +5654,8 @@
             </a:pPr>
             <a:r>
               <a:rPr lang="en-US" dirty="0"/>
-              <a:t> </a:t>
-            </a:r>
-            <a:r>
-              <a:rPr lang="en-US" dirty="0" smtClean="0"/>
-              <a:t>Big Data &amp; Analytics Algorithms</a:t>
-            </a:r>
-            <a:endParaRPr lang="en-US" dirty="0"/>
+              <a:t> Big Data &amp; Analytics Algorithms</a:t>
+            </a:r>
           </a:p>
         </p:txBody>
       </p:sp>
@@ -5549,7 +5686,7 @@
               <a:buChar char="Ø"/>
             </a:pPr>
             <a:r>
-              <a:rPr lang="en-US" dirty="0" smtClean="0"/>
+              <a:rPr lang="en-US" dirty="0"/>
               <a:t> Comparison</a:t>
             </a:r>
           </a:p>
@@ -5559,7 +5696,7 @@
               <a:buChar char="Ø"/>
             </a:pPr>
             <a:r>
-              <a:rPr lang="en-US" dirty="0" smtClean="0"/>
+              <a:rPr lang="en-US" dirty="0"/>
               <a:t> Technology</a:t>
             </a:r>
           </a:p>
@@ -5570,11 +5707,7 @@
             </a:pPr>
             <a:r>
               <a:rPr lang="en-US" dirty="0"/>
-              <a:t> </a:t>
-            </a:r>
-            <a:r>
-              <a:rPr lang="en-US" dirty="0" smtClean="0"/>
-              <a:t>Tools </a:t>
+              <a:t> Tools </a:t>
             </a:r>
           </a:p>
           <a:p>
@@ -5583,7 +5716,7 @@
               <a:buChar char="Ø"/>
             </a:pPr>
             <a:r>
-              <a:rPr lang="en-US" dirty="0" smtClean="0"/>
+              <a:rPr lang="en-US" dirty="0"/>
               <a:t> Feature</a:t>
             </a:r>
           </a:p>
@@ -5593,7 +5726,7 @@
               <a:buChar char="Ø"/>
             </a:pPr>
             <a:r>
-              <a:rPr lang="en-US" dirty="0" smtClean="0"/>
+              <a:rPr lang="en-US" dirty="0"/>
               <a:t> Use </a:t>
             </a:r>
           </a:p>
@@ -5603,7 +5736,7 @@
               <a:buChar char="Ø"/>
             </a:pPr>
             <a:r>
-              <a:rPr lang="en-US" dirty="0" smtClean="0"/>
+              <a:rPr lang="en-US" dirty="0"/>
               <a:t> New Propose Model</a:t>
             </a:r>
           </a:p>
@@ -5613,7 +5746,7 @@
               <a:buChar char="Ø"/>
             </a:pPr>
             <a:r>
-              <a:rPr lang="en-US" dirty="0" smtClean="0"/>
+              <a:rPr lang="en-US" dirty="0"/>
               <a:t> Conclusion</a:t>
             </a:r>
           </a:p>
@@ -5745,10 +5878,9 @@
           <a:p>
             <a:pPr algn="ctr"/>
             <a:r>
-              <a:rPr lang="en-US" dirty="0" smtClean="0"/>
+              <a:rPr lang="en-US" dirty="0"/>
               <a:t>DATA</a:t>
             </a:r>
-            <a:endParaRPr lang="en-US" dirty="0"/>
           </a:p>
         </p:txBody>
       </p:sp>
@@ -5769,16 +5901,8 @@
           <a:p>
             <a:pPr marL="0" lvl="1" algn="ctr"/>
             <a:r>
-              <a:rPr lang="en-US" dirty="0" smtClean="0"/>
-              <a:t>TYPES, </a:t>
-            </a:r>
-            <a:r>
-              <a:rPr lang="en-US" dirty="0"/>
-              <a:t>DATA </a:t>
-            </a:r>
-            <a:r>
-              <a:rPr lang="en-US" dirty="0" smtClean="0"/>
-              <a:t>LAKE, ANALYSIS, ANALYTICS, A vs A, ANALYTICS TOOLS</a:t>
+              <a:rPr lang="en-US" dirty="0"/>
+              <a:t>TYPES, DATA LAKE, ANALYSIS, ANALYTICS, A vs A, ANALYTICS TOOLS</a:t>
             </a:r>
           </a:p>
           <a:p>
@@ -5832,10 +5956,9 @@
           <a:lstStyle/>
           <a:p>
             <a:r>
-              <a:rPr lang="en-US" dirty="0" smtClean="0"/>
+              <a:rPr lang="en-US" dirty="0"/>
               <a:t>THE DATA</a:t>
             </a:r>
-            <a:endParaRPr lang="en-US" dirty="0"/>
           </a:p>
         </p:txBody>
       </p:sp>
@@ -5862,67 +5985,15 @@
           <a:lstStyle/>
           <a:p>
             <a:r>
-              <a:rPr lang="en-US" sz="3200" b="1" dirty="0" smtClean="0"/>
+              <a:rPr lang="en-US" sz="3200" b="1" dirty="0"/>
               <a:t>DEFINITION</a:t>
             </a:r>
           </a:p>
           <a:p>
             <a:pPr algn="justLow"/>
             <a:r>
-              <a:rPr lang="en-US" dirty="0" smtClean="0"/>
-              <a:t>It </a:t>
-            </a:r>
-            <a:r>
-              <a:rPr lang="en-US" dirty="0"/>
-              <a:t>is </a:t>
-            </a:r>
-            <a:r>
-              <a:rPr lang="en-US" dirty="0" smtClean="0"/>
-              <a:t>something that could be measured</a:t>
-            </a:r>
-            <a:r>
-              <a:rPr lang="en-US" dirty="0"/>
-              <a:t>, </a:t>
-            </a:r>
-            <a:r>
-              <a:rPr lang="en-US" dirty="0" smtClean="0"/>
-              <a:t>collected, </a:t>
-            </a:r>
-            <a:r>
-              <a:rPr lang="en-US" dirty="0"/>
-              <a:t>reported, </a:t>
-            </a:r>
-            <a:r>
-              <a:rPr lang="en-US" dirty="0" smtClean="0"/>
-              <a:t>analyzed</a:t>
-            </a:r>
-            <a:r>
-              <a:rPr lang="en-US" dirty="0"/>
-              <a:t>, </a:t>
-            </a:r>
-            <a:r>
-              <a:rPr lang="en-US" dirty="0" smtClean="0"/>
-              <a:t>stored, </a:t>
-            </a:r>
-            <a:r>
-              <a:rPr lang="en-US" dirty="0"/>
-              <a:t>and whereupon </a:t>
-            </a:r>
-            <a:r>
-              <a:rPr lang="en-US" dirty="0" smtClean="0"/>
-              <a:t>it </a:t>
-            </a:r>
-            <a:r>
-              <a:rPr lang="en-US" dirty="0"/>
-              <a:t>can be visualized using graphs, images or other </a:t>
-            </a:r>
-            <a:r>
-              <a:rPr lang="en-US" dirty="0" smtClean="0"/>
-              <a:t>analysis tools</a:t>
-            </a:r>
-            <a:r>
-              <a:rPr lang="en-US" dirty="0"/>
-              <a:t>.</a:t>
+              <a:rPr lang="en-US" dirty="0"/>
+              <a:t>It is something that could be measured, collected, reported, analyzed, stored, and whereupon it can be visualized using graphs, images or other analysis tools.</a:t>
             </a:r>
             <a:endParaRPr lang="en-US" dirty="0">
               <a:latin typeface="+mj-lt"/>
@@ -5987,10 +6058,9 @@
           <a:lstStyle/>
           <a:p>
             <a:r>
-              <a:rPr lang="en-US" dirty="0" smtClean="0"/>
+              <a:rPr lang="en-US" dirty="0"/>
               <a:t>DATA: TYPES</a:t>
             </a:r>
-            <a:endParaRPr lang="en-US" dirty="0"/>
           </a:p>
         </p:txBody>
       </p:sp>
@@ -6016,10 +6086,9 @@
               <a:buChar char="v"/>
             </a:pPr>
             <a:r>
-              <a:rPr lang="en-US" dirty="0" smtClean="0"/>
+              <a:rPr lang="en-US" dirty="0"/>
               <a:t> Observational </a:t>
             </a:r>
-            <a:endParaRPr lang="en-US" dirty="0"/>
           </a:p>
           <a:p>
             <a:pPr>
@@ -6027,10 +6096,9 @@
               <a:buChar char="v"/>
             </a:pPr>
             <a:r>
-              <a:rPr lang="en-US" dirty="0" smtClean="0"/>
+              <a:rPr lang="en-US" dirty="0"/>
               <a:t> Simulation</a:t>
             </a:r>
-            <a:endParaRPr lang="en-US" dirty="0"/>
           </a:p>
           <a:p>
             <a:pPr>
@@ -6038,10 +6106,9 @@
               <a:buChar char="v"/>
             </a:pPr>
             <a:r>
-              <a:rPr lang="en-US" dirty="0" smtClean="0"/>
+              <a:rPr lang="en-US" dirty="0"/>
               <a:t> Experimental</a:t>
             </a:r>
-            <a:endParaRPr lang="en-US" dirty="0"/>
           </a:p>
           <a:p>
             <a:pPr>
@@ -6049,10 +6116,9 @@
               <a:buChar char="v"/>
             </a:pPr>
             <a:r>
-              <a:rPr lang="en-US" dirty="0" smtClean="0"/>
+              <a:rPr lang="en-US" dirty="0"/>
               <a:t> Derived or Compiled</a:t>
             </a:r>
-            <a:endParaRPr lang="en-US" dirty="0"/>
           </a:p>
           <a:p>
             <a:pPr>
@@ -6060,10 +6126,9 @@
               <a:buChar char="v"/>
             </a:pPr>
             <a:r>
-              <a:rPr lang="en-US" dirty="0" smtClean="0"/>
+              <a:rPr lang="en-US" dirty="0"/>
               <a:t> Machine</a:t>
             </a:r>
-            <a:endParaRPr lang="en-US" dirty="0"/>
           </a:p>
           <a:p>
             <a:pPr>
@@ -6071,7 +6136,7 @@
               <a:buChar char="v"/>
             </a:pPr>
             <a:r>
-              <a:rPr lang="en-US" dirty="0" smtClean="0"/>
+              <a:rPr lang="en-US" dirty="0"/>
               <a:t> Time-stamped</a:t>
             </a:r>
           </a:p>
@@ -6081,10 +6146,9 @@
               <a:buChar char="v"/>
             </a:pPr>
             <a:r>
-              <a:rPr lang="en-US" dirty="0" smtClean="0"/>
+              <a:rPr lang="en-US" dirty="0"/>
               <a:t> Spatiotemporal </a:t>
             </a:r>
-            <a:endParaRPr lang="en-US" dirty="0"/>
           </a:p>
           <a:p>
             <a:pPr>
@@ -6092,10 +6156,9 @@
               <a:buChar char="v"/>
             </a:pPr>
             <a:r>
-              <a:rPr lang="en-US" dirty="0" smtClean="0"/>
+              <a:rPr lang="en-US" dirty="0"/>
               <a:t> Open</a:t>
             </a:r>
-            <a:endParaRPr lang="en-US" dirty="0"/>
           </a:p>
           <a:p>
             <a:pPr>
@@ -6103,7 +6166,7 @@
               <a:buChar char="v"/>
             </a:pPr>
             <a:r>
-              <a:rPr lang="en-US" dirty="0" smtClean="0"/>
+              <a:rPr lang="en-US" dirty="0"/>
               <a:t> Dark </a:t>
             </a:r>
           </a:p>
@@ -6113,10 +6176,9 @@
               <a:buChar char="v"/>
             </a:pPr>
             <a:r>
-              <a:rPr lang="en-US" dirty="0" smtClean="0"/>
+              <a:rPr lang="en-US" dirty="0"/>
               <a:t> Real time</a:t>
             </a:r>
-            <a:endParaRPr lang="en-US" dirty="0"/>
           </a:p>
           <a:p>
             <a:pPr>
@@ -6124,10 +6186,9 @@
               <a:buChar char="v"/>
             </a:pPr>
             <a:r>
-              <a:rPr lang="en-US" dirty="0" smtClean="0"/>
+              <a:rPr lang="en-US" dirty="0"/>
               <a:t> Operational</a:t>
             </a:r>
-            <a:endParaRPr lang="en-US" dirty="0"/>
           </a:p>
         </p:txBody>
       </p:sp>
@@ -6182,10 +6243,9 @@
           <a:lstStyle/>
           <a:p>
             <a:r>
-              <a:rPr lang="en-US" dirty="0" smtClean="0"/>
+              <a:rPr lang="en-US" dirty="0"/>
               <a:t>Audio	Video	Image	 Text	Num</a:t>
             </a:r>
-            <a:endParaRPr lang="en-US" dirty="0"/>
           </a:p>
         </p:txBody>
       </p:sp>
@@ -6213,65 +6273,38 @@
           <a:p>
             <a:r>
               <a:rPr lang="en-US" dirty="0"/>
-              <a:t> </a:t>
-            </a:r>
-            <a:r>
-              <a:rPr lang="en-US" dirty="0" smtClean="0"/>
-              <a:t>               Observational  	Simulation</a:t>
-            </a:r>
-            <a:endParaRPr lang="en-US" dirty="0"/>
-          </a:p>
-          <a:p>
-            <a:r>
-              <a:rPr lang="en-US" dirty="0"/>
-              <a:t> </a:t>
-            </a:r>
-            <a:r>
-              <a:rPr lang="en-US" dirty="0" smtClean="0"/>
-              <a:t>     Experimental 	    Dark	</a:t>
-            </a:r>
-            <a:r>
-              <a:rPr lang="en-US" dirty="0"/>
-              <a:t> </a:t>
-            </a:r>
-            <a:r>
-              <a:rPr lang="en-US" dirty="0" smtClean="0"/>
-              <a:t>	Derived </a:t>
-            </a:r>
-          </a:p>
-          <a:p>
-            <a:r>
-              <a:rPr lang="en-US" dirty="0"/>
-              <a:t>	</a:t>
-            </a:r>
-            <a:r>
-              <a:rPr lang="en-US" dirty="0" smtClean="0"/>
-              <a:t> Compiled 	Open  </a:t>
-            </a:r>
-          </a:p>
-          <a:p>
-            <a:r>
-              <a:rPr lang="en-US" dirty="0" smtClean="0"/>
+              <a:t>                Observational  	Simulation</a:t>
+            </a:r>
+          </a:p>
+          <a:p>
+            <a:r>
+              <a:rPr lang="en-US" dirty="0"/>
+              <a:t>      Experimental 	    Dark	 	Derived </a:t>
+            </a:r>
+          </a:p>
+          <a:p>
+            <a:r>
+              <a:rPr lang="en-US" dirty="0"/>
+              <a:t>	 Compiled 	Open  </a:t>
+            </a:r>
+          </a:p>
+          <a:p>
+            <a:r>
+              <a:rPr lang="en-US" dirty="0"/>
               <a:t>Machine            Time-stamped       Operational</a:t>
             </a:r>
-            <a:endParaRPr lang="en-US" dirty="0"/>
-          </a:p>
-          <a:p>
-            <a:r>
-              <a:rPr lang="en-US" dirty="0"/>
-              <a:t>  </a:t>
-            </a:r>
-            <a:r>
-              <a:rPr lang="en-US" dirty="0" smtClean="0"/>
-              <a:t>            Spatiotemporal        Real time</a:t>
-            </a:r>
-          </a:p>
-          <a:p>
-            <a:r>
-              <a:rPr lang="en-US" dirty="0" smtClean="0"/>
+          </a:p>
+          <a:p>
+            <a:r>
+              <a:rPr lang="en-US" dirty="0"/>
+              <a:t>              Spatiotemporal        Real time</a:t>
+            </a:r>
+          </a:p>
+          <a:p>
+            <a:r>
+              <a:rPr lang="en-US" dirty="0"/>
               <a:t>….. 	…	…..	...	…..        ... </a:t>
             </a:r>
-            <a:endParaRPr lang="en-US" dirty="0"/>
           </a:p>
         </p:txBody>
       </p:sp>
@@ -6321,10 +6354,9 @@
           <a:lstStyle/>
           <a:p>
             <a:r>
-              <a:rPr lang="en-US" dirty="0" smtClean="0"/>
+              <a:rPr lang="en-US" dirty="0"/>
               <a:t>DATA: CLASSIFICATION</a:t>
             </a:r>
-            <a:endParaRPr lang="en-US" dirty="0"/>
           </a:p>
         </p:txBody>
       </p:sp>
@@ -6356,7 +6388,7 @@
               <a:buChar char="v"/>
             </a:pPr>
             <a:r>
-              <a:rPr lang="en-US" dirty="0" smtClean="0"/>
+              <a:rPr lang="en-US" dirty="0"/>
               <a:t> Structured</a:t>
             </a:r>
           </a:p>
@@ -6366,7 +6398,7 @@
               <a:buChar char="v"/>
             </a:pPr>
             <a:r>
-              <a:rPr lang="en-US" dirty="0" smtClean="0"/>
+              <a:rPr lang="en-US" dirty="0"/>
               <a:t> Semi-structured</a:t>
             </a:r>
           </a:p>
@@ -6376,7 +6408,7 @@
               <a:buChar char="v"/>
             </a:pPr>
             <a:r>
-              <a:rPr lang="en-US" dirty="0" smtClean="0"/>
+              <a:rPr lang="en-US" dirty="0"/>
               <a:t> Unstructured</a:t>
             </a:r>
           </a:p>
@@ -6392,14 +6424,9 @@
               <a:buChar char="v"/>
             </a:pPr>
             <a:r>
-              <a:rPr lang="en-US" dirty="0" smtClean="0"/>
-              <a:t> Qualitative</a:t>
-            </a:r>
-            <a:r>
-              <a:rPr lang="en-US" dirty="0"/>
-              <a:t>   </a:t>
-            </a:r>
-            <a:endParaRPr lang="en-US" dirty="0" smtClean="0"/>
+              <a:rPr lang="en-US" dirty="0"/>
+              <a:t> Qualitative   </a:t>
+            </a:r>
           </a:p>
           <a:p>
             <a:pPr>
@@ -6407,7 +6434,7 @@
               <a:buChar char="v"/>
             </a:pPr>
             <a:r>
-              <a:rPr lang="en-US" dirty="0" smtClean="0"/>
+              <a:rPr lang="en-US" dirty="0"/>
               <a:t> Quantitative</a:t>
             </a:r>
           </a:p>
@@ -6417,7 +6444,7 @@
               <a:buChar char="v"/>
             </a:pPr>
             <a:r>
-              <a:rPr lang="en-US" dirty="0" smtClean="0"/>
+              <a:rPr lang="en-US" dirty="0"/>
               <a:t> Geographical Base</a:t>
             </a:r>
           </a:p>
@@ -6427,7 +6454,7 @@
               <a:buChar char="v"/>
             </a:pPr>
             <a:r>
-              <a:rPr lang="en-US" dirty="0" smtClean="0"/>
+              <a:rPr lang="en-US" dirty="0"/>
               <a:t> Chronological or Temporal</a:t>
             </a:r>
           </a:p>

</xml_diff>

<commit_message>
Big data tools for analysis
Few correction are made
</commit_message>
<xml_diff>
--- a/Project Interim Submission/Generic DS Framework.pptx
+++ b/Project Interim Submission/Generic DS Framework.pptx
@@ -4748,15 +4748,25 @@
             </a:pPr>
             <a:r>
               <a:rPr lang="en-US" dirty="0"/>
-              <a:t> It powers a stack of libraries including SQL and </a:t>
-            </a:r>
-            <a:r>
-              <a:rPr lang="en-US" dirty="0" err="1"/>
-              <a:t>DataFrames</a:t>
+              <a:t> It powers a stack of libraries including SQL </a:t>
+            </a:r>
+            <a:r>
+              <a:rPr lang="en-US"/>
+              <a:t>and Data Frames</a:t>
             </a:r>
             <a:r>
               <a:rPr lang="en-US" dirty="0"/>
               <a:t>, MLlib for machine learning, GraphX, and Spark Streaming</a:t>
+            </a:r>
+          </a:p>
+          <a:p>
+            <a:pPr>
+              <a:buFont typeface="Wingdings" panose="05000000000000000000" pitchFamily="2" charset="2"/>
+              <a:buChar char="v"/>
+            </a:pPr>
+            <a:r>
+              <a:rPr lang="en-US" dirty="0"/>
+              <a:t>Latest stable version is 2.4.0 with multiple advance features</a:t>
             </a:r>
             <a:endParaRPr lang="en-PK" dirty="0"/>
           </a:p>

</xml_diff>

<commit_message>
Added: Data Forms slide
Added Data Foroms slides
</commit_message>
<xml_diff>
--- a/Project Interim Submission/Generic DS Framework.pptx
+++ b/Project Interim Submission/Generic DS Framework.pptx
@@ -5,7 +5,7 @@
     <p:sldMasterId id="2147483708" r:id="rId1"/>
   </p:sldMasterIdLst>
   <p:notesMasterIdLst>
-    <p:notesMasterId r:id="rId17"/>
+    <p:notesMasterId r:id="rId19"/>
   </p:notesMasterIdLst>
   <p:sldIdLst>
     <p:sldId id="256" r:id="rId2"/>
@@ -16,13 +16,15 @@
     <p:sldId id="264" r:id="rId7"/>
     <p:sldId id="267" r:id="rId8"/>
     <p:sldId id="268" r:id="rId9"/>
-    <p:sldId id="269" r:id="rId10"/>
-    <p:sldId id="263" r:id="rId11"/>
-    <p:sldId id="261" r:id="rId12"/>
-    <p:sldId id="262" r:id="rId13"/>
-    <p:sldId id="270" r:id="rId14"/>
-    <p:sldId id="265" r:id="rId15"/>
-    <p:sldId id="266" r:id="rId16"/>
+    <p:sldId id="271" r:id="rId10"/>
+    <p:sldId id="269" r:id="rId11"/>
+    <p:sldId id="272" r:id="rId12"/>
+    <p:sldId id="263" r:id="rId13"/>
+    <p:sldId id="261" r:id="rId14"/>
+    <p:sldId id="262" r:id="rId15"/>
+    <p:sldId id="270" r:id="rId16"/>
+    <p:sldId id="265" r:id="rId17"/>
+    <p:sldId id="266" r:id="rId18"/>
   </p:sldIdLst>
   <p:sldSz cx="12192000" cy="6858000"/>
   <p:notesSz cx="6858000" cy="9144000"/>
@@ -4324,7 +4326,7 @@
       </p:grpSpPr>
       <p:sp>
         <p:nvSpPr>
-          <p:cNvPr id="4" name="Title 3"/>
+          <p:cNvPr id="2" name="Title 1"/>
           <p:cNvSpPr>
             <a:spLocks noGrp="1"/>
           </p:cNvSpPr>
@@ -4337,43 +4339,136 @@
           <a:bodyPr/>
           <a:lstStyle/>
           <a:p>
-            <a:pPr algn="ctr"/>
-            <a:r>
-              <a:rPr lang="en-US" dirty="0"/>
-              <a:t>BIG DATA</a:t>
-            </a:r>
-          </a:p>
-        </p:txBody>
-      </p:sp>
-      <p:sp>
-        <p:nvSpPr>
-          <p:cNvPr id="5" name="Text Placeholder 4"/>
-          <p:cNvSpPr>
-            <a:spLocks noGrp="1"/>
-          </p:cNvSpPr>
-          <p:nvPr>
-            <p:ph type="body" idx="1"/>
+            <a:r>
+              <a:rPr lang="en-US" dirty="0"/>
+              <a:t>DATA: CLASSIFICATION</a:t>
+            </a:r>
+          </a:p>
+        </p:txBody>
+      </p:sp>
+      <p:sp>
+        <p:nvSpPr>
+          <p:cNvPr id="3" name="Content Placeholder 2"/>
+          <p:cNvSpPr>
+            <a:spLocks noGrp="1"/>
+          </p:cNvSpPr>
+          <p:nvPr>
+            <p:ph sz="half" idx="1"/>
           </p:nvPr>
         </p:nvSpPr>
         <p:spPr/>
         <p:txBody>
           <a:bodyPr>
-            <a:normAutofit/>
+            <a:normAutofit lnSpcReduction="10000"/>
           </a:bodyPr>
           <a:lstStyle/>
           <a:p>
-            <a:pPr marL="0" lvl="1" algn="ctr"/>
-            <a:r>
-              <a:rPr lang="en-US" sz="2000" dirty="0"/>
-              <a:t>PILLARS, SOURCES, DATA LAKE, MODEL, TOOLS</a:t>
-            </a:r>
+            <a:r>
+              <a:rPr lang="en-US" sz="3200" b="1" dirty="0"/>
+              <a:t>First Level</a:t>
+            </a:r>
+          </a:p>
+          <a:p>
+            <a:pPr>
+              <a:buFont typeface="Wingdings" panose="05000000000000000000" pitchFamily="2" charset="2"/>
+              <a:buChar char="v"/>
+            </a:pPr>
+            <a:r>
+              <a:rPr lang="en-US" dirty="0"/>
+              <a:t> Structured</a:t>
+            </a:r>
+          </a:p>
+          <a:p>
+            <a:pPr>
+              <a:buFont typeface="Wingdings" panose="05000000000000000000" pitchFamily="2" charset="2"/>
+              <a:buChar char="v"/>
+            </a:pPr>
+            <a:r>
+              <a:rPr lang="en-US" dirty="0"/>
+              <a:t> Semi-structured</a:t>
+            </a:r>
+          </a:p>
+          <a:p>
+            <a:pPr>
+              <a:buFont typeface="Wingdings" panose="05000000000000000000" pitchFamily="2" charset="2"/>
+              <a:buChar char="v"/>
+            </a:pPr>
+            <a:r>
+              <a:rPr lang="en-US" dirty="0"/>
+              <a:t> Unstructured</a:t>
+            </a:r>
+          </a:p>
+          <a:p>
+            <a:r>
+              <a:rPr lang="en-US" sz="3200" b="1" dirty="0"/>
+              <a:t>Second Level</a:t>
+            </a:r>
+          </a:p>
+          <a:p>
+            <a:pPr>
+              <a:buFont typeface="Wingdings" panose="05000000000000000000" pitchFamily="2" charset="2"/>
+              <a:buChar char="v"/>
+            </a:pPr>
+            <a:r>
+              <a:rPr lang="en-US" dirty="0"/>
+              <a:t> Qualitative   </a:t>
+            </a:r>
+          </a:p>
+          <a:p>
+            <a:pPr>
+              <a:buFont typeface="Wingdings" panose="05000000000000000000" pitchFamily="2" charset="2"/>
+              <a:buChar char="v"/>
+            </a:pPr>
+            <a:r>
+              <a:rPr lang="en-US" dirty="0"/>
+              <a:t> Quantitative</a:t>
+            </a:r>
+          </a:p>
+          <a:p>
+            <a:pPr>
+              <a:buFont typeface="Wingdings" panose="05000000000000000000" pitchFamily="2" charset="2"/>
+              <a:buChar char="v"/>
+            </a:pPr>
+            <a:r>
+              <a:rPr lang="en-US" dirty="0"/>
+              <a:t> Geographical Base</a:t>
+            </a:r>
+          </a:p>
+          <a:p>
+            <a:pPr>
+              <a:buFont typeface="Wingdings" panose="05000000000000000000" pitchFamily="2" charset="2"/>
+              <a:buChar char="v"/>
+            </a:pPr>
+            <a:r>
+              <a:rPr lang="en-US" dirty="0"/>
+              <a:t> Chronological or Temporal</a:t>
+            </a:r>
+          </a:p>
+        </p:txBody>
+      </p:sp>
+      <p:sp>
+        <p:nvSpPr>
+          <p:cNvPr id="4" name="Content Placeholder 3"/>
+          <p:cNvSpPr>
+            <a:spLocks noGrp="1"/>
+          </p:cNvSpPr>
+          <p:nvPr>
+            <p:ph sz="half" idx="2"/>
+          </p:nvPr>
+        </p:nvSpPr>
+        <p:spPr/>
+        <p:txBody>
+          <a:bodyPr/>
+          <a:lstStyle/>
+          <a:p>
+            <a:endParaRPr lang="en-US"/>
           </a:p>
         </p:txBody>
       </p:sp>
     </p:spTree>
     <p:extLst>
       <p:ext uri="{BB962C8B-B14F-4D97-AF65-F5344CB8AC3E}">
-        <p14:creationId xmlns:p14="http://schemas.microsoft.com/office/powerpoint/2010/main" val="2241138064"/>
+        <p14:creationId xmlns:p14="http://schemas.microsoft.com/office/powerpoint/2010/main" val="2169991389"/>
       </p:ext>
     </p:extLst>
   </p:cSld>
@@ -4402,13 +4497,7 @@
       </p:grpSpPr>
       <p:sp>
         <p:nvSpPr>
-          <p:cNvPr id="2" name="Title 1">
-            <a:extLst>
-              <a:ext uri="{FF2B5EF4-FFF2-40B4-BE49-F238E27FC236}">
-                <a16:creationId xmlns="" xmlns:a16="http://schemas.microsoft.com/office/drawing/2014/main" id="{F4727C6F-3982-4E54-AA66-B4E0AA33FF66}"/>
-              </a:ext>
-            </a:extLst>
-          </p:cNvPr>
+          <p:cNvPr id="2" name="Title 1"/>
           <p:cNvSpPr>
             <a:spLocks noGrp="1"/>
           </p:cNvSpPr>
@@ -4422,22 +4511,16 @@
           <a:lstStyle/>
           <a:p>
             <a:r>
-              <a:rPr lang="en-US" dirty="0"/>
-              <a:t>Big Data</a:t>
-            </a:r>
-            <a:endParaRPr lang="x-none" dirty="0"/>
-          </a:p>
-        </p:txBody>
-      </p:sp>
-      <p:sp>
-        <p:nvSpPr>
-          <p:cNvPr id="3" name="Content Placeholder 2">
-            <a:extLst>
-              <a:ext uri="{FF2B5EF4-FFF2-40B4-BE49-F238E27FC236}">
-                <a16:creationId xmlns="" xmlns:a16="http://schemas.microsoft.com/office/drawing/2014/main" id="{1134DAC4-9E94-441C-A9BE-87750F6F60A2}"/>
-              </a:ext>
-            </a:extLst>
-          </p:cNvPr>
+              <a:rPr lang="en-US" dirty="0" smtClean="0"/>
+              <a:t>DATA: ANALYSIS</a:t>
+            </a:r>
+            <a:endParaRPr lang="en-US" dirty="0"/>
+          </a:p>
+        </p:txBody>
+      </p:sp>
+      <p:sp>
+        <p:nvSpPr>
+          <p:cNvPr id="5" name="Content Placeholder 4"/>
           <p:cNvSpPr>
             <a:spLocks noGrp="1"/>
           </p:cNvSpPr>
@@ -4447,41 +4530,17 @@
         </p:nvSpPr>
         <p:spPr/>
         <p:txBody>
-          <a:bodyPr>
-            <a:normAutofit/>
-          </a:bodyPr>
-          <a:lstStyle/>
-          <a:p>
-            <a:r>
-              <a:rPr lang="en-US" sz="3200" b="1" dirty="0"/>
-              <a:t>DEFINITION </a:t>
-            </a:r>
-          </a:p>
-          <a:p>
-            <a:r>
-              <a:rPr lang="en-US" dirty="0">
-                <a:latin typeface="+mj-lt"/>
-              </a:rPr>
-              <a:t>Extremely large data sets that may be analyzed computationally to reveal patterns, trends, and associations, especially relating to human behavior and interactions.</a:t>
-            </a:r>
-          </a:p>
-          <a:p>
-            <a:r>
-              <a:rPr lang="en-US" dirty="0">
-                <a:latin typeface="+mj-lt"/>
-              </a:rPr>
-              <a:t>Big data is a term that describes the large volume of data – both structured and unstructured – that inundates a business on a day-to-day basis. But it’s not the amount of data that’s important. It’s what organizations do with the data that matters. Big data can be analyzed for insights that lead to better decisions and strategic business moves.</a:t>
-            </a:r>
-          </a:p>
-          <a:p>
-            <a:endParaRPr lang="x-none" dirty="0"/>
+          <a:bodyPr/>
+          <a:lstStyle/>
+          <a:p>
+            <a:endParaRPr lang="en-US"/>
           </a:p>
         </p:txBody>
       </p:sp>
     </p:spTree>
     <p:extLst>
       <p:ext uri="{BB962C8B-B14F-4D97-AF65-F5344CB8AC3E}">
-        <p14:creationId xmlns:p14="http://schemas.microsoft.com/office/powerpoint/2010/main" val="196455147"/>
+        <p14:creationId xmlns:p14="http://schemas.microsoft.com/office/powerpoint/2010/main" val="3881154302"/>
       </p:ext>
     </p:extLst>
   </p:cSld>
@@ -4510,13 +4569,7 @@
       </p:grpSpPr>
       <p:sp>
         <p:nvSpPr>
-          <p:cNvPr id="2" name="Title 1">
-            <a:extLst>
-              <a:ext uri="{FF2B5EF4-FFF2-40B4-BE49-F238E27FC236}">
-                <a16:creationId xmlns="" xmlns:a16="http://schemas.microsoft.com/office/drawing/2014/main" id="{3E1AC600-D16C-47B7-9075-94DA61007B25}"/>
-              </a:ext>
-            </a:extLst>
-          </p:cNvPr>
+          <p:cNvPr id="4" name="Title 3"/>
           <p:cNvSpPr>
             <a:spLocks noGrp="1"/>
           </p:cNvSpPr>
@@ -4524,102 +4577,40 @@
             <p:ph type="title"/>
           </p:nvPr>
         </p:nvSpPr>
-        <p:spPr>
-          <a:xfrm>
-            <a:off x="1097280" y="286603"/>
-            <a:ext cx="10058400" cy="1450757"/>
-          </a:xfrm>
-        </p:spPr>
+        <p:spPr/>
         <p:txBody>
           <a:bodyPr/>
           <a:lstStyle/>
           <a:p>
-            <a:r>
-              <a:rPr lang="en-US" dirty="0"/>
-              <a:t>Big Data: Tools</a:t>
-            </a:r>
-            <a:endParaRPr lang="x-none" dirty="0"/>
-          </a:p>
-        </p:txBody>
-      </p:sp>
-      <p:sp>
-        <p:nvSpPr>
-          <p:cNvPr id="3" name="Content Placeholder 2">
-            <a:extLst>
-              <a:ext uri="{FF2B5EF4-FFF2-40B4-BE49-F238E27FC236}">
-                <a16:creationId xmlns="" xmlns:a16="http://schemas.microsoft.com/office/drawing/2014/main" id="{DDC8679B-3323-4E4B-ABD6-BD8748DF3AEB}"/>
-              </a:ext>
-            </a:extLst>
-          </p:cNvPr>
-          <p:cNvSpPr>
-            <a:spLocks noGrp="1"/>
-          </p:cNvSpPr>
-          <p:nvPr>
-            <p:ph idx="1"/>
+            <a:pPr algn="ctr"/>
+            <a:r>
+              <a:rPr lang="en-US" dirty="0"/>
+              <a:t>BIG DATA</a:t>
+            </a:r>
+          </a:p>
+        </p:txBody>
+      </p:sp>
+      <p:sp>
+        <p:nvSpPr>
+          <p:cNvPr id="5" name="Text Placeholder 4"/>
+          <p:cNvSpPr>
+            <a:spLocks noGrp="1"/>
+          </p:cNvSpPr>
+          <p:nvPr>
+            <p:ph type="body" idx="1"/>
           </p:nvPr>
         </p:nvSpPr>
         <p:spPr/>
         <p:txBody>
-          <a:bodyPr/>
-          <a:lstStyle/>
-          <a:p>
-            <a:pPr marL="0" indent="0">
-              <a:buNone/>
-            </a:pPr>
-            <a:r>
-              <a:rPr lang="en-US" sz="3200" b="1" dirty="0"/>
-              <a:t>Hadoop</a:t>
-            </a:r>
-            <a:endParaRPr lang="en-US" b="1" dirty="0"/>
-          </a:p>
-          <a:p>
-            <a:pPr>
-              <a:buFont typeface="Wingdings" panose="05000000000000000000" pitchFamily="2" charset="2"/>
-              <a:buChar char="v"/>
-            </a:pPr>
-            <a:r>
-              <a:rPr lang="en-US" dirty="0"/>
-              <a:t>Hadoop software library is a framework</a:t>
-            </a:r>
-          </a:p>
-          <a:p>
-            <a:pPr>
-              <a:buFont typeface="Wingdings" panose="05000000000000000000" pitchFamily="2" charset="2"/>
-              <a:buChar char="v"/>
-            </a:pPr>
-            <a:r>
-              <a:rPr lang="en-US" dirty="0"/>
-              <a:t>Help in distributed processing of large data sets across clusters of computers</a:t>
-            </a:r>
-          </a:p>
-          <a:p>
-            <a:pPr>
-              <a:buFont typeface="Wingdings" panose="05000000000000000000" pitchFamily="2" charset="2"/>
-              <a:buChar char="v"/>
-            </a:pPr>
-            <a:r>
-              <a:rPr lang="en-US" dirty="0"/>
-              <a:t>Two method to start single node or cluster mode</a:t>
-            </a:r>
-          </a:p>
-          <a:p>
-            <a:pPr>
-              <a:buFont typeface="Wingdings" panose="05000000000000000000" pitchFamily="2" charset="2"/>
-              <a:buChar char="v"/>
-            </a:pPr>
-            <a:r>
-              <a:rPr lang="en-US" dirty="0"/>
-              <a:t>Latest stable version is 2.9.2 </a:t>
-            </a:r>
-          </a:p>
-          <a:p>
-            <a:pPr>
-              <a:buFont typeface="Wingdings" panose="05000000000000000000" pitchFamily="2" charset="2"/>
-              <a:buChar char="v"/>
-            </a:pPr>
-            <a:r>
-              <a:rPr lang="en-US" dirty="0"/>
-              <a:t>Few Important features are HDFS, YARN,MAPREDUCE, cost efficient, Hadoop libraries and many more</a:t>
+          <a:bodyPr>
+            <a:normAutofit/>
+          </a:bodyPr>
+          <a:lstStyle/>
+          <a:p>
+            <a:pPr marL="0" lvl="1" algn="ctr"/>
+            <a:r>
+              <a:rPr lang="en-US" sz="2000" dirty="0"/>
+              <a:t>PILLARS, SOURCES, DATA LAKE, MODEL, TOOLS</a:t>
             </a:r>
           </a:p>
         </p:txBody>
@@ -4627,7 +4618,7 @@
     </p:spTree>
     <p:extLst>
       <p:ext uri="{BB962C8B-B14F-4D97-AF65-F5344CB8AC3E}">
-        <p14:creationId xmlns:p14="http://schemas.microsoft.com/office/powerpoint/2010/main" val="2845727905"/>
+        <p14:creationId xmlns:p14="http://schemas.microsoft.com/office/powerpoint/2010/main" val="2241138064"/>
       </p:ext>
     </p:extLst>
   </p:cSld>
@@ -4656,10 +4647,39 @@
       </p:grpSpPr>
       <p:sp>
         <p:nvSpPr>
+          <p:cNvPr id="2" name="Title 1">
+            <a:extLst>
+              <a:ext uri="{FF2B5EF4-FFF2-40B4-BE49-F238E27FC236}">
+                <a16:creationId xmlns:a16="http://schemas.microsoft.com/office/drawing/2014/main" xmlns="" id="{F4727C6F-3982-4E54-AA66-B4E0AA33FF66}"/>
+              </a:ext>
+            </a:extLst>
+          </p:cNvPr>
+          <p:cNvSpPr>
+            <a:spLocks noGrp="1"/>
+          </p:cNvSpPr>
+          <p:nvPr>
+            <p:ph type="title"/>
+          </p:nvPr>
+        </p:nvSpPr>
+        <p:spPr/>
+        <p:txBody>
+          <a:bodyPr/>
+          <a:lstStyle/>
+          <a:p>
+            <a:r>
+              <a:rPr lang="en-US" dirty="0"/>
+              <a:t>Big Data</a:t>
+            </a:r>
+            <a:endParaRPr lang="x-none" dirty="0"/>
+          </a:p>
+        </p:txBody>
+      </p:sp>
+      <p:sp>
+        <p:nvSpPr>
           <p:cNvPr id="3" name="Content Placeholder 2">
             <a:extLst>
               <a:ext uri="{FF2B5EF4-FFF2-40B4-BE49-F238E27FC236}">
-                <a16:creationId xmlns="" xmlns:a16="http://schemas.microsoft.com/office/drawing/2014/main" id="{12CE7563-67E4-470C-A76A-FD376D4C2471}"/>
+                <a16:creationId xmlns:a16="http://schemas.microsoft.com/office/drawing/2014/main" xmlns="" id="{1134DAC4-9E94-441C-A9BE-87750F6F60A2}"/>
               </a:ext>
             </a:extLst>
           </p:cNvPr>
@@ -4678,130 +4698,27 @@
           <a:lstStyle/>
           <a:p>
             <a:r>
-              <a:rPr lang="en-US" sz="3200" dirty="0"/>
-              <a:t>SPARK</a:t>
-            </a:r>
-          </a:p>
-          <a:p>
-            <a:pPr>
-              <a:buFont typeface="Wingdings" panose="05000000000000000000" pitchFamily="2" charset="2"/>
-              <a:buChar char="v"/>
-            </a:pPr>
-            <a:r>
-              <a:rPr lang="x-none" dirty="0"/>
-              <a:t>Apache Spark is the alternative — and in many aspects the successor — of Apache Hadoop. </a:t>
-            </a:r>
-            <a:endParaRPr lang="en-US" dirty="0"/>
-          </a:p>
-          <a:p>
-            <a:pPr>
-              <a:buFont typeface="Wingdings" panose="05000000000000000000" pitchFamily="2" charset="2"/>
-              <a:buChar char="v"/>
-            </a:pPr>
-            <a:r>
-              <a:rPr lang="en-US" dirty="0"/>
-              <a:t>Built </a:t>
-            </a:r>
-            <a:r>
-              <a:rPr lang="x-none" dirty="0"/>
-              <a:t>to address the shortcomings of Hadoop</a:t>
-            </a:r>
-            <a:r>
-              <a:rPr lang="en-US" dirty="0"/>
-              <a:t>.</a:t>
-            </a:r>
-          </a:p>
-          <a:p>
-            <a:pPr>
-              <a:buFont typeface="Wingdings" panose="05000000000000000000" pitchFamily="2" charset="2"/>
-              <a:buChar char="v"/>
-            </a:pPr>
-            <a:r>
-              <a:rPr lang="en-US" dirty="0"/>
-              <a:t>Apache Spark achieves high performance for both batch and streaming data.</a:t>
-            </a:r>
-          </a:p>
-          <a:p>
-            <a:pPr>
-              <a:buFont typeface="Wingdings" panose="05000000000000000000" pitchFamily="2" charset="2"/>
-              <a:buChar char="v"/>
-            </a:pPr>
-            <a:r>
-              <a:rPr lang="en-US" dirty="0"/>
-              <a:t>Run workload 100X faster.</a:t>
-            </a:r>
-          </a:p>
-          <a:p>
-            <a:pPr>
-              <a:buFont typeface="Wingdings" panose="05000000000000000000" pitchFamily="2" charset="2"/>
-              <a:buChar char="v"/>
-            </a:pPr>
-            <a:r>
-              <a:rPr lang="en-US" dirty="0"/>
-              <a:t>Offers over 80 high-level operators that make it easy to build parallel apps.</a:t>
-            </a:r>
-          </a:p>
-          <a:p>
-            <a:pPr>
-              <a:buFont typeface="Wingdings" panose="05000000000000000000" pitchFamily="2" charset="2"/>
-              <a:buChar char="v"/>
-            </a:pPr>
-            <a:r>
-              <a:rPr lang="en-US" dirty="0"/>
-              <a:t> It powers a stack of libraries including SQL </a:t>
-            </a:r>
-            <a:r>
-              <a:rPr lang="en-US"/>
-              <a:t>and Data Frames</a:t>
-            </a:r>
-            <a:r>
-              <a:rPr lang="en-US" dirty="0"/>
-              <a:t>, MLlib for machine learning, GraphX, and Spark Streaming</a:t>
-            </a:r>
-          </a:p>
-          <a:p>
-            <a:pPr>
-              <a:buFont typeface="Wingdings" panose="05000000000000000000" pitchFamily="2" charset="2"/>
-              <a:buChar char="v"/>
-            </a:pPr>
-            <a:r>
-              <a:rPr lang="en-US" dirty="0"/>
-              <a:t>Latest stable version is 2.4.0 with multiple advance features</a:t>
-            </a:r>
-            <a:endParaRPr lang="x-none" dirty="0"/>
-          </a:p>
-        </p:txBody>
-      </p:sp>
-      <p:sp>
-        <p:nvSpPr>
-          <p:cNvPr id="4" name="Title 1">
-            <a:extLst>
-              <a:ext uri="{FF2B5EF4-FFF2-40B4-BE49-F238E27FC236}">
-                <a16:creationId xmlns="" xmlns:a16="http://schemas.microsoft.com/office/drawing/2014/main" id="{D1F22F75-6806-481E-A0D8-FC161C3266D1}"/>
-              </a:ext>
-            </a:extLst>
-          </p:cNvPr>
-          <p:cNvSpPr>
-            <a:spLocks noGrp="1"/>
-          </p:cNvSpPr>
-          <p:nvPr>
-            <p:ph type="title"/>
-          </p:nvPr>
-        </p:nvSpPr>
-        <p:spPr>
-          <a:xfrm>
-            <a:off x="1096963" y="287338"/>
-            <a:ext cx="10058400" cy="1449387"/>
-          </a:xfrm>
-        </p:spPr>
-        <p:txBody>
-          <a:bodyPr/>
-          <a:lstStyle/>
-          <a:p>
-            <a:r>
-              <a:rPr lang="en-US" dirty="0"/>
-              <a:t>Big Data: Tools</a:t>
-            </a:r>
+              <a:rPr lang="en-US" sz="3200" b="1" dirty="0"/>
+              <a:t>DEFINITION </a:t>
+            </a:r>
+          </a:p>
+          <a:p>
+            <a:r>
+              <a:rPr lang="en-US" dirty="0">
+                <a:latin typeface="+mj-lt"/>
+              </a:rPr>
+              <a:t>Extremely large data sets that may be analyzed computationally to reveal patterns, trends, and associations, especially relating to human behavior and interactions.</a:t>
+            </a:r>
+          </a:p>
+          <a:p>
+            <a:r>
+              <a:rPr lang="en-US" dirty="0">
+                <a:latin typeface="+mj-lt"/>
+              </a:rPr>
+              <a:t>Big data is a term that describes the large volume of data – both structured and unstructured – that inundates a business on a day-to-day basis. But it’s not the amount of data that’s important. It’s what organizations do with the data that matters. Big data can be analyzed for insights that lead to better decisions and strategic business moves.</a:t>
+            </a:r>
+          </a:p>
+          <a:p>
             <a:endParaRPr lang="x-none" dirty="0"/>
           </a:p>
         </p:txBody>
@@ -4809,7 +4726,7 @@
     </p:spTree>
     <p:extLst>
       <p:ext uri="{BB962C8B-B14F-4D97-AF65-F5344CB8AC3E}">
-        <p14:creationId xmlns:p14="http://schemas.microsoft.com/office/powerpoint/2010/main" val="2181567895"/>
+        <p14:creationId xmlns:p14="http://schemas.microsoft.com/office/powerpoint/2010/main" val="196455147"/>
       </p:ext>
     </p:extLst>
   </p:cSld>
@@ -4838,6 +4755,334 @@
       </p:grpSpPr>
       <p:sp>
         <p:nvSpPr>
+          <p:cNvPr id="2" name="Title 1">
+            <a:extLst>
+              <a:ext uri="{FF2B5EF4-FFF2-40B4-BE49-F238E27FC236}">
+                <a16:creationId xmlns:a16="http://schemas.microsoft.com/office/drawing/2014/main" xmlns="" id="{3E1AC600-D16C-47B7-9075-94DA61007B25}"/>
+              </a:ext>
+            </a:extLst>
+          </p:cNvPr>
+          <p:cNvSpPr>
+            <a:spLocks noGrp="1"/>
+          </p:cNvSpPr>
+          <p:nvPr>
+            <p:ph type="title"/>
+          </p:nvPr>
+        </p:nvSpPr>
+        <p:spPr>
+          <a:xfrm>
+            <a:off x="1097280" y="286603"/>
+            <a:ext cx="10058400" cy="1450757"/>
+          </a:xfrm>
+        </p:spPr>
+        <p:txBody>
+          <a:bodyPr/>
+          <a:lstStyle/>
+          <a:p>
+            <a:r>
+              <a:rPr lang="en-US" dirty="0"/>
+              <a:t>Big Data: Tools</a:t>
+            </a:r>
+            <a:endParaRPr lang="x-none" dirty="0"/>
+          </a:p>
+        </p:txBody>
+      </p:sp>
+      <p:sp>
+        <p:nvSpPr>
+          <p:cNvPr id="3" name="Content Placeholder 2">
+            <a:extLst>
+              <a:ext uri="{FF2B5EF4-FFF2-40B4-BE49-F238E27FC236}">
+                <a16:creationId xmlns:a16="http://schemas.microsoft.com/office/drawing/2014/main" xmlns="" id="{DDC8679B-3323-4E4B-ABD6-BD8748DF3AEB}"/>
+              </a:ext>
+            </a:extLst>
+          </p:cNvPr>
+          <p:cNvSpPr>
+            <a:spLocks noGrp="1"/>
+          </p:cNvSpPr>
+          <p:nvPr>
+            <p:ph idx="1"/>
+          </p:nvPr>
+        </p:nvSpPr>
+        <p:spPr/>
+        <p:txBody>
+          <a:bodyPr/>
+          <a:lstStyle/>
+          <a:p>
+            <a:pPr marL="0" indent="0">
+              <a:buNone/>
+            </a:pPr>
+            <a:r>
+              <a:rPr lang="en-US" sz="3200" b="1" dirty="0"/>
+              <a:t>Hadoop</a:t>
+            </a:r>
+            <a:endParaRPr lang="en-US" b="1" dirty="0"/>
+          </a:p>
+          <a:p>
+            <a:pPr>
+              <a:buFont typeface="Wingdings" panose="05000000000000000000" pitchFamily="2" charset="2"/>
+              <a:buChar char="v"/>
+            </a:pPr>
+            <a:r>
+              <a:rPr lang="en-US" dirty="0"/>
+              <a:t>Hadoop software library is a framework</a:t>
+            </a:r>
+          </a:p>
+          <a:p>
+            <a:pPr>
+              <a:buFont typeface="Wingdings" panose="05000000000000000000" pitchFamily="2" charset="2"/>
+              <a:buChar char="v"/>
+            </a:pPr>
+            <a:r>
+              <a:rPr lang="en-US" dirty="0"/>
+              <a:t>Help in distributed processing of large data sets across clusters of computers</a:t>
+            </a:r>
+          </a:p>
+          <a:p>
+            <a:pPr>
+              <a:buFont typeface="Wingdings" panose="05000000000000000000" pitchFamily="2" charset="2"/>
+              <a:buChar char="v"/>
+            </a:pPr>
+            <a:r>
+              <a:rPr lang="en-US" dirty="0"/>
+              <a:t>Two method to start single node or cluster mode</a:t>
+            </a:r>
+          </a:p>
+          <a:p>
+            <a:pPr>
+              <a:buFont typeface="Wingdings" panose="05000000000000000000" pitchFamily="2" charset="2"/>
+              <a:buChar char="v"/>
+            </a:pPr>
+            <a:r>
+              <a:rPr lang="en-US" dirty="0"/>
+              <a:t>Latest stable version is 2.9.2 </a:t>
+            </a:r>
+          </a:p>
+          <a:p>
+            <a:pPr>
+              <a:buFont typeface="Wingdings" panose="05000000000000000000" pitchFamily="2" charset="2"/>
+              <a:buChar char="v"/>
+            </a:pPr>
+            <a:r>
+              <a:rPr lang="en-US" dirty="0"/>
+              <a:t>Few Important features are HDFS, YARN,MAPREDUCE, cost efficient, Hadoop libraries and many more</a:t>
+            </a:r>
+          </a:p>
+        </p:txBody>
+      </p:sp>
+    </p:spTree>
+    <p:extLst>
+      <p:ext uri="{BB962C8B-B14F-4D97-AF65-F5344CB8AC3E}">
+        <p14:creationId xmlns:p14="http://schemas.microsoft.com/office/powerpoint/2010/main" val="2845727905"/>
+      </p:ext>
+    </p:extLst>
+  </p:cSld>
+  <p:clrMapOvr>
+    <a:masterClrMapping/>
+  </p:clrMapOvr>
+</p:sld>
+</file>
+
+<file path=ppt/slides/slide15.xml><?xml version="1.0" encoding="utf-8"?>
+<p:sld xmlns:a="http://schemas.openxmlformats.org/drawingml/2006/main" xmlns:r="http://schemas.openxmlformats.org/officeDocument/2006/relationships" xmlns:p="http://schemas.openxmlformats.org/presentationml/2006/main">
+  <p:cSld>
+    <p:spTree>
+      <p:nvGrpSpPr>
+        <p:cNvPr id="1" name=""/>
+        <p:cNvGrpSpPr/>
+        <p:nvPr/>
+      </p:nvGrpSpPr>
+      <p:grpSpPr>
+        <a:xfrm>
+          <a:off x="0" y="0"/>
+          <a:ext cx="0" cy="0"/>
+          <a:chOff x="0" y="0"/>
+          <a:chExt cx="0" cy="0"/>
+        </a:xfrm>
+      </p:grpSpPr>
+      <p:sp>
+        <p:nvSpPr>
+          <p:cNvPr id="3" name="Content Placeholder 2">
+            <a:extLst>
+              <a:ext uri="{FF2B5EF4-FFF2-40B4-BE49-F238E27FC236}">
+                <a16:creationId xmlns:a16="http://schemas.microsoft.com/office/drawing/2014/main" xmlns="" id="{12CE7563-67E4-470C-A76A-FD376D4C2471}"/>
+              </a:ext>
+            </a:extLst>
+          </p:cNvPr>
+          <p:cNvSpPr>
+            <a:spLocks noGrp="1"/>
+          </p:cNvSpPr>
+          <p:nvPr>
+            <p:ph idx="1"/>
+          </p:nvPr>
+        </p:nvSpPr>
+        <p:spPr/>
+        <p:txBody>
+          <a:bodyPr>
+            <a:normAutofit/>
+          </a:bodyPr>
+          <a:lstStyle/>
+          <a:p>
+            <a:r>
+              <a:rPr lang="en-US" sz="3200" dirty="0"/>
+              <a:t>SPARK</a:t>
+            </a:r>
+          </a:p>
+          <a:p>
+            <a:pPr>
+              <a:buFont typeface="Wingdings" panose="05000000000000000000" pitchFamily="2" charset="2"/>
+              <a:buChar char="v"/>
+            </a:pPr>
+            <a:r>
+              <a:rPr lang="x-none" dirty="0"/>
+              <a:t>Apache Spark is the alternative — and in many aspects the successor — of Apache Hadoop. </a:t>
+            </a:r>
+            <a:endParaRPr lang="en-US" dirty="0"/>
+          </a:p>
+          <a:p>
+            <a:pPr>
+              <a:buFont typeface="Wingdings" panose="05000000000000000000" pitchFamily="2" charset="2"/>
+              <a:buChar char="v"/>
+            </a:pPr>
+            <a:r>
+              <a:rPr lang="en-US" dirty="0"/>
+              <a:t>Built </a:t>
+            </a:r>
+            <a:r>
+              <a:rPr lang="x-none" dirty="0"/>
+              <a:t>to address the shortcomings of Hadoop</a:t>
+            </a:r>
+            <a:r>
+              <a:rPr lang="en-US" dirty="0"/>
+              <a:t>.</a:t>
+            </a:r>
+          </a:p>
+          <a:p>
+            <a:pPr>
+              <a:buFont typeface="Wingdings" panose="05000000000000000000" pitchFamily="2" charset="2"/>
+              <a:buChar char="v"/>
+            </a:pPr>
+            <a:r>
+              <a:rPr lang="en-US" dirty="0"/>
+              <a:t>Apache Spark achieves high performance for both batch and streaming data.</a:t>
+            </a:r>
+          </a:p>
+          <a:p>
+            <a:pPr>
+              <a:buFont typeface="Wingdings" panose="05000000000000000000" pitchFamily="2" charset="2"/>
+              <a:buChar char="v"/>
+            </a:pPr>
+            <a:r>
+              <a:rPr lang="en-US" dirty="0"/>
+              <a:t>Run workload 100X faster.</a:t>
+            </a:r>
+          </a:p>
+          <a:p>
+            <a:pPr>
+              <a:buFont typeface="Wingdings" panose="05000000000000000000" pitchFamily="2" charset="2"/>
+              <a:buChar char="v"/>
+            </a:pPr>
+            <a:r>
+              <a:rPr lang="en-US" dirty="0"/>
+              <a:t>Offers over 80 high-level operators that make it easy to build parallel apps.</a:t>
+            </a:r>
+          </a:p>
+          <a:p>
+            <a:pPr>
+              <a:buFont typeface="Wingdings" panose="05000000000000000000" pitchFamily="2" charset="2"/>
+              <a:buChar char="v"/>
+            </a:pPr>
+            <a:r>
+              <a:rPr lang="en-US" dirty="0"/>
+              <a:t> It powers a stack of libraries including SQL </a:t>
+            </a:r>
+            <a:r>
+              <a:rPr lang="en-US"/>
+              <a:t>and Data Frames</a:t>
+            </a:r>
+            <a:r>
+              <a:rPr lang="en-US" dirty="0"/>
+              <a:t>, MLlib for machine learning, GraphX, and Spark Streaming</a:t>
+            </a:r>
+          </a:p>
+          <a:p>
+            <a:pPr>
+              <a:buFont typeface="Wingdings" panose="05000000000000000000" pitchFamily="2" charset="2"/>
+              <a:buChar char="v"/>
+            </a:pPr>
+            <a:r>
+              <a:rPr lang="en-US" dirty="0"/>
+              <a:t>Latest stable version is 2.4.0 with multiple advance features</a:t>
+            </a:r>
+            <a:endParaRPr lang="x-none" dirty="0"/>
+          </a:p>
+        </p:txBody>
+      </p:sp>
+      <p:sp>
+        <p:nvSpPr>
+          <p:cNvPr id="4" name="Title 1">
+            <a:extLst>
+              <a:ext uri="{FF2B5EF4-FFF2-40B4-BE49-F238E27FC236}">
+                <a16:creationId xmlns:a16="http://schemas.microsoft.com/office/drawing/2014/main" xmlns="" id="{D1F22F75-6806-481E-A0D8-FC161C3266D1}"/>
+              </a:ext>
+            </a:extLst>
+          </p:cNvPr>
+          <p:cNvSpPr>
+            <a:spLocks noGrp="1"/>
+          </p:cNvSpPr>
+          <p:nvPr>
+            <p:ph type="title"/>
+          </p:nvPr>
+        </p:nvSpPr>
+        <p:spPr>
+          <a:xfrm>
+            <a:off x="1096963" y="287338"/>
+            <a:ext cx="10058400" cy="1449387"/>
+          </a:xfrm>
+        </p:spPr>
+        <p:txBody>
+          <a:bodyPr/>
+          <a:lstStyle/>
+          <a:p>
+            <a:r>
+              <a:rPr lang="en-US" dirty="0"/>
+              <a:t>Big Data: Tools</a:t>
+            </a:r>
+            <a:endParaRPr lang="x-none" dirty="0"/>
+          </a:p>
+        </p:txBody>
+      </p:sp>
+    </p:spTree>
+    <p:extLst>
+      <p:ext uri="{BB962C8B-B14F-4D97-AF65-F5344CB8AC3E}">
+        <p14:creationId xmlns:p14="http://schemas.microsoft.com/office/powerpoint/2010/main" val="2181567895"/>
+      </p:ext>
+    </p:extLst>
+  </p:cSld>
+  <p:clrMapOvr>
+    <a:masterClrMapping/>
+  </p:clrMapOvr>
+</p:sld>
+</file>
+
+<file path=ppt/slides/slide16.xml><?xml version="1.0" encoding="utf-8"?>
+<p:sld xmlns:a="http://schemas.openxmlformats.org/drawingml/2006/main" xmlns:r="http://schemas.openxmlformats.org/officeDocument/2006/relationships" xmlns:p="http://schemas.openxmlformats.org/presentationml/2006/main">
+  <p:cSld>
+    <p:spTree>
+      <p:nvGrpSpPr>
+        <p:cNvPr id="1" name=""/>
+        <p:cNvGrpSpPr/>
+        <p:nvPr/>
+      </p:nvGrpSpPr>
+      <p:grpSpPr>
+        <a:xfrm>
+          <a:off x="0" y="0"/>
+          <a:ext cx="0" cy="0"/>
+          <a:chOff x="0" y="0"/>
+          <a:chExt cx="0" cy="0"/>
+        </a:xfrm>
+      </p:grpSpPr>
+      <p:sp>
+        <p:nvSpPr>
           <p:cNvPr id="2" name="Title 1"/>
           <p:cNvSpPr>
             <a:spLocks noGrp="1"/>
@@ -4895,7 +5140,7 @@
 </p:sld>
 </file>
 
-<file path=ppt/slides/slide15.xml><?xml version="1.0" encoding="utf-8"?>
+<file path=ppt/slides/slide17.xml><?xml version="1.0" encoding="utf-8"?>
 <p:sld xmlns:a="http://schemas.openxmlformats.org/drawingml/2006/main" xmlns:r="http://schemas.openxmlformats.org/officeDocument/2006/relationships" xmlns:p="http://schemas.openxmlformats.org/presentationml/2006/main">
   <p:cSld>
     <p:spTree>
@@ -5159,14 +5404,14 @@
                 <a:gridCol w="5035931">
                   <a:extLst>
                     <a:ext uri="{9D8B030D-6E8A-4147-A177-3AD203B41FA5}">
-                      <a16:colId xmlns="" xmlns:a16="http://schemas.microsoft.com/office/drawing/2014/main" val="20000"/>
+                      <a16:colId xmlns:a16="http://schemas.microsoft.com/office/drawing/2014/main" xmlns="" val="20000"/>
                     </a:ext>
                   </a:extLst>
                 </a:gridCol>
                 <a:gridCol w="5022469">
                   <a:extLst>
                     <a:ext uri="{9D8B030D-6E8A-4147-A177-3AD203B41FA5}">
-                      <a16:colId xmlns="" xmlns:a16="http://schemas.microsoft.com/office/drawing/2014/main" val="20001"/>
+                      <a16:colId xmlns:a16="http://schemas.microsoft.com/office/drawing/2014/main" xmlns="" val="20001"/>
                     </a:ext>
                   </a:extLst>
                 </a:gridCol>
@@ -5246,7 +5491,7 @@
                 </a:tc>
                 <a:extLst>
                   <a:ext uri="{0D108BD9-81ED-4DB2-BD59-A6C34878D82A}">
-                    <a16:rowId xmlns="" xmlns:a16="http://schemas.microsoft.com/office/drawing/2014/main" val="10000"/>
+                    <a16:rowId xmlns:a16="http://schemas.microsoft.com/office/drawing/2014/main" xmlns="" val="10000"/>
                   </a:ext>
                 </a:extLst>
               </a:tr>
@@ -5333,7 +5578,7 @@
                 </a:tc>
                 <a:extLst>
                   <a:ext uri="{0D108BD9-81ED-4DB2-BD59-A6C34878D82A}">
-                    <a16:rowId xmlns="" xmlns:a16="http://schemas.microsoft.com/office/drawing/2014/main" val="10001"/>
+                    <a16:rowId xmlns:a16="http://schemas.microsoft.com/office/drawing/2014/main" xmlns="" val="10001"/>
                   </a:ext>
                 </a:extLst>
               </a:tr>
@@ -5436,7 +5681,7 @@
                 </a:tc>
                 <a:extLst>
                   <a:ext uri="{0D108BD9-81ED-4DB2-BD59-A6C34878D82A}">
-                    <a16:rowId xmlns="" xmlns:a16="http://schemas.microsoft.com/office/drawing/2014/main" val="10002"/>
+                    <a16:rowId xmlns:a16="http://schemas.microsoft.com/office/drawing/2014/main" xmlns="" val="10002"/>
                   </a:ext>
                 </a:extLst>
               </a:tr>
@@ -5545,11 +5790,7 @@
             </a:pPr>
             <a:r>
               <a:rPr lang="en-US" dirty="0" smtClean="0"/>
-              <a:t> Forms, Types, Classification</a:t>
-            </a:r>
-            <a:r>
-              <a:rPr lang="en-US" dirty="0" smtClean="0"/>
-              <a:t> </a:t>
+              <a:t> Forms, Types, Classification </a:t>
             </a:r>
           </a:p>
           <a:p>
@@ -6102,8 +6343,13 @@
           <a:p>
             <a:r>
               <a:rPr lang="en-US" dirty="0"/>
-              <a:t>DATA: TYPES</a:t>
-            </a:r>
+              <a:t>DATA: </a:t>
+            </a:r>
+            <a:r>
+              <a:rPr lang="en-US" dirty="0" smtClean="0"/>
+              <a:t>FORMS</a:t>
+            </a:r>
+            <a:endParaRPr lang="en-US" dirty="0"/>
           </a:p>
         </p:txBody>
       </p:sp>
@@ -6120,17 +6366,26 @@
         <p:spPr/>
         <p:txBody>
           <a:bodyPr>
-            <a:normAutofit fontScale="85000" lnSpcReduction="20000"/>
+            <a:normAutofit/>
           </a:bodyPr>
           <a:lstStyle/>
+          <a:p>
+            <a:pPr marL="0" indent="0">
+              <a:buNone/>
+            </a:pPr>
+            <a:r>
+              <a:rPr lang="en-US" sz="3200" b="1" dirty="0"/>
+              <a:t>CORE DATA FORMS</a:t>
+            </a:r>
+          </a:p>
           <a:p>
             <a:pPr>
               <a:buFont typeface="Wingdings" panose="05000000000000000000" pitchFamily="2" charset="2"/>
               <a:buChar char="v"/>
             </a:pPr>
             <a:r>
-              <a:rPr lang="en-US" dirty="0"/>
-              <a:t> Observational </a:t>
+              <a:rPr lang="en-US" dirty="0" smtClean="0"/>
+              <a:t> Number</a:t>
             </a:r>
           </a:p>
           <a:p>
@@ -6140,7 +6395,11 @@
             </a:pPr>
             <a:r>
               <a:rPr lang="en-US" dirty="0"/>
-              <a:t> Simulation</a:t>
+              <a:t> </a:t>
+            </a:r>
+            <a:r>
+              <a:rPr lang="en-US" dirty="0" smtClean="0"/>
+              <a:t>Text</a:t>
             </a:r>
           </a:p>
           <a:p>
@@ -6150,7 +6409,11 @@
             </a:pPr>
             <a:r>
               <a:rPr lang="en-US" dirty="0"/>
-              <a:t> Experimental</a:t>
+              <a:t> </a:t>
+            </a:r>
+            <a:r>
+              <a:rPr lang="en-US" dirty="0" smtClean="0"/>
+              <a:t>Image</a:t>
             </a:r>
           </a:p>
           <a:p>
@@ -6160,7 +6423,11 @@
             </a:pPr>
             <a:r>
               <a:rPr lang="en-US" dirty="0"/>
-              <a:t> Derived or Compiled</a:t>
+              <a:t> </a:t>
+            </a:r>
+            <a:r>
+              <a:rPr lang="en-US" dirty="0" smtClean="0"/>
+              <a:t>Audio </a:t>
             </a:r>
           </a:p>
           <a:p>
@@ -6170,67 +6437,11 @@
             </a:pPr>
             <a:r>
               <a:rPr lang="en-US" dirty="0"/>
-              <a:t> Machine</a:t>
-            </a:r>
-          </a:p>
-          <a:p>
-            <a:pPr>
-              <a:buFont typeface="Wingdings" panose="05000000000000000000" pitchFamily="2" charset="2"/>
-              <a:buChar char="v"/>
-            </a:pPr>
-            <a:r>
-              <a:rPr lang="en-US" dirty="0"/>
-              <a:t> Time-stamped</a:t>
-            </a:r>
-          </a:p>
-          <a:p>
-            <a:pPr>
-              <a:buFont typeface="Wingdings" panose="05000000000000000000" pitchFamily="2" charset="2"/>
-              <a:buChar char="v"/>
-            </a:pPr>
-            <a:r>
-              <a:rPr lang="en-US" dirty="0"/>
-              <a:t> Spatiotemporal </a:t>
-            </a:r>
-          </a:p>
-          <a:p>
-            <a:pPr>
-              <a:buFont typeface="Wingdings" panose="05000000000000000000" pitchFamily="2" charset="2"/>
-              <a:buChar char="v"/>
-            </a:pPr>
-            <a:r>
-              <a:rPr lang="en-US" dirty="0"/>
-              <a:t> Open</a:t>
-            </a:r>
-          </a:p>
-          <a:p>
-            <a:pPr>
-              <a:buFont typeface="Wingdings" panose="05000000000000000000" pitchFamily="2" charset="2"/>
-              <a:buChar char="v"/>
-            </a:pPr>
-            <a:r>
-              <a:rPr lang="en-US" dirty="0"/>
-              <a:t> Dark </a:t>
-            </a:r>
-          </a:p>
-          <a:p>
-            <a:pPr>
-              <a:buFont typeface="Wingdings" panose="05000000000000000000" pitchFamily="2" charset="2"/>
-              <a:buChar char="v"/>
-            </a:pPr>
-            <a:r>
-              <a:rPr lang="en-US" dirty="0"/>
-              <a:t> Real time</a:t>
-            </a:r>
-          </a:p>
-          <a:p>
-            <a:pPr>
-              <a:buFont typeface="Wingdings" panose="05000000000000000000" pitchFamily="2" charset="2"/>
-              <a:buChar char="v"/>
-            </a:pPr>
-            <a:r>
-              <a:rPr lang="en-US" dirty="0"/>
-              <a:t> Operational</a:t>
+              <a:t> </a:t>
+            </a:r>
+            <a:r>
+              <a:rPr lang="en-US" dirty="0" smtClean="0"/>
+              <a:t>Video</a:t>
             </a:r>
           </a:p>
         </p:txBody>
@@ -6288,65 +6499,6 @@
             <a:r>
               <a:rPr lang="en-US" dirty="0"/>
               <a:t>Audio	Video	Image	 Text	Num</a:t>
-            </a:r>
-          </a:p>
-        </p:txBody>
-      </p:sp>
-      <p:sp>
-        <p:nvSpPr>
-          <p:cNvPr id="8" name="TextBox 7"/>
-          <p:cNvSpPr txBox="1"/>
-          <p:nvPr/>
-        </p:nvSpPr>
-        <p:spPr>
-          <a:xfrm>
-            <a:off x="6350000" y="4140446"/>
-            <a:ext cx="4711337" cy="1754326"/>
-          </a:xfrm>
-          <a:prstGeom prst="rect">
-            <a:avLst/>
-          </a:prstGeom>
-          <a:noFill/>
-        </p:spPr>
-        <p:txBody>
-          <a:bodyPr wrap="square" rtlCol="0">
-            <a:spAutoFit/>
-          </a:bodyPr>
-          <a:lstStyle/>
-          <a:p>
-            <a:r>
-              <a:rPr lang="en-US" dirty="0"/>
-              <a:t>                Observational  	Simulation</a:t>
-            </a:r>
-          </a:p>
-          <a:p>
-            <a:r>
-              <a:rPr lang="en-US" dirty="0"/>
-              <a:t>      Experimental 	    Dark	 	Derived </a:t>
-            </a:r>
-          </a:p>
-          <a:p>
-            <a:r>
-              <a:rPr lang="en-US" dirty="0"/>
-              <a:t>	 Compiled 	Open  </a:t>
-            </a:r>
-          </a:p>
-          <a:p>
-            <a:r>
-              <a:rPr lang="en-US" dirty="0"/>
-              <a:t>Machine            Time-stamped       Operational</a:t>
-            </a:r>
-          </a:p>
-          <a:p>
-            <a:r>
-              <a:rPr lang="en-US" dirty="0"/>
-              <a:t>              Spatiotemporal        Real time</a:t>
-            </a:r>
-          </a:p>
-          <a:p>
-            <a:r>
-              <a:rPr lang="en-US" dirty="0"/>
-              <a:t>….. 	…	…..	...	…..        ... </a:t>
             </a:r>
           </a:p>
         </p:txBody>
@@ -6398,7 +6550,7 @@
           <a:p>
             <a:r>
               <a:rPr lang="en-US" dirty="0"/>
-              <a:t>DATA: CLASSIFICATION</a:t>
+              <a:t>DATA: TYPES</a:t>
             </a:r>
           </a:p>
         </p:txBody>
@@ -6416,15 +6568,9 @@
         <p:spPr/>
         <p:txBody>
           <a:bodyPr>
-            <a:normAutofit lnSpcReduction="10000"/>
+            <a:normAutofit fontScale="85000" lnSpcReduction="20000"/>
           </a:bodyPr>
           <a:lstStyle/>
-          <a:p>
-            <a:r>
-              <a:rPr lang="en-US" sz="3200" b="1" dirty="0"/>
-              <a:t>First Level</a:t>
-            </a:r>
-          </a:p>
           <a:p>
             <a:pPr>
               <a:buFont typeface="Wingdings" panose="05000000000000000000" pitchFamily="2" charset="2"/>
@@ -6432,7 +6578,7 @@
             </a:pPr>
             <a:r>
               <a:rPr lang="en-US" dirty="0"/>
-              <a:t> Structured</a:t>
+              <a:t> Observational </a:t>
             </a:r>
           </a:p>
           <a:p>
@@ -6442,7 +6588,7 @@
             </a:pPr>
             <a:r>
               <a:rPr lang="en-US" dirty="0"/>
-              <a:t> Semi-structured</a:t>
+              <a:t> Simulation</a:t>
             </a:r>
           </a:p>
           <a:p>
@@ -6452,13 +6598,7 @@
             </a:pPr>
             <a:r>
               <a:rPr lang="en-US" dirty="0"/>
-              <a:t> Unstructured</a:t>
-            </a:r>
-          </a:p>
-          <a:p>
-            <a:r>
-              <a:rPr lang="en-US" sz="3200" b="1" dirty="0"/>
-              <a:t>Second Level</a:t>
+              <a:t> Experimental</a:t>
             </a:r>
           </a:p>
           <a:p>
@@ -6468,7 +6608,7 @@
             </a:pPr>
             <a:r>
               <a:rPr lang="en-US" dirty="0"/>
-              <a:t> Qualitative   </a:t>
+              <a:t> Derived or Compiled</a:t>
             </a:r>
           </a:p>
           <a:p>
@@ -6478,7 +6618,7 @@
             </a:pPr>
             <a:r>
               <a:rPr lang="en-US" dirty="0"/>
-              <a:t> Quantitative</a:t>
+              <a:t> Machine</a:t>
             </a:r>
           </a:p>
           <a:p>
@@ -6488,7 +6628,7 @@
             </a:pPr>
             <a:r>
               <a:rPr lang="en-US" dirty="0"/>
-              <a:t> Geographical Base</a:t>
+              <a:t> Time-stamped</a:t>
             </a:r>
           </a:p>
           <a:p>
@@ -6498,34 +6638,171 @@
             </a:pPr>
             <a:r>
               <a:rPr lang="en-US" dirty="0"/>
-              <a:t> Chronological or Temporal</a:t>
-            </a:r>
-          </a:p>
-        </p:txBody>
-      </p:sp>
-      <p:sp>
-        <p:nvSpPr>
-          <p:cNvPr id="4" name="Content Placeholder 3"/>
-          <p:cNvSpPr>
-            <a:spLocks noGrp="1"/>
-          </p:cNvSpPr>
+              <a:t> Spatiotemporal </a:t>
+            </a:r>
+          </a:p>
+          <a:p>
+            <a:pPr>
+              <a:buFont typeface="Wingdings" panose="05000000000000000000" pitchFamily="2" charset="2"/>
+              <a:buChar char="v"/>
+            </a:pPr>
+            <a:r>
+              <a:rPr lang="en-US" dirty="0"/>
+              <a:t> Open</a:t>
+            </a:r>
+          </a:p>
+          <a:p>
+            <a:pPr>
+              <a:buFont typeface="Wingdings" panose="05000000000000000000" pitchFamily="2" charset="2"/>
+              <a:buChar char="v"/>
+            </a:pPr>
+            <a:r>
+              <a:rPr lang="en-US" dirty="0"/>
+              <a:t> Dark </a:t>
+            </a:r>
+          </a:p>
+          <a:p>
+            <a:pPr>
+              <a:buFont typeface="Wingdings" panose="05000000000000000000" pitchFamily="2" charset="2"/>
+              <a:buChar char="v"/>
+            </a:pPr>
+            <a:r>
+              <a:rPr lang="en-US" dirty="0"/>
+              <a:t> Real time</a:t>
+            </a:r>
+          </a:p>
+          <a:p>
+            <a:pPr>
+              <a:buFont typeface="Wingdings" panose="05000000000000000000" pitchFamily="2" charset="2"/>
+              <a:buChar char="v"/>
+            </a:pPr>
+            <a:r>
+              <a:rPr lang="en-US" dirty="0"/>
+              <a:t> Operational</a:t>
+            </a:r>
+          </a:p>
+        </p:txBody>
+      </p:sp>
+      <p:pic>
+        <p:nvPicPr>
+          <p:cNvPr id="6" name="Content Placeholder 5"/>
+          <p:cNvPicPr>
+            <a:picLocks noGrp="1" noChangeAspect="1"/>
+          </p:cNvPicPr>
           <p:nvPr>
             <p:ph sz="half" idx="2"/>
           </p:nvPr>
-        </p:nvSpPr>
-        <p:spPr/>
-        <p:txBody>
-          <a:bodyPr/>
-          <a:lstStyle/>
-          <a:p>
-            <a:endParaRPr lang="en-US"/>
+        </p:nvPicPr>
+        <p:blipFill rotWithShape="1">
+          <a:blip r:embed="rId2">
+            <a:extLst>
+              <a:ext uri="{28A0092B-C50C-407E-A947-70E740481C1C}">
+                <a14:useLocalDpi xmlns:a14="http://schemas.microsoft.com/office/drawing/2010/main" val="0"/>
+              </a:ext>
+            </a:extLst>
+          </a:blip>
+          <a:srcRect t="12148" b="34005"/>
+          <a:stretch/>
+        </p:blipFill>
+        <p:spPr>
+          <a:xfrm>
+            <a:off x="6218555" y="1845734"/>
+            <a:ext cx="4937125" cy="1957009"/>
+          </a:xfrm>
+        </p:spPr>
+      </p:pic>
+      <p:sp>
+        <p:nvSpPr>
+          <p:cNvPr id="7" name="TextBox 6"/>
+          <p:cNvSpPr txBox="1"/>
+          <p:nvPr/>
+        </p:nvSpPr>
+        <p:spPr>
+          <a:xfrm>
+            <a:off x="6415314" y="3697759"/>
+            <a:ext cx="4397829" cy="369332"/>
+          </a:xfrm>
+          <a:prstGeom prst="rect">
+            <a:avLst/>
+          </a:prstGeom>
+          <a:noFill/>
+        </p:spPr>
+        <p:txBody>
+          <a:bodyPr wrap="square" rtlCol="0">
+            <a:spAutoFit/>
+          </a:bodyPr>
+          <a:lstStyle/>
+          <a:p>
+            <a:r>
+              <a:rPr lang="en-US" dirty="0"/>
+              <a:t>Audio	Video	Image	 Text	Num</a:t>
+            </a:r>
+          </a:p>
+        </p:txBody>
+      </p:sp>
+      <p:sp>
+        <p:nvSpPr>
+          <p:cNvPr id="8" name="TextBox 7"/>
+          <p:cNvSpPr txBox="1"/>
+          <p:nvPr/>
+        </p:nvSpPr>
+        <p:spPr>
+          <a:xfrm>
+            <a:off x="6350000" y="4140446"/>
+            <a:ext cx="4711337" cy="1754326"/>
+          </a:xfrm>
+          <a:prstGeom prst="rect">
+            <a:avLst/>
+          </a:prstGeom>
+          <a:noFill/>
+        </p:spPr>
+        <p:txBody>
+          <a:bodyPr wrap="square" rtlCol="0">
+            <a:spAutoFit/>
+          </a:bodyPr>
+          <a:lstStyle/>
+          <a:p>
+            <a:r>
+              <a:rPr lang="en-US" dirty="0"/>
+              <a:t>                Observational  	Simulation</a:t>
+            </a:r>
+          </a:p>
+          <a:p>
+            <a:r>
+              <a:rPr lang="en-US" dirty="0"/>
+              <a:t>      Experimental 	    Dark	 	Derived </a:t>
+            </a:r>
+          </a:p>
+          <a:p>
+            <a:r>
+              <a:rPr lang="en-US" dirty="0"/>
+              <a:t>	 Compiled 	Open  </a:t>
+            </a:r>
+          </a:p>
+          <a:p>
+            <a:r>
+              <a:rPr lang="en-US" dirty="0"/>
+              <a:t>Machine            Time-stamped       Operational</a:t>
+            </a:r>
+          </a:p>
+          <a:p>
+            <a:r>
+              <a:rPr lang="en-US" dirty="0"/>
+              <a:t>              Spatiotemporal        Real time</a:t>
+            </a:r>
+          </a:p>
+          <a:p>
+            <a:r>
+              <a:rPr lang="en-US" dirty="0"/>
+              <a:t>….. 	…	…..	...	…..        ... </a:t>
+            </a:r>
           </a:p>
         </p:txBody>
       </p:sp>
     </p:spTree>
     <p:extLst>
       <p:ext uri="{BB962C8B-B14F-4D97-AF65-F5344CB8AC3E}">
-        <p14:creationId xmlns:p14="http://schemas.microsoft.com/office/powerpoint/2010/main" val="2169991389"/>
+        <p14:creationId xmlns:p14="http://schemas.microsoft.com/office/powerpoint/2010/main" val="2733164690"/>
       </p:ext>
     </p:extLst>
   </p:cSld>

</xml_diff>

<commit_message>
added: Data analysis side
Added Data analysis slide
</commit_message>
<xml_diff>
--- a/Project Interim Submission/Generic DS Framework.pptx
+++ b/Project Interim Submission/Generic DS Framework.pptx
@@ -4533,7 +4533,141 @@
           <a:bodyPr/>
           <a:lstStyle/>
           <a:p>
-            <a:endParaRPr lang="en-US"/>
+            <a:r>
+              <a:rPr lang="en-US" sz="3200" b="1" dirty="0"/>
+              <a:t>DEFINITION</a:t>
+            </a:r>
+            <a:r>
+              <a:rPr lang="en-US" b="1" dirty="0"/>
+              <a:t> </a:t>
+            </a:r>
+            <a:endParaRPr lang="en-US" b="1" dirty="0" smtClean="0"/>
+          </a:p>
+          <a:p>
+            <a:r>
+              <a:rPr lang="en-US" dirty="0" smtClean="0"/>
+              <a:t>It is the </a:t>
+            </a:r>
+            <a:r>
+              <a:rPr lang="en-US" dirty="0"/>
+              <a:t>process of examining information, especially using a computer, in order to find out </a:t>
+            </a:r>
+            <a:r>
+              <a:rPr lang="en-US" dirty="0" smtClean="0"/>
+              <a:t>something, </a:t>
+            </a:r>
+            <a:r>
+              <a:rPr lang="en-US" dirty="0"/>
+              <a:t>or to help with making </a:t>
+            </a:r>
+            <a:r>
+              <a:rPr lang="en-US" dirty="0" smtClean="0"/>
+              <a:t>decisions out of it.</a:t>
+            </a:r>
+          </a:p>
+          <a:p>
+            <a:r>
+              <a:rPr lang="en-US" b="1" dirty="0" smtClean="0"/>
+              <a:t>Example </a:t>
+            </a:r>
+            <a:r>
+              <a:rPr lang="en-US" b="1" dirty="0"/>
+              <a:t>Tools</a:t>
+            </a:r>
+          </a:p>
+          <a:p>
+            <a:pPr>
+              <a:buFont typeface="Wingdings" panose="05000000000000000000" pitchFamily="2" charset="2"/>
+              <a:buChar char="Ø"/>
+            </a:pPr>
+            <a:r>
+              <a:rPr lang="en-US" dirty="0" err="1"/>
+              <a:t>OpenRefine</a:t>
+            </a:r>
+            <a:r>
+              <a:rPr lang="en-US" dirty="0"/>
+              <a:t>, </a:t>
+            </a:r>
+            <a:r>
+              <a:rPr lang="en-US" dirty="0" smtClean="0"/>
+              <a:t> KNIME</a:t>
+            </a:r>
+            <a:r>
+              <a:rPr lang="en-US" dirty="0"/>
+              <a:t>, </a:t>
+            </a:r>
+            <a:endParaRPr lang="en-US" dirty="0" smtClean="0"/>
+          </a:p>
+          <a:p>
+            <a:pPr>
+              <a:buFont typeface="Wingdings" panose="05000000000000000000" pitchFamily="2" charset="2"/>
+              <a:buChar char="Ø"/>
+            </a:pPr>
+            <a:r>
+              <a:rPr lang="en-US" dirty="0" err="1" smtClean="0"/>
+              <a:t>RapidMiner</a:t>
+            </a:r>
+            <a:r>
+              <a:rPr lang="en-US" dirty="0"/>
+              <a:t>, </a:t>
+            </a:r>
+            <a:r>
+              <a:rPr lang="en-US" dirty="0" smtClean="0"/>
+              <a:t>Google </a:t>
+            </a:r>
+            <a:r>
+              <a:rPr lang="en-US" dirty="0"/>
+              <a:t>Fusion Tables, </a:t>
+            </a:r>
+            <a:endParaRPr lang="en-US" dirty="0" smtClean="0"/>
+          </a:p>
+          <a:p>
+            <a:pPr>
+              <a:buFont typeface="Wingdings" panose="05000000000000000000" pitchFamily="2" charset="2"/>
+              <a:buChar char="Ø"/>
+            </a:pPr>
+            <a:r>
+              <a:rPr lang="en-US" dirty="0" smtClean="0"/>
+              <a:t>Tableau </a:t>
+            </a:r>
+            <a:r>
+              <a:rPr lang="en-US" dirty="0"/>
+              <a:t>Public, </a:t>
+            </a:r>
+            <a:r>
+              <a:rPr lang="en-US" dirty="0" err="1"/>
+              <a:t>NodeXL</a:t>
+            </a:r>
+            <a:r>
+              <a:rPr lang="en-US" dirty="0"/>
+              <a:t>, </a:t>
+            </a:r>
+            <a:endParaRPr lang="en-US" dirty="0" smtClean="0"/>
+          </a:p>
+          <a:p>
+            <a:pPr>
+              <a:buFont typeface="Wingdings" panose="05000000000000000000" pitchFamily="2" charset="2"/>
+              <a:buChar char="Ø"/>
+            </a:pPr>
+            <a:r>
+              <a:rPr lang="en-US" dirty="0" err="1" smtClean="0"/>
+              <a:t>WolframAlpha</a:t>
+            </a:r>
+            <a:r>
+              <a:rPr lang="en-US" dirty="0" smtClean="0"/>
+              <a:t> </a:t>
+            </a:r>
+            <a:r>
+              <a:rPr lang="en-US" dirty="0"/>
+              <a:t>tools are used</a:t>
+            </a:r>
+            <a:r>
+              <a:rPr lang="en-US" dirty="0" smtClean="0"/>
+              <a:t>.</a:t>
+            </a:r>
+          </a:p>
+          <a:p>
+            <a:endParaRPr lang="en-US" dirty="0"/>
           </a:p>
         </p:txBody>
       </p:sp>
@@ -4650,7 +4784,7 @@
           <p:cNvPr id="2" name="Title 1">
             <a:extLst>
               <a:ext uri="{FF2B5EF4-FFF2-40B4-BE49-F238E27FC236}">
-                <a16:creationId xmlns:a16="http://schemas.microsoft.com/office/drawing/2014/main" xmlns="" id="{F4727C6F-3982-4E54-AA66-B4E0AA33FF66}"/>
+                <a16:creationId xmlns="" xmlns:a16="http://schemas.microsoft.com/office/drawing/2014/main" id="{F4727C6F-3982-4E54-AA66-B4E0AA33FF66}"/>
               </a:ext>
             </a:extLst>
           </p:cNvPr>
@@ -4679,7 +4813,7 @@
           <p:cNvPr id="3" name="Content Placeholder 2">
             <a:extLst>
               <a:ext uri="{FF2B5EF4-FFF2-40B4-BE49-F238E27FC236}">
-                <a16:creationId xmlns:a16="http://schemas.microsoft.com/office/drawing/2014/main" xmlns="" id="{1134DAC4-9E94-441C-A9BE-87750F6F60A2}"/>
+                <a16:creationId xmlns="" xmlns:a16="http://schemas.microsoft.com/office/drawing/2014/main" id="{1134DAC4-9E94-441C-A9BE-87750F6F60A2}"/>
               </a:ext>
             </a:extLst>
           </p:cNvPr>
@@ -4758,7 +4892,7 @@
           <p:cNvPr id="2" name="Title 1">
             <a:extLst>
               <a:ext uri="{FF2B5EF4-FFF2-40B4-BE49-F238E27FC236}">
-                <a16:creationId xmlns:a16="http://schemas.microsoft.com/office/drawing/2014/main" xmlns="" id="{3E1AC600-D16C-47B7-9075-94DA61007B25}"/>
+                <a16:creationId xmlns="" xmlns:a16="http://schemas.microsoft.com/office/drawing/2014/main" id="{3E1AC600-D16C-47B7-9075-94DA61007B25}"/>
               </a:ext>
             </a:extLst>
           </p:cNvPr>
@@ -4792,7 +4926,7 @@
           <p:cNvPr id="3" name="Content Placeholder 2">
             <a:extLst>
               <a:ext uri="{FF2B5EF4-FFF2-40B4-BE49-F238E27FC236}">
-                <a16:creationId xmlns:a16="http://schemas.microsoft.com/office/drawing/2014/main" xmlns="" id="{DDC8679B-3323-4E4B-ABD6-BD8748DF3AEB}"/>
+                <a16:creationId xmlns="" xmlns:a16="http://schemas.microsoft.com/office/drawing/2014/main" id="{DDC8679B-3323-4E4B-ABD6-BD8748DF3AEB}"/>
               </a:ext>
             </a:extLst>
           </p:cNvPr>
@@ -4904,7 +5038,7 @@
           <p:cNvPr id="3" name="Content Placeholder 2">
             <a:extLst>
               <a:ext uri="{FF2B5EF4-FFF2-40B4-BE49-F238E27FC236}">
-                <a16:creationId xmlns:a16="http://schemas.microsoft.com/office/drawing/2014/main" xmlns="" id="{12CE7563-67E4-470C-A76A-FD376D4C2471}"/>
+                <a16:creationId xmlns="" xmlns:a16="http://schemas.microsoft.com/office/drawing/2014/main" id="{12CE7563-67E4-470C-A76A-FD376D4C2471}"/>
               </a:ext>
             </a:extLst>
           </p:cNvPr>
@@ -5022,7 +5156,7 @@
           <p:cNvPr id="4" name="Title 1">
             <a:extLst>
               <a:ext uri="{FF2B5EF4-FFF2-40B4-BE49-F238E27FC236}">
-                <a16:creationId xmlns:a16="http://schemas.microsoft.com/office/drawing/2014/main" xmlns="" id="{D1F22F75-6806-481E-A0D8-FC161C3266D1}"/>
+                <a16:creationId xmlns="" xmlns:a16="http://schemas.microsoft.com/office/drawing/2014/main" id="{D1F22F75-6806-481E-A0D8-FC161C3266D1}"/>
               </a:ext>
             </a:extLst>
           </p:cNvPr>
@@ -5404,14 +5538,14 @@
                 <a:gridCol w="5035931">
                   <a:extLst>
                     <a:ext uri="{9D8B030D-6E8A-4147-A177-3AD203B41FA5}">
-                      <a16:colId xmlns:a16="http://schemas.microsoft.com/office/drawing/2014/main" xmlns="" val="20000"/>
+                      <a16:colId xmlns="" xmlns:a16="http://schemas.microsoft.com/office/drawing/2014/main" val="20000"/>
                     </a:ext>
                   </a:extLst>
                 </a:gridCol>
                 <a:gridCol w="5022469">
                   <a:extLst>
                     <a:ext uri="{9D8B030D-6E8A-4147-A177-3AD203B41FA5}">
-                      <a16:colId xmlns:a16="http://schemas.microsoft.com/office/drawing/2014/main" xmlns="" val="20001"/>
+                      <a16:colId xmlns="" xmlns:a16="http://schemas.microsoft.com/office/drawing/2014/main" val="20001"/>
                     </a:ext>
                   </a:extLst>
                 </a:gridCol>
@@ -5491,7 +5625,7 @@
                 </a:tc>
                 <a:extLst>
                   <a:ext uri="{0D108BD9-81ED-4DB2-BD59-A6C34878D82A}">
-                    <a16:rowId xmlns:a16="http://schemas.microsoft.com/office/drawing/2014/main" xmlns="" val="10000"/>
+                    <a16:rowId xmlns="" xmlns:a16="http://schemas.microsoft.com/office/drawing/2014/main" val="10000"/>
                   </a:ext>
                 </a:extLst>
               </a:tr>
@@ -5578,7 +5712,7 @@
                 </a:tc>
                 <a:extLst>
                   <a:ext uri="{0D108BD9-81ED-4DB2-BD59-A6C34878D82A}">
-                    <a16:rowId xmlns:a16="http://schemas.microsoft.com/office/drawing/2014/main" xmlns="" val="10001"/>
+                    <a16:rowId xmlns="" xmlns:a16="http://schemas.microsoft.com/office/drawing/2014/main" val="10001"/>
                   </a:ext>
                 </a:extLst>
               </a:tr>
@@ -5681,7 +5815,7 @@
                 </a:tc>
                 <a:extLst>
                   <a:ext uri="{0D108BD9-81ED-4DB2-BD59-A6C34878D82A}">
-                    <a16:rowId xmlns:a16="http://schemas.microsoft.com/office/drawing/2014/main" xmlns="" val="10002"/>
+                    <a16:rowId xmlns="" xmlns:a16="http://schemas.microsoft.com/office/drawing/2014/main" val="10002"/>
                   </a:ext>
                 </a:extLst>
               </a:tr>

</xml_diff>

<commit_message>
added: data analytics slide
Added Data analytics slides
</commit_message>
<xml_diff>
--- a/Project Interim Submission/Generic DS Framework.pptx
+++ b/Project Interim Submission/Generic DS Framework.pptx
@@ -5,7 +5,7 @@
     <p:sldMasterId id="2147483708" r:id="rId1"/>
   </p:sldMasterIdLst>
   <p:notesMasterIdLst>
-    <p:notesMasterId r:id="rId19"/>
+    <p:notesMasterId r:id="rId20"/>
   </p:notesMasterIdLst>
   <p:sldIdLst>
     <p:sldId id="256" r:id="rId2"/>
@@ -19,12 +19,13 @@
     <p:sldId id="271" r:id="rId10"/>
     <p:sldId id="269" r:id="rId11"/>
     <p:sldId id="272" r:id="rId12"/>
-    <p:sldId id="263" r:id="rId13"/>
-    <p:sldId id="261" r:id="rId14"/>
-    <p:sldId id="262" r:id="rId15"/>
-    <p:sldId id="270" r:id="rId16"/>
-    <p:sldId id="265" r:id="rId17"/>
-    <p:sldId id="266" r:id="rId18"/>
+    <p:sldId id="273" r:id="rId13"/>
+    <p:sldId id="263" r:id="rId14"/>
+    <p:sldId id="261" r:id="rId15"/>
+    <p:sldId id="262" r:id="rId16"/>
+    <p:sldId id="270" r:id="rId17"/>
+    <p:sldId id="265" r:id="rId18"/>
+    <p:sldId id="266" r:id="rId19"/>
   </p:sldIdLst>
   <p:sldSz cx="12192000" cy="6858000"/>
   <p:notesSz cx="6858000" cy="9144000"/>
@@ -4533,6 +4534,9 @@
           <a:bodyPr/>
           <a:lstStyle/>
           <a:p>
+            <a:pPr marL="0" indent="0">
+              <a:buNone/>
+            </a:pPr>
             <a:r>
               <a:rPr lang="en-US" sz="3200" b="1" dirty="0"/>
               <a:t>DEFINITION</a:t>
@@ -4566,6 +4570,9 @@
             </a:r>
           </a:p>
           <a:p>
+            <a:pPr marL="0" indent="0">
+              <a:buNone/>
+            </a:pPr>
             <a:r>
               <a:rPr lang="en-US" b="1" dirty="0" smtClean="0"/>
               <a:t>Example </a:t>
@@ -4703,7 +4710,7 @@
       </p:grpSpPr>
       <p:sp>
         <p:nvSpPr>
-          <p:cNvPr id="4" name="Title 3"/>
+          <p:cNvPr id="2" name="Title 1"/>
           <p:cNvSpPr>
             <a:spLocks noGrp="1"/>
           </p:cNvSpPr>
@@ -4716,43 +4723,186 @@
           <a:bodyPr/>
           <a:lstStyle/>
           <a:p>
-            <a:pPr algn="ctr"/>
-            <a:r>
-              <a:rPr lang="en-US" dirty="0"/>
-              <a:t>BIG DATA</a:t>
-            </a:r>
-          </a:p>
-        </p:txBody>
-      </p:sp>
-      <p:sp>
-        <p:nvSpPr>
-          <p:cNvPr id="5" name="Text Placeholder 4"/>
-          <p:cNvSpPr>
-            <a:spLocks noGrp="1"/>
-          </p:cNvSpPr>
-          <p:nvPr>
-            <p:ph type="body" idx="1"/>
-          </p:nvPr>
-        </p:nvSpPr>
-        <p:spPr/>
-        <p:txBody>
-          <a:bodyPr>
-            <a:normAutofit/>
-          </a:bodyPr>
-          <a:lstStyle/>
-          <a:p>
-            <a:pPr marL="0" lvl="1" algn="ctr"/>
-            <a:r>
-              <a:rPr lang="en-US" sz="2000" dirty="0"/>
-              <a:t>PILLARS, SOURCES, DATA LAKE, MODEL, TOOLS</a:t>
-            </a:r>
+            <a:r>
+              <a:rPr lang="en-US" dirty="0" smtClean="0"/>
+              <a:t>DATA: </a:t>
+            </a:r>
+            <a:r>
+              <a:rPr lang="en-US" dirty="0" smtClean="0"/>
+              <a:t>ANALYTICS </a:t>
+            </a:r>
+            <a:endParaRPr lang="en-US" dirty="0"/>
+          </a:p>
+        </p:txBody>
+      </p:sp>
+      <p:sp>
+        <p:nvSpPr>
+          <p:cNvPr id="5" name="Content Placeholder 4"/>
+          <p:cNvSpPr>
+            <a:spLocks noGrp="1"/>
+          </p:cNvSpPr>
+          <p:nvPr>
+            <p:ph idx="1"/>
+          </p:nvPr>
+        </p:nvSpPr>
+        <p:spPr>
+          <a:xfrm>
+            <a:off x="1097280" y="1845734"/>
+            <a:ext cx="10058400" cy="4453466"/>
+          </a:xfrm>
+        </p:spPr>
+        <p:txBody>
+          <a:bodyPr/>
+          <a:lstStyle/>
+          <a:p>
+            <a:pPr marL="0" indent="0">
+              <a:buNone/>
+            </a:pPr>
+            <a:r>
+              <a:rPr lang="en-US" sz="3200" b="1" dirty="0"/>
+              <a:t>DEFINITION</a:t>
+            </a:r>
+            <a:r>
+              <a:rPr lang="en-US" b="1" dirty="0"/>
+              <a:t> </a:t>
+            </a:r>
+            <a:endParaRPr lang="en-US" b="1" dirty="0" smtClean="0"/>
+          </a:p>
+          <a:p>
+            <a:r>
+              <a:rPr lang="en-US" dirty="0" smtClean="0"/>
+              <a:t>It is </a:t>
+            </a:r>
+            <a:r>
+              <a:rPr lang="en-US" dirty="0"/>
+              <a:t>the process of examining </a:t>
+            </a:r>
+            <a:r>
+              <a:rPr lang="en-US" dirty="0" smtClean="0"/>
+              <a:t>data sets in </a:t>
+            </a:r>
+            <a:r>
+              <a:rPr lang="en-US" dirty="0"/>
+              <a:t>order to draw conclusions about the information they contain, increasingly with the aid of specialized systems and software</a:t>
+            </a:r>
+            <a:r>
+              <a:rPr lang="en-US" dirty="0" smtClean="0"/>
+              <a:t>.</a:t>
+            </a:r>
+            <a:endParaRPr lang="en-US" dirty="0" smtClean="0"/>
+          </a:p>
+          <a:p>
+            <a:pPr marL="0" indent="0">
+              <a:buNone/>
+            </a:pPr>
+            <a:r>
+              <a:rPr lang="en-US" b="1" dirty="0" smtClean="0"/>
+              <a:t>Example </a:t>
+            </a:r>
+            <a:r>
+              <a:rPr lang="en-US" b="1" dirty="0" smtClean="0"/>
+              <a:t>Tools</a:t>
+            </a:r>
+          </a:p>
+          <a:p>
+            <a:pPr>
+              <a:buFont typeface="Wingdings" panose="05000000000000000000" pitchFamily="2" charset="2"/>
+              <a:buChar char="Ø"/>
+            </a:pPr>
+            <a:r>
+              <a:rPr lang="en-US" dirty="0" smtClean="0"/>
+              <a:t> R</a:t>
+            </a:r>
+            <a:r>
+              <a:rPr lang="en-US" dirty="0"/>
+              <a:t>, </a:t>
+            </a:r>
+            <a:endParaRPr lang="en-US" dirty="0" smtClean="0"/>
+          </a:p>
+          <a:p>
+            <a:pPr>
+              <a:buFont typeface="Wingdings" panose="05000000000000000000" pitchFamily="2" charset="2"/>
+              <a:buChar char="Ø"/>
+            </a:pPr>
+            <a:r>
+              <a:rPr lang="en-US" dirty="0" smtClean="0"/>
+              <a:t> Tableau </a:t>
+            </a:r>
+            <a:r>
+              <a:rPr lang="en-US" dirty="0"/>
+              <a:t>Public, </a:t>
+            </a:r>
+            <a:endParaRPr lang="en-US" dirty="0" smtClean="0"/>
+          </a:p>
+          <a:p>
+            <a:pPr>
+              <a:buFont typeface="Wingdings" panose="05000000000000000000" pitchFamily="2" charset="2"/>
+              <a:buChar char="Ø"/>
+            </a:pPr>
+            <a:r>
+              <a:rPr lang="en-US" dirty="0" smtClean="0"/>
+              <a:t> Python</a:t>
+            </a:r>
+            <a:r>
+              <a:rPr lang="en-US" dirty="0"/>
+              <a:t>, </a:t>
+            </a:r>
+            <a:endParaRPr lang="en-US" dirty="0" smtClean="0"/>
+          </a:p>
+          <a:p>
+            <a:pPr>
+              <a:buFont typeface="Wingdings" panose="05000000000000000000" pitchFamily="2" charset="2"/>
+              <a:buChar char="Ø"/>
+            </a:pPr>
+            <a:r>
+              <a:rPr lang="en-US" dirty="0" smtClean="0"/>
+              <a:t> SAS</a:t>
+            </a:r>
+            <a:r>
+              <a:rPr lang="en-US" dirty="0"/>
+              <a:t>, </a:t>
+            </a:r>
+            <a:endParaRPr lang="en-US" dirty="0" smtClean="0"/>
+          </a:p>
+          <a:p>
+            <a:pPr>
+              <a:buFont typeface="Wingdings" panose="05000000000000000000" pitchFamily="2" charset="2"/>
+              <a:buChar char="Ø"/>
+            </a:pPr>
+            <a:r>
+              <a:rPr lang="en-US" dirty="0" smtClean="0"/>
+              <a:t> Apache </a:t>
+            </a:r>
+            <a:r>
+              <a:rPr lang="en-US" dirty="0"/>
+              <a:t>Spark, </a:t>
+            </a:r>
+            <a:endParaRPr lang="en-US" dirty="0" smtClean="0"/>
+          </a:p>
+          <a:p>
+            <a:pPr>
+              <a:buFont typeface="Wingdings" panose="05000000000000000000" pitchFamily="2" charset="2"/>
+              <a:buChar char="Ø"/>
+            </a:pPr>
+            <a:r>
+              <a:rPr lang="en-US" dirty="0" smtClean="0"/>
+              <a:t> Excel, </a:t>
+            </a:r>
+            <a:r>
+              <a:rPr lang="en-US" dirty="0" err="1" smtClean="0"/>
+              <a:t>etc</a:t>
+            </a:r>
+            <a:endParaRPr lang="en-US" b="1" dirty="0"/>
+          </a:p>
+          <a:p>
+            <a:endParaRPr lang="en-US" dirty="0"/>
           </a:p>
         </p:txBody>
       </p:sp>
     </p:spTree>
     <p:extLst>
       <p:ext uri="{BB962C8B-B14F-4D97-AF65-F5344CB8AC3E}">
-        <p14:creationId xmlns:p14="http://schemas.microsoft.com/office/powerpoint/2010/main" val="2241138064"/>
+        <p14:creationId xmlns:p14="http://schemas.microsoft.com/office/powerpoint/2010/main" val="2799485698"/>
       </p:ext>
     </p:extLst>
   </p:cSld>
@@ -4781,13 +4931,7 @@
       </p:grpSpPr>
       <p:sp>
         <p:nvSpPr>
-          <p:cNvPr id="2" name="Title 1">
-            <a:extLst>
-              <a:ext uri="{FF2B5EF4-FFF2-40B4-BE49-F238E27FC236}">
-                <a16:creationId xmlns="" xmlns:a16="http://schemas.microsoft.com/office/drawing/2014/main" id="{F4727C6F-3982-4E54-AA66-B4E0AA33FF66}"/>
-              </a:ext>
-            </a:extLst>
-          </p:cNvPr>
+          <p:cNvPr id="4" name="Title 3"/>
           <p:cNvSpPr>
             <a:spLocks noGrp="1"/>
           </p:cNvSpPr>
@@ -4800,28 +4944,22 @@
           <a:bodyPr/>
           <a:lstStyle/>
           <a:p>
-            <a:r>
-              <a:rPr lang="en-US" dirty="0"/>
-              <a:t>Big Data</a:t>
-            </a:r>
-            <a:endParaRPr lang="x-none" dirty="0"/>
-          </a:p>
-        </p:txBody>
-      </p:sp>
-      <p:sp>
-        <p:nvSpPr>
-          <p:cNvPr id="3" name="Content Placeholder 2">
-            <a:extLst>
-              <a:ext uri="{FF2B5EF4-FFF2-40B4-BE49-F238E27FC236}">
-                <a16:creationId xmlns="" xmlns:a16="http://schemas.microsoft.com/office/drawing/2014/main" id="{1134DAC4-9E94-441C-A9BE-87750F6F60A2}"/>
-              </a:ext>
-            </a:extLst>
-          </p:cNvPr>
-          <p:cNvSpPr>
-            <a:spLocks noGrp="1"/>
-          </p:cNvSpPr>
-          <p:nvPr>
-            <p:ph idx="1"/>
+            <a:pPr algn="ctr"/>
+            <a:r>
+              <a:rPr lang="en-US" dirty="0"/>
+              <a:t>BIG DATA</a:t>
+            </a:r>
+          </a:p>
+        </p:txBody>
+      </p:sp>
+      <p:sp>
+        <p:nvSpPr>
+          <p:cNvPr id="5" name="Text Placeholder 4"/>
+          <p:cNvSpPr>
+            <a:spLocks noGrp="1"/>
+          </p:cNvSpPr>
+          <p:nvPr>
+            <p:ph type="body" idx="1"/>
           </p:nvPr>
         </p:nvSpPr>
         <p:spPr/>
@@ -4831,36 +4969,18 @@
           </a:bodyPr>
           <a:lstStyle/>
           <a:p>
-            <a:r>
-              <a:rPr lang="en-US" sz="3200" b="1" dirty="0"/>
-              <a:t>DEFINITION </a:t>
-            </a:r>
-          </a:p>
-          <a:p>
-            <a:r>
-              <a:rPr lang="en-US" dirty="0">
-                <a:latin typeface="+mj-lt"/>
-              </a:rPr>
-              <a:t>Extremely large data sets that may be analyzed computationally to reveal patterns, trends, and associations, especially relating to human behavior and interactions.</a:t>
-            </a:r>
-          </a:p>
-          <a:p>
-            <a:r>
-              <a:rPr lang="en-US" dirty="0">
-                <a:latin typeface="+mj-lt"/>
-              </a:rPr>
-              <a:t>Big data is a term that describes the large volume of data – both structured and unstructured – that inundates a business on a day-to-day basis. But it’s not the amount of data that’s important. It’s what organizations do with the data that matters. Big data can be analyzed for insights that lead to better decisions and strategic business moves.</a:t>
-            </a:r>
-          </a:p>
-          <a:p>
-            <a:endParaRPr lang="x-none" dirty="0"/>
+            <a:pPr marL="0" lvl="1" algn="ctr"/>
+            <a:r>
+              <a:rPr lang="en-US" sz="2000" dirty="0"/>
+              <a:t>PILLARS, SOURCES, DATA LAKE, MODEL, TOOLS</a:t>
+            </a:r>
           </a:p>
         </p:txBody>
       </p:sp>
     </p:spTree>
     <p:extLst>
       <p:ext uri="{BB962C8B-B14F-4D97-AF65-F5344CB8AC3E}">
-        <p14:creationId xmlns:p14="http://schemas.microsoft.com/office/powerpoint/2010/main" val="196455147"/>
+        <p14:creationId xmlns:p14="http://schemas.microsoft.com/office/powerpoint/2010/main" val="2241138064"/>
       </p:ext>
     </p:extLst>
   </p:cSld>
@@ -4892,7 +5012,7 @@
           <p:cNvPr id="2" name="Title 1">
             <a:extLst>
               <a:ext uri="{FF2B5EF4-FFF2-40B4-BE49-F238E27FC236}">
-                <a16:creationId xmlns="" xmlns:a16="http://schemas.microsoft.com/office/drawing/2014/main" id="{3E1AC600-D16C-47B7-9075-94DA61007B25}"/>
+                <a16:creationId xmlns:a16="http://schemas.microsoft.com/office/drawing/2014/main" xmlns="" id="{F4727C6F-3982-4E54-AA66-B4E0AA33FF66}"/>
               </a:ext>
             </a:extLst>
           </p:cNvPr>
@@ -4903,19 +5023,14 @@
             <p:ph type="title"/>
           </p:nvPr>
         </p:nvSpPr>
-        <p:spPr>
-          <a:xfrm>
-            <a:off x="1097280" y="286603"/>
-            <a:ext cx="10058400" cy="1450757"/>
-          </a:xfrm>
-        </p:spPr>
+        <p:spPr/>
         <p:txBody>
           <a:bodyPr/>
           <a:lstStyle/>
           <a:p>
             <a:r>
               <a:rPr lang="en-US" dirty="0"/>
-              <a:t>Big Data: Tools</a:t>
+              <a:t>Big Data</a:t>
             </a:r>
             <a:endParaRPr lang="x-none" dirty="0"/>
           </a:p>
@@ -4926,7 +5041,7 @@
           <p:cNvPr id="3" name="Content Placeholder 2">
             <a:extLst>
               <a:ext uri="{FF2B5EF4-FFF2-40B4-BE49-F238E27FC236}">
-                <a16:creationId xmlns="" xmlns:a16="http://schemas.microsoft.com/office/drawing/2014/main" id="{DDC8679B-3323-4E4B-ABD6-BD8748DF3AEB}"/>
+                <a16:creationId xmlns:a16="http://schemas.microsoft.com/office/drawing/2014/main" xmlns="" id="{1134DAC4-9E94-441C-A9BE-87750F6F60A2}"/>
               </a:ext>
             </a:extLst>
           </p:cNvPr>
@@ -4939,74 +5054,41 @@
         </p:nvSpPr>
         <p:spPr/>
         <p:txBody>
-          <a:bodyPr/>
-          <a:lstStyle/>
-          <a:p>
-            <a:pPr marL="0" indent="0">
-              <a:buNone/>
-            </a:pPr>
+          <a:bodyPr>
+            <a:normAutofit/>
+          </a:bodyPr>
+          <a:lstStyle/>
+          <a:p>
             <a:r>
               <a:rPr lang="en-US" sz="3200" b="1" dirty="0"/>
-              <a:t>Hadoop</a:t>
-            </a:r>
-            <a:endParaRPr lang="en-US" b="1" dirty="0"/>
-          </a:p>
-          <a:p>
-            <a:pPr>
-              <a:buFont typeface="Wingdings" panose="05000000000000000000" pitchFamily="2" charset="2"/>
-              <a:buChar char="v"/>
-            </a:pPr>
-            <a:r>
-              <a:rPr lang="en-US" dirty="0"/>
-              <a:t>Hadoop software library is a framework</a:t>
-            </a:r>
-          </a:p>
-          <a:p>
-            <a:pPr>
-              <a:buFont typeface="Wingdings" panose="05000000000000000000" pitchFamily="2" charset="2"/>
-              <a:buChar char="v"/>
-            </a:pPr>
-            <a:r>
-              <a:rPr lang="en-US" dirty="0"/>
-              <a:t>Help in distributed processing of large data sets across clusters of computers</a:t>
-            </a:r>
-          </a:p>
-          <a:p>
-            <a:pPr>
-              <a:buFont typeface="Wingdings" panose="05000000000000000000" pitchFamily="2" charset="2"/>
-              <a:buChar char="v"/>
-            </a:pPr>
-            <a:r>
-              <a:rPr lang="en-US" dirty="0"/>
-              <a:t>Two method to start single node or cluster mode</a:t>
-            </a:r>
-          </a:p>
-          <a:p>
-            <a:pPr>
-              <a:buFont typeface="Wingdings" panose="05000000000000000000" pitchFamily="2" charset="2"/>
-              <a:buChar char="v"/>
-            </a:pPr>
-            <a:r>
-              <a:rPr lang="en-US" dirty="0"/>
-              <a:t>Latest stable version is 2.9.2 </a:t>
-            </a:r>
-          </a:p>
-          <a:p>
-            <a:pPr>
-              <a:buFont typeface="Wingdings" panose="05000000000000000000" pitchFamily="2" charset="2"/>
-              <a:buChar char="v"/>
-            </a:pPr>
-            <a:r>
-              <a:rPr lang="en-US" dirty="0"/>
-              <a:t>Few Important features are HDFS, YARN,MAPREDUCE, cost efficient, Hadoop libraries and many more</a:t>
-            </a:r>
+              <a:t>DEFINITION </a:t>
+            </a:r>
+          </a:p>
+          <a:p>
+            <a:r>
+              <a:rPr lang="en-US" dirty="0">
+                <a:latin typeface="+mj-lt"/>
+              </a:rPr>
+              <a:t>Extremely large data sets that may be analyzed computationally to reveal patterns, trends, and associations, especially relating to human behavior and interactions.</a:t>
+            </a:r>
+          </a:p>
+          <a:p>
+            <a:r>
+              <a:rPr lang="en-US" dirty="0">
+                <a:latin typeface="+mj-lt"/>
+              </a:rPr>
+              <a:t>Big data is a term that describes the large volume of data – both structured and unstructured – that inundates a business on a day-to-day basis. But it’s not the amount of data that’s important. It’s what organizations do with the data that matters. Big data can be analyzed for insights that lead to better decisions and strategic business moves.</a:t>
+            </a:r>
+          </a:p>
+          <a:p>
+            <a:endParaRPr lang="x-none" dirty="0"/>
           </a:p>
         </p:txBody>
       </p:sp>
     </p:spTree>
     <p:extLst>
       <p:ext uri="{BB962C8B-B14F-4D97-AF65-F5344CB8AC3E}">
-        <p14:creationId xmlns:p14="http://schemas.microsoft.com/office/powerpoint/2010/main" val="2845727905"/>
+        <p14:creationId xmlns:p14="http://schemas.microsoft.com/office/powerpoint/2010/main" val="196455147"/>
       </p:ext>
     </p:extLst>
   </p:cSld>
@@ -5035,10 +5117,44 @@
       </p:grpSpPr>
       <p:sp>
         <p:nvSpPr>
+          <p:cNvPr id="2" name="Title 1">
+            <a:extLst>
+              <a:ext uri="{FF2B5EF4-FFF2-40B4-BE49-F238E27FC236}">
+                <a16:creationId xmlns:a16="http://schemas.microsoft.com/office/drawing/2014/main" xmlns="" id="{3E1AC600-D16C-47B7-9075-94DA61007B25}"/>
+              </a:ext>
+            </a:extLst>
+          </p:cNvPr>
+          <p:cNvSpPr>
+            <a:spLocks noGrp="1"/>
+          </p:cNvSpPr>
+          <p:nvPr>
+            <p:ph type="title"/>
+          </p:nvPr>
+        </p:nvSpPr>
+        <p:spPr>
+          <a:xfrm>
+            <a:off x="1097280" y="286603"/>
+            <a:ext cx="10058400" cy="1450757"/>
+          </a:xfrm>
+        </p:spPr>
+        <p:txBody>
+          <a:bodyPr/>
+          <a:lstStyle/>
+          <a:p>
+            <a:r>
+              <a:rPr lang="en-US" dirty="0"/>
+              <a:t>Big Data: Tools</a:t>
+            </a:r>
+            <a:endParaRPr lang="x-none" dirty="0"/>
+          </a:p>
+        </p:txBody>
+      </p:sp>
+      <p:sp>
+        <p:nvSpPr>
           <p:cNvPr id="3" name="Content Placeholder 2">
             <a:extLst>
               <a:ext uri="{FF2B5EF4-FFF2-40B4-BE49-F238E27FC236}">
-                <a16:creationId xmlns="" xmlns:a16="http://schemas.microsoft.com/office/drawing/2014/main" id="{12CE7563-67E4-470C-A76A-FD376D4C2471}"/>
+                <a16:creationId xmlns:a16="http://schemas.microsoft.com/office/drawing/2014/main" xmlns="" id="{DDC8679B-3323-4E4B-ABD6-BD8748DF3AEB}"/>
               </a:ext>
             </a:extLst>
           </p:cNvPr>
@@ -5051,15 +5167,17 @@
         </p:nvSpPr>
         <p:spPr/>
         <p:txBody>
-          <a:bodyPr>
-            <a:normAutofit/>
-          </a:bodyPr>
-          <a:lstStyle/>
-          <a:p>
-            <a:r>
-              <a:rPr lang="en-US" sz="3200" dirty="0"/>
-              <a:t>SPARK</a:t>
-            </a:r>
+          <a:bodyPr/>
+          <a:lstStyle/>
+          <a:p>
+            <a:pPr marL="0" indent="0">
+              <a:buNone/>
+            </a:pPr>
+            <a:r>
+              <a:rPr lang="en-US" sz="3200" b="1" dirty="0"/>
+              <a:t>Hadoop</a:t>
+            </a:r>
+            <a:endParaRPr lang="en-US" b="1" dirty="0"/>
           </a:p>
           <a:p>
             <a:pPr>
@@ -5067,10 +5185,9 @@
               <a:buChar char="v"/>
             </a:pPr>
             <a:r>
-              <a:rPr lang="x-none" dirty="0"/>
-              <a:t>Apache Spark is the alternative — and in many aspects the successor — of Apache Hadoop. </a:t>
-            </a:r>
-            <a:endParaRPr lang="en-US" dirty="0"/>
+              <a:rPr lang="en-US" dirty="0"/>
+              <a:t>Hadoop software library is a framework</a:t>
+            </a:r>
           </a:p>
           <a:p>
             <a:pPr>
@@ -5079,15 +5196,7 @@
             </a:pPr>
             <a:r>
               <a:rPr lang="en-US" dirty="0"/>
-              <a:t>Built </a:t>
-            </a:r>
-            <a:r>
-              <a:rPr lang="x-none" dirty="0"/>
-              <a:t>to address the shortcomings of Hadoop</a:t>
-            </a:r>
-            <a:r>
-              <a:rPr lang="en-US" dirty="0"/>
-              <a:t>.</a:t>
+              <a:t>Help in distributed processing of large data sets across clusters of computers</a:t>
             </a:r>
           </a:p>
           <a:p>
@@ -5097,7 +5206,7 @@
             </a:pPr>
             <a:r>
               <a:rPr lang="en-US" dirty="0"/>
-              <a:t>Apache Spark achieves high performance for both batch and streaming data.</a:t>
+              <a:t>Two method to start single node or cluster mode</a:t>
             </a:r>
           </a:p>
           <a:p>
@@ -5107,7 +5216,7 @@
             </a:pPr>
             <a:r>
               <a:rPr lang="en-US" dirty="0"/>
-              <a:t>Run workload 100X faster.</a:t>
+              <a:t>Latest stable version is 2.9.2 </a:t>
             </a:r>
           </a:p>
           <a:p>
@@ -5117,78 +5226,15 @@
             </a:pPr>
             <a:r>
               <a:rPr lang="en-US" dirty="0"/>
-              <a:t>Offers over 80 high-level operators that make it easy to build parallel apps.</a:t>
-            </a:r>
-          </a:p>
-          <a:p>
-            <a:pPr>
-              <a:buFont typeface="Wingdings" panose="05000000000000000000" pitchFamily="2" charset="2"/>
-              <a:buChar char="v"/>
-            </a:pPr>
-            <a:r>
-              <a:rPr lang="en-US" dirty="0"/>
-              <a:t> It powers a stack of libraries including SQL </a:t>
-            </a:r>
-            <a:r>
-              <a:rPr lang="en-US"/>
-              <a:t>and Data Frames</a:t>
-            </a:r>
-            <a:r>
-              <a:rPr lang="en-US" dirty="0"/>
-              <a:t>, MLlib for machine learning, GraphX, and Spark Streaming</a:t>
-            </a:r>
-          </a:p>
-          <a:p>
-            <a:pPr>
-              <a:buFont typeface="Wingdings" panose="05000000000000000000" pitchFamily="2" charset="2"/>
-              <a:buChar char="v"/>
-            </a:pPr>
-            <a:r>
-              <a:rPr lang="en-US" dirty="0"/>
-              <a:t>Latest stable version is 2.4.0 with multiple advance features</a:t>
-            </a:r>
-            <a:endParaRPr lang="x-none" dirty="0"/>
-          </a:p>
-        </p:txBody>
-      </p:sp>
-      <p:sp>
-        <p:nvSpPr>
-          <p:cNvPr id="4" name="Title 1">
-            <a:extLst>
-              <a:ext uri="{FF2B5EF4-FFF2-40B4-BE49-F238E27FC236}">
-                <a16:creationId xmlns="" xmlns:a16="http://schemas.microsoft.com/office/drawing/2014/main" id="{D1F22F75-6806-481E-A0D8-FC161C3266D1}"/>
-              </a:ext>
-            </a:extLst>
-          </p:cNvPr>
-          <p:cNvSpPr>
-            <a:spLocks noGrp="1"/>
-          </p:cNvSpPr>
-          <p:nvPr>
-            <p:ph type="title"/>
-          </p:nvPr>
-        </p:nvSpPr>
-        <p:spPr>
-          <a:xfrm>
-            <a:off x="1096963" y="287338"/>
-            <a:ext cx="10058400" cy="1449387"/>
-          </a:xfrm>
-        </p:spPr>
-        <p:txBody>
-          <a:bodyPr/>
-          <a:lstStyle/>
-          <a:p>
-            <a:r>
-              <a:rPr lang="en-US" dirty="0"/>
-              <a:t>Big Data: Tools</a:t>
-            </a:r>
-            <a:endParaRPr lang="x-none" dirty="0"/>
+              <a:t>Few Important features are HDFS, YARN,MAPREDUCE, cost efficient, Hadoop libraries and many more</a:t>
+            </a:r>
           </a:p>
         </p:txBody>
       </p:sp>
     </p:spTree>
     <p:extLst>
       <p:ext uri="{BB962C8B-B14F-4D97-AF65-F5344CB8AC3E}">
-        <p14:creationId xmlns:p14="http://schemas.microsoft.com/office/powerpoint/2010/main" val="2181567895"/>
+        <p14:creationId xmlns:p14="http://schemas.microsoft.com/office/powerpoint/2010/main" val="2845727905"/>
       </p:ext>
     </p:extLst>
   </p:cSld>
@@ -5217,6 +5263,188 @@
       </p:grpSpPr>
       <p:sp>
         <p:nvSpPr>
+          <p:cNvPr id="3" name="Content Placeholder 2">
+            <a:extLst>
+              <a:ext uri="{FF2B5EF4-FFF2-40B4-BE49-F238E27FC236}">
+                <a16:creationId xmlns:a16="http://schemas.microsoft.com/office/drawing/2014/main" xmlns="" id="{12CE7563-67E4-470C-A76A-FD376D4C2471}"/>
+              </a:ext>
+            </a:extLst>
+          </p:cNvPr>
+          <p:cNvSpPr>
+            <a:spLocks noGrp="1"/>
+          </p:cNvSpPr>
+          <p:nvPr>
+            <p:ph idx="1"/>
+          </p:nvPr>
+        </p:nvSpPr>
+        <p:spPr/>
+        <p:txBody>
+          <a:bodyPr>
+            <a:normAutofit/>
+          </a:bodyPr>
+          <a:lstStyle/>
+          <a:p>
+            <a:r>
+              <a:rPr lang="en-US" sz="3200" dirty="0"/>
+              <a:t>SPARK</a:t>
+            </a:r>
+          </a:p>
+          <a:p>
+            <a:pPr>
+              <a:buFont typeface="Wingdings" panose="05000000000000000000" pitchFamily="2" charset="2"/>
+              <a:buChar char="v"/>
+            </a:pPr>
+            <a:r>
+              <a:rPr lang="x-none" dirty="0"/>
+              <a:t>Apache Spark is the alternative — and in many aspects the successor — of Apache Hadoop. </a:t>
+            </a:r>
+            <a:endParaRPr lang="en-US" dirty="0"/>
+          </a:p>
+          <a:p>
+            <a:pPr>
+              <a:buFont typeface="Wingdings" panose="05000000000000000000" pitchFamily="2" charset="2"/>
+              <a:buChar char="v"/>
+            </a:pPr>
+            <a:r>
+              <a:rPr lang="en-US" dirty="0"/>
+              <a:t>Built </a:t>
+            </a:r>
+            <a:r>
+              <a:rPr lang="x-none" dirty="0"/>
+              <a:t>to address the shortcomings of Hadoop</a:t>
+            </a:r>
+            <a:r>
+              <a:rPr lang="en-US" dirty="0"/>
+              <a:t>.</a:t>
+            </a:r>
+          </a:p>
+          <a:p>
+            <a:pPr>
+              <a:buFont typeface="Wingdings" panose="05000000000000000000" pitchFamily="2" charset="2"/>
+              <a:buChar char="v"/>
+            </a:pPr>
+            <a:r>
+              <a:rPr lang="en-US" dirty="0"/>
+              <a:t>Apache Spark achieves high performance for both batch and streaming data.</a:t>
+            </a:r>
+          </a:p>
+          <a:p>
+            <a:pPr>
+              <a:buFont typeface="Wingdings" panose="05000000000000000000" pitchFamily="2" charset="2"/>
+              <a:buChar char="v"/>
+            </a:pPr>
+            <a:r>
+              <a:rPr lang="en-US" dirty="0"/>
+              <a:t>Run workload 100X faster.</a:t>
+            </a:r>
+          </a:p>
+          <a:p>
+            <a:pPr>
+              <a:buFont typeface="Wingdings" panose="05000000000000000000" pitchFamily="2" charset="2"/>
+              <a:buChar char="v"/>
+            </a:pPr>
+            <a:r>
+              <a:rPr lang="en-US" dirty="0"/>
+              <a:t>Offers over 80 high-level operators that make it easy to build parallel apps.</a:t>
+            </a:r>
+          </a:p>
+          <a:p>
+            <a:pPr>
+              <a:buFont typeface="Wingdings" panose="05000000000000000000" pitchFamily="2" charset="2"/>
+              <a:buChar char="v"/>
+            </a:pPr>
+            <a:r>
+              <a:rPr lang="en-US" dirty="0"/>
+              <a:t> It powers a stack of libraries including SQL </a:t>
+            </a:r>
+            <a:r>
+              <a:rPr lang="en-US"/>
+              <a:t>and Data Frames</a:t>
+            </a:r>
+            <a:r>
+              <a:rPr lang="en-US" dirty="0"/>
+              <a:t>, MLlib for machine learning, GraphX, and Spark Streaming</a:t>
+            </a:r>
+          </a:p>
+          <a:p>
+            <a:pPr>
+              <a:buFont typeface="Wingdings" panose="05000000000000000000" pitchFamily="2" charset="2"/>
+              <a:buChar char="v"/>
+            </a:pPr>
+            <a:r>
+              <a:rPr lang="en-US" dirty="0"/>
+              <a:t>Latest stable version is 2.4.0 with multiple advance features</a:t>
+            </a:r>
+            <a:endParaRPr lang="x-none" dirty="0"/>
+          </a:p>
+        </p:txBody>
+      </p:sp>
+      <p:sp>
+        <p:nvSpPr>
+          <p:cNvPr id="4" name="Title 1">
+            <a:extLst>
+              <a:ext uri="{FF2B5EF4-FFF2-40B4-BE49-F238E27FC236}">
+                <a16:creationId xmlns:a16="http://schemas.microsoft.com/office/drawing/2014/main" xmlns="" id="{D1F22F75-6806-481E-A0D8-FC161C3266D1}"/>
+              </a:ext>
+            </a:extLst>
+          </p:cNvPr>
+          <p:cNvSpPr>
+            <a:spLocks noGrp="1"/>
+          </p:cNvSpPr>
+          <p:nvPr>
+            <p:ph type="title"/>
+          </p:nvPr>
+        </p:nvSpPr>
+        <p:spPr>
+          <a:xfrm>
+            <a:off x="1096963" y="287338"/>
+            <a:ext cx="10058400" cy="1449387"/>
+          </a:xfrm>
+        </p:spPr>
+        <p:txBody>
+          <a:bodyPr/>
+          <a:lstStyle/>
+          <a:p>
+            <a:r>
+              <a:rPr lang="en-US" dirty="0"/>
+              <a:t>Big Data: Tools</a:t>
+            </a:r>
+            <a:endParaRPr lang="x-none" dirty="0"/>
+          </a:p>
+        </p:txBody>
+      </p:sp>
+    </p:spTree>
+    <p:extLst>
+      <p:ext uri="{BB962C8B-B14F-4D97-AF65-F5344CB8AC3E}">
+        <p14:creationId xmlns:p14="http://schemas.microsoft.com/office/powerpoint/2010/main" val="2181567895"/>
+      </p:ext>
+    </p:extLst>
+  </p:cSld>
+  <p:clrMapOvr>
+    <a:masterClrMapping/>
+  </p:clrMapOvr>
+</p:sld>
+</file>
+
+<file path=ppt/slides/slide17.xml><?xml version="1.0" encoding="utf-8"?>
+<p:sld xmlns:a="http://schemas.openxmlformats.org/drawingml/2006/main" xmlns:r="http://schemas.openxmlformats.org/officeDocument/2006/relationships" xmlns:p="http://schemas.openxmlformats.org/presentationml/2006/main">
+  <p:cSld>
+    <p:spTree>
+      <p:nvGrpSpPr>
+        <p:cNvPr id="1" name=""/>
+        <p:cNvGrpSpPr/>
+        <p:nvPr/>
+      </p:nvGrpSpPr>
+      <p:grpSpPr>
+        <a:xfrm>
+          <a:off x="0" y="0"/>
+          <a:ext cx="0" cy="0"/>
+          <a:chOff x="0" y="0"/>
+          <a:chExt cx="0" cy="0"/>
+        </a:xfrm>
+      </p:grpSpPr>
+      <p:sp>
+        <p:nvSpPr>
           <p:cNvPr id="2" name="Title 1"/>
           <p:cNvSpPr>
             <a:spLocks noGrp="1"/>
@@ -5274,7 +5502,7 @@
 </p:sld>
 </file>
 
-<file path=ppt/slides/slide17.xml><?xml version="1.0" encoding="utf-8"?>
+<file path=ppt/slides/slide18.xml><?xml version="1.0" encoding="utf-8"?>
 <p:sld xmlns:a="http://schemas.openxmlformats.org/drawingml/2006/main" xmlns:r="http://schemas.openxmlformats.org/officeDocument/2006/relationships" xmlns:p="http://schemas.openxmlformats.org/presentationml/2006/main">
   <p:cSld>
     <p:spTree>
@@ -5538,14 +5766,14 @@
                 <a:gridCol w="5035931">
                   <a:extLst>
                     <a:ext uri="{9D8B030D-6E8A-4147-A177-3AD203B41FA5}">
-                      <a16:colId xmlns="" xmlns:a16="http://schemas.microsoft.com/office/drawing/2014/main" val="20000"/>
+                      <a16:colId xmlns:a16="http://schemas.microsoft.com/office/drawing/2014/main" xmlns="" val="20000"/>
                     </a:ext>
                   </a:extLst>
                 </a:gridCol>
                 <a:gridCol w="5022469">
                   <a:extLst>
                     <a:ext uri="{9D8B030D-6E8A-4147-A177-3AD203B41FA5}">
-                      <a16:colId xmlns="" xmlns:a16="http://schemas.microsoft.com/office/drawing/2014/main" val="20001"/>
+                      <a16:colId xmlns:a16="http://schemas.microsoft.com/office/drawing/2014/main" xmlns="" val="20001"/>
                     </a:ext>
                   </a:extLst>
                 </a:gridCol>
@@ -5625,7 +5853,7 @@
                 </a:tc>
                 <a:extLst>
                   <a:ext uri="{0D108BD9-81ED-4DB2-BD59-A6C34878D82A}">
-                    <a16:rowId xmlns="" xmlns:a16="http://schemas.microsoft.com/office/drawing/2014/main" val="10000"/>
+                    <a16:rowId xmlns:a16="http://schemas.microsoft.com/office/drawing/2014/main" xmlns="" val="10000"/>
                   </a:ext>
                 </a:extLst>
               </a:tr>
@@ -5712,7 +5940,7 @@
                 </a:tc>
                 <a:extLst>
                   <a:ext uri="{0D108BD9-81ED-4DB2-BD59-A6C34878D82A}">
-                    <a16:rowId xmlns="" xmlns:a16="http://schemas.microsoft.com/office/drawing/2014/main" val="10001"/>
+                    <a16:rowId xmlns:a16="http://schemas.microsoft.com/office/drawing/2014/main" xmlns="" val="10001"/>
                   </a:ext>
                 </a:extLst>
               </a:tr>
@@ -5815,7 +6043,7 @@
                 </a:tc>
                 <a:extLst>
                   <a:ext uri="{0D108BD9-81ED-4DB2-BD59-A6C34878D82A}">
-                    <a16:rowId xmlns="" xmlns:a16="http://schemas.microsoft.com/office/drawing/2014/main" val="10002"/>
+                    <a16:rowId xmlns:a16="http://schemas.microsoft.com/office/drawing/2014/main" xmlns="" val="10002"/>
                   </a:ext>
                 </a:extLst>
               </a:tr>

</xml_diff>

<commit_message>
added A vs A slide
Added: A vs A slide and its content
</commit_message>
<xml_diff>
--- a/Project Interim Submission/Generic DS Framework.pptx
+++ b/Project Interim Submission/Generic DS Framework.pptx
@@ -5,7 +5,7 @@
     <p:sldMasterId id="2147483708" r:id="rId1"/>
   </p:sldMasterIdLst>
   <p:notesMasterIdLst>
-    <p:notesMasterId r:id="rId20"/>
+    <p:notesMasterId r:id="rId21"/>
   </p:notesMasterIdLst>
   <p:sldIdLst>
     <p:sldId id="256" r:id="rId2"/>
@@ -20,12 +20,13 @@
     <p:sldId id="269" r:id="rId11"/>
     <p:sldId id="272" r:id="rId12"/>
     <p:sldId id="273" r:id="rId13"/>
-    <p:sldId id="263" r:id="rId14"/>
-    <p:sldId id="261" r:id="rId15"/>
-    <p:sldId id="262" r:id="rId16"/>
-    <p:sldId id="270" r:id="rId17"/>
-    <p:sldId id="265" r:id="rId18"/>
-    <p:sldId id="266" r:id="rId19"/>
+    <p:sldId id="274" r:id="rId14"/>
+    <p:sldId id="263" r:id="rId15"/>
+    <p:sldId id="261" r:id="rId16"/>
+    <p:sldId id="262" r:id="rId17"/>
+    <p:sldId id="270" r:id="rId18"/>
+    <p:sldId id="265" r:id="rId19"/>
+    <p:sldId id="266" r:id="rId20"/>
   </p:sldIdLst>
   <p:sldSz cx="12192000" cy="6858000"/>
   <p:notesSz cx="6858000" cy="9144000"/>
@@ -4725,11 +4726,7 @@
           <a:p>
             <a:r>
               <a:rPr lang="en-US" dirty="0" smtClean="0"/>
-              <a:t>DATA: </a:t>
-            </a:r>
-            <a:r>
-              <a:rPr lang="en-US" dirty="0" smtClean="0"/>
-              <a:t>ANALYTICS </a:t>
+              <a:t>DATA: ANALYTICS </a:t>
             </a:r>
             <a:endParaRPr lang="en-US" dirty="0"/>
           </a:p>
@@ -4789,7 +4786,6 @@
               <a:rPr lang="en-US" dirty="0" smtClean="0"/>
               <a:t>.</a:t>
             </a:r>
-            <a:endParaRPr lang="en-US" dirty="0" smtClean="0"/>
           </a:p>
           <a:p>
             <a:pPr marL="0" indent="0">
@@ -4797,11 +4793,7 @@
             </a:pPr>
             <a:r>
               <a:rPr lang="en-US" b="1" dirty="0" smtClean="0"/>
-              <a:t>Example </a:t>
-            </a:r>
-            <a:r>
-              <a:rPr lang="en-US" b="1" dirty="0" smtClean="0"/>
-              <a:t>Tools</a:t>
+              <a:t>Example Tools</a:t>
             </a:r>
           </a:p>
           <a:p>
@@ -4931,7 +4923,7 @@
       </p:grpSpPr>
       <p:sp>
         <p:nvSpPr>
-          <p:cNvPr id="4" name="Title 3"/>
+          <p:cNvPr id="2" name="Title 1"/>
           <p:cNvSpPr>
             <a:spLocks noGrp="1"/>
           </p:cNvSpPr>
@@ -4944,43 +4936,669 @@
           <a:bodyPr/>
           <a:lstStyle/>
           <a:p>
-            <a:pPr algn="ctr"/>
-            <a:r>
-              <a:rPr lang="en-US" dirty="0"/>
-              <a:t>BIG DATA</a:t>
-            </a:r>
-          </a:p>
-        </p:txBody>
-      </p:sp>
-      <p:sp>
-        <p:nvSpPr>
-          <p:cNvPr id="5" name="Text Placeholder 4"/>
-          <p:cNvSpPr>
-            <a:spLocks noGrp="1"/>
-          </p:cNvSpPr>
-          <p:nvPr>
-            <p:ph type="body" idx="1"/>
-          </p:nvPr>
-        </p:nvSpPr>
-        <p:spPr/>
-        <p:txBody>
-          <a:bodyPr>
-            <a:normAutofit/>
-          </a:bodyPr>
-          <a:lstStyle/>
-          <a:p>
-            <a:pPr marL="0" lvl="1" algn="ctr"/>
-            <a:r>
-              <a:rPr lang="en-US" sz="2000" dirty="0"/>
-              <a:t>PILLARS, SOURCES, DATA LAKE, MODEL, TOOLS</a:t>
-            </a:r>
-          </a:p>
-        </p:txBody>
-      </p:sp>
+            <a:r>
+              <a:rPr lang="en-US" dirty="0" smtClean="0"/>
+              <a:t>Analytics vs Analysis (A vs A)</a:t>
+            </a:r>
+            <a:endParaRPr lang="en-US" dirty="0"/>
+          </a:p>
+        </p:txBody>
+      </p:sp>
+      <p:graphicFrame>
+        <p:nvGraphicFramePr>
+          <p:cNvPr id="4" name="Content Placeholder 3"/>
+          <p:cNvGraphicFramePr>
+            <a:graphicFrameLocks noGrp="1"/>
+          </p:cNvGraphicFramePr>
+          <p:nvPr>
+            <p:ph idx="1"/>
+            <p:extLst>
+              <p:ext uri="{D42A27DB-BD31-4B8C-83A1-F6EECF244321}">
+                <p14:modId xmlns:p14="http://schemas.microsoft.com/office/powerpoint/2010/main" val="546937068"/>
+              </p:ext>
+            </p:extLst>
+          </p:nvPr>
+        </p:nvGraphicFramePr>
+        <p:xfrm>
+          <a:off x="1097280" y="1799773"/>
+          <a:ext cx="10058401" cy="4399461"/>
+        </p:xfrm>
+        <a:graphic>
+          <a:graphicData uri="http://schemas.openxmlformats.org/drawingml/2006/table">
+            <a:tbl>
+              <a:tblPr/>
+              <a:tblGrid>
+                <a:gridCol w="1195977"/>
+                <a:gridCol w="4431212"/>
+                <a:gridCol w="4431212"/>
+              </a:tblGrid>
+              <a:tr h="286359">
+                <a:tc>
+                  <a:txBody>
+                    <a:bodyPr/>
+                    <a:lstStyle/>
+                    <a:p>
+                      <a:pPr algn="ctr"/>
+                      <a:r>
+                        <a:rPr lang="en-US" sz="1800" b="0" dirty="0">
+                          <a:solidFill>
+                            <a:schemeClr val="bg1"/>
+                          </a:solidFill>
+                        </a:rPr>
+                        <a:t>Basis  </a:t>
+                      </a:r>
+                    </a:p>
+                  </a:txBody>
+                  <a:tcPr marL="22225" marR="22225" marT="11112" marB="11112" anchor="ctr">
+                    <a:solidFill>
+                      <a:schemeClr val="accent2"/>
+                    </a:solidFill>
+                  </a:tcPr>
+                </a:tc>
+                <a:tc>
+                  <a:txBody>
+                    <a:bodyPr/>
+                    <a:lstStyle/>
+                    <a:p>
+                      <a:pPr algn="ctr"/>
+                      <a:r>
+                        <a:rPr lang="en-US" sz="1800" b="0" dirty="0">
+                          <a:solidFill>
+                            <a:schemeClr val="bg1"/>
+                          </a:solidFill>
+                        </a:rPr>
+                        <a:t>               Data Analytics  </a:t>
+                      </a:r>
+                    </a:p>
+                  </a:txBody>
+                  <a:tcPr marL="22225" marR="22225" marT="11112" marB="11112" anchor="ctr">
+                    <a:solidFill>
+                      <a:schemeClr val="accent2"/>
+                    </a:solidFill>
+                  </a:tcPr>
+                </a:tc>
+                <a:tc>
+                  <a:txBody>
+                    <a:bodyPr/>
+                    <a:lstStyle/>
+                    <a:p>
+                      <a:pPr algn="ctr"/>
+                      <a:r>
+                        <a:rPr lang="en-US" sz="1800" b="0" dirty="0">
+                          <a:solidFill>
+                            <a:schemeClr val="bg1"/>
+                          </a:solidFill>
+                        </a:rPr>
+                        <a:t>             Data Analysis  </a:t>
+                      </a:r>
+                    </a:p>
+                  </a:txBody>
+                  <a:tcPr marL="22225" marR="22225" marT="11112" marB="11112" anchor="ctr">
+                    <a:solidFill>
+                      <a:schemeClr val="accent2"/>
+                    </a:solidFill>
+                  </a:tcPr>
+                </a:tc>
+              </a:tr>
+              <a:tr h="548800">
+                <a:tc>
+                  <a:txBody>
+                    <a:bodyPr/>
+                    <a:lstStyle/>
+                    <a:p>
+                      <a:pPr algn="l"/>
+                      <a:r>
+                        <a:rPr lang="en-US" sz="1600" dirty="0"/>
+                        <a:t>Form  </a:t>
+                      </a:r>
+                    </a:p>
+                    <a:p>
+                      <a:pPr algn="l"/>
+                      <a:r>
+                        <a:rPr lang="en-US" sz="1600" dirty="0"/>
+                        <a:t> </a:t>
+                      </a:r>
+                      <a:endParaRPr lang="en-US" sz="1600" b="1" dirty="0"/>
+                    </a:p>
+                  </a:txBody>
+                  <a:tcPr marL="22225" marR="22225" marT="11112" marB="11112" anchor="ctr"/>
+                </a:tc>
+                <a:tc>
+                  <a:txBody>
+                    <a:bodyPr/>
+                    <a:lstStyle/>
+                    <a:p>
+                      <a:pPr algn="l"/>
+                      <a:r>
+                        <a:rPr lang="en-US" sz="1400" dirty="0" smtClean="0"/>
+                        <a:t>Used </a:t>
+                      </a:r>
+                      <a:r>
+                        <a:rPr lang="en-US" sz="1400" dirty="0"/>
+                        <a:t>in businesses to make decisions from data which are data-driven</a:t>
+                      </a:r>
+                    </a:p>
+                  </a:txBody>
+                  <a:tcPr marL="22225" marR="22225" marT="11112" marB="11112" anchor="ctr"/>
+                </a:tc>
+                <a:tc>
+                  <a:txBody>
+                    <a:bodyPr/>
+                    <a:lstStyle/>
+                    <a:p>
+                      <a:pPr algn="l"/>
+                      <a:r>
+                        <a:rPr lang="en-US" sz="1400" dirty="0" smtClean="0"/>
+                        <a:t>used </a:t>
+                      </a:r>
+                      <a:r>
+                        <a:rPr lang="en-US" sz="1400" dirty="0"/>
+                        <a:t>in businesses to analyze data and take some insights of it.</a:t>
+                      </a:r>
+                    </a:p>
+                  </a:txBody>
+                  <a:tcPr marL="22225" marR="22225" marT="11112" marB="11112" anchor="ctr"/>
+                </a:tc>
+              </a:tr>
+              <a:tr h="526247">
+                <a:tc>
+                  <a:txBody>
+                    <a:bodyPr/>
+                    <a:lstStyle/>
+                    <a:p>
+                      <a:pPr algn="l"/>
+                      <a:r>
+                        <a:rPr lang="en-US" sz="1600" dirty="0" smtClean="0"/>
+                        <a:t>Structure</a:t>
+                      </a:r>
+                      <a:endParaRPr lang="en-US" sz="1600" b="1" dirty="0"/>
+                    </a:p>
+                  </a:txBody>
+                  <a:tcPr marL="22225" marR="22225" marT="11112" marB="11112" anchor="ctr"/>
+                </a:tc>
+                <a:tc>
+                  <a:txBody>
+                    <a:bodyPr/>
+                    <a:lstStyle/>
+                    <a:p>
+                      <a:pPr algn="l"/>
+                      <a:r>
+                        <a:rPr lang="en-US" sz="1400" dirty="0" smtClean="0"/>
+                        <a:t>Consist </a:t>
+                      </a:r>
+                      <a:r>
+                        <a:rPr lang="en-US" sz="1400" dirty="0"/>
+                        <a:t>of data collection and inspect in general and it has one or more users.</a:t>
+                      </a:r>
+                    </a:p>
+                  </a:txBody>
+                  <a:tcPr marL="22225" marR="22225" marT="11112" marB="11112" anchor="ctr"/>
+                </a:tc>
+                <a:tc>
+                  <a:txBody>
+                    <a:bodyPr/>
+                    <a:lstStyle/>
+                    <a:p>
+                      <a:pPr algn="l"/>
+                      <a:r>
+                        <a:rPr lang="en-US" sz="1400" dirty="0" smtClean="0"/>
+                        <a:t>Consisted </a:t>
+                      </a:r>
+                      <a:r>
+                        <a:rPr lang="en-US" sz="1400" dirty="0"/>
+                        <a:t>of defining a data, investigation, cleaning, transforming the data to give a meaningful outcome.  </a:t>
+                      </a:r>
+                    </a:p>
+                  </a:txBody>
+                  <a:tcPr marL="22225" marR="22225" marT="11112" marB="11112" anchor="ctr"/>
+                </a:tc>
+              </a:tr>
+              <a:tr h="602350">
+                <a:tc>
+                  <a:txBody>
+                    <a:bodyPr/>
+                    <a:lstStyle/>
+                    <a:p>
+                      <a:pPr algn="l"/>
+                      <a:r>
+                        <a:rPr lang="en-US" sz="1600" dirty="0"/>
+                        <a:t>Tools</a:t>
+                      </a:r>
+                      <a:endParaRPr lang="en-US" sz="1600" b="1" dirty="0"/>
+                    </a:p>
+                  </a:txBody>
+                  <a:tcPr marL="22225" marR="22225" marT="11112" marB="11112" anchor="ctr"/>
+                </a:tc>
+                <a:tc>
+                  <a:txBody>
+                    <a:bodyPr/>
+                    <a:lstStyle/>
+                    <a:p>
+                      <a:pPr algn="l"/>
+                      <a:r>
+                        <a:rPr lang="en-US" sz="1400" dirty="0" smtClean="0"/>
+                        <a:t>Example tools </a:t>
+                      </a:r>
+                      <a:r>
+                        <a:rPr lang="en-US" sz="1400" dirty="0"/>
+                        <a:t>in a market but mainly R, Tableau Public, Python, SAS, Apache Spark, Excel are used.</a:t>
+                      </a:r>
+                    </a:p>
+                  </a:txBody>
+                  <a:tcPr marL="22225" marR="22225" marT="11112" marB="11112" anchor="ctr"/>
+                </a:tc>
+                <a:tc>
+                  <a:txBody>
+                    <a:bodyPr/>
+                    <a:lstStyle/>
+                    <a:p>
+                      <a:pPr algn="l"/>
+                      <a:r>
+                        <a:rPr lang="en-US" sz="1400" dirty="0" smtClean="0"/>
+                        <a:t>Example tools </a:t>
+                      </a:r>
+                      <a:r>
+                        <a:rPr lang="en-US" sz="1400" dirty="0" err="1" smtClean="0"/>
+                        <a:t>OpenRefine</a:t>
+                      </a:r>
+                      <a:r>
+                        <a:rPr lang="en-US" sz="1400" dirty="0"/>
+                        <a:t>, KNIME, </a:t>
+                      </a:r>
+                      <a:r>
+                        <a:rPr lang="en-US" sz="1400" dirty="0" err="1"/>
+                        <a:t>RapidMiner</a:t>
+                      </a:r>
+                      <a:r>
+                        <a:rPr lang="en-US" sz="1400" dirty="0"/>
+                        <a:t>, Google Fusion Tables, Tableau Public, </a:t>
+                      </a:r>
+                      <a:r>
+                        <a:rPr lang="en-US" sz="1400" dirty="0" err="1"/>
+                        <a:t>NodeXL</a:t>
+                      </a:r>
+                      <a:r>
+                        <a:rPr lang="en-US" sz="1400" dirty="0"/>
+                        <a:t>, </a:t>
+                      </a:r>
+                      <a:r>
+                        <a:rPr lang="en-US" sz="1400" dirty="0" err="1" smtClean="0"/>
+                        <a:t>WolframAlpha</a:t>
+                      </a:r>
+                      <a:r>
+                        <a:rPr lang="en-US" sz="1400" dirty="0" smtClean="0"/>
+                        <a:t>.</a:t>
+                      </a:r>
+                      <a:endParaRPr lang="en-US" sz="1400" dirty="0"/>
+                    </a:p>
+                  </a:txBody>
+                  <a:tcPr marL="22225" marR="22225" marT="11112" marB="11112" anchor="ctr"/>
+                </a:tc>
+              </a:tr>
+              <a:tr h="942460">
+                <a:tc>
+                  <a:txBody>
+                    <a:bodyPr/>
+                    <a:lstStyle/>
+                    <a:p>
+                      <a:pPr algn="l"/>
+                      <a:r>
+                        <a:rPr lang="en-US" sz="1600" dirty="0" smtClean="0"/>
+                        <a:t>Process Sequence</a:t>
+                      </a:r>
+                      <a:endParaRPr lang="en-US" sz="1600" b="1" dirty="0"/>
+                    </a:p>
+                  </a:txBody>
+                  <a:tcPr marL="22225" marR="22225" marT="11112" marB="11112" anchor="ctr"/>
+                </a:tc>
+                <a:tc>
+                  <a:txBody>
+                    <a:bodyPr/>
+                    <a:lstStyle/>
+                    <a:p>
+                      <a:pPr algn="l"/>
+                      <a:r>
+                        <a:rPr lang="en-US" sz="1400" dirty="0" smtClean="0"/>
+                        <a:t>Business </a:t>
+                      </a:r>
+                      <a:r>
+                        <a:rPr lang="en-US" sz="1400" dirty="0"/>
+                        <a:t>Case Evaluation, Data Identification, </a:t>
+                      </a:r>
+                      <a:r>
+                        <a:rPr lang="en-US" sz="1400" dirty="0" smtClean="0"/>
+                        <a:t>Acquisition </a:t>
+                      </a:r>
+                      <a:r>
+                        <a:rPr lang="en-US" sz="1400" dirty="0"/>
+                        <a:t>&amp; Filtering, </a:t>
+                      </a:r>
+                      <a:r>
+                        <a:rPr lang="en-US" sz="1400" dirty="0" smtClean="0"/>
+                        <a:t>Extraction</a:t>
+                      </a:r>
+                      <a:r>
+                        <a:rPr lang="en-US" sz="1400" dirty="0"/>
+                        <a:t>, </a:t>
+                      </a:r>
+                      <a:r>
+                        <a:rPr lang="en-US" sz="1400" dirty="0" smtClean="0"/>
+                        <a:t>Validation </a:t>
+                      </a:r>
+                      <a:r>
+                        <a:rPr lang="en-US" sz="1400" dirty="0"/>
+                        <a:t>&amp; Cleansing, </a:t>
+                      </a:r>
+                      <a:r>
+                        <a:rPr lang="en-US" sz="1400" dirty="0" smtClean="0"/>
+                        <a:t>Aggregation </a:t>
+                      </a:r>
+                      <a:r>
+                        <a:rPr lang="en-US" sz="1400" dirty="0"/>
+                        <a:t>&amp; Representation, Data Analysis, </a:t>
+                      </a:r>
+                      <a:r>
+                        <a:rPr lang="en-US" sz="1400" dirty="0" smtClean="0"/>
+                        <a:t>Visualization</a:t>
+                      </a:r>
+                      <a:r>
+                        <a:rPr lang="en-US" sz="1400" dirty="0"/>
+                        <a:t>, Utilization of Analysis Results.  </a:t>
+                      </a:r>
+                    </a:p>
+                  </a:txBody>
+                  <a:tcPr marL="22225" marR="22225" marT="11112" marB="11112" anchor="ctr"/>
+                </a:tc>
+                <a:tc>
+                  <a:txBody>
+                    <a:bodyPr/>
+                    <a:lstStyle/>
+                    <a:p>
+                      <a:pPr algn="l"/>
+                      <a:r>
+                        <a:rPr lang="en-US" sz="1400" dirty="0" smtClean="0"/>
+                        <a:t>Data </a:t>
+                      </a:r>
+                      <a:r>
+                        <a:rPr lang="en-US" sz="1400" dirty="0"/>
+                        <a:t>gathering</a:t>
+                      </a:r>
+                      <a:r>
+                        <a:rPr lang="en-US" sz="1400" dirty="0" smtClean="0"/>
+                        <a:t>, </a:t>
+                      </a:r>
+                      <a:r>
+                        <a:rPr lang="en-US" sz="1400" dirty="0"/>
+                        <a:t>scrubbing, analysis </a:t>
+                      </a:r>
+                      <a:r>
+                        <a:rPr lang="en-US" sz="1400" dirty="0" smtClean="0"/>
+                        <a:t>and interpret precisely </a:t>
+                      </a:r>
+                      <a:r>
+                        <a:rPr lang="en-US" sz="1400" dirty="0"/>
+                        <a:t>so that </a:t>
+                      </a:r>
+                      <a:r>
+                        <a:rPr lang="en-US" sz="1400" dirty="0" smtClean="0"/>
+                        <a:t>one </a:t>
+                      </a:r>
+                      <a:r>
+                        <a:rPr lang="en-US" sz="1400" dirty="0"/>
+                        <a:t>can understand what </a:t>
+                      </a:r>
+                      <a:r>
+                        <a:rPr lang="en-US" sz="1400" dirty="0" smtClean="0"/>
+                        <a:t>data </a:t>
+                      </a:r>
+                      <a:r>
+                        <a:rPr lang="en-US" sz="1400" dirty="0"/>
+                        <a:t>want to say.</a:t>
+                      </a:r>
+                    </a:p>
+                  </a:txBody>
+                  <a:tcPr marL="22225" marR="22225" marT="11112" marB="11112" anchor="ctr"/>
+                </a:tc>
+              </a:tr>
+              <a:tr h="813291">
+                <a:tc>
+                  <a:txBody>
+                    <a:bodyPr/>
+                    <a:lstStyle/>
+                    <a:p>
+                      <a:pPr algn="l"/>
+                      <a:r>
+                        <a:rPr lang="en-US" sz="1600" dirty="0"/>
+                        <a:t>Usage</a:t>
+                      </a:r>
+                      <a:endParaRPr lang="en-US" sz="1600" b="1" dirty="0"/>
+                    </a:p>
+                  </a:txBody>
+                  <a:tcPr marL="22225" marR="22225" marT="11112" marB="11112" anchor="ctr"/>
+                </a:tc>
+                <a:tc>
+                  <a:txBody>
+                    <a:bodyPr/>
+                    <a:lstStyle/>
+                    <a:p>
+                      <a:pPr algn="l"/>
+                      <a:r>
+                        <a:rPr lang="en-US" sz="1400" dirty="0" smtClean="0"/>
+                        <a:t>It</a:t>
+                      </a:r>
+                      <a:r>
+                        <a:rPr lang="en-US" sz="1400" baseline="0" dirty="0" smtClean="0"/>
+                        <a:t> </a:t>
+                      </a:r>
+                      <a:r>
+                        <a:rPr lang="en-US" sz="1400" dirty="0" smtClean="0"/>
+                        <a:t>can </a:t>
+                      </a:r>
+                      <a:r>
+                        <a:rPr lang="en-US" sz="1400" dirty="0"/>
+                        <a:t>be used to find masked patterns, anonymous correlations, customer preferences, market </a:t>
+                      </a:r>
+                      <a:r>
+                        <a:rPr lang="en-US" sz="1400" dirty="0" smtClean="0"/>
+                        <a:t>trends</a:t>
+                      </a:r>
+                      <a:r>
+                        <a:rPr lang="en-US" sz="1400" baseline="0" dirty="0" smtClean="0"/>
+                        <a:t> </a:t>
+                      </a:r>
+                      <a:r>
+                        <a:rPr lang="en-US" sz="1400" dirty="0" smtClean="0"/>
+                        <a:t>that </a:t>
+                      </a:r>
+                      <a:r>
+                        <a:rPr lang="en-US" sz="1400" dirty="0"/>
+                        <a:t>can </a:t>
+                      </a:r>
+                      <a:r>
+                        <a:rPr lang="en-US" sz="1400" dirty="0" smtClean="0"/>
+                        <a:t>aid</a:t>
+                      </a:r>
+                      <a:r>
+                        <a:rPr lang="en-US" sz="1400" baseline="0" dirty="0" smtClean="0"/>
+                        <a:t> in to </a:t>
+                      </a:r>
+                      <a:r>
+                        <a:rPr lang="en-US" sz="1400" dirty="0" smtClean="0"/>
+                        <a:t>notify </a:t>
+                      </a:r>
+                      <a:r>
+                        <a:rPr lang="en-US" sz="1400" dirty="0"/>
+                        <a:t>decisions for business purpose.</a:t>
+                      </a:r>
+                    </a:p>
+                  </a:txBody>
+                  <a:tcPr marL="22225" marR="22225" marT="11112" marB="11112" anchor="ctr"/>
+                </a:tc>
+                <a:tc>
+                  <a:txBody>
+                    <a:bodyPr/>
+                    <a:lstStyle/>
+                    <a:p>
+                      <a:pPr algn="l"/>
+                      <a:r>
+                        <a:rPr lang="en-US" sz="1400" dirty="0" smtClean="0"/>
+                        <a:t>It</a:t>
+                      </a:r>
+                      <a:r>
+                        <a:rPr lang="en-US" sz="1400" baseline="0" dirty="0" smtClean="0"/>
+                        <a:t> may be </a:t>
+                      </a:r>
+                      <a:r>
+                        <a:rPr lang="en-US" sz="1400" dirty="0" smtClean="0"/>
+                        <a:t>descriptive </a:t>
+                      </a:r>
+                      <a:r>
+                        <a:rPr lang="en-US" sz="1400" dirty="0"/>
+                        <a:t>analysis, exploratory analysis, inferential analysis, predictive analysis and take useful insights from the data.</a:t>
+                      </a:r>
+                    </a:p>
+                  </a:txBody>
+                  <a:tcPr marL="22225" marR="22225" marT="11112" marB="11112" anchor="ctr"/>
+                </a:tc>
+              </a:tr>
+              <a:tr h="669769">
+                <a:tc>
+                  <a:txBody>
+                    <a:bodyPr/>
+                    <a:lstStyle/>
+                    <a:p>
+                      <a:pPr algn="l"/>
+                      <a:r>
+                        <a:rPr lang="en-US" sz="1600" dirty="0"/>
+                        <a:t>Example</a:t>
+                      </a:r>
+                      <a:endParaRPr lang="en-US" sz="1600" b="1" dirty="0"/>
+                    </a:p>
+                  </a:txBody>
+                  <a:tcPr marL="22225" marR="22225" marT="11112" marB="11112" anchor="ctr"/>
+                </a:tc>
+                <a:tc>
+                  <a:txBody>
+                    <a:bodyPr/>
+                    <a:lstStyle/>
+                    <a:p>
+                      <a:pPr algn="l"/>
+                      <a:r>
+                        <a:rPr lang="en-US" sz="1400" dirty="0" smtClean="0"/>
+                        <a:t>1GB </a:t>
+                      </a:r>
+                      <a:r>
+                        <a:rPr lang="en-US" sz="1400" dirty="0"/>
+                        <a:t>customer purchase </a:t>
+                      </a:r>
+                      <a:r>
+                        <a:rPr lang="en-US" sz="1400" dirty="0" smtClean="0"/>
+                        <a:t>data </a:t>
+                      </a:r>
+                      <a:r>
+                        <a:rPr lang="en-US" sz="1400" dirty="0"/>
+                        <a:t>of past 1 year, </a:t>
+                      </a:r>
+                      <a:r>
+                        <a:rPr lang="en-US" sz="1400" dirty="0" smtClean="0"/>
+                        <a:t>one </a:t>
+                      </a:r>
+                      <a:r>
+                        <a:rPr lang="en-US" sz="1400" dirty="0"/>
+                        <a:t>has to find that what our customers next possible </a:t>
+                      </a:r>
+                      <a:r>
+                        <a:rPr lang="en-US" sz="1400" dirty="0" smtClean="0"/>
+                        <a:t>purchases.</a:t>
+                      </a:r>
+                      <a:endParaRPr lang="en-US" sz="1400" dirty="0"/>
+                    </a:p>
+                  </a:txBody>
+                  <a:tcPr marL="22225" marR="22225" marT="11112" marB="11112" anchor="ctr"/>
+                </a:tc>
+                <a:tc>
+                  <a:txBody>
+                    <a:bodyPr/>
+                    <a:lstStyle/>
+                    <a:p>
+                      <a:pPr algn="l"/>
+                      <a:r>
+                        <a:rPr lang="en-US" sz="1400" dirty="0" smtClean="0"/>
+                        <a:t>1GB </a:t>
+                      </a:r>
+                      <a:r>
+                        <a:rPr lang="en-US" sz="1400" dirty="0"/>
+                        <a:t>customer purchase </a:t>
+                      </a:r>
+                      <a:r>
+                        <a:rPr lang="en-US" sz="1400" dirty="0" smtClean="0"/>
+                        <a:t>data </a:t>
+                      </a:r>
+                      <a:r>
+                        <a:rPr lang="en-US" sz="1400" dirty="0"/>
+                        <a:t>of past 1 </a:t>
+                      </a:r>
+                      <a:r>
+                        <a:rPr lang="en-US" sz="1400" dirty="0" smtClean="0"/>
+                        <a:t>year,</a:t>
+                      </a:r>
+                      <a:r>
+                        <a:rPr lang="en-US" sz="1400" baseline="0" dirty="0" smtClean="0"/>
+                        <a:t> </a:t>
+                      </a:r>
+                      <a:r>
+                        <a:rPr lang="en-US" sz="1400" dirty="0" smtClean="0"/>
+                        <a:t>one</a:t>
+                      </a:r>
+                      <a:r>
+                        <a:rPr lang="en-US" sz="1400" baseline="0" dirty="0" smtClean="0"/>
+                        <a:t> </a:t>
+                      </a:r>
+                      <a:r>
+                        <a:rPr lang="en-US" sz="1400" dirty="0" smtClean="0"/>
+                        <a:t> try</a:t>
+                      </a:r>
+                      <a:r>
+                        <a:rPr lang="en-US" sz="1400" baseline="0" dirty="0" smtClean="0"/>
+                        <a:t>ing </a:t>
+                      </a:r>
+                      <a:r>
+                        <a:rPr lang="en-US" sz="1400" dirty="0" smtClean="0"/>
+                        <a:t>to </a:t>
+                      </a:r>
+                      <a:r>
+                        <a:rPr lang="en-US" sz="1400" dirty="0"/>
+                        <a:t>find what happened so </a:t>
+                      </a:r>
+                      <a:r>
+                        <a:rPr lang="en-US" sz="1400" dirty="0" smtClean="0"/>
+                        <a:t>far, having</a:t>
+                      </a:r>
+                      <a:r>
+                        <a:rPr lang="en-US" sz="1400" baseline="0" dirty="0" smtClean="0"/>
+                        <a:t> </a:t>
+                      </a:r>
+                      <a:r>
+                        <a:rPr lang="en-US" sz="1400" dirty="0" smtClean="0"/>
+                        <a:t>look </a:t>
+                      </a:r>
+                      <a:r>
+                        <a:rPr lang="en-US" sz="1400" dirty="0"/>
+                        <a:t>into past.</a:t>
+                      </a:r>
+                    </a:p>
+                  </a:txBody>
+                  <a:tcPr marL="22225" marR="22225" marT="11112" marB="11112" anchor="ctr"/>
+                </a:tc>
+              </a:tr>
+            </a:tbl>
+          </a:graphicData>
+        </a:graphic>
+      </p:graphicFrame>
     </p:spTree>
     <p:extLst>
       <p:ext uri="{BB962C8B-B14F-4D97-AF65-F5344CB8AC3E}">
-        <p14:creationId xmlns:p14="http://schemas.microsoft.com/office/powerpoint/2010/main" val="2241138064"/>
+        <p14:creationId xmlns:p14="http://schemas.microsoft.com/office/powerpoint/2010/main" val="2648148418"/>
       </p:ext>
     </p:extLst>
   </p:cSld>
@@ -5009,13 +5627,7 @@
       </p:grpSpPr>
       <p:sp>
         <p:nvSpPr>
-          <p:cNvPr id="2" name="Title 1">
-            <a:extLst>
-              <a:ext uri="{FF2B5EF4-FFF2-40B4-BE49-F238E27FC236}">
-                <a16:creationId xmlns:a16="http://schemas.microsoft.com/office/drawing/2014/main" xmlns="" id="{F4727C6F-3982-4E54-AA66-B4E0AA33FF66}"/>
-              </a:ext>
-            </a:extLst>
-          </p:cNvPr>
+          <p:cNvPr id="4" name="Title 3"/>
           <p:cNvSpPr>
             <a:spLocks noGrp="1"/>
           </p:cNvSpPr>
@@ -5028,28 +5640,22 @@
           <a:bodyPr/>
           <a:lstStyle/>
           <a:p>
-            <a:r>
-              <a:rPr lang="en-US" dirty="0"/>
-              <a:t>Big Data</a:t>
-            </a:r>
-            <a:endParaRPr lang="x-none" dirty="0"/>
-          </a:p>
-        </p:txBody>
-      </p:sp>
-      <p:sp>
-        <p:nvSpPr>
-          <p:cNvPr id="3" name="Content Placeholder 2">
-            <a:extLst>
-              <a:ext uri="{FF2B5EF4-FFF2-40B4-BE49-F238E27FC236}">
-                <a16:creationId xmlns:a16="http://schemas.microsoft.com/office/drawing/2014/main" xmlns="" id="{1134DAC4-9E94-441C-A9BE-87750F6F60A2}"/>
-              </a:ext>
-            </a:extLst>
-          </p:cNvPr>
-          <p:cNvSpPr>
-            <a:spLocks noGrp="1"/>
-          </p:cNvSpPr>
-          <p:nvPr>
-            <p:ph idx="1"/>
+            <a:pPr algn="ctr"/>
+            <a:r>
+              <a:rPr lang="en-US" dirty="0"/>
+              <a:t>BIG DATA</a:t>
+            </a:r>
+          </a:p>
+        </p:txBody>
+      </p:sp>
+      <p:sp>
+        <p:nvSpPr>
+          <p:cNvPr id="5" name="Text Placeholder 4"/>
+          <p:cNvSpPr>
+            <a:spLocks noGrp="1"/>
+          </p:cNvSpPr>
+          <p:nvPr>
+            <p:ph type="body" idx="1"/>
           </p:nvPr>
         </p:nvSpPr>
         <p:spPr/>
@@ -5059,36 +5665,18 @@
           </a:bodyPr>
           <a:lstStyle/>
           <a:p>
-            <a:r>
-              <a:rPr lang="en-US" sz="3200" b="1" dirty="0"/>
-              <a:t>DEFINITION </a:t>
-            </a:r>
-          </a:p>
-          <a:p>
-            <a:r>
-              <a:rPr lang="en-US" dirty="0">
-                <a:latin typeface="+mj-lt"/>
-              </a:rPr>
-              <a:t>Extremely large data sets that may be analyzed computationally to reveal patterns, trends, and associations, especially relating to human behavior and interactions.</a:t>
-            </a:r>
-          </a:p>
-          <a:p>
-            <a:r>
-              <a:rPr lang="en-US" dirty="0">
-                <a:latin typeface="+mj-lt"/>
-              </a:rPr>
-              <a:t>Big data is a term that describes the large volume of data – both structured and unstructured – that inundates a business on a day-to-day basis. But it’s not the amount of data that’s important. It’s what organizations do with the data that matters. Big data can be analyzed for insights that lead to better decisions and strategic business moves.</a:t>
-            </a:r>
-          </a:p>
-          <a:p>
-            <a:endParaRPr lang="x-none" dirty="0"/>
+            <a:pPr marL="0" lvl="1" algn="ctr"/>
+            <a:r>
+              <a:rPr lang="en-US" sz="2000" dirty="0"/>
+              <a:t>PILLARS, SOURCES, DATA LAKE, MODEL, TOOLS</a:t>
+            </a:r>
           </a:p>
         </p:txBody>
       </p:sp>
     </p:spTree>
     <p:extLst>
       <p:ext uri="{BB962C8B-B14F-4D97-AF65-F5344CB8AC3E}">
-        <p14:creationId xmlns:p14="http://schemas.microsoft.com/office/powerpoint/2010/main" val="196455147"/>
+        <p14:creationId xmlns:p14="http://schemas.microsoft.com/office/powerpoint/2010/main" val="2241138064"/>
       </p:ext>
     </p:extLst>
   </p:cSld>
@@ -5120,7 +5708,7 @@
           <p:cNvPr id="2" name="Title 1">
             <a:extLst>
               <a:ext uri="{FF2B5EF4-FFF2-40B4-BE49-F238E27FC236}">
-                <a16:creationId xmlns:a16="http://schemas.microsoft.com/office/drawing/2014/main" xmlns="" id="{3E1AC600-D16C-47B7-9075-94DA61007B25}"/>
+                <a16:creationId xmlns="" xmlns:a16="http://schemas.microsoft.com/office/drawing/2014/main" id="{F4727C6F-3982-4E54-AA66-B4E0AA33FF66}"/>
               </a:ext>
             </a:extLst>
           </p:cNvPr>
@@ -5131,19 +5719,14 @@
             <p:ph type="title"/>
           </p:nvPr>
         </p:nvSpPr>
-        <p:spPr>
-          <a:xfrm>
-            <a:off x="1097280" y="286603"/>
-            <a:ext cx="10058400" cy="1450757"/>
-          </a:xfrm>
-        </p:spPr>
+        <p:spPr/>
         <p:txBody>
           <a:bodyPr/>
           <a:lstStyle/>
           <a:p>
             <a:r>
               <a:rPr lang="en-US" dirty="0"/>
-              <a:t>Big Data: Tools</a:t>
+              <a:t>Big Data</a:t>
             </a:r>
             <a:endParaRPr lang="x-none" dirty="0"/>
           </a:p>
@@ -5154,7 +5737,7 @@
           <p:cNvPr id="3" name="Content Placeholder 2">
             <a:extLst>
               <a:ext uri="{FF2B5EF4-FFF2-40B4-BE49-F238E27FC236}">
-                <a16:creationId xmlns:a16="http://schemas.microsoft.com/office/drawing/2014/main" xmlns="" id="{DDC8679B-3323-4E4B-ABD6-BD8748DF3AEB}"/>
+                <a16:creationId xmlns="" xmlns:a16="http://schemas.microsoft.com/office/drawing/2014/main" id="{1134DAC4-9E94-441C-A9BE-87750F6F60A2}"/>
               </a:ext>
             </a:extLst>
           </p:cNvPr>
@@ -5167,74 +5750,41 @@
         </p:nvSpPr>
         <p:spPr/>
         <p:txBody>
-          <a:bodyPr/>
-          <a:lstStyle/>
-          <a:p>
-            <a:pPr marL="0" indent="0">
-              <a:buNone/>
-            </a:pPr>
+          <a:bodyPr>
+            <a:normAutofit/>
+          </a:bodyPr>
+          <a:lstStyle/>
+          <a:p>
             <a:r>
               <a:rPr lang="en-US" sz="3200" b="1" dirty="0"/>
-              <a:t>Hadoop</a:t>
-            </a:r>
-            <a:endParaRPr lang="en-US" b="1" dirty="0"/>
-          </a:p>
-          <a:p>
-            <a:pPr>
-              <a:buFont typeface="Wingdings" panose="05000000000000000000" pitchFamily="2" charset="2"/>
-              <a:buChar char="v"/>
-            </a:pPr>
-            <a:r>
-              <a:rPr lang="en-US" dirty="0"/>
-              <a:t>Hadoop software library is a framework</a:t>
-            </a:r>
-          </a:p>
-          <a:p>
-            <a:pPr>
-              <a:buFont typeface="Wingdings" panose="05000000000000000000" pitchFamily="2" charset="2"/>
-              <a:buChar char="v"/>
-            </a:pPr>
-            <a:r>
-              <a:rPr lang="en-US" dirty="0"/>
-              <a:t>Help in distributed processing of large data sets across clusters of computers</a:t>
-            </a:r>
-          </a:p>
-          <a:p>
-            <a:pPr>
-              <a:buFont typeface="Wingdings" panose="05000000000000000000" pitchFamily="2" charset="2"/>
-              <a:buChar char="v"/>
-            </a:pPr>
-            <a:r>
-              <a:rPr lang="en-US" dirty="0"/>
-              <a:t>Two method to start single node or cluster mode</a:t>
-            </a:r>
-          </a:p>
-          <a:p>
-            <a:pPr>
-              <a:buFont typeface="Wingdings" panose="05000000000000000000" pitchFamily="2" charset="2"/>
-              <a:buChar char="v"/>
-            </a:pPr>
-            <a:r>
-              <a:rPr lang="en-US" dirty="0"/>
-              <a:t>Latest stable version is 2.9.2 </a:t>
-            </a:r>
-          </a:p>
-          <a:p>
-            <a:pPr>
-              <a:buFont typeface="Wingdings" panose="05000000000000000000" pitchFamily="2" charset="2"/>
-              <a:buChar char="v"/>
-            </a:pPr>
-            <a:r>
-              <a:rPr lang="en-US" dirty="0"/>
-              <a:t>Few Important features are HDFS, YARN,MAPREDUCE, cost efficient, Hadoop libraries and many more</a:t>
-            </a:r>
+              <a:t>DEFINITION </a:t>
+            </a:r>
+          </a:p>
+          <a:p>
+            <a:r>
+              <a:rPr lang="en-US" dirty="0">
+                <a:latin typeface="+mj-lt"/>
+              </a:rPr>
+              <a:t>Extremely large data sets that may be analyzed computationally to reveal patterns, trends, and associations, especially relating to human behavior and interactions.</a:t>
+            </a:r>
+          </a:p>
+          <a:p>
+            <a:r>
+              <a:rPr lang="en-US" dirty="0">
+                <a:latin typeface="+mj-lt"/>
+              </a:rPr>
+              <a:t>Big data is a term that describes the large volume of data – both structured and unstructured – that inundates a business on a day-to-day basis. But it’s not the amount of data that’s important. It’s what organizations do with the data that matters. Big data can be analyzed for insights that lead to better decisions and strategic business moves.</a:t>
+            </a:r>
+          </a:p>
+          <a:p>
+            <a:endParaRPr lang="x-none" dirty="0"/>
           </a:p>
         </p:txBody>
       </p:sp>
     </p:spTree>
     <p:extLst>
       <p:ext uri="{BB962C8B-B14F-4D97-AF65-F5344CB8AC3E}">
-        <p14:creationId xmlns:p14="http://schemas.microsoft.com/office/powerpoint/2010/main" val="2845727905"/>
+        <p14:creationId xmlns:p14="http://schemas.microsoft.com/office/powerpoint/2010/main" val="196455147"/>
       </p:ext>
     </p:extLst>
   </p:cSld>
@@ -5263,10 +5813,44 @@
       </p:grpSpPr>
       <p:sp>
         <p:nvSpPr>
+          <p:cNvPr id="2" name="Title 1">
+            <a:extLst>
+              <a:ext uri="{FF2B5EF4-FFF2-40B4-BE49-F238E27FC236}">
+                <a16:creationId xmlns="" xmlns:a16="http://schemas.microsoft.com/office/drawing/2014/main" id="{3E1AC600-D16C-47B7-9075-94DA61007B25}"/>
+              </a:ext>
+            </a:extLst>
+          </p:cNvPr>
+          <p:cNvSpPr>
+            <a:spLocks noGrp="1"/>
+          </p:cNvSpPr>
+          <p:nvPr>
+            <p:ph type="title"/>
+          </p:nvPr>
+        </p:nvSpPr>
+        <p:spPr>
+          <a:xfrm>
+            <a:off x="1097280" y="286603"/>
+            <a:ext cx="10058400" cy="1450757"/>
+          </a:xfrm>
+        </p:spPr>
+        <p:txBody>
+          <a:bodyPr/>
+          <a:lstStyle/>
+          <a:p>
+            <a:r>
+              <a:rPr lang="en-US" dirty="0"/>
+              <a:t>Big Data: Tools</a:t>
+            </a:r>
+            <a:endParaRPr lang="x-none" dirty="0"/>
+          </a:p>
+        </p:txBody>
+      </p:sp>
+      <p:sp>
+        <p:nvSpPr>
           <p:cNvPr id="3" name="Content Placeholder 2">
             <a:extLst>
               <a:ext uri="{FF2B5EF4-FFF2-40B4-BE49-F238E27FC236}">
-                <a16:creationId xmlns:a16="http://schemas.microsoft.com/office/drawing/2014/main" xmlns="" id="{12CE7563-67E4-470C-A76A-FD376D4C2471}"/>
+                <a16:creationId xmlns="" xmlns:a16="http://schemas.microsoft.com/office/drawing/2014/main" id="{DDC8679B-3323-4E4B-ABD6-BD8748DF3AEB}"/>
               </a:ext>
             </a:extLst>
           </p:cNvPr>
@@ -5279,15 +5863,17 @@
         </p:nvSpPr>
         <p:spPr/>
         <p:txBody>
-          <a:bodyPr>
-            <a:normAutofit/>
-          </a:bodyPr>
-          <a:lstStyle/>
-          <a:p>
-            <a:r>
-              <a:rPr lang="en-US" sz="3200" dirty="0"/>
-              <a:t>SPARK</a:t>
-            </a:r>
+          <a:bodyPr/>
+          <a:lstStyle/>
+          <a:p>
+            <a:pPr marL="0" indent="0">
+              <a:buNone/>
+            </a:pPr>
+            <a:r>
+              <a:rPr lang="en-US" sz="3200" b="1" dirty="0"/>
+              <a:t>Hadoop</a:t>
+            </a:r>
+            <a:endParaRPr lang="en-US" b="1" dirty="0"/>
           </a:p>
           <a:p>
             <a:pPr>
@@ -5295,10 +5881,9 @@
               <a:buChar char="v"/>
             </a:pPr>
             <a:r>
-              <a:rPr lang="x-none" dirty="0"/>
-              <a:t>Apache Spark is the alternative — and in many aspects the successor — of Apache Hadoop. </a:t>
-            </a:r>
-            <a:endParaRPr lang="en-US" dirty="0"/>
+              <a:rPr lang="en-US" dirty="0"/>
+              <a:t>Hadoop software library is a framework</a:t>
+            </a:r>
           </a:p>
           <a:p>
             <a:pPr>
@@ -5307,15 +5892,7 @@
             </a:pPr>
             <a:r>
               <a:rPr lang="en-US" dirty="0"/>
-              <a:t>Built </a:t>
-            </a:r>
-            <a:r>
-              <a:rPr lang="x-none" dirty="0"/>
-              <a:t>to address the shortcomings of Hadoop</a:t>
-            </a:r>
-            <a:r>
-              <a:rPr lang="en-US" dirty="0"/>
-              <a:t>.</a:t>
+              <a:t>Help in distributed processing of large data sets across clusters of computers</a:t>
             </a:r>
           </a:p>
           <a:p>
@@ -5325,7 +5902,7 @@
             </a:pPr>
             <a:r>
               <a:rPr lang="en-US" dirty="0"/>
-              <a:t>Apache Spark achieves high performance for both batch and streaming data.</a:t>
+              <a:t>Two method to start single node or cluster mode</a:t>
             </a:r>
           </a:p>
           <a:p>
@@ -5335,7 +5912,7 @@
             </a:pPr>
             <a:r>
               <a:rPr lang="en-US" dirty="0"/>
-              <a:t>Run workload 100X faster.</a:t>
+              <a:t>Latest stable version is 2.9.2 </a:t>
             </a:r>
           </a:p>
           <a:p>
@@ -5345,78 +5922,15 @@
             </a:pPr>
             <a:r>
               <a:rPr lang="en-US" dirty="0"/>
-              <a:t>Offers over 80 high-level operators that make it easy to build parallel apps.</a:t>
-            </a:r>
-          </a:p>
-          <a:p>
-            <a:pPr>
-              <a:buFont typeface="Wingdings" panose="05000000000000000000" pitchFamily="2" charset="2"/>
-              <a:buChar char="v"/>
-            </a:pPr>
-            <a:r>
-              <a:rPr lang="en-US" dirty="0"/>
-              <a:t> It powers a stack of libraries including SQL </a:t>
-            </a:r>
-            <a:r>
-              <a:rPr lang="en-US"/>
-              <a:t>and Data Frames</a:t>
-            </a:r>
-            <a:r>
-              <a:rPr lang="en-US" dirty="0"/>
-              <a:t>, MLlib for machine learning, GraphX, and Spark Streaming</a:t>
-            </a:r>
-          </a:p>
-          <a:p>
-            <a:pPr>
-              <a:buFont typeface="Wingdings" panose="05000000000000000000" pitchFamily="2" charset="2"/>
-              <a:buChar char="v"/>
-            </a:pPr>
-            <a:r>
-              <a:rPr lang="en-US" dirty="0"/>
-              <a:t>Latest stable version is 2.4.0 with multiple advance features</a:t>
-            </a:r>
-            <a:endParaRPr lang="x-none" dirty="0"/>
-          </a:p>
-        </p:txBody>
-      </p:sp>
-      <p:sp>
-        <p:nvSpPr>
-          <p:cNvPr id="4" name="Title 1">
-            <a:extLst>
-              <a:ext uri="{FF2B5EF4-FFF2-40B4-BE49-F238E27FC236}">
-                <a16:creationId xmlns:a16="http://schemas.microsoft.com/office/drawing/2014/main" xmlns="" id="{D1F22F75-6806-481E-A0D8-FC161C3266D1}"/>
-              </a:ext>
-            </a:extLst>
-          </p:cNvPr>
-          <p:cNvSpPr>
-            <a:spLocks noGrp="1"/>
-          </p:cNvSpPr>
-          <p:nvPr>
-            <p:ph type="title"/>
-          </p:nvPr>
-        </p:nvSpPr>
-        <p:spPr>
-          <a:xfrm>
-            <a:off x="1096963" y="287338"/>
-            <a:ext cx="10058400" cy="1449387"/>
-          </a:xfrm>
-        </p:spPr>
-        <p:txBody>
-          <a:bodyPr/>
-          <a:lstStyle/>
-          <a:p>
-            <a:r>
-              <a:rPr lang="en-US" dirty="0"/>
-              <a:t>Big Data: Tools</a:t>
-            </a:r>
-            <a:endParaRPr lang="x-none" dirty="0"/>
+              <a:t>Few Important features are HDFS, YARN,MAPREDUCE, cost efficient, Hadoop libraries and many more</a:t>
+            </a:r>
           </a:p>
         </p:txBody>
       </p:sp>
     </p:spTree>
     <p:extLst>
       <p:ext uri="{BB962C8B-B14F-4D97-AF65-F5344CB8AC3E}">
-        <p14:creationId xmlns:p14="http://schemas.microsoft.com/office/powerpoint/2010/main" val="2181567895"/>
+        <p14:creationId xmlns:p14="http://schemas.microsoft.com/office/powerpoint/2010/main" val="2845727905"/>
       </p:ext>
     </p:extLst>
   </p:cSld>
@@ -5445,6 +5959,188 @@
       </p:grpSpPr>
       <p:sp>
         <p:nvSpPr>
+          <p:cNvPr id="3" name="Content Placeholder 2">
+            <a:extLst>
+              <a:ext uri="{FF2B5EF4-FFF2-40B4-BE49-F238E27FC236}">
+                <a16:creationId xmlns="" xmlns:a16="http://schemas.microsoft.com/office/drawing/2014/main" id="{12CE7563-67E4-470C-A76A-FD376D4C2471}"/>
+              </a:ext>
+            </a:extLst>
+          </p:cNvPr>
+          <p:cNvSpPr>
+            <a:spLocks noGrp="1"/>
+          </p:cNvSpPr>
+          <p:nvPr>
+            <p:ph idx="1"/>
+          </p:nvPr>
+        </p:nvSpPr>
+        <p:spPr/>
+        <p:txBody>
+          <a:bodyPr>
+            <a:normAutofit/>
+          </a:bodyPr>
+          <a:lstStyle/>
+          <a:p>
+            <a:r>
+              <a:rPr lang="en-US" sz="3200" dirty="0"/>
+              <a:t>SPARK</a:t>
+            </a:r>
+          </a:p>
+          <a:p>
+            <a:pPr>
+              <a:buFont typeface="Wingdings" panose="05000000000000000000" pitchFamily="2" charset="2"/>
+              <a:buChar char="v"/>
+            </a:pPr>
+            <a:r>
+              <a:rPr lang="x-none" dirty="0"/>
+              <a:t>Apache Spark is the alternative — and in many aspects the successor — of Apache Hadoop. </a:t>
+            </a:r>
+            <a:endParaRPr lang="en-US" dirty="0"/>
+          </a:p>
+          <a:p>
+            <a:pPr>
+              <a:buFont typeface="Wingdings" panose="05000000000000000000" pitchFamily="2" charset="2"/>
+              <a:buChar char="v"/>
+            </a:pPr>
+            <a:r>
+              <a:rPr lang="en-US" dirty="0"/>
+              <a:t>Built </a:t>
+            </a:r>
+            <a:r>
+              <a:rPr lang="x-none" dirty="0"/>
+              <a:t>to address the shortcomings of Hadoop</a:t>
+            </a:r>
+            <a:r>
+              <a:rPr lang="en-US" dirty="0"/>
+              <a:t>.</a:t>
+            </a:r>
+          </a:p>
+          <a:p>
+            <a:pPr>
+              <a:buFont typeface="Wingdings" panose="05000000000000000000" pitchFamily="2" charset="2"/>
+              <a:buChar char="v"/>
+            </a:pPr>
+            <a:r>
+              <a:rPr lang="en-US" dirty="0"/>
+              <a:t>Apache Spark achieves high performance for both batch and streaming data.</a:t>
+            </a:r>
+          </a:p>
+          <a:p>
+            <a:pPr>
+              <a:buFont typeface="Wingdings" panose="05000000000000000000" pitchFamily="2" charset="2"/>
+              <a:buChar char="v"/>
+            </a:pPr>
+            <a:r>
+              <a:rPr lang="en-US" dirty="0"/>
+              <a:t>Run workload 100X faster.</a:t>
+            </a:r>
+          </a:p>
+          <a:p>
+            <a:pPr>
+              <a:buFont typeface="Wingdings" panose="05000000000000000000" pitchFamily="2" charset="2"/>
+              <a:buChar char="v"/>
+            </a:pPr>
+            <a:r>
+              <a:rPr lang="en-US" dirty="0"/>
+              <a:t>Offers over 80 high-level operators that make it easy to build parallel apps.</a:t>
+            </a:r>
+          </a:p>
+          <a:p>
+            <a:pPr>
+              <a:buFont typeface="Wingdings" panose="05000000000000000000" pitchFamily="2" charset="2"/>
+              <a:buChar char="v"/>
+            </a:pPr>
+            <a:r>
+              <a:rPr lang="en-US" dirty="0"/>
+              <a:t> It powers a stack of libraries including SQL </a:t>
+            </a:r>
+            <a:r>
+              <a:rPr lang="en-US"/>
+              <a:t>and Data Frames</a:t>
+            </a:r>
+            <a:r>
+              <a:rPr lang="en-US" dirty="0"/>
+              <a:t>, MLlib for machine learning, GraphX, and Spark Streaming</a:t>
+            </a:r>
+          </a:p>
+          <a:p>
+            <a:pPr>
+              <a:buFont typeface="Wingdings" panose="05000000000000000000" pitchFamily="2" charset="2"/>
+              <a:buChar char="v"/>
+            </a:pPr>
+            <a:r>
+              <a:rPr lang="en-US" dirty="0"/>
+              <a:t>Latest stable version is 2.4.0 with multiple advance features</a:t>
+            </a:r>
+            <a:endParaRPr lang="x-none" dirty="0"/>
+          </a:p>
+        </p:txBody>
+      </p:sp>
+      <p:sp>
+        <p:nvSpPr>
+          <p:cNvPr id="4" name="Title 1">
+            <a:extLst>
+              <a:ext uri="{FF2B5EF4-FFF2-40B4-BE49-F238E27FC236}">
+                <a16:creationId xmlns="" xmlns:a16="http://schemas.microsoft.com/office/drawing/2014/main" id="{D1F22F75-6806-481E-A0D8-FC161C3266D1}"/>
+              </a:ext>
+            </a:extLst>
+          </p:cNvPr>
+          <p:cNvSpPr>
+            <a:spLocks noGrp="1"/>
+          </p:cNvSpPr>
+          <p:nvPr>
+            <p:ph type="title"/>
+          </p:nvPr>
+        </p:nvSpPr>
+        <p:spPr>
+          <a:xfrm>
+            <a:off x="1096963" y="287338"/>
+            <a:ext cx="10058400" cy="1449387"/>
+          </a:xfrm>
+        </p:spPr>
+        <p:txBody>
+          <a:bodyPr/>
+          <a:lstStyle/>
+          <a:p>
+            <a:r>
+              <a:rPr lang="en-US" dirty="0"/>
+              <a:t>Big Data: Tools</a:t>
+            </a:r>
+            <a:endParaRPr lang="x-none" dirty="0"/>
+          </a:p>
+        </p:txBody>
+      </p:sp>
+    </p:spTree>
+    <p:extLst>
+      <p:ext uri="{BB962C8B-B14F-4D97-AF65-F5344CB8AC3E}">
+        <p14:creationId xmlns:p14="http://schemas.microsoft.com/office/powerpoint/2010/main" val="2181567895"/>
+      </p:ext>
+    </p:extLst>
+  </p:cSld>
+  <p:clrMapOvr>
+    <a:masterClrMapping/>
+  </p:clrMapOvr>
+</p:sld>
+</file>
+
+<file path=ppt/slides/slide18.xml><?xml version="1.0" encoding="utf-8"?>
+<p:sld xmlns:a="http://schemas.openxmlformats.org/drawingml/2006/main" xmlns:r="http://schemas.openxmlformats.org/officeDocument/2006/relationships" xmlns:p="http://schemas.openxmlformats.org/presentationml/2006/main">
+  <p:cSld>
+    <p:spTree>
+      <p:nvGrpSpPr>
+        <p:cNvPr id="1" name=""/>
+        <p:cNvGrpSpPr/>
+        <p:nvPr/>
+      </p:nvGrpSpPr>
+      <p:grpSpPr>
+        <a:xfrm>
+          <a:off x="0" y="0"/>
+          <a:ext cx="0" cy="0"/>
+          <a:chOff x="0" y="0"/>
+          <a:chExt cx="0" cy="0"/>
+        </a:xfrm>
+      </p:grpSpPr>
+      <p:sp>
+        <p:nvSpPr>
           <p:cNvPr id="2" name="Title 1"/>
           <p:cNvSpPr>
             <a:spLocks noGrp="1"/>
@@ -5502,7 +6198,7 @@
 </p:sld>
 </file>
 
-<file path=ppt/slides/slide18.xml><?xml version="1.0" encoding="utf-8"?>
+<file path=ppt/slides/slide19.xml><?xml version="1.0" encoding="utf-8"?>
 <p:sld xmlns:a="http://schemas.openxmlformats.org/drawingml/2006/main" xmlns:r="http://schemas.openxmlformats.org/officeDocument/2006/relationships" xmlns:p="http://schemas.openxmlformats.org/presentationml/2006/main">
   <p:cSld>
     <p:spTree>
@@ -5766,14 +6462,14 @@
                 <a:gridCol w="5035931">
                   <a:extLst>
                     <a:ext uri="{9D8B030D-6E8A-4147-A177-3AD203B41FA5}">
-                      <a16:colId xmlns:a16="http://schemas.microsoft.com/office/drawing/2014/main" xmlns="" val="20000"/>
+                      <a16:colId xmlns="" xmlns:a16="http://schemas.microsoft.com/office/drawing/2014/main" val="20000"/>
                     </a:ext>
                   </a:extLst>
                 </a:gridCol>
                 <a:gridCol w="5022469">
                   <a:extLst>
                     <a:ext uri="{9D8B030D-6E8A-4147-A177-3AD203B41FA5}">
-                      <a16:colId xmlns:a16="http://schemas.microsoft.com/office/drawing/2014/main" xmlns="" val="20001"/>
+                      <a16:colId xmlns="" xmlns:a16="http://schemas.microsoft.com/office/drawing/2014/main" val="20001"/>
                     </a:ext>
                   </a:extLst>
                 </a:gridCol>
@@ -5853,7 +6549,7 @@
                 </a:tc>
                 <a:extLst>
                   <a:ext uri="{0D108BD9-81ED-4DB2-BD59-A6C34878D82A}">
-                    <a16:rowId xmlns:a16="http://schemas.microsoft.com/office/drawing/2014/main" xmlns="" val="10000"/>
+                    <a16:rowId xmlns="" xmlns:a16="http://schemas.microsoft.com/office/drawing/2014/main" val="10000"/>
                   </a:ext>
                 </a:extLst>
               </a:tr>
@@ -5940,7 +6636,7 @@
                 </a:tc>
                 <a:extLst>
                   <a:ext uri="{0D108BD9-81ED-4DB2-BD59-A6C34878D82A}">
-                    <a16:rowId xmlns:a16="http://schemas.microsoft.com/office/drawing/2014/main" xmlns="" val="10001"/>
+                    <a16:rowId xmlns="" xmlns:a16="http://schemas.microsoft.com/office/drawing/2014/main" val="10001"/>
                   </a:ext>
                 </a:extLst>
               </a:tr>
@@ -6043,7 +6739,7 @@
                 </a:tc>
                 <a:extLst>
                   <a:ext uri="{0D108BD9-81ED-4DB2-BD59-A6C34878D82A}">
-                    <a16:rowId xmlns:a16="http://schemas.microsoft.com/office/drawing/2014/main" xmlns="" val="10002"/>
+                    <a16:rowId xmlns="" xmlns:a16="http://schemas.microsoft.com/office/drawing/2014/main" val="10002"/>
                   </a:ext>
                 </a:extLst>
               </a:tr>

</xml_diff>

<commit_message>
1 more tool added in ppt
</commit_message>
<xml_diff>
--- a/Project Interim Submission/Generic DS Framework.pptx
+++ b/Project Interim Submission/Generic DS Framework.pptx
@@ -5,7 +5,7 @@
     <p:sldMasterId id="2147483708" r:id="rId1"/>
   </p:sldMasterIdLst>
   <p:notesMasterIdLst>
-    <p:notesMasterId r:id="rId21"/>
+    <p:notesMasterId r:id="rId22"/>
   </p:notesMasterIdLst>
   <p:sldIdLst>
     <p:sldId id="256" r:id="rId2"/>
@@ -25,8 +25,9 @@
     <p:sldId id="261" r:id="rId16"/>
     <p:sldId id="262" r:id="rId17"/>
     <p:sldId id="270" r:id="rId18"/>
-    <p:sldId id="265" r:id="rId19"/>
-    <p:sldId id="266" r:id="rId20"/>
+    <p:sldId id="275" r:id="rId19"/>
+    <p:sldId id="265" r:id="rId20"/>
+    <p:sldId id="266" r:id="rId21"/>
   </p:sldIdLst>
   <p:sldSz cx="12192000" cy="6858000"/>
   <p:notesSz cx="6858000" cy="9144000"/>
@@ -215,7 +216,7 @@
           <a:p>
             <a:fld id="{1BE3ABC5-6C6D-49D2-9FFB-15BACE4436B8}" type="datetimeFigureOut">
               <a:rPr lang="en-US" smtClean="0"/>
-              <a:t>22-Jan-19</a:t>
+              <a:t>1/28/2019</a:t>
             </a:fld>
             <a:endParaRPr lang="en-US"/>
           </a:p>
@@ -792,7 +793,7 @@
           <a:p>
             <a:fld id="{BE50AB1F-9C50-41A2-BE99-4D3D06C85678}" type="datetimeFigureOut">
               <a:rPr lang="en-US" smtClean="0"/>
-              <a:t>22-Jan-19</a:t>
+              <a:t>1/28/2019</a:t>
             </a:fld>
             <a:endParaRPr lang="en-US"/>
           </a:p>
@@ -1000,7 +1001,7 @@
           <a:p>
             <a:fld id="{BE50AB1F-9C50-41A2-BE99-4D3D06C85678}" type="datetimeFigureOut">
               <a:rPr lang="en-US" smtClean="0"/>
-              <a:t>22-Jan-19</a:t>
+              <a:t>1/28/2019</a:t>
             </a:fld>
             <a:endParaRPr lang="en-US"/>
           </a:p>
@@ -1256,7 +1257,7 @@
           <a:p>
             <a:fld id="{BE50AB1F-9C50-41A2-BE99-4D3D06C85678}" type="datetimeFigureOut">
               <a:rPr lang="en-US" smtClean="0"/>
-              <a:t>22-Jan-19</a:t>
+              <a:t>1/28/2019</a:t>
             </a:fld>
             <a:endParaRPr lang="en-US"/>
           </a:p>
@@ -1426,7 +1427,7 @@
           <a:p>
             <a:fld id="{BE50AB1F-9C50-41A2-BE99-4D3D06C85678}" type="datetimeFigureOut">
               <a:rPr lang="en-US" smtClean="0"/>
-              <a:t>22-Jan-19</a:t>
+              <a:t>1/28/2019</a:t>
             </a:fld>
             <a:endParaRPr lang="en-US"/>
           </a:p>
@@ -1769,7 +1770,7 @@
           <a:p>
             <a:fld id="{BE50AB1F-9C50-41A2-BE99-4D3D06C85678}" type="datetimeFigureOut">
               <a:rPr lang="en-US" smtClean="0"/>
-              <a:t>22-Jan-19</a:t>
+              <a:t>1/28/2019</a:t>
             </a:fld>
             <a:endParaRPr lang="en-US"/>
           </a:p>
@@ -2044,7 +2045,7 @@
           <a:p>
             <a:fld id="{BE50AB1F-9C50-41A2-BE99-4D3D06C85678}" type="datetimeFigureOut">
               <a:rPr lang="en-US" smtClean="0"/>
-              <a:t>22-Jan-19</a:t>
+              <a:t>1/28/2019</a:t>
             </a:fld>
             <a:endParaRPr lang="en-US"/>
           </a:p>
@@ -2423,7 +2424,7 @@
           <a:p>
             <a:fld id="{BE50AB1F-9C50-41A2-BE99-4D3D06C85678}" type="datetimeFigureOut">
               <a:rPr lang="en-US" smtClean="0"/>
-              <a:t>22-Jan-19</a:t>
+              <a:t>1/28/2019</a:t>
             </a:fld>
             <a:endParaRPr lang="en-US"/>
           </a:p>
@@ -2541,7 +2542,7 @@
           <a:p>
             <a:fld id="{BE50AB1F-9C50-41A2-BE99-4D3D06C85678}" type="datetimeFigureOut">
               <a:rPr lang="en-US" smtClean="0"/>
-              <a:t>22-Jan-19</a:t>
+              <a:t>1/28/2019</a:t>
             </a:fld>
             <a:endParaRPr lang="en-US"/>
           </a:p>
@@ -2712,7 +2713,7 @@
           <a:p>
             <a:fld id="{BE50AB1F-9C50-41A2-BE99-4D3D06C85678}" type="datetimeFigureOut">
               <a:rPr lang="en-US" smtClean="0"/>
-              <a:t>22-Jan-19</a:t>
+              <a:t>1/28/2019</a:t>
             </a:fld>
             <a:endParaRPr lang="en-US"/>
           </a:p>
@@ -3066,7 +3067,7 @@
           <a:p>
             <a:fld id="{BE50AB1F-9C50-41A2-BE99-4D3D06C85678}" type="datetimeFigureOut">
               <a:rPr lang="en-US" smtClean="0"/>
-              <a:t>22-Jan-19</a:t>
+              <a:t>1/28/2019</a:t>
             </a:fld>
             <a:endParaRPr lang="en-US"/>
           </a:p>
@@ -3443,7 +3444,7 @@
           <a:p>
             <a:fld id="{BE50AB1F-9C50-41A2-BE99-4D3D06C85678}" type="datetimeFigureOut">
               <a:rPr lang="en-US" smtClean="0"/>
-              <a:t>22-Jan-19</a:t>
+              <a:t>1/28/2019</a:t>
             </a:fld>
             <a:endParaRPr lang="en-US"/>
           </a:p>
@@ -3730,7 +3731,7 @@
           <a:p>
             <a:fld id="{BE50AB1F-9C50-41A2-BE99-4D3D06C85678}" type="datetimeFigureOut">
               <a:rPr lang="en-US" smtClean="0"/>
-              <a:t>22-Jan-19</a:t>
+              <a:t>1/28/2019</a:t>
             </a:fld>
             <a:endParaRPr lang="en-US"/>
           </a:p>
@@ -4513,10 +4514,9 @@
           <a:lstStyle/>
           <a:p>
             <a:r>
-              <a:rPr lang="en-US" dirty="0" smtClean="0"/>
+              <a:rPr lang="en-US" dirty="0"/>
               <a:t>DATA: ANALYSIS</a:t>
             </a:r>
-            <a:endParaRPr lang="en-US" dirty="0"/>
           </a:p>
         </p:txBody>
       </p:sp>
@@ -4546,28 +4546,11 @@
               <a:rPr lang="en-US" b="1" dirty="0"/>
               <a:t> </a:t>
             </a:r>
-            <a:endParaRPr lang="en-US" b="1" dirty="0" smtClean="0"/>
-          </a:p>
-          <a:p>
-            <a:r>
-              <a:rPr lang="en-US" dirty="0" smtClean="0"/>
-              <a:t>It is the </a:t>
-            </a:r>
-            <a:r>
-              <a:rPr lang="en-US" dirty="0"/>
-              <a:t>process of examining information, especially using a computer, in order to find out </a:t>
-            </a:r>
-            <a:r>
-              <a:rPr lang="en-US" dirty="0" smtClean="0"/>
-              <a:t>something, </a:t>
-            </a:r>
-            <a:r>
-              <a:rPr lang="en-US" dirty="0"/>
-              <a:t>or to help with making </a:t>
-            </a:r>
-            <a:r>
-              <a:rPr lang="en-US" dirty="0" smtClean="0"/>
-              <a:t>decisions out of it.</a:t>
+          </a:p>
+          <a:p>
+            <a:r>
+              <a:rPr lang="en-US" dirty="0"/>
+              <a:t>It is the process of examining information, especially using a computer, in order to find out something, or to help with making decisions out of it.</a:t>
             </a:r>
           </a:p>
           <a:p>
@@ -4575,12 +4558,8 @@
               <a:buNone/>
             </a:pPr>
             <a:r>
-              <a:rPr lang="en-US" b="1" dirty="0" smtClean="0"/>
-              <a:t>Example </a:t>
-            </a:r>
-            <a:r>
               <a:rPr lang="en-US" b="1" dirty="0"/>
-              <a:t>Tools</a:t>
+              <a:t>Example Tools</a:t>
             </a:r>
           </a:p>
           <a:p>
@@ -4594,17 +4573,8 @@
             </a:r>
             <a:r>
               <a:rPr lang="en-US" dirty="0"/>
-              <a:t>, </a:t>
-            </a:r>
-            <a:r>
-              <a:rPr lang="en-US" dirty="0" smtClean="0"/>
-              <a:t> KNIME</a:t>
-            </a:r>
-            <a:r>
-              <a:rPr lang="en-US" dirty="0"/>
-              <a:t>, </a:t>
-            </a:r>
-            <a:endParaRPr lang="en-US" dirty="0" smtClean="0"/>
+              <a:t>,  KNIME, </a:t>
+            </a:r>
           </a:p>
           <a:p>
             <a:pPr>
@@ -4612,22 +4582,13 @@
               <a:buChar char="Ø"/>
             </a:pPr>
             <a:r>
-              <a:rPr lang="en-US" dirty="0" err="1" smtClean="0"/>
+              <a:rPr lang="en-US" dirty="0" err="1"/>
               <a:t>RapidMiner</a:t>
             </a:r>
             <a:r>
               <a:rPr lang="en-US" dirty="0"/>
-              <a:t>, </a:t>
-            </a:r>
-            <a:r>
-              <a:rPr lang="en-US" dirty="0" smtClean="0"/>
-              <a:t>Google </a:t>
-            </a:r>
-            <a:r>
-              <a:rPr lang="en-US" dirty="0"/>
-              <a:t>Fusion Tables, </a:t>
-            </a:r>
-            <a:endParaRPr lang="en-US" dirty="0" smtClean="0"/>
+              <a:t>, Google Fusion Tables, </a:t>
+            </a:r>
           </a:p>
           <a:p>
             <a:pPr>
@@ -4635,12 +4596,8 @@
               <a:buChar char="Ø"/>
             </a:pPr>
             <a:r>
-              <a:rPr lang="en-US" dirty="0" smtClean="0"/>
-              <a:t>Tableau </a:t>
-            </a:r>
-            <a:r>
-              <a:rPr lang="en-US" dirty="0"/>
-              <a:t>Public, </a:t>
+              <a:rPr lang="en-US" dirty="0"/>
+              <a:t>Tableau Public, </a:t>
             </a:r>
             <a:r>
               <a:rPr lang="en-US" dirty="0" err="1"/>
@@ -4650,7 +4607,6 @@
               <a:rPr lang="en-US" dirty="0"/>
               <a:t>, </a:t>
             </a:r>
-            <a:endParaRPr lang="en-US" dirty="0" smtClean="0"/>
           </a:p>
           <a:p>
             <a:pPr>
@@ -4658,20 +4614,12 @@
               <a:buChar char="Ø"/>
             </a:pPr>
             <a:r>
-              <a:rPr lang="en-US" dirty="0" err="1" smtClean="0"/>
+              <a:rPr lang="en-US" dirty="0" err="1"/>
               <a:t>WolframAlpha</a:t>
             </a:r>
             <a:r>
-              <a:rPr lang="en-US" dirty="0" smtClean="0"/>
-              <a:t> </a:t>
-            </a:r>
-            <a:r>
-              <a:rPr lang="en-US" dirty="0"/>
-              <a:t>tools are used</a:t>
-            </a:r>
-            <a:r>
-              <a:rPr lang="en-US" dirty="0" smtClean="0"/>
-              <a:t>.</a:t>
+              <a:rPr lang="en-US" dirty="0"/>
+              <a:t> tools are used.</a:t>
             </a:r>
           </a:p>
           <a:p>
@@ -4725,10 +4673,9 @@
           <a:lstStyle/>
           <a:p>
             <a:r>
-              <a:rPr lang="en-US" dirty="0" smtClean="0"/>
+              <a:rPr lang="en-US" dirty="0"/>
               <a:t>DATA: ANALYTICS </a:t>
             </a:r>
-            <a:endParaRPr lang="en-US" dirty="0"/>
           </a:p>
         </p:txBody>
       </p:sp>
@@ -4763,28 +4710,11 @@
               <a:rPr lang="en-US" b="1" dirty="0"/>
               <a:t> </a:t>
             </a:r>
-            <a:endParaRPr lang="en-US" b="1" dirty="0" smtClean="0"/>
-          </a:p>
-          <a:p>
-            <a:r>
-              <a:rPr lang="en-US" dirty="0" smtClean="0"/>
-              <a:t>It is </a:t>
-            </a:r>
-            <a:r>
-              <a:rPr lang="en-US" dirty="0"/>
-              <a:t>the process of examining </a:t>
-            </a:r>
-            <a:r>
-              <a:rPr lang="en-US" dirty="0" smtClean="0"/>
-              <a:t>data sets in </a:t>
-            </a:r>
-            <a:r>
-              <a:rPr lang="en-US" dirty="0"/>
-              <a:t>order to draw conclusions about the information they contain, increasingly with the aid of specialized systems and software</a:t>
-            </a:r>
-            <a:r>
-              <a:rPr lang="en-US" dirty="0" smtClean="0"/>
-              <a:t>.</a:t>
+          </a:p>
+          <a:p>
+            <a:r>
+              <a:rPr lang="en-US" dirty="0"/>
+              <a:t>It is the process of examining data sets in order to draw conclusions about the information they contain, increasingly with the aid of specialized systems and software.</a:t>
             </a:r>
           </a:p>
           <a:p>
@@ -4792,7 +4722,7 @@
               <a:buNone/>
             </a:pPr>
             <a:r>
-              <a:rPr lang="en-US" b="1" dirty="0" smtClean="0"/>
+              <a:rPr lang="en-US" b="1" dirty="0"/>
               <a:t>Example Tools</a:t>
             </a:r>
           </a:p>
@@ -4802,26 +4732,9 @@
               <a:buChar char="Ø"/>
             </a:pPr>
             <a:r>
-              <a:rPr lang="en-US" dirty="0" smtClean="0"/>
-              <a:t> R</a:t>
-            </a:r>
-            <a:r>
-              <a:rPr lang="en-US" dirty="0"/>
-              <a:t>, </a:t>
-            </a:r>
-            <a:r>
-              <a:rPr lang="en-US" dirty="0" smtClean="0"/>
-              <a:t> </a:t>
-            </a:r>
-            <a:r>
-              <a:rPr lang="en-US" dirty="0" smtClean="0"/>
-              <a:t>Tableau </a:t>
-            </a:r>
-            <a:r>
-              <a:rPr lang="en-US" dirty="0"/>
-              <a:t>Public, </a:t>
-            </a:r>
-            <a:endParaRPr lang="en-US" dirty="0" smtClean="0"/>
+              <a:rPr lang="en-US" dirty="0"/>
+              <a:t> R,  Tableau Public, </a:t>
+            </a:r>
           </a:p>
           <a:p>
             <a:pPr>
@@ -4829,26 +4742,9 @@
               <a:buChar char="Ø"/>
             </a:pPr>
             <a:r>
-              <a:rPr lang="en-US" dirty="0" smtClean="0"/>
-              <a:t> Python</a:t>
-            </a:r>
-            <a:r>
-              <a:rPr lang="en-US" dirty="0"/>
-              <a:t>, </a:t>
-            </a:r>
-            <a:r>
-              <a:rPr lang="en-US" dirty="0" smtClean="0"/>
-              <a:t> </a:t>
-            </a:r>
-            <a:r>
-              <a:rPr lang="en-US" dirty="0" smtClean="0"/>
-              <a:t>SAS</a:t>
-            </a:r>
-            <a:r>
-              <a:rPr lang="en-US" dirty="0"/>
-              <a:t>, </a:t>
-            </a:r>
-            <a:endParaRPr lang="en-US" dirty="0" smtClean="0"/>
+              <a:rPr lang="en-US" dirty="0"/>
+              <a:t> Python,  SAS, </a:t>
+            </a:r>
           </a:p>
           <a:p>
             <a:pPr>
@@ -4856,14 +4752,9 @@
               <a:buChar char="Ø"/>
             </a:pPr>
             <a:r>
-              <a:rPr lang="en-US" dirty="0" smtClean="0"/>
-              <a:t> Apache </a:t>
-            </a:r>
-            <a:r>
-              <a:rPr lang="en-US" dirty="0"/>
-              <a:t>Spark, </a:t>
-            </a:r>
-            <a:endParaRPr lang="en-US" dirty="0" smtClean="0"/>
+              <a:rPr lang="en-US" dirty="0"/>
+              <a:t> Apache Spark, </a:t>
+            </a:r>
           </a:p>
           <a:p>
             <a:pPr>
@@ -4871,11 +4762,11 @@
               <a:buChar char="Ø"/>
             </a:pPr>
             <a:r>
-              <a:rPr lang="en-US" dirty="0" smtClean="0"/>
+              <a:rPr lang="en-US" dirty="0"/>
               <a:t> Excel, </a:t>
             </a:r>
             <a:r>
-              <a:rPr lang="en-US" dirty="0" err="1" smtClean="0"/>
+              <a:rPr lang="en-US" dirty="0" err="1"/>
               <a:t>etc</a:t>
             </a:r>
             <a:endParaRPr lang="en-US" b="1" dirty="0"/>
@@ -4931,10 +4822,9 @@
           <a:lstStyle/>
           <a:p>
             <a:r>
-              <a:rPr lang="en-US" dirty="0" smtClean="0"/>
+              <a:rPr lang="en-US" dirty="0"/>
               <a:t>Analytics vs Analysis (A vs A)</a:t>
             </a:r>
-            <a:endParaRPr lang="en-US" dirty="0"/>
           </a:p>
         </p:txBody>
       </p:sp>
@@ -4962,9 +4852,27 @@
             <a:tbl>
               <a:tblPr/>
               <a:tblGrid>
-                <a:gridCol w="1195977"/>
-                <a:gridCol w="4431212"/>
-                <a:gridCol w="4431212"/>
+                <a:gridCol w="1195977">
+                  <a:extLst>
+                    <a:ext uri="{9D8B030D-6E8A-4147-A177-3AD203B41FA5}">
+                      <a16:colId xmlns:a16="http://schemas.microsoft.com/office/drawing/2014/main" val="20000"/>
+                    </a:ext>
+                  </a:extLst>
+                </a:gridCol>
+                <a:gridCol w="4431212">
+                  <a:extLst>
+                    <a:ext uri="{9D8B030D-6E8A-4147-A177-3AD203B41FA5}">
+                      <a16:colId xmlns:a16="http://schemas.microsoft.com/office/drawing/2014/main" val="20001"/>
+                    </a:ext>
+                  </a:extLst>
+                </a:gridCol>
+                <a:gridCol w="4431212">
+                  <a:extLst>
+                    <a:ext uri="{9D8B030D-6E8A-4147-A177-3AD203B41FA5}">
+                      <a16:colId xmlns:a16="http://schemas.microsoft.com/office/drawing/2014/main" val="20002"/>
+                    </a:ext>
+                  </a:extLst>
+                </a:gridCol>
               </a:tblGrid>
               <a:tr h="286359">
                 <a:tc>
@@ -5033,6 +4941,11 @@
                     </a:solidFill>
                   </a:tcPr>
                 </a:tc>
+                <a:extLst>
+                  <a:ext uri="{0D108BD9-81ED-4DB2-BD59-A6C34878D82A}">
+                    <a16:rowId xmlns:a16="http://schemas.microsoft.com/office/drawing/2014/main" val="10000"/>
+                  </a:ext>
+                </a:extLst>
               </a:tr>
               <a:tr h="548800">
                 <a:tc>
@@ -5064,12 +4977,8 @@
                     <a:p>
                       <a:pPr algn="l"/>
                       <a:r>
-                        <a:rPr lang="en-US" sz="1400" dirty="0" smtClean="0"/>
-                        <a:t>Used </a:t>
-                      </a:r>
-                      <a:r>
                         <a:rPr lang="en-US" sz="1400" dirty="0"/>
-                        <a:t>in businesses to make decisions from data which are data-driven</a:t>
+                        <a:t>Used in businesses to make decisions from data which are data-driven</a:t>
                       </a:r>
                     </a:p>
                   </a:txBody>
@@ -5082,17 +4991,18 @@
                     <a:p>
                       <a:pPr algn="l"/>
                       <a:r>
-                        <a:rPr lang="en-US" sz="1400" dirty="0" smtClean="0"/>
-                        <a:t>used </a:t>
-                      </a:r>
-                      <a:r>
                         <a:rPr lang="en-US" sz="1400" dirty="0"/>
-                        <a:t>in businesses to analyze data and take some insights of it.</a:t>
+                        <a:t>used in businesses to analyze data and take some insights of it.</a:t>
                       </a:r>
                     </a:p>
                   </a:txBody>
                   <a:tcPr marL="22225" marR="22225" marT="11112" marB="11112" anchor="ctr"/>
                 </a:tc>
+                <a:extLst>
+                  <a:ext uri="{0D108BD9-81ED-4DB2-BD59-A6C34878D82A}">
+                    <a16:rowId xmlns:a16="http://schemas.microsoft.com/office/drawing/2014/main" val="10001"/>
+                  </a:ext>
+                </a:extLst>
               </a:tr>
               <a:tr h="526247">
                 <a:tc>
@@ -5102,7 +5012,7 @@
                     <a:p>
                       <a:pPr algn="l"/>
                       <a:r>
-                        <a:rPr lang="en-US" sz="1600" dirty="0" smtClean="0"/>
+                        <a:rPr lang="en-US" sz="1600" dirty="0"/>
                         <a:t>Structure</a:t>
                       </a:r>
                       <a:endParaRPr lang="en-US" sz="1600" b="1" dirty="0"/>
@@ -5117,12 +5027,8 @@
                     <a:p>
                       <a:pPr algn="l"/>
                       <a:r>
-                        <a:rPr lang="en-US" sz="1400" dirty="0" smtClean="0"/>
-                        <a:t>Consist </a:t>
-                      </a:r>
-                      <a:r>
                         <a:rPr lang="en-US" sz="1400" dirty="0"/>
-                        <a:t>of data collection and inspect in general and it has one or more users.</a:t>
+                        <a:t>Consist of data collection and inspect in general and it has one or more users.</a:t>
                       </a:r>
                     </a:p>
                   </a:txBody>
@@ -5135,17 +5041,18 @@
                     <a:p>
                       <a:pPr algn="l"/>
                       <a:r>
-                        <a:rPr lang="en-US" sz="1400" dirty="0" smtClean="0"/>
-                        <a:t>Consisted </a:t>
-                      </a:r>
-                      <a:r>
                         <a:rPr lang="en-US" sz="1400" dirty="0"/>
-                        <a:t>of defining a data, investigation, cleaning, transforming the data to give a meaningful outcome.  </a:t>
+                        <a:t>Consisted of defining a data, investigation, cleaning, transforming the data to give a meaningful outcome.  </a:t>
                       </a:r>
                     </a:p>
                   </a:txBody>
                   <a:tcPr marL="22225" marR="22225" marT="11112" marB="11112" anchor="ctr"/>
                 </a:tc>
+                <a:extLst>
+                  <a:ext uri="{0D108BD9-81ED-4DB2-BD59-A6C34878D82A}">
+                    <a16:rowId xmlns:a16="http://schemas.microsoft.com/office/drawing/2014/main" val="10002"/>
+                  </a:ext>
+                </a:extLst>
               </a:tr>
               <a:tr h="602350">
                 <a:tc>
@@ -5170,12 +5077,8 @@
                     <a:p>
                       <a:pPr algn="l"/>
                       <a:r>
-                        <a:rPr lang="en-US" sz="1400" dirty="0" smtClean="0"/>
-                        <a:t>Example tools </a:t>
-                      </a:r>
-                      <a:r>
                         <a:rPr lang="en-US" sz="1400" dirty="0"/>
-                        <a:t>in a market but mainly R, Tableau Public, Python, SAS, Apache Spark, Excel are used.</a:t>
+                        <a:t>Example tools in a market but mainly R, Tableau Public, Python, SAS, Apache Spark, Excel are used.</a:t>
                       </a:r>
                     </a:p>
                   </a:txBody>
@@ -5188,11 +5091,11 @@
                     <a:p>
                       <a:pPr algn="l"/>
                       <a:r>
-                        <a:rPr lang="en-US" sz="1400" dirty="0" smtClean="0"/>
+                        <a:rPr lang="en-US" sz="1400" dirty="0"/>
                         <a:t>Example tools </a:t>
                       </a:r>
                       <a:r>
-                        <a:rPr lang="en-US" sz="1400" dirty="0" err="1" smtClean="0"/>
+                        <a:rPr lang="en-US" sz="1400" dirty="0" err="1"/>
                         <a:t>OpenRefine</a:t>
                       </a:r>
                       <a:r>
@@ -5216,18 +5119,22 @@
                         <a:t>, </a:t>
                       </a:r>
                       <a:r>
-                        <a:rPr lang="en-US" sz="1400" dirty="0" err="1" smtClean="0"/>
+                        <a:rPr lang="en-US" sz="1400" dirty="0" err="1"/>
                         <a:t>WolframAlpha</a:t>
                       </a:r>
                       <a:r>
-                        <a:rPr lang="en-US" sz="1400" dirty="0" smtClean="0"/>
+                        <a:rPr lang="en-US" sz="1400" dirty="0"/>
                         <a:t>.</a:t>
                       </a:r>
-                      <a:endParaRPr lang="en-US" sz="1400" dirty="0"/>
                     </a:p>
                   </a:txBody>
                   <a:tcPr marL="22225" marR="22225" marT="11112" marB="11112" anchor="ctr"/>
                 </a:tc>
+                <a:extLst>
+                  <a:ext uri="{0D108BD9-81ED-4DB2-BD59-A6C34878D82A}">
+                    <a16:rowId xmlns:a16="http://schemas.microsoft.com/office/drawing/2014/main" val="10003"/>
+                  </a:ext>
+                </a:extLst>
               </a:tr>
               <a:tr h="942460">
                 <a:tc>
@@ -5237,7 +5144,7 @@
                     <a:p>
                       <a:pPr algn="l"/>
                       <a:r>
-                        <a:rPr lang="en-US" sz="1600" dirty="0" smtClean="0"/>
+                        <a:rPr lang="en-US" sz="1600" dirty="0"/>
                         <a:t>Process Sequence</a:t>
                       </a:r>
                       <a:endParaRPr lang="en-US" sz="1600" b="1" dirty="0"/>
@@ -5252,52 +5159,8 @@
                     <a:p>
                       <a:pPr algn="l"/>
                       <a:r>
-                        <a:rPr lang="en-US" sz="1400" dirty="0" smtClean="0"/>
-                        <a:t>Business </a:t>
-                      </a:r>
-                      <a:r>
                         <a:rPr lang="en-US" sz="1400" dirty="0"/>
-                        <a:t>Case Evaluation, Data Identification, </a:t>
-                      </a:r>
-                      <a:r>
-                        <a:rPr lang="en-US" sz="1400" dirty="0" smtClean="0"/>
-                        <a:t>Acquisition </a:t>
-                      </a:r>
-                      <a:r>
-                        <a:rPr lang="en-US" sz="1400" dirty="0"/>
-                        <a:t>&amp; Filtering, </a:t>
-                      </a:r>
-                      <a:r>
-                        <a:rPr lang="en-US" sz="1400" dirty="0" smtClean="0"/>
-                        <a:t>Extraction</a:t>
-                      </a:r>
-                      <a:r>
-                        <a:rPr lang="en-US" sz="1400" dirty="0"/>
-                        <a:t>, </a:t>
-                      </a:r>
-                      <a:r>
-                        <a:rPr lang="en-US" sz="1400" dirty="0" smtClean="0"/>
-                        <a:t>Validation </a:t>
-                      </a:r>
-                      <a:r>
-                        <a:rPr lang="en-US" sz="1400" dirty="0"/>
-                        <a:t>&amp; Cleansing, </a:t>
-                      </a:r>
-                      <a:r>
-                        <a:rPr lang="en-US" sz="1400" dirty="0" smtClean="0"/>
-                        <a:t>Aggregation </a:t>
-                      </a:r>
-                      <a:r>
-                        <a:rPr lang="en-US" sz="1400" dirty="0"/>
-                        <a:t>&amp; Representation, Data Analysis, </a:t>
-                      </a:r>
-                      <a:r>
-                        <a:rPr lang="en-US" sz="1400" dirty="0" smtClean="0"/>
-                        <a:t>Visualization</a:t>
-                      </a:r>
-                      <a:r>
-                        <a:rPr lang="en-US" sz="1400" dirty="0"/>
-                        <a:t>, Utilization of Analysis Results.  </a:t>
+                        <a:t>Business Case Evaluation, Data Identification, Acquisition &amp; Filtering, Extraction, Validation &amp; Cleansing, Aggregation &amp; Representation, Data Analysis, Visualization, Utilization of Analysis Results.  </a:t>
                       </a:r>
                     </a:p>
                   </a:txBody>
@@ -5310,49 +5173,18 @@
                     <a:p>
                       <a:pPr algn="l"/>
                       <a:r>
-                        <a:rPr lang="en-US" sz="1400" dirty="0" smtClean="0"/>
-                        <a:t>Data </a:t>
-                      </a:r>
-                      <a:r>
                         <a:rPr lang="en-US" sz="1400" dirty="0"/>
-                        <a:t>gathering</a:t>
-                      </a:r>
-                      <a:r>
-                        <a:rPr lang="en-US" sz="1400" dirty="0" smtClean="0"/>
-                        <a:t>, </a:t>
-                      </a:r>
-                      <a:r>
-                        <a:rPr lang="en-US" sz="1400" dirty="0"/>
-                        <a:t>scrubbing, analysis </a:t>
-                      </a:r>
-                      <a:r>
-                        <a:rPr lang="en-US" sz="1400" dirty="0" smtClean="0"/>
-                        <a:t>and interpret precisely </a:t>
-                      </a:r>
-                      <a:r>
-                        <a:rPr lang="en-US" sz="1400" dirty="0"/>
-                        <a:t>so that </a:t>
-                      </a:r>
-                      <a:r>
-                        <a:rPr lang="en-US" sz="1400" dirty="0" smtClean="0"/>
-                        <a:t>one </a:t>
-                      </a:r>
-                      <a:r>
-                        <a:rPr lang="en-US" sz="1400" dirty="0"/>
-                        <a:t>can understand what </a:t>
-                      </a:r>
-                      <a:r>
-                        <a:rPr lang="en-US" sz="1400" dirty="0" smtClean="0"/>
-                        <a:t>data </a:t>
-                      </a:r>
-                      <a:r>
-                        <a:rPr lang="en-US" sz="1400" dirty="0"/>
-                        <a:t>want to say.</a:t>
+                        <a:t>Data gathering, scrubbing, analysis and interpret precisely so that one can understand what data want to say.</a:t>
                       </a:r>
                     </a:p>
                   </a:txBody>
                   <a:tcPr marL="22225" marR="22225" marT="11112" marB="11112" anchor="ctr"/>
                 </a:tc>
+                <a:extLst>
+                  <a:ext uri="{0D108BD9-81ED-4DB2-BD59-A6C34878D82A}">
+                    <a16:rowId xmlns:a16="http://schemas.microsoft.com/office/drawing/2014/main" val="10004"/>
+                  </a:ext>
+                </a:extLst>
               </a:tr>
               <a:tr h="813291">
                 <a:tc>
@@ -5377,52 +5209,32 @@
                     <a:p>
                       <a:pPr algn="l"/>
                       <a:r>
-                        <a:rPr lang="en-US" sz="1400" dirty="0" smtClean="0"/>
+                        <a:rPr lang="en-US" sz="1400" dirty="0"/>
                         <a:t>It</a:t>
                       </a:r>
                       <a:r>
-                        <a:rPr lang="en-US" sz="1400" baseline="0" dirty="0" smtClean="0"/>
+                        <a:rPr lang="en-US" sz="1400" baseline="0" dirty="0"/>
                         <a:t> </a:t>
                       </a:r>
                       <a:r>
-                        <a:rPr lang="en-US" sz="1400" dirty="0" smtClean="0"/>
-                        <a:t>can </a:t>
+                        <a:rPr lang="en-US" sz="1400" dirty="0"/>
+                        <a:t>can be used to find masked patterns, anonymous correlations, customer preferences, market trends</a:t>
+                      </a:r>
+                      <a:r>
+                        <a:rPr lang="en-US" sz="1400" baseline="0" dirty="0"/>
+                        <a:t> </a:t>
                       </a:r>
                       <a:r>
                         <a:rPr lang="en-US" sz="1400" dirty="0"/>
-                        <a:t>be used to find masked patterns, anonymous correlations, customer preferences, market </a:t>
+                        <a:t>that can aid</a:t>
                       </a:r>
                       <a:r>
-                        <a:rPr lang="en-US" sz="1400" dirty="0" smtClean="0"/>
-                        <a:t>trends</a:t>
-                      </a:r>
-                      <a:r>
-                        <a:rPr lang="en-US" sz="1400" baseline="0" dirty="0" smtClean="0"/>
-                        <a:t> </a:t>
-                      </a:r>
-                      <a:r>
-                        <a:rPr lang="en-US" sz="1400" dirty="0" smtClean="0"/>
-                        <a:t>that </a:t>
+                        <a:rPr lang="en-US" sz="1400" baseline="0" dirty="0"/>
+                        <a:t> in to </a:t>
                       </a:r>
                       <a:r>
                         <a:rPr lang="en-US" sz="1400" dirty="0"/>
-                        <a:t>can </a:t>
-                      </a:r>
-                      <a:r>
-                        <a:rPr lang="en-US" sz="1400" dirty="0" smtClean="0"/>
-                        <a:t>aid</a:t>
-                      </a:r>
-                      <a:r>
-                        <a:rPr lang="en-US" sz="1400" baseline="0" dirty="0" smtClean="0"/>
-                        <a:t> in to </a:t>
-                      </a:r>
-                      <a:r>
-                        <a:rPr lang="en-US" sz="1400" dirty="0" smtClean="0"/>
-                        <a:t>notify </a:t>
-                      </a:r>
-                      <a:r>
-                        <a:rPr lang="en-US" sz="1400" dirty="0"/>
-                        <a:t>decisions for business purpose.</a:t>
+                        <a:t>notify decisions for business purpose.</a:t>
                       </a:r>
                     </a:p>
                   </a:txBody>
@@ -5435,25 +5247,26 @@
                     <a:p>
                       <a:pPr algn="l"/>
                       <a:r>
-                        <a:rPr lang="en-US" sz="1400" dirty="0" smtClean="0"/>
+                        <a:rPr lang="en-US" sz="1400" dirty="0"/>
                         <a:t>It</a:t>
                       </a:r>
                       <a:r>
-                        <a:rPr lang="en-US" sz="1400" baseline="0" dirty="0" smtClean="0"/>
+                        <a:rPr lang="en-US" sz="1400" baseline="0" dirty="0"/>
                         <a:t> may be </a:t>
                       </a:r>
                       <a:r>
-                        <a:rPr lang="en-US" sz="1400" dirty="0" smtClean="0"/>
-                        <a:t>descriptive </a:t>
-                      </a:r>
-                      <a:r>
                         <a:rPr lang="en-US" sz="1400" dirty="0"/>
-                        <a:t>analysis, exploratory analysis, inferential analysis, predictive analysis and take useful insights from the data.</a:t>
+                        <a:t>descriptive analysis, exploratory analysis, inferential analysis, predictive analysis and take useful insights from the data.</a:t>
                       </a:r>
                     </a:p>
                   </a:txBody>
                   <a:tcPr marL="22225" marR="22225" marT="11112" marB="11112" anchor="ctr"/>
                 </a:tc>
+                <a:extLst>
+                  <a:ext uri="{0D108BD9-81ED-4DB2-BD59-A6C34878D82A}">
+                    <a16:rowId xmlns:a16="http://schemas.microsoft.com/office/drawing/2014/main" val="10005"/>
+                  </a:ext>
+                </a:extLst>
               </a:tr>
               <a:tr h="669769">
                 <a:tc>
@@ -5478,34 +5291,9 @@
                     <a:p>
                       <a:pPr algn="l"/>
                       <a:r>
-                        <a:rPr lang="en-US" sz="1400" dirty="0" smtClean="0"/>
-                        <a:t>1GB </a:t>
+                        <a:rPr lang="en-US" sz="1400" dirty="0"/>
+                        <a:t>1GB customer purchase data of past 1 year, one has to find that what our customers next possible purchases.</a:t>
                       </a:r>
-                      <a:r>
-                        <a:rPr lang="en-US" sz="1400" dirty="0"/>
-                        <a:t>customer purchase </a:t>
-                      </a:r>
-                      <a:r>
-                        <a:rPr lang="en-US" sz="1400" dirty="0" smtClean="0"/>
-                        <a:t>data </a:t>
-                      </a:r>
-                      <a:r>
-                        <a:rPr lang="en-US" sz="1400" dirty="0"/>
-                        <a:t>of past 1 year, </a:t>
-                      </a:r>
-                      <a:r>
-                        <a:rPr lang="en-US" sz="1400" dirty="0" smtClean="0"/>
-                        <a:t>one </a:t>
-                      </a:r>
-                      <a:r>
-                        <a:rPr lang="en-US" sz="1400" dirty="0"/>
-                        <a:t>has to find that what our customers next possible </a:t>
-                      </a:r>
-                      <a:r>
-                        <a:rPr lang="en-US" sz="1400" dirty="0" smtClean="0"/>
-                        <a:t>purchases.</a:t>
-                      </a:r>
-                      <a:endParaRPr lang="en-US" sz="1400" dirty="0"/>
                     </a:p>
                   </a:txBody>
                   <a:tcPr marL="22225" marR="22225" marT="11112" marB="11112" anchor="ctr"/>
@@ -5517,73 +5305,50 @@
                     <a:p>
                       <a:pPr algn="l"/>
                       <a:r>
-                        <a:rPr lang="en-US" sz="1400" dirty="0" smtClean="0"/>
-                        <a:t>1GB </a:t>
+                        <a:rPr lang="en-US" sz="1400" dirty="0"/>
+                        <a:t>1GB customer purchase data of past 1 year,</a:t>
+                      </a:r>
+                      <a:r>
+                        <a:rPr lang="en-US" sz="1400" baseline="0" dirty="0"/>
+                        <a:t> </a:t>
                       </a:r>
                       <a:r>
                         <a:rPr lang="en-US" sz="1400" dirty="0"/>
-                        <a:t>customer purchase </a:t>
+                        <a:t>one</a:t>
                       </a:r>
                       <a:r>
-                        <a:rPr lang="en-US" sz="1400" dirty="0" smtClean="0"/>
-                        <a:t>data </a:t>
+                        <a:rPr lang="en-US" sz="1400" baseline="0" dirty="0"/>
+                        <a:t> </a:t>
                       </a:r>
                       <a:r>
                         <a:rPr lang="en-US" sz="1400" dirty="0"/>
-                        <a:t>of past 1 </a:t>
+                        <a:t> try</a:t>
                       </a:r>
                       <a:r>
-                        <a:rPr lang="en-US" sz="1400" dirty="0" smtClean="0"/>
-                        <a:t>year,</a:t>
+                        <a:rPr lang="en-US" sz="1400" baseline="0" dirty="0"/>
+                        <a:t>ing </a:t>
                       </a:r>
                       <a:r>
-                        <a:rPr lang="en-US" sz="1400" baseline="0" dirty="0" smtClean="0"/>
+                        <a:rPr lang="en-US" sz="1400" dirty="0"/>
+                        <a:t>to find what happened so far, having</a:t>
+                      </a:r>
+                      <a:r>
+                        <a:rPr lang="en-US" sz="1400" baseline="0" dirty="0"/>
                         <a:t> </a:t>
                       </a:r>
                       <a:r>
-                        <a:rPr lang="en-US" sz="1400" dirty="0" smtClean="0"/>
-                        <a:t>one</a:t>
-                      </a:r>
-                      <a:r>
-                        <a:rPr lang="en-US" sz="1400" baseline="0" dirty="0" smtClean="0"/>
-                        <a:t> </a:t>
-                      </a:r>
-                      <a:r>
-                        <a:rPr lang="en-US" sz="1400" dirty="0" smtClean="0"/>
-                        <a:t> try</a:t>
-                      </a:r>
-                      <a:r>
-                        <a:rPr lang="en-US" sz="1400" baseline="0" dirty="0" smtClean="0"/>
-                        <a:t>ing </a:t>
-                      </a:r>
-                      <a:r>
-                        <a:rPr lang="en-US" sz="1400" dirty="0" smtClean="0"/>
-                        <a:t>to </a:t>
-                      </a:r>
-                      <a:r>
                         <a:rPr lang="en-US" sz="1400" dirty="0"/>
-                        <a:t>find what happened so </a:t>
-                      </a:r>
-                      <a:r>
-                        <a:rPr lang="en-US" sz="1400" dirty="0" smtClean="0"/>
-                        <a:t>far, having</a:t>
-                      </a:r>
-                      <a:r>
-                        <a:rPr lang="en-US" sz="1400" baseline="0" dirty="0" smtClean="0"/>
-                        <a:t> </a:t>
-                      </a:r>
-                      <a:r>
-                        <a:rPr lang="en-US" sz="1400" dirty="0" smtClean="0"/>
-                        <a:t>look </a:t>
-                      </a:r>
-                      <a:r>
-                        <a:rPr lang="en-US" sz="1400" dirty="0"/>
-                        <a:t>into past.</a:t>
+                        <a:t>look into past.</a:t>
                       </a:r>
                     </a:p>
                   </a:txBody>
                   <a:tcPr marL="22225" marR="22225" marT="11112" marB="11112" anchor="ctr"/>
                 </a:tc>
+                <a:extLst>
+                  <a:ext uri="{0D108BD9-81ED-4DB2-BD59-A6C34878D82A}">
+                    <a16:rowId xmlns:a16="http://schemas.microsoft.com/office/drawing/2014/main" val="10006"/>
+                  </a:ext>
+                </a:extLst>
               </a:tr>
             </a:tbl>
           </a:graphicData>
@@ -5702,7 +5467,7 @@
           <p:cNvPr id="2" name="Title 1">
             <a:extLst>
               <a:ext uri="{FF2B5EF4-FFF2-40B4-BE49-F238E27FC236}">
-                <a16:creationId xmlns:a16="http://schemas.microsoft.com/office/drawing/2014/main" xmlns="" id="{F4727C6F-3982-4E54-AA66-B4E0AA33FF66}"/>
+                <a16:creationId xmlns:a16="http://schemas.microsoft.com/office/drawing/2014/main" id="{F4727C6F-3982-4E54-AA66-B4E0AA33FF66}"/>
               </a:ext>
             </a:extLst>
           </p:cNvPr>
@@ -5731,7 +5496,7 @@
           <p:cNvPr id="3" name="Content Placeholder 2">
             <a:extLst>
               <a:ext uri="{FF2B5EF4-FFF2-40B4-BE49-F238E27FC236}">
-                <a16:creationId xmlns:a16="http://schemas.microsoft.com/office/drawing/2014/main" xmlns="" id="{1134DAC4-9E94-441C-A9BE-87750F6F60A2}"/>
+                <a16:creationId xmlns:a16="http://schemas.microsoft.com/office/drawing/2014/main" id="{1134DAC4-9E94-441C-A9BE-87750F6F60A2}"/>
               </a:ext>
             </a:extLst>
           </p:cNvPr>
@@ -5810,7 +5575,7 @@
           <p:cNvPr id="2" name="Title 1">
             <a:extLst>
               <a:ext uri="{FF2B5EF4-FFF2-40B4-BE49-F238E27FC236}">
-                <a16:creationId xmlns:a16="http://schemas.microsoft.com/office/drawing/2014/main" xmlns="" id="{3E1AC600-D16C-47B7-9075-94DA61007B25}"/>
+                <a16:creationId xmlns:a16="http://schemas.microsoft.com/office/drawing/2014/main" id="{3E1AC600-D16C-47B7-9075-94DA61007B25}"/>
               </a:ext>
             </a:extLst>
           </p:cNvPr>
@@ -5844,7 +5609,7 @@
           <p:cNvPr id="3" name="Content Placeholder 2">
             <a:extLst>
               <a:ext uri="{FF2B5EF4-FFF2-40B4-BE49-F238E27FC236}">
-                <a16:creationId xmlns:a16="http://schemas.microsoft.com/office/drawing/2014/main" xmlns="" id="{DDC8679B-3323-4E4B-ABD6-BD8748DF3AEB}"/>
+                <a16:creationId xmlns:a16="http://schemas.microsoft.com/office/drawing/2014/main" id="{DDC8679B-3323-4E4B-ABD6-BD8748DF3AEB}"/>
               </a:ext>
             </a:extLst>
           </p:cNvPr>
@@ -5956,7 +5721,7 @@
           <p:cNvPr id="3" name="Content Placeholder 2">
             <a:extLst>
               <a:ext uri="{FF2B5EF4-FFF2-40B4-BE49-F238E27FC236}">
-                <a16:creationId xmlns:a16="http://schemas.microsoft.com/office/drawing/2014/main" xmlns="" id="{12CE7563-67E4-470C-A76A-FD376D4C2471}"/>
+                <a16:creationId xmlns:a16="http://schemas.microsoft.com/office/drawing/2014/main" id="{12CE7563-67E4-470C-A76A-FD376D4C2471}"/>
               </a:ext>
             </a:extLst>
           </p:cNvPr>
@@ -5975,7 +5740,7 @@
           <a:lstStyle/>
           <a:p>
             <a:r>
-              <a:rPr lang="en-US" sz="3200" dirty="0"/>
+              <a:rPr lang="en-US" sz="3200" b="1" dirty="0"/>
               <a:t>SPARK</a:t>
             </a:r>
           </a:p>
@@ -6045,15 +5810,7 @@
             </a:pPr>
             <a:r>
               <a:rPr lang="en-US" dirty="0"/>
-              <a:t> It powers a stack of libraries including SQL </a:t>
-            </a:r>
-            <a:r>
-              <a:rPr lang="en-US"/>
-              <a:t>and Data Frames</a:t>
-            </a:r>
-            <a:r>
-              <a:rPr lang="en-US" dirty="0"/>
-              <a:t>, MLlib for machine learning, GraphX, and Spark Streaming</a:t>
+              <a:t> It powers a stack of libraries including SQL and Data Frames, MLlib for machine learning, GraphX, and Spark Streaming</a:t>
             </a:r>
           </a:p>
           <a:p>
@@ -6074,7 +5831,7 @@
           <p:cNvPr id="4" name="Title 1">
             <a:extLst>
               <a:ext uri="{FF2B5EF4-FFF2-40B4-BE49-F238E27FC236}">
-                <a16:creationId xmlns:a16="http://schemas.microsoft.com/office/drawing/2014/main" xmlns="" id="{D1F22F75-6806-481E-A0D8-FC161C3266D1}"/>
+                <a16:creationId xmlns:a16="http://schemas.microsoft.com/office/drawing/2014/main" id="{D1F22F75-6806-481E-A0D8-FC161C3266D1}"/>
               </a:ext>
             </a:extLst>
           </p:cNvPr>
@@ -6135,7 +5892,13 @@
       </p:grpSpPr>
       <p:sp>
         <p:nvSpPr>
-          <p:cNvPr id="2" name="Title 1"/>
+          <p:cNvPr id="2" name="Title 1">
+            <a:extLst>
+              <a:ext uri="{FF2B5EF4-FFF2-40B4-BE49-F238E27FC236}">
+                <a16:creationId xmlns:a16="http://schemas.microsoft.com/office/drawing/2014/main" id="{E881B18B-4DA4-4CC6-AA85-24D93A7030E6}"/>
+              </a:ext>
+            </a:extLst>
+          </p:cNvPr>
           <p:cNvSpPr>
             <a:spLocks noGrp="1"/>
           </p:cNvSpPr>
@@ -6148,41 +5911,97 @@
           <a:bodyPr/>
           <a:lstStyle/>
           <a:p>
-            <a:pPr algn="ctr"/>
-            <a:r>
-              <a:rPr lang="en-US" dirty="0"/>
-              <a:t>ALGORITHMS</a:t>
-            </a:r>
-          </a:p>
-        </p:txBody>
-      </p:sp>
-      <p:sp>
-        <p:nvSpPr>
-          <p:cNvPr id="3" name="Text Placeholder 2"/>
-          <p:cNvSpPr>
-            <a:spLocks noGrp="1"/>
-          </p:cNvSpPr>
-          <p:nvPr>
-            <p:ph type="body" idx="1"/>
+            <a:r>
+              <a:rPr lang="en-US" dirty="0"/>
+              <a:t>Big Data: Tools</a:t>
+            </a:r>
+            <a:endParaRPr lang="en-PK" dirty="0"/>
+          </a:p>
+        </p:txBody>
+      </p:sp>
+      <p:sp>
+        <p:nvSpPr>
+          <p:cNvPr id="3" name="Content Placeholder 2">
+            <a:extLst>
+              <a:ext uri="{FF2B5EF4-FFF2-40B4-BE49-F238E27FC236}">
+                <a16:creationId xmlns:a16="http://schemas.microsoft.com/office/drawing/2014/main" id="{30E794A1-6573-4598-90E8-7C27AE5A980A}"/>
+              </a:ext>
+            </a:extLst>
+          </p:cNvPr>
+          <p:cNvSpPr>
+            <a:spLocks noGrp="1"/>
+          </p:cNvSpPr>
+          <p:nvPr>
+            <p:ph idx="1"/>
           </p:nvPr>
         </p:nvSpPr>
         <p:spPr/>
         <p:txBody>
-          <a:bodyPr/>
-          <a:lstStyle/>
-          <a:p>
-            <a:pPr algn="ctr"/>
-            <a:r>
-              <a:rPr lang="en-US" dirty="0"/>
-              <a:t>Classification, for Da, for BD</a:t>
-            </a:r>
+          <a:bodyPr>
+            <a:normAutofit/>
+          </a:bodyPr>
+          <a:lstStyle/>
+          <a:p>
+            <a:r>
+              <a:rPr lang="en-US" sz="3200" b="1" dirty="0"/>
+              <a:t>Storm</a:t>
+            </a:r>
+            <a:endParaRPr lang="en-US" dirty="0"/>
+          </a:p>
+          <a:p>
+            <a:pPr>
+              <a:buFont typeface="Wingdings" panose="05000000000000000000" pitchFamily="2" charset="2"/>
+              <a:buChar char="v"/>
+            </a:pPr>
+            <a:r>
+              <a:rPr lang="en-US" dirty="0"/>
+              <a:t>Apache Storm is a free and open source distributed real time computation system.</a:t>
+            </a:r>
+          </a:p>
+          <a:p>
+            <a:pPr>
+              <a:buFont typeface="Wingdings" panose="05000000000000000000" pitchFamily="2" charset="2"/>
+              <a:buChar char="v"/>
+            </a:pPr>
+            <a:r>
+              <a:rPr lang="en-US" dirty="0"/>
+              <a:t>Storm is simple and can be used with any programming language.</a:t>
+            </a:r>
+          </a:p>
+          <a:p>
+            <a:pPr>
+              <a:buFont typeface="Wingdings" panose="05000000000000000000" pitchFamily="2" charset="2"/>
+              <a:buChar char="v"/>
+            </a:pPr>
+            <a:r>
+              <a:rPr lang="en-US" dirty="0"/>
+              <a:t>Storm topology consumes streams of data and processes those streams in arbitrarily complex ways</a:t>
+            </a:r>
+          </a:p>
+          <a:p>
+            <a:pPr>
+              <a:buFont typeface="Wingdings" panose="05000000000000000000" pitchFamily="2" charset="2"/>
+              <a:buChar char="v"/>
+            </a:pPr>
+            <a:r>
+              <a:rPr lang="en-US" dirty="0"/>
+              <a:t>The latest version of storm </a:t>
+            </a:r>
+            <a:r>
+              <a:rPr lang="en-US"/>
+              <a:t>is 1.2.2</a:t>
+            </a:r>
+            <a:endParaRPr lang="en-US" dirty="0"/>
+          </a:p>
+          <a:p>
+            <a:endParaRPr lang="en-PK" sz="3200" b="1" dirty="0"/>
           </a:p>
         </p:txBody>
       </p:sp>
     </p:spTree>
     <p:extLst>
       <p:ext uri="{BB962C8B-B14F-4D97-AF65-F5344CB8AC3E}">
-        <p14:creationId xmlns:p14="http://schemas.microsoft.com/office/powerpoint/2010/main" val="2204207379"/>
+        <p14:creationId xmlns:p14="http://schemas.microsoft.com/office/powerpoint/2010/main" val="53400761"/>
       </p:ext>
     </p:extLst>
   </p:cSld>
@@ -6227,7 +6046,7 @@
             <a:pPr algn="ctr"/>
             <a:r>
               <a:rPr lang="en-US" dirty="0"/>
-              <a:t>COMPARISON </a:t>
+              <a:t>ALGORITHMS</a:t>
             </a:r>
           </a:p>
         </p:txBody>
@@ -6249,17 +6068,16 @@
           <a:p>
             <a:pPr algn="ctr"/>
             <a:r>
-              <a:rPr lang="en-US" cap="none" dirty="0"/>
-              <a:t>Technology, Tool, Features, Use</a:t>
-            </a:r>
-            <a:endParaRPr lang="en-US" dirty="0"/>
+              <a:rPr lang="en-US" dirty="0"/>
+              <a:t>Classification, for Da, for BD</a:t>
+            </a:r>
           </a:p>
         </p:txBody>
       </p:sp>
     </p:spTree>
     <p:extLst>
       <p:ext uri="{BB962C8B-B14F-4D97-AF65-F5344CB8AC3E}">
-        <p14:creationId xmlns:p14="http://schemas.microsoft.com/office/powerpoint/2010/main" val="3585353157"/>
+        <p14:creationId xmlns:p14="http://schemas.microsoft.com/office/powerpoint/2010/main" val="2204207379"/>
       </p:ext>
     </p:extLst>
   </p:cSld>
@@ -6370,6 +6188,83 @@
 </p:sld>
 </file>
 
+<file path=ppt/slides/slide20.xml><?xml version="1.0" encoding="utf-8"?>
+<p:sld xmlns:a="http://schemas.openxmlformats.org/drawingml/2006/main" xmlns:r="http://schemas.openxmlformats.org/officeDocument/2006/relationships" xmlns:p="http://schemas.openxmlformats.org/presentationml/2006/main">
+  <p:cSld>
+    <p:spTree>
+      <p:nvGrpSpPr>
+        <p:cNvPr id="1" name=""/>
+        <p:cNvGrpSpPr/>
+        <p:nvPr/>
+      </p:nvGrpSpPr>
+      <p:grpSpPr>
+        <a:xfrm>
+          <a:off x="0" y="0"/>
+          <a:ext cx="0" cy="0"/>
+          <a:chOff x="0" y="0"/>
+          <a:chExt cx="0" cy="0"/>
+        </a:xfrm>
+      </p:grpSpPr>
+      <p:sp>
+        <p:nvSpPr>
+          <p:cNvPr id="2" name="Title 1"/>
+          <p:cNvSpPr>
+            <a:spLocks noGrp="1"/>
+          </p:cNvSpPr>
+          <p:nvPr>
+            <p:ph type="title"/>
+          </p:nvPr>
+        </p:nvSpPr>
+        <p:spPr/>
+        <p:txBody>
+          <a:bodyPr/>
+          <a:lstStyle/>
+          <a:p>
+            <a:pPr algn="ctr"/>
+            <a:r>
+              <a:rPr lang="en-US" dirty="0"/>
+              <a:t>COMPARISON </a:t>
+            </a:r>
+          </a:p>
+        </p:txBody>
+      </p:sp>
+      <p:sp>
+        <p:nvSpPr>
+          <p:cNvPr id="3" name="Text Placeholder 2"/>
+          <p:cNvSpPr>
+            <a:spLocks noGrp="1"/>
+          </p:cNvSpPr>
+          <p:nvPr>
+            <p:ph type="body" idx="1"/>
+          </p:nvPr>
+        </p:nvSpPr>
+        <p:spPr/>
+        <p:txBody>
+          <a:bodyPr/>
+          <a:lstStyle/>
+          <a:p>
+            <a:pPr algn="ctr"/>
+            <a:r>
+              <a:rPr lang="en-US" cap="none" dirty="0"/>
+              <a:t>Technology, Tool, Features, Use</a:t>
+            </a:r>
+            <a:endParaRPr lang="en-US" dirty="0"/>
+          </a:p>
+        </p:txBody>
+      </p:sp>
+    </p:spTree>
+    <p:extLst>
+      <p:ext uri="{BB962C8B-B14F-4D97-AF65-F5344CB8AC3E}">
+        <p14:creationId xmlns:p14="http://schemas.microsoft.com/office/powerpoint/2010/main" val="3585353157"/>
+      </p:ext>
+    </p:extLst>
+  </p:cSld>
+  <p:clrMapOvr>
+    <a:masterClrMapping/>
+  </p:clrMapOvr>
+</p:sld>
+</file>
+
 <file path=ppt/slides/slide3.xml><?xml version="1.0" encoding="utf-8"?>
 <p:sld xmlns:a="http://schemas.openxmlformats.org/drawingml/2006/main" xmlns:r="http://schemas.openxmlformats.org/officeDocument/2006/relationships" xmlns:p="http://schemas.openxmlformats.org/presentationml/2006/main">
   <p:cSld>
@@ -6456,14 +6351,14 @@
                 <a:gridCol w="5035931">
                   <a:extLst>
                     <a:ext uri="{9D8B030D-6E8A-4147-A177-3AD203B41FA5}">
-                      <a16:colId xmlns:a16="http://schemas.microsoft.com/office/drawing/2014/main" xmlns="" val="20000"/>
+                      <a16:colId xmlns:a16="http://schemas.microsoft.com/office/drawing/2014/main" val="20000"/>
                     </a:ext>
                   </a:extLst>
                 </a:gridCol>
                 <a:gridCol w="5022469">
                   <a:extLst>
                     <a:ext uri="{9D8B030D-6E8A-4147-A177-3AD203B41FA5}">
-                      <a16:colId xmlns:a16="http://schemas.microsoft.com/office/drawing/2014/main" xmlns="" val="20001"/>
+                      <a16:colId xmlns:a16="http://schemas.microsoft.com/office/drawing/2014/main" val="20001"/>
                     </a:ext>
                   </a:extLst>
                 </a:gridCol>
@@ -6543,7 +6438,7 @@
                 </a:tc>
                 <a:extLst>
                   <a:ext uri="{0D108BD9-81ED-4DB2-BD59-A6C34878D82A}">
-                    <a16:rowId xmlns:a16="http://schemas.microsoft.com/office/drawing/2014/main" xmlns="" val="10000"/>
+                    <a16:rowId xmlns:a16="http://schemas.microsoft.com/office/drawing/2014/main" val="10000"/>
                   </a:ext>
                 </a:extLst>
               </a:tr>
@@ -6630,7 +6525,7 @@
                 </a:tc>
                 <a:extLst>
                   <a:ext uri="{0D108BD9-81ED-4DB2-BD59-A6C34878D82A}">
-                    <a16:rowId xmlns:a16="http://schemas.microsoft.com/office/drawing/2014/main" xmlns="" val="10001"/>
+                    <a16:rowId xmlns:a16="http://schemas.microsoft.com/office/drawing/2014/main" val="10001"/>
                   </a:ext>
                 </a:extLst>
               </a:tr>
@@ -6733,7 +6628,7 @@
                 </a:tc>
                 <a:extLst>
                   <a:ext uri="{0D108BD9-81ED-4DB2-BD59-A6C34878D82A}">
-                    <a16:rowId xmlns:a16="http://schemas.microsoft.com/office/drawing/2014/main" xmlns="" val="10002"/>
+                    <a16:rowId xmlns:a16="http://schemas.microsoft.com/office/drawing/2014/main" val="10002"/>
                   </a:ext>
                 </a:extLst>
               </a:tr>
@@ -6820,10 +6715,9 @@
               <a:buChar char="Ø"/>
             </a:pPr>
             <a:r>
-              <a:rPr lang="en-US" dirty="0" smtClean="0"/>
+              <a:rPr lang="en-US" dirty="0"/>
               <a:t>Objective</a:t>
             </a:r>
-            <a:endParaRPr lang="en-US" dirty="0"/>
           </a:p>
           <a:p>
             <a:pPr>
@@ -6841,7 +6735,7 @@
               <a:buChar char="Ø"/>
             </a:pPr>
             <a:r>
-              <a:rPr lang="en-US" dirty="0" smtClean="0"/>
+              <a:rPr lang="en-US" dirty="0"/>
               <a:t> Forms, Types, Classification </a:t>
             </a:r>
           </a:p>
@@ -6851,10 +6745,9 @@
               <a:buChar char="Ø"/>
             </a:pPr>
             <a:r>
-              <a:rPr lang="en-US" dirty="0" smtClean="0"/>
+              <a:rPr lang="en-US" dirty="0"/>
               <a:t> Analysis</a:t>
             </a:r>
-            <a:endParaRPr lang="en-US" dirty="0"/>
           </a:p>
           <a:p>
             <a:pPr lvl="1">
@@ -6913,13 +6806,8 @@
             </a:pPr>
             <a:r>
               <a:rPr lang="en-US" dirty="0"/>
-              <a:t> </a:t>
-            </a:r>
-            <a:r>
-              <a:rPr lang="en-US" dirty="0" smtClean="0"/>
-              <a:t>Sources &amp; Data Lake</a:t>
-            </a:r>
-            <a:endParaRPr lang="en-US" dirty="0"/>
+              <a:t> Sources &amp; Data Lake</a:t>
+            </a:r>
           </a:p>
           <a:p>
             <a:pPr lvl="1">
@@ -6978,15 +6866,7 @@
             </a:pPr>
             <a:r>
               <a:rPr lang="en-US" dirty="0"/>
-              <a:t> Big Data &amp; </a:t>
-            </a:r>
-            <a:r>
-              <a:rPr lang="en-US" dirty="0" smtClean="0"/>
-              <a:t>Analytics </a:t>
-            </a:r>
-            <a:r>
-              <a:rPr lang="en-US" dirty="0"/>
-              <a:t>Algorithms</a:t>
+              <a:t> Big Data &amp; Analytics Algorithms</a:t>
             </a:r>
           </a:p>
         </p:txBody>
@@ -7233,12 +7113,8 @@
           <a:p>
             <a:pPr marL="0" lvl="1" algn="ctr"/>
             <a:r>
-              <a:rPr lang="en-US" dirty="0" smtClean="0"/>
-              <a:t>FORMS, TYPES,  CLASSIFICATION, ANALYSIS</a:t>
-            </a:r>
-            <a:r>
-              <a:rPr lang="en-US" dirty="0"/>
-              <a:t>, ANALYTICS, A vs A, ANALYTICS TOOLS</a:t>
+              <a:rPr lang="en-US" dirty="0"/>
+              <a:t>FORMS, TYPES,  CLASSIFICATION, ANALYSIS, ANALYTICS, A vs A, ANALYTICS TOOLS</a:t>
             </a:r>
           </a:p>
           <a:p>
@@ -7395,13 +7271,8 @@
           <a:p>
             <a:r>
               <a:rPr lang="en-US" dirty="0"/>
-              <a:t>DATA: </a:t>
-            </a:r>
-            <a:r>
-              <a:rPr lang="en-US" dirty="0" smtClean="0"/>
-              <a:t>FORMS</a:t>
-            </a:r>
-            <a:endParaRPr lang="en-US" dirty="0"/>
+              <a:t>DATA: FORMS</a:t>
+            </a:r>
           </a:p>
         </p:txBody>
       </p:sp>
@@ -7436,7 +7307,7 @@
               <a:buChar char="v"/>
             </a:pPr>
             <a:r>
-              <a:rPr lang="en-US" dirty="0" smtClean="0"/>
+              <a:rPr lang="en-US" dirty="0"/>
               <a:t> Number</a:t>
             </a:r>
           </a:p>
@@ -7447,11 +7318,7 @@
             </a:pPr>
             <a:r>
               <a:rPr lang="en-US" dirty="0"/>
-              <a:t> </a:t>
-            </a:r>
-            <a:r>
-              <a:rPr lang="en-US" dirty="0" smtClean="0"/>
-              <a:t>Text</a:t>
+              <a:t> Text</a:t>
             </a:r>
           </a:p>
           <a:p>
@@ -7461,11 +7328,7 @@
             </a:pPr>
             <a:r>
               <a:rPr lang="en-US" dirty="0"/>
-              <a:t> </a:t>
-            </a:r>
-            <a:r>
-              <a:rPr lang="en-US" dirty="0" smtClean="0"/>
-              <a:t>Image</a:t>
+              <a:t> Image</a:t>
             </a:r>
           </a:p>
           <a:p>
@@ -7475,11 +7338,7 @@
             </a:pPr>
             <a:r>
               <a:rPr lang="en-US" dirty="0"/>
-              <a:t> </a:t>
-            </a:r>
-            <a:r>
-              <a:rPr lang="en-US" dirty="0" smtClean="0"/>
-              <a:t>Audio </a:t>
+              <a:t> Audio </a:t>
             </a:r>
           </a:p>
           <a:p>
@@ -7489,11 +7348,7 @@
             </a:pPr>
             <a:r>
               <a:rPr lang="en-US" dirty="0"/>
-              <a:t> </a:t>
-            </a:r>
-            <a:r>
-              <a:rPr lang="en-US" dirty="0" smtClean="0"/>
-              <a:t>Video</a:t>
+              <a:t> Video</a:t>
             </a:r>
           </a:p>
         </p:txBody>

</xml_diff>

<commit_message>
Added algo types' exmpl
Added: Algorithm Types' examples algorithms to slide
</commit_message>
<xml_diff>
--- a/Project Interim Submission/Generic DS Framework.pptx
+++ b/Project Interim Submission/Generic DS Framework.pptx
@@ -1735,58 +1735,6 @@
         </dgm:presLayoutVars>
       </dgm:prSet>
       <dgm:spPr/>
-    </dgm:pt>
-    <dgm:pt modelId="{D465AAE9-80F9-4B15-8D00-FCD2F5B0741D}" type="pres">
-      <dgm:prSet presAssocID="{A7E2D81E-7900-4DF4-BEF5-77A2812B0C4E}" presName="hierRoot1" presStyleCnt="0">
-        <dgm:presLayoutVars>
-          <dgm:hierBranch val="init"/>
-        </dgm:presLayoutVars>
-      </dgm:prSet>
-      <dgm:spPr/>
-    </dgm:pt>
-    <dgm:pt modelId="{3FD2C245-E911-4A1C-878D-89B50AA53502}" type="pres">
-      <dgm:prSet presAssocID="{A7E2D81E-7900-4DF4-BEF5-77A2812B0C4E}" presName="rootComposite1" presStyleCnt="0"/>
-      <dgm:spPr/>
-    </dgm:pt>
-    <dgm:pt modelId="{91E1DAD5-A378-4F9D-90D3-E4D6E3B719CC}" type="pres">
-      <dgm:prSet presAssocID="{A7E2D81E-7900-4DF4-BEF5-77A2812B0C4E}" presName="rootText1" presStyleLbl="node0" presStyleIdx="0" presStyleCnt="1">
-        <dgm:presLayoutVars>
-          <dgm:chPref val="3"/>
-        </dgm:presLayoutVars>
-      </dgm:prSet>
-      <dgm:spPr/>
-    </dgm:pt>
-    <dgm:pt modelId="{C91E4177-0B62-4588-885D-1A4C3BD2BAF7}" type="pres">
-      <dgm:prSet presAssocID="{A7E2D81E-7900-4DF4-BEF5-77A2812B0C4E}" presName="rootConnector1" presStyleLbl="node1" presStyleIdx="0" presStyleCnt="0"/>
-      <dgm:spPr/>
-    </dgm:pt>
-    <dgm:pt modelId="{D53B8CB7-CBBA-4A47-AEAB-20BDBD529059}" type="pres">
-      <dgm:prSet presAssocID="{A7E2D81E-7900-4DF4-BEF5-77A2812B0C4E}" presName="hierChild2" presStyleCnt="0"/>
-      <dgm:spPr/>
-    </dgm:pt>
-    <dgm:pt modelId="{D81F13DE-77CA-4947-A9D8-3B9405F7FB4A}" type="pres">
-      <dgm:prSet presAssocID="{CEB0D96F-42A5-4903-B863-AD62B81F61AE}" presName="Name37" presStyleLbl="parChTrans1D2" presStyleIdx="0" presStyleCnt="4"/>
-      <dgm:spPr/>
-    </dgm:pt>
-    <dgm:pt modelId="{8A9B036C-9B9C-4C62-B327-FD06621DCB37}" type="pres">
-      <dgm:prSet presAssocID="{C9F271EB-AA97-406F-A22E-048A336DC94A}" presName="hierRoot2" presStyleCnt="0">
-        <dgm:presLayoutVars>
-          <dgm:hierBranch val="init"/>
-        </dgm:presLayoutVars>
-      </dgm:prSet>
-      <dgm:spPr/>
-    </dgm:pt>
-    <dgm:pt modelId="{0FF48768-7FE3-4BFF-8011-551D566767B6}" type="pres">
-      <dgm:prSet presAssocID="{C9F271EB-AA97-406F-A22E-048A336DC94A}" presName="rootComposite" presStyleCnt="0"/>
-      <dgm:spPr/>
-    </dgm:pt>
-    <dgm:pt modelId="{EF58EAAC-E8FC-4E92-AC54-3E70E3CCE427}" type="pres">
-      <dgm:prSet presAssocID="{C9F271EB-AA97-406F-A22E-048A336DC94A}" presName="rootText" presStyleLbl="node2" presStyleIdx="0" presStyleCnt="4">
-        <dgm:presLayoutVars>
-          <dgm:chPref val="3"/>
-        </dgm:presLayoutVars>
-      </dgm:prSet>
-      <dgm:spPr/>
       <dgm:t>
         <a:bodyPr/>
         <a:lstStyle/>
@@ -1795,32 +1743,20 @@
         </a:p>
       </dgm:t>
     </dgm:pt>
-    <dgm:pt modelId="{0CDB574B-8A16-4575-B86E-72EE9B15201E}" type="pres">
-      <dgm:prSet presAssocID="{C9F271EB-AA97-406F-A22E-048A336DC94A}" presName="rootConnector" presStyleLbl="node2" presStyleIdx="0" presStyleCnt="4"/>
-      <dgm:spPr/>
-    </dgm:pt>
-    <dgm:pt modelId="{F42E551D-2C1C-4B45-8B66-81CA30C78788}" type="pres">
-      <dgm:prSet presAssocID="{C9F271EB-AA97-406F-A22E-048A336DC94A}" presName="hierChild4" presStyleCnt="0"/>
-      <dgm:spPr/>
-    </dgm:pt>
-    <dgm:pt modelId="{52AB23E0-53A6-4AC3-B89A-D72BC394F116}" type="pres">
-      <dgm:prSet presAssocID="{C6CC40CD-5626-4A19-9936-F67709EE7AF0}" presName="Name37" presStyleLbl="parChTrans1D3" presStyleIdx="0" presStyleCnt="6"/>
-      <dgm:spPr/>
-    </dgm:pt>
-    <dgm:pt modelId="{0665CF0F-5F73-4C12-B8AF-EC4C4F5C66D0}" type="pres">
-      <dgm:prSet presAssocID="{B23CD900-37E2-45DE-B384-F9885D55838B}" presName="hierRoot2" presStyleCnt="0">
+    <dgm:pt modelId="{D465AAE9-80F9-4B15-8D00-FCD2F5B0741D}" type="pres">
+      <dgm:prSet presAssocID="{A7E2D81E-7900-4DF4-BEF5-77A2812B0C4E}" presName="hierRoot1" presStyleCnt="0">
         <dgm:presLayoutVars>
           <dgm:hierBranch val="init"/>
         </dgm:presLayoutVars>
       </dgm:prSet>
       <dgm:spPr/>
     </dgm:pt>
-    <dgm:pt modelId="{DAD4F479-B05D-48F3-8BD1-2471FD3FDD1A}" type="pres">
-      <dgm:prSet presAssocID="{B23CD900-37E2-45DE-B384-F9885D55838B}" presName="rootComposite" presStyleCnt="0"/>
-      <dgm:spPr/>
-    </dgm:pt>
-    <dgm:pt modelId="{F6A2B30B-A958-479B-AD92-8D9166487761}" type="pres">
-      <dgm:prSet presAssocID="{B23CD900-37E2-45DE-B384-F9885D55838B}" presName="rootText" presStyleLbl="node3" presStyleIdx="0" presStyleCnt="6">
+    <dgm:pt modelId="{3FD2C245-E911-4A1C-878D-89B50AA53502}" type="pres">
+      <dgm:prSet presAssocID="{A7E2D81E-7900-4DF4-BEF5-77A2812B0C4E}" presName="rootComposite1" presStyleCnt="0"/>
+      <dgm:spPr/>
+    </dgm:pt>
+    <dgm:pt modelId="{91E1DAD5-A378-4F9D-90D3-E4D6E3B719CC}" type="pres">
+      <dgm:prSet presAssocID="{A7E2D81E-7900-4DF4-BEF5-77A2812B0C4E}" presName="rootText1" presStyleLbl="node0" presStyleIdx="0" presStyleCnt="1">
         <dgm:presLayoutVars>
           <dgm:chPref val="3"/>
         </dgm:presLayoutVars>
@@ -1834,36 +1770,8 @@
         </a:p>
       </dgm:t>
     </dgm:pt>
-    <dgm:pt modelId="{82AF4305-DDE7-4632-85B6-1B4672473DDD}" type="pres">
-      <dgm:prSet presAssocID="{B23CD900-37E2-45DE-B384-F9885D55838B}" presName="rootConnector" presStyleLbl="node3" presStyleIdx="0" presStyleCnt="6"/>
-      <dgm:spPr/>
-    </dgm:pt>
-    <dgm:pt modelId="{FFD4A4B2-AEC0-48EB-BFFB-34B6FD14A514}" type="pres">
-      <dgm:prSet presAssocID="{B23CD900-37E2-45DE-B384-F9885D55838B}" presName="hierChild4" presStyleCnt="0"/>
-      <dgm:spPr/>
-    </dgm:pt>
-    <dgm:pt modelId="{21695C6D-5845-4B94-8EDE-C845DA7BA21E}" type="pres">
-      <dgm:prSet presAssocID="{3C5DF98A-9E49-4EBC-AA28-3E96D9B53B39}" presName="Name37" presStyleLbl="parChTrans1D4" presStyleIdx="0" presStyleCnt="8"/>
-      <dgm:spPr/>
-    </dgm:pt>
-    <dgm:pt modelId="{83161E41-2EF8-4DF4-B687-A796B22BBC00}" type="pres">
-      <dgm:prSet presAssocID="{A9576EC0-F780-411F-A988-792BB4B5827F}" presName="hierRoot2" presStyleCnt="0">
-        <dgm:presLayoutVars>
-          <dgm:hierBranch val="init"/>
-        </dgm:presLayoutVars>
-      </dgm:prSet>
-      <dgm:spPr/>
-    </dgm:pt>
-    <dgm:pt modelId="{34BF0F66-79EF-487E-A751-373FE74E565A}" type="pres">
-      <dgm:prSet presAssocID="{A9576EC0-F780-411F-A988-792BB4B5827F}" presName="rootComposite" presStyleCnt="0"/>
-      <dgm:spPr/>
-    </dgm:pt>
-    <dgm:pt modelId="{B4236978-BB7B-465F-A15B-A4753285650F}" type="pres">
-      <dgm:prSet presAssocID="{A9576EC0-F780-411F-A988-792BB4B5827F}" presName="rootText" presStyleLbl="node4" presStyleIdx="0" presStyleCnt="8">
-        <dgm:presLayoutVars>
-          <dgm:chPref val="3"/>
-        </dgm:presLayoutVars>
-      </dgm:prSet>
+    <dgm:pt modelId="{C91E4177-0B62-4588-885D-1A4C3BD2BAF7}" type="pres">
+      <dgm:prSet presAssocID="{A7E2D81E-7900-4DF4-BEF5-77A2812B0C4E}" presName="rootConnector1" presStyleLbl="node1" presStyleIdx="0" presStyleCnt="0"/>
       <dgm:spPr/>
       <dgm:t>
         <a:bodyPr/>
@@ -1873,44 +1781,12 @@
         </a:p>
       </dgm:t>
     </dgm:pt>
-    <dgm:pt modelId="{3C3CC326-C1BB-4802-9C80-3024F7E2EFEC}" type="pres">
-      <dgm:prSet presAssocID="{A9576EC0-F780-411F-A988-792BB4B5827F}" presName="rootConnector" presStyleLbl="node4" presStyleIdx="0" presStyleCnt="8"/>
-      <dgm:spPr/>
-    </dgm:pt>
-    <dgm:pt modelId="{73072FC8-772C-450F-8876-176E24E10D0E}" type="pres">
-      <dgm:prSet presAssocID="{A9576EC0-F780-411F-A988-792BB4B5827F}" presName="hierChild4" presStyleCnt="0"/>
-      <dgm:spPr/>
-    </dgm:pt>
-    <dgm:pt modelId="{F14183EB-D0F8-400A-97FC-69B00B9DFE60}" type="pres">
-      <dgm:prSet presAssocID="{A9576EC0-F780-411F-A988-792BB4B5827F}" presName="hierChild5" presStyleCnt="0"/>
-      <dgm:spPr/>
-    </dgm:pt>
-    <dgm:pt modelId="{DE7B171F-28D8-4ECB-80FF-440ED2CB1FC7}" type="pres">
-      <dgm:prSet presAssocID="{B23CD900-37E2-45DE-B384-F9885D55838B}" presName="hierChild5" presStyleCnt="0"/>
-      <dgm:spPr/>
-    </dgm:pt>
-    <dgm:pt modelId="{8D8E53BF-D23C-4E66-A64D-69E3B5A64376}" type="pres">
-      <dgm:prSet presAssocID="{9DFE08AD-6D40-40B9-8C6C-0D9B748E71FD}" presName="Name37" presStyleLbl="parChTrans1D3" presStyleIdx="1" presStyleCnt="6"/>
-      <dgm:spPr/>
-    </dgm:pt>
-    <dgm:pt modelId="{1350A144-4572-4E0C-B6F5-5BA07957B926}" type="pres">
-      <dgm:prSet presAssocID="{6CEB8C34-32A9-47E6-A405-A04B3711CFB7}" presName="hierRoot2" presStyleCnt="0">
-        <dgm:presLayoutVars>
-          <dgm:hierBranch val="init"/>
-        </dgm:presLayoutVars>
-      </dgm:prSet>
-      <dgm:spPr/>
-    </dgm:pt>
-    <dgm:pt modelId="{8AB9D0C9-ACD4-4DAC-B6D6-2BFDC93C6F00}" type="pres">
-      <dgm:prSet presAssocID="{6CEB8C34-32A9-47E6-A405-A04B3711CFB7}" presName="rootComposite" presStyleCnt="0"/>
-      <dgm:spPr/>
-    </dgm:pt>
-    <dgm:pt modelId="{087E6E65-2112-476B-A4AA-3A36C7628514}" type="pres">
-      <dgm:prSet presAssocID="{6CEB8C34-32A9-47E6-A405-A04B3711CFB7}" presName="rootText" presStyleLbl="node3" presStyleIdx="1" presStyleCnt="6">
-        <dgm:presLayoutVars>
-          <dgm:chPref val="3"/>
-        </dgm:presLayoutVars>
-      </dgm:prSet>
+    <dgm:pt modelId="{D53B8CB7-CBBA-4A47-AEAB-20BDBD529059}" type="pres">
+      <dgm:prSet presAssocID="{A7E2D81E-7900-4DF4-BEF5-77A2812B0C4E}" presName="hierChild2" presStyleCnt="0"/>
+      <dgm:spPr/>
+    </dgm:pt>
+    <dgm:pt modelId="{D81F13DE-77CA-4947-A9D8-3B9405F7FB4A}" type="pres">
+      <dgm:prSet presAssocID="{CEB0D96F-42A5-4903-B863-AD62B81F61AE}" presName="Name37" presStyleLbl="parChTrans1D2" presStyleIdx="0" presStyleCnt="4"/>
       <dgm:spPr/>
       <dgm:t>
         <a:bodyPr/>
@@ -1920,32 +1796,20 @@
         </a:p>
       </dgm:t>
     </dgm:pt>
-    <dgm:pt modelId="{F5F98A29-63BF-4AC3-9BF3-D3C7E3FF700B}" type="pres">
-      <dgm:prSet presAssocID="{6CEB8C34-32A9-47E6-A405-A04B3711CFB7}" presName="rootConnector" presStyleLbl="node3" presStyleIdx="1" presStyleCnt="6"/>
-      <dgm:spPr/>
-    </dgm:pt>
-    <dgm:pt modelId="{DE9A03BD-5558-45D3-9F86-59D9BE412CFD}" type="pres">
-      <dgm:prSet presAssocID="{6CEB8C34-32A9-47E6-A405-A04B3711CFB7}" presName="hierChild4" presStyleCnt="0"/>
-      <dgm:spPr/>
-    </dgm:pt>
-    <dgm:pt modelId="{E8CF98EA-1E11-4C8B-B3DC-A8B8C9716700}" type="pres">
-      <dgm:prSet presAssocID="{B3E11DF4-0A70-40F4-A9F3-378E2202AE1D}" presName="Name37" presStyleLbl="parChTrans1D4" presStyleIdx="1" presStyleCnt="8"/>
-      <dgm:spPr/>
-    </dgm:pt>
-    <dgm:pt modelId="{E5E0420A-856C-4A91-ACF2-F71403B73E44}" type="pres">
-      <dgm:prSet presAssocID="{5AF5E628-F524-43D4-9C5A-5A8189560301}" presName="hierRoot2" presStyleCnt="0">
+    <dgm:pt modelId="{8A9B036C-9B9C-4C62-B327-FD06621DCB37}" type="pres">
+      <dgm:prSet presAssocID="{C9F271EB-AA97-406F-A22E-048A336DC94A}" presName="hierRoot2" presStyleCnt="0">
         <dgm:presLayoutVars>
           <dgm:hierBranch val="init"/>
         </dgm:presLayoutVars>
       </dgm:prSet>
       <dgm:spPr/>
     </dgm:pt>
-    <dgm:pt modelId="{77600785-CC89-410E-82E1-FF4F496F5442}" type="pres">
-      <dgm:prSet presAssocID="{5AF5E628-F524-43D4-9C5A-5A8189560301}" presName="rootComposite" presStyleCnt="0"/>
-      <dgm:spPr/>
-    </dgm:pt>
-    <dgm:pt modelId="{710C924E-E30F-44DF-A6AA-7A0529BD66A0}" type="pres">
-      <dgm:prSet presAssocID="{5AF5E628-F524-43D4-9C5A-5A8189560301}" presName="rootText" presStyleLbl="node4" presStyleIdx="1" presStyleCnt="8">
+    <dgm:pt modelId="{0FF48768-7FE3-4BFF-8011-551D566767B6}" type="pres">
+      <dgm:prSet presAssocID="{C9F271EB-AA97-406F-A22E-048A336DC94A}" presName="rootComposite" presStyleCnt="0"/>
+      <dgm:spPr/>
+    </dgm:pt>
+    <dgm:pt modelId="{EF58EAAC-E8FC-4E92-AC54-3E70E3CCE427}" type="pres">
+      <dgm:prSet presAssocID="{C9F271EB-AA97-406F-A22E-048A336DC94A}" presName="rootText" presStyleLbl="node2" presStyleIdx="0" presStyleCnt="4">
         <dgm:presLayoutVars>
           <dgm:chPref val="3"/>
         </dgm:presLayoutVars>
@@ -1959,48 +1823,8 @@
         </a:p>
       </dgm:t>
     </dgm:pt>
-    <dgm:pt modelId="{C6B5F02F-BF16-4258-AC5A-D980E6777BDC}" type="pres">
-      <dgm:prSet presAssocID="{5AF5E628-F524-43D4-9C5A-5A8189560301}" presName="rootConnector" presStyleLbl="node4" presStyleIdx="1" presStyleCnt="8"/>
-      <dgm:spPr/>
-    </dgm:pt>
-    <dgm:pt modelId="{F6F09632-4A16-4C17-A313-983E0E192977}" type="pres">
-      <dgm:prSet presAssocID="{5AF5E628-F524-43D4-9C5A-5A8189560301}" presName="hierChild4" presStyleCnt="0"/>
-      <dgm:spPr/>
-    </dgm:pt>
-    <dgm:pt modelId="{B12841A3-D0EB-492D-B1AD-568D69D3DEDE}" type="pres">
-      <dgm:prSet presAssocID="{5AF5E628-F524-43D4-9C5A-5A8189560301}" presName="hierChild5" presStyleCnt="0"/>
-      <dgm:spPr/>
-    </dgm:pt>
-    <dgm:pt modelId="{8C0BB0A1-822C-46F3-A202-C614663CDD7A}" type="pres">
-      <dgm:prSet presAssocID="{6CEB8C34-32A9-47E6-A405-A04B3711CFB7}" presName="hierChild5" presStyleCnt="0"/>
-      <dgm:spPr/>
-    </dgm:pt>
-    <dgm:pt modelId="{E8D79B63-11A9-4A8F-A4DE-C95D916175B2}" type="pres">
-      <dgm:prSet presAssocID="{C9F271EB-AA97-406F-A22E-048A336DC94A}" presName="hierChild5" presStyleCnt="0"/>
-      <dgm:spPr/>
-    </dgm:pt>
-    <dgm:pt modelId="{AAC078B5-22C6-4465-AC60-50B89A62DAA4}" type="pres">
-      <dgm:prSet presAssocID="{82243891-7EAF-4E58-B342-FB3AEF7D96D8}" presName="Name37" presStyleLbl="parChTrans1D2" presStyleIdx="1" presStyleCnt="4"/>
-      <dgm:spPr/>
-    </dgm:pt>
-    <dgm:pt modelId="{264DBD67-1487-45E4-9503-3AC3CF96B885}" type="pres">
-      <dgm:prSet presAssocID="{4BD105F0-FCB2-4292-8534-EF3F82555BF1}" presName="hierRoot2" presStyleCnt="0">
-        <dgm:presLayoutVars>
-          <dgm:hierBranch val="init"/>
-        </dgm:presLayoutVars>
-      </dgm:prSet>
-      <dgm:spPr/>
-    </dgm:pt>
-    <dgm:pt modelId="{E1298A52-9E86-41D4-80A1-DB1EEB0262C2}" type="pres">
-      <dgm:prSet presAssocID="{4BD105F0-FCB2-4292-8534-EF3F82555BF1}" presName="rootComposite" presStyleCnt="0"/>
-      <dgm:spPr/>
-    </dgm:pt>
-    <dgm:pt modelId="{3780879A-AD2D-405D-977E-4451EF3CA5AD}" type="pres">
-      <dgm:prSet presAssocID="{4BD105F0-FCB2-4292-8534-EF3F82555BF1}" presName="rootText" presStyleLbl="node2" presStyleIdx="1" presStyleCnt="4">
-        <dgm:presLayoutVars>
-          <dgm:chPref val="3"/>
-        </dgm:presLayoutVars>
-      </dgm:prSet>
+    <dgm:pt modelId="{0CDB574B-8A16-4575-B86E-72EE9B15201E}" type="pres">
+      <dgm:prSet presAssocID="{C9F271EB-AA97-406F-A22E-048A336DC94A}" presName="rootConnector" presStyleLbl="node2" presStyleIdx="0" presStyleCnt="4"/>
       <dgm:spPr/>
       <dgm:t>
         <a:bodyPr/>
@@ -2010,36 +1834,12 @@
         </a:p>
       </dgm:t>
     </dgm:pt>
-    <dgm:pt modelId="{432E8FE3-B9B9-442A-A4A0-5A0F509E161A}" type="pres">
-      <dgm:prSet presAssocID="{4BD105F0-FCB2-4292-8534-EF3F82555BF1}" presName="rootConnector" presStyleLbl="node2" presStyleIdx="1" presStyleCnt="4"/>
-      <dgm:spPr/>
-    </dgm:pt>
-    <dgm:pt modelId="{7AA51B0B-E4AA-4DAF-A8F9-EF5C51938859}" type="pres">
-      <dgm:prSet presAssocID="{4BD105F0-FCB2-4292-8534-EF3F82555BF1}" presName="hierChild4" presStyleCnt="0"/>
-      <dgm:spPr/>
-    </dgm:pt>
-    <dgm:pt modelId="{6E390A44-09EF-4120-ABD1-1835798D84D0}" type="pres">
-      <dgm:prSet presAssocID="{763868FB-01C7-4C07-982A-E0002DD2F249}" presName="Name37" presStyleLbl="parChTrans1D3" presStyleIdx="2" presStyleCnt="6"/>
-      <dgm:spPr/>
-    </dgm:pt>
-    <dgm:pt modelId="{92C9C8A9-0C54-4F38-BB30-58DA146F7ADC}" type="pres">
-      <dgm:prSet presAssocID="{F8118993-C3C6-4246-A6BF-F9F2EC3DC9CB}" presName="hierRoot2" presStyleCnt="0">
-        <dgm:presLayoutVars>
-          <dgm:hierBranch val="init"/>
-        </dgm:presLayoutVars>
-      </dgm:prSet>
-      <dgm:spPr/>
-    </dgm:pt>
-    <dgm:pt modelId="{E75FAA1B-BC12-40E0-A960-5C1DC7A46243}" type="pres">
-      <dgm:prSet presAssocID="{F8118993-C3C6-4246-A6BF-F9F2EC3DC9CB}" presName="rootComposite" presStyleCnt="0"/>
-      <dgm:spPr/>
-    </dgm:pt>
-    <dgm:pt modelId="{23D4122E-B967-488C-8CB8-9B0B4654BF0E}" type="pres">
-      <dgm:prSet presAssocID="{F8118993-C3C6-4246-A6BF-F9F2EC3DC9CB}" presName="rootText" presStyleLbl="node3" presStyleIdx="2" presStyleCnt="6">
-        <dgm:presLayoutVars>
-          <dgm:chPref val="3"/>
-        </dgm:presLayoutVars>
-      </dgm:prSet>
+    <dgm:pt modelId="{F42E551D-2C1C-4B45-8B66-81CA30C78788}" type="pres">
+      <dgm:prSet presAssocID="{C9F271EB-AA97-406F-A22E-048A336DC94A}" presName="hierChild4" presStyleCnt="0"/>
+      <dgm:spPr/>
+    </dgm:pt>
+    <dgm:pt modelId="{52AB23E0-53A6-4AC3-B89A-D72BC394F116}" type="pres">
+      <dgm:prSet presAssocID="{C6CC40CD-5626-4A19-9936-F67709EE7AF0}" presName="Name37" presStyleLbl="parChTrans1D3" presStyleIdx="0" presStyleCnt="6"/>
       <dgm:spPr/>
       <dgm:t>
         <a:bodyPr/>
@@ -2049,32 +1849,20 @@
         </a:p>
       </dgm:t>
     </dgm:pt>
-    <dgm:pt modelId="{A2BECFDC-6DED-4CEA-B9D1-694651AD4E09}" type="pres">
-      <dgm:prSet presAssocID="{F8118993-C3C6-4246-A6BF-F9F2EC3DC9CB}" presName="rootConnector" presStyleLbl="node3" presStyleIdx="2" presStyleCnt="6"/>
-      <dgm:spPr/>
-    </dgm:pt>
-    <dgm:pt modelId="{26CAB1AF-5CF2-45A2-A2E8-B5C83C206CAA}" type="pres">
-      <dgm:prSet presAssocID="{F8118993-C3C6-4246-A6BF-F9F2EC3DC9CB}" presName="hierChild4" presStyleCnt="0"/>
-      <dgm:spPr/>
-    </dgm:pt>
-    <dgm:pt modelId="{3D07C967-7F5A-4259-8C92-44D4DA2F7550}" type="pres">
-      <dgm:prSet presAssocID="{C1DBF8BC-E021-419E-A78A-05014B36B3B1}" presName="Name37" presStyleLbl="parChTrans1D4" presStyleIdx="2" presStyleCnt="8"/>
-      <dgm:spPr/>
-    </dgm:pt>
-    <dgm:pt modelId="{74ED9AB8-F597-4293-B304-6F8BFECCCD81}" type="pres">
-      <dgm:prSet presAssocID="{2AB59A33-B6A6-40FF-98F7-711698F4D26B}" presName="hierRoot2" presStyleCnt="0">
+    <dgm:pt modelId="{0665CF0F-5F73-4C12-B8AF-EC4C4F5C66D0}" type="pres">
+      <dgm:prSet presAssocID="{B23CD900-37E2-45DE-B384-F9885D55838B}" presName="hierRoot2" presStyleCnt="0">
         <dgm:presLayoutVars>
           <dgm:hierBranch val="init"/>
         </dgm:presLayoutVars>
       </dgm:prSet>
       <dgm:spPr/>
     </dgm:pt>
-    <dgm:pt modelId="{C4232CA5-29DB-4AE3-9645-7E73EE41D69D}" type="pres">
-      <dgm:prSet presAssocID="{2AB59A33-B6A6-40FF-98F7-711698F4D26B}" presName="rootComposite" presStyleCnt="0"/>
-      <dgm:spPr/>
-    </dgm:pt>
-    <dgm:pt modelId="{64076540-8FAD-4187-A304-8898DDD0C9A8}" type="pres">
-      <dgm:prSet presAssocID="{2AB59A33-B6A6-40FF-98F7-711698F4D26B}" presName="rootText" presStyleLbl="node4" presStyleIdx="2" presStyleCnt="8">
+    <dgm:pt modelId="{DAD4F479-B05D-48F3-8BD1-2471FD3FDD1A}" type="pres">
+      <dgm:prSet presAssocID="{B23CD900-37E2-45DE-B384-F9885D55838B}" presName="rootComposite" presStyleCnt="0"/>
+      <dgm:spPr/>
+    </dgm:pt>
+    <dgm:pt modelId="{F6A2B30B-A958-479B-AD92-8D9166487761}" type="pres">
+      <dgm:prSet presAssocID="{B23CD900-37E2-45DE-B384-F9885D55838B}" presName="rootText" presStyleLbl="node3" presStyleIdx="0" presStyleCnt="6">
         <dgm:presLayoutVars>
           <dgm:chPref val="3"/>
         </dgm:presLayoutVars>
@@ -2088,40 +1876,8 @@
         </a:p>
       </dgm:t>
     </dgm:pt>
-    <dgm:pt modelId="{DE7689F0-0909-4DF0-993D-DF1D19A454E0}" type="pres">
-      <dgm:prSet presAssocID="{2AB59A33-B6A6-40FF-98F7-711698F4D26B}" presName="rootConnector" presStyleLbl="node4" presStyleIdx="2" presStyleCnt="8"/>
-      <dgm:spPr/>
-    </dgm:pt>
-    <dgm:pt modelId="{22E189B4-CB18-419D-A161-BE6773E40744}" type="pres">
-      <dgm:prSet presAssocID="{2AB59A33-B6A6-40FF-98F7-711698F4D26B}" presName="hierChild4" presStyleCnt="0"/>
-      <dgm:spPr/>
-    </dgm:pt>
-    <dgm:pt modelId="{D6E75DDE-6CF0-4677-90D2-02005418D489}" type="pres">
-      <dgm:prSet presAssocID="{2AB59A33-B6A6-40FF-98F7-711698F4D26B}" presName="hierChild5" presStyleCnt="0"/>
-      <dgm:spPr/>
-    </dgm:pt>
-    <dgm:pt modelId="{2D94B2C8-24C9-4949-954A-EDC01FC95EB8}" type="pres">
-      <dgm:prSet presAssocID="{A3D548BD-E471-4C3A-9014-C70E7E2B5BFD}" presName="Name37" presStyleLbl="parChTrans1D4" presStyleIdx="3" presStyleCnt="8"/>
-      <dgm:spPr/>
-    </dgm:pt>
-    <dgm:pt modelId="{8F8A5BC8-613B-4430-BBBF-353AEE82EF85}" type="pres">
-      <dgm:prSet presAssocID="{CC818131-8C0B-4D2C-AEA4-5A1BD3A6EFF3}" presName="hierRoot2" presStyleCnt="0">
-        <dgm:presLayoutVars>
-          <dgm:hierBranch val="init"/>
-        </dgm:presLayoutVars>
-      </dgm:prSet>
-      <dgm:spPr/>
-    </dgm:pt>
-    <dgm:pt modelId="{51AD7B84-6AAA-4835-B55D-4AAE4C9EE4E4}" type="pres">
-      <dgm:prSet presAssocID="{CC818131-8C0B-4D2C-AEA4-5A1BD3A6EFF3}" presName="rootComposite" presStyleCnt="0"/>
-      <dgm:spPr/>
-    </dgm:pt>
-    <dgm:pt modelId="{3E8697EF-F0C0-442C-AC8F-AF21953408C4}" type="pres">
-      <dgm:prSet presAssocID="{CC818131-8C0B-4D2C-AEA4-5A1BD3A6EFF3}" presName="rootText" presStyleLbl="node4" presStyleIdx="3" presStyleCnt="8">
-        <dgm:presLayoutVars>
-          <dgm:chPref val="3"/>
-        </dgm:presLayoutVars>
-      </dgm:prSet>
+    <dgm:pt modelId="{82AF4305-DDE7-4632-85B6-1B4672473DDD}" type="pres">
+      <dgm:prSet presAssocID="{B23CD900-37E2-45DE-B384-F9885D55838B}" presName="rootConnector" presStyleLbl="node3" presStyleIdx="0" presStyleCnt="6"/>
       <dgm:spPr/>
       <dgm:t>
         <a:bodyPr/>
@@ -2131,48 +1887,12 @@
         </a:p>
       </dgm:t>
     </dgm:pt>
-    <dgm:pt modelId="{D62139CB-9D8F-4560-A01D-A225FB31D9FF}" type="pres">
-      <dgm:prSet presAssocID="{CC818131-8C0B-4D2C-AEA4-5A1BD3A6EFF3}" presName="rootConnector" presStyleLbl="node4" presStyleIdx="3" presStyleCnt="8"/>
-      <dgm:spPr/>
-    </dgm:pt>
-    <dgm:pt modelId="{3D753F84-6591-4CD9-8A0B-642442C7F9CE}" type="pres">
-      <dgm:prSet presAssocID="{CC818131-8C0B-4D2C-AEA4-5A1BD3A6EFF3}" presName="hierChild4" presStyleCnt="0"/>
-      <dgm:spPr/>
-    </dgm:pt>
-    <dgm:pt modelId="{87CBF9BA-2F77-4930-B27D-FFBF9FD3D260}" type="pres">
-      <dgm:prSet presAssocID="{CC818131-8C0B-4D2C-AEA4-5A1BD3A6EFF3}" presName="hierChild5" presStyleCnt="0"/>
-      <dgm:spPr/>
-    </dgm:pt>
-    <dgm:pt modelId="{74F43271-9FF0-41D3-A6C1-913DDA941CB0}" type="pres">
-      <dgm:prSet presAssocID="{F8118993-C3C6-4246-A6BF-F9F2EC3DC9CB}" presName="hierChild5" presStyleCnt="0"/>
-      <dgm:spPr/>
-    </dgm:pt>
-    <dgm:pt modelId="{997037F1-DE29-4650-BBB0-BD9F8517060F}" type="pres">
-      <dgm:prSet presAssocID="{4BD105F0-FCB2-4292-8534-EF3F82555BF1}" presName="hierChild5" presStyleCnt="0"/>
-      <dgm:spPr/>
-    </dgm:pt>
-    <dgm:pt modelId="{75994A22-3790-4219-8C34-EFB1A172683C}" type="pres">
-      <dgm:prSet presAssocID="{E2FCDC95-A76F-447E-B7A8-96053D2336AC}" presName="Name37" presStyleLbl="parChTrans1D2" presStyleIdx="2" presStyleCnt="4"/>
-      <dgm:spPr/>
-    </dgm:pt>
-    <dgm:pt modelId="{CFCF3BD3-3040-4D7D-ABFB-65020DF4F3A3}" type="pres">
-      <dgm:prSet presAssocID="{2A1734E5-F350-4043-A59D-090A5C851E96}" presName="hierRoot2" presStyleCnt="0">
-        <dgm:presLayoutVars>
-          <dgm:hierBranch val="init"/>
-        </dgm:presLayoutVars>
-      </dgm:prSet>
-      <dgm:spPr/>
-    </dgm:pt>
-    <dgm:pt modelId="{77FCE11E-A552-47B9-8E24-6CBEA989FFB1}" type="pres">
-      <dgm:prSet presAssocID="{2A1734E5-F350-4043-A59D-090A5C851E96}" presName="rootComposite" presStyleCnt="0"/>
-      <dgm:spPr/>
-    </dgm:pt>
-    <dgm:pt modelId="{632D20A3-D474-4945-BEC3-702EAB53AF00}" type="pres">
-      <dgm:prSet presAssocID="{2A1734E5-F350-4043-A59D-090A5C851E96}" presName="rootText" presStyleLbl="node2" presStyleIdx="2" presStyleCnt="4">
-        <dgm:presLayoutVars>
-          <dgm:chPref val="3"/>
-        </dgm:presLayoutVars>
-      </dgm:prSet>
+    <dgm:pt modelId="{FFD4A4B2-AEC0-48EB-BFFB-34B6FD14A514}" type="pres">
+      <dgm:prSet presAssocID="{B23CD900-37E2-45DE-B384-F9885D55838B}" presName="hierChild4" presStyleCnt="0"/>
+      <dgm:spPr/>
+    </dgm:pt>
+    <dgm:pt modelId="{21695C6D-5845-4B94-8EDE-C845DA7BA21E}" type="pres">
+      <dgm:prSet presAssocID="{3C5DF98A-9E49-4EBC-AA28-3E96D9B53B39}" presName="Name37" presStyleLbl="parChTrans1D4" presStyleIdx="0" presStyleCnt="8"/>
       <dgm:spPr/>
       <dgm:t>
         <a:bodyPr/>
@@ -2182,32 +1902,20 @@
         </a:p>
       </dgm:t>
     </dgm:pt>
-    <dgm:pt modelId="{E65AAA3D-6EDF-4733-A476-6E661CF70E36}" type="pres">
-      <dgm:prSet presAssocID="{2A1734E5-F350-4043-A59D-090A5C851E96}" presName="rootConnector" presStyleLbl="node2" presStyleIdx="2" presStyleCnt="4"/>
-      <dgm:spPr/>
-    </dgm:pt>
-    <dgm:pt modelId="{8A76F8F6-1527-4544-B3EF-8AFFC4EE7FE0}" type="pres">
-      <dgm:prSet presAssocID="{2A1734E5-F350-4043-A59D-090A5C851E96}" presName="hierChild4" presStyleCnt="0"/>
-      <dgm:spPr/>
-    </dgm:pt>
-    <dgm:pt modelId="{6B1C0F91-7709-4920-8BCD-A2344D4FC3C1}" type="pres">
-      <dgm:prSet presAssocID="{3196F628-F850-402C-8DFF-32FDBF641FAF}" presName="Name37" presStyleLbl="parChTrans1D3" presStyleIdx="3" presStyleCnt="6"/>
-      <dgm:spPr/>
-    </dgm:pt>
-    <dgm:pt modelId="{6738A195-0866-4AC1-B354-5EAEFDDF675B}" type="pres">
-      <dgm:prSet presAssocID="{26CDFC28-47AA-4502-887A-33E7C0CE0838}" presName="hierRoot2" presStyleCnt="0">
+    <dgm:pt modelId="{83161E41-2EF8-4DF4-B687-A796B22BBC00}" type="pres">
+      <dgm:prSet presAssocID="{A9576EC0-F780-411F-A988-792BB4B5827F}" presName="hierRoot2" presStyleCnt="0">
         <dgm:presLayoutVars>
           <dgm:hierBranch val="init"/>
         </dgm:presLayoutVars>
       </dgm:prSet>
       <dgm:spPr/>
     </dgm:pt>
-    <dgm:pt modelId="{B36072B2-A7BB-4406-A573-ED3AB8B793B8}" type="pres">
-      <dgm:prSet presAssocID="{26CDFC28-47AA-4502-887A-33E7C0CE0838}" presName="rootComposite" presStyleCnt="0"/>
-      <dgm:spPr/>
-    </dgm:pt>
-    <dgm:pt modelId="{B9EF6254-674C-4CF7-8107-B9DBCC5CC06C}" type="pres">
-      <dgm:prSet presAssocID="{26CDFC28-47AA-4502-887A-33E7C0CE0838}" presName="rootText" presStyleLbl="node3" presStyleIdx="3" presStyleCnt="6">
+    <dgm:pt modelId="{34BF0F66-79EF-487E-A751-373FE74E565A}" type="pres">
+      <dgm:prSet presAssocID="{A9576EC0-F780-411F-A988-792BB4B5827F}" presName="rootComposite" presStyleCnt="0"/>
+      <dgm:spPr/>
+    </dgm:pt>
+    <dgm:pt modelId="{B4236978-BB7B-465F-A15B-A4753285650F}" type="pres">
+      <dgm:prSet presAssocID="{A9576EC0-F780-411F-A988-792BB4B5827F}" presName="rootText" presStyleLbl="node4" presStyleIdx="0" presStyleCnt="8">
         <dgm:presLayoutVars>
           <dgm:chPref val="3"/>
         </dgm:presLayoutVars>
@@ -2221,36 +1929,8 @@
         </a:p>
       </dgm:t>
     </dgm:pt>
-    <dgm:pt modelId="{4780D492-11D4-4975-B35A-476D05181A39}" type="pres">
-      <dgm:prSet presAssocID="{26CDFC28-47AA-4502-887A-33E7C0CE0838}" presName="rootConnector" presStyleLbl="node3" presStyleIdx="3" presStyleCnt="6"/>
-      <dgm:spPr/>
-    </dgm:pt>
-    <dgm:pt modelId="{6864C1DF-EEA5-478E-8AD6-45153E9C27BC}" type="pres">
-      <dgm:prSet presAssocID="{26CDFC28-47AA-4502-887A-33E7C0CE0838}" presName="hierChild4" presStyleCnt="0"/>
-      <dgm:spPr/>
-    </dgm:pt>
-    <dgm:pt modelId="{5871E8CC-FA46-4584-AC5E-0BFF5BB7E6D6}" type="pres">
-      <dgm:prSet presAssocID="{5ED6D770-BF3B-4684-98EB-5ABB516FF23D}" presName="Name37" presStyleLbl="parChTrans1D4" presStyleIdx="4" presStyleCnt="8"/>
-      <dgm:spPr/>
-    </dgm:pt>
-    <dgm:pt modelId="{B88D22EA-D86B-473C-BA00-FF5A3875D387}" type="pres">
-      <dgm:prSet presAssocID="{F0588C2A-6766-47BF-AE7C-52B851FABC21}" presName="hierRoot2" presStyleCnt="0">
-        <dgm:presLayoutVars>
-          <dgm:hierBranch val="init"/>
-        </dgm:presLayoutVars>
-      </dgm:prSet>
-      <dgm:spPr/>
-    </dgm:pt>
-    <dgm:pt modelId="{51F73BD8-C4DF-47B6-A353-911D5752175F}" type="pres">
-      <dgm:prSet presAssocID="{F0588C2A-6766-47BF-AE7C-52B851FABC21}" presName="rootComposite" presStyleCnt="0"/>
-      <dgm:spPr/>
-    </dgm:pt>
-    <dgm:pt modelId="{4C0517EB-FD0E-41DA-B0F6-7F0D2D018DD1}" type="pres">
-      <dgm:prSet presAssocID="{F0588C2A-6766-47BF-AE7C-52B851FABC21}" presName="rootText" presStyleLbl="node4" presStyleIdx="4" presStyleCnt="8">
-        <dgm:presLayoutVars>
-          <dgm:chPref val="3"/>
-        </dgm:presLayoutVars>
-      </dgm:prSet>
+    <dgm:pt modelId="{3C3CC326-C1BB-4802-9C80-3024F7E2EFEC}" type="pres">
+      <dgm:prSet presAssocID="{A9576EC0-F780-411F-A988-792BB4B5827F}" presName="rootConnector" presStyleLbl="node4" presStyleIdx="0" presStyleCnt="8"/>
       <dgm:spPr/>
       <dgm:t>
         <a:bodyPr/>
@@ -2260,40 +1940,20 @@
         </a:p>
       </dgm:t>
     </dgm:pt>
-    <dgm:pt modelId="{09C02F37-0DFF-472D-BC6B-B6584867F159}" type="pres">
-      <dgm:prSet presAssocID="{F0588C2A-6766-47BF-AE7C-52B851FABC21}" presName="rootConnector" presStyleLbl="node4" presStyleIdx="4" presStyleCnt="8"/>
-      <dgm:spPr/>
-    </dgm:pt>
-    <dgm:pt modelId="{B0F50642-159A-42FB-AF91-8E6A106D0AF1}" type="pres">
-      <dgm:prSet presAssocID="{F0588C2A-6766-47BF-AE7C-52B851FABC21}" presName="hierChild4" presStyleCnt="0"/>
-      <dgm:spPr/>
-    </dgm:pt>
-    <dgm:pt modelId="{ADC95EE5-5B5C-4556-916A-FD35F1A7520B}" type="pres">
-      <dgm:prSet presAssocID="{F0588C2A-6766-47BF-AE7C-52B851FABC21}" presName="hierChild5" presStyleCnt="0"/>
-      <dgm:spPr/>
-    </dgm:pt>
-    <dgm:pt modelId="{27D617F6-CD92-4160-85E9-3D135DEE9C6C}" type="pres">
-      <dgm:prSet presAssocID="{810F6CE3-7B9A-4BC5-B642-3E284064AEB8}" presName="Name37" presStyleLbl="parChTrans1D4" presStyleIdx="5" presStyleCnt="8"/>
-      <dgm:spPr/>
-    </dgm:pt>
-    <dgm:pt modelId="{180780F7-BDB0-47DE-A56C-6CEB326C8C76}" type="pres">
-      <dgm:prSet presAssocID="{8F21D5B7-1E81-4E68-9A3B-41478D9E578F}" presName="hierRoot2" presStyleCnt="0">
-        <dgm:presLayoutVars>
-          <dgm:hierBranch val="init"/>
-        </dgm:presLayoutVars>
-      </dgm:prSet>
-      <dgm:spPr/>
-    </dgm:pt>
-    <dgm:pt modelId="{A2BE8849-F0C8-4425-99B5-FDB6C514D9B2}" type="pres">
-      <dgm:prSet presAssocID="{8F21D5B7-1E81-4E68-9A3B-41478D9E578F}" presName="rootComposite" presStyleCnt="0"/>
-      <dgm:spPr/>
-    </dgm:pt>
-    <dgm:pt modelId="{9961A4E0-4305-4F81-8160-655C9A27D034}" type="pres">
-      <dgm:prSet presAssocID="{8F21D5B7-1E81-4E68-9A3B-41478D9E578F}" presName="rootText" presStyleLbl="node4" presStyleIdx="5" presStyleCnt="8">
-        <dgm:presLayoutVars>
-          <dgm:chPref val="3"/>
-        </dgm:presLayoutVars>
-      </dgm:prSet>
+    <dgm:pt modelId="{73072FC8-772C-450F-8876-176E24E10D0E}" type="pres">
+      <dgm:prSet presAssocID="{A9576EC0-F780-411F-A988-792BB4B5827F}" presName="hierChild4" presStyleCnt="0"/>
+      <dgm:spPr/>
+    </dgm:pt>
+    <dgm:pt modelId="{F14183EB-D0F8-400A-97FC-69B00B9DFE60}" type="pres">
+      <dgm:prSet presAssocID="{A9576EC0-F780-411F-A988-792BB4B5827F}" presName="hierChild5" presStyleCnt="0"/>
+      <dgm:spPr/>
+    </dgm:pt>
+    <dgm:pt modelId="{DE7B171F-28D8-4ECB-80FF-440ED2CB1FC7}" type="pres">
+      <dgm:prSet presAssocID="{B23CD900-37E2-45DE-B384-F9885D55838B}" presName="hierChild5" presStyleCnt="0"/>
+      <dgm:spPr/>
+    </dgm:pt>
+    <dgm:pt modelId="{8D8E53BF-D23C-4E66-A64D-69E3B5A64376}" type="pres">
+      <dgm:prSet presAssocID="{9DFE08AD-6D40-40B9-8C6C-0D9B748E71FD}" presName="Name37" presStyleLbl="parChTrans1D3" presStyleIdx="1" presStyleCnt="6"/>
       <dgm:spPr/>
       <dgm:t>
         <a:bodyPr/>
@@ -2303,44 +1963,20 @@
         </a:p>
       </dgm:t>
     </dgm:pt>
-    <dgm:pt modelId="{14A65CCA-D715-46D8-B448-593158ED3247}" type="pres">
-      <dgm:prSet presAssocID="{8F21D5B7-1E81-4E68-9A3B-41478D9E578F}" presName="rootConnector" presStyleLbl="node4" presStyleIdx="5" presStyleCnt="8"/>
-      <dgm:spPr/>
-    </dgm:pt>
-    <dgm:pt modelId="{C3B9C58F-D652-4603-83E2-D3442093A142}" type="pres">
-      <dgm:prSet presAssocID="{8F21D5B7-1E81-4E68-9A3B-41478D9E578F}" presName="hierChild4" presStyleCnt="0"/>
-      <dgm:spPr/>
-    </dgm:pt>
-    <dgm:pt modelId="{CDC66A6A-9587-4281-80F2-3DC6321E4053}" type="pres">
-      <dgm:prSet presAssocID="{8F21D5B7-1E81-4E68-9A3B-41478D9E578F}" presName="hierChild5" presStyleCnt="0"/>
-      <dgm:spPr/>
-    </dgm:pt>
-    <dgm:pt modelId="{CE8790CA-3AE5-4F40-B398-FE8B34DFE900}" type="pres">
-      <dgm:prSet presAssocID="{26CDFC28-47AA-4502-887A-33E7C0CE0838}" presName="hierChild5" presStyleCnt="0"/>
-      <dgm:spPr/>
-    </dgm:pt>
-    <dgm:pt modelId="{B23C490C-E8B9-4293-B5C2-287857590110}" type="pres">
-      <dgm:prSet presAssocID="{2A1734E5-F350-4043-A59D-090A5C851E96}" presName="hierChild5" presStyleCnt="0"/>
-      <dgm:spPr/>
-    </dgm:pt>
-    <dgm:pt modelId="{AA253CD6-C0DA-4C21-9B15-7211D0914EE5}" type="pres">
-      <dgm:prSet presAssocID="{D5432636-319A-4212-83DB-9D3BA6AA54A9}" presName="Name37" presStyleLbl="parChTrans1D2" presStyleIdx="3" presStyleCnt="4"/>
-      <dgm:spPr/>
-    </dgm:pt>
-    <dgm:pt modelId="{A3C45A23-D01A-423A-8C4D-5DB25799D757}" type="pres">
-      <dgm:prSet presAssocID="{51C939BC-1F71-4B4B-B76E-5AB02C7C5227}" presName="hierRoot2" presStyleCnt="0">
+    <dgm:pt modelId="{1350A144-4572-4E0C-B6F5-5BA07957B926}" type="pres">
+      <dgm:prSet presAssocID="{6CEB8C34-32A9-47E6-A405-A04B3711CFB7}" presName="hierRoot2" presStyleCnt="0">
         <dgm:presLayoutVars>
           <dgm:hierBranch val="init"/>
         </dgm:presLayoutVars>
       </dgm:prSet>
       <dgm:spPr/>
     </dgm:pt>
-    <dgm:pt modelId="{0089DFFE-40EA-4637-89C2-1B5FCB414797}" type="pres">
-      <dgm:prSet presAssocID="{51C939BC-1F71-4B4B-B76E-5AB02C7C5227}" presName="rootComposite" presStyleCnt="0"/>
-      <dgm:spPr/>
-    </dgm:pt>
-    <dgm:pt modelId="{617A3543-3392-450A-AE60-926A208DA196}" type="pres">
-      <dgm:prSet presAssocID="{51C939BC-1F71-4B4B-B76E-5AB02C7C5227}" presName="rootText" presStyleLbl="node2" presStyleIdx="3" presStyleCnt="4">
+    <dgm:pt modelId="{8AB9D0C9-ACD4-4DAC-B6D6-2BFDC93C6F00}" type="pres">
+      <dgm:prSet presAssocID="{6CEB8C34-32A9-47E6-A405-A04B3711CFB7}" presName="rootComposite" presStyleCnt="0"/>
+      <dgm:spPr/>
+    </dgm:pt>
+    <dgm:pt modelId="{087E6E65-2112-476B-A4AA-3A36C7628514}" type="pres">
+      <dgm:prSet presAssocID="{6CEB8C34-32A9-47E6-A405-A04B3711CFB7}" presName="rootText" presStyleLbl="node3" presStyleIdx="1" presStyleCnt="6">
         <dgm:presLayoutVars>
           <dgm:chPref val="3"/>
         </dgm:presLayoutVars>
@@ -2354,36 +1990,8 @@
         </a:p>
       </dgm:t>
     </dgm:pt>
-    <dgm:pt modelId="{26FA5C1D-10E1-45CD-A1D3-744EEEC37631}" type="pres">
-      <dgm:prSet presAssocID="{51C939BC-1F71-4B4B-B76E-5AB02C7C5227}" presName="rootConnector" presStyleLbl="node2" presStyleIdx="3" presStyleCnt="4"/>
-      <dgm:spPr/>
-    </dgm:pt>
-    <dgm:pt modelId="{12E1EE17-E0E6-4067-9846-C300F17CEFE3}" type="pres">
-      <dgm:prSet presAssocID="{51C939BC-1F71-4B4B-B76E-5AB02C7C5227}" presName="hierChild4" presStyleCnt="0"/>
-      <dgm:spPr/>
-    </dgm:pt>
-    <dgm:pt modelId="{DFAC233F-FFFB-4BE5-9FC7-55A2752E1DAD}" type="pres">
-      <dgm:prSet presAssocID="{9FCE91AE-B52F-45FA-A0C5-CA2E6E43F0FC}" presName="Name37" presStyleLbl="parChTrans1D3" presStyleIdx="4" presStyleCnt="6"/>
-      <dgm:spPr/>
-    </dgm:pt>
-    <dgm:pt modelId="{A102166C-182A-4677-B643-E12E34414D0C}" type="pres">
-      <dgm:prSet presAssocID="{998DBD50-443E-466A-9688-66A52BCFB283}" presName="hierRoot2" presStyleCnt="0">
-        <dgm:presLayoutVars>
-          <dgm:hierBranch val="init"/>
-        </dgm:presLayoutVars>
-      </dgm:prSet>
-      <dgm:spPr/>
-    </dgm:pt>
-    <dgm:pt modelId="{EE9D06FB-2DA4-413E-9A04-5CE829CC7043}" type="pres">
-      <dgm:prSet presAssocID="{998DBD50-443E-466A-9688-66A52BCFB283}" presName="rootComposite" presStyleCnt="0"/>
-      <dgm:spPr/>
-    </dgm:pt>
-    <dgm:pt modelId="{F5D3DEFB-AE85-4939-AB97-E915462269C0}" type="pres">
-      <dgm:prSet presAssocID="{998DBD50-443E-466A-9688-66A52BCFB283}" presName="rootText" presStyleLbl="node3" presStyleIdx="4" presStyleCnt="6">
-        <dgm:presLayoutVars>
-          <dgm:chPref val="3"/>
-        </dgm:presLayoutVars>
-      </dgm:prSet>
+    <dgm:pt modelId="{F5F98A29-63BF-4AC3-9BF3-D3C7E3FF700B}" type="pres">
+      <dgm:prSet presAssocID="{6CEB8C34-32A9-47E6-A405-A04B3711CFB7}" presName="rootConnector" presStyleLbl="node3" presStyleIdx="1" presStyleCnt="6"/>
       <dgm:spPr/>
       <dgm:t>
         <a:bodyPr/>
@@ -2393,36 +2001,12 @@
         </a:p>
       </dgm:t>
     </dgm:pt>
-    <dgm:pt modelId="{291B4844-977C-4B0C-9CCC-F7511A56BE71}" type="pres">
-      <dgm:prSet presAssocID="{998DBD50-443E-466A-9688-66A52BCFB283}" presName="rootConnector" presStyleLbl="node3" presStyleIdx="4" presStyleCnt="6"/>
-      <dgm:spPr/>
-    </dgm:pt>
-    <dgm:pt modelId="{2CEE4ED9-C2E8-4894-8D83-91B8801128DF}" type="pres">
-      <dgm:prSet presAssocID="{998DBD50-443E-466A-9688-66A52BCFB283}" presName="hierChild4" presStyleCnt="0"/>
-      <dgm:spPr/>
-    </dgm:pt>
-    <dgm:pt modelId="{044C785A-5A95-4E11-98D2-B0C3A8153197}" type="pres">
-      <dgm:prSet presAssocID="{5B6E6A94-B82E-45A0-B538-B423850E5FD3}" presName="Name37" presStyleLbl="parChTrans1D4" presStyleIdx="6" presStyleCnt="8"/>
-      <dgm:spPr/>
-    </dgm:pt>
-    <dgm:pt modelId="{A73085DE-C626-4126-88BA-B599BD7ABF8C}" type="pres">
-      <dgm:prSet presAssocID="{DD18F73E-5873-4440-AD2A-CB98A7E335BB}" presName="hierRoot2" presStyleCnt="0">
-        <dgm:presLayoutVars>
-          <dgm:hierBranch val="init"/>
-        </dgm:presLayoutVars>
-      </dgm:prSet>
-      <dgm:spPr/>
-    </dgm:pt>
-    <dgm:pt modelId="{2ECDA22B-7533-4C01-9326-44D6F8BD0DF9}" type="pres">
-      <dgm:prSet presAssocID="{DD18F73E-5873-4440-AD2A-CB98A7E335BB}" presName="rootComposite" presStyleCnt="0"/>
-      <dgm:spPr/>
-    </dgm:pt>
-    <dgm:pt modelId="{7527F677-2F8C-4154-ADCF-5A9B516211C5}" type="pres">
-      <dgm:prSet presAssocID="{DD18F73E-5873-4440-AD2A-CB98A7E335BB}" presName="rootText" presStyleLbl="node4" presStyleIdx="6" presStyleCnt="8">
-        <dgm:presLayoutVars>
-          <dgm:chPref val="3"/>
-        </dgm:presLayoutVars>
-      </dgm:prSet>
+    <dgm:pt modelId="{DE9A03BD-5558-45D3-9F86-59D9BE412CFD}" type="pres">
+      <dgm:prSet presAssocID="{6CEB8C34-32A9-47E6-A405-A04B3711CFB7}" presName="hierChild4" presStyleCnt="0"/>
+      <dgm:spPr/>
+    </dgm:pt>
+    <dgm:pt modelId="{E8CF98EA-1E11-4C8B-B3DC-A8B8C9716700}" type="pres">
+      <dgm:prSet presAssocID="{B3E11DF4-0A70-40F4-A9F3-378E2202AE1D}" presName="Name37" presStyleLbl="parChTrans1D4" presStyleIdx="1" presStyleCnt="8"/>
       <dgm:spPr/>
       <dgm:t>
         <a:bodyPr/>
@@ -2432,40 +2016,20 @@
         </a:p>
       </dgm:t>
     </dgm:pt>
-    <dgm:pt modelId="{24D69D00-71EB-421A-A1CD-E1399AFDD654}" type="pres">
-      <dgm:prSet presAssocID="{DD18F73E-5873-4440-AD2A-CB98A7E335BB}" presName="rootConnector" presStyleLbl="node4" presStyleIdx="6" presStyleCnt="8"/>
-      <dgm:spPr/>
-    </dgm:pt>
-    <dgm:pt modelId="{EF2AA458-53CB-431F-ADA6-2CE94CA3A3FA}" type="pres">
-      <dgm:prSet presAssocID="{DD18F73E-5873-4440-AD2A-CB98A7E335BB}" presName="hierChild4" presStyleCnt="0"/>
-      <dgm:spPr/>
-    </dgm:pt>
-    <dgm:pt modelId="{DBE2C0CD-57E4-4301-AFCC-142E72F17D48}" type="pres">
-      <dgm:prSet presAssocID="{DD18F73E-5873-4440-AD2A-CB98A7E335BB}" presName="hierChild5" presStyleCnt="0"/>
-      <dgm:spPr/>
-    </dgm:pt>
-    <dgm:pt modelId="{4E46776B-A9BF-40BA-B23E-D60E8258377D}" type="pres">
-      <dgm:prSet presAssocID="{998DBD50-443E-466A-9688-66A52BCFB283}" presName="hierChild5" presStyleCnt="0"/>
-      <dgm:spPr/>
-    </dgm:pt>
-    <dgm:pt modelId="{06BFC016-E41C-49B3-B96E-72E532519536}" type="pres">
-      <dgm:prSet presAssocID="{64BCB35C-1AA8-4805-AE44-941DC0666BE4}" presName="Name37" presStyleLbl="parChTrans1D3" presStyleIdx="5" presStyleCnt="6"/>
-      <dgm:spPr/>
-    </dgm:pt>
-    <dgm:pt modelId="{F0316925-ADF4-407C-AC18-E9AF2568B7AC}" type="pres">
-      <dgm:prSet presAssocID="{AB5982FD-D354-4AAA-B978-F9826D0D05FB}" presName="hierRoot2" presStyleCnt="0">
+    <dgm:pt modelId="{E5E0420A-856C-4A91-ACF2-F71403B73E44}" type="pres">
+      <dgm:prSet presAssocID="{5AF5E628-F524-43D4-9C5A-5A8189560301}" presName="hierRoot2" presStyleCnt="0">
         <dgm:presLayoutVars>
           <dgm:hierBranch val="init"/>
         </dgm:presLayoutVars>
       </dgm:prSet>
       <dgm:spPr/>
     </dgm:pt>
-    <dgm:pt modelId="{11089E92-0810-486E-9CCF-0222441D031D}" type="pres">
-      <dgm:prSet presAssocID="{AB5982FD-D354-4AAA-B978-F9826D0D05FB}" presName="rootComposite" presStyleCnt="0"/>
-      <dgm:spPr/>
-    </dgm:pt>
-    <dgm:pt modelId="{A48D18B2-265E-4299-AC55-85A70F37F6FA}" type="pres">
-      <dgm:prSet presAssocID="{AB5982FD-D354-4AAA-B978-F9826D0D05FB}" presName="rootText" presStyleLbl="node3" presStyleIdx="5" presStyleCnt="6">
+    <dgm:pt modelId="{77600785-CC89-410E-82E1-FF4F496F5442}" type="pres">
+      <dgm:prSet presAssocID="{5AF5E628-F524-43D4-9C5A-5A8189560301}" presName="rootComposite" presStyleCnt="0"/>
+      <dgm:spPr/>
+    </dgm:pt>
+    <dgm:pt modelId="{710C924E-E30F-44DF-A6AA-7A0529BD66A0}" type="pres">
+      <dgm:prSet presAssocID="{5AF5E628-F524-43D4-9C5A-5A8189560301}" presName="rootText" presStyleLbl="node4" presStyleIdx="1" presStyleCnt="8">
         <dgm:presLayoutVars>
           <dgm:chPref val="3"/>
         </dgm:presLayoutVars>
@@ -2479,36 +2043,8 @@
         </a:p>
       </dgm:t>
     </dgm:pt>
-    <dgm:pt modelId="{9D123678-09FF-430E-9CD4-847B9B41C9E6}" type="pres">
-      <dgm:prSet presAssocID="{AB5982FD-D354-4AAA-B978-F9826D0D05FB}" presName="rootConnector" presStyleLbl="node3" presStyleIdx="5" presStyleCnt="6"/>
-      <dgm:spPr/>
-    </dgm:pt>
-    <dgm:pt modelId="{A421275B-1C99-476A-8C66-7769DB8789A0}" type="pres">
-      <dgm:prSet presAssocID="{AB5982FD-D354-4AAA-B978-F9826D0D05FB}" presName="hierChild4" presStyleCnt="0"/>
-      <dgm:spPr/>
-    </dgm:pt>
-    <dgm:pt modelId="{F6217F3C-65DD-408C-AC11-C96C35846B77}" type="pres">
-      <dgm:prSet presAssocID="{CBAC9813-60C7-4469-BF09-A874065B34A7}" presName="Name37" presStyleLbl="parChTrans1D4" presStyleIdx="7" presStyleCnt="8"/>
-      <dgm:spPr/>
-    </dgm:pt>
-    <dgm:pt modelId="{0ECFA94B-E46A-45CA-8C3A-10607FEAC768}" type="pres">
-      <dgm:prSet presAssocID="{CF665F69-5C99-4ABA-84BB-EE78294ED608}" presName="hierRoot2" presStyleCnt="0">
-        <dgm:presLayoutVars>
-          <dgm:hierBranch val="init"/>
-        </dgm:presLayoutVars>
-      </dgm:prSet>
-      <dgm:spPr/>
-    </dgm:pt>
-    <dgm:pt modelId="{0BB80446-A4A9-44E1-AB94-82E0068A5631}" type="pres">
-      <dgm:prSet presAssocID="{CF665F69-5C99-4ABA-84BB-EE78294ED608}" presName="rootComposite" presStyleCnt="0"/>
-      <dgm:spPr/>
-    </dgm:pt>
-    <dgm:pt modelId="{1F6BCCA0-2CCE-4CE0-BBC4-117FD2054979}" type="pres">
-      <dgm:prSet presAssocID="{CF665F69-5C99-4ABA-84BB-EE78294ED608}" presName="rootText" presStyleLbl="node4" presStyleIdx="7" presStyleCnt="8">
-        <dgm:presLayoutVars>
-          <dgm:chPref val="3"/>
-        </dgm:presLayoutVars>
-      </dgm:prSet>
+    <dgm:pt modelId="{C6B5F02F-BF16-4258-AC5A-D980E6777BDC}" type="pres">
+      <dgm:prSet presAssocID="{5AF5E628-F524-43D4-9C5A-5A8189560301}" presName="rootConnector" presStyleLbl="node4" presStyleIdx="1" presStyleCnt="8"/>
       <dgm:spPr/>
       <dgm:t>
         <a:bodyPr/>
@@ -2518,9 +2054,746 @@
         </a:p>
       </dgm:t>
     </dgm:pt>
+    <dgm:pt modelId="{F6F09632-4A16-4C17-A313-983E0E192977}" type="pres">
+      <dgm:prSet presAssocID="{5AF5E628-F524-43D4-9C5A-5A8189560301}" presName="hierChild4" presStyleCnt="0"/>
+      <dgm:spPr/>
+    </dgm:pt>
+    <dgm:pt modelId="{B12841A3-D0EB-492D-B1AD-568D69D3DEDE}" type="pres">
+      <dgm:prSet presAssocID="{5AF5E628-F524-43D4-9C5A-5A8189560301}" presName="hierChild5" presStyleCnt="0"/>
+      <dgm:spPr/>
+    </dgm:pt>
+    <dgm:pt modelId="{8C0BB0A1-822C-46F3-A202-C614663CDD7A}" type="pres">
+      <dgm:prSet presAssocID="{6CEB8C34-32A9-47E6-A405-A04B3711CFB7}" presName="hierChild5" presStyleCnt="0"/>
+      <dgm:spPr/>
+    </dgm:pt>
+    <dgm:pt modelId="{E8D79B63-11A9-4A8F-A4DE-C95D916175B2}" type="pres">
+      <dgm:prSet presAssocID="{C9F271EB-AA97-406F-A22E-048A336DC94A}" presName="hierChild5" presStyleCnt="0"/>
+      <dgm:spPr/>
+    </dgm:pt>
+    <dgm:pt modelId="{AAC078B5-22C6-4465-AC60-50B89A62DAA4}" type="pres">
+      <dgm:prSet presAssocID="{82243891-7EAF-4E58-B342-FB3AEF7D96D8}" presName="Name37" presStyleLbl="parChTrans1D2" presStyleIdx="1" presStyleCnt="4"/>
+      <dgm:spPr/>
+      <dgm:t>
+        <a:bodyPr/>
+        <a:lstStyle/>
+        <a:p>
+          <a:endParaRPr lang="en-US"/>
+        </a:p>
+      </dgm:t>
+    </dgm:pt>
+    <dgm:pt modelId="{264DBD67-1487-45E4-9503-3AC3CF96B885}" type="pres">
+      <dgm:prSet presAssocID="{4BD105F0-FCB2-4292-8534-EF3F82555BF1}" presName="hierRoot2" presStyleCnt="0">
+        <dgm:presLayoutVars>
+          <dgm:hierBranch val="init"/>
+        </dgm:presLayoutVars>
+      </dgm:prSet>
+      <dgm:spPr/>
+    </dgm:pt>
+    <dgm:pt modelId="{E1298A52-9E86-41D4-80A1-DB1EEB0262C2}" type="pres">
+      <dgm:prSet presAssocID="{4BD105F0-FCB2-4292-8534-EF3F82555BF1}" presName="rootComposite" presStyleCnt="0"/>
+      <dgm:spPr/>
+    </dgm:pt>
+    <dgm:pt modelId="{3780879A-AD2D-405D-977E-4451EF3CA5AD}" type="pres">
+      <dgm:prSet presAssocID="{4BD105F0-FCB2-4292-8534-EF3F82555BF1}" presName="rootText" presStyleLbl="node2" presStyleIdx="1" presStyleCnt="4">
+        <dgm:presLayoutVars>
+          <dgm:chPref val="3"/>
+        </dgm:presLayoutVars>
+      </dgm:prSet>
+      <dgm:spPr/>
+      <dgm:t>
+        <a:bodyPr/>
+        <a:lstStyle/>
+        <a:p>
+          <a:endParaRPr lang="en-US"/>
+        </a:p>
+      </dgm:t>
+    </dgm:pt>
+    <dgm:pt modelId="{432E8FE3-B9B9-442A-A4A0-5A0F509E161A}" type="pres">
+      <dgm:prSet presAssocID="{4BD105F0-FCB2-4292-8534-EF3F82555BF1}" presName="rootConnector" presStyleLbl="node2" presStyleIdx="1" presStyleCnt="4"/>
+      <dgm:spPr/>
+      <dgm:t>
+        <a:bodyPr/>
+        <a:lstStyle/>
+        <a:p>
+          <a:endParaRPr lang="en-US"/>
+        </a:p>
+      </dgm:t>
+    </dgm:pt>
+    <dgm:pt modelId="{7AA51B0B-E4AA-4DAF-A8F9-EF5C51938859}" type="pres">
+      <dgm:prSet presAssocID="{4BD105F0-FCB2-4292-8534-EF3F82555BF1}" presName="hierChild4" presStyleCnt="0"/>
+      <dgm:spPr/>
+    </dgm:pt>
+    <dgm:pt modelId="{6E390A44-09EF-4120-ABD1-1835798D84D0}" type="pres">
+      <dgm:prSet presAssocID="{763868FB-01C7-4C07-982A-E0002DD2F249}" presName="Name37" presStyleLbl="parChTrans1D3" presStyleIdx="2" presStyleCnt="6"/>
+      <dgm:spPr/>
+      <dgm:t>
+        <a:bodyPr/>
+        <a:lstStyle/>
+        <a:p>
+          <a:endParaRPr lang="en-US"/>
+        </a:p>
+      </dgm:t>
+    </dgm:pt>
+    <dgm:pt modelId="{92C9C8A9-0C54-4F38-BB30-58DA146F7ADC}" type="pres">
+      <dgm:prSet presAssocID="{F8118993-C3C6-4246-A6BF-F9F2EC3DC9CB}" presName="hierRoot2" presStyleCnt="0">
+        <dgm:presLayoutVars>
+          <dgm:hierBranch val="init"/>
+        </dgm:presLayoutVars>
+      </dgm:prSet>
+      <dgm:spPr/>
+    </dgm:pt>
+    <dgm:pt modelId="{E75FAA1B-BC12-40E0-A960-5C1DC7A46243}" type="pres">
+      <dgm:prSet presAssocID="{F8118993-C3C6-4246-A6BF-F9F2EC3DC9CB}" presName="rootComposite" presStyleCnt="0"/>
+      <dgm:spPr/>
+    </dgm:pt>
+    <dgm:pt modelId="{23D4122E-B967-488C-8CB8-9B0B4654BF0E}" type="pres">
+      <dgm:prSet presAssocID="{F8118993-C3C6-4246-A6BF-F9F2EC3DC9CB}" presName="rootText" presStyleLbl="node3" presStyleIdx="2" presStyleCnt="6">
+        <dgm:presLayoutVars>
+          <dgm:chPref val="3"/>
+        </dgm:presLayoutVars>
+      </dgm:prSet>
+      <dgm:spPr/>
+      <dgm:t>
+        <a:bodyPr/>
+        <a:lstStyle/>
+        <a:p>
+          <a:endParaRPr lang="en-US"/>
+        </a:p>
+      </dgm:t>
+    </dgm:pt>
+    <dgm:pt modelId="{A2BECFDC-6DED-4CEA-B9D1-694651AD4E09}" type="pres">
+      <dgm:prSet presAssocID="{F8118993-C3C6-4246-A6BF-F9F2EC3DC9CB}" presName="rootConnector" presStyleLbl="node3" presStyleIdx="2" presStyleCnt="6"/>
+      <dgm:spPr/>
+      <dgm:t>
+        <a:bodyPr/>
+        <a:lstStyle/>
+        <a:p>
+          <a:endParaRPr lang="en-US"/>
+        </a:p>
+      </dgm:t>
+    </dgm:pt>
+    <dgm:pt modelId="{26CAB1AF-5CF2-45A2-A2E8-B5C83C206CAA}" type="pres">
+      <dgm:prSet presAssocID="{F8118993-C3C6-4246-A6BF-F9F2EC3DC9CB}" presName="hierChild4" presStyleCnt="0"/>
+      <dgm:spPr/>
+    </dgm:pt>
+    <dgm:pt modelId="{3D07C967-7F5A-4259-8C92-44D4DA2F7550}" type="pres">
+      <dgm:prSet presAssocID="{C1DBF8BC-E021-419E-A78A-05014B36B3B1}" presName="Name37" presStyleLbl="parChTrans1D4" presStyleIdx="2" presStyleCnt="8"/>
+      <dgm:spPr/>
+      <dgm:t>
+        <a:bodyPr/>
+        <a:lstStyle/>
+        <a:p>
+          <a:endParaRPr lang="en-US"/>
+        </a:p>
+      </dgm:t>
+    </dgm:pt>
+    <dgm:pt modelId="{74ED9AB8-F597-4293-B304-6F8BFECCCD81}" type="pres">
+      <dgm:prSet presAssocID="{2AB59A33-B6A6-40FF-98F7-711698F4D26B}" presName="hierRoot2" presStyleCnt="0">
+        <dgm:presLayoutVars>
+          <dgm:hierBranch val="init"/>
+        </dgm:presLayoutVars>
+      </dgm:prSet>
+      <dgm:spPr/>
+    </dgm:pt>
+    <dgm:pt modelId="{C4232CA5-29DB-4AE3-9645-7E73EE41D69D}" type="pres">
+      <dgm:prSet presAssocID="{2AB59A33-B6A6-40FF-98F7-711698F4D26B}" presName="rootComposite" presStyleCnt="0"/>
+      <dgm:spPr/>
+    </dgm:pt>
+    <dgm:pt modelId="{64076540-8FAD-4187-A304-8898DDD0C9A8}" type="pres">
+      <dgm:prSet presAssocID="{2AB59A33-B6A6-40FF-98F7-711698F4D26B}" presName="rootText" presStyleLbl="node4" presStyleIdx="2" presStyleCnt="8">
+        <dgm:presLayoutVars>
+          <dgm:chPref val="3"/>
+        </dgm:presLayoutVars>
+      </dgm:prSet>
+      <dgm:spPr/>
+      <dgm:t>
+        <a:bodyPr/>
+        <a:lstStyle/>
+        <a:p>
+          <a:endParaRPr lang="en-US"/>
+        </a:p>
+      </dgm:t>
+    </dgm:pt>
+    <dgm:pt modelId="{DE7689F0-0909-4DF0-993D-DF1D19A454E0}" type="pres">
+      <dgm:prSet presAssocID="{2AB59A33-B6A6-40FF-98F7-711698F4D26B}" presName="rootConnector" presStyleLbl="node4" presStyleIdx="2" presStyleCnt="8"/>
+      <dgm:spPr/>
+      <dgm:t>
+        <a:bodyPr/>
+        <a:lstStyle/>
+        <a:p>
+          <a:endParaRPr lang="en-US"/>
+        </a:p>
+      </dgm:t>
+    </dgm:pt>
+    <dgm:pt modelId="{22E189B4-CB18-419D-A161-BE6773E40744}" type="pres">
+      <dgm:prSet presAssocID="{2AB59A33-B6A6-40FF-98F7-711698F4D26B}" presName="hierChild4" presStyleCnt="0"/>
+      <dgm:spPr/>
+    </dgm:pt>
+    <dgm:pt modelId="{D6E75DDE-6CF0-4677-90D2-02005418D489}" type="pres">
+      <dgm:prSet presAssocID="{2AB59A33-B6A6-40FF-98F7-711698F4D26B}" presName="hierChild5" presStyleCnt="0"/>
+      <dgm:spPr/>
+    </dgm:pt>
+    <dgm:pt modelId="{2D94B2C8-24C9-4949-954A-EDC01FC95EB8}" type="pres">
+      <dgm:prSet presAssocID="{A3D548BD-E471-4C3A-9014-C70E7E2B5BFD}" presName="Name37" presStyleLbl="parChTrans1D4" presStyleIdx="3" presStyleCnt="8"/>
+      <dgm:spPr/>
+      <dgm:t>
+        <a:bodyPr/>
+        <a:lstStyle/>
+        <a:p>
+          <a:endParaRPr lang="en-US"/>
+        </a:p>
+      </dgm:t>
+    </dgm:pt>
+    <dgm:pt modelId="{8F8A5BC8-613B-4430-BBBF-353AEE82EF85}" type="pres">
+      <dgm:prSet presAssocID="{CC818131-8C0B-4D2C-AEA4-5A1BD3A6EFF3}" presName="hierRoot2" presStyleCnt="0">
+        <dgm:presLayoutVars>
+          <dgm:hierBranch val="init"/>
+        </dgm:presLayoutVars>
+      </dgm:prSet>
+      <dgm:spPr/>
+    </dgm:pt>
+    <dgm:pt modelId="{51AD7B84-6AAA-4835-B55D-4AAE4C9EE4E4}" type="pres">
+      <dgm:prSet presAssocID="{CC818131-8C0B-4D2C-AEA4-5A1BD3A6EFF3}" presName="rootComposite" presStyleCnt="0"/>
+      <dgm:spPr/>
+    </dgm:pt>
+    <dgm:pt modelId="{3E8697EF-F0C0-442C-AC8F-AF21953408C4}" type="pres">
+      <dgm:prSet presAssocID="{CC818131-8C0B-4D2C-AEA4-5A1BD3A6EFF3}" presName="rootText" presStyleLbl="node4" presStyleIdx="3" presStyleCnt="8">
+        <dgm:presLayoutVars>
+          <dgm:chPref val="3"/>
+        </dgm:presLayoutVars>
+      </dgm:prSet>
+      <dgm:spPr/>
+      <dgm:t>
+        <a:bodyPr/>
+        <a:lstStyle/>
+        <a:p>
+          <a:endParaRPr lang="en-US"/>
+        </a:p>
+      </dgm:t>
+    </dgm:pt>
+    <dgm:pt modelId="{D62139CB-9D8F-4560-A01D-A225FB31D9FF}" type="pres">
+      <dgm:prSet presAssocID="{CC818131-8C0B-4D2C-AEA4-5A1BD3A6EFF3}" presName="rootConnector" presStyleLbl="node4" presStyleIdx="3" presStyleCnt="8"/>
+      <dgm:spPr/>
+      <dgm:t>
+        <a:bodyPr/>
+        <a:lstStyle/>
+        <a:p>
+          <a:endParaRPr lang="en-US"/>
+        </a:p>
+      </dgm:t>
+    </dgm:pt>
+    <dgm:pt modelId="{3D753F84-6591-4CD9-8A0B-642442C7F9CE}" type="pres">
+      <dgm:prSet presAssocID="{CC818131-8C0B-4D2C-AEA4-5A1BD3A6EFF3}" presName="hierChild4" presStyleCnt="0"/>
+      <dgm:spPr/>
+    </dgm:pt>
+    <dgm:pt modelId="{87CBF9BA-2F77-4930-B27D-FFBF9FD3D260}" type="pres">
+      <dgm:prSet presAssocID="{CC818131-8C0B-4D2C-AEA4-5A1BD3A6EFF3}" presName="hierChild5" presStyleCnt="0"/>
+      <dgm:spPr/>
+    </dgm:pt>
+    <dgm:pt modelId="{74F43271-9FF0-41D3-A6C1-913DDA941CB0}" type="pres">
+      <dgm:prSet presAssocID="{F8118993-C3C6-4246-A6BF-F9F2EC3DC9CB}" presName="hierChild5" presStyleCnt="0"/>
+      <dgm:spPr/>
+    </dgm:pt>
+    <dgm:pt modelId="{997037F1-DE29-4650-BBB0-BD9F8517060F}" type="pres">
+      <dgm:prSet presAssocID="{4BD105F0-FCB2-4292-8534-EF3F82555BF1}" presName="hierChild5" presStyleCnt="0"/>
+      <dgm:spPr/>
+    </dgm:pt>
+    <dgm:pt modelId="{75994A22-3790-4219-8C34-EFB1A172683C}" type="pres">
+      <dgm:prSet presAssocID="{E2FCDC95-A76F-447E-B7A8-96053D2336AC}" presName="Name37" presStyleLbl="parChTrans1D2" presStyleIdx="2" presStyleCnt="4"/>
+      <dgm:spPr/>
+      <dgm:t>
+        <a:bodyPr/>
+        <a:lstStyle/>
+        <a:p>
+          <a:endParaRPr lang="en-US"/>
+        </a:p>
+      </dgm:t>
+    </dgm:pt>
+    <dgm:pt modelId="{CFCF3BD3-3040-4D7D-ABFB-65020DF4F3A3}" type="pres">
+      <dgm:prSet presAssocID="{2A1734E5-F350-4043-A59D-090A5C851E96}" presName="hierRoot2" presStyleCnt="0">
+        <dgm:presLayoutVars>
+          <dgm:hierBranch val="init"/>
+        </dgm:presLayoutVars>
+      </dgm:prSet>
+      <dgm:spPr/>
+    </dgm:pt>
+    <dgm:pt modelId="{77FCE11E-A552-47B9-8E24-6CBEA989FFB1}" type="pres">
+      <dgm:prSet presAssocID="{2A1734E5-F350-4043-A59D-090A5C851E96}" presName="rootComposite" presStyleCnt="0"/>
+      <dgm:spPr/>
+    </dgm:pt>
+    <dgm:pt modelId="{632D20A3-D474-4945-BEC3-702EAB53AF00}" type="pres">
+      <dgm:prSet presAssocID="{2A1734E5-F350-4043-A59D-090A5C851E96}" presName="rootText" presStyleLbl="node2" presStyleIdx="2" presStyleCnt="4">
+        <dgm:presLayoutVars>
+          <dgm:chPref val="3"/>
+        </dgm:presLayoutVars>
+      </dgm:prSet>
+      <dgm:spPr/>
+      <dgm:t>
+        <a:bodyPr/>
+        <a:lstStyle/>
+        <a:p>
+          <a:endParaRPr lang="en-US"/>
+        </a:p>
+      </dgm:t>
+    </dgm:pt>
+    <dgm:pt modelId="{E65AAA3D-6EDF-4733-A476-6E661CF70E36}" type="pres">
+      <dgm:prSet presAssocID="{2A1734E5-F350-4043-A59D-090A5C851E96}" presName="rootConnector" presStyleLbl="node2" presStyleIdx="2" presStyleCnt="4"/>
+      <dgm:spPr/>
+      <dgm:t>
+        <a:bodyPr/>
+        <a:lstStyle/>
+        <a:p>
+          <a:endParaRPr lang="en-US"/>
+        </a:p>
+      </dgm:t>
+    </dgm:pt>
+    <dgm:pt modelId="{8A76F8F6-1527-4544-B3EF-8AFFC4EE7FE0}" type="pres">
+      <dgm:prSet presAssocID="{2A1734E5-F350-4043-A59D-090A5C851E96}" presName="hierChild4" presStyleCnt="0"/>
+      <dgm:spPr/>
+    </dgm:pt>
+    <dgm:pt modelId="{6B1C0F91-7709-4920-8BCD-A2344D4FC3C1}" type="pres">
+      <dgm:prSet presAssocID="{3196F628-F850-402C-8DFF-32FDBF641FAF}" presName="Name37" presStyleLbl="parChTrans1D3" presStyleIdx="3" presStyleCnt="6"/>
+      <dgm:spPr/>
+      <dgm:t>
+        <a:bodyPr/>
+        <a:lstStyle/>
+        <a:p>
+          <a:endParaRPr lang="en-US"/>
+        </a:p>
+      </dgm:t>
+    </dgm:pt>
+    <dgm:pt modelId="{6738A195-0866-4AC1-B354-5EAEFDDF675B}" type="pres">
+      <dgm:prSet presAssocID="{26CDFC28-47AA-4502-887A-33E7C0CE0838}" presName="hierRoot2" presStyleCnt="0">
+        <dgm:presLayoutVars>
+          <dgm:hierBranch val="init"/>
+        </dgm:presLayoutVars>
+      </dgm:prSet>
+      <dgm:spPr/>
+    </dgm:pt>
+    <dgm:pt modelId="{B36072B2-A7BB-4406-A573-ED3AB8B793B8}" type="pres">
+      <dgm:prSet presAssocID="{26CDFC28-47AA-4502-887A-33E7C0CE0838}" presName="rootComposite" presStyleCnt="0"/>
+      <dgm:spPr/>
+    </dgm:pt>
+    <dgm:pt modelId="{B9EF6254-674C-4CF7-8107-B9DBCC5CC06C}" type="pres">
+      <dgm:prSet presAssocID="{26CDFC28-47AA-4502-887A-33E7C0CE0838}" presName="rootText" presStyleLbl="node3" presStyleIdx="3" presStyleCnt="6">
+        <dgm:presLayoutVars>
+          <dgm:chPref val="3"/>
+        </dgm:presLayoutVars>
+      </dgm:prSet>
+      <dgm:spPr/>
+      <dgm:t>
+        <a:bodyPr/>
+        <a:lstStyle/>
+        <a:p>
+          <a:endParaRPr lang="en-US"/>
+        </a:p>
+      </dgm:t>
+    </dgm:pt>
+    <dgm:pt modelId="{4780D492-11D4-4975-B35A-476D05181A39}" type="pres">
+      <dgm:prSet presAssocID="{26CDFC28-47AA-4502-887A-33E7C0CE0838}" presName="rootConnector" presStyleLbl="node3" presStyleIdx="3" presStyleCnt="6"/>
+      <dgm:spPr/>
+      <dgm:t>
+        <a:bodyPr/>
+        <a:lstStyle/>
+        <a:p>
+          <a:endParaRPr lang="en-US"/>
+        </a:p>
+      </dgm:t>
+    </dgm:pt>
+    <dgm:pt modelId="{6864C1DF-EEA5-478E-8AD6-45153E9C27BC}" type="pres">
+      <dgm:prSet presAssocID="{26CDFC28-47AA-4502-887A-33E7C0CE0838}" presName="hierChild4" presStyleCnt="0"/>
+      <dgm:spPr/>
+    </dgm:pt>
+    <dgm:pt modelId="{5871E8CC-FA46-4584-AC5E-0BFF5BB7E6D6}" type="pres">
+      <dgm:prSet presAssocID="{5ED6D770-BF3B-4684-98EB-5ABB516FF23D}" presName="Name37" presStyleLbl="parChTrans1D4" presStyleIdx="4" presStyleCnt="8"/>
+      <dgm:spPr/>
+      <dgm:t>
+        <a:bodyPr/>
+        <a:lstStyle/>
+        <a:p>
+          <a:endParaRPr lang="en-US"/>
+        </a:p>
+      </dgm:t>
+    </dgm:pt>
+    <dgm:pt modelId="{B88D22EA-D86B-473C-BA00-FF5A3875D387}" type="pres">
+      <dgm:prSet presAssocID="{F0588C2A-6766-47BF-AE7C-52B851FABC21}" presName="hierRoot2" presStyleCnt="0">
+        <dgm:presLayoutVars>
+          <dgm:hierBranch val="init"/>
+        </dgm:presLayoutVars>
+      </dgm:prSet>
+      <dgm:spPr/>
+    </dgm:pt>
+    <dgm:pt modelId="{51F73BD8-C4DF-47B6-A353-911D5752175F}" type="pres">
+      <dgm:prSet presAssocID="{F0588C2A-6766-47BF-AE7C-52B851FABC21}" presName="rootComposite" presStyleCnt="0"/>
+      <dgm:spPr/>
+    </dgm:pt>
+    <dgm:pt modelId="{4C0517EB-FD0E-41DA-B0F6-7F0D2D018DD1}" type="pres">
+      <dgm:prSet presAssocID="{F0588C2A-6766-47BF-AE7C-52B851FABC21}" presName="rootText" presStyleLbl="node4" presStyleIdx="4" presStyleCnt="8">
+        <dgm:presLayoutVars>
+          <dgm:chPref val="3"/>
+        </dgm:presLayoutVars>
+      </dgm:prSet>
+      <dgm:spPr/>
+      <dgm:t>
+        <a:bodyPr/>
+        <a:lstStyle/>
+        <a:p>
+          <a:endParaRPr lang="en-US"/>
+        </a:p>
+      </dgm:t>
+    </dgm:pt>
+    <dgm:pt modelId="{09C02F37-0DFF-472D-BC6B-B6584867F159}" type="pres">
+      <dgm:prSet presAssocID="{F0588C2A-6766-47BF-AE7C-52B851FABC21}" presName="rootConnector" presStyleLbl="node4" presStyleIdx="4" presStyleCnt="8"/>
+      <dgm:spPr/>
+      <dgm:t>
+        <a:bodyPr/>
+        <a:lstStyle/>
+        <a:p>
+          <a:endParaRPr lang="en-US"/>
+        </a:p>
+      </dgm:t>
+    </dgm:pt>
+    <dgm:pt modelId="{B0F50642-159A-42FB-AF91-8E6A106D0AF1}" type="pres">
+      <dgm:prSet presAssocID="{F0588C2A-6766-47BF-AE7C-52B851FABC21}" presName="hierChild4" presStyleCnt="0"/>
+      <dgm:spPr/>
+    </dgm:pt>
+    <dgm:pt modelId="{ADC95EE5-5B5C-4556-916A-FD35F1A7520B}" type="pres">
+      <dgm:prSet presAssocID="{F0588C2A-6766-47BF-AE7C-52B851FABC21}" presName="hierChild5" presStyleCnt="0"/>
+      <dgm:spPr/>
+    </dgm:pt>
+    <dgm:pt modelId="{27D617F6-CD92-4160-85E9-3D135DEE9C6C}" type="pres">
+      <dgm:prSet presAssocID="{810F6CE3-7B9A-4BC5-B642-3E284064AEB8}" presName="Name37" presStyleLbl="parChTrans1D4" presStyleIdx="5" presStyleCnt="8"/>
+      <dgm:spPr/>
+      <dgm:t>
+        <a:bodyPr/>
+        <a:lstStyle/>
+        <a:p>
+          <a:endParaRPr lang="en-US"/>
+        </a:p>
+      </dgm:t>
+    </dgm:pt>
+    <dgm:pt modelId="{180780F7-BDB0-47DE-A56C-6CEB326C8C76}" type="pres">
+      <dgm:prSet presAssocID="{8F21D5B7-1E81-4E68-9A3B-41478D9E578F}" presName="hierRoot2" presStyleCnt="0">
+        <dgm:presLayoutVars>
+          <dgm:hierBranch val="init"/>
+        </dgm:presLayoutVars>
+      </dgm:prSet>
+      <dgm:spPr/>
+    </dgm:pt>
+    <dgm:pt modelId="{A2BE8849-F0C8-4425-99B5-FDB6C514D9B2}" type="pres">
+      <dgm:prSet presAssocID="{8F21D5B7-1E81-4E68-9A3B-41478D9E578F}" presName="rootComposite" presStyleCnt="0"/>
+      <dgm:spPr/>
+    </dgm:pt>
+    <dgm:pt modelId="{9961A4E0-4305-4F81-8160-655C9A27D034}" type="pres">
+      <dgm:prSet presAssocID="{8F21D5B7-1E81-4E68-9A3B-41478D9E578F}" presName="rootText" presStyleLbl="node4" presStyleIdx="5" presStyleCnt="8">
+        <dgm:presLayoutVars>
+          <dgm:chPref val="3"/>
+        </dgm:presLayoutVars>
+      </dgm:prSet>
+      <dgm:spPr/>
+      <dgm:t>
+        <a:bodyPr/>
+        <a:lstStyle/>
+        <a:p>
+          <a:endParaRPr lang="en-US"/>
+        </a:p>
+      </dgm:t>
+    </dgm:pt>
+    <dgm:pt modelId="{14A65CCA-D715-46D8-B448-593158ED3247}" type="pres">
+      <dgm:prSet presAssocID="{8F21D5B7-1E81-4E68-9A3B-41478D9E578F}" presName="rootConnector" presStyleLbl="node4" presStyleIdx="5" presStyleCnt="8"/>
+      <dgm:spPr/>
+      <dgm:t>
+        <a:bodyPr/>
+        <a:lstStyle/>
+        <a:p>
+          <a:endParaRPr lang="en-US"/>
+        </a:p>
+      </dgm:t>
+    </dgm:pt>
+    <dgm:pt modelId="{C3B9C58F-D652-4603-83E2-D3442093A142}" type="pres">
+      <dgm:prSet presAssocID="{8F21D5B7-1E81-4E68-9A3B-41478D9E578F}" presName="hierChild4" presStyleCnt="0"/>
+      <dgm:spPr/>
+    </dgm:pt>
+    <dgm:pt modelId="{CDC66A6A-9587-4281-80F2-3DC6321E4053}" type="pres">
+      <dgm:prSet presAssocID="{8F21D5B7-1E81-4E68-9A3B-41478D9E578F}" presName="hierChild5" presStyleCnt="0"/>
+      <dgm:spPr/>
+    </dgm:pt>
+    <dgm:pt modelId="{CE8790CA-3AE5-4F40-B398-FE8B34DFE900}" type="pres">
+      <dgm:prSet presAssocID="{26CDFC28-47AA-4502-887A-33E7C0CE0838}" presName="hierChild5" presStyleCnt="0"/>
+      <dgm:spPr/>
+    </dgm:pt>
+    <dgm:pt modelId="{B23C490C-E8B9-4293-B5C2-287857590110}" type="pres">
+      <dgm:prSet presAssocID="{2A1734E5-F350-4043-A59D-090A5C851E96}" presName="hierChild5" presStyleCnt="0"/>
+      <dgm:spPr/>
+    </dgm:pt>
+    <dgm:pt modelId="{AA253CD6-C0DA-4C21-9B15-7211D0914EE5}" type="pres">
+      <dgm:prSet presAssocID="{D5432636-319A-4212-83DB-9D3BA6AA54A9}" presName="Name37" presStyleLbl="parChTrans1D2" presStyleIdx="3" presStyleCnt="4"/>
+      <dgm:spPr/>
+      <dgm:t>
+        <a:bodyPr/>
+        <a:lstStyle/>
+        <a:p>
+          <a:endParaRPr lang="en-US"/>
+        </a:p>
+      </dgm:t>
+    </dgm:pt>
+    <dgm:pt modelId="{A3C45A23-D01A-423A-8C4D-5DB25799D757}" type="pres">
+      <dgm:prSet presAssocID="{51C939BC-1F71-4B4B-B76E-5AB02C7C5227}" presName="hierRoot2" presStyleCnt="0">
+        <dgm:presLayoutVars>
+          <dgm:hierBranch val="init"/>
+        </dgm:presLayoutVars>
+      </dgm:prSet>
+      <dgm:spPr/>
+    </dgm:pt>
+    <dgm:pt modelId="{0089DFFE-40EA-4637-89C2-1B5FCB414797}" type="pres">
+      <dgm:prSet presAssocID="{51C939BC-1F71-4B4B-B76E-5AB02C7C5227}" presName="rootComposite" presStyleCnt="0"/>
+      <dgm:spPr/>
+    </dgm:pt>
+    <dgm:pt modelId="{617A3543-3392-450A-AE60-926A208DA196}" type="pres">
+      <dgm:prSet presAssocID="{51C939BC-1F71-4B4B-B76E-5AB02C7C5227}" presName="rootText" presStyleLbl="node2" presStyleIdx="3" presStyleCnt="4">
+        <dgm:presLayoutVars>
+          <dgm:chPref val="3"/>
+        </dgm:presLayoutVars>
+      </dgm:prSet>
+      <dgm:spPr/>
+      <dgm:t>
+        <a:bodyPr/>
+        <a:lstStyle/>
+        <a:p>
+          <a:endParaRPr lang="en-US"/>
+        </a:p>
+      </dgm:t>
+    </dgm:pt>
+    <dgm:pt modelId="{26FA5C1D-10E1-45CD-A1D3-744EEEC37631}" type="pres">
+      <dgm:prSet presAssocID="{51C939BC-1F71-4B4B-B76E-5AB02C7C5227}" presName="rootConnector" presStyleLbl="node2" presStyleIdx="3" presStyleCnt="4"/>
+      <dgm:spPr/>
+      <dgm:t>
+        <a:bodyPr/>
+        <a:lstStyle/>
+        <a:p>
+          <a:endParaRPr lang="en-US"/>
+        </a:p>
+      </dgm:t>
+    </dgm:pt>
+    <dgm:pt modelId="{12E1EE17-E0E6-4067-9846-C300F17CEFE3}" type="pres">
+      <dgm:prSet presAssocID="{51C939BC-1F71-4B4B-B76E-5AB02C7C5227}" presName="hierChild4" presStyleCnt="0"/>
+      <dgm:spPr/>
+    </dgm:pt>
+    <dgm:pt modelId="{DFAC233F-FFFB-4BE5-9FC7-55A2752E1DAD}" type="pres">
+      <dgm:prSet presAssocID="{9FCE91AE-B52F-45FA-A0C5-CA2E6E43F0FC}" presName="Name37" presStyleLbl="parChTrans1D3" presStyleIdx="4" presStyleCnt="6"/>
+      <dgm:spPr/>
+      <dgm:t>
+        <a:bodyPr/>
+        <a:lstStyle/>
+        <a:p>
+          <a:endParaRPr lang="en-US"/>
+        </a:p>
+      </dgm:t>
+    </dgm:pt>
+    <dgm:pt modelId="{A102166C-182A-4677-B643-E12E34414D0C}" type="pres">
+      <dgm:prSet presAssocID="{998DBD50-443E-466A-9688-66A52BCFB283}" presName="hierRoot2" presStyleCnt="0">
+        <dgm:presLayoutVars>
+          <dgm:hierBranch val="init"/>
+        </dgm:presLayoutVars>
+      </dgm:prSet>
+      <dgm:spPr/>
+    </dgm:pt>
+    <dgm:pt modelId="{EE9D06FB-2DA4-413E-9A04-5CE829CC7043}" type="pres">
+      <dgm:prSet presAssocID="{998DBD50-443E-466A-9688-66A52BCFB283}" presName="rootComposite" presStyleCnt="0"/>
+      <dgm:spPr/>
+    </dgm:pt>
+    <dgm:pt modelId="{F5D3DEFB-AE85-4939-AB97-E915462269C0}" type="pres">
+      <dgm:prSet presAssocID="{998DBD50-443E-466A-9688-66A52BCFB283}" presName="rootText" presStyleLbl="node3" presStyleIdx="4" presStyleCnt="6">
+        <dgm:presLayoutVars>
+          <dgm:chPref val="3"/>
+        </dgm:presLayoutVars>
+      </dgm:prSet>
+      <dgm:spPr/>
+      <dgm:t>
+        <a:bodyPr/>
+        <a:lstStyle/>
+        <a:p>
+          <a:endParaRPr lang="en-US"/>
+        </a:p>
+      </dgm:t>
+    </dgm:pt>
+    <dgm:pt modelId="{291B4844-977C-4B0C-9CCC-F7511A56BE71}" type="pres">
+      <dgm:prSet presAssocID="{998DBD50-443E-466A-9688-66A52BCFB283}" presName="rootConnector" presStyleLbl="node3" presStyleIdx="4" presStyleCnt="6"/>
+      <dgm:spPr/>
+      <dgm:t>
+        <a:bodyPr/>
+        <a:lstStyle/>
+        <a:p>
+          <a:endParaRPr lang="en-US"/>
+        </a:p>
+      </dgm:t>
+    </dgm:pt>
+    <dgm:pt modelId="{2CEE4ED9-C2E8-4894-8D83-91B8801128DF}" type="pres">
+      <dgm:prSet presAssocID="{998DBD50-443E-466A-9688-66A52BCFB283}" presName="hierChild4" presStyleCnt="0"/>
+      <dgm:spPr/>
+    </dgm:pt>
+    <dgm:pt modelId="{044C785A-5A95-4E11-98D2-B0C3A8153197}" type="pres">
+      <dgm:prSet presAssocID="{5B6E6A94-B82E-45A0-B538-B423850E5FD3}" presName="Name37" presStyleLbl="parChTrans1D4" presStyleIdx="6" presStyleCnt="8"/>
+      <dgm:spPr/>
+      <dgm:t>
+        <a:bodyPr/>
+        <a:lstStyle/>
+        <a:p>
+          <a:endParaRPr lang="en-US"/>
+        </a:p>
+      </dgm:t>
+    </dgm:pt>
+    <dgm:pt modelId="{A73085DE-C626-4126-88BA-B599BD7ABF8C}" type="pres">
+      <dgm:prSet presAssocID="{DD18F73E-5873-4440-AD2A-CB98A7E335BB}" presName="hierRoot2" presStyleCnt="0">
+        <dgm:presLayoutVars>
+          <dgm:hierBranch val="init"/>
+        </dgm:presLayoutVars>
+      </dgm:prSet>
+      <dgm:spPr/>
+    </dgm:pt>
+    <dgm:pt modelId="{2ECDA22B-7533-4C01-9326-44D6F8BD0DF9}" type="pres">
+      <dgm:prSet presAssocID="{DD18F73E-5873-4440-AD2A-CB98A7E335BB}" presName="rootComposite" presStyleCnt="0"/>
+      <dgm:spPr/>
+    </dgm:pt>
+    <dgm:pt modelId="{7527F677-2F8C-4154-ADCF-5A9B516211C5}" type="pres">
+      <dgm:prSet presAssocID="{DD18F73E-5873-4440-AD2A-CB98A7E335BB}" presName="rootText" presStyleLbl="node4" presStyleIdx="6" presStyleCnt="8">
+        <dgm:presLayoutVars>
+          <dgm:chPref val="3"/>
+        </dgm:presLayoutVars>
+      </dgm:prSet>
+      <dgm:spPr/>
+      <dgm:t>
+        <a:bodyPr/>
+        <a:lstStyle/>
+        <a:p>
+          <a:endParaRPr lang="en-US"/>
+        </a:p>
+      </dgm:t>
+    </dgm:pt>
+    <dgm:pt modelId="{24D69D00-71EB-421A-A1CD-E1399AFDD654}" type="pres">
+      <dgm:prSet presAssocID="{DD18F73E-5873-4440-AD2A-CB98A7E335BB}" presName="rootConnector" presStyleLbl="node4" presStyleIdx="6" presStyleCnt="8"/>
+      <dgm:spPr/>
+      <dgm:t>
+        <a:bodyPr/>
+        <a:lstStyle/>
+        <a:p>
+          <a:endParaRPr lang="en-US"/>
+        </a:p>
+      </dgm:t>
+    </dgm:pt>
+    <dgm:pt modelId="{EF2AA458-53CB-431F-ADA6-2CE94CA3A3FA}" type="pres">
+      <dgm:prSet presAssocID="{DD18F73E-5873-4440-AD2A-CB98A7E335BB}" presName="hierChild4" presStyleCnt="0"/>
+      <dgm:spPr/>
+    </dgm:pt>
+    <dgm:pt modelId="{DBE2C0CD-57E4-4301-AFCC-142E72F17D48}" type="pres">
+      <dgm:prSet presAssocID="{DD18F73E-5873-4440-AD2A-CB98A7E335BB}" presName="hierChild5" presStyleCnt="0"/>
+      <dgm:spPr/>
+    </dgm:pt>
+    <dgm:pt modelId="{4E46776B-A9BF-40BA-B23E-D60E8258377D}" type="pres">
+      <dgm:prSet presAssocID="{998DBD50-443E-466A-9688-66A52BCFB283}" presName="hierChild5" presStyleCnt="0"/>
+      <dgm:spPr/>
+    </dgm:pt>
+    <dgm:pt modelId="{06BFC016-E41C-49B3-B96E-72E532519536}" type="pres">
+      <dgm:prSet presAssocID="{64BCB35C-1AA8-4805-AE44-941DC0666BE4}" presName="Name37" presStyleLbl="parChTrans1D3" presStyleIdx="5" presStyleCnt="6"/>
+      <dgm:spPr/>
+      <dgm:t>
+        <a:bodyPr/>
+        <a:lstStyle/>
+        <a:p>
+          <a:endParaRPr lang="en-US"/>
+        </a:p>
+      </dgm:t>
+    </dgm:pt>
+    <dgm:pt modelId="{F0316925-ADF4-407C-AC18-E9AF2568B7AC}" type="pres">
+      <dgm:prSet presAssocID="{AB5982FD-D354-4AAA-B978-F9826D0D05FB}" presName="hierRoot2" presStyleCnt="0">
+        <dgm:presLayoutVars>
+          <dgm:hierBranch val="init"/>
+        </dgm:presLayoutVars>
+      </dgm:prSet>
+      <dgm:spPr/>
+    </dgm:pt>
+    <dgm:pt modelId="{11089E92-0810-486E-9CCF-0222441D031D}" type="pres">
+      <dgm:prSet presAssocID="{AB5982FD-D354-4AAA-B978-F9826D0D05FB}" presName="rootComposite" presStyleCnt="0"/>
+      <dgm:spPr/>
+    </dgm:pt>
+    <dgm:pt modelId="{A48D18B2-265E-4299-AC55-85A70F37F6FA}" type="pres">
+      <dgm:prSet presAssocID="{AB5982FD-D354-4AAA-B978-F9826D0D05FB}" presName="rootText" presStyleLbl="node3" presStyleIdx="5" presStyleCnt="6">
+        <dgm:presLayoutVars>
+          <dgm:chPref val="3"/>
+        </dgm:presLayoutVars>
+      </dgm:prSet>
+      <dgm:spPr/>
+      <dgm:t>
+        <a:bodyPr/>
+        <a:lstStyle/>
+        <a:p>
+          <a:endParaRPr lang="en-US"/>
+        </a:p>
+      </dgm:t>
+    </dgm:pt>
+    <dgm:pt modelId="{9D123678-09FF-430E-9CD4-847B9B41C9E6}" type="pres">
+      <dgm:prSet presAssocID="{AB5982FD-D354-4AAA-B978-F9826D0D05FB}" presName="rootConnector" presStyleLbl="node3" presStyleIdx="5" presStyleCnt="6"/>
+      <dgm:spPr/>
+      <dgm:t>
+        <a:bodyPr/>
+        <a:lstStyle/>
+        <a:p>
+          <a:endParaRPr lang="en-US"/>
+        </a:p>
+      </dgm:t>
+    </dgm:pt>
+    <dgm:pt modelId="{A421275B-1C99-476A-8C66-7769DB8789A0}" type="pres">
+      <dgm:prSet presAssocID="{AB5982FD-D354-4AAA-B978-F9826D0D05FB}" presName="hierChild4" presStyleCnt="0"/>
+      <dgm:spPr/>
+    </dgm:pt>
+    <dgm:pt modelId="{F6217F3C-65DD-408C-AC11-C96C35846B77}" type="pres">
+      <dgm:prSet presAssocID="{CBAC9813-60C7-4469-BF09-A874065B34A7}" presName="Name37" presStyleLbl="parChTrans1D4" presStyleIdx="7" presStyleCnt="8"/>
+      <dgm:spPr/>
+      <dgm:t>
+        <a:bodyPr/>
+        <a:lstStyle/>
+        <a:p>
+          <a:endParaRPr lang="en-US"/>
+        </a:p>
+      </dgm:t>
+    </dgm:pt>
+    <dgm:pt modelId="{0ECFA94B-E46A-45CA-8C3A-10607FEAC768}" type="pres">
+      <dgm:prSet presAssocID="{CF665F69-5C99-4ABA-84BB-EE78294ED608}" presName="hierRoot2" presStyleCnt="0">
+        <dgm:presLayoutVars>
+          <dgm:hierBranch val="init"/>
+        </dgm:presLayoutVars>
+      </dgm:prSet>
+      <dgm:spPr/>
+    </dgm:pt>
+    <dgm:pt modelId="{0BB80446-A4A9-44E1-AB94-82E0068A5631}" type="pres">
+      <dgm:prSet presAssocID="{CF665F69-5C99-4ABA-84BB-EE78294ED608}" presName="rootComposite" presStyleCnt="0"/>
+      <dgm:spPr/>
+    </dgm:pt>
+    <dgm:pt modelId="{1F6BCCA0-2CCE-4CE0-BBC4-117FD2054979}" type="pres">
+      <dgm:prSet presAssocID="{CF665F69-5C99-4ABA-84BB-EE78294ED608}" presName="rootText" presStyleLbl="node4" presStyleIdx="7" presStyleCnt="8">
+        <dgm:presLayoutVars>
+          <dgm:chPref val="3"/>
+        </dgm:presLayoutVars>
+      </dgm:prSet>
+      <dgm:spPr/>
+      <dgm:t>
+        <a:bodyPr/>
+        <a:lstStyle/>
+        <a:p>
+          <a:endParaRPr lang="en-US"/>
+        </a:p>
+      </dgm:t>
+    </dgm:pt>
     <dgm:pt modelId="{0EA51ED5-D16D-4D92-B6FA-B66031566B6A}" type="pres">
       <dgm:prSet presAssocID="{CF665F69-5C99-4ABA-84BB-EE78294ED608}" presName="rootConnector" presStyleLbl="node4" presStyleIdx="7" presStyleCnt="8"/>
       <dgm:spPr/>
+      <dgm:t>
+        <a:bodyPr/>
+        <a:lstStyle/>
+        <a:p>
+          <a:endParaRPr lang="en-US"/>
+        </a:p>
+      </dgm:t>
     </dgm:pt>
     <dgm:pt modelId="{2A9B1DC3-8779-48EF-92AD-112791FF5D99}" type="pres">
       <dgm:prSet presAssocID="{CF665F69-5C99-4ABA-84BB-EE78294ED608}" presName="hierChild4" presStyleCnt="0"/>
@@ -2544,82 +2817,82 @@
     </dgm:pt>
   </dgm:ptLst>
   <dgm:cxnLst>
+    <dgm:cxn modelId="{7F4CBF52-8E85-4962-B47C-2E9BB8838D4B}" type="presOf" srcId="{CF665F69-5C99-4ABA-84BB-EE78294ED608}" destId="{1F6BCCA0-2CCE-4CE0-BBC4-117FD2054979}" srcOrd="0" destOrd="0" presId="urn:microsoft.com/office/officeart/2005/8/layout/orgChart1"/>
+    <dgm:cxn modelId="{2451FA6F-A70D-4E78-8CF6-9527C49C1AC2}" type="presOf" srcId="{F0588C2A-6766-47BF-AE7C-52B851FABC21}" destId="{4C0517EB-FD0E-41DA-B0F6-7F0D2D018DD1}" srcOrd="0" destOrd="0" presId="urn:microsoft.com/office/officeart/2005/8/layout/orgChart1"/>
+    <dgm:cxn modelId="{5CA14EFE-56BA-428E-9344-6E54BD1CDAE3}" type="presOf" srcId="{A7E2D81E-7900-4DF4-BEF5-77A2812B0C4E}" destId="{91E1DAD5-A378-4F9D-90D3-E4D6E3B719CC}" srcOrd="0" destOrd="0" presId="urn:microsoft.com/office/officeart/2005/8/layout/orgChart1"/>
+    <dgm:cxn modelId="{275E1EA8-9958-4385-AD1D-0D70F2B2E97E}" type="presOf" srcId="{998DBD50-443E-466A-9688-66A52BCFB283}" destId="{291B4844-977C-4B0C-9CCC-F7511A56BE71}" srcOrd="1" destOrd="0" presId="urn:microsoft.com/office/officeart/2005/8/layout/orgChart1"/>
+    <dgm:cxn modelId="{F1E4A56E-64BE-44F4-8E42-D61EDD68880B}" srcId="{26CDFC28-47AA-4502-887A-33E7C0CE0838}" destId="{F0588C2A-6766-47BF-AE7C-52B851FABC21}" srcOrd="0" destOrd="0" parTransId="{5ED6D770-BF3B-4684-98EB-5ABB516FF23D}" sibTransId="{AFD6C0FD-0670-49CC-B34D-0E113DDEE343}"/>
+    <dgm:cxn modelId="{B90982DA-E1CB-43C2-9643-4ECB399A3CBC}" type="presOf" srcId="{998DBD50-443E-466A-9688-66A52BCFB283}" destId="{F5D3DEFB-AE85-4939-AB97-E915462269C0}" srcOrd="0" destOrd="0" presId="urn:microsoft.com/office/officeart/2005/8/layout/orgChart1"/>
+    <dgm:cxn modelId="{A4FD5072-445C-4BF4-99DD-5F1BDAD862DA}" srcId="{C9F271EB-AA97-406F-A22E-048A336DC94A}" destId="{6CEB8C34-32A9-47E6-A405-A04B3711CFB7}" srcOrd="1" destOrd="0" parTransId="{9DFE08AD-6D40-40B9-8C6C-0D9B748E71FD}" sibTransId="{05E40D46-9D4A-4AE0-8A7C-2E5D2787A5C2}"/>
+    <dgm:cxn modelId="{8137AEC6-67AB-4747-A01B-8846F373EF92}" type="presOf" srcId="{2A1734E5-F350-4043-A59D-090A5C851E96}" destId="{632D20A3-D474-4945-BEC3-702EAB53AF00}" srcOrd="0" destOrd="0" presId="urn:microsoft.com/office/officeart/2005/8/layout/orgChart1"/>
+    <dgm:cxn modelId="{B382F07A-E779-468F-8018-7984C1FE1CF1}" type="presOf" srcId="{26CDFC28-47AA-4502-887A-33E7C0CE0838}" destId="{4780D492-11D4-4975-B35A-476D05181A39}" srcOrd="1" destOrd="0" presId="urn:microsoft.com/office/officeart/2005/8/layout/orgChart1"/>
+    <dgm:cxn modelId="{0B387FA4-F216-482B-AC2E-CAF30E8346BB}" type="presOf" srcId="{64BCB35C-1AA8-4805-AE44-941DC0666BE4}" destId="{06BFC016-E41C-49B3-B96E-72E532519536}" srcOrd="0" destOrd="0" presId="urn:microsoft.com/office/officeart/2005/8/layout/orgChart1"/>
+    <dgm:cxn modelId="{CF4DF7D7-2777-4A2A-9B0C-8DEB23527131}" type="presOf" srcId="{C6CC40CD-5626-4A19-9936-F67709EE7AF0}" destId="{52AB23E0-53A6-4AC3-B89A-D72BC394F116}" srcOrd="0" destOrd="0" presId="urn:microsoft.com/office/officeart/2005/8/layout/orgChart1"/>
+    <dgm:cxn modelId="{2258E7B5-0D3B-4779-989F-0D2802E77E9D}" type="presOf" srcId="{2AB59A33-B6A6-40FF-98F7-711698F4D26B}" destId="{64076540-8FAD-4187-A304-8898DDD0C9A8}" srcOrd="0" destOrd="0" presId="urn:microsoft.com/office/officeart/2005/8/layout/orgChart1"/>
+    <dgm:cxn modelId="{06EB2273-9FAF-4E8B-B25D-B647F848AA12}" type="presOf" srcId="{A7E2D81E-7900-4DF4-BEF5-77A2812B0C4E}" destId="{C91E4177-0B62-4588-885D-1A4C3BD2BAF7}" srcOrd="1" destOrd="0" presId="urn:microsoft.com/office/officeart/2005/8/layout/orgChart1"/>
+    <dgm:cxn modelId="{2058D512-BFDC-429D-8108-A884B1DF591E}" type="presOf" srcId="{9FCE91AE-B52F-45FA-A0C5-CA2E6E43F0FC}" destId="{DFAC233F-FFFB-4BE5-9FC7-55A2752E1DAD}" srcOrd="0" destOrd="0" presId="urn:microsoft.com/office/officeart/2005/8/layout/orgChart1"/>
+    <dgm:cxn modelId="{8CBE4C9A-8DBD-4F86-806A-74F82BAF13CF}" type="presOf" srcId="{26CDFC28-47AA-4502-887A-33E7C0CE0838}" destId="{B9EF6254-674C-4CF7-8107-B9DBCC5CC06C}" srcOrd="0" destOrd="0" presId="urn:microsoft.com/office/officeart/2005/8/layout/orgChart1"/>
+    <dgm:cxn modelId="{74291408-E599-4241-9208-778B25B35419}" type="presOf" srcId="{5AF5E628-F524-43D4-9C5A-5A8189560301}" destId="{C6B5F02F-BF16-4258-AC5A-D980E6777BDC}" srcOrd="1" destOrd="0" presId="urn:microsoft.com/office/officeart/2005/8/layout/orgChart1"/>
+    <dgm:cxn modelId="{5F5DBC77-905E-46B9-9C22-D2F5D1C757CB}" type="presOf" srcId="{6CEB8C34-32A9-47E6-A405-A04B3711CFB7}" destId="{F5F98A29-63BF-4AC3-9BF3-D3C7E3FF700B}" srcOrd="1" destOrd="0" presId="urn:microsoft.com/office/officeart/2005/8/layout/orgChart1"/>
+    <dgm:cxn modelId="{4D7522AD-EF42-4E61-860F-C5EE7ADC920F}" srcId="{A7E2D81E-7900-4DF4-BEF5-77A2812B0C4E}" destId="{4BD105F0-FCB2-4292-8534-EF3F82555BF1}" srcOrd="1" destOrd="0" parTransId="{82243891-7EAF-4E58-B342-FB3AEF7D96D8}" sibTransId="{1B73A89F-B150-403E-8069-7813E3E859D3}"/>
+    <dgm:cxn modelId="{A1CD0581-8F25-4433-BCB3-403F201DCE98}" srcId="{31976A02-02B1-412A-B691-02C3A6880CD3}" destId="{A7E2D81E-7900-4DF4-BEF5-77A2812B0C4E}" srcOrd="0" destOrd="0" parTransId="{5E9185FC-D944-454A-8EDB-88DDB1EC156B}" sibTransId="{6CE37D0C-36BB-4B53-B0BC-4BBCC03B877F}"/>
     <dgm:cxn modelId="{DF1FF10C-2385-4496-A025-967A40CBD7A2}" type="presOf" srcId="{2A1734E5-F350-4043-A59D-090A5C851E96}" destId="{E65AAA3D-6EDF-4733-A476-6E661CF70E36}" srcOrd="1" destOrd="0" presId="urn:microsoft.com/office/officeart/2005/8/layout/orgChart1"/>
+    <dgm:cxn modelId="{87C8B196-323D-4EB7-8C11-259CEDD39083}" type="presOf" srcId="{AB5982FD-D354-4AAA-B978-F9826D0D05FB}" destId="{A48D18B2-265E-4299-AC55-85A70F37F6FA}" srcOrd="0" destOrd="0" presId="urn:microsoft.com/office/officeart/2005/8/layout/orgChart1"/>
+    <dgm:cxn modelId="{A8107FC3-6D18-4968-ADAB-112DB844FD6C}" type="presOf" srcId="{AB5982FD-D354-4AAA-B978-F9826D0D05FB}" destId="{9D123678-09FF-430E-9CD4-847B9B41C9E6}" srcOrd="1" destOrd="0" presId="urn:microsoft.com/office/officeart/2005/8/layout/orgChart1"/>
+    <dgm:cxn modelId="{6D67D41E-CA24-4B50-B776-9590486E46E4}" type="presOf" srcId="{763868FB-01C7-4C07-982A-E0002DD2F249}" destId="{6E390A44-09EF-4120-ABD1-1835798D84D0}" srcOrd="0" destOrd="0" presId="urn:microsoft.com/office/officeart/2005/8/layout/orgChart1"/>
+    <dgm:cxn modelId="{7A6B7DFA-AF2C-46D0-9BF7-1A6F2A4BD05F}" type="presOf" srcId="{82243891-7EAF-4E58-B342-FB3AEF7D96D8}" destId="{AAC078B5-22C6-4465-AC60-50B89A62DAA4}" srcOrd="0" destOrd="0" presId="urn:microsoft.com/office/officeart/2005/8/layout/orgChart1"/>
+    <dgm:cxn modelId="{54CCCEDE-ECD4-498C-B465-8CA9F82A49C5}" type="presOf" srcId="{F8118993-C3C6-4246-A6BF-F9F2EC3DC9CB}" destId="{A2BECFDC-6DED-4CEA-B9D1-694651AD4E09}" srcOrd="1" destOrd="0" presId="urn:microsoft.com/office/officeart/2005/8/layout/orgChart1"/>
+    <dgm:cxn modelId="{C3A31E5B-D7BF-45EA-9802-6D3D083F2984}" type="presOf" srcId="{A3D548BD-E471-4C3A-9014-C70E7E2B5BFD}" destId="{2D94B2C8-24C9-4949-954A-EDC01FC95EB8}" srcOrd="0" destOrd="0" presId="urn:microsoft.com/office/officeart/2005/8/layout/orgChart1"/>
+    <dgm:cxn modelId="{65D0E857-80DD-4041-83CE-8C50597B830A}" type="presOf" srcId="{31976A02-02B1-412A-B691-02C3A6880CD3}" destId="{36B3E81A-E148-4D3B-88E5-4419A3BAFF40}" srcOrd="0" destOrd="0" presId="urn:microsoft.com/office/officeart/2005/8/layout/orgChart1"/>
+    <dgm:cxn modelId="{5AD1E491-93BF-4390-A05D-1A6277716063}" type="presOf" srcId="{CC818131-8C0B-4D2C-AEA4-5A1BD3A6EFF3}" destId="{3E8697EF-F0C0-442C-AC8F-AF21953408C4}" srcOrd="0" destOrd="0" presId="urn:microsoft.com/office/officeart/2005/8/layout/orgChart1"/>
+    <dgm:cxn modelId="{63957BFE-6189-47C3-8B38-C33EAFDBB625}" srcId="{998DBD50-443E-466A-9688-66A52BCFB283}" destId="{DD18F73E-5873-4440-AD2A-CB98A7E335BB}" srcOrd="0" destOrd="0" parTransId="{5B6E6A94-B82E-45A0-B538-B423850E5FD3}" sibTransId="{9786C01A-E46D-4E4C-952B-67F9C5AB60A3}"/>
+    <dgm:cxn modelId="{16C1F492-6F23-441E-8C79-9308ED1456B5}" type="presOf" srcId="{B23CD900-37E2-45DE-B384-F9885D55838B}" destId="{82AF4305-DDE7-4632-85B6-1B4672473DDD}" srcOrd="1" destOrd="0" presId="urn:microsoft.com/office/officeart/2005/8/layout/orgChart1"/>
+    <dgm:cxn modelId="{3F6EF168-B749-47B5-86FD-91ABA2C7D72E}" type="presOf" srcId="{A9576EC0-F780-411F-A988-792BB4B5827F}" destId="{3C3CC326-C1BB-4802-9C80-3024F7E2EFEC}" srcOrd="1" destOrd="0" presId="urn:microsoft.com/office/officeart/2005/8/layout/orgChart1"/>
+    <dgm:cxn modelId="{9A9E885B-6395-49FB-9E85-9D1E8F64238A}" type="presOf" srcId="{810F6CE3-7B9A-4BC5-B642-3E284064AEB8}" destId="{27D617F6-CD92-4160-85E9-3D135DEE9C6C}" srcOrd="0" destOrd="0" presId="urn:microsoft.com/office/officeart/2005/8/layout/orgChart1"/>
+    <dgm:cxn modelId="{964962C0-3F9A-405E-B7CF-7320CA058054}" srcId="{4BD105F0-FCB2-4292-8534-EF3F82555BF1}" destId="{F8118993-C3C6-4246-A6BF-F9F2EC3DC9CB}" srcOrd="0" destOrd="0" parTransId="{763868FB-01C7-4C07-982A-E0002DD2F249}" sibTransId="{196FC47F-8F5E-4EE4-99DA-8228F767EF40}"/>
+    <dgm:cxn modelId="{F3B26E1E-6947-4159-918E-E138CED3D239}" srcId="{B23CD900-37E2-45DE-B384-F9885D55838B}" destId="{A9576EC0-F780-411F-A988-792BB4B5827F}" srcOrd="0" destOrd="0" parTransId="{3C5DF98A-9E49-4EBC-AA28-3E96D9B53B39}" sibTransId="{4568403F-227F-414F-9181-6C36CA1FB882}"/>
+    <dgm:cxn modelId="{F4CB865C-996A-492E-9E5F-2B17DE9381E0}" srcId="{26CDFC28-47AA-4502-887A-33E7C0CE0838}" destId="{8F21D5B7-1E81-4E68-9A3B-41478D9E578F}" srcOrd="1" destOrd="0" parTransId="{810F6CE3-7B9A-4BC5-B642-3E284064AEB8}" sibTransId="{0C0A6C55-CE4D-42AC-8392-A28B6E9C2042}"/>
     <dgm:cxn modelId="{EC9B6DDA-4079-451C-AA2A-4CC8ABD15E1E}" srcId="{A7E2D81E-7900-4DF4-BEF5-77A2812B0C4E}" destId="{2A1734E5-F350-4043-A59D-090A5C851E96}" srcOrd="2" destOrd="0" parTransId="{E2FCDC95-A76F-447E-B7A8-96053D2336AC}" sibTransId="{1BA36650-D456-4FCA-ABBC-F4EEE6270BCA}"/>
-    <dgm:cxn modelId="{63957BFE-6189-47C3-8B38-C33EAFDBB625}" srcId="{998DBD50-443E-466A-9688-66A52BCFB283}" destId="{DD18F73E-5873-4440-AD2A-CB98A7E335BB}" srcOrd="0" destOrd="0" parTransId="{5B6E6A94-B82E-45A0-B538-B423850E5FD3}" sibTransId="{9786C01A-E46D-4E4C-952B-67F9C5AB60A3}"/>
+    <dgm:cxn modelId="{7D2A03B3-72A8-4CAF-A850-B82FF1D961C0}" type="presOf" srcId="{3196F628-F850-402C-8DFF-32FDBF641FAF}" destId="{6B1C0F91-7709-4920-8BCD-A2344D4FC3C1}" srcOrd="0" destOrd="0" presId="urn:microsoft.com/office/officeart/2005/8/layout/orgChart1"/>
+    <dgm:cxn modelId="{D9F878CB-CD73-43B2-924C-4145A2798C53}" type="presOf" srcId="{CC818131-8C0B-4D2C-AEA4-5A1BD3A6EFF3}" destId="{D62139CB-9D8F-4560-A01D-A225FB31D9FF}" srcOrd="1" destOrd="0" presId="urn:microsoft.com/office/officeart/2005/8/layout/orgChart1"/>
     <dgm:cxn modelId="{E7F7BF8F-EE5F-4676-BDAC-E110E82FDA6F}" type="presOf" srcId="{DD18F73E-5873-4440-AD2A-CB98A7E335BB}" destId="{7527F677-2F8C-4154-ADCF-5A9B516211C5}" srcOrd="0" destOrd="0" presId="urn:microsoft.com/office/officeart/2005/8/layout/orgChart1"/>
-    <dgm:cxn modelId="{B90982DA-E1CB-43C2-9643-4ECB399A3CBC}" type="presOf" srcId="{998DBD50-443E-466A-9688-66A52BCFB283}" destId="{F5D3DEFB-AE85-4939-AB97-E915462269C0}" srcOrd="0" destOrd="0" presId="urn:microsoft.com/office/officeart/2005/8/layout/orgChart1"/>
+    <dgm:cxn modelId="{07BFF742-37D9-4F3A-8BCA-5FA7F3B3FFDA}" type="presOf" srcId="{51C939BC-1F71-4B4B-B76E-5AB02C7C5227}" destId="{617A3543-3392-450A-AE60-926A208DA196}" srcOrd="0" destOrd="0" presId="urn:microsoft.com/office/officeart/2005/8/layout/orgChart1"/>
+    <dgm:cxn modelId="{3E527903-2969-4BE6-A44A-67C70C96E603}" type="presOf" srcId="{4BD105F0-FCB2-4292-8534-EF3F82555BF1}" destId="{432E8FE3-B9B9-442A-A4A0-5A0F509E161A}" srcOrd="1" destOrd="0" presId="urn:microsoft.com/office/officeart/2005/8/layout/orgChart1"/>
+    <dgm:cxn modelId="{F56EA288-A208-43A9-BC15-07480867F718}" type="presOf" srcId="{CF665F69-5C99-4ABA-84BB-EE78294ED608}" destId="{0EA51ED5-D16D-4D92-B6FA-B66031566B6A}" srcOrd="1" destOrd="0" presId="urn:microsoft.com/office/officeart/2005/8/layout/orgChart1"/>
+    <dgm:cxn modelId="{6DDE05DA-2CC4-4A86-986C-5CBE3D44190A}" type="presOf" srcId="{6CEB8C34-32A9-47E6-A405-A04B3711CFB7}" destId="{087E6E65-2112-476B-A4AA-3A36C7628514}" srcOrd="0" destOrd="0" presId="urn:microsoft.com/office/officeart/2005/8/layout/orgChart1"/>
+    <dgm:cxn modelId="{D08B451E-BCB5-4E0B-8342-ED0CFBDE97DB}" type="presOf" srcId="{F8118993-C3C6-4246-A6BF-F9F2EC3DC9CB}" destId="{23D4122E-B967-488C-8CB8-9B0B4654BF0E}" srcOrd="0" destOrd="0" presId="urn:microsoft.com/office/officeart/2005/8/layout/orgChart1"/>
+    <dgm:cxn modelId="{D4A13C56-EB94-4538-AEB3-2A061DCE865E}" srcId="{51C939BC-1F71-4B4B-B76E-5AB02C7C5227}" destId="{AB5982FD-D354-4AAA-B978-F9826D0D05FB}" srcOrd="1" destOrd="0" parTransId="{64BCB35C-1AA8-4805-AE44-941DC0666BE4}" sibTransId="{F8A871A7-1431-40C2-8D1E-3F46A7492963}"/>
+    <dgm:cxn modelId="{3A8D22D7-D5E6-464A-8BEE-727F9246E9EE}" srcId="{F8118993-C3C6-4246-A6BF-F9F2EC3DC9CB}" destId="{CC818131-8C0B-4D2C-AEA4-5A1BD3A6EFF3}" srcOrd="1" destOrd="0" parTransId="{A3D548BD-E471-4C3A-9014-C70E7E2B5BFD}" sibTransId="{1E143EFF-2729-40A1-84B3-E819EDF8B7B2}"/>
+    <dgm:cxn modelId="{79528653-A03B-4870-8A6A-410571D115D3}" type="presOf" srcId="{51C939BC-1F71-4B4B-B76E-5AB02C7C5227}" destId="{26FA5C1D-10E1-45CD-A1D3-744EEEC37631}" srcOrd="1" destOrd="0" presId="urn:microsoft.com/office/officeart/2005/8/layout/orgChart1"/>
+    <dgm:cxn modelId="{5DC0E0BC-0122-42DE-9175-76DAAE24D215}" srcId="{A7E2D81E-7900-4DF4-BEF5-77A2812B0C4E}" destId="{51C939BC-1F71-4B4B-B76E-5AB02C7C5227}" srcOrd="3" destOrd="0" parTransId="{D5432636-319A-4212-83DB-9D3BA6AA54A9}" sibTransId="{C119049A-FECA-4579-956E-33C230BAA319}"/>
+    <dgm:cxn modelId="{B8E816F8-7FA7-46B3-B6D5-3CE42BCFB40A}" srcId="{2A1734E5-F350-4043-A59D-090A5C851E96}" destId="{26CDFC28-47AA-4502-887A-33E7C0CE0838}" srcOrd="0" destOrd="0" parTransId="{3196F628-F850-402C-8DFF-32FDBF641FAF}" sibTransId="{31721E21-E4E4-40B3-A55D-F290C2DF3887}"/>
+    <dgm:cxn modelId="{5E6BA506-E2BF-4C29-92E3-F77F24013314}" type="presOf" srcId="{5AF5E628-F524-43D4-9C5A-5A8189560301}" destId="{710C924E-E30F-44DF-A6AA-7A0529BD66A0}" srcOrd="0" destOrd="0" presId="urn:microsoft.com/office/officeart/2005/8/layout/orgChart1"/>
+    <dgm:cxn modelId="{8D0015CC-72CA-4964-8D64-FA31789A0CF7}" type="presOf" srcId="{C9F271EB-AA97-406F-A22E-048A336DC94A}" destId="{EF58EAAC-E8FC-4E92-AC54-3E70E3CCE427}" srcOrd="0" destOrd="0" presId="urn:microsoft.com/office/officeart/2005/8/layout/orgChart1"/>
+    <dgm:cxn modelId="{855D9E2B-03E2-41B3-895F-0198D29F1009}" type="presOf" srcId="{3C5DF98A-9E49-4EBC-AA28-3E96D9B53B39}" destId="{21695C6D-5845-4B94-8EDE-C845DA7BA21E}" srcOrd="0" destOrd="0" presId="urn:microsoft.com/office/officeart/2005/8/layout/orgChart1"/>
+    <dgm:cxn modelId="{DE92D672-1362-46B3-9B36-E204E35D3A8A}" srcId="{AB5982FD-D354-4AAA-B978-F9826D0D05FB}" destId="{CF665F69-5C99-4ABA-84BB-EE78294ED608}" srcOrd="0" destOrd="0" parTransId="{CBAC9813-60C7-4469-BF09-A874065B34A7}" sibTransId="{F6125F52-3FD9-4490-AD82-6F4F52591F18}"/>
+    <dgm:cxn modelId="{585916E3-B9E6-418F-BBFC-91743B566955}" type="presOf" srcId="{5ED6D770-BF3B-4684-98EB-5ABB516FF23D}" destId="{5871E8CC-FA46-4584-AC5E-0BFF5BB7E6D6}" srcOrd="0" destOrd="0" presId="urn:microsoft.com/office/officeart/2005/8/layout/orgChart1"/>
+    <dgm:cxn modelId="{EC2000F8-6406-4F91-AC03-67371B9EF307}" type="presOf" srcId="{CEB0D96F-42A5-4903-B863-AD62B81F61AE}" destId="{D81F13DE-77CA-4947-A9D8-3B9405F7FB4A}" srcOrd="0" destOrd="0" presId="urn:microsoft.com/office/officeart/2005/8/layout/orgChart1"/>
+    <dgm:cxn modelId="{2D8C82CF-8261-498E-8D04-AFAB3415C828}" srcId="{6CEB8C34-32A9-47E6-A405-A04B3711CFB7}" destId="{5AF5E628-F524-43D4-9C5A-5A8189560301}" srcOrd="0" destOrd="0" parTransId="{B3E11DF4-0A70-40F4-A9F3-378E2202AE1D}" sibTransId="{79E1E6F3-8832-4EDA-9B35-6A23A6E78C38}"/>
+    <dgm:cxn modelId="{3652CE73-9339-44DF-877F-2A4347BDCFDB}" type="presOf" srcId="{8F21D5B7-1E81-4E68-9A3B-41478D9E578F}" destId="{14A65CCA-D715-46D8-B448-593158ED3247}" srcOrd="1" destOrd="0" presId="urn:microsoft.com/office/officeart/2005/8/layout/orgChart1"/>
     <dgm:cxn modelId="{AA527D19-A024-4500-8A09-2D410AABF130}" type="presOf" srcId="{DD18F73E-5873-4440-AD2A-CB98A7E335BB}" destId="{24D69D00-71EB-421A-A1CD-E1399AFDD654}" srcOrd="1" destOrd="0" presId="urn:microsoft.com/office/officeart/2005/8/layout/orgChart1"/>
-    <dgm:cxn modelId="{79528653-A03B-4870-8A6A-410571D115D3}" type="presOf" srcId="{51C939BC-1F71-4B4B-B76E-5AB02C7C5227}" destId="{26FA5C1D-10E1-45CD-A1D3-744EEEC37631}" srcOrd="1" destOrd="0" presId="urn:microsoft.com/office/officeart/2005/8/layout/orgChart1"/>
-    <dgm:cxn modelId="{65D0E857-80DD-4041-83CE-8C50597B830A}" type="presOf" srcId="{31976A02-02B1-412A-B691-02C3A6880CD3}" destId="{36B3E81A-E148-4D3B-88E5-4419A3BAFF40}" srcOrd="0" destOrd="0" presId="urn:microsoft.com/office/officeart/2005/8/layout/orgChart1"/>
-    <dgm:cxn modelId="{855D9E2B-03E2-41B3-895F-0198D29F1009}" type="presOf" srcId="{3C5DF98A-9E49-4EBC-AA28-3E96D9B53B39}" destId="{21695C6D-5845-4B94-8EDE-C845DA7BA21E}" srcOrd="0" destOrd="0" presId="urn:microsoft.com/office/officeart/2005/8/layout/orgChart1"/>
-    <dgm:cxn modelId="{3652CE73-9339-44DF-877F-2A4347BDCFDB}" type="presOf" srcId="{8F21D5B7-1E81-4E68-9A3B-41478D9E578F}" destId="{14A65CCA-D715-46D8-B448-593158ED3247}" srcOrd="1" destOrd="0" presId="urn:microsoft.com/office/officeart/2005/8/layout/orgChart1"/>
-    <dgm:cxn modelId="{6DDE05DA-2CC4-4A86-986C-5CBE3D44190A}" type="presOf" srcId="{6CEB8C34-32A9-47E6-A405-A04B3711CFB7}" destId="{087E6E65-2112-476B-A4AA-3A36C7628514}" srcOrd="0" destOrd="0" presId="urn:microsoft.com/office/officeart/2005/8/layout/orgChart1"/>
-    <dgm:cxn modelId="{C3A31E5B-D7BF-45EA-9802-6D3D083F2984}" type="presOf" srcId="{A3D548BD-E471-4C3A-9014-C70E7E2B5BFD}" destId="{2D94B2C8-24C9-4949-954A-EDC01FC95EB8}" srcOrd="0" destOrd="0" presId="urn:microsoft.com/office/officeart/2005/8/layout/orgChart1"/>
-    <dgm:cxn modelId="{A4FD5072-445C-4BF4-99DD-5F1BDAD862DA}" srcId="{C9F271EB-AA97-406F-A22E-048A336DC94A}" destId="{6CEB8C34-32A9-47E6-A405-A04B3711CFB7}" srcOrd="1" destOrd="0" parTransId="{9DFE08AD-6D40-40B9-8C6C-0D9B748E71FD}" sibTransId="{05E40D46-9D4A-4AE0-8A7C-2E5D2787A5C2}"/>
+    <dgm:cxn modelId="{1B284198-CAF5-4CC2-BF48-541C8C13B704}" type="presOf" srcId="{2AB59A33-B6A6-40FF-98F7-711698F4D26B}" destId="{DE7689F0-0909-4DF0-993D-DF1D19A454E0}" srcOrd="1" destOrd="0" presId="urn:microsoft.com/office/officeart/2005/8/layout/orgChart1"/>
+    <dgm:cxn modelId="{9FE69CA7-02A8-4923-B8F4-A5DECC562316}" type="presOf" srcId="{B3E11DF4-0A70-40F4-A9F3-378E2202AE1D}" destId="{E8CF98EA-1E11-4C8B-B3DC-A8B8C9716700}" srcOrd="0" destOrd="0" presId="urn:microsoft.com/office/officeart/2005/8/layout/orgChart1"/>
+    <dgm:cxn modelId="{3FFF7750-E39A-400B-867E-3AD7510BEE79}" type="presOf" srcId="{4BD105F0-FCB2-4292-8534-EF3F82555BF1}" destId="{3780879A-AD2D-405D-977E-4451EF3CA5AD}" srcOrd="0" destOrd="0" presId="urn:microsoft.com/office/officeart/2005/8/layout/orgChart1"/>
     <dgm:cxn modelId="{3D6039C9-601D-4282-8BBF-03FEEA76F5F3}" type="presOf" srcId="{E2FCDC95-A76F-447E-B7A8-96053D2336AC}" destId="{75994A22-3790-4219-8C34-EFB1A172683C}" srcOrd="0" destOrd="0" presId="urn:microsoft.com/office/officeart/2005/8/layout/orgChart1"/>
-    <dgm:cxn modelId="{16C1F492-6F23-441E-8C79-9308ED1456B5}" type="presOf" srcId="{B23CD900-37E2-45DE-B384-F9885D55838B}" destId="{82AF4305-DDE7-4632-85B6-1B4672473DDD}" srcOrd="1" destOrd="0" presId="urn:microsoft.com/office/officeart/2005/8/layout/orgChart1"/>
-    <dgm:cxn modelId="{EC2000F8-6406-4F91-AC03-67371B9EF307}" type="presOf" srcId="{CEB0D96F-42A5-4903-B863-AD62B81F61AE}" destId="{D81F13DE-77CA-4947-A9D8-3B9405F7FB4A}" srcOrd="0" destOrd="0" presId="urn:microsoft.com/office/officeart/2005/8/layout/orgChart1"/>
-    <dgm:cxn modelId="{B382F07A-E779-468F-8018-7984C1FE1CF1}" type="presOf" srcId="{26CDFC28-47AA-4502-887A-33E7C0CE0838}" destId="{4780D492-11D4-4975-B35A-476D05181A39}" srcOrd="1" destOrd="0" presId="urn:microsoft.com/office/officeart/2005/8/layout/orgChart1"/>
-    <dgm:cxn modelId="{3E527903-2969-4BE6-A44A-67C70C96E603}" type="presOf" srcId="{4BD105F0-FCB2-4292-8534-EF3F82555BF1}" destId="{432E8FE3-B9B9-442A-A4A0-5A0F509E161A}" srcOrd="1" destOrd="0" presId="urn:microsoft.com/office/officeart/2005/8/layout/orgChart1"/>
-    <dgm:cxn modelId="{06EB2273-9FAF-4E8B-B25D-B647F848AA12}" type="presOf" srcId="{A7E2D81E-7900-4DF4-BEF5-77A2812B0C4E}" destId="{C91E4177-0B62-4588-885D-1A4C3BD2BAF7}" srcOrd="1" destOrd="0" presId="urn:microsoft.com/office/officeart/2005/8/layout/orgChart1"/>
+    <dgm:cxn modelId="{079B3109-107E-4D2E-99FC-71764D1796B1}" type="presOf" srcId="{B23CD900-37E2-45DE-B384-F9885D55838B}" destId="{F6A2B30B-A958-479B-AD92-8D9166487761}" srcOrd="0" destOrd="0" presId="urn:microsoft.com/office/officeart/2005/8/layout/orgChart1"/>
+    <dgm:cxn modelId="{DB030D6B-BB16-4AB3-BD3B-676A1CBC0A28}" type="presOf" srcId="{A9576EC0-F780-411F-A988-792BB4B5827F}" destId="{B4236978-BB7B-465F-A15B-A4753285650F}" srcOrd="0" destOrd="0" presId="urn:microsoft.com/office/officeart/2005/8/layout/orgChart1"/>
+    <dgm:cxn modelId="{29D3F1C6-D8C1-4696-9225-7574825892FA}" srcId="{F8118993-C3C6-4246-A6BF-F9F2EC3DC9CB}" destId="{2AB59A33-B6A6-40FF-98F7-711698F4D26B}" srcOrd="0" destOrd="0" parTransId="{C1DBF8BC-E021-419E-A78A-05014B36B3B1}" sibTransId="{39934AF9-B63A-4C68-8C74-12CFA5946906}"/>
+    <dgm:cxn modelId="{73D1DC3E-5AF2-43C6-AE9C-C378299A836A}" type="presOf" srcId="{CBAC9813-60C7-4469-BF09-A874065B34A7}" destId="{F6217F3C-65DD-408C-AC11-C96C35846B77}" srcOrd="0" destOrd="0" presId="urn:microsoft.com/office/officeart/2005/8/layout/orgChart1"/>
+    <dgm:cxn modelId="{711E14F9-8AF4-4019-8C8C-9FE45B7D3E7C}" type="presOf" srcId="{9DFE08AD-6D40-40B9-8C6C-0D9B748E71FD}" destId="{8D8E53BF-D23C-4E66-A64D-69E3B5A64376}" srcOrd="0" destOrd="0" presId="urn:microsoft.com/office/officeart/2005/8/layout/orgChart1"/>
+    <dgm:cxn modelId="{F864C8BC-B8C9-4962-ABB8-1D4DB46F4EA9}" srcId="{C9F271EB-AA97-406F-A22E-048A336DC94A}" destId="{B23CD900-37E2-45DE-B384-F9885D55838B}" srcOrd="0" destOrd="0" parTransId="{C6CC40CD-5626-4A19-9936-F67709EE7AF0}" sibTransId="{4EC04109-3134-4314-B119-98550E78BF07}"/>
+    <dgm:cxn modelId="{701FBC72-4CA4-403B-9C1B-0720F2EB9273}" type="presOf" srcId="{F0588C2A-6766-47BF-AE7C-52B851FABC21}" destId="{09C02F37-0DFF-472D-BC6B-B6584867F159}" srcOrd="1" destOrd="0" presId="urn:microsoft.com/office/officeart/2005/8/layout/orgChart1"/>
+    <dgm:cxn modelId="{FCF7D859-A8C6-4A69-ACE7-6EBD0F233C30}" type="presOf" srcId="{D5432636-319A-4212-83DB-9D3BA6AA54A9}" destId="{AA253CD6-C0DA-4C21-9B15-7211D0914EE5}" srcOrd="0" destOrd="0" presId="urn:microsoft.com/office/officeart/2005/8/layout/orgChart1"/>
+    <dgm:cxn modelId="{794BC4DB-07B9-4B18-835E-CC6189AFDB89}" type="presOf" srcId="{C1DBF8BC-E021-419E-A78A-05014B36B3B1}" destId="{3D07C967-7F5A-4259-8C92-44D4DA2F7550}" srcOrd="0" destOrd="0" presId="urn:microsoft.com/office/officeart/2005/8/layout/orgChart1"/>
+    <dgm:cxn modelId="{A25B346A-AF67-44D0-A601-4D4A0B7FEEC8}" srcId="{A7E2D81E-7900-4DF4-BEF5-77A2812B0C4E}" destId="{C9F271EB-AA97-406F-A22E-048A336DC94A}" srcOrd="0" destOrd="0" parTransId="{CEB0D96F-42A5-4903-B863-AD62B81F61AE}" sibTransId="{994C4CAB-5619-4281-B81C-1EBED1C2EFE7}"/>
     <dgm:cxn modelId="{22930F4D-DE10-45E5-ACDC-A461022FFBA9}" srcId="{51C939BC-1F71-4B4B-B76E-5AB02C7C5227}" destId="{998DBD50-443E-466A-9688-66A52BCFB283}" srcOrd="0" destOrd="0" parTransId="{9FCE91AE-B52F-45FA-A0C5-CA2E6E43F0FC}" sibTransId="{1642DE8E-03D4-4062-A10D-83B597A79491}"/>
-    <dgm:cxn modelId="{1B284198-CAF5-4CC2-BF48-541C8C13B704}" type="presOf" srcId="{2AB59A33-B6A6-40FF-98F7-711698F4D26B}" destId="{DE7689F0-0909-4DF0-993D-DF1D19A454E0}" srcOrd="1" destOrd="0" presId="urn:microsoft.com/office/officeart/2005/8/layout/orgChart1"/>
-    <dgm:cxn modelId="{2D8C82CF-8261-498E-8D04-AFAB3415C828}" srcId="{6CEB8C34-32A9-47E6-A405-A04B3711CFB7}" destId="{5AF5E628-F524-43D4-9C5A-5A8189560301}" srcOrd="0" destOrd="0" parTransId="{B3E11DF4-0A70-40F4-A9F3-378E2202AE1D}" sibTransId="{79E1E6F3-8832-4EDA-9B35-6A23A6E78C38}"/>
-    <dgm:cxn modelId="{A1CD0581-8F25-4433-BCB3-403F201DCE98}" srcId="{31976A02-02B1-412A-B691-02C3A6880CD3}" destId="{A7E2D81E-7900-4DF4-BEF5-77A2812B0C4E}" srcOrd="0" destOrd="0" parTransId="{5E9185FC-D944-454A-8EDB-88DDB1EC156B}" sibTransId="{6CE37D0C-36BB-4B53-B0BC-4BBCC03B877F}"/>
-    <dgm:cxn modelId="{73D1DC3E-5AF2-43C6-AE9C-C378299A836A}" type="presOf" srcId="{CBAC9813-60C7-4469-BF09-A874065B34A7}" destId="{F6217F3C-65DD-408C-AC11-C96C35846B77}" srcOrd="0" destOrd="0" presId="urn:microsoft.com/office/officeart/2005/8/layout/orgChart1"/>
-    <dgm:cxn modelId="{DE92D672-1362-46B3-9B36-E204E35D3A8A}" srcId="{AB5982FD-D354-4AAA-B978-F9826D0D05FB}" destId="{CF665F69-5C99-4ABA-84BB-EE78294ED608}" srcOrd="0" destOrd="0" parTransId="{CBAC9813-60C7-4469-BF09-A874065B34A7}" sibTransId="{F6125F52-3FD9-4490-AD82-6F4F52591F18}"/>
-    <dgm:cxn modelId="{7F4CBF52-8E85-4962-B47C-2E9BB8838D4B}" type="presOf" srcId="{CF665F69-5C99-4ABA-84BB-EE78294ED608}" destId="{1F6BCCA0-2CCE-4CE0-BBC4-117FD2054979}" srcOrd="0" destOrd="0" presId="urn:microsoft.com/office/officeart/2005/8/layout/orgChart1"/>
-    <dgm:cxn modelId="{9FE69CA7-02A8-4923-B8F4-A5DECC562316}" type="presOf" srcId="{B3E11DF4-0A70-40F4-A9F3-378E2202AE1D}" destId="{E8CF98EA-1E11-4C8B-B3DC-A8B8C9716700}" srcOrd="0" destOrd="0" presId="urn:microsoft.com/office/officeart/2005/8/layout/orgChart1"/>
-    <dgm:cxn modelId="{8CBE4C9A-8DBD-4F86-806A-74F82BAF13CF}" type="presOf" srcId="{26CDFC28-47AA-4502-887A-33E7C0CE0838}" destId="{B9EF6254-674C-4CF7-8107-B9DBCC5CC06C}" srcOrd="0" destOrd="0" presId="urn:microsoft.com/office/officeart/2005/8/layout/orgChart1"/>
-    <dgm:cxn modelId="{A8107FC3-6D18-4968-ADAB-112DB844FD6C}" type="presOf" srcId="{AB5982FD-D354-4AAA-B978-F9826D0D05FB}" destId="{9D123678-09FF-430E-9CD4-847B9B41C9E6}" srcOrd="1" destOrd="0" presId="urn:microsoft.com/office/officeart/2005/8/layout/orgChart1"/>
     <dgm:cxn modelId="{63B04F08-C750-4C7A-B49E-BEE5344BBD39}" type="presOf" srcId="{C9F271EB-AA97-406F-A22E-048A336DC94A}" destId="{0CDB574B-8A16-4575-B86E-72EE9B15201E}" srcOrd="1" destOrd="0" presId="urn:microsoft.com/office/officeart/2005/8/layout/orgChart1"/>
-    <dgm:cxn modelId="{DB030D6B-BB16-4AB3-BD3B-676A1CBC0A28}" type="presOf" srcId="{A9576EC0-F780-411F-A988-792BB4B5827F}" destId="{B4236978-BB7B-465F-A15B-A4753285650F}" srcOrd="0" destOrd="0" presId="urn:microsoft.com/office/officeart/2005/8/layout/orgChart1"/>
-    <dgm:cxn modelId="{8137AEC6-67AB-4747-A01B-8846F373EF92}" type="presOf" srcId="{2A1734E5-F350-4043-A59D-090A5C851E96}" destId="{632D20A3-D474-4945-BEC3-702EAB53AF00}" srcOrd="0" destOrd="0" presId="urn:microsoft.com/office/officeart/2005/8/layout/orgChart1"/>
-    <dgm:cxn modelId="{585916E3-B9E6-418F-BBFC-91743B566955}" type="presOf" srcId="{5ED6D770-BF3B-4684-98EB-5ABB516FF23D}" destId="{5871E8CC-FA46-4584-AC5E-0BFF5BB7E6D6}" srcOrd="0" destOrd="0" presId="urn:microsoft.com/office/officeart/2005/8/layout/orgChart1"/>
-    <dgm:cxn modelId="{3FFF7750-E39A-400B-867E-3AD7510BEE79}" type="presOf" srcId="{4BD105F0-FCB2-4292-8534-EF3F82555BF1}" destId="{3780879A-AD2D-405D-977E-4451EF3CA5AD}" srcOrd="0" destOrd="0" presId="urn:microsoft.com/office/officeart/2005/8/layout/orgChart1"/>
-    <dgm:cxn modelId="{5AD1E491-93BF-4390-A05D-1A6277716063}" type="presOf" srcId="{CC818131-8C0B-4D2C-AEA4-5A1BD3A6EFF3}" destId="{3E8697EF-F0C0-442C-AC8F-AF21953408C4}" srcOrd="0" destOrd="0" presId="urn:microsoft.com/office/officeart/2005/8/layout/orgChart1"/>
-    <dgm:cxn modelId="{4D7522AD-EF42-4E61-860F-C5EE7ADC920F}" srcId="{A7E2D81E-7900-4DF4-BEF5-77A2812B0C4E}" destId="{4BD105F0-FCB2-4292-8534-EF3F82555BF1}" srcOrd="1" destOrd="0" parTransId="{82243891-7EAF-4E58-B342-FB3AEF7D96D8}" sibTransId="{1B73A89F-B150-403E-8069-7813E3E859D3}"/>
-    <dgm:cxn modelId="{2058D512-BFDC-429D-8108-A884B1DF591E}" type="presOf" srcId="{9FCE91AE-B52F-45FA-A0C5-CA2E6E43F0FC}" destId="{DFAC233F-FFFB-4BE5-9FC7-55A2752E1DAD}" srcOrd="0" destOrd="0" presId="urn:microsoft.com/office/officeart/2005/8/layout/orgChart1"/>
-    <dgm:cxn modelId="{A25B346A-AF67-44D0-A601-4D4A0B7FEEC8}" srcId="{A7E2D81E-7900-4DF4-BEF5-77A2812B0C4E}" destId="{C9F271EB-AA97-406F-A22E-048A336DC94A}" srcOrd="0" destOrd="0" parTransId="{CEB0D96F-42A5-4903-B863-AD62B81F61AE}" sibTransId="{994C4CAB-5619-4281-B81C-1EBED1C2EFE7}"/>
-    <dgm:cxn modelId="{F1E4A56E-64BE-44F4-8E42-D61EDD68880B}" srcId="{26CDFC28-47AA-4502-887A-33E7C0CE0838}" destId="{F0588C2A-6766-47BF-AE7C-52B851FABC21}" srcOrd="0" destOrd="0" parTransId="{5ED6D770-BF3B-4684-98EB-5ABB516FF23D}" sibTransId="{AFD6C0FD-0670-49CC-B34D-0E113DDEE343}"/>
-    <dgm:cxn modelId="{F4CB865C-996A-492E-9E5F-2B17DE9381E0}" srcId="{26CDFC28-47AA-4502-887A-33E7C0CE0838}" destId="{8F21D5B7-1E81-4E68-9A3B-41478D9E578F}" srcOrd="1" destOrd="0" parTransId="{810F6CE3-7B9A-4BC5-B642-3E284064AEB8}" sibTransId="{0C0A6C55-CE4D-42AC-8392-A28B6E9C2042}"/>
-    <dgm:cxn modelId="{54CCCEDE-ECD4-498C-B465-8CA9F82A49C5}" type="presOf" srcId="{F8118993-C3C6-4246-A6BF-F9F2EC3DC9CB}" destId="{A2BECFDC-6DED-4CEA-B9D1-694651AD4E09}" srcOrd="1" destOrd="0" presId="urn:microsoft.com/office/officeart/2005/8/layout/orgChart1"/>
-    <dgm:cxn modelId="{079B3109-107E-4D2E-99FC-71764D1796B1}" type="presOf" srcId="{B23CD900-37E2-45DE-B384-F9885D55838B}" destId="{F6A2B30B-A958-479B-AD92-8D9166487761}" srcOrd="0" destOrd="0" presId="urn:microsoft.com/office/officeart/2005/8/layout/orgChart1"/>
-    <dgm:cxn modelId="{F3B26E1E-6947-4159-918E-E138CED3D239}" srcId="{B23CD900-37E2-45DE-B384-F9885D55838B}" destId="{A9576EC0-F780-411F-A988-792BB4B5827F}" srcOrd="0" destOrd="0" parTransId="{3C5DF98A-9E49-4EBC-AA28-3E96D9B53B39}" sibTransId="{4568403F-227F-414F-9181-6C36CA1FB882}"/>
-    <dgm:cxn modelId="{275E1EA8-9958-4385-AD1D-0D70F2B2E97E}" type="presOf" srcId="{998DBD50-443E-466A-9688-66A52BCFB283}" destId="{291B4844-977C-4B0C-9CCC-F7511A56BE71}" srcOrd="1" destOrd="0" presId="urn:microsoft.com/office/officeart/2005/8/layout/orgChart1"/>
-    <dgm:cxn modelId="{B8E816F8-7FA7-46B3-B6D5-3CE42BCFB40A}" srcId="{2A1734E5-F350-4043-A59D-090A5C851E96}" destId="{26CDFC28-47AA-4502-887A-33E7C0CE0838}" srcOrd="0" destOrd="0" parTransId="{3196F628-F850-402C-8DFF-32FDBF641FAF}" sibTransId="{31721E21-E4E4-40B3-A55D-F290C2DF3887}"/>
-    <dgm:cxn modelId="{3A8D22D7-D5E6-464A-8BEE-727F9246E9EE}" srcId="{F8118993-C3C6-4246-A6BF-F9F2EC3DC9CB}" destId="{CC818131-8C0B-4D2C-AEA4-5A1BD3A6EFF3}" srcOrd="1" destOrd="0" parTransId="{A3D548BD-E471-4C3A-9014-C70E7E2B5BFD}" sibTransId="{1E143EFF-2729-40A1-84B3-E819EDF8B7B2}"/>
-    <dgm:cxn modelId="{964962C0-3F9A-405E-B7CF-7320CA058054}" srcId="{4BD105F0-FCB2-4292-8534-EF3F82555BF1}" destId="{F8118993-C3C6-4246-A6BF-F9F2EC3DC9CB}" srcOrd="0" destOrd="0" parTransId="{763868FB-01C7-4C07-982A-E0002DD2F249}" sibTransId="{196FC47F-8F5E-4EE4-99DA-8228F767EF40}"/>
     <dgm:cxn modelId="{EC81C075-A36A-401B-894E-F2172C22244B}" type="presOf" srcId="{5B6E6A94-B82E-45A0-B538-B423850E5FD3}" destId="{044C785A-5A95-4E11-98D2-B0C3A8153197}" srcOrd="0" destOrd="0" presId="urn:microsoft.com/office/officeart/2005/8/layout/orgChart1"/>
-    <dgm:cxn modelId="{29D3F1C6-D8C1-4696-9225-7574825892FA}" srcId="{F8118993-C3C6-4246-A6BF-F9F2EC3DC9CB}" destId="{2AB59A33-B6A6-40FF-98F7-711698F4D26B}" srcOrd="0" destOrd="0" parTransId="{C1DBF8BC-E021-419E-A78A-05014B36B3B1}" sibTransId="{39934AF9-B63A-4C68-8C74-12CFA5946906}"/>
     <dgm:cxn modelId="{66587802-E1A1-4490-8EE6-DFFED4C0E387}" type="presOf" srcId="{8F21D5B7-1E81-4E68-9A3B-41478D9E578F}" destId="{9961A4E0-4305-4F81-8160-655C9A27D034}" srcOrd="0" destOrd="0" presId="urn:microsoft.com/office/officeart/2005/8/layout/orgChart1"/>
-    <dgm:cxn modelId="{87C8B196-323D-4EB7-8C11-259CEDD39083}" type="presOf" srcId="{AB5982FD-D354-4AAA-B978-F9826D0D05FB}" destId="{A48D18B2-265E-4299-AC55-85A70F37F6FA}" srcOrd="0" destOrd="0" presId="urn:microsoft.com/office/officeart/2005/8/layout/orgChart1"/>
-    <dgm:cxn modelId="{D4A13C56-EB94-4538-AEB3-2A061DCE865E}" srcId="{51C939BC-1F71-4B4B-B76E-5AB02C7C5227}" destId="{AB5982FD-D354-4AAA-B978-F9826D0D05FB}" srcOrd="1" destOrd="0" parTransId="{64BCB35C-1AA8-4805-AE44-941DC0666BE4}" sibTransId="{F8A871A7-1431-40C2-8D1E-3F46A7492963}"/>
-    <dgm:cxn modelId="{3F6EF168-B749-47B5-86FD-91ABA2C7D72E}" type="presOf" srcId="{A9576EC0-F780-411F-A988-792BB4B5827F}" destId="{3C3CC326-C1BB-4802-9C80-3024F7E2EFEC}" srcOrd="1" destOrd="0" presId="urn:microsoft.com/office/officeart/2005/8/layout/orgChart1"/>
-    <dgm:cxn modelId="{711E14F9-8AF4-4019-8C8C-9FE45B7D3E7C}" type="presOf" srcId="{9DFE08AD-6D40-40B9-8C6C-0D9B748E71FD}" destId="{8D8E53BF-D23C-4E66-A64D-69E3B5A64376}" srcOrd="0" destOrd="0" presId="urn:microsoft.com/office/officeart/2005/8/layout/orgChart1"/>
-    <dgm:cxn modelId="{5F5DBC77-905E-46B9-9C22-D2F5D1C757CB}" type="presOf" srcId="{6CEB8C34-32A9-47E6-A405-A04B3711CFB7}" destId="{F5F98A29-63BF-4AC3-9BF3-D3C7E3FF700B}" srcOrd="1" destOrd="0" presId="urn:microsoft.com/office/officeart/2005/8/layout/orgChart1"/>
-    <dgm:cxn modelId="{8D0015CC-72CA-4964-8D64-FA31789A0CF7}" type="presOf" srcId="{C9F271EB-AA97-406F-A22E-048A336DC94A}" destId="{EF58EAAC-E8FC-4E92-AC54-3E70E3CCE427}" srcOrd="0" destOrd="0" presId="urn:microsoft.com/office/officeart/2005/8/layout/orgChart1"/>
-    <dgm:cxn modelId="{D9F878CB-CD73-43B2-924C-4145A2798C53}" type="presOf" srcId="{CC818131-8C0B-4D2C-AEA4-5A1BD3A6EFF3}" destId="{D62139CB-9D8F-4560-A01D-A225FB31D9FF}" srcOrd="1" destOrd="0" presId="urn:microsoft.com/office/officeart/2005/8/layout/orgChart1"/>
-    <dgm:cxn modelId="{07BFF742-37D9-4F3A-8BCA-5FA7F3B3FFDA}" type="presOf" srcId="{51C939BC-1F71-4B4B-B76E-5AB02C7C5227}" destId="{617A3543-3392-450A-AE60-926A208DA196}" srcOrd="0" destOrd="0" presId="urn:microsoft.com/office/officeart/2005/8/layout/orgChart1"/>
-    <dgm:cxn modelId="{9A9E885B-6395-49FB-9E85-9D1E8F64238A}" type="presOf" srcId="{810F6CE3-7B9A-4BC5-B642-3E284064AEB8}" destId="{27D617F6-CD92-4160-85E9-3D135DEE9C6C}" srcOrd="0" destOrd="0" presId="urn:microsoft.com/office/officeart/2005/8/layout/orgChart1"/>
-    <dgm:cxn modelId="{2258E7B5-0D3B-4779-989F-0D2802E77E9D}" type="presOf" srcId="{2AB59A33-B6A6-40FF-98F7-711698F4D26B}" destId="{64076540-8FAD-4187-A304-8898DDD0C9A8}" srcOrd="0" destOrd="0" presId="urn:microsoft.com/office/officeart/2005/8/layout/orgChart1"/>
-    <dgm:cxn modelId="{F864C8BC-B8C9-4962-ABB8-1D4DB46F4EA9}" srcId="{C9F271EB-AA97-406F-A22E-048A336DC94A}" destId="{B23CD900-37E2-45DE-B384-F9885D55838B}" srcOrd="0" destOrd="0" parTransId="{C6CC40CD-5626-4A19-9936-F67709EE7AF0}" sibTransId="{4EC04109-3134-4314-B119-98550E78BF07}"/>
-    <dgm:cxn modelId="{5CA14EFE-56BA-428E-9344-6E54BD1CDAE3}" type="presOf" srcId="{A7E2D81E-7900-4DF4-BEF5-77A2812B0C4E}" destId="{91E1DAD5-A378-4F9D-90D3-E4D6E3B719CC}" srcOrd="0" destOrd="0" presId="urn:microsoft.com/office/officeart/2005/8/layout/orgChart1"/>
-    <dgm:cxn modelId="{CF4DF7D7-2777-4A2A-9B0C-8DEB23527131}" type="presOf" srcId="{C6CC40CD-5626-4A19-9936-F67709EE7AF0}" destId="{52AB23E0-53A6-4AC3-B89A-D72BC394F116}" srcOrd="0" destOrd="0" presId="urn:microsoft.com/office/officeart/2005/8/layout/orgChart1"/>
-    <dgm:cxn modelId="{7A6B7DFA-AF2C-46D0-9BF7-1A6F2A4BD05F}" type="presOf" srcId="{82243891-7EAF-4E58-B342-FB3AEF7D96D8}" destId="{AAC078B5-22C6-4465-AC60-50B89A62DAA4}" srcOrd="0" destOrd="0" presId="urn:microsoft.com/office/officeart/2005/8/layout/orgChart1"/>
-    <dgm:cxn modelId="{74291408-E599-4241-9208-778B25B35419}" type="presOf" srcId="{5AF5E628-F524-43D4-9C5A-5A8189560301}" destId="{C6B5F02F-BF16-4258-AC5A-D980E6777BDC}" srcOrd="1" destOrd="0" presId="urn:microsoft.com/office/officeart/2005/8/layout/orgChart1"/>
-    <dgm:cxn modelId="{5E6BA506-E2BF-4C29-92E3-F77F24013314}" type="presOf" srcId="{5AF5E628-F524-43D4-9C5A-5A8189560301}" destId="{710C924E-E30F-44DF-A6AA-7A0529BD66A0}" srcOrd="0" destOrd="0" presId="urn:microsoft.com/office/officeart/2005/8/layout/orgChart1"/>
-    <dgm:cxn modelId="{5DC0E0BC-0122-42DE-9175-76DAAE24D215}" srcId="{A7E2D81E-7900-4DF4-BEF5-77A2812B0C4E}" destId="{51C939BC-1F71-4B4B-B76E-5AB02C7C5227}" srcOrd="3" destOrd="0" parTransId="{D5432636-319A-4212-83DB-9D3BA6AA54A9}" sibTransId="{C119049A-FECA-4579-956E-33C230BAA319}"/>
-    <dgm:cxn modelId="{FCF7D859-A8C6-4A69-ACE7-6EBD0F233C30}" type="presOf" srcId="{D5432636-319A-4212-83DB-9D3BA6AA54A9}" destId="{AA253CD6-C0DA-4C21-9B15-7211D0914EE5}" srcOrd="0" destOrd="0" presId="urn:microsoft.com/office/officeart/2005/8/layout/orgChart1"/>
-    <dgm:cxn modelId="{0B387FA4-F216-482B-AC2E-CAF30E8346BB}" type="presOf" srcId="{64BCB35C-1AA8-4805-AE44-941DC0666BE4}" destId="{06BFC016-E41C-49B3-B96E-72E532519536}" srcOrd="0" destOrd="0" presId="urn:microsoft.com/office/officeart/2005/8/layout/orgChart1"/>
-    <dgm:cxn modelId="{2451FA6F-A70D-4E78-8CF6-9527C49C1AC2}" type="presOf" srcId="{F0588C2A-6766-47BF-AE7C-52B851FABC21}" destId="{4C0517EB-FD0E-41DA-B0F6-7F0D2D018DD1}" srcOrd="0" destOrd="0" presId="urn:microsoft.com/office/officeart/2005/8/layout/orgChart1"/>
-    <dgm:cxn modelId="{7D2A03B3-72A8-4CAF-A850-B82FF1D961C0}" type="presOf" srcId="{3196F628-F850-402C-8DFF-32FDBF641FAF}" destId="{6B1C0F91-7709-4920-8BCD-A2344D4FC3C1}" srcOrd="0" destOrd="0" presId="urn:microsoft.com/office/officeart/2005/8/layout/orgChart1"/>
-    <dgm:cxn modelId="{701FBC72-4CA4-403B-9C1B-0720F2EB9273}" type="presOf" srcId="{F0588C2A-6766-47BF-AE7C-52B851FABC21}" destId="{09C02F37-0DFF-472D-BC6B-B6584867F159}" srcOrd="1" destOrd="0" presId="urn:microsoft.com/office/officeart/2005/8/layout/orgChart1"/>
-    <dgm:cxn modelId="{794BC4DB-07B9-4B18-835E-CC6189AFDB89}" type="presOf" srcId="{C1DBF8BC-E021-419E-A78A-05014B36B3B1}" destId="{3D07C967-7F5A-4259-8C92-44D4DA2F7550}" srcOrd="0" destOrd="0" presId="urn:microsoft.com/office/officeart/2005/8/layout/orgChart1"/>
-    <dgm:cxn modelId="{F56EA288-A208-43A9-BC15-07480867F718}" type="presOf" srcId="{CF665F69-5C99-4ABA-84BB-EE78294ED608}" destId="{0EA51ED5-D16D-4D92-B6FA-B66031566B6A}" srcOrd="1" destOrd="0" presId="urn:microsoft.com/office/officeart/2005/8/layout/orgChart1"/>
-    <dgm:cxn modelId="{6D67D41E-CA24-4B50-B776-9590486E46E4}" type="presOf" srcId="{763868FB-01C7-4C07-982A-E0002DD2F249}" destId="{6E390A44-09EF-4120-ABD1-1835798D84D0}" srcOrd="0" destOrd="0" presId="urn:microsoft.com/office/officeart/2005/8/layout/orgChart1"/>
-    <dgm:cxn modelId="{D08B451E-BCB5-4E0B-8342-ED0CFBDE97DB}" type="presOf" srcId="{F8118993-C3C6-4246-A6BF-F9F2EC3DC9CB}" destId="{23D4122E-B967-488C-8CB8-9B0B4654BF0E}" srcOrd="0" destOrd="0" presId="urn:microsoft.com/office/officeart/2005/8/layout/orgChart1"/>
     <dgm:cxn modelId="{A331ECE4-3A51-47A2-B0EB-15A33C8106AE}" type="presParOf" srcId="{36B3E81A-E148-4D3B-88E5-4419A3BAFF40}" destId="{D465AAE9-80F9-4B15-8D00-FCD2F5B0741D}" srcOrd="0" destOrd="0" presId="urn:microsoft.com/office/officeart/2005/8/layout/orgChart1"/>
     <dgm:cxn modelId="{FDA91742-653C-4F89-9365-271A53D2AD08}" type="presParOf" srcId="{D465AAE9-80F9-4B15-8D00-FCD2F5B0741D}" destId="{3FD2C245-E911-4A1C-878D-89B50AA53502}" srcOrd="0" destOrd="0" presId="urn:microsoft.com/office/officeart/2005/8/layout/orgChart1"/>
     <dgm:cxn modelId="{4BBCF4DB-0FC6-453B-AD7D-F55E26A6C214}" type="presParOf" srcId="{3FD2C245-E911-4A1C-878D-89B50AA53502}" destId="{91E1DAD5-A378-4F9D-90D3-E4D6E3B719CC}" srcOrd="0" destOrd="0" presId="urn:microsoft.com/office/officeart/2005/8/layout/orgChart1"/>
@@ -13066,7 +13339,7 @@
           <p:cNvPr id="2" name="Title 1">
             <a:extLst>
               <a:ext uri="{FF2B5EF4-FFF2-40B4-BE49-F238E27FC236}">
-                <a16:creationId xmlns:a16="http://schemas.microsoft.com/office/drawing/2014/main" xmlns="" id="{F4727C6F-3982-4E54-AA66-B4E0AA33FF66}"/>
+                <a16:creationId xmlns="" xmlns:a16="http://schemas.microsoft.com/office/drawing/2014/main" id="{F4727C6F-3982-4E54-AA66-B4E0AA33FF66}"/>
               </a:ext>
             </a:extLst>
           </p:cNvPr>
@@ -13095,7 +13368,7 @@
           <p:cNvPr id="3" name="Content Placeholder 2">
             <a:extLst>
               <a:ext uri="{FF2B5EF4-FFF2-40B4-BE49-F238E27FC236}">
-                <a16:creationId xmlns:a16="http://schemas.microsoft.com/office/drawing/2014/main" xmlns="" id="{1134DAC4-9E94-441C-A9BE-87750F6F60A2}"/>
+                <a16:creationId xmlns="" xmlns:a16="http://schemas.microsoft.com/office/drawing/2014/main" id="{1134DAC4-9E94-441C-A9BE-87750F6F60A2}"/>
               </a:ext>
             </a:extLst>
           </p:cNvPr>
@@ -13174,7 +13447,7 @@
           <p:cNvPr id="2" name="Title 1">
             <a:extLst>
               <a:ext uri="{FF2B5EF4-FFF2-40B4-BE49-F238E27FC236}">
-                <a16:creationId xmlns:a16="http://schemas.microsoft.com/office/drawing/2014/main" xmlns="" id="{3E1AC600-D16C-47B7-9075-94DA61007B25}"/>
+                <a16:creationId xmlns="" xmlns:a16="http://schemas.microsoft.com/office/drawing/2014/main" id="{3E1AC600-D16C-47B7-9075-94DA61007B25}"/>
               </a:ext>
             </a:extLst>
           </p:cNvPr>
@@ -13208,7 +13481,7 @@
           <p:cNvPr id="3" name="Content Placeholder 2">
             <a:extLst>
               <a:ext uri="{FF2B5EF4-FFF2-40B4-BE49-F238E27FC236}">
-                <a16:creationId xmlns:a16="http://schemas.microsoft.com/office/drawing/2014/main" xmlns="" id="{DDC8679B-3323-4E4B-ABD6-BD8748DF3AEB}"/>
+                <a16:creationId xmlns="" xmlns:a16="http://schemas.microsoft.com/office/drawing/2014/main" id="{DDC8679B-3323-4E4B-ABD6-BD8748DF3AEB}"/>
               </a:ext>
             </a:extLst>
           </p:cNvPr>
@@ -13320,7 +13593,7 @@
           <p:cNvPr id="3" name="Content Placeholder 2">
             <a:extLst>
               <a:ext uri="{FF2B5EF4-FFF2-40B4-BE49-F238E27FC236}">
-                <a16:creationId xmlns:a16="http://schemas.microsoft.com/office/drawing/2014/main" xmlns="" id="{12CE7563-67E4-470C-A76A-FD376D4C2471}"/>
+                <a16:creationId xmlns="" xmlns:a16="http://schemas.microsoft.com/office/drawing/2014/main" id="{12CE7563-67E4-470C-A76A-FD376D4C2471}"/>
               </a:ext>
             </a:extLst>
           </p:cNvPr>
@@ -13438,7 +13711,7 @@
           <p:cNvPr id="4" name="Title 1">
             <a:extLst>
               <a:ext uri="{FF2B5EF4-FFF2-40B4-BE49-F238E27FC236}">
-                <a16:creationId xmlns:a16="http://schemas.microsoft.com/office/drawing/2014/main" xmlns="" id="{D1F22F75-6806-481E-A0D8-FC161C3266D1}"/>
+                <a16:creationId xmlns="" xmlns:a16="http://schemas.microsoft.com/office/drawing/2014/main" id="{D1F22F75-6806-481E-A0D8-FC161C3266D1}"/>
               </a:ext>
             </a:extLst>
           </p:cNvPr>
@@ -14049,11 +14322,7 @@
             </a:r>
             <a:r>
               <a:rPr lang="en-US" dirty="0" smtClean="0"/>
-              <a:t>algorithms. These classified as</a:t>
-            </a:r>
-            <a:r>
-              <a:rPr lang="en-US" dirty="0" smtClean="0"/>
-              <a:t>:</a:t>
+              <a:t>algorithms. These classified as:</a:t>
             </a:r>
           </a:p>
           <a:p>
@@ -14073,12 +14342,16 @@
               <a:rPr lang="en-US" dirty="0"/>
             </a:br>
             <a:r>
-              <a:rPr lang="en-US" sz="1400" dirty="0" err="1" smtClean="0"/>
+              <a:rPr lang="en-US" sz="1400" b="1" dirty="0" err="1" smtClean="0"/>
               <a:t>e.g</a:t>
             </a:r>
             <a:r>
+              <a:rPr lang="en-US" sz="1400" b="1" dirty="0" smtClean="0"/>
+              <a:t>:</a:t>
+            </a:r>
+            <a:r>
               <a:rPr lang="en-US" sz="1400" dirty="0" smtClean="0"/>
-              <a:t>: Nearest </a:t>
+              <a:t> Nearest </a:t>
             </a:r>
             <a:r>
               <a:rPr lang="en-US" sz="1400" dirty="0"/>
@@ -14107,12 +14380,16 @@
               <a:rPr lang="en-US" dirty="0"/>
             </a:br>
             <a:r>
-              <a:rPr lang="en-US" sz="1400" dirty="0" err="1"/>
+              <a:rPr lang="en-US" sz="1400" b="1" dirty="0" err="1"/>
               <a:t>e.g</a:t>
             </a:r>
             <a:r>
+              <a:rPr lang="en-US" sz="1400" b="1" dirty="0"/>
+              <a:t>:</a:t>
+            </a:r>
+            <a:r>
               <a:rPr lang="en-US" sz="1400" dirty="0"/>
-              <a:t>: </a:t>
+              <a:t> </a:t>
             </a:r>
             <a:r>
               <a:rPr lang="en-US" sz="1400" dirty="0" smtClean="0"/>
@@ -14120,8 +14397,33 @@
             </a:r>
             <a:r>
               <a:rPr lang="en-US" sz="1400" dirty="0"/>
-              <a:t>clustering, Association Rules</a:t>
-            </a:r>
+              <a:t>clustering, Association </a:t>
+            </a:r>
+            <a:r>
+              <a:rPr lang="en-US" sz="1400" dirty="0" smtClean="0"/>
+              <a:t>Rules, </a:t>
+            </a:r>
+            <a:r>
+              <a:rPr lang="en-US" sz="1400" dirty="0"/>
+              <a:t>mixture </a:t>
+            </a:r>
+            <a:r>
+              <a:rPr lang="en-US" sz="1400" dirty="0" smtClean="0"/>
+              <a:t>models, </a:t>
+            </a:r>
+            <a:r>
+              <a:rPr lang="en-US" sz="1400" dirty="0"/>
+              <a:t>Self-organizing </a:t>
+            </a:r>
+            <a:r>
+              <a:rPr lang="en-US" sz="1400" dirty="0" smtClean="0"/>
+              <a:t>map, </a:t>
+            </a:r>
+            <a:r>
+              <a:rPr lang="en-US" sz="1400" dirty="0"/>
+              <a:t>Expectation–maximization algorithm (EM)</a:t>
+            </a:r>
+            <a:endParaRPr lang="en-US" sz="1400" dirty="0"/>
           </a:p>
           <a:p>
             <a:pPr marL="566738" indent="-457200">
@@ -14130,16 +14432,32 @@
             </a:pPr>
             <a:r>
               <a:rPr lang="en-US" dirty="0" smtClean="0"/>
-              <a:t>Semi-Supervised </a:t>
-            </a:r>
-            <a:r>
-              <a:rPr lang="en-US" dirty="0" smtClean="0"/>
-              <a:t>Learning</a:t>
+              <a:t>Semi-Supervised Learning</a:t>
             </a:r>
             <a:br>
               <a:rPr lang="en-US" dirty="0" smtClean="0"/>
             </a:br>
-            <a:endParaRPr lang="en-US" dirty="0"/>
+            <a:r>
+              <a:rPr lang="en-US" sz="1400" b="1" dirty="0" err="1"/>
+              <a:t>e.g</a:t>
+            </a:r>
+            <a:r>
+              <a:rPr lang="en-US" sz="1400" b="1" dirty="0"/>
+              <a:t>: </a:t>
+            </a:r>
+            <a:r>
+              <a:rPr lang="en-US" sz="1400" dirty="0"/>
+              <a:t>Generative </a:t>
+            </a:r>
+            <a:r>
+              <a:rPr lang="en-US" sz="1400" dirty="0"/>
+              <a:t>method, Low-density separation method, Graph-based method, Heuristic </a:t>
+            </a:r>
+            <a:r>
+              <a:rPr lang="en-US" sz="1400" dirty="0"/>
+              <a:t>method</a:t>
+            </a:r>
+            <a:endParaRPr lang="en-US" sz="1400" dirty="0"/>
           </a:p>
           <a:p>
             <a:pPr marL="566738" indent="-457200">
@@ -14151,12 +14469,45 @@
               <a:t>Reinforcement </a:t>
             </a:r>
             <a:r>
-              <a:rPr lang="en-US" dirty="0"/>
+              <a:rPr lang="en-US" dirty="0" smtClean="0"/>
               <a:t>Learning</a:t>
             </a:r>
-          </a:p>
-          <a:p>
-            <a:endParaRPr lang="en-US" dirty="0"/>
+            <a:br>
+              <a:rPr lang="en-US" dirty="0" smtClean="0"/>
+            </a:br>
+            <a:r>
+              <a:rPr lang="en-US" sz="1400" b="1" dirty="0" err="1"/>
+              <a:t>e.g</a:t>
+            </a:r>
+            <a:r>
+              <a:rPr lang="en-US" sz="1400" b="1" dirty="0"/>
+              <a:t>: </a:t>
+            </a:r>
+            <a:r>
+              <a:rPr lang="en-US" sz="1400" dirty="0" smtClean="0"/>
+              <a:t>Monte </a:t>
+            </a:r>
+            <a:r>
+              <a:rPr lang="en-US" sz="1400" dirty="0"/>
+              <a:t>Carlo, Q-learning, SARSA</a:t>
+            </a:r>
+            <a:r>
+              <a:rPr lang="en-US" sz="1400" dirty="0"/>
+              <a:t>, DQN, A3C, </a:t>
+            </a:r>
+            <a:r>
+              <a:rPr lang="en-US" sz="1400" dirty="0"/>
+              <a:t>NAF, PPO</a:t>
+            </a:r>
+            <a:r>
+              <a:rPr lang="en-US" sz="1400" dirty="0"/>
+              <a:t>, </a:t>
+            </a:r>
+            <a:r>
+              <a:rPr lang="en-US" sz="1400" dirty="0" smtClean="0"/>
+              <a:t>TRPO</a:t>
+            </a:r>
+            <a:endParaRPr lang="en-US" sz="1400" dirty="0"/>
           </a:p>
         </p:txBody>
       </p:sp>
@@ -14414,14 +14765,14 @@
                 <a:gridCol w="5035931">
                   <a:extLst>
                     <a:ext uri="{9D8B030D-6E8A-4147-A177-3AD203B41FA5}">
-                      <a16:colId xmlns:a16="http://schemas.microsoft.com/office/drawing/2014/main" xmlns="" val="20000"/>
+                      <a16:colId xmlns="" xmlns:a16="http://schemas.microsoft.com/office/drawing/2014/main" val="20000"/>
                     </a:ext>
                   </a:extLst>
                 </a:gridCol>
                 <a:gridCol w="5022469">
                   <a:extLst>
                     <a:ext uri="{9D8B030D-6E8A-4147-A177-3AD203B41FA5}">
-                      <a16:colId xmlns:a16="http://schemas.microsoft.com/office/drawing/2014/main" xmlns="" val="20001"/>
+                      <a16:colId xmlns="" xmlns:a16="http://schemas.microsoft.com/office/drawing/2014/main" val="20001"/>
                     </a:ext>
                   </a:extLst>
                 </a:gridCol>
@@ -14501,7 +14852,7 @@
                 </a:tc>
                 <a:extLst>
                   <a:ext uri="{0D108BD9-81ED-4DB2-BD59-A6C34878D82A}">
-                    <a16:rowId xmlns:a16="http://schemas.microsoft.com/office/drawing/2014/main" xmlns="" val="10000"/>
+                    <a16:rowId xmlns="" xmlns:a16="http://schemas.microsoft.com/office/drawing/2014/main" val="10000"/>
                   </a:ext>
                 </a:extLst>
               </a:tr>
@@ -14588,7 +14939,7 @@
                 </a:tc>
                 <a:extLst>
                   <a:ext uri="{0D108BD9-81ED-4DB2-BD59-A6C34878D82A}">
-                    <a16:rowId xmlns:a16="http://schemas.microsoft.com/office/drawing/2014/main" xmlns="" val="10001"/>
+                    <a16:rowId xmlns="" xmlns:a16="http://schemas.microsoft.com/office/drawing/2014/main" val="10001"/>
                   </a:ext>
                 </a:extLst>
               </a:tr>
@@ -14691,7 +15042,7 @@
                 </a:tc>
                 <a:extLst>
                   <a:ext uri="{0D108BD9-81ED-4DB2-BD59-A6C34878D82A}">
-                    <a16:rowId xmlns:a16="http://schemas.microsoft.com/office/drawing/2014/main" xmlns="" val="10002"/>
+                    <a16:rowId xmlns="" xmlns:a16="http://schemas.microsoft.com/office/drawing/2014/main" val="10002"/>
                   </a:ext>
                 </a:extLst>
               </a:tr>

</xml_diff>

<commit_message>
added picture to classification page
added picture to classification page
</commit_message>
<xml_diff>
--- a/Project Interim Submission/Generic DS Framework.pptx
+++ b/Project Interim Submission/Generic DS Framework.pptx
@@ -3565,82 +3565,82 @@
     </dgm:pt>
   </dgm:ptLst>
   <dgm:cxnLst>
-    <dgm:cxn modelId="{7A6B7DFA-AF2C-46D0-9BF7-1A6F2A4BD05F}" type="presOf" srcId="{82243891-7EAF-4E58-B342-FB3AEF7D96D8}" destId="{AAC078B5-22C6-4465-AC60-50B89A62DAA4}" srcOrd="0" destOrd="0" presId="urn:microsoft.com/office/officeart/2005/8/layout/orgChart1"/>
-    <dgm:cxn modelId="{D4A13C56-EB94-4538-AEB3-2A061DCE865E}" srcId="{51C939BC-1F71-4B4B-B76E-5AB02C7C5227}" destId="{AB5982FD-D354-4AAA-B978-F9826D0D05FB}" srcOrd="1" destOrd="0" parTransId="{64BCB35C-1AA8-4805-AE44-941DC0666BE4}" sibTransId="{F8A871A7-1431-40C2-8D1E-3F46A7492963}"/>
-    <dgm:cxn modelId="{A8107FC3-6D18-4968-ADAB-112DB844FD6C}" type="presOf" srcId="{AB5982FD-D354-4AAA-B978-F9826D0D05FB}" destId="{9D123678-09FF-430E-9CD4-847B9B41C9E6}" srcOrd="1" destOrd="0" presId="urn:microsoft.com/office/officeart/2005/8/layout/orgChart1"/>
-    <dgm:cxn modelId="{9FE69CA7-02A8-4923-B8F4-A5DECC562316}" type="presOf" srcId="{B3E11DF4-0A70-40F4-A9F3-378E2202AE1D}" destId="{E8CF98EA-1E11-4C8B-B3DC-A8B8C9716700}" srcOrd="0" destOrd="0" presId="urn:microsoft.com/office/officeart/2005/8/layout/orgChart1"/>
-    <dgm:cxn modelId="{FCF7D859-A8C6-4A69-ACE7-6EBD0F233C30}" type="presOf" srcId="{D5432636-319A-4212-83DB-9D3BA6AA54A9}" destId="{AA253CD6-C0DA-4C21-9B15-7211D0914EE5}" srcOrd="0" destOrd="0" presId="urn:microsoft.com/office/officeart/2005/8/layout/orgChart1"/>
+    <dgm:cxn modelId="{DF1FF10C-2385-4496-A025-967A40CBD7A2}" type="presOf" srcId="{2A1734E5-F350-4043-A59D-090A5C851E96}" destId="{E65AAA3D-6EDF-4733-A476-6E661CF70E36}" srcOrd="1" destOrd="0" presId="urn:microsoft.com/office/officeart/2005/8/layout/orgChart1"/>
+    <dgm:cxn modelId="{EC9B6DDA-4079-451C-AA2A-4CC8ABD15E1E}" srcId="{A7E2D81E-7900-4DF4-BEF5-77A2812B0C4E}" destId="{2A1734E5-F350-4043-A59D-090A5C851E96}" srcOrd="2" destOrd="0" parTransId="{E2FCDC95-A76F-447E-B7A8-96053D2336AC}" sibTransId="{1BA36650-D456-4FCA-ABBC-F4EEE6270BCA}"/>
+    <dgm:cxn modelId="{63957BFE-6189-47C3-8B38-C33EAFDBB625}" srcId="{998DBD50-443E-466A-9688-66A52BCFB283}" destId="{DD18F73E-5873-4440-AD2A-CB98A7E335BB}" srcOrd="0" destOrd="0" parTransId="{5B6E6A94-B82E-45A0-B538-B423850E5FD3}" sibTransId="{9786C01A-E46D-4E4C-952B-67F9C5AB60A3}"/>
+    <dgm:cxn modelId="{E7F7BF8F-EE5F-4676-BDAC-E110E82FDA6F}" type="presOf" srcId="{DD18F73E-5873-4440-AD2A-CB98A7E335BB}" destId="{7527F677-2F8C-4154-ADCF-5A9B516211C5}" srcOrd="0" destOrd="0" presId="urn:microsoft.com/office/officeart/2005/8/layout/orgChart1"/>
+    <dgm:cxn modelId="{B90982DA-E1CB-43C2-9643-4ECB399A3CBC}" type="presOf" srcId="{998DBD50-443E-466A-9688-66A52BCFB283}" destId="{F5D3DEFB-AE85-4939-AB97-E915462269C0}" srcOrd="0" destOrd="0" presId="urn:microsoft.com/office/officeart/2005/8/layout/orgChart1"/>
+    <dgm:cxn modelId="{AA527D19-A024-4500-8A09-2D410AABF130}" type="presOf" srcId="{DD18F73E-5873-4440-AD2A-CB98A7E335BB}" destId="{24D69D00-71EB-421A-A1CD-E1399AFDD654}" srcOrd="1" destOrd="0" presId="urn:microsoft.com/office/officeart/2005/8/layout/orgChart1"/>
+    <dgm:cxn modelId="{79528653-A03B-4870-8A6A-410571D115D3}" type="presOf" srcId="{51C939BC-1F71-4B4B-B76E-5AB02C7C5227}" destId="{26FA5C1D-10E1-45CD-A1D3-744EEEC37631}" srcOrd="1" destOrd="0" presId="urn:microsoft.com/office/officeart/2005/8/layout/orgChart1"/>
+    <dgm:cxn modelId="{65D0E857-80DD-4041-83CE-8C50597B830A}" type="presOf" srcId="{31976A02-02B1-412A-B691-02C3A6880CD3}" destId="{36B3E81A-E148-4D3B-88E5-4419A3BAFF40}" srcOrd="0" destOrd="0" presId="urn:microsoft.com/office/officeart/2005/8/layout/orgChart1"/>
     <dgm:cxn modelId="{855D9E2B-03E2-41B3-895F-0198D29F1009}" type="presOf" srcId="{3C5DF98A-9E49-4EBC-AA28-3E96D9B53B39}" destId="{21695C6D-5845-4B94-8EDE-C845DA7BA21E}" srcOrd="0" destOrd="0" presId="urn:microsoft.com/office/officeart/2005/8/layout/orgChart1"/>
-    <dgm:cxn modelId="{F56EA288-A208-43A9-BC15-07480867F718}" type="presOf" srcId="{CF665F69-5C99-4ABA-84BB-EE78294ED608}" destId="{0EA51ED5-D16D-4D92-B6FA-B66031566B6A}" srcOrd="1" destOrd="0" presId="urn:microsoft.com/office/officeart/2005/8/layout/orgChart1"/>
+    <dgm:cxn modelId="{3652CE73-9339-44DF-877F-2A4347BDCFDB}" type="presOf" srcId="{8F21D5B7-1E81-4E68-9A3B-41478D9E578F}" destId="{14A65CCA-D715-46D8-B448-593158ED3247}" srcOrd="1" destOrd="0" presId="urn:microsoft.com/office/officeart/2005/8/layout/orgChart1"/>
+    <dgm:cxn modelId="{6DDE05DA-2CC4-4A86-986C-5CBE3D44190A}" type="presOf" srcId="{6CEB8C34-32A9-47E6-A405-A04B3711CFB7}" destId="{087E6E65-2112-476B-A4AA-3A36C7628514}" srcOrd="0" destOrd="0" presId="urn:microsoft.com/office/officeart/2005/8/layout/orgChart1"/>
     <dgm:cxn modelId="{C3A31E5B-D7BF-45EA-9802-6D3D083F2984}" type="presOf" srcId="{A3D548BD-E471-4C3A-9014-C70E7E2B5BFD}" destId="{2D94B2C8-24C9-4949-954A-EDC01FC95EB8}" srcOrd="0" destOrd="0" presId="urn:microsoft.com/office/officeart/2005/8/layout/orgChart1"/>
-    <dgm:cxn modelId="{73D1DC3E-5AF2-43C6-AE9C-C378299A836A}" type="presOf" srcId="{CBAC9813-60C7-4469-BF09-A874065B34A7}" destId="{F6217F3C-65DD-408C-AC11-C96C35846B77}" srcOrd="0" destOrd="0" presId="urn:microsoft.com/office/officeart/2005/8/layout/orgChart1"/>
-    <dgm:cxn modelId="{F864C8BC-B8C9-4962-ABB8-1D4DB46F4EA9}" srcId="{C9F271EB-AA97-406F-A22E-048A336DC94A}" destId="{B23CD900-37E2-45DE-B384-F9885D55838B}" srcOrd="0" destOrd="0" parTransId="{C6CC40CD-5626-4A19-9936-F67709EE7AF0}" sibTransId="{4EC04109-3134-4314-B119-98550E78BF07}"/>
-    <dgm:cxn modelId="{B90982DA-E1CB-43C2-9643-4ECB399A3CBC}" type="presOf" srcId="{998DBD50-443E-466A-9688-66A52BCFB283}" destId="{F5D3DEFB-AE85-4939-AB97-E915462269C0}" srcOrd="0" destOrd="0" presId="urn:microsoft.com/office/officeart/2005/8/layout/orgChart1"/>
-    <dgm:cxn modelId="{29D3F1C6-D8C1-4696-9225-7574825892FA}" srcId="{F8118993-C3C6-4246-A6BF-F9F2EC3DC9CB}" destId="{2AB59A33-B6A6-40FF-98F7-711698F4D26B}" srcOrd="0" destOrd="0" parTransId="{C1DBF8BC-E021-419E-A78A-05014B36B3B1}" sibTransId="{39934AF9-B63A-4C68-8C74-12CFA5946906}"/>
-    <dgm:cxn modelId="{3652CE73-9339-44DF-877F-2A4347BDCFDB}" type="presOf" srcId="{8F21D5B7-1E81-4E68-9A3B-41478D9E578F}" destId="{14A65CCA-D715-46D8-B448-593158ED3247}" srcOrd="1" destOrd="0" presId="urn:microsoft.com/office/officeart/2005/8/layout/orgChart1"/>
+    <dgm:cxn modelId="{A4FD5072-445C-4BF4-99DD-5F1BDAD862DA}" srcId="{C9F271EB-AA97-406F-A22E-048A336DC94A}" destId="{6CEB8C34-32A9-47E6-A405-A04B3711CFB7}" srcOrd="1" destOrd="0" parTransId="{9DFE08AD-6D40-40B9-8C6C-0D9B748E71FD}" sibTransId="{05E40D46-9D4A-4AE0-8A7C-2E5D2787A5C2}"/>
     <dgm:cxn modelId="{16C1F492-6F23-441E-8C79-9308ED1456B5}" type="presOf" srcId="{B23CD900-37E2-45DE-B384-F9885D55838B}" destId="{82AF4305-DDE7-4632-85B6-1B4672473DDD}" srcOrd="1" destOrd="0" presId="urn:microsoft.com/office/officeart/2005/8/layout/orgChart1"/>
-    <dgm:cxn modelId="{EC9B6DDA-4079-451C-AA2A-4CC8ABD15E1E}" srcId="{A7E2D81E-7900-4DF4-BEF5-77A2812B0C4E}" destId="{2A1734E5-F350-4043-A59D-090A5C851E96}" srcOrd="2" destOrd="0" parTransId="{E2FCDC95-A76F-447E-B7A8-96053D2336AC}" sibTransId="{1BA36650-D456-4FCA-ABBC-F4EEE6270BCA}"/>
-    <dgm:cxn modelId="{87C8B196-323D-4EB7-8C11-259CEDD39083}" type="presOf" srcId="{AB5982FD-D354-4AAA-B978-F9826D0D05FB}" destId="{A48D18B2-265E-4299-AC55-85A70F37F6FA}" srcOrd="0" destOrd="0" presId="urn:microsoft.com/office/officeart/2005/8/layout/orgChart1"/>
-    <dgm:cxn modelId="{54CCCEDE-ECD4-498C-B465-8CA9F82A49C5}" type="presOf" srcId="{F8118993-C3C6-4246-A6BF-F9F2EC3DC9CB}" destId="{A2BECFDC-6DED-4CEA-B9D1-694651AD4E09}" srcOrd="1" destOrd="0" presId="urn:microsoft.com/office/officeart/2005/8/layout/orgChart1"/>
-    <dgm:cxn modelId="{701FBC72-4CA4-403B-9C1B-0720F2EB9273}" type="presOf" srcId="{F0588C2A-6766-47BF-AE7C-52B851FABC21}" destId="{09C02F37-0DFF-472D-BC6B-B6584867F159}" srcOrd="1" destOrd="0" presId="urn:microsoft.com/office/officeart/2005/8/layout/orgChart1"/>
-    <dgm:cxn modelId="{65D0E857-80DD-4041-83CE-8C50597B830A}" type="presOf" srcId="{31976A02-02B1-412A-B691-02C3A6880CD3}" destId="{36B3E81A-E148-4D3B-88E5-4419A3BAFF40}" srcOrd="0" destOrd="0" presId="urn:microsoft.com/office/officeart/2005/8/layout/orgChart1"/>
-    <dgm:cxn modelId="{2058D512-BFDC-429D-8108-A884B1DF591E}" type="presOf" srcId="{9FCE91AE-B52F-45FA-A0C5-CA2E6E43F0FC}" destId="{DFAC233F-FFFB-4BE5-9FC7-55A2752E1DAD}" srcOrd="0" destOrd="0" presId="urn:microsoft.com/office/officeart/2005/8/layout/orgChart1"/>
-    <dgm:cxn modelId="{5AD1E491-93BF-4390-A05D-1A6277716063}" type="presOf" srcId="{CC818131-8C0B-4D2C-AEA4-5A1BD3A6EFF3}" destId="{3E8697EF-F0C0-442C-AC8F-AF21953408C4}" srcOrd="0" destOrd="0" presId="urn:microsoft.com/office/officeart/2005/8/layout/orgChart1"/>
-    <dgm:cxn modelId="{9A9E885B-6395-49FB-9E85-9D1E8F64238A}" type="presOf" srcId="{810F6CE3-7B9A-4BC5-B642-3E284064AEB8}" destId="{27D617F6-CD92-4160-85E9-3D135DEE9C6C}" srcOrd="0" destOrd="0" presId="urn:microsoft.com/office/officeart/2005/8/layout/orgChart1"/>
-    <dgm:cxn modelId="{794BC4DB-07B9-4B18-835E-CC6189AFDB89}" type="presOf" srcId="{C1DBF8BC-E021-419E-A78A-05014B36B3B1}" destId="{3D07C967-7F5A-4259-8C92-44D4DA2F7550}" srcOrd="0" destOrd="0" presId="urn:microsoft.com/office/officeart/2005/8/layout/orgChart1"/>
-    <dgm:cxn modelId="{07BFF742-37D9-4F3A-8BCA-5FA7F3B3FFDA}" type="presOf" srcId="{51C939BC-1F71-4B4B-B76E-5AB02C7C5227}" destId="{617A3543-3392-450A-AE60-926A208DA196}" srcOrd="0" destOrd="0" presId="urn:microsoft.com/office/officeart/2005/8/layout/orgChart1"/>
-    <dgm:cxn modelId="{74291408-E599-4241-9208-778B25B35419}" type="presOf" srcId="{5AF5E628-F524-43D4-9C5A-5A8189560301}" destId="{C6B5F02F-BF16-4258-AC5A-D980E6777BDC}" srcOrd="1" destOrd="0" presId="urn:microsoft.com/office/officeart/2005/8/layout/orgChart1"/>
-    <dgm:cxn modelId="{AA527D19-A024-4500-8A09-2D410AABF130}" type="presOf" srcId="{DD18F73E-5873-4440-AD2A-CB98A7E335BB}" destId="{24D69D00-71EB-421A-A1CD-E1399AFDD654}" srcOrd="1" destOrd="0" presId="urn:microsoft.com/office/officeart/2005/8/layout/orgChart1"/>
+    <dgm:cxn modelId="{3D6039C9-601D-4282-8BBF-03FEEA76F5F3}" type="presOf" srcId="{E2FCDC95-A76F-447E-B7A8-96053D2336AC}" destId="{75994A22-3790-4219-8C34-EFB1A172683C}" srcOrd="0" destOrd="0" presId="urn:microsoft.com/office/officeart/2005/8/layout/orgChart1"/>
     <dgm:cxn modelId="{EC2000F8-6406-4F91-AC03-67371B9EF307}" type="presOf" srcId="{CEB0D96F-42A5-4903-B863-AD62B81F61AE}" destId="{D81F13DE-77CA-4947-A9D8-3B9405F7FB4A}" srcOrd="0" destOrd="0" presId="urn:microsoft.com/office/officeart/2005/8/layout/orgChart1"/>
-    <dgm:cxn modelId="{79528653-A03B-4870-8A6A-410571D115D3}" type="presOf" srcId="{51C939BC-1F71-4B4B-B76E-5AB02C7C5227}" destId="{26FA5C1D-10E1-45CD-A1D3-744EEEC37631}" srcOrd="1" destOrd="0" presId="urn:microsoft.com/office/officeart/2005/8/layout/orgChart1"/>
-    <dgm:cxn modelId="{3A8D22D7-D5E6-464A-8BEE-727F9246E9EE}" srcId="{F8118993-C3C6-4246-A6BF-F9F2EC3DC9CB}" destId="{CC818131-8C0B-4D2C-AEA4-5A1BD3A6EFF3}" srcOrd="1" destOrd="0" parTransId="{A3D548BD-E471-4C3A-9014-C70E7E2B5BFD}" sibTransId="{1E143EFF-2729-40A1-84B3-E819EDF8B7B2}"/>
-    <dgm:cxn modelId="{8D0015CC-72CA-4964-8D64-FA31789A0CF7}" type="presOf" srcId="{C9F271EB-AA97-406F-A22E-048A336DC94A}" destId="{EF58EAAC-E8FC-4E92-AC54-3E70E3CCE427}" srcOrd="0" destOrd="0" presId="urn:microsoft.com/office/officeart/2005/8/layout/orgChart1"/>
-    <dgm:cxn modelId="{711E14F9-8AF4-4019-8C8C-9FE45B7D3E7C}" type="presOf" srcId="{9DFE08AD-6D40-40B9-8C6C-0D9B748E71FD}" destId="{8D8E53BF-D23C-4E66-A64D-69E3B5A64376}" srcOrd="0" destOrd="0" presId="urn:microsoft.com/office/officeart/2005/8/layout/orgChart1"/>
-    <dgm:cxn modelId="{22930F4D-DE10-45E5-ACDC-A461022FFBA9}" srcId="{51C939BC-1F71-4B4B-B76E-5AB02C7C5227}" destId="{998DBD50-443E-466A-9688-66A52BCFB283}" srcOrd="0" destOrd="0" parTransId="{9FCE91AE-B52F-45FA-A0C5-CA2E6E43F0FC}" sibTransId="{1642DE8E-03D4-4062-A10D-83B597A79491}"/>
-    <dgm:cxn modelId="{D08B451E-BCB5-4E0B-8342-ED0CFBDE97DB}" type="presOf" srcId="{F8118993-C3C6-4246-A6BF-F9F2EC3DC9CB}" destId="{23D4122E-B967-488C-8CB8-9B0B4654BF0E}" srcOrd="0" destOrd="0" presId="urn:microsoft.com/office/officeart/2005/8/layout/orgChart1"/>
-    <dgm:cxn modelId="{4D7522AD-EF42-4E61-860F-C5EE7ADC920F}" srcId="{A7E2D81E-7900-4DF4-BEF5-77A2812B0C4E}" destId="{4BD105F0-FCB2-4292-8534-EF3F82555BF1}" srcOrd="1" destOrd="0" parTransId="{82243891-7EAF-4E58-B342-FB3AEF7D96D8}" sibTransId="{1B73A89F-B150-403E-8069-7813E3E859D3}"/>
-    <dgm:cxn modelId="{A1CD0581-8F25-4433-BCB3-403F201DCE98}" srcId="{31976A02-02B1-412A-B691-02C3A6880CD3}" destId="{A7E2D81E-7900-4DF4-BEF5-77A2812B0C4E}" srcOrd="0" destOrd="0" parTransId="{5E9185FC-D944-454A-8EDB-88DDB1EC156B}" sibTransId="{6CE37D0C-36BB-4B53-B0BC-4BBCC03B877F}"/>
-    <dgm:cxn modelId="{3FFF7750-E39A-400B-867E-3AD7510BEE79}" type="presOf" srcId="{4BD105F0-FCB2-4292-8534-EF3F82555BF1}" destId="{3780879A-AD2D-405D-977E-4451EF3CA5AD}" srcOrd="0" destOrd="0" presId="urn:microsoft.com/office/officeart/2005/8/layout/orgChart1"/>
-    <dgm:cxn modelId="{F1E4A56E-64BE-44F4-8E42-D61EDD68880B}" srcId="{26CDFC28-47AA-4502-887A-33E7C0CE0838}" destId="{F0588C2A-6766-47BF-AE7C-52B851FABC21}" srcOrd="0" destOrd="0" parTransId="{5ED6D770-BF3B-4684-98EB-5ABB516FF23D}" sibTransId="{AFD6C0FD-0670-49CC-B34D-0E113DDEE343}"/>
     <dgm:cxn modelId="{3E527903-2969-4BE6-A44A-67C70C96E603}" type="presOf" srcId="{4BD105F0-FCB2-4292-8534-EF3F82555BF1}" destId="{432E8FE3-B9B9-442A-A4A0-5A0F509E161A}" srcOrd="1" destOrd="0" presId="urn:microsoft.com/office/officeart/2005/8/layout/orgChart1"/>
     <dgm:cxn modelId="{B382F07A-E779-468F-8018-7984C1FE1CF1}" type="presOf" srcId="{26CDFC28-47AA-4502-887A-33E7C0CE0838}" destId="{4780D492-11D4-4975-B35A-476D05181A39}" srcOrd="1" destOrd="0" presId="urn:microsoft.com/office/officeart/2005/8/layout/orgChart1"/>
+    <dgm:cxn modelId="{06EB2273-9FAF-4E8B-B25D-B647F848AA12}" type="presOf" srcId="{A7E2D81E-7900-4DF4-BEF5-77A2812B0C4E}" destId="{C91E4177-0B62-4588-885D-1A4C3BD2BAF7}" srcOrd="1" destOrd="0" presId="urn:microsoft.com/office/officeart/2005/8/layout/orgChart1"/>
+    <dgm:cxn modelId="{22930F4D-DE10-45E5-ACDC-A461022FFBA9}" srcId="{51C939BC-1F71-4B4B-B76E-5AB02C7C5227}" destId="{998DBD50-443E-466A-9688-66A52BCFB283}" srcOrd="0" destOrd="0" parTransId="{9FCE91AE-B52F-45FA-A0C5-CA2E6E43F0FC}" sibTransId="{1642DE8E-03D4-4062-A10D-83B597A79491}"/>
     <dgm:cxn modelId="{1B284198-CAF5-4CC2-BF48-541C8C13B704}" type="presOf" srcId="{2AB59A33-B6A6-40FF-98F7-711698F4D26B}" destId="{DE7689F0-0909-4DF0-993D-DF1D19A454E0}" srcOrd="1" destOrd="0" presId="urn:microsoft.com/office/officeart/2005/8/layout/orgChart1"/>
+    <dgm:cxn modelId="{2D8C82CF-8261-498E-8D04-AFAB3415C828}" srcId="{6CEB8C34-32A9-47E6-A405-A04B3711CFB7}" destId="{5AF5E628-F524-43D4-9C5A-5A8189560301}" srcOrd="0" destOrd="0" parTransId="{B3E11DF4-0A70-40F4-A9F3-378E2202AE1D}" sibTransId="{79E1E6F3-8832-4EDA-9B35-6A23A6E78C38}"/>
+    <dgm:cxn modelId="{73D1DC3E-5AF2-43C6-AE9C-C378299A836A}" type="presOf" srcId="{CBAC9813-60C7-4469-BF09-A874065B34A7}" destId="{F6217F3C-65DD-408C-AC11-C96C35846B77}" srcOrd="0" destOrd="0" presId="urn:microsoft.com/office/officeart/2005/8/layout/orgChart1"/>
+    <dgm:cxn modelId="{A1CD0581-8F25-4433-BCB3-403F201DCE98}" srcId="{31976A02-02B1-412A-B691-02C3A6880CD3}" destId="{A7E2D81E-7900-4DF4-BEF5-77A2812B0C4E}" srcOrd="0" destOrd="0" parTransId="{5E9185FC-D944-454A-8EDB-88DDB1EC156B}" sibTransId="{6CE37D0C-36BB-4B53-B0BC-4BBCC03B877F}"/>
+    <dgm:cxn modelId="{DE92D672-1362-46B3-9B36-E204E35D3A8A}" srcId="{AB5982FD-D354-4AAA-B978-F9826D0D05FB}" destId="{CF665F69-5C99-4ABA-84BB-EE78294ED608}" srcOrd="0" destOrd="0" parTransId="{CBAC9813-60C7-4469-BF09-A874065B34A7}" sibTransId="{F6125F52-3FD9-4490-AD82-6F4F52591F18}"/>
+    <dgm:cxn modelId="{7F4CBF52-8E85-4962-B47C-2E9BB8838D4B}" type="presOf" srcId="{CF665F69-5C99-4ABA-84BB-EE78294ED608}" destId="{1F6BCCA0-2CCE-4CE0-BBC4-117FD2054979}" srcOrd="0" destOrd="0" presId="urn:microsoft.com/office/officeart/2005/8/layout/orgChart1"/>
+    <dgm:cxn modelId="{9FE69CA7-02A8-4923-B8F4-A5DECC562316}" type="presOf" srcId="{B3E11DF4-0A70-40F4-A9F3-378E2202AE1D}" destId="{E8CF98EA-1E11-4C8B-B3DC-A8B8C9716700}" srcOrd="0" destOrd="0" presId="urn:microsoft.com/office/officeart/2005/8/layout/orgChart1"/>
+    <dgm:cxn modelId="{8CBE4C9A-8DBD-4F86-806A-74F82BAF13CF}" type="presOf" srcId="{26CDFC28-47AA-4502-887A-33E7C0CE0838}" destId="{B9EF6254-674C-4CF7-8107-B9DBCC5CC06C}" srcOrd="0" destOrd="0" presId="urn:microsoft.com/office/officeart/2005/8/layout/orgChart1"/>
+    <dgm:cxn modelId="{A8107FC3-6D18-4968-ADAB-112DB844FD6C}" type="presOf" srcId="{AB5982FD-D354-4AAA-B978-F9826D0D05FB}" destId="{9D123678-09FF-430E-9CD4-847B9B41C9E6}" srcOrd="1" destOrd="0" presId="urn:microsoft.com/office/officeart/2005/8/layout/orgChart1"/>
+    <dgm:cxn modelId="{63B04F08-C750-4C7A-B49E-BEE5344BBD39}" type="presOf" srcId="{C9F271EB-AA97-406F-A22E-048A336DC94A}" destId="{0CDB574B-8A16-4575-B86E-72EE9B15201E}" srcOrd="1" destOrd="0" presId="urn:microsoft.com/office/officeart/2005/8/layout/orgChart1"/>
+    <dgm:cxn modelId="{DB030D6B-BB16-4AB3-BD3B-676A1CBC0A28}" type="presOf" srcId="{A9576EC0-F780-411F-A988-792BB4B5827F}" destId="{B4236978-BB7B-465F-A15B-A4753285650F}" srcOrd="0" destOrd="0" presId="urn:microsoft.com/office/officeart/2005/8/layout/orgChart1"/>
+    <dgm:cxn modelId="{8137AEC6-67AB-4747-A01B-8846F373EF92}" type="presOf" srcId="{2A1734E5-F350-4043-A59D-090A5C851E96}" destId="{632D20A3-D474-4945-BEC3-702EAB53AF00}" srcOrd="0" destOrd="0" presId="urn:microsoft.com/office/officeart/2005/8/layout/orgChart1"/>
+    <dgm:cxn modelId="{585916E3-B9E6-418F-BBFC-91743B566955}" type="presOf" srcId="{5ED6D770-BF3B-4684-98EB-5ABB516FF23D}" destId="{5871E8CC-FA46-4584-AC5E-0BFF5BB7E6D6}" srcOrd="0" destOrd="0" presId="urn:microsoft.com/office/officeart/2005/8/layout/orgChart1"/>
+    <dgm:cxn modelId="{3FFF7750-E39A-400B-867E-3AD7510BEE79}" type="presOf" srcId="{4BD105F0-FCB2-4292-8534-EF3F82555BF1}" destId="{3780879A-AD2D-405D-977E-4451EF3CA5AD}" srcOrd="0" destOrd="0" presId="urn:microsoft.com/office/officeart/2005/8/layout/orgChart1"/>
+    <dgm:cxn modelId="{5AD1E491-93BF-4390-A05D-1A6277716063}" type="presOf" srcId="{CC818131-8C0B-4D2C-AEA4-5A1BD3A6EFF3}" destId="{3E8697EF-F0C0-442C-AC8F-AF21953408C4}" srcOrd="0" destOrd="0" presId="urn:microsoft.com/office/officeart/2005/8/layout/orgChart1"/>
+    <dgm:cxn modelId="{4D7522AD-EF42-4E61-860F-C5EE7ADC920F}" srcId="{A7E2D81E-7900-4DF4-BEF5-77A2812B0C4E}" destId="{4BD105F0-FCB2-4292-8534-EF3F82555BF1}" srcOrd="1" destOrd="0" parTransId="{82243891-7EAF-4E58-B342-FB3AEF7D96D8}" sibTransId="{1B73A89F-B150-403E-8069-7813E3E859D3}"/>
+    <dgm:cxn modelId="{2058D512-BFDC-429D-8108-A884B1DF591E}" type="presOf" srcId="{9FCE91AE-B52F-45FA-A0C5-CA2E6E43F0FC}" destId="{DFAC233F-FFFB-4BE5-9FC7-55A2752E1DAD}" srcOrd="0" destOrd="0" presId="urn:microsoft.com/office/officeart/2005/8/layout/orgChart1"/>
+    <dgm:cxn modelId="{F1E4A56E-64BE-44F4-8E42-D61EDD68880B}" srcId="{26CDFC28-47AA-4502-887A-33E7C0CE0838}" destId="{F0588C2A-6766-47BF-AE7C-52B851FABC21}" srcOrd="0" destOrd="0" parTransId="{5ED6D770-BF3B-4684-98EB-5ABB516FF23D}" sibTransId="{AFD6C0FD-0670-49CC-B34D-0E113DDEE343}"/>
+    <dgm:cxn modelId="{A25B346A-AF67-44D0-A601-4D4A0B7FEEC8}" srcId="{A7E2D81E-7900-4DF4-BEF5-77A2812B0C4E}" destId="{C9F271EB-AA97-406F-A22E-048A336DC94A}" srcOrd="0" destOrd="0" parTransId="{CEB0D96F-42A5-4903-B863-AD62B81F61AE}" sibTransId="{994C4CAB-5619-4281-B81C-1EBED1C2EFE7}"/>
+    <dgm:cxn modelId="{F4CB865C-996A-492E-9E5F-2B17DE9381E0}" srcId="{26CDFC28-47AA-4502-887A-33E7C0CE0838}" destId="{8F21D5B7-1E81-4E68-9A3B-41478D9E578F}" srcOrd="1" destOrd="0" parTransId="{810F6CE3-7B9A-4BC5-B642-3E284064AEB8}" sibTransId="{0C0A6C55-CE4D-42AC-8392-A28B6E9C2042}"/>
+    <dgm:cxn modelId="{54CCCEDE-ECD4-498C-B465-8CA9F82A49C5}" type="presOf" srcId="{F8118993-C3C6-4246-A6BF-F9F2EC3DC9CB}" destId="{A2BECFDC-6DED-4CEA-B9D1-694651AD4E09}" srcOrd="1" destOrd="0" presId="urn:microsoft.com/office/officeart/2005/8/layout/orgChart1"/>
+    <dgm:cxn modelId="{079B3109-107E-4D2E-99FC-71764D1796B1}" type="presOf" srcId="{B23CD900-37E2-45DE-B384-F9885D55838B}" destId="{F6A2B30B-A958-479B-AD92-8D9166487761}" srcOrd="0" destOrd="0" presId="urn:microsoft.com/office/officeart/2005/8/layout/orgChart1"/>
+    <dgm:cxn modelId="{F3B26E1E-6947-4159-918E-E138CED3D239}" srcId="{B23CD900-37E2-45DE-B384-F9885D55838B}" destId="{A9576EC0-F780-411F-A988-792BB4B5827F}" srcOrd="0" destOrd="0" parTransId="{3C5DF98A-9E49-4EBC-AA28-3E96D9B53B39}" sibTransId="{4568403F-227F-414F-9181-6C36CA1FB882}"/>
+    <dgm:cxn modelId="{275E1EA8-9958-4385-AD1D-0D70F2B2E97E}" type="presOf" srcId="{998DBD50-443E-466A-9688-66A52BCFB283}" destId="{291B4844-977C-4B0C-9CCC-F7511A56BE71}" srcOrd="1" destOrd="0" presId="urn:microsoft.com/office/officeart/2005/8/layout/orgChart1"/>
+    <dgm:cxn modelId="{B8E816F8-7FA7-46B3-B6D5-3CE42BCFB40A}" srcId="{2A1734E5-F350-4043-A59D-090A5C851E96}" destId="{26CDFC28-47AA-4502-887A-33E7C0CE0838}" srcOrd="0" destOrd="0" parTransId="{3196F628-F850-402C-8DFF-32FDBF641FAF}" sibTransId="{31721E21-E4E4-40B3-A55D-F290C2DF3887}"/>
+    <dgm:cxn modelId="{3A8D22D7-D5E6-464A-8BEE-727F9246E9EE}" srcId="{F8118993-C3C6-4246-A6BF-F9F2EC3DC9CB}" destId="{CC818131-8C0B-4D2C-AEA4-5A1BD3A6EFF3}" srcOrd="1" destOrd="0" parTransId="{A3D548BD-E471-4C3A-9014-C70E7E2B5BFD}" sibTransId="{1E143EFF-2729-40A1-84B3-E819EDF8B7B2}"/>
+    <dgm:cxn modelId="{964962C0-3F9A-405E-B7CF-7320CA058054}" srcId="{4BD105F0-FCB2-4292-8534-EF3F82555BF1}" destId="{F8118993-C3C6-4246-A6BF-F9F2EC3DC9CB}" srcOrd="0" destOrd="0" parTransId="{763868FB-01C7-4C07-982A-E0002DD2F249}" sibTransId="{196FC47F-8F5E-4EE4-99DA-8228F767EF40}"/>
+    <dgm:cxn modelId="{EC81C075-A36A-401B-894E-F2172C22244B}" type="presOf" srcId="{5B6E6A94-B82E-45A0-B538-B423850E5FD3}" destId="{044C785A-5A95-4E11-98D2-B0C3A8153197}" srcOrd="0" destOrd="0" presId="urn:microsoft.com/office/officeart/2005/8/layout/orgChart1"/>
+    <dgm:cxn modelId="{29D3F1C6-D8C1-4696-9225-7574825892FA}" srcId="{F8118993-C3C6-4246-A6BF-F9F2EC3DC9CB}" destId="{2AB59A33-B6A6-40FF-98F7-711698F4D26B}" srcOrd="0" destOrd="0" parTransId="{C1DBF8BC-E021-419E-A78A-05014B36B3B1}" sibTransId="{39934AF9-B63A-4C68-8C74-12CFA5946906}"/>
+    <dgm:cxn modelId="{66587802-E1A1-4490-8EE6-DFFED4C0E387}" type="presOf" srcId="{8F21D5B7-1E81-4E68-9A3B-41478D9E578F}" destId="{9961A4E0-4305-4F81-8160-655C9A27D034}" srcOrd="0" destOrd="0" presId="urn:microsoft.com/office/officeart/2005/8/layout/orgChart1"/>
+    <dgm:cxn modelId="{87C8B196-323D-4EB7-8C11-259CEDD39083}" type="presOf" srcId="{AB5982FD-D354-4AAA-B978-F9826D0D05FB}" destId="{A48D18B2-265E-4299-AC55-85A70F37F6FA}" srcOrd="0" destOrd="0" presId="urn:microsoft.com/office/officeart/2005/8/layout/orgChart1"/>
+    <dgm:cxn modelId="{D4A13C56-EB94-4538-AEB3-2A061DCE865E}" srcId="{51C939BC-1F71-4B4B-B76E-5AB02C7C5227}" destId="{AB5982FD-D354-4AAA-B978-F9826D0D05FB}" srcOrd="1" destOrd="0" parTransId="{64BCB35C-1AA8-4805-AE44-941DC0666BE4}" sibTransId="{F8A871A7-1431-40C2-8D1E-3F46A7492963}"/>
+    <dgm:cxn modelId="{3F6EF168-B749-47B5-86FD-91ABA2C7D72E}" type="presOf" srcId="{A9576EC0-F780-411F-A988-792BB4B5827F}" destId="{3C3CC326-C1BB-4802-9C80-3024F7E2EFEC}" srcOrd="1" destOrd="0" presId="urn:microsoft.com/office/officeart/2005/8/layout/orgChart1"/>
+    <dgm:cxn modelId="{711E14F9-8AF4-4019-8C8C-9FE45B7D3E7C}" type="presOf" srcId="{9DFE08AD-6D40-40B9-8C6C-0D9B748E71FD}" destId="{8D8E53BF-D23C-4E66-A64D-69E3B5A64376}" srcOrd="0" destOrd="0" presId="urn:microsoft.com/office/officeart/2005/8/layout/orgChart1"/>
+    <dgm:cxn modelId="{5F5DBC77-905E-46B9-9C22-D2F5D1C757CB}" type="presOf" srcId="{6CEB8C34-32A9-47E6-A405-A04B3711CFB7}" destId="{F5F98A29-63BF-4AC3-9BF3-D3C7E3FF700B}" srcOrd="1" destOrd="0" presId="urn:microsoft.com/office/officeart/2005/8/layout/orgChart1"/>
+    <dgm:cxn modelId="{8D0015CC-72CA-4964-8D64-FA31789A0CF7}" type="presOf" srcId="{C9F271EB-AA97-406F-A22E-048A336DC94A}" destId="{EF58EAAC-E8FC-4E92-AC54-3E70E3CCE427}" srcOrd="0" destOrd="0" presId="urn:microsoft.com/office/officeart/2005/8/layout/orgChart1"/>
+    <dgm:cxn modelId="{D9F878CB-CD73-43B2-924C-4145A2798C53}" type="presOf" srcId="{CC818131-8C0B-4D2C-AEA4-5A1BD3A6EFF3}" destId="{D62139CB-9D8F-4560-A01D-A225FB31D9FF}" srcOrd="1" destOrd="0" presId="urn:microsoft.com/office/officeart/2005/8/layout/orgChart1"/>
+    <dgm:cxn modelId="{07BFF742-37D9-4F3A-8BCA-5FA7F3B3FFDA}" type="presOf" srcId="{51C939BC-1F71-4B4B-B76E-5AB02C7C5227}" destId="{617A3543-3392-450A-AE60-926A208DA196}" srcOrd="0" destOrd="0" presId="urn:microsoft.com/office/officeart/2005/8/layout/orgChart1"/>
+    <dgm:cxn modelId="{9A9E885B-6395-49FB-9E85-9D1E8F64238A}" type="presOf" srcId="{810F6CE3-7B9A-4BC5-B642-3E284064AEB8}" destId="{27D617F6-CD92-4160-85E9-3D135DEE9C6C}" srcOrd="0" destOrd="0" presId="urn:microsoft.com/office/officeart/2005/8/layout/orgChart1"/>
+    <dgm:cxn modelId="{2258E7B5-0D3B-4779-989F-0D2802E77E9D}" type="presOf" srcId="{2AB59A33-B6A6-40FF-98F7-711698F4D26B}" destId="{64076540-8FAD-4187-A304-8898DDD0C9A8}" srcOrd="0" destOrd="0" presId="urn:microsoft.com/office/officeart/2005/8/layout/orgChart1"/>
+    <dgm:cxn modelId="{F864C8BC-B8C9-4962-ABB8-1D4DB46F4EA9}" srcId="{C9F271EB-AA97-406F-A22E-048A336DC94A}" destId="{B23CD900-37E2-45DE-B384-F9885D55838B}" srcOrd="0" destOrd="0" parTransId="{C6CC40CD-5626-4A19-9936-F67709EE7AF0}" sibTransId="{4EC04109-3134-4314-B119-98550E78BF07}"/>
+    <dgm:cxn modelId="{5CA14EFE-56BA-428E-9344-6E54BD1CDAE3}" type="presOf" srcId="{A7E2D81E-7900-4DF4-BEF5-77A2812B0C4E}" destId="{91E1DAD5-A378-4F9D-90D3-E4D6E3B719CC}" srcOrd="0" destOrd="0" presId="urn:microsoft.com/office/officeart/2005/8/layout/orgChart1"/>
+    <dgm:cxn modelId="{CF4DF7D7-2777-4A2A-9B0C-8DEB23527131}" type="presOf" srcId="{C6CC40CD-5626-4A19-9936-F67709EE7AF0}" destId="{52AB23E0-53A6-4AC3-B89A-D72BC394F116}" srcOrd="0" destOrd="0" presId="urn:microsoft.com/office/officeart/2005/8/layout/orgChart1"/>
+    <dgm:cxn modelId="{7A6B7DFA-AF2C-46D0-9BF7-1A6F2A4BD05F}" type="presOf" srcId="{82243891-7EAF-4E58-B342-FB3AEF7D96D8}" destId="{AAC078B5-22C6-4465-AC60-50B89A62DAA4}" srcOrd="0" destOrd="0" presId="urn:microsoft.com/office/officeart/2005/8/layout/orgChart1"/>
+    <dgm:cxn modelId="{74291408-E599-4241-9208-778B25B35419}" type="presOf" srcId="{5AF5E628-F524-43D4-9C5A-5A8189560301}" destId="{C6B5F02F-BF16-4258-AC5A-D980E6777BDC}" srcOrd="1" destOrd="0" presId="urn:microsoft.com/office/officeart/2005/8/layout/orgChart1"/>
+    <dgm:cxn modelId="{5E6BA506-E2BF-4C29-92E3-F77F24013314}" type="presOf" srcId="{5AF5E628-F524-43D4-9C5A-5A8189560301}" destId="{710C924E-E30F-44DF-A6AA-7A0529BD66A0}" srcOrd="0" destOrd="0" presId="urn:microsoft.com/office/officeart/2005/8/layout/orgChart1"/>
+    <dgm:cxn modelId="{FCF7D859-A8C6-4A69-ACE7-6EBD0F233C30}" type="presOf" srcId="{D5432636-319A-4212-83DB-9D3BA6AA54A9}" destId="{AA253CD6-C0DA-4C21-9B15-7211D0914EE5}" srcOrd="0" destOrd="0" presId="urn:microsoft.com/office/officeart/2005/8/layout/orgChart1"/>
+    <dgm:cxn modelId="{5DC0E0BC-0122-42DE-9175-76DAAE24D215}" srcId="{A7E2D81E-7900-4DF4-BEF5-77A2812B0C4E}" destId="{51C939BC-1F71-4B4B-B76E-5AB02C7C5227}" srcOrd="3" destOrd="0" parTransId="{D5432636-319A-4212-83DB-9D3BA6AA54A9}" sibTransId="{C119049A-FECA-4579-956E-33C230BAA319}"/>
     <dgm:cxn modelId="{0B387FA4-F216-482B-AC2E-CAF30E8346BB}" type="presOf" srcId="{64BCB35C-1AA8-4805-AE44-941DC0666BE4}" destId="{06BFC016-E41C-49B3-B96E-72E532519536}" srcOrd="0" destOrd="0" presId="urn:microsoft.com/office/officeart/2005/8/layout/orgChart1"/>
-    <dgm:cxn modelId="{3D6039C9-601D-4282-8BBF-03FEEA76F5F3}" type="presOf" srcId="{E2FCDC95-A76F-447E-B7A8-96053D2336AC}" destId="{75994A22-3790-4219-8C34-EFB1A172683C}" srcOrd="0" destOrd="0" presId="urn:microsoft.com/office/officeart/2005/8/layout/orgChart1"/>
-    <dgm:cxn modelId="{8137AEC6-67AB-4747-A01B-8846F373EF92}" type="presOf" srcId="{2A1734E5-F350-4043-A59D-090A5C851E96}" destId="{632D20A3-D474-4945-BEC3-702EAB53AF00}" srcOrd="0" destOrd="0" presId="urn:microsoft.com/office/officeart/2005/8/layout/orgChart1"/>
-    <dgm:cxn modelId="{A4FD5072-445C-4BF4-99DD-5F1BDAD862DA}" srcId="{C9F271EB-AA97-406F-A22E-048A336DC94A}" destId="{6CEB8C34-32A9-47E6-A405-A04B3711CFB7}" srcOrd="1" destOrd="0" parTransId="{9DFE08AD-6D40-40B9-8C6C-0D9B748E71FD}" sibTransId="{05E40D46-9D4A-4AE0-8A7C-2E5D2787A5C2}"/>
-    <dgm:cxn modelId="{63B04F08-C750-4C7A-B49E-BEE5344BBD39}" type="presOf" srcId="{C9F271EB-AA97-406F-A22E-048A336DC94A}" destId="{0CDB574B-8A16-4575-B86E-72EE9B15201E}" srcOrd="1" destOrd="0" presId="urn:microsoft.com/office/officeart/2005/8/layout/orgChart1"/>
-    <dgm:cxn modelId="{66587802-E1A1-4490-8EE6-DFFED4C0E387}" type="presOf" srcId="{8F21D5B7-1E81-4E68-9A3B-41478D9E578F}" destId="{9961A4E0-4305-4F81-8160-655C9A27D034}" srcOrd="0" destOrd="0" presId="urn:microsoft.com/office/officeart/2005/8/layout/orgChart1"/>
-    <dgm:cxn modelId="{5CA14EFE-56BA-428E-9344-6E54BD1CDAE3}" type="presOf" srcId="{A7E2D81E-7900-4DF4-BEF5-77A2812B0C4E}" destId="{91E1DAD5-A378-4F9D-90D3-E4D6E3B719CC}" srcOrd="0" destOrd="0" presId="urn:microsoft.com/office/officeart/2005/8/layout/orgChart1"/>
-    <dgm:cxn modelId="{3F6EF168-B749-47B5-86FD-91ABA2C7D72E}" type="presOf" srcId="{A9576EC0-F780-411F-A988-792BB4B5827F}" destId="{3C3CC326-C1BB-4802-9C80-3024F7E2EFEC}" srcOrd="1" destOrd="0" presId="urn:microsoft.com/office/officeart/2005/8/layout/orgChart1"/>
-    <dgm:cxn modelId="{DB030D6B-BB16-4AB3-BD3B-676A1CBC0A28}" type="presOf" srcId="{A9576EC0-F780-411F-A988-792BB4B5827F}" destId="{B4236978-BB7B-465F-A15B-A4753285650F}" srcOrd="0" destOrd="0" presId="urn:microsoft.com/office/officeart/2005/8/layout/orgChart1"/>
-    <dgm:cxn modelId="{585916E3-B9E6-418F-BBFC-91743B566955}" type="presOf" srcId="{5ED6D770-BF3B-4684-98EB-5ABB516FF23D}" destId="{5871E8CC-FA46-4584-AC5E-0BFF5BB7E6D6}" srcOrd="0" destOrd="0" presId="urn:microsoft.com/office/officeart/2005/8/layout/orgChart1"/>
-    <dgm:cxn modelId="{B8E816F8-7FA7-46B3-B6D5-3CE42BCFB40A}" srcId="{2A1734E5-F350-4043-A59D-090A5C851E96}" destId="{26CDFC28-47AA-4502-887A-33E7C0CE0838}" srcOrd="0" destOrd="0" parTransId="{3196F628-F850-402C-8DFF-32FDBF641FAF}" sibTransId="{31721E21-E4E4-40B3-A55D-F290C2DF3887}"/>
-    <dgm:cxn modelId="{5E6BA506-E2BF-4C29-92E3-F77F24013314}" type="presOf" srcId="{5AF5E628-F524-43D4-9C5A-5A8189560301}" destId="{710C924E-E30F-44DF-A6AA-7A0529BD66A0}" srcOrd="0" destOrd="0" presId="urn:microsoft.com/office/officeart/2005/8/layout/orgChart1"/>
-    <dgm:cxn modelId="{63957BFE-6189-47C3-8B38-C33EAFDBB625}" srcId="{998DBD50-443E-466A-9688-66A52BCFB283}" destId="{DD18F73E-5873-4440-AD2A-CB98A7E335BB}" srcOrd="0" destOrd="0" parTransId="{5B6E6A94-B82E-45A0-B538-B423850E5FD3}" sibTransId="{9786C01A-E46D-4E4C-952B-67F9C5AB60A3}"/>
     <dgm:cxn modelId="{2451FA6F-A70D-4E78-8CF6-9527C49C1AC2}" type="presOf" srcId="{F0588C2A-6766-47BF-AE7C-52B851FABC21}" destId="{4C0517EB-FD0E-41DA-B0F6-7F0D2D018DD1}" srcOrd="0" destOrd="0" presId="urn:microsoft.com/office/officeart/2005/8/layout/orgChart1"/>
-    <dgm:cxn modelId="{CF4DF7D7-2777-4A2A-9B0C-8DEB23527131}" type="presOf" srcId="{C6CC40CD-5626-4A19-9936-F67709EE7AF0}" destId="{52AB23E0-53A6-4AC3-B89A-D72BC394F116}" srcOrd="0" destOrd="0" presId="urn:microsoft.com/office/officeart/2005/8/layout/orgChart1"/>
-    <dgm:cxn modelId="{F3B26E1E-6947-4159-918E-E138CED3D239}" srcId="{B23CD900-37E2-45DE-B384-F9885D55838B}" destId="{A9576EC0-F780-411F-A988-792BB4B5827F}" srcOrd="0" destOrd="0" parTransId="{3C5DF98A-9E49-4EBC-AA28-3E96D9B53B39}" sibTransId="{4568403F-227F-414F-9181-6C36CA1FB882}"/>
-    <dgm:cxn modelId="{6DDE05DA-2CC4-4A86-986C-5CBE3D44190A}" type="presOf" srcId="{6CEB8C34-32A9-47E6-A405-A04B3711CFB7}" destId="{087E6E65-2112-476B-A4AA-3A36C7628514}" srcOrd="0" destOrd="0" presId="urn:microsoft.com/office/officeart/2005/8/layout/orgChart1"/>
-    <dgm:cxn modelId="{275E1EA8-9958-4385-AD1D-0D70F2B2E97E}" type="presOf" srcId="{998DBD50-443E-466A-9688-66A52BCFB283}" destId="{291B4844-977C-4B0C-9CCC-F7511A56BE71}" srcOrd="1" destOrd="0" presId="urn:microsoft.com/office/officeart/2005/8/layout/orgChart1"/>
-    <dgm:cxn modelId="{964962C0-3F9A-405E-B7CF-7320CA058054}" srcId="{4BD105F0-FCB2-4292-8534-EF3F82555BF1}" destId="{F8118993-C3C6-4246-A6BF-F9F2EC3DC9CB}" srcOrd="0" destOrd="0" parTransId="{763868FB-01C7-4C07-982A-E0002DD2F249}" sibTransId="{196FC47F-8F5E-4EE4-99DA-8228F767EF40}"/>
-    <dgm:cxn modelId="{2258E7B5-0D3B-4779-989F-0D2802E77E9D}" type="presOf" srcId="{2AB59A33-B6A6-40FF-98F7-711698F4D26B}" destId="{64076540-8FAD-4187-A304-8898DDD0C9A8}" srcOrd="0" destOrd="0" presId="urn:microsoft.com/office/officeart/2005/8/layout/orgChart1"/>
-    <dgm:cxn modelId="{DE92D672-1362-46B3-9B36-E204E35D3A8A}" srcId="{AB5982FD-D354-4AAA-B978-F9826D0D05FB}" destId="{CF665F69-5C99-4ABA-84BB-EE78294ED608}" srcOrd="0" destOrd="0" parTransId="{CBAC9813-60C7-4469-BF09-A874065B34A7}" sibTransId="{F6125F52-3FD9-4490-AD82-6F4F52591F18}"/>
-    <dgm:cxn modelId="{E7F7BF8F-EE5F-4676-BDAC-E110E82FDA6F}" type="presOf" srcId="{DD18F73E-5873-4440-AD2A-CB98A7E335BB}" destId="{7527F677-2F8C-4154-ADCF-5A9B516211C5}" srcOrd="0" destOrd="0" presId="urn:microsoft.com/office/officeart/2005/8/layout/orgChart1"/>
     <dgm:cxn modelId="{7D2A03B3-72A8-4CAF-A850-B82FF1D961C0}" type="presOf" srcId="{3196F628-F850-402C-8DFF-32FDBF641FAF}" destId="{6B1C0F91-7709-4920-8BCD-A2344D4FC3C1}" srcOrd="0" destOrd="0" presId="urn:microsoft.com/office/officeart/2005/8/layout/orgChart1"/>
-    <dgm:cxn modelId="{06EB2273-9FAF-4E8B-B25D-B647F848AA12}" type="presOf" srcId="{A7E2D81E-7900-4DF4-BEF5-77A2812B0C4E}" destId="{C91E4177-0B62-4588-885D-1A4C3BD2BAF7}" srcOrd="1" destOrd="0" presId="urn:microsoft.com/office/officeart/2005/8/layout/orgChart1"/>
-    <dgm:cxn modelId="{DF1FF10C-2385-4496-A025-967A40CBD7A2}" type="presOf" srcId="{2A1734E5-F350-4043-A59D-090A5C851E96}" destId="{E65AAA3D-6EDF-4733-A476-6E661CF70E36}" srcOrd="1" destOrd="0" presId="urn:microsoft.com/office/officeart/2005/8/layout/orgChart1"/>
-    <dgm:cxn modelId="{F4CB865C-996A-492E-9E5F-2B17DE9381E0}" srcId="{26CDFC28-47AA-4502-887A-33E7C0CE0838}" destId="{8F21D5B7-1E81-4E68-9A3B-41478D9E578F}" srcOrd="1" destOrd="0" parTransId="{810F6CE3-7B9A-4BC5-B642-3E284064AEB8}" sibTransId="{0C0A6C55-CE4D-42AC-8392-A28B6E9C2042}"/>
-    <dgm:cxn modelId="{7F4CBF52-8E85-4962-B47C-2E9BB8838D4B}" type="presOf" srcId="{CF665F69-5C99-4ABA-84BB-EE78294ED608}" destId="{1F6BCCA0-2CCE-4CE0-BBC4-117FD2054979}" srcOrd="0" destOrd="0" presId="urn:microsoft.com/office/officeart/2005/8/layout/orgChart1"/>
-    <dgm:cxn modelId="{5F5DBC77-905E-46B9-9C22-D2F5D1C757CB}" type="presOf" srcId="{6CEB8C34-32A9-47E6-A405-A04B3711CFB7}" destId="{F5F98A29-63BF-4AC3-9BF3-D3C7E3FF700B}" srcOrd="1" destOrd="0" presId="urn:microsoft.com/office/officeart/2005/8/layout/orgChart1"/>
-    <dgm:cxn modelId="{5DC0E0BC-0122-42DE-9175-76DAAE24D215}" srcId="{A7E2D81E-7900-4DF4-BEF5-77A2812B0C4E}" destId="{51C939BC-1F71-4B4B-B76E-5AB02C7C5227}" srcOrd="3" destOrd="0" parTransId="{D5432636-319A-4212-83DB-9D3BA6AA54A9}" sibTransId="{C119049A-FECA-4579-956E-33C230BAA319}"/>
-    <dgm:cxn modelId="{8CBE4C9A-8DBD-4F86-806A-74F82BAF13CF}" type="presOf" srcId="{26CDFC28-47AA-4502-887A-33E7C0CE0838}" destId="{B9EF6254-674C-4CF7-8107-B9DBCC5CC06C}" srcOrd="0" destOrd="0" presId="urn:microsoft.com/office/officeart/2005/8/layout/orgChart1"/>
-    <dgm:cxn modelId="{A25B346A-AF67-44D0-A601-4D4A0B7FEEC8}" srcId="{A7E2D81E-7900-4DF4-BEF5-77A2812B0C4E}" destId="{C9F271EB-AA97-406F-A22E-048A336DC94A}" srcOrd="0" destOrd="0" parTransId="{CEB0D96F-42A5-4903-B863-AD62B81F61AE}" sibTransId="{994C4CAB-5619-4281-B81C-1EBED1C2EFE7}"/>
-    <dgm:cxn modelId="{EC81C075-A36A-401B-894E-F2172C22244B}" type="presOf" srcId="{5B6E6A94-B82E-45A0-B538-B423850E5FD3}" destId="{044C785A-5A95-4E11-98D2-B0C3A8153197}" srcOrd="0" destOrd="0" presId="urn:microsoft.com/office/officeart/2005/8/layout/orgChart1"/>
-    <dgm:cxn modelId="{079B3109-107E-4D2E-99FC-71764D1796B1}" type="presOf" srcId="{B23CD900-37E2-45DE-B384-F9885D55838B}" destId="{F6A2B30B-A958-479B-AD92-8D9166487761}" srcOrd="0" destOrd="0" presId="urn:microsoft.com/office/officeart/2005/8/layout/orgChart1"/>
-    <dgm:cxn modelId="{D9F878CB-CD73-43B2-924C-4145A2798C53}" type="presOf" srcId="{CC818131-8C0B-4D2C-AEA4-5A1BD3A6EFF3}" destId="{D62139CB-9D8F-4560-A01D-A225FB31D9FF}" srcOrd="1" destOrd="0" presId="urn:microsoft.com/office/officeart/2005/8/layout/orgChart1"/>
-    <dgm:cxn modelId="{2D8C82CF-8261-498E-8D04-AFAB3415C828}" srcId="{6CEB8C34-32A9-47E6-A405-A04B3711CFB7}" destId="{5AF5E628-F524-43D4-9C5A-5A8189560301}" srcOrd="0" destOrd="0" parTransId="{B3E11DF4-0A70-40F4-A9F3-378E2202AE1D}" sibTransId="{79E1E6F3-8832-4EDA-9B35-6A23A6E78C38}"/>
+    <dgm:cxn modelId="{701FBC72-4CA4-403B-9C1B-0720F2EB9273}" type="presOf" srcId="{F0588C2A-6766-47BF-AE7C-52B851FABC21}" destId="{09C02F37-0DFF-472D-BC6B-B6584867F159}" srcOrd="1" destOrd="0" presId="urn:microsoft.com/office/officeart/2005/8/layout/orgChart1"/>
+    <dgm:cxn modelId="{794BC4DB-07B9-4B18-835E-CC6189AFDB89}" type="presOf" srcId="{C1DBF8BC-E021-419E-A78A-05014B36B3B1}" destId="{3D07C967-7F5A-4259-8C92-44D4DA2F7550}" srcOrd="0" destOrd="0" presId="urn:microsoft.com/office/officeart/2005/8/layout/orgChart1"/>
+    <dgm:cxn modelId="{F56EA288-A208-43A9-BC15-07480867F718}" type="presOf" srcId="{CF665F69-5C99-4ABA-84BB-EE78294ED608}" destId="{0EA51ED5-D16D-4D92-B6FA-B66031566B6A}" srcOrd="1" destOrd="0" presId="urn:microsoft.com/office/officeart/2005/8/layout/orgChart1"/>
     <dgm:cxn modelId="{6D67D41E-CA24-4B50-B776-9590486E46E4}" type="presOf" srcId="{763868FB-01C7-4C07-982A-E0002DD2F249}" destId="{6E390A44-09EF-4120-ABD1-1835798D84D0}" srcOrd="0" destOrd="0" presId="urn:microsoft.com/office/officeart/2005/8/layout/orgChart1"/>
+    <dgm:cxn modelId="{D08B451E-BCB5-4E0B-8342-ED0CFBDE97DB}" type="presOf" srcId="{F8118993-C3C6-4246-A6BF-F9F2EC3DC9CB}" destId="{23D4122E-B967-488C-8CB8-9B0B4654BF0E}" srcOrd="0" destOrd="0" presId="urn:microsoft.com/office/officeart/2005/8/layout/orgChart1"/>
     <dgm:cxn modelId="{A331ECE4-3A51-47A2-B0EB-15A33C8106AE}" type="presParOf" srcId="{36B3E81A-E148-4D3B-88E5-4419A3BAFF40}" destId="{D465AAE9-80F9-4B15-8D00-FCD2F5B0741D}" srcOrd="0" destOrd="0" presId="urn:microsoft.com/office/officeart/2005/8/layout/orgChart1"/>
     <dgm:cxn modelId="{FDA91742-653C-4F89-9365-271A53D2AD08}" type="presParOf" srcId="{D465AAE9-80F9-4B15-8D00-FCD2F5B0741D}" destId="{3FD2C245-E911-4A1C-878D-89B50AA53502}" srcOrd="0" destOrd="0" presId="urn:microsoft.com/office/officeart/2005/8/layout/orgChart1"/>
     <dgm:cxn modelId="{4BBCF4DB-0FC6-453B-AD7D-F55E26A6C214}" type="presParOf" srcId="{3FD2C245-E911-4A1C-878D-89B50AA53502}" destId="{91E1DAD5-A378-4F9D-90D3-E4D6E3B719CC}" srcOrd="0" destOrd="0" presId="urn:microsoft.com/office/officeart/2005/8/layout/orgChart1"/>
@@ -4176,7 +4176,7 @@
         <a:lstStyle/>
         <a:p>
           <a:r>
-            <a:rPr lang="en-US" b="1" smtClean="0"/>
+            <a:rPr lang="en-US" b="1" dirty="0" smtClean="0"/>
             <a:t>Instance-based</a:t>
           </a:r>
           <a:endParaRPr lang="en-US" dirty="0"/>
@@ -4213,15 +4213,25 @@
         </dgm:presLayoutVars>
       </dgm:prSet>
       <dgm:spPr/>
+      <dgm:t>
+        <a:bodyPr/>
+        <a:lstStyle/>
+        <a:p>
+          <a:endParaRPr lang="en-US"/>
+        </a:p>
+      </dgm:t>
     </dgm:pt>
     <dgm:pt modelId="{6881A7B4-D734-4147-A4FF-48E3B17CF19D}" type="pres">
       <dgm:prSet presAssocID="{8D1DD9BB-2FD5-49F9-B739-66E12D5FB53A}" presName="compNode" presStyleCnt="0"/>
       <dgm:spPr/>
     </dgm:pt>
     <dgm:pt modelId="{191CA2BA-BBE9-4219-815D-F475DA1BBBC8}" type="pres">
-      <dgm:prSet presAssocID="{8D1DD9BB-2FD5-49F9-B739-66E12D5FB53A}" presName="pictRect" presStyleLbl="node1" presStyleIdx="0" presStyleCnt="11"/>
+      <dgm:prSet presAssocID="{8D1DD9BB-2FD5-49F9-B739-66E12D5FB53A}" presName="pictRect" presStyleLbl="node1" presStyleIdx="0" presStyleCnt="11" custScaleY="145158"/>
       <dgm:spPr>
-        <a:blipFill dpi="0" rotWithShape="1">
+        <a:prstGeom prst="roundRect">
+          <a:avLst/>
+        </a:prstGeom>
+        <a:blipFill>
           <a:blip xmlns:r="http://schemas.openxmlformats.org/officeDocument/2006/relationships" r:embed="rId1">
             <a:extLst>
               <a:ext uri="{28A0092B-C50C-407E-A947-70E740481C1C}">
@@ -4231,18 +4241,10 @@
           </a:blip>
           <a:srcRect/>
           <a:stretch>
-            <a:fillRect/>
+            <a:fillRect l="-2000" r="-2000"/>
           </a:stretch>
         </a:blipFill>
       </dgm:spPr>
-    </dgm:pt>
-    <dgm:pt modelId="{343FABA3-EAA5-430F-9977-5A929A400932}" type="pres">
-      <dgm:prSet presAssocID="{8D1DD9BB-2FD5-49F9-B739-66E12D5FB53A}" presName="textRect" presStyleLbl="revTx" presStyleIdx="0" presStyleCnt="11">
-        <dgm:presLayoutVars>
-          <dgm:bulletEnabled val="1"/>
-        </dgm:presLayoutVars>
-      </dgm:prSet>
-      <dgm:spPr/>
       <dgm:t>
         <a:bodyPr/>
         <a:lstStyle/>
@@ -4251,40 +4253,8 @@
         </a:p>
       </dgm:t>
     </dgm:pt>
-    <dgm:pt modelId="{09880910-0797-434B-AD31-1961608BAD83}" type="pres">
-      <dgm:prSet presAssocID="{284221E8-6A5D-479D-9C64-8647FDBD90F7}" presName="sibTrans" presStyleLbl="sibTrans2D1" presStyleIdx="0" presStyleCnt="0"/>
-      <dgm:spPr/>
-    </dgm:pt>
-    <dgm:pt modelId="{E723D577-5C70-4C6C-8553-A499C31ABEE1}" type="pres">
-      <dgm:prSet presAssocID="{280AE31E-5671-4086-BFBC-D251814C2BE1}" presName="compNode" presStyleCnt="0"/>
-      <dgm:spPr/>
-    </dgm:pt>
-    <dgm:pt modelId="{F7BC8508-2A8D-4CB0-BDCE-C1EDDE51A653}" type="pres">
-      <dgm:prSet presAssocID="{280AE31E-5671-4086-BFBC-D251814C2BE1}" presName="pictRect" presStyleLbl="node1" presStyleIdx="1" presStyleCnt="11"/>
-      <dgm:spPr/>
-    </dgm:pt>
-    <dgm:pt modelId="{D34C5AC7-17A2-4B2A-8B92-B580205857D4}" type="pres">
-      <dgm:prSet presAssocID="{280AE31E-5671-4086-BFBC-D251814C2BE1}" presName="textRect" presStyleLbl="revTx" presStyleIdx="1" presStyleCnt="11">
-        <dgm:presLayoutVars>
-          <dgm:bulletEnabled val="1"/>
-        </dgm:presLayoutVars>
-      </dgm:prSet>
-      <dgm:spPr/>
-    </dgm:pt>
-    <dgm:pt modelId="{BC2EB331-AF00-4E20-A08C-ADA53896BA6E}" type="pres">
-      <dgm:prSet presAssocID="{C4BB5136-E5BF-4A2F-8516-FA1224DD41D1}" presName="sibTrans" presStyleLbl="sibTrans2D1" presStyleIdx="0" presStyleCnt="0"/>
-      <dgm:spPr/>
-    </dgm:pt>
-    <dgm:pt modelId="{5DA234AF-B2A6-4FB4-B50E-C5EB77348B32}" type="pres">
-      <dgm:prSet presAssocID="{984AEDF1-8F1B-4C9E-8222-F7D0CDFB53FE}" presName="compNode" presStyleCnt="0"/>
-      <dgm:spPr/>
-    </dgm:pt>
-    <dgm:pt modelId="{634B8261-1238-4FE6-9F01-CED04D20E036}" type="pres">
-      <dgm:prSet presAssocID="{984AEDF1-8F1B-4C9E-8222-F7D0CDFB53FE}" presName="pictRect" presStyleLbl="node1" presStyleIdx="2" presStyleCnt="11"/>
-      <dgm:spPr/>
-    </dgm:pt>
-    <dgm:pt modelId="{647C9E19-CCC8-46AE-A4D6-8146BB7619E9}" type="pres">
-      <dgm:prSet presAssocID="{984AEDF1-8F1B-4C9E-8222-F7D0CDFB53FE}" presName="textRect" presStyleLbl="revTx" presStyleIdx="2" presStyleCnt="11">
+    <dgm:pt modelId="{343FABA3-EAA5-430F-9977-5A929A400932}" type="pres">
+      <dgm:prSet presAssocID="{8D1DD9BB-2FD5-49F9-B739-66E12D5FB53A}" presName="textRect" presStyleLbl="revTx" presStyleIdx="0" presStyleCnt="11" custLinFactNeighborY="27830">
         <dgm:presLayoutVars>
           <dgm:bulletEnabled val="1"/>
         </dgm:presLayoutVars>
@@ -4298,24 +4268,8 @@
         </a:p>
       </dgm:t>
     </dgm:pt>
-    <dgm:pt modelId="{1FA414FC-266A-4129-8F37-89170AE28978}" type="pres">
-      <dgm:prSet presAssocID="{85CC0DF3-B163-4CED-BE3C-1FA69AC14433}" presName="sibTrans" presStyleLbl="sibTrans2D1" presStyleIdx="0" presStyleCnt="0"/>
-      <dgm:spPr/>
-    </dgm:pt>
-    <dgm:pt modelId="{7D0D3350-DBBD-4830-8B5F-C0171D5410E2}" type="pres">
-      <dgm:prSet presAssocID="{349D7D0B-4346-4E3A-AF55-971FFDEF6E78}" presName="compNode" presStyleCnt="0"/>
-      <dgm:spPr/>
-    </dgm:pt>
-    <dgm:pt modelId="{6A2C386A-8371-4F45-8D21-8B0D0F39C75A}" type="pres">
-      <dgm:prSet presAssocID="{349D7D0B-4346-4E3A-AF55-971FFDEF6E78}" presName="pictRect" presStyleLbl="node1" presStyleIdx="3" presStyleCnt="11"/>
-      <dgm:spPr/>
-    </dgm:pt>
-    <dgm:pt modelId="{DC29C323-9274-4BE5-A8FE-5047D5BDF8E6}" type="pres">
-      <dgm:prSet presAssocID="{349D7D0B-4346-4E3A-AF55-971FFDEF6E78}" presName="textRect" presStyleLbl="revTx" presStyleIdx="3" presStyleCnt="11">
-        <dgm:presLayoutVars>
-          <dgm:bulletEnabled val="1"/>
-        </dgm:presLayoutVars>
-      </dgm:prSet>
+    <dgm:pt modelId="{09880910-0797-434B-AD31-1961608BAD83}" type="pres">
+      <dgm:prSet presAssocID="{284221E8-6A5D-479D-9C64-8647FDBD90F7}" presName="sibTrans" presStyleLbl="sibTrans2D1" presStyleIdx="0" presStyleCnt="0"/>
       <dgm:spPr/>
       <dgm:t>
         <a:bodyPr/>
@@ -4325,45 +4279,27 @@
         </a:p>
       </dgm:t>
     </dgm:pt>
-    <dgm:pt modelId="{F2F86CA1-8ED9-40C6-BA22-83D3802A5E1F}" type="pres">
-      <dgm:prSet presAssocID="{2245D461-248E-4875-A913-2D93E3913285}" presName="sibTrans" presStyleLbl="sibTrans2D1" presStyleIdx="0" presStyleCnt="0"/>
-      <dgm:spPr/>
-    </dgm:pt>
-    <dgm:pt modelId="{13D98EBD-CAFB-48CB-95F2-8972255CE3DD}" type="pres">
-      <dgm:prSet presAssocID="{291F1056-283A-41D0-AD51-AE156C37B1C0}" presName="compNode" presStyleCnt="0"/>
-      <dgm:spPr/>
-    </dgm:pt>
-    <dgm:pt modelId="{A6731D9D-CA71-4587-BFBB-0696D9D59975}" type="pres">
-      <dgm:prSet presAssocID="{291F1056-283A-41D0-AD51-AE156C37B1C0}" presName="pictRect" presStyleLbl="node1" presStyleIdx="4" presStyleCnt="11"/>
-      <dgm:spPr/>
-    </dgm:pt>
-    <dgm:pt modelId="{FEA19CE0-6144-4769-8AEA-3EBD15DE5155}" type="pres">
-      <dgm:prSet presAssocID="{291F1056-283A-41D0-AD51-AE156C37B1C0}" presName="textRect" presStyleLbl="revTx" presStyleIdx="4" presStyleCnt="11">
-        <dgm:presLayoutVars>
-          <dgm:bulletEnabled val="1"/>
-        </dgm:presLayoutVars>
-      </dgm:prSet>
-      <dgm:spPr/>
-    </dgm:pt>
-    <dgm:pt modelId="{B8BEBCAD-05AD-43DE-9732-C7CBAF63C309}" type="pres">
-      <dgm:prSet presAssocID="{B36F7E42-BFC8-4598-AFE4-27F5D899299B}" presName="sibTrans" presStyleLbl="sibTrans2D1" presStyleIdx="0" presStyleCnt="0"/>
-      <dgm:spPr/>
-    </dgm:pt>
-    <dgm:pt modelId="{1838EE6D-134A-4000-A266-844B6AB3E5BC}" type="pres">
-      <dgm:prSet presAssocID="{4D7EACAB-C30A-4528-8AF2-6566B7C2770F}" presName="compNode" presStyleCnt="0"/>
-      <dgm:spPr/>
-    </dgm:pt>
-    <dgm:pt modelId="{5EF3B04E-7D09-4FCE-A0C8-2A78869A2FFD}" type="pres">
-      <dgm:prSet presAssocID="{4D7EACAB-C30A-4528-8AF2-6566B7C2770F}" presName="pictRect" presStyleLbl="node1" presStyleIdx="5" presStyleCnt="11"/>
-      <dgm:spPr/>
-    </dgm:pt>
-    <dgm:pt modelId="{834B9393-E806-4BA8-96B6-89DB08EF00F3}" type="pres">
-      <dgm:prSet presAssocID="{4D7EACAB-C30A-4528-8AF2-6566B7C2770F}" presName="textRect" presStyleLbl="revTx" presStyleIdx="5" presStyleCnt="11">
-        <dgm:presLayoutVars>
-          <dgm:bulletEnabled val="1"/>
-        </dgm:presLayoutVars>
-      </dgm:prSet>
-      <dgm:spPr/>
+    <dgm:pt modelId="{E723D577-5C70-4C6C-8553-A499C31ABEE1}" type="pres">
+      <dgm:prSet presAssocID="{280AE31E-5671-4086-BFBC-D251814C2BE1}" presName="compNode" presStyleCnt="0"/>
+      <dgm:spPr/>
+    </dgm:pt>
+    <dgm:pt modelId="{F7BC8508-2A8D-4CB0-BDCE-C1EDDE51A653}" type="pres">
+      <dgm:prSet presAssocID="{280AE31E-5671-4086-BFBC-D251814C2BE1}" presName="pictRect" presStyleLbl="node1" presStyleIdx="1" presStyleCnt="11" custScaleY="145158"/>
+      <dgm:spPr>
+        <a:blipFill>
+          <a:blip xmlns:r="http://schemas.openxmlformats.org/officeDocument/2006/relationships" r:embed="rId2">
+            <a:extLst>
+              <a:ext uri="{28A0092B-C50C-407E-A947-70E740481C1C}">
+                <a14:useLocalDpi xmlns:a14="http://schemas.microsoft.com/office/drawing/2010/main" val="0"/>
+              </a:ext>
+            </a:extLst>
+          </a:blip>
+          <a:srcRect/>
+          <a:stretch>
+            <a:fillRect l="-2000" r="-2000"/>
+          </a:stretch>
+        </a:blipFill>
+      </dgm:spPr>
       <dgm:t>
         <a:bodyPr/>
         <a:lstStyle/>
@@ -4372,60 +4308,8 @@
         </a:p>
       </dgm:t>
     </dgm:pt>
-    <dgm:pt modelId="{401293E9-76FD-4070-B323-BE94EE4E385B}" type="pres">
-      <dgm:prSet presAssocID="{BDFA7A51-10ED-4977-85AE-BBAE512BCB34}" presName="sibTrans" presStyleLbl="sibTrans2D1" presStyleIdx="0" presStyleCnt="0"/>
-      <dgm:spPr/>
-    </dgm:pt>
-    <dgm:pt modelId="{488229B2-7747-49E2-BB91-0AB99BD961AE}" type="pres">
-      <dgm:prSet presAssocID="{10BCA8D8-20CF-44A7-8697-9C744D7C789F}" presName="compNode" presStyleCnt="0"/>
-      <dgm:spPr/>
-    </dgm:pt>
-    <dgm:pt modelId="{BA9A3791-8D81-490B-B02E-C84CBDFCCD54}" type="pres">
-      <dgm:prSet presAssocID="{10BCA8D8-20CF-44A7-8697-9C744D7C789F}" presName="pictRect" presStyleLbl="node1" presStyleIdx="6" presStyleCnt="11"/>
-      <dgm:spPr/>
-    </dgm:pt>
-    <dgm:pt modelId="{8FFDDAAC-5015-46D5-85BC-3284930022E5}" type="pres">
-      <dgm:prSet presAssocID="{10BCA8D8-20CF-44A7-8697-9C744D7C789F}" presName="textRect" presStyleLbl="revTx" presStyleIdx="6" presStyleCnt="11">
-        <dgm:presLayoutVars>
-          <dgm:bulletEnabled val="1"/>
-        </dgm:presLayoutVars>
-      </dgm:prSet>
-      <dgm:spPr/>
-    </dgm:pt>
-    <dgm:pt modelId="{8EC53AE5-36C2-4C48-8622-55C539CC0749}" type="pres">
-      <dgm:prSet presAssocID="{B0FDBC70-BD9B-4D18-A676-DAD7062DA44B}" presName="sibTrans" presStyleLbl="sibTrans2D1" presStyleIdx="0" presStyleCnt="0"/>
-      <dgm:spPr/>
-    </dgm:pt>
-    <dgm:pt modelId="{A8366329-EACE-4A9E-9FFF-BF57BF74F3D2}" type="pres">
-      <dgm:prSet presAssocID="{B1DF718F-CFE2-4E40-AD43-F653B2AB85B0}" presName="compNode" presStyleCnt="0"/>
-      <dgm:spPr/>
-    </dgm:pt>
-    <dgm:pt modelId="{F6B1506E-664F-4818-A01D-BC9344AA3B71}" type="pres">
-      <dgm:prSet presAssocID="{B1DF718F-CFE2-4E40-AD43-F653B2AB85B0}" presName="pictRect" presStyleLbl="node1" presStyleIdx="7" presStyleCnt="11"/>
-      <dgm:spPr/>
-    </dgm:pt>
-    <dgm:pt modelId="{7A66E752-626A-4569-A443-E5F7F895BD41}" type="pres">
-      <dgm:prSet presAssocID="{B1DF718F-CFE2-4E40-AD43-F653B2AB85B0}" presName="textRect" presStyleLbl="revTx" presStyleIdx="7" presStyleCnt="11">
-        <dgm:presLayoutVars>
-          <dgm:bulletEnabled val="1"/>
-        </dgm:presLayoutVars>
-      </dgm:prSet>
-      <dgm:spPr/>
-    </dgm:pt>
-    <dgm:pt modelId="{FE312DD7-5C0A-4FB6-BC18-5A627A795B95}" type="pres">
-      <dgm:prSet presAssocID="{A59869DC-3147-465E-B6A0-FCFAA9AE0237}" presName="sibTrans" presStyleLbl="sibTrans2D1" presStyleIdx="0" presStyleCnt="0"/>
-      <dgm:spPr/>
-    </dgm:pt>
-    <dgm:pt modelId="{E616B7EA-CB19-485B-8BEF-44050A4619BF}" type="pres">
-      <dgm:prSet presAssocID="{EA1116B2-9487-4F74-AEAE-010523D7BC55}" presName="compNode" presStyleCnt="0"/>
-      <dgm:spPr/>
-    </dgm:pt>
-    <dgm:pt modelId="{F82522DD-42F0-4237-BA73-DFB1BDB778A3}" type="pres">
-      <dgm:prSet presAssocID="{EA1116B2-9487-4F74-AEAE-010523D7BC55}" presName="pictRect" presStyleLbl="node1" presStyleIdx="8" presStyleCnt="11"/>
-      <dgm:spPr/>
-    </dgm:pt>
-    <dgm:pt modelId="{9C871E9F-EB84-4B32-B6F7-6CAD3D929581}" type="pres">
-      <dgm:prSet presAssocID="{EA1116B2-9487-4F74-AEAE-010523D7BC55}" presName="textRect" presStyleLbl="revTx" presStyleIdx="8" presStyleCnt="11">
+    <dgm:pt modelId="{D34C5AC7-17A2-4B2A-8B92-B580205857D4}" type="pres">
+      <dgm:prSet presAssocID="{280AE31E-5671-4086-BFBC-D251814C2BE1}" presName="textRect" presStyleLbl="revTx" presStyleIdx="1" presStyleCnt="11" custLinFactNeighborY="27830">
         <dgm:presLayoutVars>
           <dgm:bulletEnabled val="1"/>
         </dgm:presLayoutVars>
@@ -4439,24 +4323,8 @@
         </a:p>
       </dgm:t>
     </dgm:pt>
-    <dgm:pt modelId="{21ABC2A0-16AB-4F7F-9546-1FED82609BAC}" type="pres">
-      <dgm:prSet presAssocID="{992641AA-4285-4D59-9638-D26B92EFADF1}" presName="sibTrans" presStyleLbl="sibTrans2D1" presStyleIdx="0" presStyleCnt="0"/>
-      <dgm:spPr/>
-    </dgm:pt>
-    <dgm:pt modelId="{9770BED6-BBD5-401F-AF20-7CD7F74F5599}" type="pres">
-      <dgm:prSet presAssocID="{C87FD8D1-1200-4E9E-A0C8-8E394B979853}" presName="compNode" presStyleCnt="0"/>
-      <dgm:spPr/>
-    </dgm:pt>
-    <dgm:pt modelId="{F2FBCA01-AB69-4BEB-B792-B46BCDD30A21}" type="pres">
-      <dgm:prSet presAssocID="{C87FD8D1-1200-4E9E-A0C8-8E394B979853}" presName="pictRect" presStyleLbl="node1" presStyleIdx="9" presStyleCnt="11"/>
-      <dgm:spPr/>
-    </dgm:pt>
-    <dgm:pt modelId="{0884AC10-478F-42E7-BB0A-94DC6E41D797}" type="pres">
-      <dgm:prSet presAssocID="{C87FD8D1-1200-4E9E-A0C8-8E394B979853}" presName="textRect" presStyleLbl="revTx" presStyleIdx="9" presStyleCnt="11">
-        <dgm:presLayoutVars>
-          <dgm:bulletEnabled val="1"/>
-        </dgm:presLayoutVars>
-      </dgm:prSet>
+    <dgm:pt modelId="{BC2EB331-AF00-4E20-A08C-ADA53896BA6E}" type="pres">
+      <dgm:prSet presAssocID="{C4BB5136-E5BF-4A2F-8516-FA1224DD41D1}" presName="sibTrans" presStyleLbl="sibTrans2D1" presStyleIdx="0" presStyleCnt="0"/>
       <dgm:spPr/>
       <dgm:t>
         <a:bodyPr/>
@@ -4466,25 +4334,27 @@
         </a:p>
       </dgm:t>
     </dgm:pt>
-    <dgm:pt modelId="{148FFCB1-F5FA-4EF8-A3C8-27253E62FD85}" type="pres">
-      <dgm:prSet presAssocID="{C6BE6B5F-13DA-4A66-BA35-AAD5F29A075F}" presName="sibTrans" presStyleLbl="sibTrans2D1" presStyleIdx="0" presStyleCnt="0"/>
-      <dgm:spPr/>
-    </dgm:pt>
-    <dgm:pt modelId="{6C5F2F4F-802E-4DA4-B9D0-94245FAE7433}" type="pres">
-      <dgm:prSet presAssocID="{8F76094E-FCF0-4382-959D-DDFFB8E8DDD0}" presName="compNode" presStyleCnt="0"/>
-      <dgm:spPr/>
-    </dgm:pt>
-    <dgm:pt modelId="{B6163960-C9CB-48E6-9D40-2444A56E0408}" type="pres">
-      <dgm:prSet presAssocID="{8F76094E-FCF0-4382-959D-DDFFB8E8DDD0}" presName="pictRect" presStyleLbl="node1" presStyleIdx="10" presStyleCnt="11"/>
-      <dgm:spPr/>
-    </dgm:pt>
-    <dgm:pt modelId="{9F050DD8-A04C-4F86-B0ED-A7C896566813}" type="pres">
-      <dgm:prSet presAssocID="{8F76094E-FCF0-4382-959D-DDFFB8E8DDD0}" presName="textRect" presStyleLbl="revTx" presStyleIdx="10" presStyleCnt="11">
-        <dgm:presLayoutVars>
-          <dgm:bulletEnabled val="1"/>
-        </dgm:presLayoutVars>
-      </dgm:prSet>
-      <dgm:spPr/>
+    <dgm:pt modelId="{5DA234AF-B2A6-4FB4-B50E-C5EB77348B32}" type="pres">
+      <dgm:prSet presAssocID="{984AEDF1-8F1B-4C9E-8222-F7D0CDFB53FE}" presName="compNode" presStyleCnt="0"/>
+      <dgm:spPr/>
+    </dgm:pt>
+    <dgm:pt modelId="{634B8261-1238-4FE6-9F01-CED04D20E036}" type="pres">
+      <dgm:prSet presAssocID="{984AEDF1-8F1B-4C9E-8222-F7D0CDFB53FE}" presName="pictRect" presStyleLbl="node1" presStyleIdx="2" presStyleCnt="11" custScaleY="145158"/>
+      <dgm:spPr>
+        <a:blipFill>
+          <a:blip xmlns:r="http://schemas.openxmlformats.org/officeDocument/2006/relationships" r:embed="rId3">
+            <a:extLst>
+              <a:ext uri="{28A0092B-C50C-407E-A947-70E740481C1C}">
+                <a14:useLocalDpi xmlns:a14="http://schemas.microsoft.com/office/drawing/2010/main" val="0"/>
+              </a:ext>
+            </a:extLst>
+          </a:blip>
+          <a:srcRect/>
+          <a:stretch>
+            <a:fillRect l="-2000" r="-2000"/>
+          </a:stretch>
+        </a:blipFill>
+      </dgm:spPr>
       <dgm:t>
         <a:bodyPr/>
         <a:lstStyle/>
@@ -4493,41 +4363,496 @@
         </a:p>
       </dgm:t>
     </dgm:pt>
+    <dgm:pt modelId="{647C9E19-CCC8-46AE-A4D6-8146BB7619E9}" type="pres">
+      <dgm:prSet presAssocID="{984AEDF1-8F1B-4C9E-8222-F7D0CDFB53FE}" presName="textRect" presStyleLbl="revTx" presStyleIdx="2" presStyleCnt="11" custLinFactNeighborY="27830">
+        <dgm:presLayoutVars>
+          <dgm:bulletEnabled val="1"/>
+        </dgm:presLayoutVars>
+      </dgm:prSet>
+      <dgm:spPr/>
+      <dgm:t>
+        <a:bodyPr/>
+        <a:lstStyle/>
+        <a:p>
+          <a:endParaRPr lang="en-US"/>
+        </a:p>
+      </dgm:t>
+    </dgm:pt>
+    <dgm:pt modelId="{1FA414FC-266A-4129-8F37-89170AE28978}" type="pres">
+      <dgm:prSet presAssocID="{85CC0DF3-B163-4CED-BE3C-1FA69AC14433}" presName="sibTrans" presStyleLbl="sibTrans2D1" presStyleIdx="0" presStyleCnt="0"/>
+      <dgm:spPr/>
+      <dgm:t>
+        <a:bodyPr/>
+        <a:lstStyle/>
+        <a:p>
+          <a:endParaRPr lang="en-US"/>
+        </a:p>
+      </dgm:t>
+    </dgm:pt>
+    <dgm:pt modelId="{7D0D3350-DBBD-4830-8B5F-C0171D5410E2}" type="pres">
+      <dgm:prSet presAssocID="{349D7D0B-4346-4E3A-AF55-971FFDEF6E78}" presName="compNode" presStyleCnt="0"/>
+      <dgm:spPr/>
+    </dgm:pt>
+    <dgm:pt modelId="{6A2C386A-8371-4F45-8D21-8B0D0F39C75A}" type="pres">
+      <dgm:prSet presAssocID="{349D7D0B-4346-4E3A-AF55-971FFDEF6E78}" presName="pictRect" presStyleLbl="node1" presStyleIdx="3" presStyleCnt="11" custScaleY="145158"/>
+      <dgm:spPr>
+        <a:blipFill>
+          <a:blip xmlns:r="http://schemas.openxmlformats.org/officeDocument/2006/relationships" r:embed="rId4">
+            <a:extLst>
+              <a:ext uri="{28A0092B-C50C-407E-A947-70E740481C1C}">
+                <a14:useLocalDpi xmlns:a14="http://schemas.microsoft.com/office/drawing/2010/main" val="0"/>
+              </a:ext>
+            </a:extLst>
+          </a:blip>
+          <a:srcRect/>
+          <a:stretch>
+            <a:fillRect l="-2000" r="-2000"/>
+          </a:stretch>
+        </a:blipFill>
+      </dgm:spPr>
+      <dgm:t>
+        <a:bodyPr/>
+        <a:lstStyle/>
+        <a:p>
+          <a:endParaRPr lang="en-US"/>
+        </a:p>
+      </dgm:t>
+    </dgm:pt>
+    <dgm:pt modelId="{DC29C323-9274-4BE5-A8FE-5047D5BDF8E6}" type="pres">
+      <dgm:prSet presAssocID="{349D7D0B-4346-4E3A-AF55-971FFDEF6E78}" presName="textRect" presStyleLbl="revTx" presStyleIdx="3" presStyleCnt="11" custLinFactNeighborY="27830">
+        <dgm:presLayoutVars>
+          <dgm:bulletEnabled val="1"/>
+        </dgm:presLayoutVars>
+      </dgm:prSet>
+      <dgm:spPr/>
+      <dgm:t>
+        <a:bodyPr/>
+        <a:lstStyle/>
+        <a:p>
+          <a:endParaRPr lang="en-US"/>
+        </a:p>
+      </dgm:t>
+    </dgm:pt>
+    <dgm:pt modelId="{F2F86CA1-8ED9-40C6-BA22-83D3802A5E1F}" type="pres">
+      <dgm:prSet presAssocID="{2245D461-248E-4875-A913-2D93E3913285}" presName="sibTrans" presStyleLbl="sibTrans2D1" presStyleIdx="0" presStyleCnt="0"/>
+      <dgm:spPr/>
+      <dgm:t>
+        <a:bodyPr/>
+        <a:lstStyle/>
+        <a:p>
+          <a:endParaRPr lang="en-US"/>
+        </a:p>
+      </dgm:t>
+    </dgm:pt>
+    <dgm:pt modelId="{13D98EBD-CAFB-48CB-95F2-8972255CE3DD}" type="pres">
+      <dgm:prSet presAssocID="{291F1056-283A-41D0-AD51-AE156C37B1C0}" presName="compNode" presStyleCnt="0"/>
+      <dgm:spPr/>
+    </dgm:pt>
+    <dgm:pt modelId="{A6731D9D-CA71-4587-BFBB-0696D9D59975}" type="pres">
+      <dgm:prSet presAssocID="{291F1056-283A-41D0-AD51-AE156C37B1C0}" presName="pictRect" presStyleLbl="node1" presStyleIdx="4" presStyleCnt="11" custScaleY="145158"/>
+      <dgm:spPr>
+        <a:blipFill>
+          <a:blip xmlns:r="http://schemas.openxmlformats.org/officeDocument/2006/relationships" r:embed="rId5">
+            <a:extLst>
+              <a:ext uri="{28A0092B-C50C-407E-A947-70E740481C1C}">
+                <a14:useLocalDpi xmlns:a14="http://schemas.microsoft.com/office/drawing/2010/main" val="0"/>
+              </a:ext>
+            </a:extLst>
+          </a:blip>
+          <a:srcRect/>
+          <a:stretch>
+            <a:fillRect l="-2000" r="-2000"/>
+          </a:stretch>
+        </a:blipFill>
+      </dgm:spPr>
+      <dgm:t>
+        <a:bodyPr/>
+        <a:lstStyle/>
+        <a:p>
+          <a:endParaRPr lang="en-US"/>
+        </a:p>
+      </dgm:t>
+    </dgm:pt>
+    <dgm:pt modelId="{FEA19CE0-6144-4769-8AEA-3EBD15DE5155}" type="pres">
+      <dgm:prSet presAssocID="{291F1056-283A-41D0-AD51-AE156C37B1C0}" presName="textRect" presStyleLbl="revTx" presStyleIdx="4" presStyleCnt="11" custLinFactNeighborY="27830">
+        <dgm:presLayoutVars>
+          <dgm:bulletEnabled val="1"/>
+        </dgm:presLayoutVars>
+      </dgm:prSet>
+      <dgm:spPr/>
+      <dgm:t>
+        <a:bodyPr/>
+        <a:lstStyle/>
+        <a:p>
+          <a:endParaRPr lang="en-US"/>
+        </a:p>
+      </dgm:t>
+    </dgm:pt>
+    <dgm:pt modelId="{B8BEBCAD-05AD-43DE-9732-C7CBAF63C309}" type="pres">
+      <dgm:prSet presAssocID="{B36F7E42-BFC8-4598-AFE4-27F5D899299B}" presName="sibTrans" presStyleLbl="sibTrans2D1" presStyleIdx="0" presStyleCnt="0"/>
+      <dgm:spPr/>
+      <dgm:t>
+        <a:bodyPr/>
+        <a:lstStyle/>
+        <a:p>
+          <a:endParaRPr lang="en-US"/>
+        </a:p>
+      </dgm:t>
+    </dgm:pt>
+    <dgm:pt modelId="{1838EE6D-134A-4000-A266-844B6AB3E5BC}" type="pres">
+      <dgm:prSet presAssocID="{4D7EACAB-C30A-4528-8AF2-6566B7C2770F}" presName="compNode" presStyleCnt="0"/>
+      <dgm:spPr/>
+    </dgm:pt>
+    <dgm:pt modelId="{5EF3B04E-7D09-4FCE-A0C8-2A78869A2FFD}" type="pres">
+      <dgm:prSet presAssocID="{4D7EACAB-C30A-4528-8AF2-6566B7C2770F}" presName="pictRect" presStyleLbl="node1" presStyleIdx="5" presStyleCnt="11" custScaleY="145158"/>
+      <dgm:spPr>
+        <a:blipFill>
+          <a:blip xmlns:r="http://schemas.openxmlformats.org/officeDocument/2006/relationships" r:embed="rId6">
+            <a:extLst>
+              <a:ext uri="{28A0092B-C50C-407E-A947-70E740481C1C}">
+                <a14:useLocalDpi xmlns:a14="http://schemas.microsoft.com/office/drawing/2010/main" val="0"/>
+              </a:ext>
+            </a:extLst>
+          </a:blip>
+          <a:srcRect/>
+          <a:stretch>
+            <a:fillRect l="-2000" r="-2000"/>
+          </a:stretch>
+        </a:blipFill>
+      </dgm:spPr>
+      <dgm:t>
+        <a:bodyPr/>
+        <a:lstStyle/>
+        <a:p>
+          <a:endParaRPr lang="en-US"/>
+        </a:p>
+      </dgm:t>
+    </dgm:pt>
+    <dgm:pt modelId="{834B9393-E806-4BA8-96B6-89DB08EF00F3}" type="pres">
+      <dgm:prSet presAssocID="{4D7EACAB-C30A-4528-8AF2-6566B7C2770F}" presName="textRect" presStyleLbl="revTx" presStyleIdx="5" presStyleCnt="11" custLinFactNeighborY="27830">
+        <dgm:presLayoutVars>
+          <dgm:bulletEnabled val="1"/>
+        </dgm:presLayoutVars>
+      </dgm:prSet>
+      <dgm:spPr/>
+      <dgm:t>
+        <a:bodyPr/>
+        <a:lstStyle/>
+        <a:p>
+          <a:endParaRPr lang="en-US"/>
+        </a:p>
+      </dgm:t>
+    </dgm:pt>
+    <dgm:pt modelId="{401293E9-76FD-4070-B323-BE94EE4E385B}" type="pres">
+      <dgm:prSet presAssocID="{BDFA7A51-10ED-4977-85AE-BBAE512BCB34}" presName="sibTrans" presStyleLbl="sibTrans2D1" presStyleIdx="0" presStyleCnt="0"/>
+      <dgm:spPr/>
+      <dgm:t>
+        <a:bodyPr/>
+        <a:lstStyle/>
+        <a:p>
+          <a:endParaRPr lang="en-US"/>
+        </a:p>
+      </dgm:t>
+    </dgm:pt>
+    <dgm:pt modelId="{488229B2-7747-49E2-BB91-0AB99BD961AE}" type="pres">
+      <dgm:prSet presAssocID="{10BCA8D8-20CF-44A7-8697-9C744D7C789F}" presName="compNode" presStyleCnt="0"/>
+      <dgm:spPr/>
+    </dgm:pt>
+    <dgm:pt modelId="{BA9A3791-8D81-490B-B02E-C84CBDFCCD54}" type="pres">
+      <dgm:prSet presAssocID="{10BCA8D8-20CF-44A7-8697-9C744D7C789F}" presName="pictRect" presStyleLbl="node1" presStyleIdx="6" presStyleCnt="11" custScaleY="145158"/>
+      <dgm:spPr>
+        <a:blipFill>
+          <a:blip xmlns:r="http://schemas.openxmlformats.org/officeDocument/2006/relationships" r:embed="rId7">
+            <a:extLst>
+              <a:ext uri="{28A0092B-C50C-407E-A947-70E740481C1C}">
+                <a14:useLocalDpi xmlns:a14="http://schemas.microsoft.com/office/drawing/2010/main" val="0"/>
+              </a:ext>
+            </a:extLst>
+          </a:blip>
+          <a:srcRect/>
+          <a:stretch>
+            <a:fillRect l="-1000" r="-1000"/>
+          </a:stretch>
+        </a:blipFill>
+      </dgm:spPr>
+      <dgm:t>
+        <a:bodyPr/>
+        <a:lstStyle/>
+        <a:p>
+          <a:endParaRPr lang="en-US"/>
+        </a:p>
+      </dgm:t>
+    </dgm:pt>
+    <dgm:pt modelId="{8FFDDAAC-5015-46D5-85BC-3284930022E5}" type="pres">
+      <dgm:prSet presAssocID="{10BCA8D8-20CF-44A7-8697-9C744D7C789F}" presName="textRect" presStyleLbl="revTx" presStyleIdx="6" presStyleCnt="11" custLinFactNeighborY="32228">
+        <dgm:presLayoutVars>
+          <dgm:bulletEnabled val="1"/>
+        </dgm:presLayoutVars>
+      </dgm:prSet>
+      <dgm:spPr/>
+      <dgm:t>
+        <a:bodyPr/>
+        <a:lstStyle/>
+        <a:p>
+          <a:endParaRPr lang="en-US"/>
+        </a:p>
+      </dgm:t>
+    </dgm:pt>
+    <dgm:pt modelId="{8EC53AE5-36C2-4C48-8622-55C539CC0749}" type="pres">
+      <dgm:prSet presAssocID="{B0FDBC70-BD9B-4D18-A676-DAD7062DA44B}" presName="sibTrans" presStyleLbl="sibTrans2D1" presStyleIdx="0" presStyleCnt="0"/>
+      <dgm:spPr/>
+      <dgm:t>
+        <a:bodyPr/>
+        <a:lstStyle/>
+        <a:p>
+          <a:endParaRPr lang="en-US"/>
+        </a:p>
+      </dgm:t>
+    </dgm:pt>
+    <dgm:pt modelId="{A8366329-EACE-4A9E-9FFF-BF57BF74F3D2}" type="pres">
+      <dgm:prSet presAssocID="{B1DF718F-CFE2-4E40-AD43-F653B2AB85B0}" presName="compNode" presStyleCnt="0"/>
+      <dgm:spPr/>
+    </dgm:pt>
+    <dgm:pt modelId="{F6B1506E-664F-4818-A01D-BC9344AA3B71}" type="pres">
+      <dgm:prSet presAssocID="{B1DF718F-CFE2-4E40-AD43-F653B2AB85B0}" presName="pictRect" presStyleLbl="node1" presStyleIdx="7" presStyleCnt="11" custScaleY="145158"/>
+      <dgm:spPr>
+        <a:blipFill>
+          <a:blip xmlns:r="http://schemas.openxmlformats.org/officeDocument/2006/relationships" r:embed="rId8">
+            <a:extLst>
+              <a:ext uri="{28A0092B-C50C-407E-A947-70E740481C1C}">
+                <a14:useLocalDpi xmlns:a14="http://schemas.microsoft.com/office/drawing/2010/main" val="0"/>
+              </a:ext>
+            </a:extLst>
+          </a:blip>
+          <a:srcRect/>
+          <a:stretch>
+            <a:fillRect l="-2000" r="-2000"/>
+          </a:stretch>
+        </a:blipFill>
+      </dgm:spPr>
+      <dgm:t>
+        <a:bodyPr/>
+        <a:lstStyle/>
+        <a:p>
+          <a:endParaRPr lang="en-US"/>
+        </a:p>
+      </dgm:t>
+    </dgm:pt>
+    <dgm:pt modelId="{7A66E752-626A-4569-A443-E5F7F895BD41}" type="pres">
+      <dgm:prSet presAssocID="{B1DF718F-CFE2-4E40-AD43-F653B2AB85B0}" presName="textRect" presStyleLbl="revTx" presStyleIdx="7" presStyleCnt="11" custLinFactNeighborY="32228">
+        <dgm:presLayoutVars>
+          <dgm:bulletEnabled val="1"/>
+        </dgm:presLayoutVars>
+      </dgm:prSet>
+      <dgm:spPr/>
+      <dgm:t>
+        <a:bodyPr/>
+        <a:lstStyle/>
+        <a:p>
+          <a:endParaRPr lang="en-US"/>
+        </a:p>
+      </dgm:t>
+    </dgm:pt>
+    <dgm:pt modelId="{FE312DD7-5C0A-4FB6-BC18-5A627A795B95}" type="pres">
+      <dgm:prSet presAssocID="{A59869DC-3147-465E-B6A0-FCFAA9AE0237}" presName="sibTrans" presStyleLbl="sibTrans2D1" presStyleIdx="0" presStyleCnt="0"/>
+      <dgm:spPr/>
+      <dgm:t>
+        <a:bodyPr/>
+        <a:lstStyle/>
+        <a:p>
+          <a:endParaRPr lang="en-US"/>
+        </a:p>
+      </dgm:t>
+    </dgm:pt>
+    <dgm:pt modelId="{E616B7EA-CB19-485B-8BEF-44050A4619BF}" type="pres">
+      <dgm:prSet presAssocID="{EA1116B2-9487-4F74-AEAE-010523D7BC55}" presName="compNode" presStyleCnt="0"/>
+      <dgm:spPr/>
+    </dgm:pt>
+    <dgm:pt modelId="{F82522DD-42F0-4237-BA73-DFB1BDB778A3}" type="pres">
+      <dgm:prSet presAssocID="{EA1116B2-9487-4F74-AEAE-010523D7BC55}" presName="pictRect" presStyleLbl="node1" presStyleIdx="8" presStyleCnt="11" custScaleY="145158"/>
+      <dgm:spPr>
+        <a:blipFill>
+          <a:blip xmlns:r="http://schemas.openxmlformats.org/officeDocument/2006/relationships" r:embed="rId9">
+            <a:extLst>
+              <a:ext uri="{28A0092B-C50C-407E-A947-70E740481C1C}">
+                <a14:useLocalDpi xmlns:a14="http://schemas.microsoft.com/office/drawing/2010/main" val="0"/>
+              </a:ext>
+            </a:extLst>
+          </a:blip>
+          <a:srcRect/>
+          <a:stretch>
+            <a:fillRect l="-2000" r="-2000"/>
+          </a:stretch>
+        </a:blipFill>
+      </dgm:spPr>
+      <dgm:t>
+        <a:bodyPr/>
+        <a:lstStyle/>
+        <a:p>
+          <a:endParaRPr lang="en-US"/>
+        </a:p>
+      </dgm:t>
+    </dgm:pt>
+    <dgm:pt modelId="{9C871E9F-EB84-4B32-B6F7-6CAD3D929581}" type="pres">
+      <dgm:prSet presAssocID="{EA1116B2-9487-4F74-AEAE-010523D7BC55}" presName="textRect" presStyleLbl="revTx" presStyleIdx="8" presStyleCnt="11" custLinFactNeighborY="32228">
+        <dgm:presLayoutVars>
+          <dgm:bulletEnabled val="1"/>
+        </dgm:presLayoutVars>
+      </dgm:prSet>
+      <dgm:spPr/>
+      <dgm:t>
+        <a:bodyPr/>
+        <a:lstStyle/>
+        <a:p>
+          <a:endParaRPr lang="en-US"/>
+        </a:p>
+      </dgm:t>
+    </dgm:pt>
+    <dgm:pt modelId="{21ABC2A0-16AB-4F7F-9546-1FED82609BAC}" type="pres">
+      <dgm:prSet presAssocID="{992641AA-4285-4D59-9638-D26B92EFADF1}" presName="sibTrans" presStyleLbl="sibTrans2D1" presStyleIdx="0" presStyleCnt="0"/>
+      <dgm:spPr/>
+      <dgm:t>
+        <a:bodyPr/>
+        <a:lstStyle/>
+        <a:p>
+          <a:endParaRPr lang="en-US"/>
+        </a:p>
+      </dgm:t>
+    </dgm:pt>
+    <dgm:pt modelId="{9770BED6-BBD5-401F-AF20-7CD7F74F5599}" type="pres">
+      <dgm:prSet presAssocID="{C87FD8D1-1200-4E9E-A0C8-8E394B979853}" presName="compNode" presStyleCnt="0"/>
+      <dgm:spPr/>
+    </dgm:pt>
+    <dgm:pt modelId="{F2FBCA01-AB69-4BEB-B792-B46BCDD30A21}" type="pres">
+      <dgm:prSet presAssocID="{C87FD8D1-1200-4E9E-A0C8-8E394B979853}" presName="pictRect" presStyleLbl="node1" presStyleIdx="9" presStyleCnt="11" custScaleY="145158"/>
+      <dgm:spPr>
+        <a:blipFill>
+          <a:blip xmlns:r="http://schemas.openxmlformats.org/officeDocument/2006/relationships" r:embed="rId10">
+            <a:extLst>
+              <a:ext uri="{28A0092B-C50C-407E-A947-70E740481C1C}">
+                <a14:useLocalDpi xmlns:a14="http://schemas.microsoft.com/office/drawing/2010/main" val="0"/>
+              </a:ext>
+            </a:extLst>
+          </a:blip>
+          <a:srcRect/>
+          <a:stretch>
+            <a:fillRect l="-2000" r="-2000"/>
+          </a:stretch>
+        </a:blipFill>
+      </dgm:spPr>
+      <dgm:t>
+        <a:bodyPr/>
+        <a:lstStyle/>
+        <a:p>
+          <a:endParaRPr lang="en-US"/>
+        </a:p>
+      </dgm:t>
+    </dgm:pt>
+    <dgm:pt modelId="{0884AC10-478F-42E7-BB0A-94DC6E41D797}" type="pres">
+      <dgm:prSet presAssocID="{C87FD8D1-1200-4E9E-A0C8-8E394B979853}" presName="textRect" presStyleLbl="revTx" presStyleIdx="9" presStyleCnt="11" custLinFactNeighborY="32228">
+        <dgm:presLayoutVars>
+          <dgm:bulletEnabled val="1"/>
+        </dgm:presLayoutVars>
+      </dgm:prSet>
+      <dgm:spPr/>
+      <dgm:t>
+        <a:bodyPr/>
+        <a:lstStyle/>
+        <a:p>
+          <a:endParaRPr lang="en-US"/>
+        </a:p>
+      </dgm:t>
+    </dgm:pt>
+    <dgm:pt modelId="{148FFCB1-F5FA-4EF8-A3C8-27253E62FD85}" type="pres">
+      <dgm:prSet presAssocID="{C6BE6B5F-13DA-4A66-BA35-AAD5F29A075F}" presName="sibTrans" presStyleLbl="sibTrans2D1" presStyleIdx="0" presStyleCnt="0"/>
+      <dgm:spPr/>
+      <dgm:t>
+        <a:bodyPr/>
+        <a:lstStyle/>
+        <a:p>
+          <a:endParaRPr lang="en-US"/>
+        </a:p>
+      </dgm:t>
+    </dgm:pt>
+    <dgm:pt modelId="{6C5F2F4F-802E-4DA4-B9D0-94245FAE7433}" type="pres">
+      <dgm:prSet presAssocID="{8F76094E-FCF0-4382-959D-DDFFB8E8DDD0}" presName="compNode" presStyleCnt="0"/>
+      <dgm:spPr/>
+    </dgm:pt>
+    <dgm:pt modelId="{B6163960-C9CB-48E6-9D40-2444A56E0408}" type="pres">
+      <dgm:prSet presAssocID="{8F76094E-FCF0-4382-959D-DDFFB8E8DDD0}" presName="pictRect" presStyleLbl="node1" presStyleIdx="10" presStyleCnt="11" custScaleY="145158"/>
+      <dgm:spPr>
+        <a:blipFill>
+          <a:blip xmlns:r="http://schemas.openxmlformats.org/officeDocument/2006/relationships" r:embed="rId11">
+            <a:extLst>
+              <a:ext uri="{28A0092B-C50C-407E-A947-70E740481C1C}">
+                <a14:useLocalDpi xmlns:a14="http://schemas.microsoft.com/office/drawing/2010/main" val="0"/>
+              </a:ext>
+            </a:extLst>
+          </a:blip>
+          <a:srcRect/>
+          <a:stretch>
+            <a:fillRect l="-2000" r="-2000"/>
+          </a:stretch>
+        </a:blipFill>
+      </dgm:spPr>
+      <dgm:t>
+        <a:bodyPr/>
+        <a:lstStyle/>
+        <a:p>
+          <a:endParaRPr lang="en-US"/>
+        </a:p>
+      </dgm:t>
+    </dgm:pt>
+    <dgm:pt modelId="{9F050DD8-A04C-4F86-B0ED-A7C896566813}" type="pres">
+      <dgm:prSet presAssocID="{8F76094E-FCF0-4382-959D-DDFFB8E8DDD0}" presName="textRect" presStyleLbl="revTx" presStyleIdx="10" presStyleCnt="11" custLinFactNeighborY="32228">
+        <dgm:presLayoutVars>
+          <dgm:bulletEnabled val="1"/>
+        </dgm:presLayoutVars>
+      </dgm:prSet>
+      <dgm:spPr/>
+      <dgm:t>
+        <a:bodyPr/>
+        <a:lstStyle/>
+        <a:p>
+          <a:endParaRPr lang="en-US"/>
+        </a:p>
+      </dgm:t>
+    </dgm:pt>
   </dgm:ptLst>
   <dgm:cxnLst>
+    <dgm:cxn modelId="{BFEAB10E-66F8-4CB2-96F0-49422BF5A8D1}" srcId="{DC87DDC6-9BF2-4964-9E87-9FB965DABF5D}" destId="{984AEDF1-8F1B-4C9E-8222-F7D0CDFB53FE}" srcOrd="2" destOrd="0" parTransId="{2F7810B2-1032-461A-A475-01D813CEE5A6}" sibTransId="{85CC0DF3-B163-4CED-BE3C-1FA69AC14433}"/>
+    <dgm:cxn modelId="{A2E76289-D19E-4A01-8240-E969C4BB9EE1}" type="presOf" srcId="{DC87DDC6-9BF2-4964-9E87-9FB965DABF5D}" destId="{3045BBB5-804A-4601-B852-73808B4388BC}" srcOrd="0" destOrd="0" presId="urn:microsoft.com/office/officeart/2005/8/layout/pList1"/>
+    <dgm:cxn modelId="{0BC5AB90-C9CD-4A0F-8E78-C3E479CE0E9D}" type="presOf" srcId="{4D7EACAB-C30A-4528-8AF2-6566B7C2770F}" destId="{834B9393-E806-4BA8-96B6-89DB08EF00F3}" srcOrd="0" destOrd="0" presId="urn:microsoft.com/office/officeart/2005/8/layout/pList1"/>
+    <dgm:cxn modelId="{ABD73FAB-21D3-40B1-A9AA-2B1EE8427B72}" type="presOf" srcId="{2245D461-248E-4875-A913-2D93E3913285}" destId="{F2F86CA1-8ED9-40C6-BA22-83D3802A5E1F}" srcOrd="0" destOrd="0" presId="urn:microsoft.com/office/officeart/2005/8/layout/pList1"/>
+    <dgm:cxn modelId="{05B52F21-ADC4-4BB0-91DD-5FE6A8C0E89E}" srcId="{DC87DDC6-9BF2-4964-9E87-9FB965DABF5D}" destId="{291F1056-283A-41D0-AD51-AE156C37B1C0}" srcOrd="4" destOrd="0" parTransId="{DFB3EFC6-E60A-44E2-9EDB-E35CB733A08E}" sibTransId="{B36F7E42-BFC8-4598-AFE4-27F5D899299B}"/>
     <dgm:cxn modelId="{4E7C06C1-18B1-4094-86A4-2FCDDAE879E7}" type="presOf" srcId="{8F76094E-FCF0-4382-959D-DDFFB8E8DDD0}" destId="{9F050DD8-A04C-4F86-B0ED-A7C896566813}" srcOrd="0" destOrd="0" presId="urn:microsoft.com/office/officeart/2005/8/layout/pList1"/>
+    <dgm:cxn modelId="{4E84BD9F-0B11-46D2-ADBD-CE221CA60EFD}" srcId="{DC87DDC6-9BF2-4964-9E87-9FB965DABF5D}" destId="{4D7EACAB-C30A-4528-8AF2-6566B7C2770F}" srcOrd="5" destOrd="0" parTransId="{C6B8B6C2-A794-46FC-A374-B55C12F5CFD2}" sibTransId="{BDFA7A51-10ED-4977-85AE-BBAE512BCB34}"/>
+    <dgm:cxn modelId="{4EFD5E6A-C30D-4CB1-BC8E-F8AF197456EC}" srcId="{DC87DDC6-9BF2-4964-9E87-9FB965DABF5D}" destId="{C87FD8D1-1200-4E9E-A0C8-8E394B979853}" srcOrd="9" destOrd="0" parTransId="{46EC3F93-DDEC-454D-9942-5A6C0D082D26}" sibTransId="{C6BE6B5F-13DA-4A66-BA35-AAD5F29A075F}"/>
+    <dgm:cxn modelId="{7A6E6950-D361-4336-A805-EE98F2A3D2C0}" type="presOf" srcId="{284221E8-6A5D-479D-9C64-8647FDBD90F7}" destId="{09880910-0797-434B-AD31-1961608BAD83}" srcOrd="0" destOrd="0" presId="urn:microsoft.com/office/officeart/2005/8/layout/pList1"/>
+    <dgm:cxn modelId="{606E289A-A86E-44D3-B554-97C607C49356}" type="presOf" srcId="{984AEDF1-8F1B-4C9E-8222-F7D0CDFB53FE}" destId="{647C9E19-CCC8-46AE-A4D6-8146BB7619E9}" srcOrd="0" destOrd="0" presId="urn:microsoft.com/office/officeart/2005/8/layout/pList1"/>
+    <dgm:cxn modelId="{48520C9B-5E91-44CC-98CA-C6F162C95447}" srcId="{DC87DDC6-9BF2-4964-9E87-9FB965DABF5D}" destId="{349D7D0B-4346-4E3A-AF55-971FFDEF6E78}" srcOrd="3" destOrd="0" parTransId="{F11F8DF7-A742-4001-8A25-9BF666199726}" sibTransId="{2245D461-248E-4875-A913-2D93E3913285}"/>
+    <dgm:cxn modelId="{9295AF0C-444B-4A6D-BC0B-D90D3244B486}" type="presOf" srcId="{C6BE6B5F-13DA-4A66-BA35-AAD5F29A075F}" destId="{148FFCB1-F5FA-4EF8-A3C8-27253E62FD85}" srcOrd="0" destOrd="0" presId="urn:microsoft.com/office/officeart/2005/8/layout/pList1"/>
+    <dgm:cxn modelId="{0FAA52A2-E119-4CCE-BF87-2B6CEB16ABC2}" srcId="{DC87DDC6-9BF2-4964-9E87-9FB965DABF5D}" destId="{EA1116B2-9487-4F74-AEAE-010523D7BC55}" srcOrd="8" destOrd="0" parTransId="{9D15692B-961D-49BB-8D03-034BFE96840E}" sibTransId="{992641AA-4285-4D59-9638-D26B92EFADF1}"/>
+    <dgm:cxn modelId="{1559844B-9D02-4C54-8263-D633D7CBFC9B}" type="presOf" srcId="{B0FDBC70-BD9B-4D18-A676-DAD7062DA44B}" destId="{8EC53AE5-36C2-4C48-8622-55C539CC0749}" srcOrd="0" destOrd="0" presId="urn:microsoft.com/office/officeart/2005/8/layout/pList1"/>
+    <dgm:cxn modelId="{E04574CA-02D4-4632-A892-4F3E6BAAFB26}" type="presOf" srcId="{992641AA-4285-4D59-9638-D26B92EFADF1}" destId="{21ABC2A0-16AB-4F7F-9546-1FED82609BAC}" srcOrd="0" destOrd="0" presId="urn:microsoft.com/office/officeart/2005/8/layout/pList1"/>
+    <dgm:cxn modelId="{0D1D1CC4-BD15-4DFE-AB40-8C0EAEEEFA93}" type="presOf" srcId="{C4BB5136-E5BF-4A2F-8516-FA1224DD41D1}" destId="{BC2EB331-AF00-4E20-A08C-ADA53896BA6E}" srcOrd="0" destOrd="0" presId="urn:microsoft.com/office/officeart/2005/8/layout/pList1"/>
+    <dgm:cxn modelId="{D929F2E2-DC30-4B62-A76C-366870B0616E}" type="presOf" srcId="{291F1056-283A-41D0-AD51-AE156C37B1C0}" destId="{FEA19CE0-6144-4769-8AEA-3EBD15DE5155}" srcOrd="0" destOrd="0" presId="urn:microsoft.com/office/officeart/2005/8/layout/pList1"/>
+    <dgm:cxn modelId="{184163D6-FB5D-499D-B8DC-515F8345C9A7}" srcId="{DC87DDC6-9BF2-4964-9E87-9FB965DABF5D}" destId="{8D1DD9BB-2FD5-49F9-B739-66E12D5FB53A}" srcOrd="0" destOrd="0" parTransId="{260534EA-679C-4D50-982D-CBA3A5635514}" sibTransId="{284221E8-6A5D-479D-9C64-8647FDBD90F7}"/>
+    <dgm:cxn modelId="{E450FC35-E82E-4B76-89C8-B5643666A1E4}" type="presOf" srcId="{B1DF718F-CFE2-4E40-AD43-F653B2AB85B0}" destId="{7A66E752-626A-4569-A443-E5F7F895BD41}" srcOrd="0" destOrd="0" presId="urn:microsoft.com/office/officeart/2005/8/layout/pList1"/>
+    <dgm:cxn modelId="{BF6308BA-A295-497F-A533-6BD8BB6E8E34}" type="presOf" srcId="{A59869DC-3147-465E-B6A0-FCFAA9AE0237}" destId="{FE312DD7-5C0A-4FB6-BC18-5A627A795B95}" srcOrd="0" destOrd="0" presId="urn:microsoft.com/office/officeart/2005/8/layout/pList1"/>
+    <dgm:cxn modelId="{EF23466F-9041-4DFE-B447-25626DB0C3AC}" srcId="{DC87DDC6-9BF2-4964-9E87-9FB965DABF5D}" destId="{B1DF718F-CFE2-4E40-AD43-F653B2AB85B0}" srcOrd="7" destOrd="0" parTransId="{3A6FBF42-423E-4978-A08A-B6D7CA02556D}" sibTransId="{A59869DC-3147-465E-B6A0-FCFAA9AE0237}"/>
+    <dgm:cxn modelId="{EBDFE754-6891-4BBF-BE47-77DF74B58753}" type="presOf" srcId="{C87FD8D1-1200-4E9E-A0C8-8E394B979853}" destId="{0884AC10-478F-42E7-BB0A-94DC6E41D797}" srcOrd="0" destOrd="0" presId="urn:microsoft.com/office/officeart/2005/8/layout/pList1"/>
+    <dgm:cxn modelId="{2F6C8346-C074-4FF0-87A8-8C25BB33764F}" type="presOf" srcId="{85CC0DF3-B163-4CED-BE3C-1FA69AC14433}" destId="{1FA414FC-266A-4129-8F37-89170AE28978}" srcOrd="0" destOrd="0" presId="urn:microsoft.com/office/officeart/2005/8/layout/pList1"/>
+    <dgm:cxn modelId="{E1558604-6C13-4A6E-9086-C87C41AE907C}" type="presOf" srcId="{349D7D0B-4346-4E3A-AF55-971FFDEF6E78}" destId="{DC29C323-9274-4BE5-A8FE-5047D5BDF8E6}" srcOrd="0" destOrd="0" presId="urn:microsoft.com/office/officeart/2005/8/layout/pList1"/>
+    <dgm:cxn modelId="{DCCC0352-6DF7-4E11-8A89-D3AECD5210F6}" type="presOf" srcId="{8D1DD9BB-2FD5-49F9-B739-66E12D5FB53A}" destId="{343FABA3-EAA5-430F-9977-5A929A400932}" srcOrd="0" destOrd="0" presId="urn:microsoft.com/office/officeart/2005/8/layout/pList1"/>
+    <dgm:cxn modelId="{5FF9C90B-BDF1-4C46-9E3D-E158F6AFAF03}" type="presOf" srcId="{280AE31E-5671-4086-BFBC-D251814C2BE1}" destId="{D34C5AC7-17A2-4B2A-8B92-B580205857D4}" srcOrd="0" destOrd="0" presId="urn:microsoft.com/office/officeart/2005/8/layout/pList1"/>
+    <dgm:cxn modelId="{93575134-52DC-47E5-AB24-F4AC9F9B1117}" type="presOf" srcId="{10BCA8D8-20CF-44A7-8697-9C744D7C789F}" destId="{8FFDDAAC-5015-46D5-85BC-3284930022E5}" srcOrd="0" destOrd="0" presId="urn:microsoft.com/office/officeart/2005/8/layout/pList1"/>
+    <dgm:cxn modelId="{2AD8EBBF-7C69-4016-ABCD-BED410510EC8}" type="presOf" srcId="{BDFA7A51-10ED-4977-85AE-BBAE512BCB34}" destId="{401293E9-76FD-4070-B323-BE94EE4E385B}" srcOrd="0" destOrd="0" presId="urn:microsoft.com/office/officeart/2005/8/layout/pList1"/>
+    <dgm:cxn modelId="{EE0EBAC4-A308-4B68-B9B9-72449DBA0AE4}" srcId="{DC87DDC6-9BF2-4964-9E87-9FB965DABF5D}" destId="{280AE31E-5671-4086-BFBC-D251814C2BE1}" srcOrd="1" destOrd="0" parTransId="{B499474D-596C-4C4C-9BAD-6A7D80290865}" sibTransId="{C4BB5136-E5BF-4A2F-8516-FA1224DD41D1}"/>
+    <dgm:cxn modelId="{1A27AF2F-E3B6-4C12-A42D-0A2CACC233E8}" type="presOf" srcId="{B36F7E42-BFC8-4598-AFE4-27F5D899299B}" destId="{B8BEBCAD-05AD-43DE-9732-C7CBAF63C309}" srcOrd="0" destOrd="0" presId="urn:microsoft.com/office/officeart/2005/8/layout/pList1"/>
     <dgm:cxn modelId="{8E95423A-CA58-4AAF-811A-8901C1E69A9A}" srcId="{DC87DDC6-9BF2-4964-9E87-9FB965DABF5D}" destId="{10BCA8D8-20CF-44A7-8697-9C744D7C789F}" srcOrd="6" destOrd="0" parTransId="{0E737625-7299-4B05-A082-14D2D9316CE0}" sibTransId="{B0FDBC70-BD9B-4D18-A676-DAD7062DA44B}"/>
-    <dgm:cxn modelId="{0D1D1CC4-BD15-4DFE-AB40-8C0EAEEEFA93}" type="presOf" srcId="{C4BB5136-E5BF-4A2F-8516-FA1224DD41D1}" destId="{BC2EB331-AF00-4E20-A08C-ADA53896BA6E}" srcOrd="0" destOrd="0" presId="urn:microsoft.com/office/officeart/2005/8/layout/pList1"/>
-    <dgm:cxn modelId="{48520C9B-5E91-44CC-98CA-C6F162C95447}" srcId="{DC87DDC6-9BF2-4964-9E87-9FB965DABF5D}" destId="{349D7D0B-4346-4E3A-AF55-971FFDEF6E78}" srcOrd="3" destOrd="0" parTransId="{F11F8DF7-A742-4001-8A25-9BF666199726}" sibTransId="{2245D461-248E-4875-A913-2D93E3913285}"/>
-    <dgm:cxn modelId="{184163D6-FB5D-499D-B8DC-515F8345C9A7}" srcId="{DC87DDC6-9BF2-4964-9E87-9FB965DABF5D}" destId="{8D1DD9BB-2FD5-49F9-B739-66E12D5FB53A}" srcOrd="0" destOrd="0" parTransId="{260534EA-679C-4D50-982D-CBA3A5635514}" sibTransId="{284221E8-6A5D-479D-9C64-8647FDBD90F7}"/>
-    <dgm:cxn modelId="{05B52F21-ADC4-4BB0-91DD-5FE6A8C0E89E}" srcId="{DC87DDC6-9BF2-4964-9E87-9FB965DABF5D}" destId="{291F1056-283A-41D0-AD51-AE156C37B1C0}" srcOrd="4" destOrd="0" parTransId="{DFB3EFC6-E60A-44E2-9EDB-E35CB733A08E}" sibTransId="{B36F7E42-BFC8-4598-AFE4-27F5D899299B}"/>
-    <dgm:cxn modelId="{9295AF0C-444B-4A6D-BC0B-D90D3244B486}" type="presOf" srcId="{C6BE6B5F-13DA-4A66-BA35-AAD5F29A075F}" destId="{148FFCB1-F5FA-4EF8-A3C8-27253E62FD85}" srcOrd="0" destOrd="0" presId="urn:microsoft.com/office/officeart/2005/8/layout/pList1"/>
-    <dgm:cxn modelId="{5FF9C90B-BDF1-4C46-9E3D-E158F6AFAF03}" type="presOf" srcId="{280AE31E-5671-4086-BFBC-D251814C2BE1}" destId="{D34C5AC7-17A2-4B2A-8B92-B580205857D4}" srcOrd="0" destOrd="0" presId="urn:microsoft.com/office/officeart/2005/8/layout/pList1"/>
-    <dgm:cxn modelId="{EE0EBAC4-A308-4B68-B9B9-72449DBA0AE4}" srcId="{DC87DDC6-9BF2-4964-9E87-9FB965DABF5D}" destId="{280AE31E-5671-4086-BFBC-D251814C2BE1}" srcOrd="1" destOrd="0" parTransId="{B499474D-596C-4C4C-9BAD-6A7D80290865}" sibTransId="{C4BB5136-E5BF-4A2F-8516-FA1224DD41D1}"/>
-    <dgm:cxn modelId="{E04574CA-02D4-4632-A892-4F3E6BAAFB26}" type="presOf" srcId="{992641AA-4285-4D59-9638-D26B92EFADF1}" destId="{21ABC2A0-16AB-4F7F-9546-1FED82609BAC}" srcOrd="0" destOrd="0" presId="urn:microsoft.com/office/officeart/2005/8/layout/pList1"/>
-    <dgm:cxn modelId="{BF6308BA-A295-497F-A533-6BD8BB6E8E34}" type="presOf" srcId="{A59869DC-3147-465E-B6A0-FCFAA9AE0237}" destId="{FE312DD7-5C0A-4FB6-BC18-5A627A795B95}" srcOrd="0" destOrd="0" presId="urn:microsoft.com/office/officeart/2005/8/layout/pList1"/>
-    <dgm:cxn modelId="{EBDFE754-6891-4BBF-BE47-77DF74B58753}" type="presOf" srcId="{C87FD8D1-1200-4E9E-A0C8-8E394B979853}" destId="{0884AC10-478F-42E7-BB0A-94DC6E41D797}" srcOrd="0" destOrd="0" presId="urn:microsoft.com/office/officeart/2005/8/layout/pList1"/>
-    <dgm:cxn modelId="{606E289A-A86E-44D3-B554-97C607C49356}" type="presOf" srcId="{984AEDF1-8F1B-4C9E-8222-F7D0CDFB53FE}" destId="{647C9E19-CCC8-46AE-A4D6-8146BB7619E9}" srcOrd="0" destOrd="0" presId="urn:microsoft.com/office/officeart/2005/8/layout/pList1"/>
     <dgm:cxn modelId="{08A4D8DA-619E-4F53-9E29-2A3211F9D0BF}" srcId="{DC87DDC6-9BF2-4964-9E87-9FB965DABF5D}" destId="{8F76094E-FCF0-4382-959D-DDFFB8E8DDD0}" srcOrd="10" destOrd="0" parTransId="{2CE5187D-B6E6-415E-A446-BD0EC383FDDF}" sibTransId="{BFF42732-E24D-426E-9631-6DE32E65E559}"/>
-    <dgm:cxn modelId="{EF23466F-9041-4DFE-B447-25626DB0C3AC}" srcId="{DC87DDC6-9BF2-4964-9E87-9FB965DABF5D}" destId="{B1DF718F-CFE2-4E40-AD43-F653B2AB85B0}" srcOrd="7" destOrd="0" parTransId="{3A6FBF42-423E-4978-A08A-B6D7CA02556D}" sibTransId="{A59869DC-3147-465E-B6A0-FCFAA9AE0237}"/>
-    <dgm:cxn modelId="{BFEAB10E-66F8-4CB2-96F0-49422BF5A8D1}" srcId="{DC87DDC6-9BF2-4964-9E87-9FB965DABF5D}" destId="{984AEDF1-8F1B-4C9E-8222-F7D0CDFB53FE}" srcOrd="2" destOrd="0" parTransId="{2F7810B2-1032-461A-A475-01D813CEE5A6}" sibTransId="{85CC0DF3-B163-4CED-BE3C-1FA69AC14433}"/>
-    <dgm:cxn modelId="{ABD73FAB-21D3-40B1-A9AA-2B1EE8427B72}" type="presOf" srcId="{2245D461-248E-4875-A913-2D93E3913285}" destId="{F2F86CA1-8ED9-40C6-BA22-83D3802A5E1F}" srcOrd="0" destOrd="0" presId="urn:microsoft.com/office/officeart/2005/8/layout/pList1"/>
-    <dgm:cxn modelId="{4EFD5E6A-C30D-4CB1-BC8E-F8AF197456EC}" srcId="{DC87DDC6-9BF2-4964-9E87-9FB965DABF5D}" destId="{C87FD8D1-1200-4E9E-A0C8-8E394B979853}" srcOrd="9" destOrd="0" parTransId="{46EC3F93-DDEC-454D-9942-5A6C0D082D26}" sibTransId="{C6BE6B5F-13DA-4A66-BA35-AAD5F29A075F}"/>
-    <dgm:cxn modelId="{93575134-52DC-47E5-AB24-F4AC9F9B1117}" type="presOf" srcId="{10BCA8D8-20CF-44A7-8697-9C744D7C789F}" destId="{8FFDDAAC-5015-46D5-85BC-3284930022E5}" srcOrd="0" destOrd="0" presId="urn:microsoft.com/office/officeart/2005/8/layout/pList1"/>
-    <dgm:cxn modelId="{D929F2E2-DC30-4B62-A76C-366870B0616E}" type="presOf" srcId="{291F1056-283A-41D0-AD51-AE156C37B1C0}" destId="{FEA19CE0-6144-4769-8AEA-3EBD15DE5155}" srcOrd="0" destOrd="0" presId="urn:microsoft.com/office/officeart/2005/8/layout/pList1"/>
-    <dgm:cxn modelId="{0BC5AB90-C9CD-4A0F-8E78-C3E479CE0E9D}" type="presOf" srcId="{4D7EACAB-C30A-4528-8AF2-6566B7C2770F}" destId="{834B9393-E806-4BA8-96B6-89DB08EF00F3}" srcOrd="0" destOrd="0" presId="urn:microsoft.com/office/officeart/2005/8/layout/pList1"/>
-    <dgm:cxn modelId="{2AD8EBBF-7C69-4016-ABCD-BED410510EC8}" type="presOf" srcId="{BDFA7A51-10ED-4977-85AE-BBAE512BCB34}" destId="{401293E9-76FD-4070-B323-BE94EE4E385B}" srcOrd="0" destOrd="0" presId="urn:microsoft.com/office/officeart/2005/8/layout/pList1"/>
-    <dgm:cxn modelId="{E450FC35-E82E-4B76-89C8-B5643666A1E4}" type="presOf" srcId="{B1DF718F-CFE2-4E40-AD43-F653B2AB85B0}" destId="{7A66E752-626A-4569-A443-E5F7F895BD41}" srcOrd="0" destOrd="0" presId="urn:microsoft.com/office/officeart/2005/8/layout/pList1"/>
-    <dgm:cxn modelId="{1A27AF2F-E3B6-4C12-A42D-0A2CACC233E8}" type="presOf" srcId="{B36F7E42-BFC8-4598-AFE4-27F5D899299B}" destId="{B8BEBCAD-05AD-43DE-9732-C7CBAF63C309}" srcOrd="0" destOrd="0" presId="urn:microsoft.com/office/officeart/2005/8/layout/pList1"/>
     <dgm:cxn modelId="{F64A87E2-D17D-4119-BE58-C566E8FF727E}" type="presOf" srcId="{EA1116B2-9487-4F74-AEAE-010523D7BC55}" destId="{9C871E9F-EB84-4B32-B6F7-6CAD3D929581}" srcOrd="0" destOrd="0" presId="urn:microsoft.com/office/officeart/2005/8/layout/pList1"/>
-    <dgm:cxn modelId="{4E84BD9F-0B11-46D2-ADBD-CE221CA60EFD}" srcId="{DC87DDC6-9BF2-4964-9E87-9FB965DABF5D}" destId="{4D7EACAB-C30A-4528-8AF2-6566B7C2770F}" srcOrd="5" destOrd="0" parTransId="{C6B8B6C2-A794-46FC-A374-B55C12F5CFD2}" sibTransId="{BDFA7A51-10ED-4977-85AE-BBAE512BCB34}"/>
-    <dgm:cxn modelId="{A2E76289-D19E-4A01-8240-E969C4BB9EE1}" type="presOf" srcId="{DC87DDC6-9BF2-4964-9E87-9FB965DABF5D}" destId="{3045BBB5-804A-4601-B852-73808B4388BC}" srcOrd="0" destOrd="0" presId="urn:microsoft.com/office/officeart/2005/8/layout/pList1"/>
-    <dgm:cxn modelId="{DCCC0352-6DF7-4E11-8A89-D3AECD5210F6}" type="presOf" srcId="{8D1DD9BB-2FD5-49F9-B739-66E12D5FB53A}" destId="{343FABA3-EAA5-430F-9977-5A929A400932}" srcOrd="0" destOrd="0" presId="urn:microsoft.com/office/officeart/2005/8/layout/pList1"/>
-    <dgm:cxn modelId="{E1558604-6C13-4A6E-9086-C87C41AE907C}" type="presOf" srcId="{349D7D0B-4346-4E3A-AF55-971FFDEF6E78}" destId="{DC29C323-9274-4BE5-A8FE-5047D5BDF8E6}" srcOrd="0" destOrd="0" presId="urn:microsoft.com/office/officeart/2005/8/layout/pList1"/>
-    <dgm:cxn modelId="{0FAA52A2-E119-4CCE-BF87-2B6CEB16ABC2}" srcId="{DC87DDC6-9BF2-4964-9E87-9FB965DABF5D}" destId="{EA1116B2-9487-4F74-AEAE-010523D7BC55}" srcOrd="8" destOrd="0" parTransId="{9D15692B-961D-49BB-8D03-034BFE96840E}" sibTransId="{992641AA-4285-4D59-9638-D26B92EFADF1}"/>
-    <dgm:cxn modelId="{7A6E6950-D361-4336-A805-EE98F2A3D2C0}" type="presOf" srcId="{284221E8-6A5D-479D-9C64-8647FDBD90F7}" destId="{09880910-0797-434B-AD31-1961608BAD83}" srcOrd="0" destOrd="0" presId="urn:microsoft.com/office/officeart/2005/8/layout/pList1"/>
-    <dgm:cxn modelId="{2F6C8346-C074-4FF0-87A8-8C25BB33764F}" type="presOf" srcId="{85CC0DF3-B163-4CED-BE3C-1FA69AC14433}" destId="{1FA414FC-266A-4129-8F37-89170AE28978}" srcOrd="0" destOrd="0" presId="urn:microsoft.com/office/officeart/2005/8/layout/pList1"/>
-    <dgm:cxn modelId="{1559844B-9D02-4C54-8263-D633D7CBFC9B}" type="presOf" srcId="{B0FDBC70-BD9B-4D18-A676-DAD7062DA44B}" destId="{8EC53AE5-36C2-4C48-8622-55C539CC0749}" srcOrd="0" destOrd="0" presId="urn:microsoft.com/office/officeart/2005/8/layout/pList1"/>
     <dgm:cxn modelId="{C984B607-1260-4F26-84F3-9F20AB230B5F}" type="presParOf" srcId="{3045BBB5-804A-4601-B852-73808B4388BC}" destId="{6881A7B4-D734-4147-A4FF-48E3B17CF19D}" srcOrd="0" destOrd="0" presId="urn:microsoft.com/office/officeart/2005/8/layout/pList1"/>
     <dgm:cxn modelId="{44D537F2-C616-49C3-B430-6D749295F8F5}" type="presParOf" srcId="{6881A7B4-D734-4147-A4FF-48E3B17CF19D}" destId="{191CA2BA-BBE9-4219-815D-F475DA1BBBC8}" srcOrd="0" destOrd="0" presId="urn:microsoft.com/office/officeart/2005/8/layout/pList1"/>
     <dgm:cxn modelId="{D0147D62-DD1B-4590-8A57-60FB018C6A16}" type="presParOf" srcId="{6881A7B4-D734-4147-A4FF-48E3B17CF19D}" destId="{343FABA3-EAA5-430F-9977-5A929A400932}" srcOrd="1" destOrd="0" presId="urn:microsoft.com/office/officeart/2005/8/layout/pList1"/>
@@ -7153,13 +7478,13 @@
       </dsp:nvSpPr>
       <dsp:spPr>
         <a:xfrm>
-          <a:off x="3177" y="294837"/>
-          <a:ext cx="1546418" cy="1065482"/>
+          <a:off x="3177" y="283883"/>
+          <a:ext cx="1546418" cy="1546632"/>
         </a:xfrm>
         <a:prstGeom prst="roundRect">
           <a:avLst/>
         </a:prstGeom>
-        <a:blipFill dpi="0" rotWithShape="1">
+        <a:blipFill>
           <a:blip xmlns:r="http://schemas.openxmlformats.org/officeDocument/2006/relationships" r:embed="rId1">
             <a:extLst>
               <a:ext uri="{28A0092B-C50C-407E-A947-70E740481C1C}">
@@ -7169,7 +7494,7 @@
           </a:blip>
           <a:srcRect/>
           <a:stretch>
-            <a:fillRect/>
+            <a:fillRect l="-2000" r="-2000"/>
           </a:stretch>
         </a:blipFill>
         <a:ln w="15875" cap="flat" cmpd="sng" algn="ctr">
@@ -7207,7 +7532,7 @@
       </dsp:nvSpPr>
       <dsp:spPr>
         <a:xfrm>
-          <a:off x="3177" y="1360320"/>
+          <a:off x="3177" y="1749607"/>
           <a:ext cx="1546418" cy="573721"/>
         </a:xfrm>
         <a:prstGeom prst="rect">
@@ -7256,7 +7581,7 @@
         </a:p>
       </dsp:txBody>
       <dsp:txXfrm>
-        <a:off x="3177" y="1360320"/>
+        <a:off x="3177" y="1749607"/>
         <a:ext cx="1546418" cy="573721"/>
       </dsp:txXfrm>
     </dsp:sp>
@@ -7267,20 +7592,25 @@
       </dsp:nvSpPr>
       <dsp:spPr>
         <a:xfrm>
-          <a:off x="1704302" y="294837"/>
-          <a:ext cx="1546418" cy="1065482"/>
+          <a:off x="1704302" y="283883"/>
+          <a:ext cx="1546418" cy="1546632"/>
         </a:xfrm>
         <a:prstGeom prst="roundRect">
           <a:avLst/>
         </a:prstGeom>
-        <a:solidFill>
-          <a:schemeClr val="accent1">
-            <a:hueOff val="0"/>
-            <a:satOff val="0"/>
-            <a:lumOff val="0"/>
-            <a:alphaOff val="0"/>
-          </a:schemeClr>
-        </a:solidFill>
+        <a:blipFill>
+          <a:blip xmlns:r="http://schemas.openxmlformats.org/officeDocument/2006/relationships" r:embed="rId2">
+            <a:extLst>
+              <a:ext uri="{28A0092B-C50C-407E-A947-70E740481C1C}">
+                <a14:useLocalDpi xmlns:a14="http://schemas.microsoft.com/office/drawing/2010/main" val="0"/>
+              </a:ext>
+            </a:extLst>
+          </a:blip>
+          <a:srcRect/>
+          <a:stretch>
+            <a:fillRect l="-2000" r="-2000"/>
+          </a:stretch>
+        </a:blipFill>
         <a:ln w="15875" cap="flat" cmpd="sng" algn="ctr">
           <a:solidFill>
             <a:schemeClr val="lt1">
@@ -7316,7 +7646,7 @@
       </dsp:nvSpPr>
       <dsp:spPr>
         <a:xfrm>
-          <a:off x="1704302" y="1360320"/>
+          <a:off x="1704302" y="1749607"/>
           <a:ext cx="1546418" cy="573721"/>
         </a:xfrm>
         <a:prstGeom prst="rect">
@@ -7365,7 +7695,7 @@
         </a:p>
       </dsp:txBody>
       <dsp:txXfrm>
-        <a:off x="1704302" y="1360320"/>
+        <a:off x="1704302" y="1749607"/>
         <a:ext cx="1546418" cy="573721"/>
       </dsp:txXfrm>
     </dsp:sp>
@@ -7376,20 +7706,25 @@
       </dsp:nvSpPr>
       <dsp:spPr>
         <a:xfrm>
-          <a:off x="3405427" y="294837"/>
-          <a:ext cx="1546418" cy="1065482"/>
+          <a:off x="3405427" y="283883"/>
+          <a:ext cx="1546418" cy="1546632"/>
         </a:xfrm>
         <a:prstGeom prst="roundRect">
           <a:avLst/>
         </a:prstGeom>
-        <a:solidFill>
-          <a:schemeClr val="accent1">
-            <a:hueOff val="0"/>
-            <a:satOff val="0"/>
-            <a:lumOff val="0"/>
-            <a:alphaOff val="0"/>
-          </a:schemeClr>
-        </a:solidFill>
+        <a:blipFill>
+          <a:blip xmlns:r="http://schemas.openxmlformats.org/officeDocument/2006/relationships" r:embed="rId3">
+            <a:extLst>
+              <a:ext uri="{28A0092B-C50C-407E-A947-70E740481C1C}">
+                <a14:useLocalDpi xmlns:a14="http://schemas.microsoft.com/office/drawing/2010/main" val="0"/>
+              </a:ext>
+            </a:extLst>
+          </a:blip>
+          <a:srcRect/>
+          <a:stretch>
+            <a:fillRect l="-2000" r="-2000"/>
+          </a:stretch>
+        </a:blipFill>
         <a:ln w="15875" cap="flat" cmpd="sng" algn="ctr">
           <a:solidFill>
             <a:schemeClr val="lt1">
@@ -7425,7 +7760,7 @@
       </dsp:nvSpPr>
       <dsp:spPr>
         <a:xfrm>
-          <a:off x="3405427" y="1360320"/>
+          <a:off x="3405427" y="1749607"/>
           <a:ext cx="1546418" cy="573721"/>
         </a:xfrm>
         <a:prstGeom prst="rect">
@@ -7474,7 +7809,7 @@
         </a:p>
       </dsp:txBody>
       <dsp:txXfrm>
-        <a:off x="3405427" y="1360320"/>
+        <a:off x="3405427" y="1749607"/>
         <a:ext cx="1546418" cy="573721"/>
       </dsp:txXfrm>
     </dsp:sp>
@@ -7485,20 +7820,25 @@
       </dsp:nvSpPr>
       <dsp:spPr>
         <a:xfrm>
-          <a:off x="5106553" y="294837"/>
-          <a:ext cx="1546418" cy="1065482"/>
+          <a:off x="5106553" y="283883"/>
+          <a:ext cx="1546418" cy="1546632"/>
         </a:xfrm>
         <a:prstGeom prst="roundRect">
           <a:avLst/>
         </a:prstGeom>
-        <a:solidFill>
-          <a:schemeClr val="accent1">
-            <a:hueOff val="0"/>
-            <a:satOff val="0"/>
-            <a:lumOff val="0"/>
-            <a:alphaOff val="0"/>
-          </a:schemeClr>
-        </a:solidFill>
+        <a:blipFill>
+          <a:blip xmlns:r="http://schemas.openxmlformats.org/officeDocument/2006/relationships" r:embed="rId4">
+            <a:extLst>
+              <a:ext uri="{28A0092B-C50C-407E-A947-70E740481C1C}">
+                <a14:useLocalDpi xmlns:a14="http://schemas.microsoft.com/office/drawing/2010/main" val="0"/>
+              </a:ext>
+            </a:extLst>
+          </a:blip>
+          <a:srcRect/>
+          <a:stretch>
+            <a:fillRect l="-2000" r="-2000"/>
+          </a:stretch>
+        </a:blipFill>
         <a:ln w="15875" cap="flat" cmpd="sng" algn="ctr">
           <a:solidFill>
             <a:schemeClr val="lt1">
@@ -7534,7 +7874,7 @@
       </dsp:nvSpPr>
       <dsp:spPr>
         <a:xfrm>
-          <a:off x="5106553" y="1360320"/>
+          <a:off x="5106553" y="1749607"/>
           <a:ext cx="1546418" cy="573721"/>
         </a:xfrm>
         <a:prstGeom prst="rect">
@@ -7583,7 +7923,7 @@
         </a:p>
       </dsp:txBody>
       <dsp:txXfrm>
-        <a:off x="5106553" y="1360320"/>
+        <a:off x="5106553" y="1749607"/>
         <a:ext cx="1546418" cy="573721"/>
       </dsp:txXfrm>
     </dsp:sp>
@@ -7594,20 +7934,25 @@
       </dsp:nvSpPr>
       <dsp:spPr>
         <a:xfrm>
-          <a:off x="6807678" y="294837"/>
-          <a:ext cx="1546418" cy="1065482"/>
+          <a:off x="6807678" y="283883"/>
+          <a:ext cx="1546418" cy="1546632"/>
         </a:xfrm>
         <a:prstGeom prst="roundRect">
           <a:avLst/>
         </a:prstGeom>
-        <a:solidFill>
-          <a:schemeClr val="accent1">
-            <a:hueOff val="0"/>
-            <a:satOff val="0"/>
-            <a:lumOff val="0"/>
-            <a:alphaOff val="0"/>
-          </a:schemeClr>
-        </a:solidFill>
+        <a:blipFill>
+          <a:blip xmlns:r="http://schemas.openxmlformats.org/officeDocument/2006/relationships" r:embed="rId5">
+            <a:extLst>
+              <a:ext uri="{28A0092B-C50C-407E-A947-70E740481C1C}">
+                <a14:useLocalDpi xmlns:a14="http://schemas.microsoft.com/office/drawing/2010/main" val="0"/>
+              </a:ext>
+            </a:extLst>
+          </a:blip>
+          <a:srcRect/>
+          <a:stretch>
+            <a:fillRect l="-2000" r="-2000"/>
+          </a:stretch>
+        </a:blipFill>
         <a:ln w="15875" cap="flat" cmpd="sng" algn="ctr">
           <a:solidFill>
             <a:schemeClr val="lt1">
@@ -7643,7 +7988,7 @@
       </dsp:nvSpPr>
       <dsp:spPr>
         <a:xfrm>
-          <a:off x="6807678" y="1360320"/>
+          <a:off x="6807678" y="1749607"/>
           <a:ext cx="1546418" cy="573721"/>
         </a:xfrm>
         <a:prstGeom prst="rect">
@@ -7692,7 +8037,7 @@
         </a:p>
       </dsp:txBody>
       <dsp:txXfrm>
-        <a:off x="6807678" y="1360320"/>
+        <a:off x="6807678" y="1749607"/>
         <a:ext cx="1546418" cy="573721"/>
       </dsp:txXfrm>
     </dsp:sp>
@@ -7703,20 +8048,25 @@
       </dsp:nvSpPr>
       <dsp:spPr>
         <a:xfrm>
-          <a:off x="8508804" y="294837"/>
-          <a:ext cx="1546418" cy="1065482"/>
+          <a:off x="8508804" y="283883"/>
+          <a:ext cx="1546418" cy="1546632"/>
         </a:xfrm>
         <a:prstGeom prst="roundRect">
           <a:avLst/>
         </a:prstGeom>
-        <a:solidFill>
-          <a:schemeClr val="accent1">
-            <a:hueOff val="0"/>
-            <a:satOff val="0"/>
-            <a:lumOff val="0"/>
-            <a:alphaOff val="0"/>
-          </a:schemeClr>
-        </a:solidFill>
+        <a:blipFill>
+          <a:blip xmlns:r="http://schemas.openxmlformats.org/officeDocument/2006/relationships" r:embed="rId6">
+            <a:extLst>
+              <a:ext uri="{28A0092B-C50C-407E-A947-70E740481C1C}">
+                <a14:useLocalDpi xmlns:a14="http://schemas.microsoft.com/office/drawing/2010/main" val="0"/>
+              </a:ext>
+            </a:extLst>
+          </a:blip>
+          <a:srcRect/>
+          <a:stretch>
+            <a:fillRect l="-2000" r="-2000"/>
+          </a:stretch>
+        </a:blipFill>
         <a:ln w="15875" cap="flat" cmpd="sng" algn="ctr">
           <a:solidFill>
             <a:schemeClr val="lt1">
@@ -7752,7 +8102,7 @@
       </dsp:nvSpPr>
       <dsp:spPr>
         <a:xfrm>
-          <a:off x="8508804" y="1360320"/>
+          <a:off x="8508804" y="1749607"/>
           <a:ext cx="1546418" cy="573721"/>
         </a:xfrm>
         <a:prstGeom prst="rect">
@@ -7801,7 +8151,7 @@
         </a:p>
       </dsp:txBody>
       <dsp:txXfrm>
-        <a:off x="8508804" y="1360320"/>
+        <a:off x="8508804" y="1749607"/>
         <a:ext cx="1546418" cy="573721"/>
       </dsp:txXfrm>
     </dsp:sp>
@@ -7812,20 +8162,25 @@
       </dsp:nvSpPr>
       <dsp:spPr>
         <a:xfrm>
-          <a:off x="853739" y="2088683"/>
-          <a:ext cx="1546418" cy="1065482"/>
+          <a:off x="853739" y="2318303"/>
+          <a:ext cx="1546418" cy="1546632"/>
         </a:xfrm>
         <a:prstGeom prst="roundRect">
           <a:avLst/>
         </a:prstGeom>
-        <a:solidFill>
-          <a:schemeClr val="accent1">
-            <a:hueOff val="0"/>
-            <a:satOff val="0"/>
-            <a:lumOff val="0"/>
-            <a:alphaOff val="0"/>
-          </a:schemeClr>
-        </a:solidFill>
+        <a:blipFill>
+          <a:blip xmlns:r="http://schemas.openxmlformats.org/officeDocument/2006/relationships" r:embed="rId7">
+            <a:extLst>
+              <a:ext uri="{28A0092B-C50C-407E-A947-70E740481C1C}">
+                <a14:useLocalDpi xmlns:a14="http://schemas.microsoft.com/office/drawing/2010/main" val="0"/>
+              </a:ext>
+            </a:extLst>
+          </a:blip>
+          <a:srcRect/>
+          <a:stretch>
+            <a:fillRect l="-1000" r="-1000"/>
+          </a:stretch>
+        </a:blipFill>
         <a:ln w="15875" cap="flat" cmpd="sng" algn="ctr">
           <a:solidFill>
             <a:schemeClr val="lt1">
@@ -7861,7 +8216,7 @@
       </dsp:nvSpPr>
       <dsp:spPr>
         <a:xfrm>
-          <a:off x="853739" y="3154165"/>
+          <a:off x="853739" y="3809260"/>
           <a:ext cx="1546418" cy="573721"/>
         </a:xfrm>
         <a:prstGeom prst="rect">
@@ -7910,7 +8265,7 @@
         </a:p>
       </dsp:txBody>
       <dsp:txXfrm>
-        <a:off x="853739" y="3154165"/>
+        <a:off x="853739" y="3809260"/>
         <a:ext cx="1546418" cy="573721"/>
       </dsp:txXfrm>
     </dsp:sp>
@@ -7921,20 +8276,25 @@
       </dsp:nvSpPr>
       <dsp:spPr>
         <a:xfrm>
-          <a:off x="2554865" y="2088683"/>
-          <a:ext cx="1546418" cy="1065482"/>
+          <a:off x="2554865" y="2318303"/>
+          <a:ext cx="1546418" cy="1546632"/>
         </a:xfrm>
         <a:prstGeom prst="roundRect">
           <a:avLst/>
         </a:prstGeom>
-        <a:solidFill>
-          <a:schemeClr val="accent1">
-            <a:hueOff val="0"/>
-            <a:satOff val="0"/>
-            <a:lumOff val="0"/>
-            <a:alphaOff val="0"/>
-          </a:schemeClr>
-        </a:solidFill>
+        <a:blipFill>
+          <a:blip xmlns:r="http://schemas.openxmlformats.org/officeDocument/2006/relationships" r:embed="rId8">
+            <a:extLst>
+              <a:ext uri="{28A0092B-C50C-407E-A947-70E740481C1C}">
+                <a14:useLocalDpi xmlns:a14="http://schemas.microsoft.com/office/drawing/2010/main" val="0"/>
+              </a:ext>
+            </a:extLst>
+          </a:blip>
+          <a:srcRect/>
+          <a:stretch>
+            <a:fillRect l="-2000" r="-2000"/>
+          </a:stretch>
+        </a:blipFill>
         <a:ln w="15875" cap="flat" cmpd="sng" algn="ctr">
           <a:solidFill>
             <a:schemeClr val="lt1">
@@ -7970,7 +8330,7 @@
       </dsp:nvSpPr>
       <dsp:spPr>
         <a:xfrm>
-          <a:off x="2554865" y="3154165"/>
+          <a:off x="2554865" y="3809260"/>
           <a:ext cx="1546418" cy="573721"/>
         </a:xfrm>
         <a:prstGeom prst="rect">
@@ -8019,7 +8379,7 @@
         </a:p>
       </dsp:txBody>
       <dsp:txXfrm>
-        <a:off x="2554865" y="3154165"/>
+        <a:off x="2554865" y="3809260"/>
         <a:ext cx="1546418" cy="573721"/>
       </dsp:txXfrm>
     </dsp:sp>
@@ -8030,20 +8390,25 @@
       </dsp:nvSpPr>
       <dsp:spPr>
         <a:xfrm>
-          <a:off x="4255990" y="2088683"/>
-          <a:ext cx="1546418" cy="1065482"/>
+          <a:off x="4255990" y="2318303"/>
+          <a:ext cx="1546418" cy="1546632"/>
         </a:xfrm>
         <a:prstGeom prst="roundRect">
           <a:avLst/>
         </a:prstGeom>
-        <a:solidFill>
-          <a:schemeClr val="accent1">
-            <a:hueOff val="0"/>
-            <a:satOff val="0"/>
-            <a:lumOff val="0"/>
-            <a:alphaOff val="0"/>
-          </a:schemeClr>
-        </a:solidFill>
+        <a:blipFill>
+          <a:blip xmlns:r="http://schemas.openxmlformats.org/officeDocument/2006/relationships" r:embed="rId9">
+            <a:extLst>
+              <a:ext uri="{28A0092B-C50C-407E-A947-70E740481C1C}">
+                <a14:useLocalDpi xmlns:a14="http://schemas.microsoft.com/office/drawing/2010/main" val="0"/>
+              </a:ext>
+            </a:extLst>
+          </a:blip>
+          <a:srcRect/>
+          <a:stretch>
+            <a:fillRect l="-2000" r="-2000"/>
+          </a:stretch>
+        </a:blipFill>
         <a:ln w="15875" cap="flat" cmpd="sng" algn="ctr">
           <a:solidFill>
             <a:schemeClr val="lt1">
@@ -8079,7 +8444,7 @@
       </dsp:nvSpPr>
       <dsp:spPr>
         <a:xfrm>
-          <a:off x="4255990" y="3154165"/>
+          <a:off x="4255990" y="3809260"/>
           <a:ext cx="1546418" cy="573721"/>
         </a:xfrm>
         <a:prstGeom prst="rect">
@@ -8121,14 +8486,14 @@
             </a:spcAft>
           </a:pPr>
           <a:r>
-            <a:rPr lang="en-US" sz="1500" b="1" kern="1200" smtClean="0"/>
+            <a:rPr lang="en-US" sz="1500" b="1" kern="1200" dirty="0" smtClean="0"/>
             <a:t>Instance-based</a:t>
           </a:r>
           <a:endParaRPr lang="en-US" sz="1500" kern="1200" dirty="0"/>
         </a:p>
       </dsp:txBody>
       <dsp:txXfrm>
-        <a:off x="4255990" y="3154165"/>
+        <a:off x="4255990" y="3809260"/>
         <a:ext cx="1546418" cy="573721"/>
       </dsp:txXfrm>
     </dsp:sp>
@@ -8139,20 +8504,25 @@
       </dsp:nvSpPr>
       <dsp:spPr>
         <a:xfrm>
-          <a:off x="5957116" y="2088683"/>
-          <a:ext cx="1546418" cy="1065482"/>
+          <a:off x="5957116" y="2318303"/>
+          <a:ext cx="1546418" cy="1546632"/>
         </a:xfrm>
         <a:prstGeom prst="roundRect">
           <a:avLst/>
         </a:prstGeom>
-        <a:solidFill>
-          <a:schemeClr val="accent1">
-            <a:hueOff val="0"/>
-            <a:satOff val="0"/>
-            <a:lumOff val="0"/>
-            <a:alphaOff val="0"/>
-          </a:schemeClr>
-        </a:solidFill>
+        <a:blipFill>
+          <a:blip xmlns:r="http://schemas.openxmlformats.org/officeDocument/2006/relationships" r:embed="rId10">
+            <a:extLst>
+              <a:ext uri="{28A0092B-C50C-407E-A947-70E740481C1C}">
+                <a14:useLocalDpi xmlns:a14="http://schemas.microsoft.com/office/drawing/2010/main" val="0"/>
+              </a:ext>
+            </a:extLst>
+          </a:blip>
+          <a:srcRect/>
+          <a:stretch>
+            <a:fillRect l="-2000" r="-2000"/>
+          </a:stretch>
+        </a:blipFill>
         <a:ln w="15875" cap="flat" cmpd="sng" algn="ctr">
           <a:solidFill>
             <a:schemeClr val="lt1">
@@ -8188,7 +8558,7 @@
       </dsp:nvSpPr>
       <dsp:spPr>
         <a:xfrm>
-          <a:off x="5957116" y="3154165"/>
+          <a:off x="5957116" y="3809260"/>
           <a:ext cx="1546418" cy="573721"/>
         </a:xfrm>
         <a:prstGeom prst="rect">
@@ -8237,7 +8607,7 @@
         </a:p>
       </dsp:txBody>
       <dsp:txXfrm>
-        <a:off x="5957116" y="3154165"/>
+        <a:off x="5957116" y="3809260"/>
         <a:ext cx="1546418" cy="573721"/>
       </dsp:txXfrm>
     </dsp:sp>
@@ -8248,20 +8618,25 @@
       </dsp:nvSpPr>
       <dsp:spPr>
         <a:xfrm>
-          <a:off x="7658241" y="2088683"/>
-          <a:ext cx="1546418" cy="1065482"/>
+          <a:off x="7658241" y="2318303"/>
+          <a:ext cx="1546418" cy="1546632"/>
         </a:xfrm>
         <a:prstGeom prst="roundRect">
           <a:avLst/>
         </a:prstGeom>
-        <a:solidFill>
-          <a:schemeClr val="accent1">
-            <a:hueOff val="0"/>
-            <a:satOff val="0"/>
-            <a:lumOff val="0"/>
-            <a:alphaOff val="0"/>
-          </a:schemeClr>
-        </a:solidFill>
+        <a:blipFill>
+          <a:blip xmlns:r="http://schemas.openxmlformats.org/officeDocument/2006/relationships" r:embed="rId11">
+            <a:extLst>
+              <a:ext uri="{28A0092B-C50C-407E-A947-70E740481C1C}">
+                <a14:useLocalDpi xmlns:a14="http://schemas.microsoft.com/office/drawing/2010/main" val="0"/>
+              </a:ext>
+            </a:extLst>
+          </a:blip>
+          <a:srcRect/>
+          <a:stretch>
+            <a:fillRect l="-2000" r="-2000"/>
+          </a:stretch>
+        </a:blipFill>
         <a:ln w="15875" cap="flat" cmpd="sng" algn="ctr">
           <a:solidFill>
             <a:schemeClr val="lt1">
@@ -8297,7 +8672,7 @@
       </dsp:nvSpPr>
       <dsp:spPr>
         <a:xfrm>
-          <a:off x="7658241" y="3154165"/>
+          <a:off x="7658241" y="3809260"/>
           <a:ext cx="1546418" cy="573721"/>
         </a:xfrm>
         <a:prstGeom prst="rect">
@@ -8346,7 +8721,7 @@
         </a:p>
       </dsp:txBody>
       <dsp:txXfrm>
-        <a:off x="7658241" y="3154165"/>
+        <a:off x="7658241" y="3809260"/>
         <a:ext cx="1546418" cy="573721"/>
       </dsp:txXfrm>
     </dsp:sp>
@@ -17296,7 +17671,7 @@
           <p:cNvPr id="2" name="Title 1">
             <a:extLst>
               <a:ext uri="{FF2B5EF4-FFF2-40B4-BE49-F238E27FC236}">
-                <a16:creationId xmlns:a16="http://schemas.microsoft.com/office/drawing/2014/main" xmlns="" id="{F4727C6F-3982-4E54-AA66-B4E0AA33FF66}"/>
+                <a16:creationId xmlns="" xmlns:a16="http://schemas.microsoft.com/office/drawing/2014/main" id="{F4727C6F-3982-4E54-AA66-B4E0AA33FF66}"/>
               </a:ext>
             </a:extLst>
           </p:cNvPr>
@@ -17325,7 +17700,7 @@
           <p:cNvPr id="3" name="Content Placeholder 2">
             <a:extLst>
               <a:ext uri="{FF2B5EF4-FFF2-40B4-BE49-F238E27FC236}">
-                <a16:creationId xmlns:a16="http://schemas.microsoft.com/office/drawing/2014/main" xmlns="" id="{1134DAC4-9E94-441C-A9BE-87750F6F60A2}"/>
+                <a16:creationId xmlns="" xmlns:a16="http://schemas.microsoft.com/office/drawing/2014/main" id="{1134DAC4-9E94-441C-A9BE-87750F6F60A2}"/>
               </a:ext>
             </a:extLst>
           </p:cNvPr>
@@ -17404,7 +17779,7 @@
           <p:cNvPr id="2" name="Title 1">
             <a:extLst>
               <a:ext uri="{FF2B5EF4-FFF2-40B4-BE49-F238E27FC236}">
-                <a16:creationId xmlns:a16="http://schemas.microsoft.com/office/drawing/2014/main" xmlns="" id="{3E1AC600-D16C-47B7-9075-94DA61007B25}"/>
+                <a16:creationId xmlns="" xmlns:a16="http://schemas.microsoft.com/office/drawing/2014/main" id="{3E1AC600-D16C-47B7-9075-94DA61007B25}"/>
               </a:ext>
             </a:extLst>
           </p:cNvPr>
@@ -17438,7 +17813,7 @@
           <p:cNvPr id="3" name="Content Placeholder 2">
             <a:extLst>
               <a:ext uri="{FF2B5EF4-FFF2-40B4-BE49-F238E27FC236}">
-                <a16:creationId xmlns:a16="http://schemas.microsoft.com/office/drawing/2014/main" xmlns="" id="{DDC8679B-3323-4E4B-ABD6-BD8748DF3AEB}"/>
+                <a16:creationId xmlns="" xmlns:a16="http://schemas.microsoft.com/office/drawing/2014/main" id="{DDC8679B-3323-4E4B-ABD6-BD8748DF3AEB}"/>
               </a:ext>
             </a:extLst>
           </p:cNvPr>
@@ -17550,7 +17925,7 @@
           <p:cNvPr id="3" name="Content Placeholder 2">
             <a:extLst>
               <a:ext uri="{FF2B5EF4-FFF2-40B4-BE49-F238E27FC236}">
-                <a16:creationId xmlns:a16="http://schemas.microsoft.com/office/drawing/2014/main" xmlns="" id="{12CE7563-67E4-470C-A76A-FD376D4C2471}"/>
+                <a16:creationId xmlns="" xmlns:a16="http://schemas.microsoft.com/office/drawing/2014/main" id="{12CE7563-67E4-470C-A76A-FD376D4C2471}"/>
               </a:ext>
             </a:extLst>
           </p:cNvPr>
@@ -17668,7 +18043,7 @@
           <p:cNvPr id="4" name="Title 1">
             <a:extLst>
               <a:ext uri="{FF2B5EF4-FFF2-40B4-BE49-F238E27FC236}">
-                <a16:creationId xmlns:a16="http://schemas.microsoft.com/office/drawing/2014/main" xmlns="" id="{D1F22F75-6806-481E-A0D8-FC161C3266D1}"/>
+                <a16:creationId xmlns="" xmlns:a16="http://schemas.microsoft.com/office/drawing/2014/main" id="{D1F22F75-6806-481E-A0D8-FC161C3266D1}"/>
               </a:ext>
             </a:extLst>
           </p:cNvPr>
@@ -17769,11 +18144,19 @@
             <a:pPr algn="ctr"/>
             <a:r>
               <a:rPr lang="en-US" dirty="0" smtClean="0"/>
-              <a:t>Does, USED, Classification</a:t>
+              <a:t>Does, USED</a:t>
+            </a:r>
+            <a:r>
+              <a:rPr lang="en-US" smtClean="0"/>
+              <a:t>, </a:t>
+            </a:r>
+            <a:r>
+              <a:rPr lang="en-US" smtClean="0"/>
+              <a:t>Classification, </a:t>
             </a:r>
             <a:r>
               <a:rPr lang="en-US" dirty="0"/>
-              <a:t>, for </a:t>
+              <a:t>for </a:t>
             </a:r>
             <a:r>
               <a:rPr lang="en-US" dirty="0" smtClean="0"/>
@@ -18507,11 +18890,7 @@
           <a:p>
             <a:r>
               <a:rPr lang="en-US" dirty="0" smtClean="0"/>
-              <a:t>Algorithms: </a:t>
-            </a:r>
-            <a:r>
-              <a:rPr lang="en-US" dirty="0" smtClean="0"/>
-              <a:t>Classification by Learning</a:t>
+              <a:t>Algorithms: Classification by Learning</a:t>
             </a:r>
             <a:endParaRPr lang="en-US" dirty="0"/>
           </a:p>
@@ -18613,14 +18992,14 @@
             <p:ph idx="1"/>
             <p:extLst>
               <p:ext uri="{D42A27DB-BD31-4B8C-83A1-F6EECF244321}">
-                <p14:modId xmlns:p14="http://schemas.microsoft.com/office/powerpoint/2010/main" val="3173823633"/>
+                <p14:modId xmlns:p14="http://schemas.microsoft.com/office/powerpoint/2010/main" val="662377921"/>
               </p:ext>
             </p:extLst>
           </p:nvPr>
         </p:nvGraphicFramePr>
         <p:xfrm>
           <a:off x="1096963" y="1846263"/>
-          <a:ext cx="10058400" cy="4022725"/>
+          <a:ext cx="10058400" cy="4481966"/>
         </p:xfrm>
         <a:graphic>
           <a:graphicData uri="http://schemas.openxmlformats.org/drawingml/2006/diagram">
@@ -18804,14 +19183,14 @@
                 <a:gridCol w="5035931">
                   <a:extLst>
                     <a:ext uri="{9D8B030D-6E8A-4147-A177-3AD203B41FA5}">
-                      <a16:colId xmlns:a16="http://schemas.microsoft.com/office/drawing/2014/main" xmlns="" val="20000"/>
+                      <a16:colId xmlns="" xmlns:a16="http://schemas.microsoft.com/office/drawing/2014/main" val="20000"/>
                     </a:ext>
                   </a:extLst>
                 </a:gridCol>
                 <a:gridCol w="5022469">
                   <a:extLst>
                     <a:ext uri="{9D8B030D-6E8A-4147-A177-3AD203B41FA5}">
-                      <a16:colId xmlns:a16="http://schemas.microsoft.com/office/drawing/2014/main" xmlns="" val="20001"/>
+                      <a16:colId xmlns="" xmlns:a16="http://schemas.microsoft.com/office/drawing/2014/main" val="20001"/>
                     </a:ext>
                   </a:extLst>
                 </a:gridCol>
@@ -18891,7 +19270,7 @@
                 </a:tc>
                 <a:extLst>
                   <a:ext uri="{0D108BD9-81ED-4DB2-BD59-A6C34878D82A}">
-                    <a16:rowId xmlns:a16="http://schemas.microsoft.com/office/drawing/2014/main" xmlns="" val="10000"/>
+                    <a16:rowId xmlns="" xmlns:a16="http://schemas.microsoft.com/office/drawing/2014/main" val="10000"/>
                   </a:ext>
                 </a:extLst>
               </a:tr>
@@ -18978,7 +19357,7 @@
                 </a:tc>
                 <a:extLst>
                   <a:ext uri="{0D108BD9-81ED-4DB2-BD59-A6C34878D82A}">
-                    <a16:rowId xmlns:a16="http://schemas.microsoft.com/office/drawing/2014/main" xmlns="" val="10001"/>
+                    <a16:rowId xmlns="" xmlns:a16="http://schemas.microsoft.com/office/drawing/2014/main" val="10001"/>
                   </a:ext>
                 </a:extLst>
               </a:tr>
@@ -19081,7 +19460,7 @@
                 </a:tc>
                 <a:extLst>
                   <a:ext uri="{0D108BD9-81ED-4DB2-BD59-A6C34878D82A}">
-                    <a16:rowId xmlns:a16="http://schemas.microsoft.com/office/drawing/2014/main" xmlns="" val="10002"/>
+                    <a16:rowId xmlns="" xmlns:a16="http://schemas.microsoft.com/office/drawing/2014/main" val="10002"/>
                   </a:ext>
                 </a:extLst>
               </a:tr>

</xml_diff>

<commit_message>
added: big data pillars picture
Added: big data pillars picture
</commit_message>
<xml_diff>
--- a/Project Interim Submission/Generic DS Framework.pptx
+++ b/Project Interim Submission/Generic DS Framework.pptx
@@ -5,7 +5,7 @@
     <p:sldMasterId id="2147483708" r:id="rId1"/>
   </p:sldMasterIdLst>
   <p:notesMasterIdLst>
-    <p:notesMasterId r:id="rId27"/>
+    <p:notesMasterId r:id="rId28"/>
   </p:notesMasterIdLst>
   <p:sldIdLst>
     <p:sldId id="256" r:id="rId2"/>
@@ -24,15 +24,16 @@
     <p:sldId id="263" r:id="rId15"/>
     <p:sldId id="261" r:id="rId16"/>
     <p:sldId id="280" r:id="rId17"/>
-    <p:sldId id="262" r:id="rId18"/>
-    <p:sldId id="270" r:id="rId19"/>
-    <p:sldId id="265" r:id="rId20"/>
-    <p:sldId id="275" r:id="rId21"/>
-    <p:sldId id="276" r:id="rId22"/>
-    <p:sldId id="277" r:id="rId23"/>
-    <p:sldId id="278" r:id="rId24"/>
-    <p:sldId id="279" r:id="rId25"/>
-    <p:sldId id="266" r:id="rId26"/>
+    <p:sldId id="281" r:id="rId18"/>
+    <p:sldId id="262" r:id="rId19"/>
+    <p:sldId id="270" r:id="rId20"/>
+    <p:sldId id="265" r:id="rId21"/>
+    <p:sldId id="275" r:id="rId22"/>
+    <p:sldId id="276" r:id="rId23"/>
+    <p:sldId id="277" r:id="rId24"/>
+    <p:sldId id="278" r:id="rId25"/>
+    <p:sldId id="279" r:id="rId26"/>
+    <p:sldId id="266" r:id="rId27"/>
   </p:sldIdLst>
   <p:sldSz cx="12192000" cy="6858000"/>
   <p:notesSz cx="6858000" cy="9144000"/>
@@ -3566,82 +3567,82 @@
     </dgm:pt>
   </dgm:ptLst>
   <dgm:cxnLst>
+    <dgm:cxn modelId="{DF1FF10C-2385-4496-A025-967A40CBD7A2}" type="presOf" srcId="{2A1734E5-F350-4043-A59D-090A5C851E96}" destId="{E65AAA3D-6EDF-4733-A476-6E661CF70E36}" srcOrd="1" destOrd="0" presId="urn:microsoft.com/office/officeart/2005/8/layout/orgChart1"/>
+    <dgm:cxn modelId="{EC9B6DDA-4079-451C-AA2A-4CC8ABD15E1E}" srcId="{A7E2D81E-7900-4DF4-BEF5-77A2812B0C4E}" destId="{2A1734E5-F350-4043-A59D-090A5C851E96}" srcOrd="2" destOrd="0" parTransId="{E2FCDC95-A76F-447E-B7A8-96053D2336AC}" sibTransId="{1BA36650-D456-4FCA-ABBC-F4EEE6270BCA}"/>
+    <dgm:cxn modelId="{63957BFE-6189-47C3-8B38-C33EAFDBB625}" srcId="{998DBD50-443E-466A-9688-66A52BCFB283}" destId="{DD18F73E-5873-4440-AD2A-CB98A7E335BB}" srcOrd="0" destOrd="0" parTransId="{5B6E6A94-B82E-45A0-B538-B423850E5FD3}" sibTransId="{9786C01A-E46D-4E4C-952B-67F9C5AB60A3}"/>
+    <dgm:cxn modelId="{E7F7BF8F-EE5F-4676-BDAC-E110E82FDA6F}" type="presOf" srcId="{DD18F73E-5873-4440-AD2A-CB98A7E335BB}" destId="{7527F677-2F8C-4154-ADCF-5A9B516211C5}" srcOrd="0" destOrd="0" presId="urn:microsoft.com/office/officeart/2005/8/layout/orgChart1"/>
+    <dgm:cxn modelId="{B90982DA-E1CB-43C2-9643-4ECB399A3CBC}" type="presOf" srcId="{998DBD50-443E-466A-9688-66A52BCFB283}" destId="{F5D3DEFB-AE85-4939-AB97-E915462269C0}" srcOrd="0" destOrd="0" presId="urn:microsoft.com/office/officeart/2005/8/layout/orgChart1"/>
+    <dgm:cxn modelId="{AA527D19-A024-4500-8A09-2D410AABF130}" type="presOf" srcId="{DD18F73E-5873-4440-AD2A-CB98A7E335BB}" destId="{24D69D00-71EB-421A-A1CD-E1399AFDD654}" srcOrd="1" destOrd="0" presId="urn:microsoft.com/office/officeart/2005/8/layout/orgChart1"/>
+    <dgm:cxn modelId="{79528653-A03B-4870-8A6A-410571D115D3}" type="presOf" srcId="{51C939BC-1F71-4B4B-B76E-5AB02C7C5227}" destId="{26FA5C1D-10E1-45CD-A1D3-744EEEC37631}" srcOrd="1" destOrd="0" presId="urn:microsoft.com/office/officeart/2005/8/layout/orgChart1"/>
+    <dgm:cxn modelId="{65D0E857-80DD-4041-83CE-8C50597B830A}" type="presOf" srcId="{31976A02-02B1-412A-B691-02C3A6880CD3}" destId="{36B3E81A-E148-4D3B-88E5-4419A3BAFF40}" srcOrd="0" destOrd="0" presId="urn:microsoft.com/office/officeart/2005/8/layout/orgChart1"/>
+    <dgm:cxn modelId="{855D9E2B-03E2-41B3-895F-0198D29F1009}" type="presOf" srcId="{3C5DF98A-9E49-4EBC-AA28-3E96D9B53B39}" destId="{21695C6D-5845-4B94-8EDE-C845DA7BA21E}" srcOrd="0" destOrd="0" presId="urn:microsoft.com/office/officeart/2005/8/layout/orgChart1"/>
+    <dgm:cxn modelId="{3652CE73-9339-44DF-877F-2A4347BDCFDB}" type="presOf" srcId="{8F21D5B7-1E81-4E68-9A3B-41478D9E578F}" destId="{14A65CCA-D715-46D8-B448-593158ED3247}" srcOrd="1" destOrd="0" presId="urn:microsoft.com/office/officeart/2005/8/layout/orgChart1"/>
+    <dgm:cxn modelId="{6DDE05DA-2CC4-4A86-986C-5CBE3D44190A}" type="presOf" srcId="{6CEB8C34-32A9-47E6-A405-A04B3711CFB7}" destId="{087E6E65-2112-476B-A4AA-3A36C7628514}" srcOrd="0" destOrd="0" presId="urn:microsoft.com/office/officeart/2005/8/layout/orgChart1"/>
+    <dgm:cxn modelId="{C3A31E5B-D7BF-45EA-9802-6D3D083F2984}" type="presOf" srcId="{A3D548BD-E471-4C3A-9014-C70E7E2B5BFD}" destId="{2D94B2C8-24C9-4949-954A-EDC01FC95EB8}" srcOrd="0" destOrd="0" presId="urn:microsoft.com/office/officeart/2005/8/layout/orgChart1"/>
+    <dgm:cxn modelId="{A4FD5072-445C-4BF4-99DD-5F1BDAD862DA}" srcId="{C9F271EB-AA97-406F-A22E-048A336DC94A}" destId="{6CEB8C34-32A9-47E6-A405-A04B3711CFB7}" srcOrd="1" destOrd="0" parTransId="{9DFE08AD-6D40-40B9-8C6C-0D9B748E71FD}" sibTransId="{05E40D46-9D4A-4AE0-8A7C-2E5D2787A5C2}"/>
+    <dgm:cxn modelId="{16C1F492-6F23-441E-8C79-9308ED1456B5}" type="presOf" srcId="{B23CD900-37E2-45DE-B384-F9885D55838B}" destId="{82AF4305-DDE7-4632-85B6-1B4672473DDD}" srcOrd="1" destOrd="0" presId="urn:microsoft.com/office/officeart/2005/8/layout/orgChart1"/>
+    <dgm:cxn modelId="{3D6039C9-601D-4282-8BBF-03FEEA76F5F3}" type="presOf" srcId="{E2FCDC95-A76F-447E-B7A8-96053D2336AC}" destId="{75994A22-3790-4219-8C34-EFB1A172683C}" srcOrd="0" destOrd="0" presId="urn:microsoft.com/office/officeart/2005/8/layout/orgChart1"/>
+    <dgm:cxn modelId="{EC2000F8-6406-4F91-AC03-67371B9EF307}" type="presOf" srcId="{CEB0D96F-42A5-4903-B863-AD62B81F61AE}" destId="{D81F13DE-77CA-4947-A9D8-3B9405F7FB4A}" srcOrd="0" destOrd="0" presId="urn:microsoft.com/office/officeart/2005/8/layout/orgChart1"/>
+    <dgm:cxn modelId="{3E527903-2969-4BE6-A44A-67C70C96E603}" type="presOf" srcId="{4BD105F0-FCB2-4292-8534-EF3F82555BF1}" destId="{432E8FE3-B9B9-442A-A4A0-5A0F509E161A}" srcOrd="1" destOrd="0" presId="urn:microsoft.com/office/officeart/2005/8/layout/orgChart1"/>
+    <dgm:cxn modelId="{B382F07A-E779-468F-8018-7984C1FE1CF1}" type="presOf" srcId="{26CDFC28-47AA-4502-887A-33E7C0CE0838}" destId="{4780D492-11D4-4975-B35A-476D05181A39}" srcOrd="1" destOrd="0" presId="urn:microsoft.com/office/officeart/2005/8/layout/orgChart1"/>
+    <dgm:cxn modelId="{06EB2273-9FAF-4E8B-B25D-B647F848AA12}" type="presOf" srcId="{A7E2D81E-7900-4DF4-BEF5-77A2812B0C4E}" destId="{C91E4177-0B62-4588-885D-1A4C3BD2BAF7}" srcOrd="1" destOrd="0" presId="urn:microsoft.com/office/officeart/2005/8/layout/orgChart1"/>
+    <dgm:cxn modelId="{22930F4D-DE10-45E5-ACDC-A461022FFBA9}" srcId="{51C939BC-1F71-4B4B-B76E-5AB02C7C5227}" destId="{998DBD50-443E-466A-9688-66A52BCFB283}" srcOrd="0" destOrd="0" parTransId="{9FCE91AE-B52F-45FA-A0C5-CA2E6E43F0FC}" sibTransId="{1642DE8E-03D4-4062-A10D-83B597A79491}"/>
+    <dgm:cxn modelId="{1B284198-CAF5-4CC2-BF48-541C8C13B704}" type="presOf" srcId="{2AB59A33-B6A6-40FF-98F7-711698F4D26B}" destId="{DE7689F0-0909-4DF0-993D-DF1D19A454E0}" srcOrd="1" destOrd="0" presId="urn:microsoft.com/office/officeart/2005/8/layout/orgChart1"/>
+    <dgm:cxn modelId="{2D8C82CF-8261-498E-8D04-AFAB3415C828}" srcId="{6CEB8C34-32A9-47E6-A405-A04B3711CFB7}" destId="{5AF5E628-F524-43D4-9C5A-5A8189560301}" srcOrd="0" destOrd="0" parTransId="{B3E11DF4-0A70-40F4-A9F3-378E2202AE1D}" sibTransId="{79E1E6F3-8832-4EDA-9B35-6A23A6E78C38}"/>
+    <dgm:cxn modelId="{73D1DC3E-5AF2-43C6-AE9C-C378299A836A}" type="presOf" srcId="{CBAC9813-60C7-4469-BF09-A874065B34A7}" destId="{F6217F3C-65DD-408C-AC11-C96C35846B77}" srcOrd="0" destOrd="0" presId="urn:microsoft.com/office/officeart/2005/8/layout/orgChart1"/>
+    <dgm:cxn modelId="{A1CD0581-8F25-4433-BCB3-403F201DCE98}" srcId="{31976A02-02B1-412A-B691-02C3A6880CD3}" destId="{A7E2D81E-7900-4DF4-BEF5-77A2812B0C4E}" srcOrd="0" destOrd="0" parTransId="{5E9185FC-D944-454A-8EDB-88DDB1EC156B}" sibTransId="{6CE37D0C-36BB-4B53-B0BC-4BBCC03B877F}"/>
+    <dgm:cxn modelId="{DE92D672-1362-46B3-9B36-E204E35D3A8A}" srcId="{AB5982FD-D354-4AAA-B978-F9826D0D05FB}" destId="{CF665F69-5C99-4ABA-84BB-EE78294ED608}" srcOrd="0" destOrd="0" parTransId="{CBAC9813-60C7-4469-BF09-A874065B34A7}" sibTransId="{F6125F52-3FD9-4490-AD82-6F4F52591F18}"/>
     <dgm:cxn modelId="{7F4CBF52-8E85-4962-B47C-2E9BB8838D4B}" type="presOf" srcId="{CF665F69-5C99-4ABA-84BB-EE78294ED608}" destId="{1F6BCCA0-2CCE-4CE0-BBC4-117FD2054979}" srcOrd="0" destOrd="0" presId="urn:microsoft.com/office/officeart/2005/8/layout/orgChart1"/>
+    <dgm:cxn modelId="{9FE69CA7-02A8-4923-B8F4-A5DECC562316}" type="presOf" srcId="{B3E11DF4-0A70-40F4-A9F3-378E2202AE1D}" destId="{E8CF98EA-1E11-4C8B-B3DC-A8B8C9716700}" srcOrd="0" destOrd="0" presId="urn:microsoft.com/office/officeart/2005/8/layout/orgChart1"/>
+    <dgm:cxn modelId="{8CBE4C9A-8DBD-4F86-806A-74F82BAF13CF}" type="presOf" srcId="{26CDFC28-47AA-4502-887A-33E7C0CE0838}" destId="{B9EF6254-674C-4CF7-8107-B9DBCC5CC06C}" srcOrd="0" destOrd="0" presId="urn:microsoft.com/office/officeart/2005/8/layout/orgChart1"/>
+    <dgm:cxn modelId="{A8107FC3-6D18-4968-ADAB-112DB844FD6C}" type="presOf" srcId="{AB5982FD-D354-4AAA-B978-F9826D0D05FB}" destId="{9D123678-09FF-430E-9CD4-847B9B41C9E6}" srcOrd="1" destOrd="0" presId="urn:microsoft.com/office/officeart/2005/8/layout/orgChart1"/>
+    <dgm:cxn modelId="{63B04F08-C750-4C7A-B49E-BEE5344BBD39}" type="presOf" srcId="{C9F271EB-AA97-406F-A22E-048A336DC94A}" destId="{0CDB574B-8A16-4575-B86E-72EE9B15201E}" srcOrd="1" destOrd="0" presId="urn:microsoft.com/office/officeart/2005/8/layout/orgChart1"/>
+    <dgm:cxn modelId="{DB030D6B-BB16-4AB3-BD3B-676A1CBC0A28}" type="presOf" srcId="{A9576EC0-F780-411F-A988-792BB4B5827F}" destId="{B4236978-BB7B-465F-A15B-A4753285650F}" srcOrd="0" destOrd="0" presId="urn:microsoft.com/office/officeart/2005/8/layout/orgChart1"/>
+    <dgm:cxn modelId="{8137AEC6-67AB-4747-A01B-8846F373EF92}" type="presOf" srcId="{2A1734E5-F350-4043-A59D-090A5C851E96}" destId="{632D20A3-D474-4945-BEC3-702EAB53AF00}" srcOrd="0" destOrd="0" presId="urn:microsoft.com/office/officeart/2005/8/layout/orgChart1"/>
+    <dgm:cxn modelId="{585916E3-B9E6-418F-BBFC-91743B566955}" type="presOf" srcId="{5ED6D770-BF3B-4684-98EB-5ABB516FF23D}" destId="{5871E8CC-FA46-4584-AC5E-0BFF5BB7E6D6}" srcOrd="0" destOrd="0" presId="urn:microsoft.com/office/officeart/2005/8/layout/orgChart1"/>
+    <dgm:cxn modelId="{3FFF7750-E39A-400B-867E-3AD7510BEE79}" type="presOf" srcId="{4BD105F0-FCB2-4292-8534-EF3F82555BF1}" destId="{3780879A-AD2D-405D-977E-4451EF3CA5AD}" srcOrd="0" destOrd="0" presId="urn:microsoft.com/office/officeart/2005/8/layout/orgChart1"/>
+    <dgm:cxn modelId="{5AD1E491-93BF-4390-A05D-1A6277716063}" type="presOf" srcId="{CC818131-8C0B-4D2C-AEA4-5A1BD3A6EFF3}" destId="{3E8697EF-F0C0-442C-AC8F-AF21953408C4}" srcOrd="0" destOrd="0" presId="urn:microsoft.com/office/officeart/2005/8/layout/orgChart1"/>
+    <dgm:cxn modelId="{4D7522AD-EF42-4E61-860F-C5EE7ADC920F}" srcId="{A7E2D81E-7900-4DF4-BEF5-77A2812B0C4E}" destId="{4BD105F0-FCB2-4292-8534-EF3F82555BF1}" srcOrd="1" destOrd="0" parTransId="{82243891-7EAF-4E58-B342-FB3AEF7D96D8}" sibTransId="{1B73A89F-B150-403E-8069-7813E3E859D3}"/>
+    <dgm:cxn modelId="{2058D512-BFDC-429D-8108-A884B1DF591E}" type="presOf" srcId="{9FCE91AE-B52F-45FA-A0C5-CA2E6E43F0FC}" destId="{DFAC233F-FFFB-4BE5-9FC7-55A2752E1DAD}" srcOrd="0" destOrd="0" presId="urn:microsoft.com/office/officeart/2005/8/layout/orgChart1"/>
+    <dgm:cxn modelId="{F1E4A56E-64BE-44F4-8E42-D61EDD68880B}" srcId="{26CDFC28-47AA-4502-887A-33E7C0CE0838}" destId="{F0588C2A-6766-47BF-AE7C-52B851FABC21}" srcOrd="0" destOrd="0" parTransId="{5ED6D770-BF3B-4684-98EB-5ABB516FF23D}" sibTransId="{AFD6C0FD-0670-49CC-B34D-0E113DDEE343}"/>
+    <dgm:cxn modelId="{A25B346A-AF67-44D0-A601-4D4A0B7FEEC8}" srcId="{A7E2D81E-7900-4DF4-BEF5-77A2812B0C4E}" destId="{C9F271EB-AA97-406F-A22E-048A336DC94A}" srcOrd="0" destOrd="0" parTransId="{CEB0D96F-42A5-4903-B863-AD62B81F61AE}" sibTransId="{994C4CAB-5619-4281-B81C-1EBED1C2EFE7}"/>
+    <dgm:cxn modelId="{F4CB865C-996A-492E-9E5F-2B17DE9381E0}" srcId="{26CDFC28-47AA-4502-887A-33E7C0CE0838}" destId="{8F21D5B7-1E81-4E68-9A3B-41478D9E578F}" srcOrd="1" destOrd="0" parTransId="{810F6CE3-7B9A-4BC5-B642-3E284064AEB8}" sibTransId="{0C0A6C55-CE4D-42AC-8392-A28B6E9C2042}"/>
+    <dgm:cxn modelId="{54CCCEDE-ECD4-498C-B465-8CA9F82A49C5}" type="presOf" srcId="{F8118993-C3C6-4246-A6BF-F9F2EC3DC9CB}" destId="{A2BECFDC-6DED-4CEA-B9D1-694651AD4E09}" srcOrd="1" destOrd="0" presId="urn:microsoft.com/office/officeart/2005/8/layout/orgChart1"/>
+    <dgm:cxn modelId="{079B3109-107E-4D2E-99FC-71764D1796B1}" type="presOf" srcId="{B23CD900-37E2-45DE-B384-F9885D55838B}" destId="{F6A2B30B-A958-479B-AD92-8D9166487761}" srcOrd="0" destOrd="0" presId="urn:microsoft.com/office/officeart/2005/8/layout/orgChart1"/>
+    <dgm:cxn modelId="{F3B26E1E-6947-4159-918E-E138CED3D239}" srcId="{B23CD900-37E2-45DE-B384-F9885D55838B}" destId="{A9576EC0-F780-411F-A988-792BB4B5827F}" srcOrd="0" destOrd="0" parTransId="{3C5DF98A-9E49-4EBC-AA28-3E96D9B53B39}" sibTransId="{4568403F-227F-414F-9181-6C36CA1FB882}"/>
+    <dgm:cxn modelId="{275E1EA8-9958-4385-AD1D-0D70F2B2E97E}" type="presOf" srcId="{998DBD50-443E-466A-9688-66A52BCFB283}" destId="{291B4844-977C-4B0C-9CCC-F7511A56BE71}" srcOrd="1" destOrd="0" presId="urn:microsoft.com/office/officeart/2005/8/layout/orgChart1"/>
+    <dgm:cxn modelId="{B8E816F8-7FA7-46B3-B6D5-3CE42BCFB40A}" srcId="{2A1734E5-F350-4043-A59D-090A5C851E96}" destId="{26CDFC28-47AA-4502-887A-33E7C0CE0838}" srcOrd="0" destOrd="0" parTransId="{3196F628-F850-402C-8DFF-32FDBF641FAF}" sibTransId="{31721E21-E4E4-40B3-A55D-F290C2DF3887}"/>
+    <dgm:cxn modelId="{3A8D22D7-D5E6-464A-8BEE-727F9246E9EE}" srcId="{F8118993-C3C6-4246-A6BF-F9F2EC3DC9CB}" destId="{CC818131-8C0B-4D2C-AEA4-5A1BD3A6EFF3}" srcOrd="1" destOrd="0" parTransId="{A3D548BD-E471-4C3A-9014-C70E7E2B5BFD}" sibTransId="{1E143EFF-2729-40A1-84B3-E819EDF8B7B2}"/>
+    <dgm:cxn modelId="{964962C0-3F9A-405E-B7CF-7320CA058054}" srcId="{4BD105F0-FCB2-4292-8534-EF3F82555BF1}" destId="{F8118993-C3C6-4246-A6BF-F9F2EC3DC9CB}" srcOrd="0" destOrd="0" parTransId="{763868FB-01C7-4C07-982A-E0002DD2F249}" sibTransId="{196FC47F-8F5E-4EE4-99DA-8228F767EF40}"/>
+    <dgm:cxn modelId="{EC81C075-A36A-401B-894E-F2172C22244B}" type="presOf" srcId="{5B6E6A94-B82E-45A0-B538-B423850E5FD3}" destId="{044C785A-5A95-4E11-98D2-B0C3A8153197}" srcOrd="0" destOrd="0" presId="urn:microsoft.com/office/officeart/2005/8/layout/orgChart1"/>
+    <dgm:cxn modelId="{29D3F1C6-D8C1-4696-9225-7574825892FA}" srcId="{F8118993-C3C6-4246-A6BF-F9F2EC3DC9CB}" destId="{2AB59A33-B6A6-40FF-98F7-711698F4D26B}" srcOrd="0" destOrd="0" parTransId="{C1DBF8BC-E021-419E-A78A-05014B36B3B1}" sibTransId="{39934AF9-B63A-4C68-8C74-12CFA5946906}"/>
+    <dgm:cxn modelId="{66587802-E1A1-4490-8EE6-DFFED4C0E387}" type="presOf" srcId="{8F21D5B7-1E81-4E68-9A3B-41478D9E578F}" destId="{9961A4E0-4305-4F81-8160-655C9A27D034}" srcOrd="0" destOrd="0" presId="urn:microsoft.com/office/officeart/2005/8/layout/orgChart1"/>
+    <dgm:cxn modelId="{87C8B196-323D-4EB7-8C11-259CEDD39083}" type="presOf" srcId="{AB5982FD-D354-4AAA-B978-F9826D0D05FB}" destId="{A48D18B2-265E-4299-AC55-85A70F37F6FA}" srcOrd="0" destOrd="0" presId="urn:microsoft.com/office/officeart/2005/8/layout/orgChart1"/>
+    <dgm:cxn modelId="{D4A13C56-EB94-4538-AEB3-2A061DCE865E}" srcId="{51C939BC-1F71-4B4B-B76E-5AB02C7C5227}" destId="{AB5982FD-D354-4AAA-B978-F9826D0D05FB}" srcOrd="1" destOrd="0" parTransId="{64BCB35C-1AA8-4805-AE44-941DC0666BE4}" sibTransId="{F8A871A7-1431-40C2-8D1E-3F46A7492963}"/>
+    <dgm:cxn modelId="{3F6EF168-B749-47B5-86FD-91ABA2C7D72E}" type="presOf" srcId="{A9576EC0-F780-411F-A988-792BB4B5827F}" destId="{3C3CC326-C1BB-4802-9C80-3024F7E2EFEC}" srcOrd="1" destOrd="0" presId="urn:microsoft.com/office/officeart/2005/8/layout/orgChart1"/>
+    <dgm:cxn modelId="{711E14F9-8AF4-4019-8C8C-9FE45B7D3E7C}" type="presOf" srcId="{9DFE08AD-6D40-40B9-8C6C-0D9B748E71FD}" destId="{8D8E53BF-D23C-4E66-A64D-69E3B5A64376}" srcOrd="0" destOrd="0" presId="urn:microsoft.com/office/officeart/2005/8/layout/orgChart1"/>
+    <dgm:cxn modelId="{5F5DBC77-905E-46B9-9C22-D2F5D1C757CB}" type="presOf" srcId="{6CEB8C34-32A9-47E6-A405-A04B3711CFB7}" destId="{F5F98A29-63BF-4AC3-9BF3-D3C7E3FF700B}" srcOrd="1" destOrd="0" presId="urn:microsoft.com/office/officeart/2005/8/layout/orgChart1"/>
+    <dgm:cxn modelId="{8D0015CC-72CA-4964-8D64-FA31789A0CF7}" type="presOf" srcId="{C9F271EB-AA97-406F-A22E-048A336DC94A}" destId="{EF58EAAC-E8FC-4E92-AC54-3E70E3CCE427}" srcOrd="0" destOrd="0" presId="urn:microsoft.com/office/officeart/2005/8/layout/orgChart1"/>
+    <dgm:cxn modelId="{D9F878CB-CD73-43B2-924C-4145A2798C53}" type="presOf" srcId="{CC818131-8C0B-4D2C-AEA4-5A1BD3A6EFF3}" destId="{D62139CB-9D8F-4560-A01D-A225FB31D9FF}" srcOrd="1" destOrd="0" presId="urn:microsoft.com/office/officeart/2005/8/layout/orgChart1"/>
+    <dgm:cxn modelId="{07BFF742-37D9-4F3A-8BCA-5FA7F3B3FFDA}" type="presOf" srcId="{51C939BC-1F71-4B4B-B76E-5AB02C7C5227}" destId="{617A3543-3392-450A-AE60-926A208DA196}" srcOrd="0" destOrd="0" presId="urn:microsoft.com/office/officeart/2005/8/layout/orgChart1"/>
+    <dgm:cxn modelId="{9A9E885B-6395-49FB-9E85-9D1E8F64238A}" type="presOf" srcId="{810F6CE3-7B9A-4BC5-B642-3E284064AEB8}" destId="{27D617F6-CD92-4160-85E9-3D135DEE9C6C}" srcOrd="0" destOrd="0" presId="urn:microsoft.com/office/officeart/2005/8/layout/orgChart1"/>
+    <dgm:cxn modelId="{2258E7B5-0D3B-4779-989F-0D2802E77E9D}" type="presOf" srcId="{2AB59A33-B6A6-40FF-98F7-711698F4D26B}" destId="{64076540-8FAD-4187-A304-8898DDD0C9A8}" srcOrd="0" destOrd="0" presId="urn:microsoft.com/office/officeart/2005/8/layout/orgChart1"/>
+    <dgm:cxn modelId="{F864C8BC-B8C9-4962-ABB8-1D4DB46F4EA9}" srcId="{C9F271EB-AA97-406F-A22E-048A336DC94A}" destId="{B23CD900-37E2-45DE-B384-F9885D55838B}" srcOrd="0" destOrd="0" parTransId="{C6CC40CD-5626-4A19-9936-F67709EE7AF0}" sibTransId="{4EC04109-3134-4314-B119-98550E78BF07}"/>
+    <dgm:cxn modelId="{5CA14EFE-56BA-428E-9344-6E54BD1CDAE3}" type="presOf" srcId="{A7E2D81E-7900-4DF4-BEF5-77A2812B0C4E}" destId="{91E1DAD5-A378-4F9D-90D3-E4D6E3B719CC}" srcOrd="0" destOrd="0" presId="urn:microsoft.com/office/officeart/2005/8/layout/orgChart1"/>
+    <dgm:cxn modelId="{CF4DF7D7-2777-4A2A-9B0C-8DEB23527131}" type="presOf" srcId="{C6CC40CD-5626-4A19-9936-F67709EE7AF0}" destId="{52AB23E0-53A6-4AC3-B89A-D72BC394F116}" srcOrd="0" destOrd="0" presId="urn:microsoft.com/office/officeart/2005/8/layout/orgChart1"/>
+    <dgm:cxn modelId="{7A6B7DFA-AF2C-46D0-9BF7-1A6F2A4BD05F}" type="presOf" srcId="{82243891-7EAF-4E58-B342-FB3AEF7D96D8}" destId="{AAC078B5-22C6-4465-AC60-50B89A62DAA4}" srcOrd="0" destOrd="0" presId="urn:microsoft.com/office/officeart/2005/8/layout/orgChart1"/>
+    <dgm:cxn modelId="{74291408-E599-4241-9208-778B25B35419}" type="presOf" srcId="{5AF5E628-F524-43D4-9C5A-5A8189560301}" destId="{C6B5F02F-BF16-4258-AC5A-D980E6777BDC}" srcOrd="1" destOrd="0" presId="urn:microsoft.com/office/officeart/2005/8/layout/orgChart1"/>
+    <dgm:cxn modelId="{5E6BA506-E2BF-4C29-92E3-F77F24013314}" type="presOf" srcId="{5AF5E628-F524-43D4-9C5A-5A8189560301}" destId="{710C924E-E30F-44DF-A6AA-7A0529BD66A0}" srcOrd="0" destOrd="0" presId="urn:microsoft.com/office/officeart/2005/8/layout/orgChart1"/>
+    <dgm:cxn modelId="{FCF7D859-A8C6-4A69-ACE7-6EBD0F233C30}" type="presOf" srcId="{D5432636-319A-4212-83DB-9D3BA6AA54A9}" destId="{AA253CD6-C0DA-4C21-9B15-7211D0914EE5}" srcOrd="0" destOrd="0" presId="urn:microsoft.com/office/officeart/2005/8/layout/orgChart1"/>
+    <dgm:cxn modelId="{5DC0E0BC-0122-42DE-9175-76DAAE24D215}" srcId="{A7E2D81E-7900-4DF4-BEF5-77A2812B0C4E}" destId="{51C939BC-1F71-4B4B-B76E-5AB02C7C5227}" srcOrd="3" destOrd="0" parTransId="{D5432636-319A-4212-83DB-9D3BA6AA54A9}" sibTransId="{C119049A-FECA-4579-956E-33C230BAA319}"/>
+    <dgm:cxn modelId="{0B387FA4-F216-482B-AC2E-CAF30E8346BB}" type="presOf" srcId="{64BCB35C-1AA8-4805-AE44-941DC0666BE4}" destId="{06BFC016-E41C-49B3-B96E-72E532519536}" srcOrd="0" destOrd="0" presId="urn:microsoft.com/office/officeart/2005/8/layout/orgChart1"/>
     <dgm:cxn modelId="{2451FA6F-A70D-4E78-8CF6-9527C49C1AC2}" type="presOf" srcId="{F0588C2A-6766-47BF-AE7C-52B851FABC21}" destId="{4C0517EB-FD0E-41DA-B0F6-7F0D2D018DD1}" srcOrd="0" destOrd="0" presId="urn:microsoft.com/office/officeart/2005/8/layout/orgChart1"/>
-    <dgm:cxn modelId="{5CA14EFE-56BA-428E-9344-6E54BD1CDAE3}" type="presOf" srcId="{A7E2D81E-7900-4DF4-BEF5-77A2812B0C4E}" destId="{91E1DAD5-A378-4F9D-90D3-E4D6E3B719CC}" srcOrd="0" destOrd="0" presId="urn:microsoft.com/office/officeart/2005/8/layout/orgChart1"/>
-    <dgm:cxn modelId="{275E1EA8-9958-4385-AD1D-0D70F2B2E97E}" type="presOf" srcId="{998DBD50-443E-466A-9688-66A52BCFB283}" destId="{291B4844-977C-4B0C-9CCC-F7511A56BE71}" srcOrd="1" destOrd="0" presId="urn:microsoft.com/office/officeart/2005/8/layout/orgChart1"/>
-    <dgm:cxn modelId="{F1E4A56E-64BE-44F4-8E42-D61EDD68880B}" srcId="{26CDFC28-47AA-4502-887A-33E7C0CE0838}" destId="{F0588C2A-6766-47BF-AE7C-52B851FABC21}" srcOrd="0" destOrd="0" parTransId="{5ED6D770-BF3B-4684-98EB-5ABB516FF23D}" sibTransId="{AFD6C0FD-0670-49CC-B34D-0E113DDEE343}"/>
-    <dgm:cxn modelId="{B90982DA-E1CB-43C2-9643-4ECB399A3CBC}" type="presOf" srcId="{998DBD50-443E-466A-9688-66A52BCFB283}" destId="{F5D3DEFB-AE85-4939-AB97-E915462269C0}" srcOrd="0" destOrd="0" presId="urn:microsoft.com/office/officeart/2005/8/layout/orgChart1"/>
-    <dgm:cxn modelId="{A4FD5072-445C-4BF4-99DD-5F1BDAD862DA}" srcId="{C9F271EB-AA97-406F-A22E-048A336DC94A}" destId="{6CEB8C34-32A9-47E6-A405-A04B3711CFB7}" srcOrd="1" destOrd="0" parTransId="{9DFE08AD-6D40-40B9-8C6C-0D9B748E71FD}" sibTransId="{05E40D46-9D4A-4AE0-8A7C-2E5D2787A5C2}"/>
-    <dgm:cxn modelId="{8137AEC6-67AB-4747-A01B-8846F373EF92}" type="presOf" srcId="{2A1734E5-F350-4043-A59D-090A5C851E96}" destId="{632D20A3-D474-4945-BEC3-702EAB53AF00}" srcOrd="0" destOrd="0" presId="urn:microsoft.com/office/officeart/2005/8/layout/orgChart1"/>
-    <dgm:cxn modelId="{B382F07A-E779-468F-8018-7984C1FE1CF1}" type="presOf" srcId="{26CDFC28-47AA-4502-887A-33E7C0CE0838}" destId="{4780D492-11D4-4975-B35A-476D05181A39}" srcOrd="1" destOrd="0" presId="urn:microsoft.com/office/officeart/2005/8/layout/orgChart1"/>
-    <dgm:cxn modelId="{0B387FA4-F216-482B-AC2E-CAF30E8346BB}" type="presOf" srcId="{64BCB35C-1AA8-4805-AE44-941DC0666BE4}" destId="{06BFC016-E41C-49B3-B96E-72E532519536}" srcOrd="0" destOrd="0" presId="urn:microsoft.com/office/officeart/2005/8/layout/orgChart1"/>
-    <dgm:cxn modelId="{CF4DF7D7-2777-4A2A-9B0C-8DEB23527131}" type="presOf" srcId="{C6CC40CD-5626-4A19-9936-F67709EE7AF0}" destId="{52AB23E0-53A6-4AC3-B89A-D72BC394F116}" srcOrd="0" destOrd="0" presId="urn:microsoft.com/office/officeart/2005/8/layout/orgChart1"/>
-    <dgm:cxn modelId="{2258E7B5-0D3B-4779-989F-0D2802E77E9D}" type="presOf" srcId="{2AB59A33-B6A6-40FF-98F7-711698F4D26B}" destId="{64076540-8FAD-4187-A304-8898DDD0C9A8}" srcOrd="0" destOrd="0" presId="urn:microsoft.com/office/officeart/2005/8/layout/orgChart1"/>
-    <dgm:cxn modelId="{06EB2273-9FAF-4E8B-B25D-B647F848AA12}" type="presOf" srcId="{A7E2D81E-7900-4DF4-BEF5-77A2812B0C4E}" destId="{C91E4177-0B62-4588-885D-1A4C3BD2BAF7}" srcOrd="1" destOrd="0" presId="urn:microsoft.com/office/officeart/2005/8/layout/orgChart1"/>
-    <dgm:cxn modelId="{2058D512-BFDC-429D-8108-A884B1DF591E}" type="presOf" srcId="{9FCE91AE-B52F-45FA-A0C5-CA2E6E43F0FC}" destId="{DFAC233F-FFFB-4BE5-9FC7-55A2752E1DAD}" srcOrd="0" destOrd="0" presId="urn:microsoft.com/office/officeart/2005/8/layout/orgChart1"/>
-    <dgm:cxn modelId="{8CBE4C9A-8DBD-4F86-806A-74F82BAF13CF}" type="presOf" srcId="{26CDFC28-47AA-4502-887A-33E7C0CE0838}" destId="{B9EF6254-674C-4CF7-8107-B9DBCC5CC06C}" srcOrd="0" destOrd="0" presId="urn:microsoft.com/office/officeart/2005/8/layout/orgChart1"/>
-    <dgm:cxn modelId="{74291408-E599-4241-9208-778B25B35419}" type="presOf" srcId="{5AF5E628-F524-43D4-9C5A-5A8189560301}" destId="{C6B5F02F-BF16-4258-AC5A-D980E6777BDC}" srcOrd="1" destOrd="0" presId="urn:microsoft.com/office/officeart/2005/8/layout/orgChart1"/>
-    <dgm:cxn modelId="{5F5DBC77-905E-46B9-9C22-D2F5D1C757CB}" type="presOf" srcId="{6CEB8C34-32A9-47E6-A405-A04B3711CFB7}" destId="{F5F98A29-63BF-4AC3-9BF3-D3C7E3FF700B}" srcOrd="1" destOrd="0" presId="urn:microsoft.com/office/officeart/2005/8/layout/orgChart1"/>
-    <dgm:cxn modelId="{4D7522AD-EF42-4E61-860F-C5EE7ADC920F}" srcId="{A7E2D81E-7900-4DF4-BEF5-77A2812B0C4E}" destId="{4BD105F0-FCB2-4292-8534-EF3F82555BF1}" srcOrd="1" destOrd="0" parTransId="{82243891-7EAF-4E58-B342-FB3AEF7D96D8}" sibTransId="{1B73A89F-B150-403E-8069-7813E3E859D3}"/>
-    <dgm:cxn modelId="{A1CD0581-8F25-4433-BCB3-403F201DCE98}" srcId="{31976A02-02B1-412A-B691-02C3A6880CD3}" destId="{A7E2D81E-7900-4DF4-BEF5-77A2812B0C4E}" srcOrd="0" destOrd="0" parTransId="{5E9185FC-D944-454A-8EDB-88DDB1EC156B}" sibTransId="{6CE37D0C-36BB-4B53-B0BC-4BBCC03B877F}"/>
-    <dgm:cxn modelId="{DF1FF10C-2385-4496-A025-967A40CBD7A2}" type="presOf" srcId="{2A1734E5-F350-4043-A59D-090A5C851E96}" destId="{E65AAA3D-6EDF-4733-A476-6E661CF70E36}" srcOrd="1" destOrd="0" presId="urn:microsoft.com/office/officeart/2005/8/layout/orgChart1"/>
-    <dgm:cxn modelId="{87C8B196-323D-4EB7-8C11-259CEDD39083}" type="presOf" srcId="{AB5982FD-D354-4AAA-B978-F9826D0D05FB}" destId="{A48D18B2-265E-4299-AC55-85A70F37F6FA}" srcOrd="0" destOrd="0" presId="urn:microsoft.com/office/officeart/2005/8/layout/orgChart1"/>
-    <dgm:cxn modelId="{A8107FC3-6D18-4968-ADAB-112DB844FD6C}" type="presOf" srcId="{AB5982FD-D354-4AAA-B978-F9826D0D05FB}" destId="{9D123678-09FF-430E-9CD4-847B9B41C9E6}" srcOrd="1" destOrd="0" presId="urn:microsoft.com/office/officeart/2005/8/layout/orgChart1"/>
+    <dgm:cxn modelId="{7D2A03B3-72A8-4CAF-A850-B82FF1D961C0}" type="presOf" srcId="{3196F628-F850-402C-8DFF-32FDBF641FAF}" destId="{6B1C0F91-7709-4920-8BCD-A2344D4FC3C1}" srcOrd="0" destOrd="0" presId="urn:microsoft.com/office/officeart/2005/8/layout/orgChart1"/>
+    <dgm:cxn modelId="{701FBC72-4CA4-403B-9C1B-0720F2EB9273}" type="presOf" srcId="{F0588C2A-6766-47BF-AE7C-52B851FABC21}" destId="{09C02F37-0DFF-472D-BC6B-B6584867F159}" srcOrd="1" destOrd="0" presId="urn:microsoft.com/office/officeart/2005/8/layout/orgChart1"/>
+    <dgm:cxn modelId="{794BC4DB-07B9-4B18-835E-CC6189AFDB89}" type="presOf" srcId="{C1DBF8BC-E021-419E-A78A-05014B36B3B1}" destId="{3D07C967-7F5A-4259-8C92-44D4DA2F7550}" srcOrd="0" destOrd="0" presId="urn:microsoft.com/office/officeart/2005/8/layout/orgChart1"/>
+    <dgm:cxn modelId="{F56EA288-A208-43A9-BC15-07480867F718}" type="presOf" srcId="{CF665F69-5C99-4ABA-84BB-EE78294ED608}" destId="{0EA51ED5-D16D-4D92-B6FA-B66031566B6A}" srcOrd="1" destOrd="0" presId="urn:microsoft.com/office/officeart/2005/8/layout/orgChart1"/>
     <dgm:cxn modelId="{6D67D41E-CA24-4B50-B776-9590486E46E4}" type="presOf" srcId="{763868FB-01C7-4C07-982A-E0002DD2F249}" destId="{6E390A44-09EF-4120-ABD1-1835798D84D0}" srcOrd="0" destOrd="0" presId="urn:microsoft.com/office/officeart/2005/8/layout/orgChart1"/>
-    <dgm:cxn modelId="{7A6B7DFA-AF2C-46D0-9BF7-1A6F2A4BD05F}" type="presOf" srcId="{82243891-7EAF-4E58-B342-FB3AEF7D96D8}" destId="{AAC078B5-22C6-4465-AC60-50B89A62DAA4}" srcOrd="0" destOrd="0" presId="urn:microsoft.com/office/officeart/2005/8/layout/orgChart1"/>
-    <dgm:cxn modelId="{54CCCEDE-ECD4-498C-B465-8CA9F82A49C5}" type="presOf" srcId="{F8118993-C3C6-4246-A6BF-F9F2EC3DC9CB}" destId="{A2BECFDC-6DED-4CEA-B9D1-694651AD4E09}" srcOrd="1" destOrd="0" presId="urn:microsoft.com/office/officeart/2005/8/layout/orgChart1"/>
-    <dgm:cxn modelId="{C3A31E5B-D7BF-45EA-9802-6D3D083F2984}" type="presOf" srcId="{A3D548BD-E471-4C3A-9014-C70E7E2B5BFD}" destId="{2D94B2C8-24C9-4949-954A-EDC01FC95EB8}" srcOrd="0" destOrd="0" presId="urn:microsoft.com/office/officeart/2005/8/layout/orgChart1"/>
-    <dgm:cxn modelId="{65D0E857-80DD-4041-83CE-8C50597B830A}" type="presOf" srcId="{31976A02-02B1-412A-B691-02C3A6880CD3}" destId="{36B3E81A-E148-4D3B-88E5-4419A3BAFF40}" srcOrd="0" destOrd="0" presId="urn:microsoft.com/office/officeart/2005/8/layout/orgChart1"/>
-    <dgm:cxn modelId="{5AD1E491-93BF-4390-A05D-1A6277716063}" type="presOf" srcId="{CC818131-8C0B-4D2C-AEA4-5A1BD3A6EFF3}" destId="{3E8697EF-F0C0-442C-AC8F-AF21953408C4}" srcOrd="0" destOrd="0" presId="urn:microsoft.com/office/officeart/2005/8/layout/orgChart1"/>
-    <dgm:cxn modelId="{63957BFE-6189-47C3-8B38-C33EAFDBB625}" srcId="{998DBD50-443E-466A-9688-66A52BCFB283}" destId="{DD18F73E-5873-4440-AD2A-CB98A7E335BB}" srcOrd="0" destOrd="0" parTransId="{5B6E6A94-B82E-45A0-B538-B423850E5FD3}" sibTransId="{9786C01A-E46D-4E4C-952B-67F9C5AB60A3}"/>
-    <dgm:cxn modelId="{16C1F492-6F23-441E-8C79-9308ED1456B5}" type="presOf" srcId="{B23CD900-37E2-45DE-B384-F9885D55838B}" destId="{82AF4305-DDE7-4632-85B6-1B4672473DDD}" srcOrd="1" destOrd="0" presId="urn:microsoft.com/office/officeart/2005/8/layout/orgChart1"/>
-    <dgm:cxn modelId="{3F6EF168-B749-47B5-86FD-91ABA2C7D72E}" type="presOf" srcId="{A9576EC0-F780-411F-A988-792BB4B5827F}" destId="{3C3CC326-C1BB-4802-9C80-3024F7E2EFEC}" srcOrd="1" destOrd="0" presId="urn:microsoft.com/office/officeart/2005/8/layout/orgChart1"/>
-    <dgm:cxn modelId="{9A9E885B-6395-49FB-9E85-9D1E8F64238A}" type="presOf" srcId="{810F6CE3-7B9A-4BC5-B642-3E284064AEB8}" destId="{27D617F6-CD92-4160-85E9-3D135DEE9C6C}" srcOrd="0" destOrd="0" presId="urn:microsoft.com/office/officeart/2005/8/layout/orgChart1"/>
-    <dgm:cxn modelId="{964962C0-3F9A-405E-B7CF-7320CA058054}" srcId="{4BD105F0-FCB2-4292-8534-EF3F82555BF1}" destId="{F8118993-C3C6-4246-A6BF-F9F2EC3DC9CB}" srcOrd="0" destOrd="0" parTransId="{763868FB-01C7-4C07-982A-E0002DD2F249}" sibTransId="{196FC47F-8F5E-4EE4-99DA-8228F767EF40}"/>
-    <dgm:cxn modelId="{F3B26E1E-6947-4159-918E-E138CED3D239}" srcId="{B23CD900-37E2-45DE-B384-F9885D55838B}" destId="{A9576EC0-F780-411F-A988-792BB4B5827F}" srcOrd="0" destOrd="0" parTransId="{3C5DF98A-9E49-4EBC-AA28-3E96D9B53B39}" sibTransId="{4568403F-227F-414F-9181-6C36CA1FB882}"/>
-    <dgm:cxn modelId="{F4CB865C-996A-492E-9E5F-2B17DE9381E0}" srcId="{26CDFC28-47AA-4502-887A-33E7C0CE0838}" destId="{8F21D5B7-1E81-4E68-9A3B-41478D9E578F}" srcOrd="1" destOrd="0" parTransId="{810F6CE3-7B9A-4BC5-B642-3E284064AEB8}" sibTransId="{0C0A6C55-CE4D-42AC-8392-A28B6E9C2042}"/>
-    <dgm:cxn modelId="{EC9B6DDA-4079-451C-AA2A-4CC8ABD15E1E}" srcId="{A7E2D81E-7900-4DF4-BEF5-77A2812B0C4E}" destId="{2A1734E5-F350-4043-A59D-090A5C851E96}" srcOrd="2" destOrd="0" parTransId="{E2FCDC95-A76F-447E-B7A8-96053D2336AC}" sibTransId="{1BA36650-D456-4FCA-ABBC-F4EEE6270BCA}"/>
-    <dgm:cxn modelId="{7D2A03B3-72A8-4CAF-A850-B82FF1D961C0}" type="presOf" srcId="{3196F628-F850-402C-8DFF-32FDBF641FAF}" destId="{6B1C0F91-7709-4920-8BCD-A2344D4FC3C1}" srcOrd="0" destOrd="0" presId="urn:microsoft.com/office/officeart/2005/8/layout/orgChart1"/>
-    <dgm:cxn modelId="{D9F878CB-CD73-43B2-924C-4145A2798C53}" type="presOf" srcId="{CC818131-8C0B-4D2C-AEA4-5A1BD3A6EFF3}" destId="{D62139CB-9D8F-4560-A01D-A225FB31D9FF}" srcOrd="1" destOrd="0" presId="urn:microsoft.com/office/officeart/2005/8/layout/orgChart1"/>
-    <dgm:cxn modelId="{E7F7BF8F-EE5F-4676-BDAC-E110E82FDA6F}" type="presOf" srcId="{DD18F73E-5873-4440-AD2A-CB98A7E335BB}" destId="{7527F677-2F8C-4154-ADCF-5A9B516211C5}" srcOrd="0" destOrd="0" presId="urn:microsoft.com/office/officeart/2005/8/layout/orgChart1"/>
-    <dgm:cxn modelId="{07BFF742-37D9-4F3A-8BCA-5FA7F3B3FFDA}" type="presOf" srcId="{51C939BC-1F71-4B4B-B76E-5AB02C7C5227}" destId="{617A3543-3392-450A-AE60-926A208DA196}" srcOrd="0" destOrd="0" presId="urn:microsoft.com/office/officeart/2005/8/layout/orgChart1"/>
-    <dgm:cxn modelId="{3E527903-2969-4BE6-A44A-67C70C96E603}" type="presOf" srcId="{4BD105F0-FCB2-4292-8534-EF3F82555BF1}" destId="{432E8FE3-B9B9-442A-A4A0-5A0F509E161A}" srcOrd="1" destOrd="0" presId="urn:microsoft.com/office/officeart/2005/8/layout/orgChart1"/>
-    <dgm:cxn modelId="{F56EA288-A208-43A9-BC15-07480867F718}" type="presOf" srcId="{CF665F69-5C99-4ABA-84BB-EE78294ED608}" destId="{0EA51ED5-D16D-4D92-B6FA-B66031566B6A}" srcOrd="1" destOrd="0" presId="urn:microsoft.com/office/officeart/2005/8/layout/orgChart1"/>
-    <dgm:cxn modelId="{6DDE05DA-2CC4-4A86-986C-5CBE3D44190A}" type="presOf" srcId="{6CEB8C34-32A9-47E6-A405-A04B3711CFB7}" destId="{087E6E65-2112-476B-A4AA-3A36C7628514}" srcOrd="0" destOrd="0" presId="urn:microsoft.com/office/officeart/2005/8/layout/orgChart1"/>
     <dgm:cxn modelId="{D08B451E-BCB5-4E0B-8342-ED0CFBDE97DB}" type="presOf" srcId="{F8118993-C3C6-4246-A6BF-F9F2EC3DC9CB}" destId="{23D4122E-B967-488C-8CB8-9B0B4654BF0E}" srcOrd="0" destOrd="0" presId="urn:microsoft.com/office/officeart/2005/8/layout/orgChart1"/>
-    <dgm:cxn modelId="{D4A13C56-EB94-4538-AEB3-2A061DCE865E}" srcId="{51C939BC-1F71-4B4B-B76E-5AB02C7C5227}" destId="{AB5982FD-D354-4AAA-B978-F9826D0D05FB}" srcOrd="1" destOrd="0" parTransId="{64BCB35C-1AA8-4805-AE44-941DC0666BE4}" sibTransId="{F8A871A7-1431-40C2-8D1E-3F46A7492963}"/>
-    <dgm:cxn modelId="{3A8D22D7-D5E6-464A-8BEE-727F9246E9EE}" srcId="{F8118993-C3C6-4246-A6BF-F9F2EC3DC9CB}" destId="{CC818131-8C0B-4D2C-AEA4-5A1BD3A6EFF3}" srcOrd="1" destOrd="0" parTransId="{A3D548BD-E471-4C3A-9014-C70E7E2B5BFD}" sibTransId="{1E143EFF-2729-40A1-84B3-E819EDF8B7B2}"/>
-    <dgm:cxn modelId="{79528653-A03B-4870-8A6A-410571D115D3}" type="presOf" srcId="{51C939BC-1F71-4B4B-B76E-5AB02C7C5227}" destId="{26FA5C1D-10E1-45CD-A1D3-744EEEC37631}" srcOrd="1" destOrd="0" presId="urn:microsoft.com/office/officeart/2005/8/layout/orgChart1"/>
-    <dgm:cxn modelId="{5DC0E0BC-0122-42DE-9175-76DAAE24D215}" srcId="{A7E2D81E-7900-4DF4-BEF5-77A2812B0C4E}" destId="{51C939BC-1F71-4B4B-B76E-5AB02C7C5227}" srcOrd="3" destOrd="0" parTransId="{D5432636-319A-4212-83DB-9D3BA6AA54A9}" sibTransId="{C119049A-FECA-4579-956E-33C230BAA319}"/>
-    <dgm:cxn modelId="{B8E816F8-7FA7-46B3-B6D5-3CE42BCFB40A}" srcId="{2A1734E5-F350-4043-A59D-090A5C851E96}" destId="{26CDFC28-47AA-4502-887A-33E7C0CE0838}" srcOrd="0" destOrd="0" parTransId="{3196F628-F850-402C-8DFF-32FDBF641FAF}" sibTransId="{31721E21-E4E4-40B3-A55D-F290C2DF3887}"/>
-    <dgm:cxn modelId="{5E6BA506-E2BF-4C29-92E3-F77F24013314}" type="presOf" srcId="{5AF5E628-F524-43D4-9C5A-5A8189560301}" destId="{710C924E-E30F-44DF-A6AA-7A0529BD66A0}" srcOrd="0" destOrd="0" presId="urn:microsoft.com/office/officeart/2005/8/layout/orgChart1"/>
-    <dgm:cxn modelId="{8D0015CC-72CA-4964-8D64-FA31789A0CF7}" type="presOf" srcId="{C9F271EB-AA97-406F-A22E-048A336DC94A}" destId="{EF58EAAC-E8FC-4E92-AC54-3E70E3CCE427}" srcOrd="0" destOrd="0" presId="urn:microsoft.com/office/officeart/2005/8/layout/orgChart1"/>
-    <dgm:cxn modelId="{855D9E2B-03E2-41B3-895F-0198D29F1009}" type="presOf" srcId="{3C5DF98A-9E49-4EBC-AA28-3E96D9B53B39}" destId="{21695C6D-5845-4B94-8EDE-C845DA7BA21E}" srcOrd="0" destOrd="0" presId="urn:microsoft.com/office/officeart/2005/8/layout/orgChart1"/>
-    <dgm:cxn modelId="{DE92D672-1362-46B3-9B36-E204E35D3A8A}" srcId="{AB5982FD-D354-4AAA-B978-F9826D0D05FB}" destId="{CF665F69-5C99-4ABA-84BB-EE78294ED608}" srcOrd="0" destOrd="0" parTransId="{CBAC9813-60C7-4469-BF09-A874065B34A7}" sibTransId="{F6125F52-3FD9-4490-AD82-6F4F52591F18}"/>
-    <dgm:cxn modelId="{585916E3-B9E6-418F-BBFC-91743B566955}" type="presOf" srcId="{5ED6D770-BF3B-4684-98EB-5ABB516FF23D}" destId="{5871E8CC-FA46-4584-AC5E-0BFF5BB7E6D6}" srcOrd="0" destOrd="0" presId="urn:microsoft.com/office/officeart/2005/8/layout/orgChart1"/>
-    <dgm:cxn modelId="{EC2000F8-6406-4F91-AC03-67371B9EF307}" type="presOf" srcId="{CEB0D96F-42A5-4903-B863-AD62B81F61AE}" destId="{D81F13DE-77CA-4947-A9D8-3B9405F7FB4A}" srcOrd="0" destOrd="0" presId="urn:microsoft.com/office/officeart/2005/8/layout/orgChart1"/>
-    <dgm:cxn modelId="{2D8C82CF-8261-498E-8D04-AFAB3415C828}" srcId="{6CEB8C34-32A9-47E6-A405-A04B3711CFB7}" destId="{5AF5E628-F524-43D4-9C5A-5A8189560301}" srcOrd="0" destOrd="0" parTransId="{B3E11DF4-0A70-40F4-A9F3-378E2202AE1D}" sibTransId="{79E1E6F3-8832-4EDA-9B35-6A23A6E78C38}"/>
-    <dgm:cxn modelId="{3652CE73-9339-44DF-877F-2A4347BDCFDB}" type="presOf" srcId="{8F21D5B7-1E81-4E68-9A3B-41478D9E578F}" destId="{14A65CCA-D715-46D8-B448-593158ED3247}" srcOrd="1" destOrd="0" presId="urn:microsoft.com/office/officeart/2005/8/layout/orgChart1"/>
-    <dgm:cxn modelId="{AA527D19-A024-4500-8A09-2D410AABF130}" type="presOf" srcId="{DD18F73E-5873-4440-AD2A-CB98A7E335BB}" destId="{24D69D00-71EB-421A-A1CD-E1399AFDD654}" srcOrd="1" destOrd="0" presId="urn:microsoft.com/office/officeart/2005/8/layout/orgChart1"/>
-    <dgm:cxn modelId="{1B284198-CAF5-4CC2-BF48-541C8C13B704}" type="presOf" srcId="{2AB59A33-B6A6-40FF-98F7-711698F4D26B}" destId="{DE7689F0-0909-4DF0-993D-DF1D19A454E0}" srcOrd="1" destOrd="0" presId="urn:microsoft.com/office/officeart/2005/8/layout/orgChart1"/>
-    <dgm:cxn modelId="{9FE69CA7-02A8-4923-B8F4-A5DECC562316}" type="presOf" srcId="{B3E11DF4-0A70-40F4-A9F3-378E2202AE1D}" destId="{E8CF98EA-1E11-4C8B-B3DC-A8B8C9716700}" srcOrd="0" destOrd="0" presId="urn:microsoft.com/office/officeart/2005/8/layout/orgChart1"/>
-    <dgm:cxn modelId="{3FFF7750-E39A-400B-867E-3AD7510BEE79}" type="presOf" srcId="{4BD105F0-FCB2-4292-8534-EF3F82555BF1}" destId="{3780879A-AD2D-405D-977E-4451EF3CA5AD}" srcOrd="0" destOrd="0" presId="urn:microsoft.com/office/officeart/2005/8/layout/orgChart1"/>
-    <dgm:cxn modelId="{3D6039C9-601D-4282-8BBF-03FEEA76F5F3}" type="presOf" srcId="{E2FCDC95-A76F-447E-B7A8-96053D2336AC}" destId="{75994A22-3790-4219-8C34-EFB1A172683C}" srcOrd="0" destOrd="0" presId="urn:microsoft.com/office/officeart/2005/8/layout/orgChart1"/>
-    <dgm:cxn modelId="{079B3109-107E-4D2E-99FC-71764D1796B1}" type="presOf" srcId="{B23CD900-37E2-45DE-B384-F9885D55838B}" destId="{F6A2B30B-A958-479B-AD92-8D9166487761}" srcOrd="0" destOrd="0" presId="urn:microsoft.com/office/officeart/2005/8/layout/orgChart1"/>
-    <dgm:cxn modelId="{DB030D6B-BB16-4AB3-BD3B-676A1CBC0A28}" type="presOf" srcId="{A9576EC0-F780-411F-A988-792BB4B5827F}" destId="{B4236978-BB7B-465F-A15B-A4753285650F}" srcOrd="0" destOrd="0" presId="urn:microsoft.com/office/officeart/2005/8/layout/orgChart1"/>
-    <dgm:cxn modelId="{29D3F1C6-D8C1-4696-9225-7574825892FA}" srcId="{F8118993-C3C6-4246-A6BF-F9F2EC3DC9CB}" destId="{2AB59A33-B6A6-40FF-98F7-711698F4D26B}" srcOrd="0" destOrd="0" parTransId="{C1DBF8BC-E021-419E-A78A-05014B36B3B1}" sibTransId="{39934AF9-B63A-4C68-8C74-12CFA5946906}"/>
-    <dgm:cxn modelId="{73D1DC3E-5AF2-43C6-AE9C-C378299A836A}" type="presOf" srcId="{CBAC9813-60C7-4469-BF09-A874065B34A7}" destId="{F6217F3C-65DD-408C-AC11-C96C35846B77}" srcOrd="0" destOrd="0" presId="urn:microsoft.com/office/officeart/2005/8/layout/orgChart1"/>
-    <dgm:cxn modelId="{711E14F9-8AF4-4019-8C8C-9FE45B7D3E7C}" type="presOf" srcId="{9DFE08AD-6D40-40B9-8C6C-0D9B748E71FD}" destId="{8D8E53BF-D23C-4E66-A64D-69E3B5A64376}" srcOrd="0" destOrd="0" presId="urn:microsoft.com/office/officeart/2005/8/layout/orgChart1"/>
-    <dgm:cxn modelId="{F864C8BC-B8C9-4962-ABB8-1D4DB46F4EA9}" srcId="{C9F271EB-AA97-406F-A22E-048A336DC94A}" destId="{B23CD900-37E2-45DE-B384-F9885D55838B}" srcOrd="0" destOrd="0" parTransId="{C6CC40CD-5626-4A19-9936-F67709EE7AF0}" sibTransId="{4EC04109-3134-4314-B119-98550E78BF07}"/>
-    <dgm:cxn modelId="{701FBC72-4CA4-403B-9C1B-0720F2EB9273}" type="presOf" srcId="{F0588C2A-6766-47BF-AE7C-52B851FABC21}" destId="{09C02F37-0DFF-472D-BC6B-B6584867F159}" srcOrd="1" destOrd="0" presId="urn:microsoft.com/office/officeart/2005/8/layout/orgChart1"/>
-    <dgm:cxn modelId="{FCF7D859-A8C6-4A69-ACE7-6EBD0F233C30}" type="presOf" srcId="{D5432636-319A-4212-83DB-9D3BA6AA54A9}" destId="{AA253CD6-C0DA-4C21-9B15-7211D0914EE5}" srcOrd="0" destOrd="0" presId="urn:microsoft.com/office/officeart/2005/8/layout/orgChart1"/>
-    <dgm:cxn modelId="{794BC4DB-07B9-4B18-835E-CC6189AFDB89}" type="presOf" srcId="{C1DBF8BC-E021-419E-A78A-05014B36B3B1}" destId="{3D07C967-7F5A-4259-8C92-44D4DA2F7550}" srcOrd="0" destOrd="0" presId="urn:microsoft.com/office/officeart/2005/8/layout/orgChart1"/>
-    <dgm:cxn modelId="{A25B346A-AF67-44D0-A601-4D4A0B7FEEC8}" srcId="{A7E2D81E-7900-4DF4-BEF5-77A2812B0C4E}" destId="{C9F271EB-AA97-406F-A22E-048A336DC94A}" srcOrd="0" destOrd="0" parTransId="{CEB0D96F-42A5-4903-B863-AD62B81F61AE}" sibTransId="{994C4CAB-5619-4281-B81C-1EBED1C2EFE7}"/>
-    <dgm:cxn modelId="{22930F4D-DE10-45E5-ACDC-A461022FFBA9}" srcId="{51C939BC-1F71-4B4B-B76E-5AB02C7C5227}" destId="{998DBD50-443E-466A-9688-66A52BCFB283}" srcOrd="0" destOrd="0" parTransId="{9FCE91AE-B52F-45FA-A0C5-CA2E6E43F0FC}" sibTransId="{1642DE8E-03D4-4062-A10D-83B597A79491}"/>
-    <dgm:cxn modelId="{63B04F08-C750-4C7A-B49E-BEE5344BBD39}" type="presOf" srcId="{C9F271EB-AA97-406F-A22E-048A336DC94A}" destId="{0CDB574B-8A16-4575-B86E-72EE9B15201E}" srcOrd="1" destOrd="0" presId="urn:microsoft.com/office/officeart/2005/8/layout/orgChart1"/>
-    <dgm:cxn modelId="{EC81C075-A36A-401B-894E-F2172C22244B}" type="presOf" srcId="{5B6E6A94-B82E-45A0-B538-B423850E5FD3}" destId="{044C785A-5A95-4E11-98D2-B0C3A8153197}" srcOrd="0" destOrd="0" presId="urn:microsoft.com/office/officeart/2005/8/layout/orgChart1"/>
-    <dgm:cxn modelId="{66587802-E1A1-4490-8EE6-DFFED4C0E387}" type="presOf" srcId="{8F21D5B7-1E81-4E68-9A3B-41478D9E578F}" destId="{9961A4E0-4305-4F81-8160-655C9A27D034}" srcOrd="0" destOrd="0" presId="urn:microsoft.com/office/officeart/2005/8/layout/orgChart1"/>
     <dgm:cxn modelId="{A331ECE4-3A51-47A2-B0EB-15A33C8106AE}" type="presParOf" srcId="{36B3E81A-E148-4D3B-88E5-4419A3BAFF40}" destId="{D465AAE9-80F9-4B15-8D00-FCD2F5B0741D}" srcOrd="0" destOrd="0" presId="urn:microsoft.com/office/officeart/2005/8/layout/orgChart1"/>
     <dgm:cxn modelId="{FDA91742-653C-4F89-9365-271A53D2AD08}" type="presParOf" srcId="{D465AAE9-80F9-4B15-8D00-FCD2F5B0741D}" destId="{3FD2C245-E911-4A1C-878D-89B50AA53502}" srcOrd="0" destOrd="0" presId="urn:microsoft.com/office/officeart/2005/8/layout/orgChart1"/>
     <dgm:cxn modelId="{4BBCF4DB-0FC6-453B-AD7D-F55E26A6C214}" type="presParOf" srcId="{3FD2C245-E911-4A1C-878D-89B50AA53502}" destId="{91E1DAD5-A378-4F9D-90D3-E4D6E3B719CC}" srcOrd="0" destOrd="0" presId="urn:microsoft.com/office/officeart/2005/8/layout/orgChart1"/>
@@ -13874,7 +13875,7 @@
           <p:cNvPr id="2" name="Title 1">
             <a:extLst>
               <a:ext uri="{FF2B5EF4-FFF2-40B4-BE49-F238E27FC236}">
-                <a16:creationId xmlns:a16="http://schemas.microsoft.com/office/drawing/2014/main" xmlns="" id="{F4727C6F-3982-4E54-AA66-B4E0AA33FF66}"/>
+                <a16:creationId xmlns="" xmlns:a16="http://schemas.microsoft.com/office/drawing/2014/main" id="{F4727C6F-3982-4E54-AA66-B4E0AA33FF66}"/>
               </a:ext>
             </a:extLst>
           </p:cNvPr>
@@ -13903,7 +13904,7 @@
           <p:cNvPr id="3" name="Content Placeholder 2">
             <a:extLst>
               <a:ext uri="{FF2B5EF4-FFF2-40B4-BE49-F238E27FC236}">
-                <a16:creationId xmlns:a16="http://schemas.microsoft.com/office/drawing/2014/main" xmlns="" id="{1134DAC4-9E94-441C-A9BE-87750F6F60A2}"/>
+                <a16:creationId xmlns="" xmlns:a16="http://schemas.microsoft.com/office/drawing/2014/main" id="{1134DAC4-9E94-441C-A9BE-87750F6F60A2}"/>
               </a:ext>
             </a:extLst>
           </p:cNvPr>
@@ -14115,13 +14116,7 @@
       </p:grpSpPr>
       <p:sp>
         <p:nvSpPr>
-          <p:cNvPr id="2" name="Title 1">
-            <a:extLst>
-              <a:ext uri="{FF2B5EF4-FFF2-40B4-BE49-F238E27FC236}">
-                <a16:creationId xmlns:a16="http://schemas.microsoft.com/office/drawing/2014/main" xmlns="" id="{3E1AC600-D16C-47B7-9075-94DA61007B25}"/>
-              </a:ext>
-            </a:extLst>
-          </p:cNvPr>
+          <p:cNvPr id="2" name="Title 1"/>
           <p:cNvSpPr>
             <a:spLocks noGrp="1"/>
           </p:cNvSpPr>
@@ -14129,110 +14124,52 @@
             <p:ph type="title"/>
           </p:nvPr>
         </p:nvSpPr>
-        <p:spPr>
-          <a:xfrm>
-            <a:off x="1097280" y="286603"/>
-            <a:ext cx="10058400" cy="1450757"/>
-          </a:xfrm>
-        </p:spPr>
-        <p:txBody>
-          <a:bodyPr/>
-          <a:lstStyle/>
-          <a:p>
-            <a:r>
-              <a:rPr lang="en-US" dirty="0"/>
-              <a:t>Big Data: Tools</a:t>
-            </a:r>
-            <a:endParaRPr lang="x-none" dirty="0"/>
-          </a:p>
-        </p:txBody>
-      </p:sp>
-      <p:sp>
-        <p:nvSpPr>
-          <p:cNvPr id="3" name="Content Placeholder 2">
-            <a:extLst>
-              <a:ext uri="{FF2B5EF4-FFF2-40B4-BE49-F238E27FC236}">
-                <a16:creationId xmlns:a16="http://schemas.microsoft.com/office/drawing/2014/main" xmlns="" id="{DDC8679B-3323-4E4B-ABD6-BD8748DF3AEB}"/>
-              </a:ext>
-            </a:extLst>
-          </p:cNvPr>
-          <p:cNvSpPr>
-            <a:spLocks noGrp="1"/>
-          </p:cNvSpPr>
-          <p:nvPr>
-            <p:ph idx="1"/>
-          </p:nvPr>
-        </p:nvSpPr>
         <p:spPr/>
         <p:txBody>
           <a:bodyPr/>
           <a:lstStyle/>
           <a:p>
-            <a:pPr marL="0" indent="0">
-              <a:buNone/>
-            </a:pPr>
-            <a:r>
-              <a:rPr lang="en-US" sz="3200" b="1" dirty="0"/>
-              <a:t>Hadoop</a:t>
-            </a:r>
-            <a:endParaRPr lang="en-US" b="1" dirty="0"/>
-          </a:p>
-          <a:p>
-            <a:pPr>
-              <a:buFont typeface="Wingdings" panose="05000000000000000000" pitchFamily="2" charset="2"/>
-              <a:buChar char="v"/>
-            </a:pPr>
-            <a:r>
-              <a:rPr lang="en-US" dirty="0"/>
-              <a:t>Hadoop software library is a framework</a:t>
-            </a:r>
-          </a:p>
-          <a:p>
-            <a:pPr>
-              <a:buFont typeface="Wingdings" panose="05000000000000000000" pitchFamily="2" charset="2"/>
-              <a:buChar char="v"/>
-            </a:pPr>
-            <a:r>
-              <a:rPr lang="en-US" dirty="0"/>
-              <a:t>Help in distributed processing of large data sets across clusters of computers</a:t>
-            </a:r>
-          </a:p>
-          <a:p>
-            <a:pPr>
-              <a:buFont typeface="Wingdings" panose="05000000000000000000" pitchFamily="2" charset="2"/>
-              <a:buChar char="v"/>
-            </a:pPr>
-            <a:r>
-              <a:rPr lang="en-US" dirty="0"/>
-              <a:t>Two method to start single node or cluster mode</a:t>
-            </a:r>
-          </a:p>
-          <a:p>
-            <a:pPr>
-              <a:buFont typeface="Wingdings" panose="05000000000000000000" pitchFamily="2" charset="2"/>
-              <a:buChar char="v"/>
-            </a:pPr>
-            <a:r>
-              <a:rPr lang="en-US" dirty="0"/>
-              <a:t>Latest stable version is 2.9.2 </a:t>
-            </a:r>
-          </a:p>
-          <a:p>
-            <a:pPr>
-              <a:buFont typeface="Wingdings" panose="05000000000000000000" pitchFamily="2" charset="2"/>
-              <a:buChar char="v"/>
-            </a:pPr>
-            <a:r>
-              <a:rPr lang="en-US" dirty="0"/>
-              <a:t>Few Important features are HDFS, YARN,MAPREDUCE, cost efficient, Hadoop libraries and many more</a:t>
-            </a:r>
+            <a:r>
+              <a:rPr lang="en-US" dirty="0" smtClean="0"/>
+              <a:t>Big Data: Pillars</a:t>
+            </a:r>
+            <a:endParaRPr lang="en-US" dirty="0"/>
           </a:p>
         </p:txBody>
       </p:sp>
+      <p:pic>
+        <p:nvPicPr>
+          <p:cNvPr id="5" name="Content Placeholder 4"/>
+          <p:cNvPicPr>
+            <a:picLocks noGrp="1" noChangeAspect="1"/>
+          </p:cNvPicPr>
+          <p:nvPr>
+            <p:ph idx="1"/>
+          </p:nvPr>
+        </p:nvPicPr>
+        <p:blipFill>
+          <a:blip r:embed="rId2">
+            <a:extLst>
+              <a:ext uri="{28A0092B-C50C-407E-A947-70E740481C1C}">
+                <a14:useLocalDpi xmlns:a14="http://schemas.microsoft.com/office/drawing/2010/main" val="0"/>
+              </a:ext>
+            </a:extLst>
+          </a:blip>
+          <a:stretch>
+            <a:fillRect/>
+          </a:stretch>
+        </p:blipFill>
+        <p:spPr>
+          <a:xfrm>
+            <a:off x="580889" y="1876878"/>
+            <a:ext cx="11091182" cy="4400550"/>
+          </a:xfrm>
+        </p:spPr>
+      </p:pic>
     </p:spTree>
     <p:extLst>
       <p:ext uri="{BB962C8B-B14F-4D97-AF65-F5344CB8AC3E}">
-        <p14:creationId xmlns:p14="http://schemas.microsoft.com/office/powerpoint/2010/main" val="2845727905"/>
+        <p14:creationId xmlns:p14="http://schemas.microsoft.com/office/powerpoint/2010/main" val="3971159462"/>
       </p:ext>
     </p:extLst>
   </p:cSld>
@@ -14261,10 +14198,44 @@
       </p:grpSpPr>
       <p:sp>
         <p:nvSpPr>
+          <p:cNvPr id="2" name="Title 1">
+            <a:extLst>
+              <a:ext uri="{FF2B5EF4-FFF2-40B4-BE49-F238E27FC236}">
+                <a16:creationId xmlns="" xmlns:a16="http://schemas.microsoft.com/office/drawing/2014/main" id="{3E1AC600-D16C-47B7-9075-94DA61007B25}"/>
+              </a:ext>
+            </a:extLst>
+          </p:cNvPr>
+          <p:cNvSpPr>
+            <a:spLocks noGrp="1"/>
+          </p:cNvSpPr>
+          <p:nvPr>
+            <p:ph type="title"/>
+          </p:nvPr>
+        </p:nvSpPr>
+        <p:spPr>
+          <a:xfrm>
+            <a:off x="1097280" y="286603"/>
+            <a:ext cx="10058400" cy="1450757"/>
+          </a:xfrm>
+        </p:spPr>
+        <p:txBody>
+          <a:bodyPr/>
+          <a:lstStyle/>
+          <a:p>
+            <a:r>
+              <a:rPr lang="en-US" dirty="0"/>
+              <a:t>Big Data: Tools</a:t>
+            </a:r>
+            <a:endParaRPr lang="x-none" dirty="0"/>
+          </a:p>
+        </p:txBody>
+      </p:sp>
+      <p:sp>
+        <p:nvSpPr>
           <p:cNvPr id="3" name="Content Placeholder 2">
             <a:extLst>
               <a:ext uri="{FF2B5EF4-FFF2-40B4-BE49-F238E27FC236}">
-                <a16:creationId xmlns:a16="http://schemas.microsoft.com/office/drawing/2014/main" xmlns="" id="{12CE7563-67E4-470C-A76A-FD376D4C2471}"/>
+                <a16:creationId xmlns="" xmlns:a16="http://schemas.microsoft.com/office/drawing/2014/main" id="{DDC8679B-3323-4E4B-ABD6-BD8748DF3AEB}"/>
               </a:ext>
             </a:extLst>
           </p:cNvPr>
@@ -14277,15 +14248,17 @@
         </p:nvSpPr>
         <p:spPr/>
         <p:txBody>
-          <a:bodyPr>
-            <a:normAutofit/>
-          </a:bodyPr>
+          <a:bodyPr/>
           <a:lstStyle/>
           <a:p>
-            <a:r>
-              <a:rPr lang="en-US" sz="3200" dirty="0"/>
-              <a:t>SPARK</a:t>
-            </a:r>
+            <a:pPr marL="0" indent="0">
+              <a:buNone/>
+            </a:pPr>
+            <a:r>
+              <a:rPr lang="en-US" sz="3200" b="1" dirty="0"/>
+              <a:t>Hadoop</a:t>
+            </a:r>
+            <a:endParaRPr lang="en-US" b="1" dirty="0"/>
           </a:p>
           <a:p>
             <a:pPr>
@@ -14293,10 +14266,9 @@
               <a:buChar char="v"/>
             </a:pPr>
             <a:r>
-              <a:rPr lang="x-none" dirty="0"/>
-              <a:t>Apache Spark is the alternative — and in many aspects the successor — of Apache Hadoop. </a:t>
-            </a:r>
-            <a:endParaRPr lang="en-US" dirty="0"/>
+              <a:rPr lang="en-US" dirty="0"/>
+              <a:t>Hadoop software library is a framework</a:t>
+            </a:r>
           </a:p>
           <a:p>
             <a:pPr>
@@ -14305,15 +14277,7 @@
             </a:pPr>
             <a:r>
               <a:rPr lang="en-US" dirty="0"/>
-              <a:t>Built </a:t>
-            </a:r>
-            <a:r>
-              <a:rPr lang="x-none" dirty="0"/>
-              <a:t>to address the shortcomings of Hadoop</a:t>
-            </a:r>
-            <a:r>
-              <a:rPr lang="en-US" dirty="0"/>
-              <a:t>.</a:t>
+              <a:t>Help in distributed processing of large data sets across clusters of computers</a:t>
             </a:r>
           </a:p>
           <a:p>
@@ -14323,7 +14287,7 @@
             </a:pPr>
             <a:r>
               <a:rPr lang="en-US" dirty="0"/>
-              <a:t>Apache Spark achieves high performance for both batch and streaming data.</a:t>
+              <a:t>Two method to start single node or cluster mode</a:t>
             </a:r>
           </a:p>
           <a:p>
@@ -14333,7 +14297,7 @@
             </a:pPr>
             <a:r>
               <a:rPr lang="en-US" dirty="0"/>
-              <a:t>Run workload 100X faster.</a:t>
+              <a:t>Latest stable version is 2.9.2 </a:t>
             </a:r>
           </a:p>
           <a:p>
@@ -14343,78 +14307,15 @@
             </a:pPr>
             <a:r>
               <a:rPr lang="en-US" dirty="0"/>
-              <a:t>Offers over 80 high-level operators that make it easy to build parallel apps.</a:t>
-            </a:r>
-          </a:p>
-          <a:p>
-            <a:pPr>
-              <a:buFont typeface="Wingdings" panose="05000000000000000000" pitchFamily="2" charset="2"/>
-              <a:buChar char="v"/>
-            </a:pPr>
-            <a:r>
-              <a:rPr lang="en-US" dirty="0"/>
-              <a:t> It powers a stack of libraries including SQL </a:t>
-            </a:r>
-            <a:r>
-              <a:rPr lang="en-US"/>
-              <a:t>and Data Frames</a:t>
-            </a:r>
-            <a:r>
-              <a:rPr lang="en-US" dirty="0"/>
-              <a:t>, MLlib for machine learning, GraphX, and Spark Streaming</a:t>
-            </a:r>
-          </a:p>
-          <a:p>
-            <a:pPr>
-              <a:buFont typeface="Wingdings" panose="05000000000000000000" pitchFamily="2" charset="2"/>
-              <a:buChar char="v"/>
-            </a:pPr>
-            <a:r>
-              <a:rPr lang="en-US" dirty="0"/>
-              <a:t>Latest stable version is 2.4.0 with multiple advance features</a:t>
-            </a:r>
-            <a:endParaRPr lang="x-none" dirty="0"/>
-          </a:p>
-        </p:txBody>
-      </p:sp>
-      <p:sp>
-        <p:nvSpPr>
-          <p:cNvPr id="4" name="Title 1">
-            <a:extLst>
-              <a:ext uri="{FF2B5EF4-FFF2-40B4-BE49-F238E27FC236}">
-                <a16:creationId xmlns:a16="http://schemas.microsoft.com/office/drawing/2014/main" xmlns="" id="{D1F22F75-6806-481E-A0D8-FC161C3266D1}"/>
-              </a:ext>
-            </a:extLst>
-          </p:cNvPr>
-          <p:cNvSpPr>
-            <a:spLocks noGrp="1"/>
-          </p:cNvSpPr>
-          <p:nvPr>
-            <p:ph type="title"/>
-          </p:nvPr>
-        </p:nvSpPr>
-        <p:spPr>
-          <a:xfrm>
-            <a:off x="1096963" y="287338"/>
-            <a:ext cx="10058400" cy="1449387"/>
-          </a:xfrm>
-        </p:spPr>
-        <p:txBody>
-          <a:bodyPr/>
-          <a:lstStyle/>
-          <a:p>
-            <a:r>
-              <a:rPr lang="en-US" dirty="0"/>
-              <a:t>Big Data: Tools</a:t>
-            </a:r>
-            <a:endParaRPr lang="x-none" dirty="0"/>
+              <a:t>Few Important features are HDFS, YARN,MAPREDUCE, cost efficient, Hadoop libraries and many more</a:t>
+            </a:r>
           </a:p>
         </p:txBody>
       </p:sp>
     </p:spTree>
     <p:extLst>
       <p:ext uri="{BB962C8B-B14F-4D97-AF65-F5344CB8AC3E}">
-        <p14:creationId xmlns:p14="http://schemas.microsoft.com/office/powerpoint/2010/main" val="2181567895"/>
+        <p14:creationId xmlns:p14="http://schemas.microsoft.com/office/powerpoint/2010/main" val="2845727905"/>
       </p:ext>
     </p:extLst>
   </p:cSld>
@@ -14443,7 +14344,131 @@
       </p:grpSpPr>
       <p:sp>
         <p:nvSpPr>
-          <p:cNvPr id="2" name="Title 1"/>
+          <p:cNvPr id="3" name="Content Placeholder 2">
+            <a:extLst>
+              <a:ext uri="{FF2B5EF4-FFF2-40B4-BE49-F238E27FC236}">
+                <a16:creationId xmlns="" xmlns:a16="http://schemas.microsoft.com/office/drawing/2014/main" id="{12CE7563-67E4-470C-A76A-FD376D4C2471}"/>
+              </a:ext>
+            </a:extLst>
+          </p:cNvPr>
+          <p:cNvSpPr>
+            <a:spLocks noGrp="1"/>
+          </p:cNvSpPr>
+          <p:nvPr>
+            <p:ph idx="1"/>
+          </p:nvPr>
+        </p:nvSpPr>
+        <p:spPr/>
+        <p:txBody>
+          <a:bodyPr>
+            <a:normAutofit/>
+          </a:bodyPr>
+          <a:lstStyle/>
+          <a:p>
+            <a:r>
+              <a:rPr lang="en-US" sz="3200" dirty="0"/>
+              <a:t>SPARK</a:t>
+            </a:r>
+          </a:p>
+          <a:p>
+            <a:pPr>
+              <a:buFont typeface="Wingdings" panose="05000000000000000000" pitchFamily="2" charset="2"/>
+              <a:buChar char="v"/>
+            </a:pPr>
+            <a:r>
+              <a:rPr lang="x-none" dirty="0"/>
+              <a:t>Apache Spark is the alternative — and in many aspects the successor — of Apache Hadoop. </a:t>
+            </a:r>
+            <a:endParaRPr lang="en-US" dirty="0"/>
+          </a:p>
+          <a:p>
+            <a:pPr>
+              <a:buFont typeface="Wingdings" panose="05000000000000000000" pitchFamily="2" charset="2"/>
+              <a:buChar char="v"/>
+            </a:pPr>
+            <a:r>
+              <a:rPr lang="en-US" dirty="0"/>
+              <a:t>Built </a:t>
+            </a:r>
+            <a:r>
+              <a:rPr lang="x-none" dirty="0"/>
+              <a:t>to address the shortcomings of Hadoop</a:t>
+            </a:r>
+            <a:r>
+              <a:rPr lang="en-US" dirty="0"/>
+              <a:t>.</a:t>
+            </a:r>
+          </a:p>
+          <a:p>
+            <a:pPr>
+              <a:buFont typeface="Wingdings" panose="05000000000000000000" pitchFamily="2" charset="2"/>
+              <a:buChar char="v"/>
+            </a:pPr>
+            <a:r>
+              <a:rPr lang="en-US" dirty="0"/>
+              <a:t>Apache Spark achieves high performance for both batch and streaming data.</a:t>
+            </a:r>
+          </a:p>
+          <a:p>
+            <a:pPr>
+              <a:buFont typeface="Wingdings" panose="05000000000000000000" pitchFamily="2" charset="2"/>
+              <a:buChar char="v"/>
+            </a:pPr>
+            <a:r>
+              <a:rPr lang="en-US" dirty="0"/>
+              <a:t>Run workload 100X faster.</a:t>
+            </a:r>
+          </a:p>
+          <a:p>
+            <a:pPr>
+              <a:buFont typeface="Wingdings" panose="05000000000000000000" pitchFamily="2" charset="2"/>
+              <a:buChar char="v"/>
+            </a:pPr>
+            <a:r>
+              <a:rPr lang="en-US" dirty="0"/>
+              <a:t>Offers over 80 high-level operators that make it easy to build parallel apps.</a:t>
+            </a:r>
+          </a:p>
+          <a:p>
+            <a:pPr>
+              <a:buFont typeface="Wingdings" panose="05000000000000000000" pitchFamily="2" charset="2"/>
+              <a:buChar char="v"/>
+            </a:pPr>
+            <a:r>
+              <a:rPr lang="en-US" dirty="0"/>
+              <a:t> It powers a stack of libraries including SQL </a:t>
+            </a:r>
+            <a:r>
+              <a:rPr lang="en-US"/>
+              <a:t>and Data Frames</a:t>
+            </a:r>
+            <a:r>
+              <a:rPr lang="en-US" dirty="0"/>
+              <a:t>, MLlib for machine learning, GraphX, and Spark Streaming</a:t>
+            </a:r>
+          </a:p>
+          <a:p>
+            <a:pPr>
+              <a:buFont typeface="Wingdings" panose="05000000000000000000" pitchFamily="2" charset="2"/>
+              <a:buChar char="v"/>
+            </a:pPr>
+            <a:r>
+              <a:rPr lang="en-US" dirty="0"/>
+              <a:t>Latest stable version is 2.4.0 with multiple advance features</a:t>
+            </a:r>
+            <a:endParaRPr lang="x-none" dirty="0"/>
+          </a:p>
+        </p:txBody>
+      </p:sp>
+      <p:sp>
+        <p:nvSpPr>
+          <p:cNvPr id="4" name="Title 1">
+            <a:extLst>
+              <a:ext uri="{FF2B5EF4-FFF2-40B4-BE49-F238E27FC236}">
+                <a16:creationId xmlns="" xmlns:a16="http://schemas.microsoft.com/office/drawing/2014/main" id="{D1F22F75-6806-481E-A0D8-FC161C3266D1}"/>
+              </a:ext>
+            </a:extLst>
+          </p:cNvPr>
           <p:cNvSpPr>
             <a:spLocks noGrp="1"/>
           </p:cNvSpPr>
@@ -14451,68 +14476,28 @@
             <p:ph type="title"/>
           </p:nvPr>
         </p:nvSpPr>
-        <p:spPr/>
+        <p:spPr>
+          <a:xfrm>
+            <a:off x="1096963" y="287338"/>
+            <a:ext cx="10058400" cy="1449387"/>
+          </a:xfrm>
+        </p:spPr>
         <p:txBody>
           <a:bodyPr/>
           <a:lstStyle/>
           <a:p>
-            <a:pPr algn="ctr"/>
-            <a:r>
-              <a:rPr lang="en-US" dirty="0" smtClean="0"/>
-              <a:t>ALGORITHM</a:t>
-            </a:r>
-            <a:endParaRPr lang="en-US" dirty="0"/>
-          </a:p>
-        </p:txBody>
-      </p:sp>
-      <p:sp>
-        <p:nvSpPr>
-          <p:cNvPr id="3" name="Text Placeholder 2"/>
-          <p:cNvSpPr>
-            <a:spLocks noGrp="1"/>
-          </p:cNvSpPr>
-          <p:nvPr>
-            <p:ph type="body" idx="1"/>
-          </p:nvPr>
-        </p:nvSpPr>
-        <p:spPr/>
-        <p:txBody>
-          <a:bodyPr/>
-          <a:lstStyle/>
-          <a:p>
-            <a:pPr algn="ctr"/>
-            <a:r>
-              <a:rPr lang="en-US" dirty="0" smtClean="0"/>
-              <a:t>Does, USED</a:t>
-            </a:r>
-            <a:r>
-              <a:rPr lang="en-US" smtClean="0"/>
-              <a:t>, Classification, </a:t>
-            </a:r>
             <a:r>
               <a:rPr lang="en-US" dirty="0"/>
-              <a:t>for </a:t>
-            </a:r>
-            <a:r>
-              <a:rPr lang="en-US" dirty="0" smtClean="0"/>
-              <a:t>DM, Da</a:t>
-            </a:r>
-            <a:r>
-              <a:rPr lang="en-US" dirty="0"/>
-              <a:t>, </a:t>
-            </a:r>
-            <a:r>
-              <a:rPr lang="en-US" dirty="0" smtClean="0"/>
-              <a:t>BD</a:t>
-            </a:r>
-            <a:endParaRPr lang="en-US" dirty="0"/>
+              <a:t>Big Data: Tools</a:t>
+            </a:r>
+            <a:endParaRPr lang="x-none" dirty="0"/>
           </a:p>
         </p:txBody>
       </p:sp>
     </p:spTree>
     <p:extLst>
       <p:ext uri="{BB962C8B-B14F-4D97-AF65-F5344CB8AC3E}">
-        <p14:creationId xmlns:p14="http://schemas.microsoft.com/office/powerpoint/2010/main" val="2204207379"/>
+        <p14:creationId xmlns:p14="http://schemas.microsoft.com/office/powerpoint/2010/main" val="2181567895"/>
       </p:ext>
     </p:extLst>
   </p:cSld>
@@ -14642,7 +14627,7 @@
       </p:grpSpPr>
       <p:sp>
         <p:nvSpPr>
-          <p:cNvPr id="4" name="Title 3"/>
+          <p:cNvPr id="2" name="Title 1"/>
           <p:cNvSpPr>
             <a:spLocks noGrp="1"/>
           </p:cNvSpPr>
@@ -14655,9 +14640,10 @@
           <a:bodyPr/>
           <a:lstStyle/>
           <a:p>
+            <a:pPr algn="ctr"/>
             <a:r>
               <a:rPr lang="en-US" dirty="0" smtClean="0"/>
-              <a:t>Algorithm</a:t>
+              <a:t>ALGORITHM</a:t>
             </a:r>
             <a:endParaRPr lang="en-US" dirty="0"/>
           </a:p>
@@ -14665,12 +14651,12 @@
       </p:sp>
       <p:sp>
         <p:nvSpPr>
-          <p:cNvPr id="5" name="Content Placeholder 4"/>
+          <p:cNvPr id="3" name="Text Placeholder 2"/>
           <p:cNvSpPr>
             <a:spLocks noGrp="1"/>
           </p:cNvSpPr>
           <p:nvPr>
-            <p:ph idx="1"/>
+            <p:ph type="body" idx="1"/>
           </p:nvPr>
         </p:nvSpPr>
         <p:spPr/>
@@ -14678,60 +14664,39 @@
           <a:bodyPr/>
           <a:lstStyle/>
           <a:p>
-            <a:r>
-              <a:rPr lang="en-US" sz="3200" b="1" dirty="0"/>
-              <a:t>DEFINITION</a:t>
-            </a:r>
-          </a:p>
-          <a:p>
+            <a:pPr algn="ctr"/>
             <a:r>
               <a:rPr lang="en-US" dirty="0" smtClean="0"/>
-              <a:t>In </a:t>
+              <a:t>Does, USED</a:t>
+            </a:r>
+            <a:r>
+              <a:rPr lang="en-US" smtClean="0"/>
+              <a:t>, Classification, </a:t>
             </a:r>
             <a:r>
               <a:rPr lang="en-US" dirty="0"/>
-              <a:t>mathematics and computer science, an algorithm is an unambiguous specification of how to solve a </a:t>
+              <a:t>for </a:t>
             </a:r>
             <a:r>
               <a:rPr lang="en-US" dirty="0" smtClean="0"/>
-              <a:t>class of problems.</a:t>
-            </a:r>
-          </a:p>
-          <a:p>
-            <a:pPr algn="ctr"/>
+              <a:t>DM, Da</a:t>
+            </a:r>
+            <a:r>
+              <a:rPr lang="en-US" dirty="0"/>
+              <a:t>, </a:t>
+            </a:r>
             <a:r>
               <a:rPr lang="en-US" dirty="0" smtClean="0"/>
-              <a:t>Or</a:t>
-            </a:r>
-          </a:p>
-          <a:p>
-            <a:r>
-              <a:rPr lang="en-US" dirty="0" smtClean="0"/>
-              <a:t>It is </a:t>
-            </a:r>
-            <a:r>
-              <a:rPr lang="en-US" dirty="0"/>
-              <a:t>a procedure or formula for solving a problem, based on </a:t>
-            </a:r>
-            <a:r>
-              <a:rPr lang="en-US" dirty="0" smtClean="0"/>
-              <a:t>sequence </a:t>
-            </a:r>
-            <a:r>
-              <a:rPr lang="en-US" dirty="0"/>
-              <a:t>of specified actions</a:t>
-            </a:r>
-            <a:r>
-              <a:rPr lang="en-US" dirty="0" smtClean="0"/>
-              <a:t>.</a:t>
-            </a:r>
+              <a:t>BD</a:t>
+            </a:r>
+            <a:endParaRPr lang="en-US" dirty="0"/>
           </a:p>
         </p:txBody>
       </p:sp>
     </p:spTree>
     <p:extLst>
       <p:ext uri="{BB962C8B-B14F-4D97-AF65-F5344CB8AC3E}">
-        <p14:creationId xmlns:p14="http://schemas.microsoft.com/office/powerpoint/2010/main" val="494284243"/>
+        <p14:creationId xmlns:p14="http://schemas.microsoft.com/office/powerpoint/2010/main" val="2204207379"/>
       </p:ext>
     </p:extLst>
   </p:cSld>
@@ -14760,7 +14725,7 @@
       </p:grpSpPr>
       <p:sp>
         <p:nvSpPr>
-          <p:cNvPr id="2" name="Title 1"/>
+          <p:cNvPr id="4" name="Title 3"/>
           <p:cNvSpPr>
             <a:spLocks noGrp="1"/>
           </p:cNvSpPr>
@@ -14775,7 +14740,7 @@
           <a:p>
             <a:r>
               <a:rPr lang="en-US" dirty="0" smtClean="0"/>
-              <a:t>Algorithm: DOES and USED </a:t>
+              <a:t>Algorithm</a:t>
             </a:r>
             <a:endParaRPr lang="en-US" dirty="0"/>
           </a:p>
@@ -14783,7 +14748,7 @@
       </p:sp>
       <p:sp>
         <p:nvSpPr>
-          <p:cNvPr id="3" name="Content Placeholder 2"/>
+          <p:cNvPr id="5" name="Content Placeholder 4"/>
           <p:cNvSpPr>
             <a:spLocks noGrp="1"/>
           </p:cNvSpPr>
@@ -14793,133 +14758,63 @@
         </p:nvSpPr>
         <p:spPr/>
         <p:txBody>
-          <a:bodyPr>
-            <a:normAutofit fontScale="85000" lnSpcReduction="20000"/>
-          </a:bodyPr>
+          <a:bodyPr/>
           <a:lstStyle/>
           <a:p>
-            <a:pPr marL="58738" indent="0">
-              <a:buNone/>
-            </a:pPr>
-            <a:r>
-              <a:rPr lang="en-US" b="1" dirty="0" smtClean="0"/>
-              <a:t>WHAT IT DOES?</a:t>
-            </a:r>
+            <a:r>
+              <a:rPr lang="en-US" sz="3200" b="1" dirty="0"/>
+              <a:t>DEFINITION</a:t>
+            </a:r>
+          </a:p>
+          <a:p>
             <a:r>
               <a:rPr lang="en-US" dirty="0" smtClean="0"/>
-              <a:t> </a:t>
-            </a:r>
-          </a:p>
-          <a:p>
-            <a:pPr marL="58738" indent="0">
-              <a:buFont typeface="Wingdings" panose="05000000000000000000" pitchFamily="2" charset="2"/>
-              <a:buChar char="v"/>
-            </a:pPr>
+              <a:t>In </a:t>
+            </a:r>
+            <a:r>
+              <a:rPr lang="en-US" dirty="0"/>
+              <a:t>mathematics and computer science, an algorithm is an unambiguous specification of how to solve a </a:t>
+            </a:r>
             <a:r>
               <a:rPr lang="en-US" dirty="0" smtClean="0"/>
-              <a:t> Follow instructions code </a:t>
-            </a:r>
-          </a:p>
-          <a:p>
-            <a:pPr marL="58738" indent="0">
-              <a:buFont typeface="Wingdings" panose="05000000000000000000" pitchFamily="2" charset="2"/>
-              <a:buChar char="v"/>
-            </a:pPr>
+              <a:t>class of problems.</a:t>
+            </a:r>
+          </a:p>
+          <a:p>
+            <a:pPr algn="ctr"/>
+            <a:r>
+              <a:rPr lang="en-US" dirty="0" smtClean="0"/>
+              <a:t>Or</a:t>
+            </a:r>
+          </a:p>
+          <a:p>
+            <a:r>
+              <a:rPr lang="en-US" dirty="0" smtClean="0"/>
+              <a:t>It is </a:t>
+            </a:r>
             <a:r>
               <a:rPr lang="en-US" dirty="0"/>
-              <a:t> </a:t>
+              <a:t>a procedure or formula for solving a problem, based on </a:t>
             </a:r>
             <a:r>
               <a:rPr lang="en-US" dirty="0" smtClean="0"/>
-              <a:t>Calculation (Logical/Mathematical)</a:t>
-            </a:r>
-          </a:p>
-          <a:p>
-            <a:pPr marL="58738" indent="0">
-              <a:buFont typeface="Wingdings" panose="05000000000000000000" pitchFamily="2" charset="2"/>
-              <a:buChar char="v"/>
-            </a:pPr>
+              <a:t>sequence </a:t>
+            </a:r>
+            <a:r>
+              <a:rPr lang="en-US" dirty="0"/>
+              <a:t>of specified actions</a:t>
+            </a:r>
             <a:r>
               <a:rPr lang="en-US" dirty="0" smtClean="0"/>
-              <a:t> Data Manipulation</a:t>
-            </a:r>
-          </a:p>
-          <a:p>
-            <a:pPr marL="58738" indent="0">
-              <a:buFont typeface="Wingdings" panose="05000000000000000000" pitchFamily="2" charset="2"/>
-              <a:buChar char="v"/>
-            </a:pPr>
-            <a:r>
-              <a:rPr lang="en-US" dirty="0" smtClean="0"/>
-              <a:t> Data Processing</a:t>
-            </a:r>
-          </a:p>
-          <a:p>
-            <a:pPr marL="58738" indent="0">
-              <a:buNone/>
-            </a:pPr>
-            <a:r>
-              <a:rPr lang="en-US" b="1" dirty="0" smtClean="0"/>
-              <a:t> IT IS USED FOR</a:t>
-            </a:r>
-          </a:p>
-          <a:p>
-            <a:pPr marL="115888" indent="-57150">
-              <a:buFont typeface="Wingdings" panose="05000000000000000000" pitchFamily="2" charset="2"/>
-              <a:buChar char="v"/>
-            </a:pPr>
-            <a:r>
-              <a:rPr lang="en-US" dirty="0" smtClean="0"/>
-              <a:t> Searching</a:t>
-            </a:r>
-          </a:p>
-          <a:p>
-            <a:pPr marL="115888" indent="-57150">
-              <a:buFont typeface="Wingdings" panose="05000000000000000000" pitchFamily="2" charset="2"/>
-              <a:buChar char="v"/>
-            </a:pPr>
-            <a:r>
-              <a:rPr lang="en-US" dirty="0" smtClean="0"/>
-              <a:t> Sorting</a:t>
-            </a:r>
-          </a:p>
-          <a:p>
-            <a:pPr marL="115888" indent="-57150">
-              <a:buFont typeface="Wingdings" panose="05000000000000000000" pitchFamily="2" charset="2"/>
-              <a:buChar char="v"/>
-            </a:pPr>
-            <a:r>
-              <a:rPr lang="en-US" dirty="0" smtClean="0"/>
-              <a:t> Scheduling</a:t>
-            </a:r>
-          </a:p>
-          <a:p>
-            <a:pPr marL="115888" indent="-57150">
-              <a:buFont typeface="Wingdings" panose="05000000000000000000" pitchFamily="2" charset="2"/>
-              <a:buChar char="v"/>
-            </a:pPr>
-            <a:r>
-              <a:rPr lang="en-US" dirty="0" smtClean="0"/>
-              <a:t> Automated Reasoning</a:t>
-            </a:r>
-          </a:p>
-          <a:p>
-            <a:pPr marL="115888" indent="-57150">
-              <a:buFont typeface="Wingdings" panose="05000000000000000000" pitchFamily="2" charset="2"/>
-              <a:buChar char="v"/>
-            </a:pPr>
-            <a:r>
-              <a:rPr lang="en-US" dirty="0" smtClean="0"/>
-              <a:t> Automate Operations/Tasks</a:t>
-            </a:r>
-            <a:endParaRPr lang="en-US" dirty="0"/>
+              <a:t>.</a:t>
+            </a:r>
           </a:p>
         </p:txBody>
       </p:sp>
     </p:spTree>
     <p:extLst>
       <p:ext uri="{BB962C8B-B14F-4D97-AF65-F5344CB8AC3E}">
-        <p14:creationId xmlns:p14="http://schemas.microsoft.com/office/powerpoint/2010/main" val="416887670"/>
+        <p14:creationId xmlns:p14="http://schemas.microsoft.com/office/powerpoint/2010/main" val="494284243"/>
       </p:ext>
     </p:extLst>
   </p:cSld>
@@ -14963,7 +14858,7 @@
           <a:p>
             <a:r>
               <a:rPr lang="en-US" dirty="0" smtClean="0"/>
-              <a:t>Algorithm: Classification</a:t>
+              <a:t>Algorithm: DOES and USED </a:t>
             </a:r>
             <a:endParaRPr lang="en-US" dirty="0"/>
           </a:p>
@@ -14982,206 +14877,132 @@
         <p:spPr/>
         <p:txBody>
           <a:bodyPr>
-            <a:normAutofit/>
+            <a:normAutofit fontScale="85000" lnSpcReduction="20000"/>
           </a:bodyPr>
           <a:lstStyle/>
           <a:p>
-            <a:pPr marL="0" indent="0">
+            <a:pPr marL="58738" indent="0">
               <a:buNone/>
             </a:pPr>
             <a:r>
+              <a:rPr lang="en-US" b="1" dirty="0" smtClean="0"/>
+              <a:t>WHAT IT DOES?</a:t>
+            </a:r>
+            <a:r>
               <a:rPr lang="en-US" dirty="0" smtClean="0"/>
-              <a:t>Algorithms have widespread range, almost in every expect of study and life. </a:t>
-            </a:r>
+              <a:t> </a:t>
+            </a:r>
+          </a:p>
+          <a:p>
+            <a:pPr marL="58738" indent="0">
+              <a:buFont typeface="Wingdings" panose="05000000000000000000" pitchFamily="2" charset="2"/>
+              <a:buChar char="v"/>
+            </a:pPr>
+            <a:r>
+              <a:rPr lang="en-US" dirty="0" smtClean="0"/>
+              <a:t> Follow instructions code </a:t>
+            </a:r>
+          </a:p>
+          <a:p>
+            <a:pPr marL="58738" indent="0">
+              <a:buFont typeface="Wingdings" panose="05000000000000000000" pitchFamily="2" charset="2"/>
+              <a:buChar char="v"/>
+            </a:pPr>
             <a:r>
               <a:rPr lang="en-US" dirty="0"/>
-              <a:t>H</a:t>
+              <a:t> </a:t>
             </a:r>
             <a:r>
               <a:rPr lang="en-US" dirty="0" smtClean="0"/>
-              <a:t>ere only concern with the Statistical/Computational statistics, </a:t>
-            </a:r>
-            <a:r>
-              <a:rPr lang="en-US" dirty="0"/>
-              <a:t>Data mining, </a:t>
-            </a:r>
+              <a:t>Calculation (Logical/Mathematical)</a:t>
+            </a:r>
+          </a:p>
+          <a:p>
+            <a:pPr marL="58738" indent="0">
+              <a:buFont typeface="Wingdings" panose="05000000000000000000" pitchFamily="2" charset="2"/>
+              <a:buChar char="v"/>
+            </a:pPr>
             <a:r>
               <a:rPr lang="en-US" dirty="0" smtClean="0"/>
-              <a:t>Machine </a:t>
-            </a:r>
-            <a:r>
-              <a:rPr lang="en-US" dirty="0"/>
-              <a:t>learning </a:t>
-            </a:r>
+              <a:t> Data Manipulation</a:t>
+            </a:r>
+          </a:p>
+          <a:p>
+            <a:pPr marL="58738" indent="0">
+              <a:buFont typeface="Wingdings" panose="05000000000000000000" pitchFamily="2" charset="2"/>
+              <a:buChar char="v"/>
+            </a:pPr>
             <a:r>
               <a:rPr lang="en-US" dirty="0" smtClean="0"/>
-              <a:t>algorithms. These classified as:</a:t>
-            </a:r>
-          </a:p>
-          <a:p>
-            <a:pPr marL="566738" indent="-457200">
-              <a:buFont typeface="+mj-lt"/>
-              <a:buAutoNum type="arabicPeriod"/>
+              <a:t> Data Processing</a:t>
+            </a:r>
+          </a:p>
+          <a:p>
+            <a:pPr marL="58738" indent="0">
+              <a:buNone/>
             </a:pPr>
             <a:r>
+              <a:rPr lang="en-US" b="1" dirty="0" smtClean="0"/>
+              <a:t> IT IS USED FOR</a:t>
+            </a:r>
+          </a:p>
+          <a:p>
+            <a:pPr marL="115888" indent="-57150">
+              <a:buFont typeface="Wingdings" panose="05000000000000000000" pitchFamily="2" charset="2"/>
+              <a:buChar char="v"/>
+            </a:pPr>
+            <a:r>
               <a:rPr lang="en-US" dirty="0" smtClean="0"/>
-              <a:t>Supervised Learning</a:t>
-            </a:r>
-            <a:r>
-              <a:rPr lang="en-US" dirty="0"/>
-              <a:t/>
-            </a:r>
-            <a:br>
-              <a:rPr lang="en-US" dirty="0"/>
-            </a:br>
-            <a:r>
-              <a:rPr lang="en-US" sz="1400" b="1" dirty="0" err="1" smtClean="0"/>
-              <a:t>e.g</a:t>
-            </a:r>
-            <a:r>
-              <a:rPr lang="en-US" sz="1400" b="1" dirty="0" smtClean="0"/>
-              <a:t>:</a:t>
-            </a:r>
-            <a:r>
-              <a:rPr lang="en-US" sz="1400" dirty="0" smtClean="0"/>
-              <a:t> Nearest </a:t>
-            </a:r>
-            <a:r>
-              <a:rPr lang="en-US" sz="1400" dirty="0"/>
-              <a:t>Neighbor, Naive Bayes, Decision Trees, Linear Regression, Support Vector Machines (SVM), Neural </a:t>
-            </a:r>
-            <a:r>
-              <a:rPr lang="en-US" sz="1400" dirty="0" smtClean="0"/>
-              <a:t>Networks</a:t>
-            </a:r>
-            <a:endParaRPr lang="en-US" dirty="0" smtClean="0"/>
-          </a:p>
-          <a:p>
-            <a:pPr marL="566738" indent="-457200">
-              <a:buFont typeface="+mj-lt"/>
-              <a:buAutoNum type="arabicPeriod"/>
+              <a:t> Searching</a:t>
+            </a:r>
+          </a:p>
+          <a:p>
+            <a:pPr marL="115888" indent="-57150">
+              <a:buFont typeface="Wingdings" panose="05000000000000000000" pitchFamily="2" charset="2"/>
+              <a:buChar char="v"/>
             </a:pPr>
             <a:r>
               <a:rPr lang="en-US" dirty="0" smtClean="0"/>
-              <a:t>Unsupervised Learning</a:t>
-            </a:r>
-            <a:r>
-              <a:rPr lang="en-US" dirty="0"/>
-              <a:t/>
-            </a:r>
-            <a:br>
-              <a:rPr lang="en-US" dirty="0"/>
-            </a:br>
-            <a:r>
-              <a:rPr lang="en-US" sz="1400" b="1" dirty="0" err="1"/>
-              <a:t>e.g</a:t>
-            </a:r>
-            <a:r>
-              <a:rPr lang="en-US" sz="1400" b="1" dirty="0"/>
-              <a:t>:</a:t>
-            </a:r>
-            <a:r>
-              <a:rPr lang="en-US" sz="1400" dirty="0"/>
-              <a:t> </a:t>
-            </a:r>
-            <a:r>
-              <a:rPr lang="en-US" sz="1400" dirty="0" smtClean="0"/>
-              <a:t>k-means </a:t>
-            </a:r>
-            <a:r>
-              <a:rPr lang="en-US" sz="1400" dirty="0"/>
-              <a:t>clustering, Association </a:t>
-            </a:r>
-            <a:r>
-              <a:rPr lang="en-US" sz="1400" dirty="0" smtClean="0"/>
-              <a:t>Rules, </a:t>
-            </a:r>
-            <a:r>
-              <a:rPr lang="en-US" sz="1400" dirty="0"/>
-              <a:t>mixture </a:t>
-            </a:r>
-            <a:r>
-              <a:rPr lang="en-US" sz="1400" dirty="0" smtClean="0"/>
-              <a:t>models, </a:t>
-            </a:r>
-            <a:r>
-              <a:rPr lang="en-US" sz="1400" dirty="0"/>
-              <a:t>Self-organizing </a:t>
-            </a:r>
-            <a:r>
-              <a:rPr lang="en-US" sz="1400" dirty="0" smtClean="0"/>
-              <a:t>map, </a:t>
-            </a:r>
-            <a:r>
-              <a:rPr lang="en-US" sz="1400" dirty="0"/>
-              <a:t>Expectation–maximization algorithm (EM)</a:t>
-            </a:r>
-          </a:p>
-          <a:p>
-            <a:pPr marL="566738" indent="-457200">
-              <a:buFont typeface="+mj-lt"/>
-              <a:buAutoNum type="arabicPeriod"/>
+              <a:t> Sorting</a:t>
+            </a:r>
+          </a:p>
+          <a:p>
+            <a:pPr marL="115888" indent="-57150">
+              <a:buFont typeface="Wingdings" panose="05000000000000000000" pitchFamily="2" charset="2"/>
+              <a:buChar char="v"/>
             </a:pPr>
             <a:r>
               <a:rPr lang="en-US" dirty="0" smtClean="0"/>
-              <a:t>Semi-Supervised Learning</a:t>
-            </a:r>
-            <a:br>
+              <a:t> Scheduling</a:t>
+            </a:r>
+          </a:p>
+          <a:p>
+            <a:pPr marL="115888" indent="-57150">
+              <a:buFont typeface="Wingdings" panose="05000000000000000000" pitchFamily="2" charset="2"/>
+              <a:buChar char="v"/>
+            </a:pPr>
+            <a:r>
               <a:rPr lang="en-US" dirty="0" smtClean="0"/>
-            </a:br>
-            <a:r>
-              <a:rPr lang="en-US" sz="1400" b="1" dirty="0" err="1"/>
-              <a:t>e.g</a:t>
-            </a:r>
-            <a:r>
-              <a:rPr lang="en-US" sz="1400" b="1" dirty="0"/>
-              <a:t>: </a:t>
-            </a:r>
-            <a:r>
-              <a:rPr lang="en-US" sz="1400" dirty="0"/>
-              <a:t>Generative method, Low-density separation method, Graph-based method, Heuristic method</a:t>
-            </a:r>
-          </a:p>
-          <a:p>
-            <a:pPr marL="566738" indent="-457200">
-              <a:buFont typeface="+mj-lt"/>
-              <a:buAutoNum type="arabicPeriod"/>
+              <a:t> Automated Reasoning</a:t>
+            </a:r>
+          </a:p>
+          <a:p>
+            <a:pPr marL="115888" indent="-57150">
+              <a:buFont typeface="Wingdings" panose="05000000000000000000" pitchFamily="2" charset="2"/>
+              <a:buChar char="v"/>
             </a:pPr>
             <a:r>
               <a:rPr lang="en-US" dirty="0" smtClean="0"/>
-              <a:t>Reinforcement Learning</a:t>
-            </a:r>
-            <a:br>
-              <a:rPr lang="en-US" dirty="0" smtClean="0"/>
-            </a:br>
-            <a:r>
-              <a:rPr lang="en-US" sz="1400" b="1" dirty="0" err="1"/>
-              <a:t>e.g</a:t>
-            </a:r>
-            <a:r>
-              <a:rPr lang="en-US" sz="1400" b="1" dirty="0"/>
-              <a:t>: </a:t>
-            </a:r>
-            <a:r>
-              <a:rPr lang="en-US" sz="1400" dirty="0" smtClean="0"/>
-              <a:t>Monte </a:t>
-            </a:r>
-            <a:r>
-              <a:rPr lang="en-US" sz="1400" dirty="0"/>
-              <a:t>Carlo, Q-learning, SARSA, DQN, A3C, NAF, PPO, </a:t>
-            </a:r>
-            <a:r>
-              <a:rPr lang="en-US" sz="1400" dirty="0" smtClean="0"/>
-              <a:t>TRPO</a:t>
-            </a:r>
-            <a:endParaRPr lang="en-US" sz="1400" dirty="0"/>
+              <a:t> Automate Operations/Tasks</a:t>
+            </a:r>
+            <a:endParaRPr lang="en-US" dirty="0"/>
           </a:p>
         </p:txBody>
       </p:sp>
     </p:spTree>
     <p:extLst>
       <p:ext uri="{BB962C8B-B14F-4D97-AF65-F5344CB8AC3E}">
-        <p14:creationId xmlns:p14="http://schemas.microsoft.com/office/powerpoint/2010/main" val="1870692302"/>
+        <p14:creationId xmlns:p14="http://schemas.microsoft.com/office/powerpoint/2010/main" val="416887670"/>
       </p:ext>
     </p:extLst>
   </p:cSld>
@@ -15225,6 +15046,268 @@
           <a:p>
             <a:r>
               <a:rPr lang="en-US" dirty="0" smtClean="0"/>
+              <a:t>Algorithm: Classification</a:t>
+            </a:r>
+            <a:endParaRPr lang="en-US" dirty="0"/>
+          </a:p>
+        </p:txBody>
+      </p:sp>
+      <p:sp>
+        <p:nvSpPr>
+          <p:cNvPr id="3" name="Content Placeholder 2"/>
+          <p:cNvSpPr>
+            <a:spLocks noGrp="1"/>
+          </p:cNvSpPr>
+          <p:nvPr>
+            <p:ph idx="1"/>
+          </p:nvPr>
+        </p:nvSpPr>
+        <p:spPr/>
+        <p:txBody>
+          <a:bodyPr>
+            <a:normAutofit/>
+          </a:bodyPr>
+          <a:lstStyle/>
+          <a:p>
+            <a:pPr marL="0" indent="0">
+              <a:buNone/>
+            </a:pPr>
+            <a:r>
+              <a:rPr lang="en-US" dirty="0" smtClean="0"/>
+              <a:t>Algorithms have widespread range, almost in every expect of study and life. </a:t>
+            </a:r>
+            <a:r>
+              <a:rPr lang="en-US" dirty="0"/>
+              <a:t>H</a:t>
+            </a:r>
+            <a:r>
+              <a:rPr lang="en-US" dirty="0" smtClean="0"/>
+              <a:t>ere only concern with the Statistical/Computational statistics, </a:t>
+            </a:r>
+            <a:r>
+              <a:rPr lang="en-US" dirty="0"/>
+              <a:t>Data mining, </a:t>
+            </a:r>
+            <a:r>
+              <a:rPr lang="en-US" dirty="0" smtClean="0"/>
+              <a:t>Machine </a:t>
+            </a:r>
+            <a:r>
+              <a:rPr lang="en-US" dirty="0"/>
+              <a:t>learning </a:t>
+            </a:r>
+            <a:r>
+              <a:rPr lang="en-US" dirty="0" smtClean="0"/>
+              <a:t>algorithms. These classified as:</a:t>
+            </a:r>
+          </a:p>
+          <a:p>
+            <a:pPr marL="566738" indent="-457200">
+              <a:buFont typeface="+mj-lt"/>
+              <a:buAutoNum type="arabicPeriod"/>
+            </a:pPr>
+            <a:r>
+              <a:rPr lang="en-US" dirty="0" smtClean="0"/>
+              <a:t>Supervised Learning</a:t>
+            </a:r>
+            <a:r>
+              <a:rPr lang="en-US" dirty="0"/>
+              <a:t/>
+            </a:r>
+            <a:br>
+              <a:rPr lang="en-US" dirty="0"/>
+            </a:br>
+            <a:r>
+              <a:rPr lang="en-US" sz="1400" b="1" dirty="0" err="1" smtClean="0"/>
+              <a:t>e.g</a:t>
+            </a:r>
+            <a:r>
+              <a:rPr lang="en-US" sz="1400" b="1" dirty="0" smtClean="0"/>
+              <a:t>:</a:t>
+            </a:r>
+            <a:r>
+              <a:rPr lang="en-US" sz="1400" dirty="0" smtClean="0"/>
+              <a:t> Nearest </a:t>
+            </a:r>
+            <a:r>
+              <a:rPr lang="en-US" sz="1400" dirty="0"/>
+              <a:t>Neighbor, Naive Bayes, Decision Trees, Linear Regression, Support Vector Machines (SVM), Neural </a:t>
+            </a:r>
+            <a:r>
+              <a:rPr lang="en-US" sz="1400" dirty="0" smtClean="0"/>
+              <a:t>Networks</a:t>
+            </a:r>
+            <a:endParaRPr lang="en-US" dirty="0" smtClean="0"/>
+          </a:p>
+          <a:p>
+            <a:pPr marL="566738" indent="-457200">
+              <a:buFont typeface="+mj-lt"/>
+              <a:buAutoNum type="arabicPeriod"/>
+            </a:pPr>
+            <a:r>
+              <a:rPr lang="en-US" dirty="0" smtClean="0"/>
+              <a:t>Unsupervised Learning</a:t>
+            </a:r>
+            <a:r>
+              <a:rPr lang="en-US" dirty="0"/>
+              <a:t/>
+            </a:r>
+            <a:br>
+              <a:rPr lang="en-US" dirty="0"/>
+            </a:br>
+            <a:r>
+              <a:rPr lang="en-US" sz="1400" b="1" dirty="0" err="1"/>
+              <a:t>e.g</a:t>
+            </a:r>
+            <a:r>
+              <a:rPr lang="en-US" sz="1400" b="1" dirty="0"/>
+              <a:t>:</a:t>
+            </a:r>
+            <a:r>
+              <a:rPr lang="en-US" sz="1400" dirty="0"/>
+              <a:t> </a:t>
+            </a:r>
+            <a:r>
+              <a:rPr lang="en-US" sz="1400" dirty="0" smtClean="0"/>
+              <a:t>k-means </a:t>
+            </a:r>
+            <a:r>
+              <a:rPr lang="en-US" sz="1400" dirty="0"/>
+              <a:t>clustering, Association </a:t>
+            </a:r>
+            <a:r>
+              <a:rPr lang="en-US" sz="1400" dirty="0" smtClean="0"/>
+              <a:t>Rules, </a:t>
+            </a:r>
+            <a:r>
+              <a:rPr lang="en-US" sz="1400" dirty="0"/>
+              <a:t>mixture </a:t>
+            </a:r>
+            <a:r>
+              <a:rPr lang="en-US" sz="1400" dirty="0" smtClean="0"/>
+              <a:t>models, </a:t>
+            </a:r>
+            <a:r>
+              <a:rPr lang="en-US" sz="1400" dirty="0"/>
+              <a:t>Self-organizing </a:t>
+            </a:r>
+            <a:r>
+              <a:rPr lang="en-US" sz="1400" dirty="0" smtClean="0"/>
+              <a:t>map, </a:t>
+            </a:r>
+            <a:r>
+              <a:rPr lang="en-US" sz="1400" dirty="0"/>
+              <a:t>Expectation–maximization algorithm (EM)</a:t>
+            </a:r>
+          </a:p>
+          <a:p>
+            <a:pPr marL="566738" indent="-457200">
+              <a:buFont typeface="+mj-lt"/>
+              <a:buAutoNum type="arabicPeriod"/>
+            </a:pPr>
+            <a:r>
+              <a:rPr lang="en-US" dirty="0" smtClean="0"/>
+              <a:t>Semi-Supervised Learning</a:t>
+            </a:r>
+            <a:br>
+              <a:rPr lang="en-US" dirty="0" smtClean="0"/>
+            </a:br>
+            <a:r>
+              <a:rPr lang="en-US" sz="1400" b="1" dirty="0" err="1"/>
+              <a:t>e.g</a:t>
+            </a:r>
+            <a:r>
+              <a:rPr lang="en-US" sz="1400" b="1" dirty="0"/>
+              <a:t>: </a:t>
+            </a:r>
+            <a:r>
+              <a:rPr lang="en-US" sz="1400" dirty="0"/>
+              <a:t>Generative method, Low-density separation method, Graph-based method, Heuristic method</a:t>
+            </a:r>
+          </a:p>
+          <a:p>
+            <a:pPr marL="566738" indent="-457200">
+              <a:buFont typeface="+mj-lt"/>
+              <a:buAutoNum type="arabicPeriod"/>
+            </a:pPr>
+            <a:r>
+              <a:rPr lang="en-US" dirty="0" smtClean="0"/>
+              <a:t>Reinforcement Learning</a:t>
+            </a:r>
+            <a:br>
+              <a:rPr lang="en-US" dirty="0" smtClean="0"/>
+            </a:br>
+            <a:r>
+              <a:rPr lang="en-US" sz="1400" b="1" dirty="0" err="1"/>
+              <a:t>e.g</a:t>
+            </a:r>
+            <a:r>
+              <a:rPr lang="en-US" sz="1400" b="1" dirty="0"/>
+              <a:t>: </a:t>
+            </a:r>
+            <a:r>
+              <a:rPr lang="en-US" sz="1400" dirty="0" smtClean="0"/>
+              <a:t>Monte </a:t>
+            </a:r>
+            <a:r>
+              <a:rPr lang="en-US" sz="1400" dirty="0"/>
+              <a:t>Carlo, Q-learning, SARSA, DQN, A3C, NAF, PPO, </a:t>
+            </a:r>
+            <a:r>
+              <a:rPr lang="en-US" sz="1400" dirty="0" smtClean="0"/>
+              <a:t>TRPO</a:t>
+            </a:r>
+            <a:endParaRPr lang="en-US" sz="1400" dirty="0"/>
+          </a:p>
+        </p:txBody>
+      </p:sp>
+    </p:spTree>
+    <p:extLst>
+      <p:ext uri="{BB962C8B-B14F-4D97-AF65-F5344CB8AC3E}">
+        <p14:creationId xmlns:p14="http://schemas.microsoft.com/office/powerpoint/2010/main" val="1870692302"/>
+      </p:ext>
+    </p:extLst>
+  </p:cSld>
+  <p:clrMapOvr>
+    <a:masterClrMapping/>
+  </p:clrMapOvr>
+</p:sld>
+</file>
+
+<file path=ppt/slides/slide24.xml><?xml version="1.0" encoding="utf-8"?>
+<p:sld xmlns:a="http://schemas.openxmlformats.org/drawingml/2006/main" xmlns:r="http://schemas.openxmlformats.org/officeDocument/2006/relationships" xmlns:p="http://schemas.openxmlformats.org/presentationml/2006/main">
+  <p:cSld>
+    <p:spTree>
+      <p:nvGrpSpPr>
+        <p:cNvPr id="1" name=""/>
+        <p:cNvGrpSpPr/>
+        <p:nvPr/>
+      </p:nvGrpSpPr>
+      <p:grpSpPr>
+        <a:xfrm>
+          <a:off x="0" y="0"/>
+          <a:ext cx="0" cy="0"/>
+          <a:chOff x="0" y="0"/>
+          <a:chExt cx="0" cy="0"/>
+        </a:xfrm>
+      </p:grpSpPr>
+      <p:sp>
+        <p:nvSpPr>
+          <p:cNvPr id="2" name="Title 1"/>
+          <p:cNvSpPr>
+            <a:spLocks noGrp="1"/>
+          </p:cNvSpPr>
+          <p:nvPr>
+            <p:ph type="title"/>
+          </p:nvPr>
+        </p:nvSpPr>
+        <p:spPr/>
+        <p:txBody>
+          <a:bodyPr/>
+          <a:lstStyle/>
+          <a:p>
+            <a:r>
+              <a:rPr lang="en-US" dirty="0" smtClean="0"/>
               <a:t>Algorithms: Classification by Learning</a:t>
             </a:r>
             <a:endParaRPr lang="en-US" dirty="0"/>
@@ -15269,7 +15352,7 @@
 </p:sld>
 </file>
 
-<file path=ppt/slides/slide24.xml><?xml version="1.0" encoding="utf-8"?>
+<file path=ppt/slides/slide25.xml><?xml version="1.0" encoding="utf-8"?>
 <p:sld xmlns:a="http://schemas.openxmlformats.org/drawingml/2006/main" xmlns:r="http://schemas.openxmlformats.org/officeDocument/2006/relationships" xmlns:p="http://schemas.openxmlformats.org/presentationml/2006/main">
   <p:cSld>
     <p:spTree>
@@ -15355,7 +15438,7 @@
 </p:sld>
 </file>
 
-<file path=ppt/slides/slide25.xml><?xml version="1.0" encoding="utf-8"?>
+<file path=ppt/slides/slide26.xml><?xml version="1.0" encoding="utf-8"?>
 <p:sld xmlns:a="http://schemas.openxmlformats.org/drawingml/2006/main" xmlns:r="http://schemas.openxmlformats.org/officeDocument/2006/relationships" xmlns:p="http://schemas.openxmlformats.org/presentationml/2006/main">
   <p:cSld>
     <p:spTree>
@@ -15518,14 +15601,14 @@
                 <a:gridCol w="5035931">
                   <a:extLst>
                     <a:ext uri="{9D8B030D-6E8A-4147-A177-3AD203B41FA5}">
-                      <a16:colId xmlns:a16="http://schemas.microsoft.com/office/drawing/2014/main" xmlns="" val="20000"/>
+                      <a16:colId xmlns="" xmlns:a16="http://schemas.microsoft.com/office/drawing/2014/main" val="20000"/>
                     </a:ext>
                   </a:extLst>
                 </a:gridCol>
                 <a:gridCol w="5022469">
                   <a:extLst>
                     <a:ext uri="{9D8B030D-6E8A-4147-A177-3AD203B41FA5}">
-                      <a16:colId xmlns:a16="http://schemas.microsoft.com/office/drawing/2014/main" xmlns="" val="20001"/>
+                      <a16:colId xmlns="" xmlns:a16="http://schemas.microsoft.com/office/drawing/2014/main" val="20001"/>
                     </a:ext>
                   </a:extLst>
                 </a:gridCol>
@@ -15605,7 +15688,7 @@
                 </a:tc>
                 <a:extLst>
                   <a:ext uri="{0D108BD9-81ED-4DB2-BD59-A6C34878D82A}">
-                    <a16:rowId xmlns:a16="http://schemas.microsoft.com/office/drawing/2014/main" xmlns="" val="10000"/>
+                    <a16:rowId xmlns="" xmlns:a16="http://schemas.microsoft.com/office/drawing/2014/main" val="10000"/>
                   </a:ext>
                 </a:extLst>
               </a:tr>
@@ -15692,7 +15775,7 @@
                 </a:tc>
                 <a:extLst>
                   <a:ext uri="{0D108BD9-81ED-4DB2-BD59-A6C34878D82A}">
-                    <a16:rowId xmlns:a16="http://schemas.microsoft.com/office/drawing/2014/main" xmlns="" val="10001"/>
+                    <a16:rowId xmlns="" xmlns:a16="http://schemas.microsoft.com/office/drawing/2014/main" val="10001"/>
                   </a:ext>
                 </a:extLst>
               </a:tr>
@@ -15795,7 +15878,7 @@
                 </a:tc>
                 <a:extLst>
                   <a:ext uri="{0D108BD9-81ED-4DB2-BD59-A6C34878D82A}">
-                    <a16:rowId xmlns:a16="http://schemas.microsoft.com/office/drawing/2014/main" xmlns="" val="10002"/>
+                    <a16:rowId xmlns="" xmlns:a16="http://schemas.microsoft.com/office/drawing/2014/main" val="10002"/>
                   </a:ext>
                 </a:extLst>
               </a:tr>

</xml_diff>

<commit_message>
Added: Big Data Sources
Added new slide: Big Data Sources
</commit_message>
<xml_diff>
--- a/Project Interim Submission/Generic DS Framework.pptx
+++ b/Project Interim Submission/Generic DS Framework.pptx
@@ -5,7 +5,7 @@
     <p:sldMasterId id="2147483708" r:id="rId1"/>
   </p:sldMasterIdLst>
   <p:notesMasterIdLst>
-    <p:notesMasterId r:id="rId28"/>
+    <p:notesMasterId r:id="rId29"/>
   </p:notesMasterIdLst>
   <p:sldIdLst>
     <p:sldId id="256" r:id="rId2"/>
@@ -25,15 +25,16 @@
     <p:sldId id="261" r:id="rId16"/>
     <p:sldId id="280" r:id="rId17"/>
     <p:sldId id="281" r:id="rId18"/>
-    <p:sldId id="262" r:id="rId19"/>
-    <p:sldId id="270" r:id="rId20"/>
-    <p:sldId id="265" r:id="rId21"/>
-    <p:sldId id="275" r:id="rId22"/>
-    <p:sldId id="276" r:id="rId23"/>
-    <p:sldId id="277" r:id="rId24"/>
-    <p:sldId id="278" r:id="rId25"/>
-    <p:sldId id="279" r:id="rId26"/>
-    <p:sldId id="266" r:id="rId27"/>
+    <p:sldId id="282" r:id="rId19"/>
+    <p:sldId id="262" r:id="rId20"/>
+    <p:sldId id="270" r:id="rId21"/>
+    <p:sldId id="265" r:id="rId22"/>
+    <p:sldId id="275" r:id="rId23"/>
+    <p:sldId id="276" r:id="rId24"/>
+    <p:sldId id="277" r:id="rId25"/>
+    <p:sldId id="278" r:id="rId26"/>
+    <p:sldId id="279" r:id="rId27"/>
+    <p:sldId id="266" r:id="rId28"/>
   </p:sldIdLst>
   <p:sldSz cx="12192000" cy="6858000"/>
   <p:notesSz cx="6858000" cy="9144000"/>
@@ -3567,82 +3568,82 @@
     </dgm:pt>
   </dgm:ptLst>
   <dgm:cxnLst>
+    <dgm:cxn modelId="{7F4CBF52-8E85-4962-B47C-2E9BB8838D4B}" type="presOf" srcId="{CF665F69-5C99-4ABA-84BB-EE78294ED608}" destId="{1F6BCCA0-2CCE-4CE0-BBC4-117FD2054979}" srcOrd="0" destOrd="0" presId="urn:microsoft.com/office/officeart/2005/8/layout/orgChart1"/>
+    <dgm:cxn modelId="{2451FA6F-A70D-4E78-8CF6-9527C49C1AC2}" type="presOf" srcId="{F0588C2A-6766-47BF-AE7C-52B851FABC21}" destId="{4C0517EB-FD0E-41DA-B0F6-7F0D2D018DD1}" srcOrd="0" destOrd="0" presId="urn:microsoft.com/office/officeart/2005/8/layout/orgChart1"/>
+    <dgm:cxn modelId="{5CA14EFE-56BA-428E-9344-6E54BD1CDAE3}" type="presOf" srcId="{A7E2D81E-7900-4DF4-BEF5-77A2812B0C4E}" destId="{91E1DAD5-A378-4F9D-90D3-E4D6E3B719CC}" srcOrd="0" destOrd="0" presId="urn:microsoft.com/office/officeart/2005/8/layout/orgChart1"/>
+    <dgm:cxn modelId="{275E1EA8-9958-4385-AD1D-0D70F2B2E97E}" type="presOf" srcId="{998DBD50-443E-466A-9688-66A52BCFB283}" destId="{291B4844-977C-4B0C-9CCC-F7511A56BE71}" srcOrd="1" destOrd="0" presId="urn:microsoft.com/office/officeart/2005/8/layout/orgChart1"/>
+    <dgm:cxn modelId="{F1E4A56E-64BE-44F4-8E42-D61EDD68880B}" srcId="{26CDFC28-47AA-4502-887A-33E7C0CE0838}" destId="{F0588C2A-6766-47BF-AE7C-52B851FABC21}" srcOrd="0" destOrd="0" parTransId="{5ED6D770-BF3B-4684-98EB-5ABB516FF23D}" sibTransId="{AFD6C0FD-0670-49CC-B34D-0E113DDEE343}"/>
+    <dgm:cxn modelId="{B90982DA-E1CB-43C2-9643-4ECB399A3CBC}" type="presOf" srcId="{998DBD50-443E-466A-9688-66A52BCFB283}" destId="{F5D3DEFB-AE85-4939-AB97-E915462269C0}" srcOrd="0" destOrd="0" presId="urn:microsoft.com/office/officeart/2005/8/layout/orgChart1"/>
+    <dgm:cxn modelId="{A4FD5072-445C-4BF4-99DD-5F1BDAD862DA}" srcId="{C9F271EB-AA97-406F-A22E-048A336DC94A}" destId="{6CEB8C34-32A9-47E6-A405-A04B3711CFB7}" srcOrd="1" destOrd="0" parTransId="{9DFE08AD-6D40-40B9-8C6C-0D9B748E71FD}" sibTransId="{05E40D46-9D4A-4AE0-8A7C-2E5D2787A5C2}"/>
+    <dgm:cxn modelId="{8137AEC6-67AB-4747-A01B-8846F373EF92}" type="presOf" srcId="{2A1734E5-F350-4043-A59D-090A5C851E96}" destId="{632D20A3-D474-4945-BEC3-702EAB53AF00}" srcOrd="0" destOrd="0" presId="urn:microsoft.com/office/officeart/2005/8/layout/orgChart1"/>
+    <dgm:cxn modelId="{B382F07A-E779-468F-8018-7984C1FE1CF1}" type="presOf" srcId="{26CDFC28-47AA-4502-887A-33E7C0CE0838}" destId="{4780D492-11D4-4975-B35A-476D05181A39}" srcOrd="1" destOrd="0" presId="urn:microsoft.com/office/officeart/2005/8/layout/orgChart1"/>
+    <dgm:cxn modelId="{0B387FA4-F216-482B-AC2E-CAF30E8346BB}" type="presOf" srcId="{64BCB35C-1AA8-4805-AE44-941DC0666BE4}" destId="{06BFC016-E41C-49B3-B96E-72E532519536}" srcOrd="0" destOrd="0" presId="urn:microsoft.com/office/officeart/2005/8/layout/orgChart1"/>
+    <dgm:cxn modelId="{CF4DF7D7-2777-4A2A-9B0C-8DEB23527131}" type="presOf" srcId="{C6CC40CD-5626-4A19-9936-F67709EE7AF0}" destId="{52AB23E0-53A6-4AC3-B89A-D72BC394F116}" srcOrd="0" destOrd="0" presId="urn:microsoft.com/office/officeart/2005/8/layout/orgChart1"/>
+    <dgm:cxn modelId="{2258E7B5-0D3B-4779-989F-0D2802E77E9D}" type="presOf" srcId="{2AB59A33-B6A6-40FF-98F7-711698F4D26B}" destId="{64076540-8FAD-4187-A304-8898DDD0C9A8}" srcOrd="0" destOrd="0" presId="urn:microsoft.com/office/officeart/2005/8/layout/orgChart1"/>
+    <dgm:cxn modelId="{06EB2273-9FAF-4E8B-B25D-B647F848AA12}" type="presOf" srcId="{A7E2D81E-7900-4DF4-BEF5-77A2812B0C4E}" destId="{C91E4177-0B62-4588-885D-1A4C3BD2BAF7}" srcOrd="1" destOrd="0" presId="urn:microsoft.com/office/officeart/2005/8/layout/orgChart1"/>
+    <dgm:cxn modelId="{2058D512-BFDC-429D-8108-A884B1DF591E}" type="presOf" srcId="{9FCE91AE-B52F-45FA-A0C5-CA2E6E43F0FC}" destId="{DFAC233F-FFFB-4BE5-9FC7-55A2752E1DAD}" srcOrd="0" destOrd="0" presId="urn:microsoft.com/office/officeart/2005/8/layout/orgChart1"/>
+    <dgm:cxn modelId="{8CBE4C9A-8DBD-4F86-806A-74F82BAF13CF}" type="presOf" srcId="{26CDFC28-47AA-4502-887A-33E7C0CE0838}" destId="{B9EF6254-674C-4CF7-8107-B9DBCC5CC06C}" srcOrd="0" destOrd="0" presId="urn:microsoft.com/office/officeart/2005/8/layout/orgChart1"/>
+    <dgm:cxn modelId="{74291408-E599-4241-9208-778B25B35419}" type="presOf" srcId="{5AF5E628-F524-43D4-9C5A-5A8189560301}" destId="{C6B5F02F-BF16-4258-AC5A-D980E6777BDC}" srcOrd="1" destOrd="0" presId="urn:microsoft.com/office/officeart/2005/8/layout/orgChart1"/>
+    <dgm:cxn modelId="{5F5DBC77-905E-46B9-9C22-D2F5D1C757CB}" type="presOf" srcId="{6CEB8C34-32A9-47E6-A405-A04B3711CFB7}" destId="{F5F98A29-63BF-4AC3-9BF3-D3C7E3FF700B}" srcOrd="1" destOrd="0" presId="urn:microsoft.com/office/officeart/2005/8/layout/orgChart1"/>
+    <dgm:cxn modelId="{4D7522AD-EF42-4E61-860F-C5EE7ADC920F}" srcId="{A7E2D81E-7900-4DF4-BEF5-77A2812B0C4E}" destId="{4BD105F0-FCB2-4292-8534-EF3F82555BF1}" srcOrd="1" destOrd="0" parTransId="{82243891-7EAF-4E58-B342-FB3AEF7D96D8}" sibTransId="{1B73A89F-B150-403E-8069-7813E3E859D3}"/>
+    <dgm:cxn modelId="{A1CD0581-8F25-4433-BCB3-403F201DCE98}" srcId="{31976A02-02B1-412A-B691-02C3A6880CD3}" destId="{A7E2D81E-7900-4DF4-BEF5-77A2812B0C4E}" srcOrd="0" destOrd="0" parTransId="{5E9185FC-D944-454A-8EDB-88DDB1EC156B}" sibTransId="{6CE37D0C-36BB-4B53-B0BC-4BBCC03B877F}"/>
     <dgm:cxn modelId="{DF1FF10C-2385-4496-A025-967A40CBD7A2}" type="presOf" srcId="{2A1734E5-F350-4043-A59D-090A5C851E96}" destId="{E65AAA3D-6EDF-4733-A476-6E661CF70E36}" srcOrd="1" destOrd="0" presId="urn:microsoft.com/office/officeart/2005/8/layout/orgChart1"/>
+    <dgm:cxn modelId="{87C8B196-323D-4EB7-8C11-259CEDD39083}" type="presOf" srcId="{AB5982FD-D354-4AAA-B978-F9826D0D05FB}" destId="{A48D18B2-265E-4299-AC55-85A70F37F6FA}" srcOrd="0" destOrd="0" presId="urn:microsoft.com/office/officeart/2005/8/layout/orgChart1"/>
+    <dgm:cxn modelId="{A8107FC3-6D18-4968-ADAB-112DB844FD6C}" type="presOf" srcId="{AB5982FD-D354-4AAA-B978-F9826D0D05FB}" destId="{9D123678-09FF-430E-9CD4-847B9B41C9E6}" srcOrd="1" destOrd="0" presId="urn:microsoft.com/office/officeart/2005/8/layout/orgChart1"/>
+    <dgm:cxn modelId="{6D67D41E-CA24-4B50-B776-9590486E46E4}" type="presOf" srcId="{763868FB-01C7-4C07-982A-E0002DD2F249}" destId="{6E390A44-09EF-4120-ABD1-1835798D84D0}" srcOrd="0" destOrd="0" presId="urn:microsoft.com/office/officeart/2005/8/layout/orgChart1"/>
+    <dgm:cxn modelId="{7A6B7DFA-AF2C-46D0-9BF7-1A6F2A4BD05F}" type="presOf" srcId="{82243891-7EAF-4E58-B342-FB3AEF7D96D8}" destId="{AAC078B5-22C6-4465-AC60-50B89A62DAA4}" srcOrd="0" destOrd="0" presId="urn:microsoft.com/office/officeart/2005/8/layout/orgChart1"/>
+    <dgm:cxn modelId="{54CCCEDE-ECD4-498C-B465-8CA9F82A49C5}" type="presOf" srcId="{F8118993-C3C6-4246-A6BF-F9F2EC3DC9CB}" destId="{A2BECFDC-6DED-4CEA-B9D1-694651AD4E09}" srcOrd="1" destOrd="0" presId="urn:microsoft.com/office/officeart/2005/8/layout/orgChart1"/>
+    <dgm:cxn modelId="{C3A31E5B-D7BF-45EA-9802-6D3D083F2984}" type="presOf" srcId="{A3D548BD-E471-4C3A-9014-C70E7E2B5BFD}" destId="{2D94B2C8-24C9-4949-954A-EDC01FC95EB8}" srcOrd="0" destOrd="0" presId="urn:microsoft.com/office/officeart/2005/8/layout/orgChart1"/>
+    <dgm:cxn modelId="{65D0E857-80DD-4041-83CE-8C50597B830A}" type="presOf" srcId="{31976A02-02B1-412A-B691-02C3A6880CD3}" destId="{36B3E81A-E148-4D3B-88E5-4419A3BAFF40}" srcOrd="0" destOrd="0" presId="urn:microsoft.com/office/officeart/2005/8/layout/orgChart1"/>
+    <dgm:cxn modelId="{5AD1E491-93BF-4390-A05D-1A6277716063}" type="presOf" srcId="{CC818131-8C0B-4D2C-AEA4-5A1BD3A6EFF3}" destId="{3E8697EF-F0C0-442C-AC8F-AF21953408C4}" srcOrd="0" destOrd="0" presId="urn:microsoft.com/office/officeart/2005/8/layout/orgChart1"/>
+    <dgm:cxn modelId="{63957BFE-6189-47C3-8B38-C33EAFDBB625}" srcId="{998DBD50-443E-466A-9688-66A52BCFB283}" destId="{DD18F73E-5873-4440-AD2A-CB98A7E335BB}" srcOrd="0" destOrd="0" parTransId="{5B6E6A94-B82E-45A0-B538-B423850E5FD3}" sibTransId="{9786C01A-E46D-4E4C-952B-67F9C5AB60A3}"/>
+    <dgm:cxn modelId="{16C1F492-6F23-441E-8C79-9308ED1456B5}" type="presOf" srcId="{B23CD900-37E2-45DE-B384-F9885D55838B}" destId="{82AF4305-DDE7-4632-85B6-1B4672473DDD}" srcOrd="1" destOrd="0" presId="urn:microsoft.com/office/officeart/2005/8/layout/orgChart1"/>
+    <dgm:cxn modelId="{3F6EF168-B749-47B5-86FD-91ABA2C7D72E}" type="presOf" srcId="{A9576EC0-F780-411F-A988-792BB4B5827F}" destId="{3C3CC326-C1BB-4802-9C80-3024F7E2EFEC}" srcOrd="1" destOrd="0" presId="urn:microsoft.com/office/officeart/2005/8/layout/orgChart1"/>
+    <dgm:cxn modelId="{9A9E885B-6395-49FB-9E85-9D1E8F64238A}" type="presOf" srcId="{810F6CE3-7B9A-4BC5-B642-3E284064AEB8}" destId="{27D617F6-CD92-4160-85E9-3D135DEE9C6C}" srcOrd="0" destOrd="0" presId="urn:microsoft.com/office/officeart/2005/8/layout/orgChart1"/>
+    <dgm:cxn modelId="{964962C0-3F9A-405E-B7CF-7320CA058054}" srcId="{4BD105F0-FCB2-4292-8534-EF3F82555BF1}" destId="{F8118993-C3C6-4246-A6BF-F9F2EC3DC9CB}" srcOrd="0" destOrd="0" parTransId="{763868FB-01C7-4C07-982A-E0002DD2F249}" sibTransId="{196FC47F-8F5E-4EE4-99DA-8228F767EF40}"/>
+    <dgm:cxn modelId="{F3B26E1E-6947-4159-918E-E138CED3D239}" srcId="{B23CD900-37E2-45DE-B384-F9885D55838B}" destId="{A9576EC0-F780-411F-A988-792BB4B5827F}" srcOrd="0" destOrd="0" parTransId="{3C5DF98A-9E49-4EBC-AA28-3E96D9B53B39}" sibTransId="{4568403F-227F-414F-9181-6C36CA1FB882}"/>
+    <dgm:cxn modelId="{F4CB865C-996A-492E-9E5F-2B17DE9381E0}" srcId="{26CDFC28-47AA-4502-887A-33E7C0CE0838}" destId="{8F21D5B7-1E81-4E68-9A3B-41478D9E578F}" srcOrd="1" destOrd="0" parTransId="{810F6CE3-7B9A-4BC5-B642-3E284064AEB8}" sibTransId="{0C0A6C55-CE4D-42AC-8392-A28B6E9C2042}"/>
     <dgm:cxn modelId="{EC9B6DDA-4079-451C-AA2A-4CC8ABD15E1E}" srcId="{A7E2D81E-7900-4DF4-BEF5-77A2812B0C4E}" destId="{2A1734E5-F350-4043-A59D-090A5C851E96}" srcOrd="2" destOrd="0" parTransId="{E2FCDC95-A76F-447E-B7A8-96053D2336AC}" sibTransId="{1BA36650-D456-4FCA-ABBC-F4EEE6270BCA}"/>
-    <dgm:cxn modelId="{63957BFE-6189-47C3-8B38-C33EAFDBB625}" srcId="{998DBD50-443E-466A-9688-66A52BCFB283}" destId="{DD18F73E-5873-4440-AD2A-CB98A7E335BB}" srcOrd="0" destOrd="0" parTransId="{5B6E6A94-B82E-45A0-B538-B423850E5FD3}" sibTransId="{9786C01A-E46D-4E4C-952B-67F9C5AB60A3}"/>
+    <dgm:cxn modelId="{7D2A03B3-72A8-4CAF-A850-B82FF1D961C0}" type="presOf" srcId="{3196F628-F850-402C-8DFF-32FDBF641FAF}" destId="{6B1C0F91-7709-4920-8BCD-A2344D4FC3C1}" srcOrd="0" destOrd="0" presId="urn:microsoft.com/office/officeart/2005/8/layout/orgChart1"/>
+    <dgm:cxn modelId="{D9F878CB-CD73-43B2-924C-4145A2798C53}" type="presOf" srcId="{CC818131-8C0B-4D2C-AEA4-5A1BD3A6EFF3}" destId="{D62139CB-9D8F-4560-A01D-A225FB31D9FF}" srcOrd="1" destOrd="0" presId="urn:microsoft.com/office/officeart/2005/8/layout/orgChart1"/>
     <dgm:cxn modelId="{E7F7BF8F-EE5F-4676-BDAC-E110E82FDA6F}" type="presOf" srcId="{DD18F73E-5873-4440-AD2A-CB98A7E335BB}" destId="{7527F677-2F8C-4154-ADCF-5A9B516211C5}" srcOrd="0" destOrd="0" presId="urn:microsoft.com/office/officeart/2005/8/layout/orgChart1"/>
-    <dgm:cxn modelId="{B90982DA-E1CB-43C2-9643-4ECB399A3CBC}" type="presOf" srcId="{998DBD50-443E-466A-9688-66A52BCFB283}" destId="{F5D3DEFB-AE85-4939-AB97-E915462269C0}" srcOrd="0" destOrd="0" presId="urn:microsoft.com/office/officeart/2005/8/layout/orgChart1"/>
+    <dgm:cxn modelId="{07BFF742-37D9-4F3A-8BCA-5FA7F3B3FFDA}" type="presOf" srcId="{51C939BC-1F71-4B4B-B76E-5AB02C7C5227}" destId="{617A3543-3392-450A-AE60-926A208DA196}" srcOrd="0" destOrd="0" presId="urn:microsoft.com/office/officeart/2005/8/layout/orgChart1"/>
+    <dgm:cxn modelId="{3E527903-2969-4BE6-A44A-67C70C96E603}" type="presOf" srcId="{4BD105F0-FCB2-4292-8534-EF3F82555BF1}" destId="{432E8FE3-B9B9-442A-A4A0-5A0F509E161A}" srcOrd="1" destOrd="0" presId="urn:microsoft.com/office/officeart/2005/8/layout/orgChart1"/>
+    <dgm:cxn modelId="{F56EA288-A208-43A9-BC15-07480867F718}" type="presOf" srcId="{CF665F69-5C99-4ABA-84BB-EE78294ED608}" destId="{0EA51ED5-D16D-4D92-B6FA-B66031566B6A}" srcOrd="1" destOrd="0" presId="urn:microsoft.com/office/officeart/2005/8/layout/orgChart1"/>
+    <dgm:cxn modelId="{6DDE05DA-2CC4-4A86-986C-5CBE3D44190A}" type="presOf" srcId="{6CEB8C34-32A9-47E6-A405-A04B3711CFB7}" destId="{087E6E65-2112-476B-A4AA-3A36C7628514}" srcOrd="0" destOrd="0" presId="urn:microsoft.com/office/officeart/2005/8/layout/orgChart1"/>
+    <dgm:cxn modelId="{D08B451E-BCB5-4E0B-8342-ED0CFBDE97DB}" type="presOf" srcId="{F8118993-C3C6-4246-A6BF-F9F2EC3DC9CB}" destId="{23D4122E-B967-488C-8CB8-9B0B4654BF0E}" srcOrd="0" destOrd="0" presId="urn:microsoft.com/office/officeart/2005/8/layout/orgChart1"/>
+    <dgm:cxn modelId="{D4A13C56-EB94-4538-AEB3-2A061DCE865E}" srcId="{51C939BC-1F71-4B4B-B76E-5AB02C7C5227}" destId="{AB5982FD-D354-4AAA-B978-F9826D0D05FB}" srcOrd="1" destOrd="0" parTransId="{64BCB35C-1AA8-4805-AE44-941DC0666BE4}" sibTransId="{F8A871A7-1431-40C2-8D1E-3F46A7492963}"/>
+    <dgm:cxn modelId="{3A8D22D7-D5E6-464A-8BEE-727F9246E9EE}" srcId="{F8118993-C3C6-4246-A6BF-F9F2EC3DC9CB}" destId="{CC818131-8C0B-4D2C-AEA4-5A1BD3A6EFF3}" srcOrd="1" destOrd="0" parTransId="{A3D548BD-E471-4C3A-9014-C70E7E2B5BFD}" sibTransId="{1E143EFF-2729-40A1-84B3-E819EDF8B7B2}"/>
+    <dgm:cxn modelId="{79528653-A03B-4870-8A6A-410571D115D3}" type="presOf" srcId="{51C939BC-1F71-4B4B-B76E-5AB02C7C5227}" destId="{26FA5C1D-10E1-45CD-A1D3-744EEEC37631}" srcOrd="1" destOrd="0" presId="urn:microsoft.com/office/officeart/2005/8/layout/orgChart1"/>
+    <dgm:cxn modelId="{5DC0E0BC-0122-42DE-9175-76DAAE24D215}" srcId="{A7E2D81E-7900-4DF4-BEF5-77A2812B0C4E}" destId="{51C939BC-1F71-4B4B-B76E-5AB02C7C5227}" srcOrd="3" destOrd="0" parTransId="{D5432636-319A-4212-83DB-9D3BA6AA54A9}" sibTransId="{C119049A-FECA-4579-956E-33C230BAA319}"/>
+    <dgm:cxn modelId="{B8E816F8-7FA7-46B3-B6D5-3CE42BCFB40A}" srcId="{2A1734E5-F350-4043-A59D-090A5C851E96}" destId="{26CDFC28-47AA-4502-887A-33E7C0CE0838}" srcOrd="0" destOrd="0" parTransId="{3196F628-F850-402C-8DFF-32FDBF641FAF}" sibTransId="{31721E21-E4E4-40B3-A55D-F290C2DF3887}"/>
+    <dgm:cxn modelId="{5E6BA506-E2BF-4C29-92E3-F77F24013314}" type="presOf" srcId="{5AF5E628-F524-43D4-9C5A-5A8189560301}" destId="{710C924E-E30F-44DF-A6AA-7A0529BD66A0}" srcOrd="0" destOrd="0" presId="urn:microsoft.com/office/officeart/2005/8/layout/orgChart1"/>
+    <dgm:cxn modelId="{8D0015CC-72CA-4964-8D64-FA31789A0CF7}" type="presOf" srcId="{C9F271EB-AA97-406F-A22E-048A336DC94A}" destId="{EF58EAAC-E8FC-4E92-AC54-3E70E3CCE427}" srcOrd="0" destOrd="0" presId="urn:microsoft.com/office/officeart/2005/8/layout/orgChart1"/>
+    <dgm:cxn modelId="{855D9E2B-03E2-41B3-895F-0198D29F1009}" type="presOf" srcId="{3C5DF98A-9E49-4EBC-AA28-3E96D9B53B39}" destId="{21695C6D-5845-4B94-8EDE-C845DA7BA21E}" srcOrd="0" destOrd="0" presId="urn:microsoft.com/office/officeart/2005/8/layout/orgChart1"/>
+    <dgm:cxn modelId="{DE92D672-1362-46B3-9B36-E204E35D3A8A}" srcId="{AB5982FD-D354-4AAA-B978-F9826D0D05FB}" destId="{CF665F69-5C99-4ABA-84BB-EE78294ED608}" srcOrd="0" destOrd="0" parTransId="{CBAC9813-60C7-4469-BF09-A874065B34A7}" sibTransId="{F6125F52-3FD9-4490-AD82-6F4F52591F18}"/>
+    <dgm:cxn modelId="{585916E3-B9E6-418F-BBFC-91743B566955}" type="presOf" srcId="{5ED6D770-BF3B-4684-98EB-5ABB516FF23D}" destId="{5871E8CC-FA46-4584-AC5E-0BFF5BB7E6D6}" srcOrd="0" destOrd="0" presId="urn:microsoft.com/office/officeart/2005/8/layout/orgChart1"/>
+    <dgm:cxn modelId="{EC2000F8-6406-4F91-AC03-67371B9EF307}" type="presOf" srcId="{CEB0D96F-42A5-4903-B863-AD62B81F61AE}" destId="{D81F13DE-77CA-4947-A9D8-3B9405F7FB4A}" srcOrd="0" destOrd="0" presId="urn:microsoft.com/office/officeart/2005/8/layout/orgChart1"/>
+    <dgm:cxn modelId="{2D8C82CF-8261-498E-8D04-AFAB3415C828}" srcId="{6CEB8C34-32A9-47E6-A405-A04B3711CFB7}" destId="{5AF5E628-F524-43D4-9C5A-5A8189560301}" srcOrd="0" destOrd="0" parTransId="{B3E11DF4-0A70-40F4-A9F3-378E2202AE1D}" sibTransId="{79E1E6F3-8832-4EDA-9B35-6A23A6E78C38}"/>
+    <dgm:cxn modelId="{3652CE73-9339-44DF-877F-2A4347BDCFDB}" type="presOf" srcId="{8F21D5B7-1E81-4E68-9A3B-41478D9E578F}" destId="{14A65CCA-D715-46D8-B448-593158ED3247}" srcOrd="1" destOrd="0" presId="urn:microsoft.com/office/officeart/2005/8/layout/orgChart1"/>
     <dgm:cxn modelId="{AA527D19-A024-4500-8A09-2D410AABF130}" type="presOf" srcId="{DD18F73E-5873-4440-AD2A-CB98A7E335BB}" destId="{24D69D00-71EB-421A-A1CD-E1399AFDD654}" srcOrd="1" destOrd="0" presId="urn:microsoft.com/office/officeart/2005/8/layout/orgChart1"/>
-    <dgm:cxn modelId="{79528653-A03B-4870-8A6A-410571D115D3}" type="presOf" srcId="{51C939BC-1F71-4B4B-B76E-5AB02C7C5227}" destId="{26FA5C1D-10E1-45CD-A1D3-744EEEC37631}" srcOrd="1" destOrd="0" presId="urn:microsoft.com/office/officeart/2005/8/layout/orgChart1"/>
-    <dgm:cxn modelId="{65D0E857-80DD-4041-83CE-8C50597B830A}" type="presOf" srcId="{31976A02-02B1-412A-B691-02C3A6880CD3}" destId="{36B3E81A-E148-4D3B-88E5-4419A3BAFF40}" srcOrd="0" destOrd="0" presId="urn:microsoft.com/office/officeart/2005/8/layout/orgChart1"/>
-    <dgm:cxn modelId="{855D9E2B-03E2-41B3-895F-0198D29F1009}" type="presOf" srcId="{3C5DF98A-9E49-4EBC-AA28-3E96D9B53B39}" destId="{21695C6D-5845-4B94-8EDE-C845DA7BA21E}" srcOrd="0" destOrd="0" presId="urn:microsoft.com/office/officeart/2005/8/layout/orgChart1"/>
-    <dgm:cxn modelId="{3652CE73-9339-44DF-877F-2A4347BDCFDB}" type="presOf" srcId="{8F21D5B7-1E81-4E68-9A3B-41478D9E578F}" destId="{14A65CCA-D715-46D8-B448-593158ED3247}" srcOrd="1" destOrd="0" presId="urn:microsoft.com/office/officeart/2005/8/layout/orgChart1"/>
-    <dgm:cxn modelId="{6DDE05DA-2CC4-4A86-986C-5CBE3D44190A}" type="presOf" srcId="{6CEB8C34-32A9-47E6-A405-A04B3711CFB7}" destId="{087E6E65-2112-476B-A4AA-3A36C7628514}" srcOrd="0" destOrd="0" presId="urn:microsoft.com/office/officeart/2005/8/layout/orgChart1"/>
-    <dgm:cxn modelId="{C3A31E5B-D7BF-45EA-9802-6D3D083F2984}" type="presOf" srcId="{A3D548BD-E471-4C3A-9014-C70E7E2B5BFD}" destId="{2D94B2C8-24C9-4949-954A-EDC01FC95EB8}" srcOrd="0" destOrd="0" presId="urn:microsoft.com/office/officeart/2005/8/layout/orgChart1"/>
-    <dgm:cxn modelId="{A4FD5072-445C-4BF4-99DD-5F1BDAD862DA}" srcId="{C9F271EB-AA97-406F-A22E-048A336DC94A}" destId="{6CEB8C34-32A9-47E6-A405-A04B3711CFB7}" srcOrd="1" destOrd="0" parTransId="{9DFE08AD-6D40-40B9-8C6C-0D9B748E71FD}" sibTransId="{05E40D46-9D4A-4AE0-8A7C-2E5D2787A5C2}"/>
-    <dgm:cxn modelId="{16C1F492-6F23-441E-8C79-9308ED1456B5}" type="presOf" srcId="{B23CD900-37E2-45DE-B384-F9885D55838B}" destId="{82AF4305-DDE7-4632-85B6-1B4672473DDD}" srcOrd="1" destOrd="0" presId="urn:microsoft.com/office/officeart/2005/8/layout/orgChart1"/>
+    <dgm:cxn modelId="{1B284198-CAF5-4CC2-BF48-541C8C13B704}" type="presOf" srcId="{2AB59A33-B6A6-40FF-98F7-711698F4D26B}" destId="{DE7689F0-0909-4DF0-993D-DF1D19A454E0}" srcOrd="1" destOrd="0" presId="urn:microsoft.com/office/officeart/2005/8/layout/orgChart1"/>
+    <dgm:cxn modelId="{9FE69CA7-02A8-4923-B8F4-A5DECC562316}" type="presOf" srcId="{B3E11DF4-0A70-40F4-A9F3-378E2202AE1D}" destId="{E8CF98EA-1E11-4C8B-B3DC-A8B8C9716700}" srcOrd="0" destOrd="0" presId="urn:microsoft.com/office/officeart/2005/8/layout/orgChart1"/>
+    <dgm:cxn modelId="{3FFF7750-E39A-400B-867E-3AD7510BEE79}" type="presOf" srcId="{4BD105F0-FCB2-4292-8534-EF3F82555BF1}" destId="{3780879A-AD2D-405D-977E-4451EF3CA5AD}" srcOrd="0" destOrd="0" presId="urn:microsoft.com/office/officeart/2005/8/layout/orgChart1"/>
     <dgm:cxn modelId="{3D6039C9-601D-4282-8BBF-03FEEA76F5F3}" type="presOf" srcId="{E2FCDC95-A76F-447E-B7A8-96053D2336AC}" destId="{75994A22-3790-4219-8C34-EFB1A172683C}" srcOrd="0" destOrd="0" presId="urn:microsoft.com/office/officeart/2005/8/layout/orgChart1"/>
-    <dgm:cxn modelId="{EC2000F8-6406-4F91-AC03-67371B9EF307}" type="presOf" srcId="{CEB0D96F-42A5-4903-B863-AD62B81F61AE}" destId="{D81F13DE-77CA-4947-A9D8-3B9405F7FB4A}" srcOrd="0" destOrd="0" presId="urn:microsoft.com/office/officeart/2005/8/layout/orgChart1"/>
-    <dgm:cxn modelId="{3E527903-2969-4BE6-A44A-67C70C96E603}" type="presOf" srcId="{4BD105F0-FCB2-4292-8534-EF3F82555BF1}" destId="{432E8FE3-B9B9-442A-A4A0-5A0F509E161A}" srcOrd="1" destOrd="0" presId="urn:microsoft.com/office/officeart/2005/8/layout/orgChart1"/>
-    <dgm:cxn modelId="{B382F07A-E779-468F-8018-7984C1FE1CF1}" type="presOf" srcId="{26CDFC28-47AA-4502-887A-33E7C0CE0838}" destId="{4780D492-11D4-4975-B35A-476D05181A39}" srcOrd="1" destOrd="0" presId="urn:microsoft.com/office/officeart/2005/8/layout/orgChart1"/>
-    <dgm:cxn modelId="{06EB2273-9FAF-4E8B-B25D-B647F848AA12}" type="presOf" srcId="{A7E2D81E-7900-4DF4-BEF5-77A2812B0C4E}" destId="{C91E4177-0B62-4588-885D-1A4C3BD2BAF7}" srcOrd="1" destOrd="0" presId="urn:microsoft.com/office/officeart/2005/8/layout/orgChart1"/>
+    <dgm:cxn modelId="{079B3109-107E-4D2E-99FC-71764D1796B1}" type="presOf" srcId="{B23CD900-37E2-45DE-B384-F9885D55838B}" destId="{F6A2B30B-A958-479B-AD92-8D9166487761}" srcOrd="0" destOrd="0" presId="urn:microsoft.com/office/officeart/2005/8/layout/orgChart1"/>
+    <dgm:cxn modelId="{DB030D6B-BB16-4AB3-BD3B-676A1CBC0A28}" type="presOf" srcId="{A9576EC0-F780-411F-A988-792BB4B5827F}" destId="{B4236978-BB7B-465F-A15B-A4753285650F}" srcOrd="0" destOrd="0" presId="urn:microsoft.com/office/officeart/2005/8/layout/orgChart1"/>
+    <dgm:cxn modelId="{29D3F1C6-D8C1-4696-9225-7574825892FA}" srcId="{F8118993-C3C6-4246-A6BF-F9F2EC3DC9CB}" destId="{2AB59A33-B6A6-40FF-98F7-711698F4D26B}" srcOrd="0" destOrd="0" parTransId="{C1DBF8BC-E021-419E-A78A-05014B36B3B1}" sibTransId="{39934AF9-B63A-4C68-8C74-12CFA5946906}"/>
+    <dgm:cxn modelId="{73D1DC3E-5AF2-43C6-AE9C-C378299A836A}" type="presOf" srcId="{CBAC9813-60C7-4469-BF09-A874065B34A7}" destId="{F6217F3C-65DD-408C-AC11-C96C35846B77}" srcOrd="0" destOrd="0" presId="urn:microsoft.com/office/officeart/2005/8/layout/orgChart1"/>
+    <dgm:cxn modelId="{711E14F9-8AF4-4019-8C8C-9FE45B7D3E7C}" type="presOf" srcId="{9DFE08AD-6D40-40B9-8C6C-0D9B748E71FD}" destId="{8D8E53BF-D23C-4E66-A64D-69E3B5A64376}" srcOrd="0" destOrd="0" presId="urn:microsoft.com/office/officeart/2005/8/layout/orgChart1"/>
+    <dgm:cxn modelId="{F864C8BC-B8C9-4962-ABB8-1D4DB46F4EA9}" srcId="{C9F271EB-AA97-406F-A22E-048A336DC94A}" destId="{B23CD900-37E2-45DE-B384-F9885D55838B}" srcOrd="0" destOrd="0" parTransId="{C6CC40CD-5626-4A19-9936-F67709EE7AF0}" sibTransId="{4EC04109-3134-4314-B119-98550E78BF07}"/>
+    <dgm:cxn modelId="{701FBC72-4CA4-403B-9C1B-0720F2EB9273}" type="presOf" srcId="{F0588C2A-6766-47BF-AE7C-52B851FABC21}" destId="{09C02F37-0DFF-472D-BC6B-B6584867F159}" srcOrd="1" destOrd="0" presId="urn:microsoft.com/office/officeart/2005/8/layout/orgChart1"/>
+    <dgm:cxn modelId="{FCF7D859-A8C6-4A69-ACE7-6EBD0F233C30}" type="presOf" srcId="{D5432636-319A-4212-83DB-9D3BA6AA54A9}" destId="{AA253CD6-C0DA-4C21-9B15-7211D0914EE5}" srcOrd="0" destOrd="0" presId="urn:microsoft.com/office/officeart/2005/8/layout/orgChart1"/>
+    <dgm:cxn modelId="{794BC4DB-07B9-4B18-835E-CC6189AFDB89}" type="presOf" srcId="{C1DBF8BC-E021-419E-A78A-05014B36B3B1}" destId="{3D07C967-7F5A-4259-8C92-44D4DA2F7550}" srcOrd="0" destOrd="0" presId="urn:microsoft.com/office/officeart/2005/8/layout/orgChart1"/>
+    <dgm:cxn modelId="{A25B346A-AF67-44D0-A601-4D4A0B7FEEC8}" srcId="{A7E2D81E-7900-4DF4-BEF5-77A2812B0C4E}" destId="{C9F271EB-AA97-406F-A22E-048A336DC94A}" srcOrd="0" destOrd="0" parTransId="{CEB0D96F-42A5-4903-B863-AD62B81F61AE}" sibTransId="{994C4CAB-5619-4281-B81C-1EBED1C2EFE7}"/>
     <dgm:cxn modelId="{22930F4D-DE10-45E5-ACDC-A461022FFBA9}" srcId="{51C939BC-1F71-4B4B-B76E-5AB02C7C5227}" destId="{998DBD50-443E-466A-9688-66A52BCFB283}" srcOrd="0" destOrd="0" parTransId="{9FCE91AE-B52F-45FA-A0C5-CA2E6E43F0FC}" sibTransId="{1642DE8E-03D4-4062-A10D-83B597A79491}"/>
-    <dgm:cxn modelId="{1B284198-CAF5-4CC2-BF48-541C8C13B704}" type="presOf" srcId="{2AB59A33-B6A6-40FF-98F7-711698F4D26B}" destId="{DE7689F0-0909-4DF0-993D-DF1D19A454E0}" srcOrd="1" destOrd="0" presId="urn:microsoft.com/office/officeart/2005/8/layout/orgChart1"/>
-    <dgm:cxn modelId="{2D8C82CF-8261-498E-8D04-AFAB3415C828}" srcId="{6CEB8C34-32A9-47E6-A405-A04B3711CFB7}" destId="{5AF5E628-F524-43D4-9C5A-5A8189560301}" srcOrd="0" destOrd="0" parTransId="{B3E11DF4-0A70-40F4-A9F3-378E2202AE1D}" sibTransId="{79E1E6F3-8832-4EDA-9B35-6A23A6E78C38}"/>
-    <dgm:cxn modelId="{73D1DC3E-5AF2-43C6-AE9C-C378299A836A}" type="presOf" srcId="{CBAC9813-60C7-4469-BF09-A874065B34A7}" destId="{F6217F3C-65DD-408C-AC11-C96C35846B77}" srcOrd="0" destOrd="0" presId="urn:microsoft.com/office/officeart/2005/8/layout/orgChart1"/>
-    <dgm:cxn modelId="{A1CD0581-8F25-4433-BCB3-403F201DCE98}" srcId="{31976A02-02B1-412A-B691-02C3A6880CD3}" destId="{A7E2D81E-7900-4DF4-BEF5-77A2812B0C4E}" srcOrd="0" destOrd="0" parTransId="{5E9185FC-D944-454A-8EDB-88DDB1EC156B}" sibTransId="{6CE37D0C-36BB-4B53-B0BC-4BBCC03B877F}"/>
-    <dgm:cxn modelId="{DE92D672-1362-46B3-9B36-E204E35D3A8A}" srcId="{AB5982FD-D354-4AAA-B978-F9826D0D05FB}" destId="{CF665F69-5C99-4ABA-84BB-EE78294ED608}" srcOrd="0" destOrd="0" parTransId="{CBAC9813-60C7-4469-BF09-A874065B34A7}" sibTransId="{F6125F52-3FD9-4490-AD82-6F4F52591F18}"/>
-    <dgm:cxn modelId="{7F4CBF52-8E85-4962-B47C-2E9BB8838D4B}" type="presOf" srcId="{CF665F69-5C99-4ABA-84BB-EE78294ED608}" destId="{1F6BCCA0-2CCE-4CE0-BBC4-117FD2054979}" srcOrd="0" destOrd="0" presId="urn:microsoft.com/office/officeart/2005/8/layout/orgChart1"/>
-    <dgm:cxn modelId="{9FE69CA7-02A8-4923-B8F4-A5DECC562316}" type="presOf" srcId="{B3E11DF4-0A70-40F4-A9F3-378E2202AE1D}" destId="{E8CF98EA-1E11-4C8B-B3DC-A8B8C9716700}" srcOrd="0" destOrd="0" presId="urn:microsoft.com/office/officeart/2005/8/layout/orgChart1"/>
-    <dgm:cxn modelId="{8CBE4C9A-8DBD-4F86-806A-74F82BAF13CF}" type="presOf" srcId="{26CDFC28-47AA-4502-887A-33E7C0CE0838}" destId="{B9EF6254-674C-4CF7-8107-B9DBCC5CC06C}" srcOrd="0" destOrd="0" presId="urn:microsoft.com/office/officeart/2005/8/layout/orgChart1"/>
-    <dgm:cxn modelId="{A8107FC3-6D18-4968-ADAB-112DB844FD6C}" type="presOf" srcId="{AB5982FD-D354-4AAA-B978-F9826D0D05FB}" destId="{9D123678-09FF-430E-9CD4-847B9B41C9E6}" srcOrd="1" destOrd="0" presId="urn:microsoft.com/office/officeart/2005/8/layout/orgChart1"/>
     <dgm:cxn modelId="{63B04F08-C750-4C7A-B49E-BEE5344BBD39}" type="presOf" srcId="{C9F271EB-AA97-406F-A22E-048A336DC94A}" destId="{0CDB574B-8A16-4575-B86E-72EE9B15201E}" srcOrd="1" destOrd="0" presId="urn:microsoft.com/office/officeart/2005/8/layout/orgChart1"/>
-    <dgm:cxn modelId="{DB030D6B-BB16-4AB3-BD3B-676A1CBC0A28}" type="presOf" srcId="{A9576EC0-F780-411F-A988-792BB4B5827F}" destId="{B4236978-BB7B-465F-A15B-A4753285650F}" srcOrd="0" destOrd="0" presId="urn:microsoft.com/office/officeart/2005/8/layout/orgChart1"/>
-    <dgm:cxn modelId="{8137AEC6-67AB-4747-A01B-8846F373EF92}" type="presOf" srcId="{2A1734E5-F350-4043-A59D-090A5C851E96}" destId="{632D20A3-D474-4945-BEC3-702EAB53AF00}" srcOrd="0" destOrd="0" presId="urn:microsoft.com/office/officeart/2005/8/layout/orgChart1"/>
-    <dgm:cxn modelId="{585916E3-B9E6-418F-BBFC-91743B566955}" type="presOf" srcId="{5ED6D770-BF3B-4684-98EB-5ABB516FF23D}" destId="{5871E8CC-FA46-4584-AC5E-0BFF5BB7E6D6}" srcOrd="0" destOrd="0" presId="urn:microsoft.com/office/officeart/2005/8/layout/orgChart1"/>
-    <dgm:cxn modelId="{3FFF7750-E39A-400B-867E-3AD7510BEE79}" type="presOf" srcId="{4BD105F0-FCB2-4292-8534-EF3F82555BF1}" destId="{3780879A-AD2D-405D-977E-4451EF3CA5AD}" srcOrd="0" destOrd="0" presId="urn:microsoft.com/office/officeart/2005/8/layout/orgChart1"/>
-    <dgm:cxn modelId="{5AD1E491-93BF-4390-A05D-1A6277716063}" type="presOf" srcId="{CC818131-8C0B-4D2C-AEA4-5A1BD3A6EFF3}" destId="{3E8697EF-F0C0-442C-AC8F-AF21953408C4}" srcOrd="0" destOrd="0" presId="urn:microsoft.com/office/officeart/2005/8/layout/orgChart1"/>
-    <dgm:cxn modelId="{4D7522AD-EF42-4E61-860F-C5EE7ADC920F}" srcId="{A7E2D81E-7900-4DF4-BEF5-77A2812B0C4E}" destId="{4BD105F0-FCB2-4292-8534-EF3F82555BF1}" srcOrd="1" destOrd="0" parTransId="{82243891-7EAF-4E58-B342-FB3AEF7D96D8}" sibTransId="{1B73A89F-B150-403E-8069-7813E3E859D3}"/>
-    <dgm:cxn modelId="{2058D512-BFDC-429D-8108-A884B1DF591E}" type="presOf" srcId="{9FCE91AE-B52F-45FA-A0C5-CA2E6E43F0FC}" destId="{DFAC233F-FFFB-4BE5-9FC7-55A2752E1DAD}" srcOrd="0" destOrd="0" presId="urn:microsoft.com/office/officeart/2005/8/layout/orgChart1"/>
-    <dgm:cxn modelId="{F1E4A56E-64BE-44F4-8E42-D61EDD68880B}" srcId="{26CDFC28-47AA-4502-887A-33E7C0CE0838}" destId="{F0588C2A-6766-47BF-AE7C-52B851FABC21}" srcOrd="0" destOrd="0" parTransId="{5ED6D770-BF3B-4684-98EB-5ABB516FF23D}" sibTransId="{AFD6C0FD-0670-49CC-B34D-0E113DDEE343}"/>
-    <dgm:cxn modelId="{A25B346A-AF67-44D0-A601-4D4A0B7FEEC8}" srcId="{A7E2D81E-7900-4DF4-BEF5-77A2812B0C4E}" destId="{C9F271EB-AA97-406F-A22E-048A336DC94A}" srcOrd="0" destOrd="0" parTransId="{CEB0D96F-42A5-4903-B863-AD62B81F61AE}" sibTransId="{994C4CAB-5619-4281-B81C-1EBED1C2EFE7}"/>
-    <dgm:cxn modelId="{F4CB865C-996A-492E-9E5F-2B17DE9381E0}" srcId="{26CDFC28-47AA-4502-887A-33E7C0CE0838}" destId="{8F21D5B7-1E81-4E68-9A3B-41478D9E578F}" srcOrd="1" destOrd="0" parTransId="{810F6CE3-7B9A-4BC5-B642-3E284064AEB8}" sibTransId="{0C0A6C55-CE4D-42AC-8392-A28B6E9C2042}"/>
-    <dgm:cxn modelId="{54CCCEDE-ECD4-498C-B465-8CA9F82A49C5}" type="presOf" srcId="{F8118993-C3C6-4246-A6BF-F9F2EC3DC9CB}" destId="{A2BECFDC-6DED-4CEA-B9D1-694651AD4E09}" srcOrd="1" destOrd="0" presId="urn:microsoft.com/office/officeart/2005/8/layout/orgChart1"/>
-    <dgm:cxn modelId="{079B3109-107E-4D2E-99FC-71764D1796B1}" type="presOf" srcId="{B23CD900-37E2-45DE-B384-F9885D55838B}" destId="{F6A2B30B-A958-479B-AD92-8D9166487761}" srcOrd="0" destOrd="0" presId="urn:microsoft.com/office/officeart/2005/8/layout/orgChart1"/>
-    <dgm:cxn modelId="{F3B26E1E-6947-4159-918E-E138CED3D239}" srcId="{B23CD900-37E2-45DE-B384-F9885D55838B}" destId="{A9576EC0-F780-411F-A988-792BB4B5827F}" srcOrd="0" destOrd="0" parTransId="{3C5DF98A-9E49-4EBC-AA28-3E96D9B53B39}" sibTransId="{4568403F-227F-414F-9181-6C36CA1FB882}"/>
-    <dgm:cxn modelId="{275E1EA8-9958-4385-AD1D-0D70F2B2E97E}" type="presOf" srcId="{998DBD50-443E-466A-9688-66A52BCFB283}" destId="{291B4844-977C-4B0C-9CCC-F7511A56BE71}" srcOrd="1" destOrd="0" presId="urn:microsoft.com/office/officeart/2005/8/layout/orgChart1"/>
-    <dgm:cxn modelId="{B8E816F8-7FA7-46B3-B6D5-3CE42BCFB40A}" srcId="{2A1734E5-F350-4043-A59D-090A5C851E96}" destId="{26CDFC28-47AA-4502-887A-33E7C0CE0838}" srcOrd="0" destOrd="0" parTransId="{3196F628-F850-402C-8DFF-32FDBF641FAF}" sibTransId="{31721E21-E4E4-40B3-A55D-F290C2DF3887}"/>
-    <dgm:cxn modelId="{3A8D22D7-D5E6-464A-8BEE-727F9246E9EE}" srcId="{F8118993-C3C6-4246-A6BF-F9F2EC3DC9CB}" destId="{CC818131-8C0B-4D2C-AEA4-5A1BD3A6EFF3}" srcOrd="1" destOrd="0" parTransId="{A3D548BD-E471-4C3A-9014-C70E7E2B5BFD}" sibTransId="{1E143EFF-2729-40A1-84B3-E819EDF8B7B2}"/>
-    <dgm:cxn modelId="{964962C0-3F9A-405E-B7CF-7320CA058054}" srcId="{4BD105F0-FCB2-4292-8534-EF3F82555BF1}" destId="{F8118993-C3C6-4246-A6BF-F9F2EC3DC9CB}" srcOrd="0" destOrd="0" parTransId="{763868FB-01C7-4C07-982A-E0002DD2F249}" sibTransId="{196FC47F-8F5E-4EE4-99DA-8228F767EF40}"/>
     <dgm:cxn modelId="{EC81C075-A36A-401B-894E-F2172C22244B}" type="presOf" srcId="{5B6E6A94-B82E-45A0-B538-B423850E5FD3}" destId="{044C785A-5A95-4E11-98D2-B0C3A8153197}" srcOrd="0" destOrd="0" presId="urn:microsoft.com/office/officeart/2005/8/layout/orgChart1"/>
-    <dgm:cxn modelId="{29D3F1C6-D8C1-4696-9225-7574825892FA}" srcId="{F8118993-C3C6-4246-A6BF-F9F2EC3DC9CB}" destId="{2AB59A33-B6A6-40FF-98F7-711698F4D26B}" srcOrd="0" destOrd="0" parTransId="{C1DBF8BC-E021-419E-A78A-05014B36B3B1}" sibTransId="{39934AF9-B63A-4C68-8C74-12CFA5946906}"/>
     <dgm:cxn modelId="{66587802-E1A1-4490-8EE6-DFFED4C0E387}" type="presOf" srcId="{8F21D5B7-1E81-4E68-9A3B-41478D9E578F}" destId="{9961A4E0-4305-4F81-8160-655C9A27D034}" srcOrd="0" destOrd="0" presId="urn:microsoft.com/office/officeart/2005/8/layout/orgChart1"/>
-    <dgm:cxn modelId="{87C8B196-323D-4EB7-8C11-259CEDD39083}" type="presOf" srcId="{AB5982FD-D354-4AAA-B978-F9826D0D05FB}" destId="{A48D18B2-265E-4299-AC55-85A70F37F6FA}" srcOrd="0" destOrd="0" presId="urn:microsoft.com/office/officeart/2005/8/layout/orgChart1"/>
-    <dgm:cxn modelId="{D4A13C56-EB94-4538-AEB3-2A061DCE865E}" srcId="{51C939BC-1F71-4B4B-B76E-5AB02C7C5227}" destId="{AB5982FD-D354-4AAA-B978-F9826D0D05FB}" srcOrd="1" destOrd="0" parTransId="{64BCB35C-1AA8-4805-AE44-941DC0666BE4}" sibTransId="{F8A871A7-1431-40C2-8D1E-3F46A7492963}"/>
-    <dgm:cxn modelId="{3F6EF168-B749-47B5-86FD-91ABA2C7D72E}" type="presOf" srcId="{A9576EC0-F780-411F-A988-792BB4B5827F}" destId="{3C3CC326-C1BB-4802-9C80-3024F7E2EFEC}" srcOrd="1" destOrd="0" presId="urn:microsoft.com/office/officeart/2005/8/layout/orgChart1"/>
-    <dgm:cxn modelId="{711E14F9-8AF4-4019-8C8C-9FE45B7D3E7C}" type="presOf" srcId="{9DFE08AD-6D40-40B9-8C6C-0D9B748E71FD}" destId="{8D8E53BF-D23C-4E66-A64D-69E3B5A64376}" srcOrd="0" destOrd="0" presId="urn:microsoft.com/office/officeart/2005/8/layout/orgChart1"/>
-    <dgm:cxn modelId="{5F5DBC77-905E-46B9-9C22-D2F5D1C757CB}" type="presOf" srcId="{6CEB8C34-32A9-47E6-A405-A04B3711CFB7}" destId="{F5F98A29-63BF-4AC3-9BF3-D3C7E3FF700B}" srcOrd="1" destOrd="0" presId="urn:microsoft.com/office/officeart/2005/8/layout/orgChart1"/>
-    <dgm:cxn modelId="{8D0015CC-72CA-4964-8D64-FA31789A0CF7}" type="presOf" srcId="{C9F271EB-AA97-406F-A22E-048A336DC94A}" destId="{EF58EAAC-E8FC-4E92-AC54-3E70E3CCE427}" srcOrd="0" destOrd="0" presId="urn:microsoft.com/office/officeart/2005/8/layout/orgChart1"/>
-    <dgm:cxn modelId="{D9F878CB-CD73-43B2-924C-4145A2798C53}" type="presOf" srcId="{CC818131-8C0B-4D2C-AEA4-5A1BD3A6EFF3}" destId="{D62139CB-9D8F-4560-A01D-A225FB31D9FF}" srcOrd="1" destOrd="0" presId="urn:microsoft.com/office/officeart/2005/8/layout/orgChart1"/>
-    <dgm:cxn modelId="{07BFF742-37D9-4F3A-8BCA-5FA7F3B3FFDA}" type="presOf" srcId="{51C939BC-1F71-4B4B-B76E-5AB02C7C5227}" destId="{617A3543-3392-450A-AE60-926A208DA196}" srcOrd="0" destOrd="0" presId="urn:microsoft.com/office/officeart/2005/8/layout/orgChart1"/>
-    <dgm:cxn modelId="{9A9E885B-6395-49FB-9E85-9D1E8F64238A}" type="presOf" srcId="{810F6CE3-7B9A-4BC5-B642-3E284064AEB8}" destId="{27D617F6-CD92-4160-85E9-3D135DEE9C6C}" srcOrd="0" destOrd="0" presId="urn:microsoft.com/office/officeart/2005/8/layout/orgChart1"/>
-    <dgm:cxn modelId="{2258E7B5-0D3B-4779-989F-0D2802E77E9D}" type="presOf" srcId="{2AB59A33-B6A6-40FF-98F7-711698F4D26B}" destId="{64076540-8FAD-4187-A304-8898DDD0C9A8}" srcOrd="0" destOrd="0" presId="urn:microsoft.com/office/officeart/2005/8/layout/orgChart1"/>
-    <dgm:cxn modelId="{F864C8BC-B8C9-4962-ABB8-1D4DB46F4EA9}" srcId="{C9F271EB-AA97-406F-A22E-048A336DC94A}" destId="{B23CD900-37E2-45DE-B384-F9885D55838B}" srcOrd="0" destOrd="0" parTransId="{C6CC40CD-5626-4A19-9936-F67709EE7AF0}" sibTransId="{4EC04109-3134-4314-B119-98550E78BF07}"/>
-    <dgm:cxn modelId="{5CA14EFE-56BA-428E-9344-6E54BD1CDAE3}" type="presOf" srcId="{A7E2D81E-7900-4DF4-BEF5-77A2812B0C4E}" destId="{91E1DAD5-A378-4F9D-90D3-E4D6E3B719CC}" srcOrd="0" destOrd="0" presId="urn:microsoft.com/office/officeart/2005/8/layout/orgChart1"/>
-    <dgm:cxn modelId="{CF4DF7D7-2777-4A2A-9B0C-8DEB23527131}" type="presOf" srcId="{C6CC40CD-5626-4A19-9936-F67709EE7AF0}" destId="{52AB23E0-53A6-4AC3-B89A-D72BC394F116}" srcOrd="0" destOrd="0" presId="urn:microsoft.com/office/officeart/2005/8/layout/orgChart1"/>
-    <dgm:cxn modelId="{7A6B7DFA-AF2C-46D0-9BF7-1A6F2A4BD05F}" type="presOf" srcId="{82243891-7EAF-4E58-B342-FB3AEF7D96D8}" destId="{AAC078B5-22C6-4465-AC60-50B89A62DAA4}" srcOrd="0" destOrd="0" presId="urn:microsoft.com/office/officeart/2005/8/layout/orgChart1"/>
-    <dgm:cxn modelId="{74291408-E599-4241-9208-778B25B35419}" type="presOf" srcId="{5AF5E628-F524-43D4-9C5A-5A8189560301}" destId="{C6B5F02F-BF16-4258-AC5A-D980E6777BDC}" srcOrd="1" destOrd="0" presId="urn:microsoft.com/office/officeart/2005/8/layout/orgChart1"/>
-    <dgm:cxn modelId="{5E6BA506-E2BF-4C29-92E3-F77F24013314}" type="presOf" srcId="{5AF5E628-F524-43D4-9C5A-5A8189560301}" destId="{710C924E-E30F-44DF-A6AA-7A0529BD66A0}" srcOrd="0" destOrd="0" presId="urn:microsoft.com/office/officeart/2005/8/layout/orgChart1"/>
-    <dgm:cxn modelId="{FCF7D859-A8C6-4A69-ACE7-6EBD0F233C30}" type="presOf" srcId="{D5432636-319A-4212-83DB-9D3BA6AA54A9}" destId="{AA253CD6-C0DA-4C21-9B15-7211D0914EE5}" srcOrd="0" destOrd="0" presId="urn:microsoft.com/office/officeart/2005/8/layout/orgChart1"/>
-    <dgm:cxn modelId="{5DC0E0BC-0122-42DE-9175-76DAAE24D215}" srcId="{A7E2D81E-7900-4DF4-BEF5-77A2812B0C4E}" destId="{51C939BC-1F71-4B4B-B76E-5AB02C7C5227}" srcOrd="3" destOrd="0" parTransId="{D5432636-319A-4212-83DB-9D3BA6AA54A9}" sibTransId="{C119049A-FECA-4579-956E-33C230BAA319}"/>
-    <dgm:cxn modelId="{0B387FA4-F216-482B-AC2E-CAF30E8346BB}" type="presOf" srcId="{64BCB35C-1AA8-4805-AE44-941DC0666BE4}" destId="{06BFC016-E41C-49B3-B96E-72E532519536}" srcOrd="0" destOrd="0" presId="urn:microsoft.com/office/officeart/2005/8/layout/orgChart1"/>
-    <dgm:cxn modelId="{2451FA6F-A70D-4E78-8CF6-9527C49C1AC2}" type="presOf" srcId="{F0588C2A-6766-47BF-AE7C-52B851FABC21}" destId="{4C0517EB-FD0E-41DA-B0F6-7F0D2D018DD1}" srcOrd="0" destOrd="0" presId="urn:microsoft.com/office/officeart/2005/8/layout/orgChart1"/>
-    <dgm:cxn modelId="{7D2A03B3-72A8-4CAF-A850-B82FF1D961C0}" type="presOf" srcId="{3196F628-F850-402C-8DFF-32FDBF641FAF}" destId="{6B1C0F91-7709-4920-8BCD-A2344D4FC3C1}" srcOrd="0" destOrd="0" presId="urn:microsoft.com/office/officeart/2005/8/layout/orgChart1"/>
-    <dgm:cxn modelId="{701FBC72-4CA4-403B-9C1B-0720F2EB9273}" type="presOf" srcId="{F0588C2A-6766-47BF-AE7C-52B851FABC21}" destId="{09C02F37-0DFF-472D-BC6B-B6584867F159}" srcOrd="1" destOrd="0" presId="urn:microsoft.com/office/officeart/2005/8/layout/orgChart1"/>
-    <dgm:cxn modelId="{794BC4DB-07B9-4B18-835E-CC6189AFDB89}" type="presOf" srcId="{C1DBF8BC-E021-419E-A78A-05014B36B3B1}" destId="{3D07C967-7F5A-4259-8C92-44D4DA2F7550}" srcOrd="0" destOrd="0" presId="urn:microsoft.com/office/officeart/2005/8/layout/orgChart1"/>
-    <dgm:cxn modelId="{F56EA288-A208-43A9-BC15-07480867F718}" type="presOf" srcId="{CF665F69-5C99-4ABA-84BB-EE78294ED608}" destId="{0EA51ED5-D16D-4D92-B6FA-B66031566B6A}" srcOrd="1" destOrd="0" presId="urn:microsoft.com/office/officeart/2005/8/layout/orgChart1"/>
-    <dgm:cxn modelId="{6D67D41E-CA24-4B50-B776-9590486E46E4}" type="presOf" srcId="{763868FB-01C7-4C07-982A-E0002DD2F249}" destId="{6E390A44-09EF-4120-ABD1-1835798D84D0}" srcOrd="0" destOrd="0" presId="urn:microsoft.com/office/officeart/2005/8/layout/orgChart1"/>
-    <dgm:cxn modelId="{D08B451E-BCB5-4E0B-8342-ED0CFBDE97DB}" type="presOf" srcId="{F8118993-C3C6-4246-A6BF-F9F2EC3DC9CB}" destId="{23D4122E-B967-488C-8CB8-9B0B4654BF0E}" srcOrd="0" destOrd="0" presId="urn:microsoft.com/office/officeart/2005/8/layout/orgChart1"/>
     <dgm:cxn modelId="{A331ECE4-3A51-47A2-B0EB-15A33C8106AE}" type="presParOf" srcId="{36B3E81A-E148-4D3B-88E5-4419A3BAFF40}" destId="{D465AAE9-80F9-4B15-8D00-FCD2F5B0741D}" srcOrd="0" destOrd="0" presId="urn:microsoft.com/office/officeart/2005/8/layout/orgChart1"/>
     <dgm:cxn modelId="{FDA91742-653C-4F89-9365-271A53D2AD08}" type="presParOf" srcId="{D465AAE9-80F9-4B15-8D00-FCD2F5B0741D}" destId="{3FD2C245-E911-4A1C-878D-89B50AA53502}" srcOrd="0" destOrd="0" presId="urn:microsoft.com/office/officeart/2005/8/layout/orgChart1"/>
     <dgm:cxn modelId="{4BBCF4DB-0FC6-453B-AD7D-F55E26A6C214}" type="presParOf" srcId="{3FD2C245-E911-4A1C-878D-89B50AA53502}" destId="{91E1DAD5-A378-4F9D-90D3-E4D6E3B719CC}" srcOrd="0" destOrd="0" presId="urn:microsoft.com/office/officeart/2005/8/layout/orgChart1"/>
@@ -13875,7 +13876,7 @@
           <p:cNvPr id="2" name="Title 1">
             <a:extLst>
               <a:ext uri="{FF2B5EF4-FFF2-40B4-BE49-F238E27FC236}">
-                <a16:creationId xmlns="" xmlns:a16="http://schemas.microsoft.com/office/drawing/2014/main" id="{F4727C6F-3982-4E54-AA66-B4E0AA33FF66}"/>
+                <a16:creationId xmlns:a16="http://schemas.microsoft.com/office/drawing/2014/main" xmlns="" id="{F4727C6F-3982-4E54-AA66-B4E0AA33FF66}"/>
               </a:ext>
             </a:extLst>
           </p:cNvPr>
@@ -13904,7 +13905,7 @@
           <p:cNvPr id="3" name="Content Placeholder 2">
             <a:extLst>
               <a:ext uri="{FF2B5EF4-FFF2-40B4-BE49-F238E27FC236}">
-                <a16:creationId xmlns="" xmlns:a16="http://schemas.microsoft.com/office/drawing/2014/main" id="{1134DAC4-9E94-441C-A9BE-87750F6F60A2}"/>
+                <a16:creationId xmlns:a16="http://schemas.microsoft.com/office/drawing/2014/main" xmlns="" id="{1134DAC4-9E94-441C-A9BE-87750F6F60A2}"/>
               </a:ext>
             </a:extLst>
           </p:cNvPr>
@@ -14176,6 +14177,13 @@
   <p:clrMapOvr>
     <a:masterClrMapping/>
   </p:clrMapOvr>
+  <p:timing>
+    <p:tnLst>
+      <p:par>
+        <p:cTn id="1" dur="indefinite" restart="never" nodeType="tmRoot"/>
+      </p:par>
+    </p:tnLst>
+  </p:timing>
 </p:sld>
 </file>
 
@@ -14196,132 +14204,51 @@
           <a:chExt cx="0" cy="0"/>
         </a:xfrm>
       </p:grpSpPr>
-      <p:sp>
-        <p:nvSpPr>
-          <p:cNvPr id="2" name="Title 1">
+      <p:pic>
+        <p:nvPicPr>
+          <p:cNvPr id="4" name="Content Placeholder 3"/>
+          <p:cNvPicPr>
+            <a:picLocks noGrp="1" noChangeAspect="1"/>
+          </p:cNvPicPr>
+          <p:nvPr>
+            <p:ph idx="4294967295"/>
+          </p:nvPr>
+        </p:nvPicPr>
+        <p:blipFill rotWithShape="1">
+          <a:blip r:embed="rId2" cstate="print">
             <a:extLst>
-              <a:ext uri="{FF2B5EF4-FFF2-40B4-BE49-F238E27FC236}">
-                <a16:creationId xmlns="" xmlns:a16="http://schemas.microsoft.com/office/drawing/2014/main" id="{3E1AC600-D16C-47B7-9075-94DA61007B25}"/>
+              <a:ext uri="{28A0092B-C50C-407E-A947-70E740481C1C}">
+                <a14:useLocalDpi xmlns:a14="http://schemas.microsoft.com/office/drawing/2010/main" val="0"/>
               </a:ext>
             </a:extLst>
-          </p:cNvPr>
-          <p:cNvSpPr>
-            <a:spLocks noGrp="1"/>
-          </p:cNvSpPr>
-          <p:nvPr>
-            <p:ph type="title"/>
-          </p:nvPr>
-        </p:nvSpPr>
+          </a:blip>
+          <a:srcRect l="711" t="2228" r="973" b="2182"/>
+          <a:stretch/>
+        </p:blipFill>
         <p:spPr>
           <a:xfrm>
-            <a:off x="1097280" y="286603"/>
-            <a:ext cx="10058400" cy="1450757"/>
+            <a:off x="2757715" y="86832"/>
+            <a:ext cx="6473372" cy="6192865"/>
           </a:xfrm>
         </p:spPr>
-        <p:txBody>
-          <a:bodyPr/>
-          <a:lstStyle/>
-          <a:p>
-            <a:r>
-              <a:rPr lang="en-US" dirty="0"/>
-              <a:t>Big Data: Tools</a:t>
-            </a:r>
-            <a:endParaRPr lang="x-none" dirty="0"/>
-          </a:p>
-        </p:txBody>
-      </p:sp>
-      <p:sp>
-        <p:nvSpPr>
-          <p:cNvPr id="3" name="Content Placeholder 2">
-            <a:extLst>
-              <a:ext uri="{FF2B5EF4-FFF2-40B4-BE49-F238E27FC236}">
-                <a16:creationId xmlns="" xmlns:a16="http://schemas.microsoft.com/office/drawing/2014/main" id="{DDC8679B-3323-4E4B-ABD6-BD8748DF3AEB}"/>
-              </a:ext>
-            </a:extLst>
-          </p:cNvPr>
-          <p:cNvSpPr>
-            <a:spLocks noGrp="1"/>
-          </p:cNvSpPr>
-          <p:nvPr>
-            <p:ph idx="1"/>
-          </p:nvPr>
-        </p:nvSpPr>
-        <p:spPr/>
-        <p:txBody>
-          <a:bodyPr/>
-          <a:lstStyle/>
-          <a:p>
-            <a:pPr marL="0" indent="0">
-              <a:buNone/>
-            </a:pPr>
-            <a:r>
-              <a:rPr lang="en-US" sz="3200" b="1" dirty="0"/>
-              <a:t>Hadoop</a:t>
-            </a:r>
-            <a:endParaRPr lang="en-US" b="1" dirty="0"/>
-          </a:p>
-          <a:p>
-            <a:pPr>
-              <a:buFont typeface="Wingdings" panose="05000000000000000000" pitchFamily="2" charset="2"/>
-              <a:buChar char="v"/>
-            </a:pPr>
-            <a:r>
-              <a:rPr lang="en-US" dirty="0"/>
-              <a:t>Hadoop software library is a framework</a:t>
-            </a:r>
-          </a:p>
-          <a:p>
-            <a:pPr>
-              <a:buFont typeface="Wingdings" panose="05000000000000000000" pitchFamily="2" charset="2"/>
-              <a:buChar char="v"/>
-            </a:pPr>
-            <a:r>
-              <a:rPr lang="en-US" dirty="0"/>
-              <a:t>Help in distributed processing of large data sets across clusters of computers</a:t>
-            </a:r>
-          </a:p>
-          <a:p>
-            <a:pPr>
-              <a:buFont typeface="Wingdings" panose="05000000000000000000" pitchFamily="2" charset="2"/>
-              <a:buChar char="v"/>
-            </a:pPr>
-            <a:r>
-              <a:rPr lang="en-US" dirty="0"/>
-              <a:t>Two method to start single node or cluster mode</a:t>
-            </a:r>
-          </a:p>
-          <a:p>
-            <a:pPr>
-              <a:buFont typeface="Wingdings" panose="05000000000000000000" pitchFamily="2" charset="2"/>
-              <a:buChar char="v"/>
-            </a:pPr>
-            <a:r>
-              <a:rPr lang="en-US" dirty="0"/>
-              <a:t>Latest stable version is 2.9.2 </a:t>
-            </a:r>
-          </a:p>
-          <a:p>
-            <a:pPr>
-              <a:buFont typeface="Wingdings" panose="05000000000000000000" pitchFamily="2" charset="2"/>
-              <a:buChar char="v"/>
-            </a:pPr>
-            <a:r>
-              <a:rPr lang="en-US" dirty="0"/>
-              <a:t>Few Important features are HDFS, YARN,MAPREDUCE, cost efficient, Hadoop libraries and many more</a:t>
-            </a:r>
-          </a:p>
-        </p:txBody>
-      </p:sp>
+      </p:pic>
     </p:spTree>
     <p:extLst>
       <p:ext uri="{BB962C8B-B14F-4D97-AF65-F5344CB8AC3E}">
-        <p14:creationId xmlns:p14="http://schemas.microsoft.com/office/powerpoint/2010/main" val="2845727905"/>
+        <p14:creationId xmlns:p14="http://schemas.microsoft.com/office/powerpoint/2010/main" val="1516630887"/>
       </p:ext>
     </p:extLst>
   </p:cSld>
   <p:clrMapOvr>
     <a:masterClrMapping/>
   </p:clrMapOvr>
+  <p:timing>
+    <p:tnLst>
+      <p:par>
+        <p:cTn id="1" dur="indefinite" restart="never" nodeType="tmRoot"/>
+      </p:par>
+    </p:tnLst>
+  </p:timing>
 </p:sld>
 </file>
 
@@ -14344,10 +14271,44 @@
       </p:grpSpPr>
       <p:sp>
         <p:nvSpPr>
+          <p:cNvPr id="2" name="Title 1">
+            <a:extLst>
+              <a:ext uri="{FF2B5EF4-FFF2-40B4-BE49-F238E27FC236}">
+                <a16:creationId xmlns:a16="http://schemas.microsoft.com/office/drawing/2014/main" xmlns="" id="{3E1AC600-D16C-47B7-9075-94DA61007B25}"/>
+              </a:ext>
+            </a:extLst>
+          </p:cNvPr>
+          <p:cNvSpPr>
+            <a:spLocks noGrp="1"/>
+          </p:cNvSpPr>
+          <p:nvPr>
+            <p:ph type="title"/>
+          </p:nvPr>
+        </p:nvSpPr>
+        <p:spPr>
+          <a:xfrm>
+            <a:off x="1097280" y="286603"/>
+            <a:ext cx="10058400" cy="1450757"/>
+          </a:xfrm>
+        </p:spPr>
+        <p:txBody>
+          <a:bodyPr/>
+          <a:lstStyle/>
+          <a:p>
+            <a:r>
+              <a:rPr lang="en-US" dirty="0"/>
+              <a:t>Big Data: Tools</a:t>
+            </a:r>
+            <a:endParaRPr lang="x-none" dirty="0"/>
+          </a:p>
+        </p:txBody>
+      </p:sp>
+      <p:sp>
+        <p:nvSpPr>
           <p:cNvPr id="3" name="Content Placeholder 2">
             <a:extLst>
               <a:ext uri="{FF2B5EF4-FFF2-40B4-BE49-F238E27FC236}">
-                <a16:creationId xmlns="" xmlns:a16="http://schemas.microsoft.com/office/drawing/2014/main" id="{12CE7563-67E4-470C-A76A-FD376D4C2471}"/>
+                <a16:creationId xmlns:a16="http://schemas.microsoft.com/office/drawing/2014/main" xmlns="" id="{DDC8679B-3323-4E4B-ABD6-BD8748DF3AEB}"/>
               </a:ext>
             </a:extLst>
           </p:cNvPr>
@@ -14360,15 +14321,17 @@
         </p:nvSpPr>
         <p:spPr/>
         <p:txBody>
-          <a:bodyPr>
-            <a:normAutofit/>
-          </a:bodyPr>
+          <a:bodyPr/>
           <a:lstStyle/>
           <a:p>
-            <a:r>
-              <a:rPr lang="en-US" sz="3200" dirty="0"/>
-              <a:t>SPARK</a:t>
-            </a:r>
+            <a:pPr marL="0" indent="0">
+              <a:buNone/>
+            </a:pPr>
+            <a:r>
+              <a:rPr lang="en-US" sz="3200" b="1" dirty="0"/>
+              <a:t>Hadoop</a:t>
+            </a:r>
+            <a:endParaRPr lang="en-US" b="1" dirty="0"/>
           </a:p>
           <a:p>
             <a:pPr>
@@ -14376,10 +14339,9 @@
               <a:buChar char="v"/>
             </a:pPr>
             <a:r>
-              <a:rPr lang="x-none" dirty="0"/>
-              <a:t>Apache Spark is the alternative — and in many aspects the successor — of Apache Hadoop. </a:t>
-            </a:r>
-            <a:endParaRPr lang="en-US" dirty="0"/>
+              <a:rPr lang="en-US" dirty="0"/>
+              <a:t>Hadoop software library is a framework</a:t>
+            </a:r>
           </a:p>
           <a:p>
             <a:pPr>
@@ -14388,15 +14350,7 @@
             </a:pPr>
             <a:r>
               <a:rPr lang="en-US" dirty="0"/>
-              <a:t>Built </a:t>
-            </a:r>
-            <a:r>
-              <a:rPr lang="x-none" dirty="0"/>
-              <a:t>to address the shortcomings of Hadoop</a:t>
-            </a:r>
-            <a:r>
-              <a:rPr lang="en-US" dirty="0"/>
-              <a:t>.</a:t>
+              <a:t>Help in distributed processing of large data sets across clusters of computers</a:t>
             </a:r>
           </a:p>
           <a:p>
@@ -14406,7 +14360,7 @@
             </a:pPr>
             <a:r>
               <a:rPr lang="en-US" dirty="0"/>
-              <a:t>Apache Spark achieves high performance for both batch and streaming data.</a:t>
+              <a:t>Two method to start single node or cluster mode</a:t>
             </a:r>
           </a:p>
           <a:p>
@@ -14416,7 +14370,7 @@
             </a:pPr>
             <a:r>
               <a:rPr lang="en-US" dirty="0"/>
-              <a:t>Run workload 100X faster.</a:t>
+              <a:t>Latest stable version is 2.9.2 </a:t>
             </a:r>
           </a:p>
           <a:p>
@@ -14426,84 +14380,28 @@
             </a:pPr>
             <a:r>
               <a:rPr lang="en-US" dirty="0"/>
-              <a:t>Offers over 80 high-level operators that make it easy to build parallel apps.</a:t>
-            </a:r>
-          </a:p>
-          <a:p>
-            <a:pPr>
-              <a:buFont typeface="Wingdings" panose="05000000000000000000" pitchFamily="2" charset="2"/>
-              <a:buChar char="v"/>
-            </a:pPr>
-            <a:r>
-              <a:rPr lang="en-US" dirty="0"/>
-              <a:t> It powers a stack of libraries including SQL </a:t>
-            </a:r>
-            <a:r>
-              <a:rPr lang="en-US"/>
-              <a:t>and Data Frames</a:t>
-            </a:r>
-            <a:r>
-              <a:rPr lang="en-US" dirty="0"/>
-              <a:t>, MLlib for machine learning, GraphX, and Spark Streaming</a:t>
-            </a:r>
-          </a:p>
-          <a:p>
-            <a:pPr>
-              <a:buFont typeface="Wingdings" panose="05000000000000000000" pitchFamily="2" charset="2"/>
-              <a:buChar char="v"/>
-            </a:pPr>
-            <a:r>
-              <a:rPr lang="en-US" dirty="0"/>
-              <a:t>Latest stable version is 2.4.0 with multiple advance features</a:t>
-            </a:r>
-            <a:endParaRPr lang="x-none" dirty="0"/>
-          </a:p>
-        </p:txBody>
-      </p:sp>
-      <p:sp>
-        <p:nvSpPr>
-          <p:cNvPr id="4" name="Title 1">
-            <a:extLst>
-              <a:ext uri="{FF2B5EF4-FFF2-40B4-BE49-F238E27FC236}">
-                <a16:creationId xmlns="" xmlns:a16="http://schemas.microsoft.com/office/drawing/2014/main" id="{D1F22F75-6806-481E-A0D8-FC161C3266D1}"/>
-              </a:ext>
-            </a:extLst>
-          </p:cNvPr>
-          <p:cNvSpPr>
-            <a:spLocks noGrp="1"/>
-          </p:cNvSpPr>
-          <p:nvPr>
-            <p:ph type="title"/>
-          </p:nvPr>
-        </p:nvSpPr>
-        <p:spPr>
-          <a:xfrm>
-            <a:off x="1096963" y="287338"/>
-            <a:ext cx="10058400" cy="1449387"/>
-          </a:xfrm>
-        </p:spPr>
-        <p:txBody>
-          <a:bodyPr/>
-          <a:lstStyle/>
-          <a:p>
-            <a:r>
-              <a:rPr lang="en-US" dirty="0"/>
-              <a:t>Big Data: Tools</a:t>
-            </a:r>
-            <a:endParaRPr lang="x-none" dirty="0"/>
+              <a:t>Few Important features are HDFS, YARN,MAPREDUCE, cost efficient, Hadoop libraries and many more</a:t>
+            </a:r>
           </a:p>
         </p:txBody>
       </p:sp>
     </p:spTree>
     <p:extLst>
       <p:ext uri="{BB962C8B-B14F-4D97-AF65-F5344CB8AC3E}">
-        <p14:creationId xmlns:p14="http://schemas.microsoft.com/office/powerpoint/2010/main" val="2181567895"/>
+        <p14:creationId xmlns:p14="http://schemas.microsoft.com/office/powerpoint/2010/main" val="2845727905"/>
       </p:ext>
     </p:extLst>
   </p:cSld>
   <p:clrMapOvr>
     <a:masterClrMapping/>
   </p:clrMapOvr>
+  <p:timing>
+    <p:tnLst>
+      <p:par>
+        <p:cTn id="1" dur="indefinite" restart="never" nodeType="tmRoot"/>
+      </p:par>
+    </p:tnLst>
+  </p:timing>
 </p:sld>
 </file>
 
@@ -14627,6 +14525,195 @@
       </p:grpSpPr>
       <p:sp>
         <p:nvSpPr>
+          <p:cNvPr id="3" name="Content Placeholder 2">
+            <a:extLst>
+              <a:ext uri="{FF2B5EF4-FFF2-40B4-BE49-F238E27FC236}">
+                <a16:creationId xmlns:a16="http://schemas.microsoft.com/office/drawing/2014/main" xmlns="" id="{12CE7563-67E4-470C-A76A-FD376D4C2471}"/>
+              </a:ext>
+            </a:extLst>
+          </p:cNvPr>
+          <p:cNvSpPr>
+            <a:spLocks noGrp="1"/>
+          </p:cNvSpPr>
+          <p:nvPr>
+            <p:ph idx="1"/>
+          </p:nvPr>
+        </p:nvSpPr>
+        <p:spPr/>
+        <p:txBody>
+          <a:bodyPr>
+            <a:normAutofit/>
+          </a:bodyPr>
+          <a:lstStyle/>
+          <a:p>
+            <a:r>
+              <a:rPr lang="en-US" sz="3200" dirty="0"/>
+              <a:t>SPARK</a:t>
+            </a:r>
+          </a:p>
+          <a:p>
+            <a:pPr>
+              <a:buFont typeface="Wingdings" panose="05000000000000000000" pitchFamily="2" charset="2"/>
+              <a:buChar char="v"/>
+            </a:pPr>
+            <a:r>
+              <a:rPr lang="x-none" dirty="0"/>
+              <a:t>Apache Spark is the alternative — and in many aspects the successor — of Apache Hadoop. </a:t>
+            </a:r>
+            <a:endParaRPr lang="en-US" dirty="0"/>
+          </a:p>
+          <a:p>
+            <a:pPr>
+              <a:buFont typeface="Wingdings" panose="05000000000000000000" pitchFamily="2" charset="2"/>
+              <a:buChar char="v"/>
+            </a:pPr>
+            <a:r>
+              <a:rPr lang="en-US" dirty="0"/>
+              <a:t>Built </a:t>
+            </a:r>
+            <a:r>
+              <a:rPr lang="x-none" dirty="0"/>
+              <a:t>to address the shortcomings of Hadoop</a:t>
+            </a:r>
+            <a:r>
+              <a:rPr lang="en-US" dirty="0"/>
+              <a:t>.</a:t>
+            </a:r>
+          </a:p>
+          <a:p>
+            <a:pPr>
+              <a:buFont typeface="Wingdings" panose="05000000000000000000" pitchFamily="2" charset="2"/>
+              <a:buChar char="v"/>
+            </a:pPr>
+            <a:r>
+              <a:rPr lang="en-US" dirty="0"/>
+              <a:t>Apache Spark achieves high performance for both batch and streaming data.</a:t>
+            </a:r>
+          </a:p>
+          <a:p>
+            <a:pPr>
+              <a:buFont typeface="Wingdings" panose="05000000000000000000" pitchFamily="2" charset="2"/>
+              <a:buChar char="v"/>
+            </a:pPr>
+            <a:r>
+              <a:rPr lang="en-US" dirty="0"/>
+              <a:t>Run workload 100X faster.</a:t>
+            </a:r>
+          </a:p>
+          <a:p>
+            <a:pPr>
+              <a:buFont typeface="Wingdings" panose="05000000000000000000" pitchFamily="2" charset="2"/>
+              <a:buChar char="v"/>
+            </a:pPr>
+            <a:r>
+              <a:rPr lang="en-US" dirty="0"/>
+              <a:t>Offers over 80 high-level operators that make it easy to build parallel apps.</a:t>
+            </a:r>
+          </a:p>
+          <a:p>
+            <a:pPr>
+              <a:buFont typeface="Wingdings" panose="05000000000000000000" pitchFamily="2" charset="2"/>
+              <a:buChar char="v"/>
+            </a:pPr>
+            <a:r>
+              <a:rPr lang="en-US" dirty="0"/>
+              <a:t> It powers a stack of libraries including SQL </a:t>
+            </a:r>
+            <a:r>
+              <a:rPr lang="en-US"/>
+              <a:t>and Data Frames</a:t>
+            </a:r>
+            <a:r>
+              <a:rPr lang="en-US" dirty="0"/>
+              <a:t>, MLlib for machine learning, GraphX, and Spark Streaming</a:t>
+            </a:r>
+          </a:p>
+          <a:p>
+            <a:pPr>
+              <a:buFont typeface="Wingdings" panose="05000000000000000000" pitchFamily="2" charset="2"/>
+              <a:buChar char="v"/>
+            </a:pPr>
+            <a:r>
+              <a:rPr lang="en-US" dirty="0"/>
+              <a:t>Latest stable version is 2.4.0 with multiple advance features</a:t>
+            </a:r>
+            <a:endParaRPr lang="x-none" dirty="0"/>
+          </a:p>
+        </p:txBody>
+      </p:sp>
+      <p:sp>
+        <p:nvSpPr>
+          <p:cNvPr id="4" name="Title 1">
+            <a:extLst>
+              <a:ext uri="{FF2B5EF4-FFF2-40B4-BE49-F238E27FC236}">
+                <a16:creationId xmlns:a16="http://schemas.microsoft.com/office/drawing/2014/main" xmlns="" id="{D1F22F75-6806-481E-A0D8-FC161C3266D1}"/>
+              </a:ext>
+            </a:extLst>
+          </p:cNvPr>
+          <p:cNvSpPr>
+            <a:spLocks noGrp="1"/>
+          </p:cNvSpPr>
+          <p:nvPr>
+            <p:ph type="title"/>
+          </p:nvPr>
+        </p:nvSpPr>
+        <p:spPr>
+          <a:xfrm>
+            <a:off x="1096963" y="287338"/>
+            <a:ext cx="10058400" cy="1449387"/>
+          </a:xfrm>
+        </p:spPr>
+        <p:txBody>
+          <a:bodyPr/>
+          <a:lstStyle/>
+          <a:p>
+            <a:r>
+              <a:rPr lang="en-US" dirty="0"/>
+              <a:t>Big Data: Tools</a:t>
+            </a:r>
+            <a:endParaRPr lang="x-none" dirty="0"/>
+          </a:p>
+        </p:txBody>
+      </p:sp>
+    </p:spTree>
+    <p:extLst>
+      <p:ext uri="{BB962C8B-B14F-4D97-AF65-F5344CB8AC3E}">
+        <p14:creationId xmlns:p14="http://schemas.microsoft.com/office/powerpoint/2010/main" val="2181567895"/>
+      </p:ext>
+    </p:extLst>
+  </p:cSld>
+  <p:clrMapOvr>
+    <a:masterClrMapping/>
+  </p:clrMapOvr>
+  <p:timing>
+    <p:tnLst>
+      <p:par>
+        <p:cTn id="1" dur="indefinite" restart="never" nodeType="tmRoot"/>
+      </p:par>
+    </p:tnLst>
+  </p:timing>
+</p:sld>
+</file>
+
+<file path=ppt/slides/slide21.xml><?xml version="1.0" encoding="utf-8"?>
+<p:sld xmlns:a="http://schemas.openxmlformats.org/drawingml/2006/main" xmlns:r="http://schemas.openxmlformats.org/officeDocument/2006/relationships" xmlns:p="http://schemas.openxmlformats.org/presentationml/2006/main">
+  <p:cSld>
+    <p:spTree>
+      <p:nvGrpSpPr>
+        <p:cNvPr id="1" name=""/>
+        <p:cNvGrpSpPr/>
+        <p:nvPr/>
+      </p:nvGrpSpPr>
+      <p:grpSpPr>
+        <a:xfrm>
+          <a:off x="0" y="0"/>
+          <a:ext cx="0" cy="0"/>
+          <a:chOff x="0" y="0"/>
+          <a:chExt cx="0" cy="0"/>
+        </a:xfrm>
+      </p:grpSpPr>
+      <p:sp>
+        <p:nvSpPr>
           <p:cNvPr id="2" name="Title 1"/>
           <p:cNvSpPr>
             <a:spLocks noGrp="1"/>
@@ -14706,7 +14793,7 @@
 </p:sld>
 </file>
 
-<file path=ppt/slides/slide21.xml><?xml version="1.0" encoding="utf-8"?>
+<file path=ppt/slides/slide22.xml><?xml version="1.0" encoding="utf-8"?>
 <p:sld xmlns:a="http://schemas.openxmlformats.org/drawingml/2006/main" xmlns:r="http://schemas.openxmlformats.org/officeDocument/2006/relationships" xmlns:p="http://schemas.openxmlformats.org/presentationml/2006/main">
   <p:cSld>
     <p:spTree>
@@ -14815,194 +14902,6 @@
     <p:extLst>
       <p:ext uri="{BB962C8B-B14F-4D97-AF65-F5344CB8AC3E}">
         <p14:creationId xmlns:p14="http://schemas.microsoft.com/office/powerpoint/2010/main" val="494284243"/>
-      </p:ext>
-    </p:extLst>
-  </p:cSld>
-  <p:clrMapOvr>
-    <a:masterClrMapping/>
-  </p:clrMapOvr>
-</p:sld>
-</file>
-
-<file path=ppt/slides/slide22.xml><?xml version="1.0" encoding="utf-8"?>
-<p:sld xmlns:a="http://schemas.openxmlformats.org/drawingml/2006/main" xmlns:r="http://schemas.openxmlformats.org/officeDocument/2006/relationships" xmlns:p="http://schemas.openxmlformats.org/presentationml/2006/main">
-  <p:cSld>
-    <p:spTree>
-      <p:nvGrpSpPr>
-        <p:cNvPr id="1" name=""/>
-        <p:cNvGrpSpPr/>
-        <p:nvPr/>
-      </p:nvGrpSpPr>
-      <p:grpSpPr>
-        <a:xfrm>
-          <a:off x="0" y="0"/>
-          <a:ext cx="0" cy="0"/>
-          <a:chOff x="0" y="0"/>
-          <a:chExt cx="0" cy="0"/>
-        </a:xfrm>
-      </p:grpSpPr>
-      <p:sp>
-        <p:nvSpPr>
-          <p:cNvPr id="2" name="Title 1"/>
-          <p:cNvSpPr>
-            <a:spLocks noGrp="1"/>
-          </p:cNvSpPr>
-          <p:nvPr>
-            <p:ph type="title"/>
-          </p:nvPr>
-        </p:nvSpPr>
-        <p:spPr/>
-        <p:txBody>
-          <a:bodyPr/>
-          <a:lstStyle/>
-          <a:p>
-            <a:r>
-              <a:rPr lang="en-US" dirty="0" smtClean="0"/>
-              <a:t>Algorithm: DOES and USED </a:t>
-            </a:r>
-            <a:endParaRPr lang="en-US" dirty="0"/>
-          </a:p>
-        </p:txBody>
-      </p:sp>
-      <p:sp>
-        <p:nvSpPr>
-          <p:cNvPr id="3" name="Content Placeholder 2"/>
-          <p:cNvSpPr>
-            <a:spLocks noGrp="1"/>
-          </p:cNvSpPr>
-          <p:nvPr>
-            <p:ph idx="1"/>
-          </p:nvPr>
-        </p:nvSpPr>
-        <p:spPr/>
-        <p:txBody>
-          <a:bodyPr>
-            <a:normAutofit fontScale="85000" lnSpcReduction="20000"/>
-          </a:bodyPr>
-          <a:lstStyle/>
-          <a:p>
-            <a:pPr marL="58738" indent="0">
-              <a:buNone/>
-            </a:pPr>
-            <a:r>
-              <a:rPr lang="en-US" b="1" dirty="0" smtClean="0"/>
-              <a:t>WHAT IT DOES?</a:t>
-            </a:r>
-            <a:r>
-              <a:rPr lang="en-US" dirty="0" smtClean="0"/>
-              <a:t> </a:t>
-            </a:r>
-          </a:p>
-          <a:p>
-            <a:pPr marL="58738" indent="0">
-              <a:buFont typeface="Wingdings" panose="05000000000000000000" pitchFamily="2" charset="2"/>
-              <a:buChar char="v"/>
-            </a:pPr>
-            <a:r>
-              <a:rPr lang="en-US" dirty="0" smtClean="0"/>
-              <a:t> Follow instructions code </a:t>
-            </a:r>
-          </a:p>
-          <a:p>
-            <a:pPr marL="58738" indent="0">
-              <a:buFont typeface="Wingdings" panose="05000000000000000000" pitchFamily="2" charset="2"/>
-              <a:buChar char="v"/>
-            </a:pPr>
-            <a:r>
-              <a:rPr lang="en-US" dirty="0"/>
-              <a:t> </a:t>
-            </a:r>
-            <a:r>
-              <a:rPr lang="en-US" dirty="0" smtClean="0"/>
-              <a:t>Calculation (Logical/Mathematical)</a:t>
-            </a:r>
-          </a:p>
-          <a:p>
-            <a:pPr marL="58738" indent="0">
-              <a:buFont typeface="Wingdings" panose="05000000000000000000" pitchFamily="2" charset="2"/>
-              <a:buChar char="v"/>
-            </a:pPr>
-            <a:r>
-              <a:rPr lang="en-US" dirty="0" smtClean="0"/>
-              <a:t> Data Manipulation</a:t>
-            </a:r>
-          </a:p>
-          <a:p>
-            <a:pPr marL="58738" indent="0">
-              <a:buFont typeface="Wingdings" panose="05000000000000000000" pitchFamily="2" charset="2"/>
-              <a:buChar char="v"/>
-            </a:pPr>
-            <a:r>
-              <a:rPr lang="en-US" dirty="0" smtClean="0"/>
-              <a:t> Data Processing</a:t>
-            </a:r>
-          </a:p>
-          <a:p>
-            <a:pPr marL="58738" indent="0">
-              <a:buNone/>
-            </a:pPr>
-            <a:r>
-              <a:rPr lang="en-US" b="1" dirty="0" smtClean="0"/>
-              <a:t> IT IS USED FOR</a:t>
-            </a:r>
-          </a:p>
-          <a:p>
-            <a:pPr marL="115888" indent="-57150">
-              <a:buFont typeface="Wingdings" panose="05000000000000000000" pitchFamily="2" charset="2"/>
-              <a:buChar char="v"/>
-            </a:pPr>
-            <a:r>
-              <a:rPr lang="en-US" dirty="0" smtClean="0"/>
-              <a:t> Searching</a:t>
-            </a:r>
-          </a:p>
-          <a:p>
-            <a:pPr marL="115888" indent="-57150">
-              <a:buFont typeface="Wingdings" panose="05000000000000000000" pitchFamily="2" charset="2"/>
-              <a:buChar char="v"/>
-            </a:pPr>
-            <a:r>
-              <a:rPr lang="en-US" dirty="0" smtClean="0"/>
-              <a:t> Sorting</a:t>
-            </a:r>
-          </a:p>
-          <a:p>
-            <a:pPr marL="115888" indent="-57150">
-              <a:buFont typeface="Wingdings" panose="05000000000000000000" pitchFamily="2" charset="2"/>
-              <a:buChar char="v"/>
-            </a:pPr>
-            <a:r>
-              <a:rPr lang="en-US" dirty="0" smtClean="0"/>
-              <a:t> Scheduling</a:t>
-            </a:r>
-          </a:p>
-          <a:p>
-            <a:pPr marL="115888" indent="-57150">
-              <a:buFont typeface="Wingdings" panose="05000000000000000000" pitchFamily="2" charset="2"/>
-              <a:buChar char="v"/>
-            </a:pPr>
-            <a:r>
-              <a:rPr lang="en-US" dirty="0" smtClean="0"/>
-              <a:t> Automated Reasoning</a:t>
-            </a:r>
-          </a:p>
-          <a:p>
-            <a:pPr marL="115888" indent="-57150">
-              <a:buFont typeface="Wingdings" panose="05000000000000000000" pitchFamily="2" charset="2"/>
-              <a:buChar char="v"/>
-            </a:pPr>
-            <a:r>
-              <a:rPr lang="en-US" dirty="0" smtClean="0"/>
-              <a:t> Automate Operations/Tasks</a:t>
-            </a:r>
-            <a:endParaRPr lang="en-US" dirty="0"/>
-          </a:p>
-        </p:txBody>
-      </p:sp>
-    </p:spTree>
-    <p:extLst>
-      <p:ext uri="{BB962C8B-B14F-4D97-AF65-F5344CB8AC3E}">
-        <p14:creationId xmlns:p14="http://schemas.microsoft.com/office/powerpoint/2010/main" val="416887670"/>
       </p:ext>
     </p:extLst>
   </p:cSld>
@@ -15046,7 +14945,7 @@
           <a:p>
             <a:r>
               <a:rPr lang="en-US" dirty="0" smtClean="0"/>
-              <a:t>Algorithm: Classification</a:t>
+              <a:t>Algorithm: DOES and USED </a:t>
             </a:r>
             <a:endParaRPr lang="en-US" dirty="0"/>
           </a:p>
@@ -15065,206 +14964,132 @@
         <p:spPr/>
         <p:txBody>
           <a:bodyPr>
-            <a:normAutofit/>
+            <a:normAutofit fontScale="85000" lnSpcReduction="20000"/>
           </a:bodyPr>
           <a:lstStyle/>
           <a:p>
-            <a:pPr marL="0" indent="0">
+            <a:pPr marL="58738" indent="0">
               <a:buNone/>
             </a:pPr>
             <a:r>
+              <a:rPr lang="en-US" b="1" dirty="0" smtClean="0"/>
+              <a:t>WHAT IT DOES?</a:t>
+            </a:r>
+            <a:r>
               <a:rPr lang="en-US" dirty="0" smtClean="0"/>
-              <a:t>Algorithms have widespread range, almost in every expect of study and life. </a:t>
-            </a:r>
+              <a:t> </a:t>
+            </a:r>
+          </a:p>
+          <a:p>
+            <a:pPr marL="58738" indent="0">
+              <a:buFont typeface="Wingdings" panose="05000000000000000000" pitchFamily="2" charset="2"/>
+              <a:buChar char="v"/>
+            </a:pPr>
+            <a:r>
+              <a:rPr lang="en-US" dirty="0" smtClean="0"/>
+              <a:t> Follow instructions code </a:t>
+            </a:r>
+          </a:p>
+          <a:p>
+            <a:pPr marL="58738" indent="0">
+              <a:buFont typeface="Wingdings" panose="05000000000000000000" pitchFamily="2" charset="2"/>
+              <a:buChar char="v"/>
+            </a:pPr>
             <a:r>
               <a:rPr lang="en-US" dirty="0"/>
-              <a:t>H</a:t>
+              <a:t> </a:t>
             </a:r>
             <a:r>
               <a:rPr lang="en-US" dirty="0" smtClean="0"/>
-              <a:t>ere only concern with the Statistical/Computational statistics, </a:t>
-            </a:r>
-            <a:r>
-              <a:rPr lang="en-US" dirty="0"/>
-              <a:t>Data mining, </a:t>
-            </a:r>
+              <a:t>Calculation (Logical/Mathematical)</a:t>
+            </a:r>
+          </a:p>
+          <a:p>
+            <a:pPr marL="58738" indent="0">
+              <a:buFont typeface="Wingdings" panose="05000000000000000000" pitchFamily="2" charset="2"/>
+              <a:buChar char="v"/>
+            </a:pPr>
             <a:r>
               <a:rPr lang="en-US" dirty="0" smtClean="0"/>
-              <a:t>Machine </a:t>
-            </a:r>
-            <a:r>
-              <a:rPr lang="en-US" dirty="0"/>
-              <a:t>learning </a:t>
-            </a:r>
+              <a:t> Data Manipulation</a:t>
+            </a:r>
+          </a:p>
+          <a:p>
+            <a:pPr marL="58738" indent="0">
+              <a:buFont typeface="Wingdings" panose="05000000000000000000" pitchFamily="2" charset="2"/>
+              <a:buChar char="v"/>
+            </a:pPr>
             <a:r>
               <a:rPr lang="en-US" dirty="0" smtClean="0"/>
-              <a:t>algorithms. These classified as:</a:t>
-            </a:r>
-          </a:p>
-          <a:p>
-            <a:pPr marL="566738" indent="-457200">
-              <a:buFont typeface="+mj-lt"/>
-              <a:buAutoNum type="arabicPeriod"/>
+              <a:t> Data Processing</a:t>
+            </a:r>
+          </a:p>
+          <a:p>
+            <a:pPr marL="58738" indent="0">
+              <a:buNone/>
             </a:pPr>
             <a:r>
+              <a:rPr lang="en-US" b="1" dirty="0" smtClean="0"/>
+              <a:t> IT IS USED FOR</a:t>
+            </a:r>
+          </a:p>
+          <a:p>
+            <a:pPr marL="115888" indent="-57150">
+              <a:buFont typeface="Wingdings" panose="05000000000000000000" pitchFamily="2" charset="2"/>
+              <a:buChar char="v"/>
+            </a:pPr>
+            <a:r>
               <a:rPr lang="en-US" dirty="0" smtClean="0"/>
-              <a:t>Supervised Learning</a:t>
-            </a:r>
-            <a:r>
-              <a:rPr lang="en-US" dirty="0"/>
-              <a:t/>
-            </a:r>
-            <a:br>
-              <a:rPr lang="en-US" dirty="0"/>
-            </a:br>
-            <a:r>
-              <a:rPr lang="en-US" sz="1400" b="1" dirty="0" err="1" smtClean="0"/>
-              <a:t>e.g</a:t>
-            </a:r>
-            <a:r>
-              <a:rPr lang="en-US" sz="1400" b="1" dirty="0" smtClean="0"/>
-              <a:t>:</a:t>
-            </a:r>
-            <a:r>
-              <a:rPr lang="en-US" sz="1400" dirty="0" smtClean="0"/>
-              <a:t> Nearest </a:t>
-            </a:r>
-            <a:r>
-              <a:rPr lang="en-US" sz="1400" dirty="0"/>
-              <a:t>Neighbor, Naive Bayes, Decision Trees, Linear Regression, Support Vector Machines (SVM), Neural </a:t>
-            </a:r>
-            <a:r>
-              <a:rPr lang="en-US" sz="1400" dirty="0" smtClean="0"/>
-              <a:t>Networks</a:t>
-            </a:r>
-            <a:endParaRPr lang="en-US" dirty="0" smtClean="0"/>
-          </a:p>
-          <a:p>
-            <a:pPr marL="566738" indent="-457200">
-              <a:buFont typeface="+mj-lt"/>
-              <a:buAutoNum type="arabicPeriod"/>
+              <a:t> Searching</a:t>
+            </a:r>
+          </a:p>
+          <a:p>
+            <a:pPr marL="115888" indent="-57150">
+              <a:buFont typeface="Wingdings" panose="05000000000000000000" pitchFamily="2" charset="2"/>
+              <a:buChar char="v"/>
             </a:pPr>
             <a:r>
               <a:rPr lang="en-US" dirty="0" smtClean="0"/>
-              <a:t>Unsupervised Learning</a:t>
-            </a:r>
-            <a:r>
-              <a:rPr lang="en-US" dirty="0"/>
-              <a:t/>
-            </a:r>
-            <a:br>
-              <a:rPr lang="en-US" dirty="0"/>
-            </a:br>
-            <a:r>
-              <a:rPr lang="en-US" sz="1400" b="1" dirty="0" err="1"/>
-              <a:t>e.g</a:t>
-            </a:r>
-            <a:r>
-              <a:rPr lang="en-US" sz="1400" b="1" dirty="0"/>
-              <a:t>:</a:t>
-            </a:r>
-            <a:r>
-              <a:rPr lang="en-US" sz="1400" dirty="0"/>
-              <a:t> </a:t>
-            </a:r>
-            <a:r>
-              <a:rPr lang="en-US" sz="1400" dirty="0" smtClean="0"/>
-              <a:t>k-means </a:t>
-            </a:r>
-            <a:r>
-              <a:rPr lang="en-US" sz="1400" dirty="0"/>
-              <a:t>clustering, Association </a:t>
-            </a:r>
-            <a:r>
-              <a:rPr lang="en-US" sz="1400" dirty="0" smtClean="0"/>
-              <a:t>Rules, </a:t>
-            </a:r>
-            <a:r>
-              <a:rPr lang="en-US" sz="1400" dirty="0"/>
-              <a:t>mixture </a:t>
-            </a:r>
-            <a:r>
-              <a:rPr lang="en-US" sz="1400" dirty="0" smtClean="0"/>
-              <a:t>models, </a:t>
-            </a:r>
-            <a:r>
-              <a:rPr lang="en-US" sz="1400" dirty="0"/>
-              <a:t>Self-organizing </a:t>
-            </a:r>
-            <a:r>
-              <a:rPr lang="en-US" sz="1400" dirty="0" smtClean="0"/>
-              <a:t>map, </a:t>
-            </a:r>
-            <a:r>
-              <a:rPr lang="en-US" sz="1400" dirty="0"/>
-              <a:t>Expectation–maximization algorithm (EM)</a:t>
-            </a:r>
-          </a:p>
-          <a:p>
-            <a:pPr marL="566738" indent="-457200">
-              <a:buFont typeface="+mj-lt"/>
-              <a:buAutoNum type="arabicPeriod"/>
+              <a:t> Sorting</a:t>
+            </a:r>
+          </a:p>
+          <a:p>
+            <a:pPr marL="115888" indent="-57150">
+              <a:buFont typeface="Wingdings" panose="05000000000000000000" pitchFamily="2" charset="2"/>
+              <a:buChar char="v"/>
             </a:pPr>
             <a:r>
               <a:rPr lang="en-US" dirty="0" smtClean="0"/>
-              <a:t>Semi-Supervised Learning</a:t>
-            </a:r>
-            <a:br>
+              <a:t> Scheduling</a:t>
+            </a:r>
+          </a:p>
+          <a:p>
+            <a:pPr marL="115888" indent="-57150">
+              <a:buFont typeface="Wingdings" panose="05000000000000000000" pitchFamily="2" charset="2"/>
+              <a:buChar char="v"/>
+            </a:pPr>
+            <a:r>
               <a:rPr lang="en-US" dirty="0" smtClean="0"/>
-            </a:br>
-            <a:r>
-              <a:rPr lang="en-US" sz="1400" b="1" dirty="0" err="1"/>
-              <a:t>e.g</a:t>
-            </a:r>
-            <a:r>
-              <a:rPr lang="en-US" sz="1400" b="1" dirty="0"/>
-              <a:t>: </a:t>
-            </a:r>
-            <a:r>
-              <a:rPr lang="en-US" sz="1400" dirty="0"/>
-              <a:t>Generative method, Low-density separation method, Graph-based method, Heuristic method</a:t>
-            </a:r>
-          </a:p>
-          <a:p>
-            <a:pPr marL="566738" indent="-457200">
-              <a:buFont typeface="+mj-lt"/>
-              <a:buAutoNum type="arabicPeriod"/>
+              <a:t> Automated Reasoning</a:t>
+            </a:r>
+          </a:p>
+          <a:p>
+            <a:pPr marL="115888" indent="-57150">
+              <a:buFont typeface="Wingdings" panose="05000000000000000000" pitchFamily="2" charset="2"/>
+              <a:buChar char="v"/>
             </a:pPr>
             <a:r>
               <a:rPr lang="en-US" dirty="0" smtClean="0"/>
-              <a:t>Reinforcement Learning</a:t>
-            </a:r>
-            <a:br>
-              <a:rPr lang="en-US" dirty="0" smtClean="0"/>
-            </a:br>
-            <a:r>
-              <a:rPr lang="en-US" sz="1400" b="1" dirty="0" err="1"/>
-              <a:t>e.g</a:t>
-            </a:r>
-            <a:r>
-              <a:rPr lang="en-US" sz="1400" b="1" dirty="0"/>
-              <a:t>: </a:t>
-            </a:r>
-            <a:r>
-              <a:rPr lang="en-US" sz="1400" dirty="0" smtClean="0"/>
-              <a:t>Monte </a:t>
-            </a:r>
-            <a:r>
-              <a:rPr lang="en-US" sz="1400" dirty="0"/>
-              <a:t>Carlo, Q-learning, SARSA, DQN, A3C, NAF, PPO, </a:t>
-            </a:r>
-            <a:r>
-              <a:rPr lang="en-US" sz="1400" dirty="0" smtClean="0"/>
-              <a:t>TRPO</a:t>
-            </a:r>
-            <a:endParaRPr lang="en-US" sz="1400" dirty="0"/>
+              <a:t> Automate Operations/Tasks</a:t>
+            </a:r>
+            <a:endParaRPr lang="en-US" dirty="0"/>
           </a:p>
         </p:txBody>
       </p:sp>
     </p:spTree>
     <p:extLst>
       <p:ext uri="{BB962C8B-B14F-4D97-AF65-F5344CB8AC3E}">
-        <p14:creationId xmlns:p14="http://schemas.microsoft.com/office/powerpoint/2010/main" val="1870692302"/>
+        <p14:creationId xmlns:p14="http://schemas.microsoft.com/office/powerpoint/2010/main" val="416887670"/>
       </p:ext>
     </p:extLst>
   </p:cSld>
@@ -15308,6 +15133,268 @@
           <a:p>
             <a:r>
               <a:rPr lang="en-US" dirty="0" smtClean="0"/>
+              <a:t>Algorithm: Classification</a:t>
+            </a:r>
+            <a:endParaRPr lang="en-US" dirty="0"/>
+          </a:p>
+        </p:txBody>
+      </p:sp>
+      <p:sp>
+        <p:nvSpPr>
+          <p:cNvPr id="3" name="Content Placeholder 2"/>
+          <p:cNvSpPr>
+            <a:spLocks noGrp="1"/>
+          </p:cNvSpPr>
+          <p:nvPr>
+            <p:ph idx="1"/>
+          </p:nvPr>
+        </p:nvSpPr>
+        <p:spPr/>
+        <p:txBody>
+          <a:bodyPr>
+            <a:normAutofit/>
+          </a:bodyPr>
+          <a:lstStyle/>
+          <a:p>
+            <a:pPr marL="0" indent="0">
+              <a:buNone/>
+            </a:pPr>
+            <a:r>
+              <a:rPr lang="en-US" dirty="0" smtClean="0"/>
+              <a:t>Algorithms have widespread range, almost in every expect of study and life. </a:t>
+            </a:r>
+            <a:r>
+              <a:rPr lang="en-US" dirty="0"/>
+              <a:t>H</a:t>
+            </a:r>
+            <a:r>
+              <a:rPr lang="en-US" dirty="0" smtClean="0"/>
+              <a:t>ere only concern with the Statistical/Computational statistics, </a:t>
+            </a:r>
+            <a:r>
+              <a:rPr lang="en-US" dirty="0"/>
+              <a:t>Data mining, </a:t>
+            </a:r>
+            <a:r>
+              <a:rPr lang="en-US" dirty="0" smtClean="0"/>
+              <a:t>Machine </a:t>
+            </a:r>
+            <a:r>
+              <a:rPr lang="en-US" dirty="0"/>
+              <a:t>learning </a:t>
+            </a:r>
+            <a:r>
+              <a:rPr lang="en-US" dirty="0" smtClean="0"/>
+              <a:t>algorithms. These classified as:</a:t>
+            </a:r>
+          </a:p>
+          <a:p>
+            <a:pPr marL="566738" indent="-457200">
+              <a:buFont typeface="+mj-lt"/>
+              <a:buAutoNum type="arabicPeriod"/>
+            </a:pPr>
+            <a:r>
+              <a:rPr lang="en-US" dirty="0" smtClean="0"/>
+              <a:t>Supervised Learning</a:t>
+            </a:r>
+            <a:r>
+              <a:rPr lang="en-US" dirty="0"/>
+              <a:t/>
+            </a:r>
+            <a:br>
+              <a:rPr lang="en-US" dirty="0"/>
+            </a:br>
+            <a:r>
+              <a:rPr lang="en-US" sz="1400" b="1" dirty="0" err="1" smtClean="0"/>
+              <a:t>e.g</a:t>
+            </a:r>
+            <a:r>
+              <a:rPr lang="en-US" sz="1400" b="1" dirty="0" smtClean="0"/>
+              <a:t>:</a:t>
+            </a:r>
+            <a:r>
+              <a:rPr lang="en-US" sz="1400" dirty="0" smtClean="0"/>
+              <a:t> Nearest </a:t>
+            </a:r>
+            <a:r>
+              <a:rPr lang="en-US" sz="1400" dirty="0"/>
+              <a:t>Neighbor, Naive Bayes, Decision Trees, Linear Regression, Support Vector Machines (SVM), Neural </a:t>
+            </a:r>
+            <a:r>
+              <a:rPr lang="en-US" sz="1400" dirty="0" smtClean="0"/>
+              <a:t>Networks</a:t>
+            </a:r>
+            <a:endParaRPr lang="en-US" dirty="0" smtClean="0"/>
+          </a:p>
+          <a:p>
+            <a:pPr marL="566738" indent="-457200">
+              <a:buFont typeface="+mj-lt"/>
+              <a:buAutoNum type="arabicPeriod"/>
+            </a:pPr>
+            <a:r>
+              <a:rPr lang="en-US" dirty="0" smtClean="0"/>
+              <a:t>Unsupervised Learning</a:t>
+            </a:r>
+            <a:r>
+              <a:rPr lang="en-US" dirty="0"/>
+              <a:t/>
+            </a:r>
+            <a:br>
+              <a:rPr lang="en-US" dirty="0"/>
+            </a:br>
+            <a:r>
+              <a:rPr lang="en-US" sz="1400" b="1" dirty="0" err="1"/>
+              <a:t>e.g</a:t>
+            </a:r>
+            <a:r>
+              <a:rPr lang="en-US" sz="1400" b="1" dirty="0"/>
+              <a:t>:</a:t>
+            </a:r>
+            <a:r>
+              <a:rPr lang="en-US" sz="1400" dirty="0"/>
+              <a:t> </a:t>
+            </a:r>
+            <a:r>
+              <a:rPr lang="en-US" sz="1400" dirty="0" smtClean="0"/>
+              <a:t>k-means </a:t>
+            </a:r>
+            <a:r>
+              <a:rPr lang="en-US" sz="1400" dirty="0"/>
+              <a:t>clustering, Association </a:t>
+            </a:r>
+            <a:r>
+              <a:rPr lang="en-US" sz="1400" dirty="0" smtClean="0"/>
+              <a:t>Rules, </a:t>
+            </a:r>
+            <a:r>
+              <a:rPr lang="en-US" sz="1400" dirty="0"/>
+              <a:t>mixture </a:t>
+            </a:r>
+            <a:r>
+              <a:rPr lang="en-US" sz="1400" dirty="0" smtClean="0"/>
+              <a:t>models, </a:t>
+            </a:r>
+            <a:r>
+              <a:rPr lang="en-US" sz="1400" dirty="0"/>
+              <a:t>Self-organizing </a:t>
+            </a:r>
+            <a:r>
+              <a:rPr lang="en-US" sz="1400" dirty="0" smtClean="0"/>
+              <a:t>map, </a:t>
+            </a:r>
+            <a:r>
+              <a:rPr lang="en-US" sz="1400" dirty="0"/>
+              <a:t>Expectation–maximization algorithm (EM)</a:t>
+            </a:r>
+          </a:p>
+          <a:p>
+            <a:pPr marL="566738" indent="-457200">
+              <a:buFont typeface="+mj-lt"/>
+              <a:buAutoNum type="arabicPeriod"/>
+            </a:pPr>
+            <a:r>
+              <a:rPr lang="en-US" dirty="0" smtClean="0"/>
+              <a:t>Semi-Supervised Learning</a:t>
+            </a:r>
+            <a:br>
+              <a:rPr lang="en-US" dirty="0" smtClean="0"/>
+            </a:br>
+            <a:r>
+              <a:rPr lang="en-US" sz="1400" b="1" dirty="0" err="1"/>
+              <a:t>e.g</a:t>
+            </a:r>
+            <a:r>
+              <a:rPr lang="en-US" sz="1400" b="1" dirty="0"/>
+              <a:t>: </a:t>
+            </a:r>
+            <a:r>
+              <a:rPr lang="en-US" sz="1400" dirty="0"/>
+              <a:t>Generative method, Low-density separation method, Graph-based method, Heuristic method</a:t>
+            </a:r>
+          </a:p>
+          <a:p>
+            <a:pPr marL="566738" indent="-457200">
+              <a:buFont typeface="+mj-lt"/>
+              <a:buAutoNum type="arabicPeriod"/>
+            </a:pPr>
+            <a:r>
+              <a:rPr lang="en-US" dirty="0" smtClean="0"/>
+              <a:t>Reinforcement Learning</a:t>
+            </a:r>
+            <a:br>
+              <a:rPr lang="en-US" dirty="0" smtClean="0"/>
+            </a:br>
+            <a:r>
+              <a:rPr lang="en-US" sz="1400" b="1" dirty="0" err="1"/>
+              <a:t>e.g</a:t>
+            </a:r>
+            <a:r>
+              <a:rPr lang="en-US" sz="1400" b="1" dirty="0"/>
+              <a:t>: </a:t>
+            </a:r>
+            <a:r>
+              <a:rPr lang="en-US" sz="1400" dirty="0" smtClean="0"/>
+              <a:t>Monte </a:t>
+            </a:r>
+            <a:r>
+              <a:rPr lang="en-US" sz="1400" dirty="0"/>
+              <a:t>Carlo, Q-learning, SARSA, DQN, A3C, NAF, PPO, </a:t>
+            </a:r>
+            <a:r>
+              <a:rPr lang="en-US" sz="1400" dirty="0" smtClean="0"/>
+              <a:t>TRPO</a:t>
+            </a:r>
+            <a:endParaRPr lang="en-US" sz="1400" dirty="0"/>
+          </a:p>
+        </p:txBody>
+      </p:sp>
+    </p:spTree>
+    <p:extLst>
+      <p:ext uri="{BB962C8B-B14F-4D97-AF65-F5344CB8AC3E}">
+        <p14:creationId xmlns:p14="http://schemas.microsoft.com/office/powerpoint/2010/main" val="1870692302"/>
+      </p:ext>
+    </p:extLst>
+  </p:cSld>
+  <p:clrMapOvr>
+    <a:masterClrMapping/>
+  </p:clrMapOvr>
+</p:sld>
+</file>
+
+<file path=ppt/slides/slide25.xml><?xml version="1.0" encoding="utf-8"?>
+<p:sld xmlns:a="http://schemas.openxmlformats.org/drawingml/2006/main" xmlns:r="http://schemas.openxmlformats.org/officeDocument/2006/relationships" xmlns:p="http://schemas.openxmlformats.org/presentationml/2006/main">
+  <p:cSld>
+    <p:spTree>
+      <p:nvGrpSpPr>
+        <p:cNvPr id="1" name=""/>
+        <p:cNvGrpSpPr/>
+        <p:nvPr/>
+      </p:nvGrpSpPr>
+      <p:grpSpPr>
+        <a:xfrm>
+          <a:off x="0" y="0"/>
+          <a:ext cx="0" cy="0"/>
+          <a:chOff x="0" y="0"/>
+          <a:chExt cx="0" cy="0"/>
+        </a:xfrm>
+      </p:grpSpPr>
+      <p:sp>
+        <p:nvSpPr>
+          <p:cNvPr id="2" name="Title 1"/>
+          <p:cNvSpPr>
+            <a:spLocks noGrp="1"/>
+          </p:cNvSpPr>
+          <p:nvPr>
+            <p:ph type="title"/>
+          </p:nvPr>
+        </p:nvSpPr>
+        <p:spPr/>
+        <p:txBody>
+          <a:bodyPr/>
+          <a:lstStyle/>
+          <a:p>
+            <a:r>
+              <a:rPr lang="en-US" dirty="0" smtClean="0"/>
               <a:t>Algorithms: Classification by Learning</a:t>
             </a:r>
             <a:endParaRPr lang="en-US" dirty="0"/>
@@ -15352,7 +15439,7 @@
 </p:sld>
 </file>
 
-<file path=ppt/slides/slide25.xml><?xml version="1.0" encoding="utf-8"?>
+<file path=ppt/slides/slide26.xml><?xml version="1.0" encoding="utf-8"?>
 <p:sld xmlns:a="http://schemas.openxmlformats.org/drawingml/2006/main" xmlns:r="http://schemas.openxmlformats.org/officeDocument/2006/relationships" xmlns:p="http://schemas.openxmlformats.org/presentationml/2006/main">
   <p:cSld>
     <p:spTree>
@@ -15438,7 +15525,7 @@
 </p:sld>
 </file>
 
-<file path=ppt/slides/slide26.xml><?xml version="1.0" encoding="utf-8"?>
+<file path=ppt/slides/slide27.xml><?xml version="1.0" encoding="utf-8"?>
 <p:sld xmlns:a="http://schemas.openxmlformats.org/drawingml/2006/main" xmlns:r="http://schemas.openxmlformats.org/officeDocument/2006/relationships" xmlns:p="http://schemas.openxmlformats.org/presentationml/2006/main">
   <p:cSld>
     <p:spTree>
@@ -15601,14 +15688,14 @@
                 <a:gridCol w="5035931">
                   <a:extLst>
                     <a:ext uri="{9D8B030D-6E8A-4147-A177-3AD203B41FA5}">
-                      <a16:colId xmlns="" xmlns:a16="http://schemas.microsoft.com/office/drawing/2014/main" val="20000"/>
+                      <a16:colId xmlns:a16="http://schemas.microsoft.com/office/drawing/2014/main" xmlns="" val="20000"/>
                     </a:ext>
                   </a:extLst>
                 </a:gridCol>
                 <a:gridCol w="5022469">
                   <a:extLst>
                     <a:ext uri="{9D8B030D-6E8A-4147-A177-3AD203B41FA5}">
-                      <a16:colId xmlns="" xmlns:a16="http://schemas.microsoft.com/office/drawing/2014/main" val="20001"/>
+                      <a16:colId xmlns:a16="http://schemas.microsoft.com/office/drawing/2014/main" xmlns="" val="20001"/>
                     </a:ext>
                   </a:extLst>
                 </a:gridCol>
@@ -15688,7 +15775,7 @@
                 </a:tc>
                 <a:extLst>
                   <a:ext uri="{0D108BD9-81ED-4DB2-BD59-A6C34878D82A}">
-                    <a16:rowId xmlns="" xmlns:a16="http://schemas.microsoft.com/office/drawing/2014/main" val="10000"/>
+                    <a16:rowId xmlns:a16="http://schemas.microsoft.com/office/drawing/2014/main" xmlns="" val="10000"/>
                   </a:ext>
                 </a:extLst>
               </a:tr>
@@ -15775,7 +15862,7 @@
                 </a:tc>
                 <a:extLst>
                   <a:ext uri="{0D108BD9-81ED-4DB2-BD59-A6C34878D82A}">
-                    <a16:rowId xmlns="" xmlns:a16="http://schemas.microsoft.com/office/drawing/2014/main" val="10001"/>
+                    <a16:rowId xmlns:a16="http://schemas.microsoft.com/office/drawing/2014/main" xmlns="" val="10001"/>
                   </a:ext>
                 </a:extLst>
               </a:tr>
@@ -15878,7 +15965,7 @@
                 </a:tc>
                 <a:extLst>
                   <a:ext uri="{0D108BD9-81ED-4DB2-BD59-A6C34878D82A}">
-                    <a16:rowId xmlns="" xmlns:a16="http://schemas.microsoft.com/office/drawing/2014/main" val="10002"/>
+                    <a16:rowId xmlns:a16="http://schemas.microsoft.com/office/drawing/2014/main" xmlns="" val="10002"/>
                   </a:ext>
                 </a:extLst>
               </a:tr>

</xml_diff>